<commit_message>
css float zur PowerPoint Präsentation hinzugefügt.
</commit_message>
<xml_diff>
--- a/html Schulung.pptx
+++ b/html Schulung.pptx
@@ -5,7 +5,7 @@
     <p:sldMasterId id="2147483660" r:id="rId1"/>
   </p:sldMasterIdLst>
   <p:notesMasterIdLst>
-    <p:notesMasterId r:id="rId62"/>
+    <p:notesMasterId r:id="rId77"/>
   </p:notesMasterIdLst>
   <p:sldIdLst>
     <p:sldId id="256" r:id="rId2"/>
@@ -67,7 +67,22 @@
     <p:sldId id="307" r:id="rId58"/>
     <p:sldId id="308" r:id="rId59"/>
     <p:sldId id="313" r:id="rId60"/>
-    <p:sldId id="264" r:id="rId61"/>
+    <p:sldId id="316" r:id="rId61"/>
+    <p:sldId id="317" r:id="rId62"/>
+    <p:sldId id="318" r:id="rId63"/>
+    <p:sldId id="319" r:id="rId64"/>
+    <p:sldId id="320" r:id="rId65"/>
+    <p:sldId id="321" r:id="rId66"/>
+    <p:sldId id="322" r:id="rId67"/>
+    <p:sldId id="323" r:id="rId68"/>
+    <p:sldId id="324" r:id="rId69"/>
+    <p:sldId id="325" r:id="rId70"/>
+    <p:sldId id="326" r:id="rId71"/>
+    <p:sldId id="327" r:id="rId72"/>
+    <p:sldId id="328" r:id="rId73"/>
+    <p:sldId id="329" r:id="rId74"/>
+    <p:sldId id="330" r:id="rId75"/>
+    <p:sldId id="264" r:id="rId76"/>
   </p:sldIdLst>
   <p:sldSz cx="12192000" cy="6858000"/>
   <p:notesSz cx="6858000" cy="9144000"/>
@@ -276,7 +291,7 @@
           <a:p>
             <a:fld id="{BE2D71F2-CD9B-7C46-8D66-54734C07EE34}" type="datetimeFigureOut">
               <a:rPr lang="de-DE" smtClean="0"/>
-              <a:t>13.03.19</a:t>
+              <a:t>22.03.19</a:t>
             </a:fld>
             <a:endParaRPr lang="de-DE"/>
           </a:p>
@@ -1464,7 +1479,7 @@
           <a:p>
             <a:fld id="{97F8442F-7EFF-D846-8D33-E60C8BAB8488}" type="datetimeFigureOut">
               <a:rPr lang="de-DE" smtClean="0"/>
-              <a:t>13.03.19</a:t>
+              <a:t>22.03.19</a:t>
             </a:fld>
             <a:endParaRPr lang="de-DE"/>
           </a:p>
@@ -1883,7 +1898,7 @@
           <a:p>
             <a:fld id="{97F8442F-7EFF-D846-8D33-E60C8BAB8488}" type="datetimeFigureOut">
               <a:rPr lang="de-DE" smtClean="0"/>
-              <a:t>13.03.19</a:t>
+              <a:t>22.03.19</a:t>
             </a:fld>
             <a:endParaRPr lang="de-DE"/>
           </a:p>
@@ -2224,7 +2239,7 @@
           <a:p>
             <a:fld id="{97F8442F-7EFF-D846-8D33-E60C8BAB8488}" type="datetimeFigureOut">
               <a:rPr lang="de-DE" smtClean="0"/>
-              <a:t>13.03.19</a:t>
+              <a:t>22.03.19</a:t>
             </a:fld>
             <a:endParaRPr lang="de-DE"/>
           </a:p>
@@ -2639,7 +2654,7 @@
           <a:p>
             <a:fld id="{97F8442F-7EFF-D846-8D33-E60C8BAB8488}" type="datetimeFigureOut">
               <a:rPr lang="de-DE" smtClean="0"/>
-              <a:t>13.03.19</a:t>
+              <a:t>22.03.19</a:t>
             </a:fld>
             <a:endParaRPr lang="de-DE"/>
           </a:p>
@@ -3212,7 +3227,7 @@
           <a:p>
             <a:fld id="{97F8442F-7EFF-D846-8D33-E60C8BAB8488}" type="datetimeFigureOut">
               <a:rPr lang="de-DE" smtClean="0"/>
-              <a:t>13.03.19</a:t>
+              <a:t>22.03.19</a:t>
             </a:fld>
             <a:endParaRPr lang="de-DE"/>
           </a:p>
@@ -3923,7 +3938,7 @@
           <a:p>
             <a:fld id="{97F8442F-7EFF-D846-8D33-E60C8BAB8488}" type="datetimeFigureOut">
               <a:rPr lang="de-DE" smtClean="0"/>
-              <a:t>13.03.19</a:t>
+              <a:t>22.03.19</a:t>
             </a:fld>
             <a:endParaRPr lang="de-DE"/>
           </a:p>
@@ -4866,7 +4881,7 @@
           <a:p>
             <a:fld id="{97F8442F-7EFF-D846-8D33-E60C8BAB8488}" type="datetimeFigureOut">
               <a:rPr lang="de-DE" smtClean="0"/>
-              <a:t>13.03.19</a:t>
+              <a:t>22.03.19</a:t>
             </a:fld>
             <a:endParaRPr lang="de-DE"/>
           </a:p>
@@ -5155,7 +5170,7 @@
           <a:p>
             <a:fld id="{97F8442F-7EFF-D846-8D33-E60C8BAB8488}" type="datetimeFigureOut">
               <a:rPr lang="de-DE" smtClean="0"/>
-              <a:t>13.03.19</a:t>
+              <a:t>22.03.19</a:t>
             </a:fld>
             <a:endParaRPr lang="de-DE"/>
           </a:p>
@@ -5395,7 +5410,7 @@
           <a:p>
             <a:fld id="{97F8442F-7EFF-D846-8D33-E60C8BAB8488}" type="datetimeFigureOut">
               <a:rPr lang="de-DE" smtClean="0"/>
-              <a:t>13.03.19</a:t>
+              <a:t>22.03.19</a:t>
             </a:fld>
             <a:endParaRPr lang="de-DE"/>
           </a:p>
@@ -5694,7 +5709,7 @@
           <a:p>
             <a:fld id="{97F8442F-7EFF-D846-8D33-E60C8BAB8488}" type="datetimeFigureOut">
               <a:rPr lang="de-DE" smtClean="0"/>
-              <a:t>13.03.19</a:t>
+              <a:t>22.03.19</a:t>
             </a:fld>
             <a:endParaRPr lang="de-DE"/>
           </a:p>
@@ -6088,7 +6103,7 @@
           <a:p>
             <a:fld id="{97F8442F-7EFF-D846-8D33-E60C8BAB8488}" type="datetimeFigureOut">
               <a:rPr lang="de-DE" smtClean="0"/>
-              <a:t>13.03.19</a:t>
+              <a:t>22.03.19</a:t>
             </a:fld>
             <a:endParaRPr lang="de-DE"/>
           </a:p>
@@ -6416,7 +6431,7 @@
           <a:p>
             <a:fld id="{97F8442F-7EFF-D846-8D33-E60C8BAB8488}" type="datetimeFigureOut">
               <a:rPr lang="de-DE" smtClean="0"/>
-              <a:t>13.03.19</a:t>
+              <a:t>22.03.19</a:t>
             </a:fld>
             <a:endParaRPr lang="de-DE"/>
           </a:p>
@@ -6884,7 +6899,7 @@
           <a:p>
             <a:fld id="{97F8442F-7EFF-D846-8D33-E60C8BAB8488}" type="datetimeFigureOut">
               <a:rPr lang="de-DE" smtClean="0"/>
-              <a:t>13.03.19</a:t>
+              <a:t>22.03.19</a:t>
             </a:fld>
             <a:endParaRPr lang="de-DE"/>
           </a:p>
@@ -7141,7 +7156,7 @@
           <a:p>
             <a:fld id="{97F8442F-7EFF-D846-8D33-E60C8BAB8488}" type="datetimeFigureOut">
               <a:rPr lang="de-DE" smtClean="0"/>
-              <a:t>13.03.19</a:t>
+              <a:t>22.03.19</a:t>
             </a:fld>
             <a:endParaRPr lang="de-DE"/>
           </a:p>
@@ -7304,7 +7319,7 @@
           <a:p>
             <a:fld id="{97F8442F-7EFF-D846-8D33-E60C8BAB8488}" type="datetimeFigureOut">
               <a:rPr lang="de-DE" smtClean="0"/>
-              <a:t>13.03.19</a:t>
+              <a:t>22.03.19</a:t>
             </a:fld>
             <a:endParaRPr lang="de-DE"/>
           </a:p>
@@ -7675,7 +7690,7 @@
           <a:p>
             <a:fld id="{97F8442F-7EFF-D846-8D33-E60C8BAB8488}" type="datetimeFigureOut">
               <a:rPr lang="de-DE" smtClean="0"/>
-              <a:t>13.03.19</a:t>
+              <a:t>22.03.19</a:t>
             </a:fld>
             <a:endParaRPr lang="de-DE"/>
           </a:p>
@@ -8089,7 +8104,7 @@
           <a:p>
             <a:fld id="{97F8442F-7EFF-D846-8D33-E60C8BAB8488}" type="datetimeFigureOut">
               <a:rPr lang="de-DE" smtClean="0"/>
-              <a:t>13.03.19</a:t>
+              <a:t>22.03.19</a:t>
             </a:fld>
             <a:endParaRPr lang="de-DE"/>
           </a:p>
@@ -8309,7 +8324,7 @@
           <a:p>
             <a:fld id="{97F8442F-7EFF-D846-8D33-E60C8BAB8488}" type="datetimeFigureOut">
               <a:rPr lang="de-DE" smtClean="0"/>
-              <a:t>13.03.19</a:t>
+              <a:t>22.03.19</a:t>
             </a:fld>
             <a:endParaRPr lang="de-DE"/>
           </a:p>
@@ -21529,10 +21544,10 @@
       </p:grpSpPr>
       <p:sp>
         <p:nvSpPr>
-          <p:cNvPr id="2" name="Titel 1">
+          <p:cNvPr id="2" name="Title 1">
             <a:extLst>
               <a:ext uri="{FF2B5EF4-FFF2-40B4-BE49-F238E27FC236}">
-                <a16:creationId xmlns:a16="http://schemas.microsoft.com/office/drawing/2014/main" id="{2D87845B-83AD-7C4C-B581-5E1612E3AFF1}"/>
+                <a16:creationId xmlns:a16="http://schemas.microsoft.com/office/drawing/2014/main" id="{585066C8-D735-4746-B6FB-377873178853}"/>
               </a:ext>
             </a:extLst>
           </p:cNvPr>
@@ -21549,18 +21564,18 @@
           <a:lstStyle/>
           <a:p>
             <a:r>
-              <a:rPr lang="de-DE" dirty="0"/>
-              <a:t>Literatur / Tutorials</a:t>
-            </a:r>
-          </a:p>
-        </p:txBody>
-      </p:sp>
-      <p:sp>
-        <p:nvSpPr>
-          <p:cNvPr id="3" name="Inhaltsplatzhalter 2">
+              <a:rPr lang="en-US" dirty="0"/>
+              <a:t>Float</a:t>
+            </a:r>
+          </a:p>
+        </p:txBody>
+      </p:sp>
+      <p:sp>
+        <p:nvSpPr>
+          <p:cNvPr id="3" name="Content Placeholder 2">
             <a:extLst>
               <a:ext uri="{FF2B5EF4-FFF2-40B4-BE49-F238E27FC236}">
-                <a16:creationId xmlns:a16="http://schemas.microsoft.com/office/drawing/2014/main" id="{180ECAA7-461F-3A48-BB16-AB334C364936}"/>
+                <a16:creationId xmlns:a16="http://schemas.microsoft.com/office/drawing/2014/main" id="{B442C989-61CB-C544-AEC3-F18A5E8D5ECA}"/>
               </a:ext>
             </a:extLst>
           </p:cNvPr>
@@ -21577,58 +21592,1913 @@
           <a:lstStyle/>
           <a:p>
             <a:r>
-              <a:rPr lang="de-DE" dirty="0">
-                <a:hlinkClick r:id="rId2"/>
-              </a:rPr>
-              <a:t>http://de.selfhtml.org/</a:t>
-            </a:r>
-            <a:endParaRPr lang="de-DE" dirty="0"/>
-          </a:p>
-          <a:p>
-            <a:r>
-              <a:rPr lang="de-DE" dirty="0">
-                <a:hlinkClick r:id="rId3"/>
-              </a:rPr>
-              <a:t>https://www.w3.org/standards/webdesign/htmlcss</a:t>
-            </a:r>
-            <a:endParaRPr lang="de-DE" dirty="0"/>
-          </a:p>
-          <a:p>
-            <a:r>
-              <a:rPr lang="de-DE" dirty="0">
-                <a:hlinkClick r:id="rId4"/>
-              </a:rPr>
-              <a:t>https://developer.mozilla.org/de/docs/Web/HTML</a:t>
-            </a:r>
-            <a:endParaRPr lang="de-DE" dirty="0"/>
-          </a:p>
-          <a:p>
-            <a:r>
-              <a:rPr lang="de-DE" dirty="0">
-                <a:hlinkClick r:id="rId5"/>
-              </a:rPr>
-              <a:t>https://developer.mozilla.org/de/docs/Web/CSS</a:t>
-            </a:r>
-            <a:endParaRPr lang="de-DE" dirty="0"/>
-          </a:p>
-          <a:p>
-            <a:r>
-              <a:rPr lang="de-DE" dirty="0">
-                <a:hlinkClick r:id="rId6"/>
-              </a:rPr>
-              <a:t>https://devdocs.io/</a:t>
-            </a:r>
-            <a:endParaRPr lang="de-DE" dirty="0"/>
-          </a:p>
-          <a:p>
-            <a:endParaRPr lang="de-DE" dirty="0"/>
+              <a:rPr lang="en-US" dirty="0"/>
+              <a:t>Floating (</a:t>
+            </a:r>
+            <a:r>
+              <a:rPr lang="en-US" dirty="0" err="1"/>
+              <a:t>engl.</a:t>
+            </a:r>
+            <a:r>
+              <a:rPr lang="en-US" dirty="0"/>
+              <a:t> </a:t>
+            </a:r>
+            <a:r>
+              <a:rPr lang="en-US" dirty="0" err="1"/>
+              <a:t>für</a:t>
+            </a:r>
+            <a:r>
+              <a:rPr lang="en-US" dirty="0"/>
+              <a:t> </a:t>
+            </a:r>
+            <a:r>
+              <a:rPr lang="en-US" dirty="0" err="1"/>
+              <a:t>Umfliessen</a:t>
+            </a:r>
+            <a:r>
+              <a:rPr lang="en-US" dirty="0"/>
+              <a:t>) </a:t>
+            </a:r>
+            <a:r>
+              <a:rPr lang="en-US" dirty="0" err="1"/>
+              <a:t>bedeutet</a:t>
+            </a:r>
+            <a:r>
+              <a:rPr lang="en-US" dirty="0"/>
+              <a:t> </a:t>
+            </a:r>
+            <a:r>
+              <a:rPr lang="en-US" dirty="0" err="1"/>
+              <a:t>im</a:t>
+            </a:r>
+            <a:r>
+              <a:rPr lang="en-US" dirty="0"/>
+              <a:t> CSS, </a:t>
+            </a:r>
+            <a:r>
+              <a:rPr lang="en-US" dirty="0" err="1"/>
+              <a:t>dass</a:t>
+            </a:r>
+            <a:r>
+              <a:rPr lang="en-US" dirty="0"/>
+              <a:t> </a:t>
+            </a:r>
+            <a:r>
+              <a:rPr lang="en-US" dirty="0" err="1"/>
+              <a:t>ein</a:t>
+            </a:r>
+            <a:r>
+              <a:rPr lang="en-US" dirty="0"/>
+              <a:t> Element </a:t>
+            </a:r>
+            <a:r>
+              <a:rPr lang="en-US" dirty="0" err="1"/>
+              <a:t>sich</a:t>
+            </a:r>
+            <a:r>
+              <a:rPr lang="en-US" dirty="0"/>
+              <a:t> </a:t>
+            </a:r>
+            <a:r>
+              <a:rPr lang="en-US" dirty="0" err="1"/>
+              <a:t>entweder</a:t>
+            </a:r>
+            <a:r>
+              <a:rPr lang="en-US" dirty="0"/>
+              <a:t> links </a:t>
+            </a:r>
+            <a:r>
+              <a:rPr lang="en-US" dirty="0" err="1"/>
+              <a:t>oder</a:t>
+            </a:r>
+            <a:r>
+              <a:rPr lang="en-US" dirty="0"/>
+              <a:t> </a:t>
+            </a:r>
+            <a:r>
+              <a:rPr lang="en-US" dirty="0" err="1"/>
+              <a:t>rechts</a:t>
+            </a:r>
+            <a:r>
+              <a:rPr lang="en-US" dirty="0"/>
+              <a:t> </a:t>
+            </a:r>
+            <a:r>
+              <a:rPr lang="en-US" dirty="0" err="1"/>
+              <a:t>neben</a:t>
+            </a:r>
+            <a:r>
+              <a:rPr lang="en-US" dirty="0"/>
+              <a:t> </a:t>
+            </a:r>
+            <a:r>
+              <a:rPr lang="en-US" dirty="0" err="1"/>
+              <a:t>einem</a:t>
+            </a:r>
+            <a:r>
+              <a:rPr lang="en-US" dirty="0"/>
+              <a:t> </a:t>
+            </a:r>
+            <a:r>
+              <a:rPr lang="en-US" dirty="0" err="1"/>
+              <a:t>anderen</a:t>
+            </a:r>
+            <a:r>
+              <a:rPr lang="en-US" dirty="0"/>
+              <a:t> Element </a:t>
+            </a:r>
+            <a:r>
+              <a:rPr lang="en-US" dirty="0" err="1"/>
+              <a:t>anordnet</a:t>
+            </a:r>
+            <a:r>
+              <a:rPr lang="en-US" dirty="0"/>
+              <a:t>, </a:t>
+            </a:r>
+            <a:r>
+              <a:rPr lang="en-US" dirty="0" err="1"/>
+              <a:t>anstatt</a:t>
+            </a:r>
+            <a:r>
+              <a:rPr lang="en-US" dirty="0"/>
+              <a:t> </a:t>
+            </a:r>
+            <a:r>
+              <a:rPr lang="en-US" dirty="0" err="1"/>
+              <a:t>darunter</a:t>
+            </a:r>
+            <a:r>
+              <a:rPr lang="en-US" dirty="0"/>
+              <a:t> (</a:t>
+            </a:r>
+            <a:r>
+              <a:rPr lang="en-US" dirty="0" err="1"/>
+              <a:t>wie</a:t>
+            </a:r>
+            <a:r>
+              <a:rPr lang="en-US" dirty="0"/>
+              <a:t> </a:t>
+            </a:r>
+            <a:r>
+              <a:rPr lang="en-US" dirty="0" err="1"/>
+              <a:t>es</a:t>
+            </a:r>
+            <a:r>
+              <a:rPr lang="en-US" dirty="0"/>
+              <a:t> </a:t>
+            </a:r>
+            <a:r>
+              <a:rPr lang="en-US" dirty="0" err="1"/>
+              <a:t>standardmässig</a:t>
+            </a:r>
+            <a:r>
+              <a:rPr lang="en-US" dirty="0"/>
+              <a:t> </a:t>
+            </a:r>
+            <a:r>
+              <a:rPr lang="en-US" dirty="0" err="1"/>
+              <a:t>bei</a:t>
+            </a:r>
+            <a:r>
+              <a:rPr lang="en-US" dirty="0"/>
+              <a:t> Block-</a:t>
+            </a:r>
+            <a:r>
+              <a:rPr lang="en-US" dirty="0" err="1"/>
+              <a:t>Elementen</a:t>
+            </a:r>
+            <a:r>
+              <a:rPr lang="en-US" dirty="0"/>
+              <a:t> der Fall </a:t>
+            </a:r>
+            <a:r>
+              <a:rPr lang="en-US" dirty="0" err="1"/>
+              <a:t>ist</a:t>
+            </a:r>
+            <a:r>
+              <a:rPr lang="en-US" dirty="0"/>
+              <a:t>).</a:t>
+            </a:r>
+            <a:br>
+              <a:rPr lang="en-US" dirty="0"/>
+            </a:br>
+            <a:r>
+              <a:rPr lang="en-US" dirty="0"/>
+              <a:t>Die CSS-</a:t>
+            </a:r>
+            <a:r>
+              <a:rPr lang="en-US" dirty="0" err="1"/>
+              <a:t>Eigenschaft</a:t>
+            </a:r>
+            <a:r>
+              <a:rPr lang="en-US" dirty="0"/>
+              <a:t> </a:t>
+            </a:r>
+            <a:r>
+              <a:rPr lang="en-US" dirty="0" err="1"/>
+              <a:t>für</a:t>
+            </a:r>
+            <a:r>
+              <a:rPr lang="en-US" dirty="0"/>
+              <a:t> das </a:t>
+            </a:r>
+            <a:r>
+              <a:rPr lang="en-US" dirty="0" err="1"/>
+              <a:t>Umfliessen</a:t>
+            </a:r>
+            <a:r>
+              <a:rPr lang="en-US" dirty="0"/>
+              <a:t> von </a:t>
+            </a:r>
+            <a:r>
+              <a:rPr lang="en-US" dirty="0" err="1"/>
+              <a:t>Elementen</a:t>
+            </a:r>
+            <a:r>
+              <a:rPr lang="en-US" dirty="0"/>
+              <a:t> </a:t>
+            </a:r>
+            <a:r>
+              <a:rPr lang="en-US" dirty="0" err="1"/>
+              <a:t>definierst</a:t>
+            </a:r>
+            <a:r>
+              <a:rPr lang="en-US" dirty="0"/>
+              <a:t> du </a:t>
+            </a:r>
+            <a:r>
+              <a:rPr lang="en-US" dirty="0" err="1"/>
+              <a:t>mit</a:t>
+            </a:r>
+            <a:r>
+              <a:rPr lang="en-US" dirty="0"/>
+              <a:t> </a:t>
+            </a:r>
+            <a:r>
+              <a:rPr lang="en-US" b="1" dirty="0" err="1"/>
+              <a:t>float:left</a:t>
+            </a:r>
+            <a:r>
+              <a:rPr lang="en-US" b="1" dirty="0"/>
+              <a:t> </a:t>
+            </a:r>
+            <a:r>
+              <a:rPr lang="en-US" dirty="0" err="1"/>
+              <a:t>oder</a:t>
+            </a:r>
+            <a:r>
+              <a:rPr lang="en-US" dirty="0"/>
+              <a:t> </a:t>
+            </a:r>
+            <a:r>
+              <a:rPr lang="en-US" b="1" dirty="0" err="1"/>
+              <a:t>float:right</a:t>
+            </a:r>
+            <a:r>
+              <a:rPr lang="en-US" b="1" dirty="0"/>
+              <a:t> </a:t>
+            </a:r>
+            <a:r>
+              <a:rPr lang="en-US" dirty="0"/>
+              <a:t>(</a:t>
+            </a:r>
+            <a:r>
+              <a:rPr lang="en-US" dirty="0" err="1"/>
+              <a:t>nach</a:t>
+            </a:r>
+            <a:r>
+              <a:rPr lang="en-US" dirty="0"/>
+              <a:t> links </a:t>
+            </a:r>
+            <a:r>
+              <a:rPr lang="en-US" dirty="0" err="1"/>
+              <a:t>oder</a:t>
+            </a:r>
+            <a:r>
+              <a:rPr lang="en-US" dirty="0"/>
+              <a:t> </a:t>
+            </a:r>
+            <a:r>
+              <a:rPr lang="en-US" dirty="0" err="1"/>
+              <a:t>rechts</a:t>
+            </a:r>
+            <a:r>
+              <a:rPr lang="en-US" dirty="0"/>
+              <a:t> </a:t>
+            </a:r>
+            <a:r>
+              <a:rPr lang="en-US" dirty="0" err="1"/>
+              <a:t>umfliessen</a:t>
+            </a:r>
+            <a:r>
+              <a:rPr lang="en-US" dirty="0"/>
+              <a:t>). </a:t>
+            </a:r>
           </a:p>
         </p:txBody>
       </p:sp>
     </p:spTree>
     <p:extLst>
       <p:ext uri="{BB962C8B-B14F-4D97-AF65-F5344CB8AC3E}">
-        <p14:creationId xmlns:p14="http://schemas.microsoft.com/office/powerpoint/2010/main" val="2129769489"/>
+        <p14:creationId xmlns:p14="http://schemas.microsoft.com/office/powerpoint/2010/main" val="2838834589"/>
+      </p:ext>
+    </p:extLst>
+  </p:cSld>
+  <p:clrMapOvr>
+    <a:masterClrMapping/>
+  </p:clrMapOvr>
+</p:sld>
+</file>
+
+<file path=ppt/slides/slide61.xml><?xml version="1.0" encoding="utf-8"?>
+<p:sld xmlns:a="http://schemas.openxmlformats.org/drawingml/2006/main" xmlns:r="http://schemas.openxmlformats.org/officeDocument/2006/relationships" xmlns:p="http://schemas.openxmlformats.org/presentationml/2006/main">
+  <p:cSld>
+    <p:spTree>
+      <p:nvGrpSpPr>
+        <p:cNvPr id="1" name=""/>
+        <p:cNvGrpSpPr/>
+        <p:nvPr/>
+      </p:nvGrpSpPr>
+      <p:grpSpPr>
+        <a:xfrm>
+          <a:off x="0" y="0"/>
+          <a:ext cx="0" cy="0"/>
+          <a:chOff x="0" y="0"/>
+          <a:chExt cx="0" cy="0"/>
+        </a:xfrm>
+      </p:grpSpPr>
+      <p:sp>
+        <p:nvSpPr>
+          <p:cNvPr id="2" name="Title 1">
+            <a:extLst>
+              <a:ext uri="{FF2B5EF4-FFF2-40B4-BE49-F238E27FC236}">
+                <a16:creationId xmlns:a16="http://schemas.microsoft.com/office/drawing/2014/main" id="{7611D6BD-D86A-0749-A51E-2E1EEA7C4532}"/>
+              </a:ext>
+            </a:extLst>
+          </p:cNvPr>
+          <p:cNvSpPr>
+            <a:spLocks noGrp="1"/>
+          </p:cNvSpPr>
+          <p:nvPr>
+            <p:ph type="title"/>
+          </p:nvPr>
+        </p:nvSpPr>
+        <p:spPr/>
+        <p:txBody>
+          <a:bodyPr/>
+          <a:lstStyle/>
+          <a:p>
+            <a:r>
+              <a:rPr lang="en-US" dirty="0"/>
+              <a:t>Float</a:t>
+            </a:r>
+          </a:p>
+        </p:txBody>
+      </p:sp>
+      <p:sp>
+        <p:nvSpPr>
+          <p:cNvPr id="3" name="Content Placeholder 2">
+            <a:extLst>
+              <a:ext uri="{FF2B5EF4-FFF2-40B4-BE49-F238E27FC236}">
+                <a16:creationId xmlns:a16="http://schemas.microsoft.com/office/drawing/2014/main" id="{1739B6E8-4065-464A-A0A2-1C6FFD5B13AD}"/>
+              </a:ext>
+            </a:extLst>
+          </p:cNvPr>
+          <p:cNvSpPr>
+            <a:spLocks noGrp="1"/>
+          </p:cNvSpPr>
+          <p:nvPr>
+            <p:ph idx="1"/>
+          </p:nvPr>
+        </p:nvSpPr>
+        <p:spPr/>
+        <p:txBody>
+          <a:bodyPr/>
+          <a:lstStyle/>
+          <a:p>
+            <a:r>
+              <a:rPr lang="de" dirty="0"/>
+              <a:t>CSS </a:t>
+            </a:r>
+            <a:r>
+              <a:rPr lang="de" dirty="0" err="1"/>
+              <a:t>float</a:t>
+            </a:r>
+            <a:r>
+              <a:rPr lang="de" dirty="0"/>
+              <a:t> setzt ein HTML-Element an den rechten oder linken Rand des umfassenden HTML-Blocks. </a:t>
+            </a:r>
+            <a:r>
+              <a:rPr lang="de" dirty="0" err="1"/>
+              <a:t>float</a:t>
+            </a:r>
+            <a:r>
+              <a:rPr lang="de" dirty="0"/>
+              <a:t> verdrängt den Text der folgenden Blöcke und ahmt so das </a:t>
+            </a:r>
+            <a:r>
+              <a:rPr lang="de" dirty="0" err="1"/>
+              <a:t>Umfliessen</a:t>
+            </a:r>
+            <a:r>
+              <a:rPr lang="de" dirty="0"/>
+              <a:t> nach. </a:t>
+            </a:r>
+          </a:p>
+          <a:p>
+            <a:endParaRPr lang="en-US" dirty="0"/>
+          </a:p>
+        </p:txBody>
+      </p:sp>
+      <p:pic>
+        <p:nvPicPr>
+          <p:cNvPr id="1026" name="Picture 2" descr="page19image4279344">
+            <a:extLst>
+              <a:ext uri="{FF2B5EF4-FFF2-40B4-BE49-F238E27FC236}">
+                <a16:creationId xmlns:a16="http://schemas.microsoft.com/office/drawing/2014/main" id="{177F15CE-A21D-3243-AE48-D46279D8A9F7}"/>
+              </a:ext>
+            </a:extLst>
+          </p:cNvPr>
+          <p:cNvPicPr>
+            <a:picLocks noChangeAspect="1" noChangeArrowheads="1"/>
+          </p:cNvPicPr>
+          <p:nvPr/>
+        </p:nvPicPr>
+        <p:blipFill>
+          <a:blip r:embed="rId2">
+            <a:extLst>
+              <a:ext uri="{28A0092B-C50C-407E-A947-70E740481C1C}">
+                <a14:useLocalDpi xmlns:a14="http://schemas.microsoft.com/office/drawing/2010/main" val="0"/>
+              </a:ext>
+            </a:extLst>
+          </a:blip>
+          <a:srcRect/>
+          <a:stretch>
+            <a:fillRect/>
+          </a:stretch>
+        </p:blipFill>
+        <p:spPr bwMode="auto">
+          <a:xfrm>
+            <a:off x="973161" y="3590172"/>
+            <a:ext cx="4013200" cy="2514600"/>
+          </a:xfrm>
+          <a:prstGeom prst="rect">
+            <a:avLst/>
+          </a:prstGeom>
+          <a:noFill/>
+          <a:extLst>
+            <a:ext uri="{909E8E84-426E-40DD-AFC4-6F175D3DCCD1}">
+              <a14:hiddenFill xmlns:a14="http://schemas.microsoft.com/office/drawing/2010/main">
+                <a:solidFill>
+                  <a:srgbClr val="FFFFFF"/>
+                </a:solidFill>
+              </a14:hiddenFill>
+            </a:ext>
+          </a:extLst>
+        </p:spPr>
+      </p:pic>
+    </p:spTree>
+    <p:extLst>
+      <p:ext uri="{BB962C8B-B14F-4D97-AF65-F5344CB8AC3E}">
+        <p14:creationId xmlns:p14="http://schemas.microsoft.com/office/powerpoint/2010/main" val="1904907182"/>
+      </p:ext>
+    </p:extLst>
+  </p:cSld>
+  <p:clrMapOvr>
+    <a:masterClrMapping/>
+  </p:clrMapOvr>
+</p:sld>
+</file>
+
+<file path=ppt/slides/slide62.xml><?xml version="1.0" encoding="utf-8"?>
+<p:sld xmlns:a="http://schemas.openxmlformats.org/drawingml/2006/main" xmlns:r="http://schemas.openxmlformats.org/officeDocument/2006/relationships" xmlns:p="http://schemas.openxmlformats.org/presentationml/2006/main">
+  <p:cSld>
+    <p:spTree>
+      <p:nvGrpSpPr>
+        <p:cNvPr id="1" name=""/>
+        <p:cNvGrpSpPr/>
+        <p:nvPr/>
+      </p:nvGrpSpPr>
+      <p:grpSpPr>
+        <a:xfrm>
+          <a:off x="0" y="0"/>
+          <a:ext cx="0" cy="0"/>
+          <a:chOff x="0" y="0"/>
+          <a:chExt cx="0" cy="0"/>
+        </a:xfrm>
+      </p:grpSpPr>
+      <p:sp>
+        <p:nvSpPr>
+          <p:cNvPr id="2" name="Title 1">
+            <a:extLst>
+              <a:ext uri="{FF2B5EF4-FFF2-40B4-BE49-F238E27FC236}">
+                <a16:creationId xmlns:a16="http://schemas.microsoft.com/office/drawing/2014/main" id="{6FE1A359-B224-FB47-8E12-6A2C71C35E19}"/>
+              </a:ext>
+            </a:extLst>
+          </p:cNvPr>
+          <p:cNvSpPr>
+            <a:spLocks noGrp="1"/>
+          </p:cNvSpPr>
+          <p:nvPr>
+            <p:ph type="title"/>
+          </p:nvPr>
+        </p:nvSpPr>
+        <p:spPr/>
+        <p:txBody>
+          <a:bodyPr/>
+          <a:lstStyle/>
+          <a:p>
+            <a:r>
+              <a:rPr lang="en-US" dirty="0"/>
+              <a:t>Float</a:t>
+            </a:r>
+          </a:p>
+        </p:txBody>
+      </p:sp>
+      <p:sp>
+        <p:nvSpPr>
+          <p:cNvPr id="3" name="Content Placeholder 2">
+            <a:extLst>
+              <a:ext uri="{FF2B5EF4-FFF2-40B4-BE49-F238E27FC236}">
+                <a16:creationId xmlns:a16="http://schemas.microsoft.com/office/drawing/2014/main" id="{41D9354C-7A65-6B4A-9CB1-7D8F0AB57D2E}"/>
+              </a:ext>
+            </a:extLst>
+          </p:cNvPr>
+          <p:cNvSpPr>
+            <a:spLocks noGrp="1"/>
+          </p:cNvSpPr>
+          <p:nvPr>
+            <p:ph idx="1"/>
+          </p:nvPr>
+        </p:nvSpPr>
+        <p:spPr>
+          <a:xfrm>
+            <a:off x="680320" y="2292096"/>
+            <a:ext cx="9613861" cy="3599316"/>
+          </a:xfrm>
+        </p:spPr>
+        <p:txBody>
+          <a:bodyPr/>
+          <a:lstStyle/>
+          <a:p>
+            <a:r>
+              <a:rPr lang="de" dirty="0"/>
+              <a:t>Dieses Prinzip kann man ebenfalls zum Erstellen von Layouts für komplette Webseiten verwenden, zum Beispiel um ein “Holy </a:t>
+            </a:r>
+            <a:r>
+              <a:rPr lang="de" dirty="0" err="1"/>
+              <a:t>Grail</a:t>
+            </a:r>
+            <a:r>
+              <a:rPr lang="de" dirty="0"/>
+              <a:t>” Layout zu erstellen. </a:t>
+            </a:r>
+          </a:p>
+          <a:p>
+            <a:pPr marL="0" indent="0">
+              <a:buNone/>
+            </a:pPr>
+            <a:endParaRPr lang="en-US" dirty="0"/>
+          </a:p>
+        </p:txBody>
+      </p:sp>
+      <p:pic>
+        <p:nvPicPr>
+          <p:cNvPr id="2049" name="Picture 1" descr="page20image4380560">
+            <a:extLst>
+              <a:ext uri="{FF2B5EF4-FFF2-40B4-BE49-F238E27FC236}">
+                <a16:creationId xmlns:a16="http://schemas.microsoft.com/office/drawing/2014/main" id="{8A52D9DB-68D0-4841-9330-0581E7DF3E75}"/>
+              </a:ext>
+            </a:extLst>
+          </p:cNvPr>
+          <p:cNvPicPr>
+            <a:picLocks noChangeAspect="1" noChangeArrowheads="1"/>
+          </p:cNvPicPr>
+          <p:nvPr/>
+        </p:nvPicPr>
+        <p:blipFill>
+          <a:blip r:embed="rId2">
+            <a:extLst>
+              <a:ext uri="{28A0092B-C50C-407E-A947-70E740481C1C}">
+                <a14:useLocalDpi xmlns:a14="http://schemas.microsoft.com/office/drawing/2010/main" val="0"/>
+              </a:ext>
+            </a:extLst>
+          </a:blip>
+          <a:srcRect/>
+          <a:stretch>
+            <a:fillRect/>
+          </a:stretch>
+        </p:blipFill>
+        <p:spPr bwMode="auto">
+          <a:xfrm>
+            <a:off x="1009141" y="3429000"/>
+            <a:ext cx="3009900" cy="2755900"/>
+          </a:xfrm>
+          <a:prstGeom prst="rect">
+            <a:avLst/>
+          </a:prstGeom>
+          <a:noFill/>
+          <a:extLst>
+            <a:ext uri="{909E8E84-426E-40DD-AFC4-6F175D3DCCD1}">
+              <a14:hiddenFill xmlns:a14="http://schemas.microsoft.com/office/drawing/2010/main">
+                <a:solidFill>
+                  <a:srgbClr val="FFFFFF"/>
+                </a:solidFill>
+              </a14:hiddenFill>
+            </a:ext>
+          </a:extLst>
+        </p:spPr>
+      </p:pic>
+    </p:spTree>
+    <p:extLst>
+      <p:ext uri="{BB962C8B-B14F-4D97-AF65-F5344CB8AC3E}">
+        <p14:creationId xmlns:p14="http://schemas.microsoft.com/office/powerpoint/2010/main" val="2077934999"/>
+      </p:ext>
+    </p:extLst>
+  </p:cSld>
+  <p:clrMapOvr>
+    <a:masterClrMapping/>
+  </p:clrMapOvr>
+</p:sld>
+</file>
+
+<file path=ppt/slides/slide63.xml><?xml version="1.0" encoding="utf-8"?>
+<p:sld xmlns:a="http://schemas.openxmlformats.org/drawingml/2006/main" xmlns:r="http://schemas.openxmlformats.org/officeDocument/2006/relationships" xmlns:p="http://schemas.openxmlformats.org/presentationml/2006/main">
+  <p:cSld>
+    <p:spTree>
+      <p:nvGrpSpPr>
+        <p:cNvPr id="1" name=""/>
+        <p:cNvGrpSpPr/>
+        <p:nvPr/>
+      </p:nvGrpSpPr>
+      <p:grpSpPr>
+        <a:xfrm>
+          <a:off x="0" y="0"/>
+          <a:ext cx="0" cy="0"/>
+          <a:chOff x="0" y="0"/>
+          <a:chExt cx="0" cy="0"/>
+        </a:xfrm>
+      </p:grpSpPr>
+      <p:sp>
+        <p:nvSpPr>
+          <p:cNvPr id="2" name="Title 1">
+            <a:extLst>
+              <a:ext uri="{FF2B5EF4-FFF2-40B4-BE49-F238E27FC236}">
+                <a16:creationId xmlns:a16="http://schemas.microsoft.com/office/drawing/2014/main" id="{3A4E6D3F-60E1-444A-AC2C-41022A41BFA0}"/>
+              </a:ext>
+            </a:extLst>
+          </p:cNvPr>
+          <p:cNvSpPr>
+            <a:spLocks noGrp="1"/>
+          </p:cNvSpPr>
+          <p:nvPr>
+            <p:ph type="title"/>
+          </p:nvPr>
+        </p:nvSpPr>
+        <p:spPr/>
+        <p:txBody>
+          <a:bodyPr/>
+          <a:lstStyle/>
+          <a:p>
+            <a:r>
+              <a:rPr lang="en-US" dirty="0"/>
+              <a:t>Float</a:t>
+            </a:r>
+          </a:p>
+        </p:txBody>
+      </p:sp>
+      <p:sp>
+        <p:nvSpPr>
+          <p:cNvPr id="3" name="Content Placeholder 2">
+            <a:extLst>
+              <a:ext uri="{FF2B5EF4-FFF2-40B4-BE49-F238E27FC236}">
+                <a16:creationId xmlns:a16="http://schemas.microsoft.com/office/drawing/2014/main" id="{D0AEDE04-E985-B64E-809D-AE3BEA231D3B}"/>
+              </a:ext>
+            </a:extLst>
+          </p:cNvPr>
+          <p:cNvSpPr>
+            <a:spLocks noGrp="1"/>
+          </p:cNvSpPr>
+          <p:nvPr>
+            <p:ph idx="1"/>
+          </p:nvPr>
+        </p:nvSpPr>
+        <p:spPr>
+          <a:xfrm>
+            <a:off x="680321" y="2336872"/>
+            <a:ext cx="9613861" cy="4033447"/>
+          </a:xfrm>
+        </p:spPr>
+        <p:txBody>
+          <a:bodyPr/>
+          <a:lstStyle/>
+          <a:p>
+            <a:r>
+              <a:rPr lang="de" dirty="0"/>
+              <a:t>Das Problem besteht allerdings darin, dass wenn ein Element gefloatet wurde, dieses von sämtlichen nachfolgenden Elementen umflossen wird.</a:t>
+            </a:r>
+            <a:br>
+              <a:rPr lang="de" dirty="0"/>
+            </a:br>
+            <a:endParaRPr lang="de" dirty="0"/>
+          </a:p>
+          <a:p>
+            <a:pPr marL="0" indent="0">
+              <a:buNone/>
+            </a:pPr>
+            <a:endParaRPr lang="en-US" dirty="0"/>
+          </a:p>
+          <a:p>
+            <a:pPr marL="0" indent="0">
+              <a:buNone/>
+            </a:pPr>
+            <a:endParaRPr lang="en-US" dirty="0"/>
+          </a:p>
+          <a:p>
+            <a:pPr marL="0" indent="0">
+              <a:buNone/>
+            </a:pPr>
+            <a:endParaRPr lang="en-US" dirty="0"/>
+          </a:p>
+          <a:p>
+            <a:pPr marL="0" indent="0">
+              <a:buNone/>
+            </a:pPr>
+            <a:endParaRPr lang="en-US" dirty="0"/>
+          </a:p>
+          <a:p>
+            <a:r>
+              <a:rPr lang="de" dirty="0"/>
+              <a:t>Um dies zu steuern braucht man die Property </a:t>
+            </a:r>
+            <a:r>
+              <a:rPr lang="de" dirty="0" err="1"/>
+              <a:t>clear</a:t>
+            </a:r>
+            <a:r>
+              <a:rPr lang="de" dirty="0"/>
+              <a:t> </a:t>
+            </a:r>
+          </a:p>
+          <a:p>
+            <a:pPr marL="0" indent="0">
+              <a:buNone/>
+            </a:pPr>
+            <a:endParaRPr lang="en-US" dirty="0"/>
+          </a:p>
+        </p:txBody>
+      </p:sp>
+      <p:pic>
+        <p:nvPicPr>
+          <p:cNvPr id="3073" name="Picture 1" descr="page21image4325584">
+            <a:extLst>
+              <a:ext uri="{FF2B5EF4-FFF2-40B4-BE49-F238E27FC236}">
+                <a16:creationId xmlns:a16="http://schemas.microsoft.com/office/drawing/2014/main" id="{52137BF0-872D-3148-905B-0510167CB827}"/>
+              </a:ext>
+            </a:extLst>
+          </p:cNvPr>
+          <p:cNvPicPr>
+            <a:picLocks noChangeAspect="1" noChangeArrowheads="1"/>
+          </p:cNvPicPr>
+          <p:nvPr/>
+        </p:nvPicPr>
+        <p:blipFill>
+          <a:blip r:embed="rId2">
+            <a:extLst>
+              <a:ext uri="{28A0092B-C50C-407E-A947-70E740481C1C}">
+                <a14:useLocalDpi xmlns:a14="http://schemas.microsoft.com/office/drawing/2010/main" val="0"/>
+              </a:ext>
+            </a:extLst>
+          </a:blip>
+          <a:srcRect/>
+          <a:stretch>
+            <a:fillRect/>
+          </a:stretch>
+        </p:blipFill>
+        <p:spPr bwMode="auto">
+          <a:xfrm>
+            <a:off x="984307" y="3429000"/>
+            <a:ext cx="4203700" cy="2057400"/>
+          </a:xfrm>
+          <a:prstGeom prst="rect">
+            <a:avLst/>
+          </a:prstGeom>
+          <a:noFill/>
+          <a:extLst>
+            <a:ext uri="{909E8E84-426E-40DD-AFC4-6F175D3DCCD1}">
+              <a14:hiddenFill xmlns:a14="http://schemas.microsoft.com/office/drawing/2010/main">
+                <a:solidFill>
+                  <a:srgbClr val="FFFFFF"/>
+                </a:solidFill>
+              </a14:hiddenFill>
+            </a:ext>
+          </a:extLst>
+        </p:spPr>
+      </p:pic>
+    </p:spTree>
+    <p:extLst>
+      <p:ext uri="{BB962C8B-B14F-4D97-AF65-F5344CB8AC3E}">
+        <p14:creationId xmlns:p14="http://schemas.microsoft.com/office/powerpoint/2010/main" val="553072728"/>
+      </p:ext>
+    </p:extLst>
+  </p:cSld>
+  <p:clrMapOvr>
+    <a:masterClrMapping/>
+  </p:clrMapOvr>
+</p:sld>
+</file>
+
+<file path=ppt/slides/slide64.xml><?xml version="1.0" encoding="utf-8"?>
+<p:sld xmlns:a="http://schemas.openxmlformats.org/drawingml/2006/main" xmlns:r="http://schemas.openxmlformats.org/officeDocument/2006/relationships" xmlns:p="http://schemas.openxmlformats.org/presentationml/2006/main">
+  <p:cSld>
+    <p:spTree>
+      <p:nvGrpSpPr>
+        <p:cNvPr id="1" name=""/>
+        <p:cNvGrpSpPr/>
+        <p:nvPr/>
+      </p:nvGrpSpPr>
+      <p:grpSpPr>
+        <a:xfrm>
+          <a:off x="0" y="0"/>
+          <a:ext cx="0" cy="0"/>
+          <a:chOff x="0" y="0"/>
+          <a:chExt cx="0" cy="0"/>
+        </a:xfrm>
+      </p:grpSpPr>
+      <p:sp>
+        <p:nvSpPr>
+          <p:cNvPr id="2" name="Title 1">
+            <a:extLst>
+              <a:ext uri="{FF2B5EF4-FFF2-40B4-BE49-F238E27FC236}">
+                <a16:creationId xmlns:a16="http://schemas.microsoft.com/office/drawing/2014/main" id="{F574FA7F-6E48-5B4C-9A4F-650EE5D21053}"/>
+              </a:ext>
+            </a:extLst>
+          </p:cNvPr>
+          <p:cNvSpPr>
+            <a:spLocks noGrp="1"/>
+          </p:cNvSpPr>
+          <p:nvPr>
+            <p:ph type="title"/>
+          </p:nvPr>
+        </p:nvSpPr>
+        <p:spPr/>
+        <p:txBody>
+          <a:bodyPr/>
+          <a:lstStyle/>
+          <a:p>
+            <a:r>
+              <a:rPr lang="en-US" dirty="0"/>
+              <a:t>Clear</a:t>
+            </a:r>
+          </a:p>
+        </p:txBody>
+      </p:sp>
+      <p:sp>
+        <p:nvSpPr>
+          <p:cNvPr id="3" name="Content Placeholder 2">
+            <a:extLst>
+              <a:ext uri="{FF2B5EF4-FFF2-40B4-BE49-F238E27FC236}">
+                <a16:creationId xmlns:a16="http://schemas.microsoft.com/office/drawing/2014/main" id="{3423B191-525B-FD49-86FD-104BA5260A6A}"/>
+              </a:ext>
+            </a:extLst>
+          </p:cNvPr>
+          <p:cNvSpPr>
+            <a:spLocks noGrp="1"/>
+          </p:cNvSpPr>
+          <p:nvPr>
+            <p:ph idx="1"/>
+          </p:nvPr>
+        </p:nvSpPr>
+        <p:spPr>
+          <a:xfrm>
+            <a:off x="680321" y="2336873"/>
+            <a:ext cx="9613861" cy="3599316"/>
+          </a:xfrm>
+        </p:spPr>
+        <p:txBody>
+          <a:bodyPr/>
+          <a:lstStyle/>
+          <a:p>
+            <a:r>
+              <a:rPr lang="de" dirty="0"/>
+              <a:t>Mit dem Property </a:t>
+            </a:r>
+            <a:r>
+              <a:rPr lang="de" dirty="0" err="1"/>
+              <a:t>clear</a:t>
+            </a:r>
+            <a:r>
+              <a:rPr lang="de" dirty="0"/>
+              <a:t> kann das </a:t>
+            </a:r>
+            <a:r>
+              <a:rPr lang="de" dirty="0" err="1"/>
+              <a:t>Umfliessen</a:t>
+            </a:r>
+            <a:r>
+              <a:rPr lang="de" dirty="0"/>
+              <a:t> eines Elementes zurückgesetzt werden. </a:t>
+            </a:r>
+          </a:p>
+          <a:p>
+            <a:r>
+              <a:rPr lang="en-US" dirty="0"/>
+              <a:t>clear: both / left / right</a:t>
+            </a:r>
+          </a:p>
+          <a:p>
+            <a:pPr marL="0" indent="0">
+              <a:buNone/>
+            </a:pPr>
+            <a:endParaRPr lang="de" dirty="0"/>
+          </a:p>
+          <a:p>
+            <a:endParaRPr lang="en-US" dirty="0"/>
+          </a:p>
+        </p:txBody>
+      </p:sp>
+      <p:pic>
+        <p:nvPicPr>
+          <p:cNvPr id="4097" name="Picture 1" descr="page22image4358352">
+            <a:extLst>
+              <a:ext uri="{FF2B5EF4-FFF2-40B4-BE49-F238E27FC236}">
+                <a16:creationId xmlns:a16="http://schemas.microsoft.com/office/drawing/2014/main" id="{F3D15BD8-BDB8-5648-A579-E24C073FBFCC}"/>
+              </a:ext>
+            </a:extLst>
+          </p:cNvPr>
+          <p:cNvPicPr>
+            <a:picLocks noChangeAspect="1" noChangeArrowheads="1"/>
+          </p:cNvPicPr>
+          <p:nvPr/>
+        </p:nvPicPr>
+        <p:blipFill>
+          <a:blip r:embed="rId2">
+            <a:extLst>
+              <a:ext uri="{28A0092B-C50C-407E-A947-70E740481C1C}">
+                <a14:useLocalDpi xmlns:a14="http://schemas.microsoft.com/office/drawing/2010/main" val="0"/>
+              </a:ext>
+            </a:extLst>
+          </a:blip>
+          <a:srcRect/>
+          <a:stretch>
+            <a:fillRect/>
+          </a:stretch>
+        </p:blipFill>
+        <p:spPr bwMode="auto">
+          <a:xfrm>
+            <a:off x="995680" y="3606800"/>
+            <a:ext cx="3251200" cy="2717800"/>
+          </a:xfrm>
+          <a:prstGeom prst="rect">
+            <a:avLst/>
+          </a:prstGeom>
+          <a:noFill/>
+          <a:extLst>
+            <a:ext uri="{909E8E84-426E-40DD-AFC4-6F175D3DCCD1}">
+              <a14:hiddenFill xmlns:a14="http://schemas.microsoft.com/office/drawing/2010/main">
+                <a:solidFill>
+                  <a:srgbClr val="FFFFFF"/>
+                </a:solidFill>
+              </a14:hiddenFill>
+            </a:ext>
+          </a:extLst>
+        </p:spPr>
+      </p:pic>
+    </p:spTree>
+    <p:extLst>
+      <p:ext uri="{BB962C8B-B14F-4D97-AF65-F5344CB8AC3E}">
+        <p14:creationId xmlns:p14="http://schemas.microsoft.com/office/powerpoint/2010/main" val="691491399"/>
+      </p:ext>
+    </p:extLst>
+  </p:cSld>
+  <p:clrMapOvr>
+    <a:masterClrMapping/>
+  </p:clrMapOvr>
+</p:sld>
+</file>
+
+<file path=ppt/slides/slide65.xml><?xml version="1.0" encoding="utf-8"?>
+<p:sld xmlns:a="http://schemas.openxmlformats.org/drawingml/2006/main" xmlns:r="http://schemas.openxmlformats.org/officeDocument/2006/relationships" xmlns:p="http://schemas.openxmlformats.org/presentationml/2006/main">
+  <p:cSld>
+    <p:spTree>
+      <p:nvGrpSpPr>
+        <p:cNvPr id="1" name=""/>
+        <p:cNvGrpSpPr/>
+        <p:nvPr/>
+      </p:nvGrpSpPr>
+      <p:grpSpPr>
+        <a:xfrm>
+          <a:off x="0" y="0"/>
+          <a:ext cx="0" cy="0"/>
+          <a:chOff x="0" y="0"/>
+          <a:chExt cx="0" cy="0"/>
+        </a:xfrm>
+      </p:grpSpPr>
+      <p:sp>
+        <p:nvSpPr>
+          <p:cNvPr id="2" name="Title 1">
+            <a:extLst>
+              <a:ext uri="{FF2B5EF4-FFF2-40B4-BE49-F238E27FC236}">
+                <a16:creationId xmlns:a16="http://schemas.microsoft.com/office/drawing/2014/main" id="{0088FB52-B078-0843-86FC-C484C8165B3F}"/>
+              </a:ext>
+            </a:extLst>
+          </p:cNvPr>
+          <p:cNvSpPr>
+            <a:spLocks noGrp="1"/>
+          </p:cNvSpPr>
+          <p:nvPr>
+            <p:ph type="title"/>
+          </p:nvPr>
+        </p:nvSpPr>
+        <p:spPr/>
+        <p:txBody>
+          <a:bodyPr/>
+          <a:lstStyle/>
+          <a:p>
+            <a:r>
+              <a:rPr lang="de" b="1" dirty="0" err="1"/>
+              <a:t>Float</a:t>
+            </a:r>
+            <a:r>
+              <a:rPr lang="de" b="1" dirty="0"/>
+              <a:t>: Elemente in einem Parent-Element </a:t>
+            </a:r>
+            <a:endParaRPr lang="en-US" dirty="0"/>
+          </a:p>
+        </p:txBody>
+      </p:sp>
+      <p:sp>
+        <p:nvSpPr>
+          <p:cNvPr id="3" name="Content Placeholder 2">
+            <a:extLst>
+              <a:ext uri="{FF2B5EF4-FFF2-40B4-BE49-F238E27FC236}">
+                <a16:creationId xmlns:a16="http://schemas.microsoft.com/office/drawing/2014/main" id="{C5750FAF-A625-E045-9149-78E16F47D291}"/>
+              </a:ext>
+            </a:extLst>
+          </p:cNvPr>
+          <p:cNvSpPr>
+            <a:spLocks noGrp="1"/>
+          </p:cNvSpPr>
+          <p:nvPr>
+            <p:ph idx="1"/>
+          </p:nvPr>
+        </p:nvSpPr>
+        <p:spPr/>
+        <p:txBody>
+          <a:bodyPr/>
+          <a:lstStyle/>
+          <a:p>
+            <a:r>
+              <a:rPr lang="de" dirty="0"/>
+              <a:t>Befinden sich in einem Container </a:t>
+            </a:r>
+            <a:r>
+              <a:rPr lang="de" dirty="0" err="1"/>
+              <a:t>ausschliesslich</a:t>
+            </a:r>
+            <a:r>
+              <a:rPr lang="de" dirty="0"/>
+              <a:t> gefloatete Elemente, so kollabiert die Höhe des Parent-Elements </a:t>
+            </a:r>
+          </a:p>
+          <a:p>
+            <a:pPr marL="0" indent="0">
+              <a:buNone/>
+            </a:pPr>
+            <a:endParaRPr lang="en-US" dirty="0"/>
+          </a:p>
+        </p:txBody>
+      </p:sp>
+      <p:pic>
+        <p:nvPicPr>
+          <p:cNvPr id="5121" name="Picture 1" descr="page23image4350288">
+            <a:extLst>
+              <a:ext uri="{FF2B5EF4-FFF2-40B4-BE49-F238E27FC236}">
+                <a16:creationId xmlns:a16="http://schemas.microsoft.com/office/drawing/2014/main" id="{34AB1977-760B-C647-B81E-7F68AC85E1B6}"/>
+              </a:ext>
+            </a:extLst>
+          </p:cNvPr>
+          <p:cNvPicPr>
+            <a:picLocks noChangeAspect="1" noChangeArrowheads="1"/>
+          </p:cNvPicPr>
+          <p:nvPr/>
+        </p:nvPicPr>
+        <p:blipFill>
+          <a:blip r:embed="rId2">
+            <a:extLst>
+              <a:ext uri="{28A0092B-C50C-407E-A947-70E740481C1C}">
+                <a14:useLocalDpi xmlns:a14="http://schemas.microsoft.com/office/drawing/2010/main" val="0"/>
+              </a:ext>
+            </a:extLst>
+          </a:blip>
+          <a:srcRect/>
+          <a:stretch>
+            <a:fillRect/>
+          </a:stretch>
+        </p:blipFill>
+        <p:spPr bwMode="auto">
+          <a:xfrm>
+            <a:off x="985520" y="3241040"/>
+            <a:ext cx="5664200" cy="2946400"/>
+          </a:xfrm>
+          <a:prstGeom prst="rect">
+            <a:avLst/>
+          </a:prstGeom>
+          <a:noFill/>
+          <a:extLst>
+            <a:ext uri="{909E8E84-426E-40DD-AFC4-6F175D3DCCD1}">
+              <a14:hiddenFill xmlns:a14="http://schemas.microsoft.com/office/drawing/2010/main">
+                <a:solidFill>
+                  <a:srgbClr val="FFFFFF"/>
+                </a:solidFill>
+              </a14:hiddenFill>
+            </a:ext>
+          </a:extLst>
+        </p:spPr>
+      </p:pic>
+    </p:spTree>
+    <p:extLst>
+      <p:ext uri="{BB962C8B-B14F-4D97-AF65-F5344CB8AC3E}">
+        <p14:creationId xmlns:p14="http://schemas.microsoft.com/office/powerpoint/2010/main" val="697456240"/>
+      </p:ext>
+    </p:extLst>
+  </p:cSld>
+  <p:clrMapOvr>
+    <a:masterClrMapping/>
+  </p:clrMapOvr>
+</p:sld>
+</file>
+
+<file path=ppt/slides/slide66.xml><?xml version="1.0" encoding="utf-8"?>
+<p:sld xmlns:a="http://schemas.openxmlformats.org/drawingml/2006/main" xmlns:r="http://schemas.openxmlformats.org/officeDocument/2006/relationships" xmlns:p="http://schemas.openxmlformats.org/presentationml/2006/main">
+  <p:cSld>
+    <p:spTree>
+      <p:nvGrpSpPr>
+        <p:cNvPr id="1" name=""/>
+        <p:cNvGrpSpPr/>
+        <p:nvPr/>
+      </p:nvGrpSpPr>
+      <p:grpSpPr>
+        <a:xfrm>
+          <a:off x="0" y="0"/>
+          <a:ext cx="0" cy="0"/>
+          <a:chOff x="0" y="0"/>
+          <a:chExt cx="0" cy="0"/>
+        </a:xfrm>
+      </p:grpSpPr>
+      <p:sp>
+        <p:nvSpPr>
+          <p:cNvPr id="2" name="Title 1">
+            <a:extLst>
+              <a:ext uri="{FF2B5EF4-FFF2-40B4-BE49-F238E27FC236}">
+                <a16:creationId xmlns:a16="http://schemas.microsoft.com/office/drawing/2014/main" id="{459D6BF9-14F3-FE43-AD9F-7EDE265B3380}"/>
+              </a:ext>
+            </a:extLst>
+          </p:cNvPr>
+          <p:cNvSpPr>
+            <a:spLocks noGrp="1"/>
+          </p:cNvSpPr>
+          <p:nvPr>
+            <p:ph type="title"/>
+          </p:nvPr>
+        </p:nvSpPr>
+        <p:spPr/>
+        <p:txBody>
+          <a:bodyPr/>
+          <a:lstStyle/>
+          <a:p>
+            <a:r>
+              <a:rPr lang="de" b="1" dirty="0" err="1"/>
+              <a:t>Float</a:t>
+            </a:r>
+            <a:r>
+              <a:rPr lang="de" b="1" dirty="0"/>
+              <a:t>: Elemente in einem Parent-Element </a:t>
+            </a:r>
+            <a:endParaRPr lang="en-US" dirty="0"/>
+          </a:p>
+        </p:txBody>
+      </p:sp>
+      <p:sp>
+        <p:nvSpPr>
+          <p:cNvPr id="3" name="Content Placeholder 2">
+            <a:extLst>
+              <a:ext uri="{FF2B5EF4-FFF2-40B4-BE49-F238E27FC236}">
+                <a16:creationId xmlns:a16="http://schemas.microsoft.com/office/drawing/2014/main" id="{B3C4C832-351E-1844-B1BB-1454A152C580}"/>
+              </a:ext>
+            </a:extLst>
+          </p:cNvPr>
+          <p:cNvSpPr>
+            <a:spLocks noGrp="1"/>
+          </p:cNvSpPr>
+          <p:nvPr>
+            <p:ph idx="1"/>
+          </p:nvPr>
+        </p:nvSpPr>
+        <p:spPr/>
+        <p:txBody>
+          <a:bodyPr/>
+          <a:lstStyle/>
+          <a:p>
+            <a:r>
+              <a:rPr lang="de" dirty="0"/>
+              <a:t>Um die </a:t>
+            </a:r>
+            <a:r>
+              <a:rPr lang="de" dirty="0" err="1"/>
+              <a:t>Höhe</a:t>
+            </a:r>
+            <a:r>
+              <a:rPr lang="de" dirty="0"/>
+              <a:t> des Parent-Elements nicht kollabieren zu lassen, braucht man ein Element mit der Property </a:t>
+            </a:r>
+            <a:r>
+              <a:rPr lang="de" dirty="0" err="1"/>
+              <a:t>clear</a:t>
+            </a:r>
+            <a:r>
+              <a:rPr lang="de" dirty="0"/>
+              <a:t> im Anschluss an die gefloateten Kind-Elemente. Dafür hat sich das .</a:t>
+            </a:r>
+            <a:r>
+              <a:rPr lang="de" dirty="0" err="1"/>
+              <a:t>clearfix</a:t>
+            </a:r>
+            <a:r>
+              <a:rPr lang="de" dirty="0"/>
+              <a:t> Schnipsel auf der Folgeseite bewährt </a:t>
+            </a:r>
+          </a:p>
+          <a:p>
+            <a:pPr marL="0" indent="0">
+              <a:buNone/>
+            </a:pPr>
+            <a:endParaRPr lang="en-US" dirty="0"/>
+          </a:p>
+        </p:txBody>
+      </p:sp>
+      <p:pic>
+        <p:nvPicPr>
+          <p:cNvPr id="6145" name="Picture 1" descr="page24image4240800">
+            <a:extLst>
+              <a:ext uri="{FF2B5EF4-FFF2-40B4-BE49-F238E27FC236}">
+                <a16:creationId xmlns:a16="http://schemas.microsoft.com/office/drawing/2014/main" id="{717F181D-4BF2-5B49-88FC-FCC35D91ED72}"/>
+              </a:ext>
+            </a:extLst>
+          </p:cNvPr>
+          <p:cNvPicPr>
+            <a:picLocks noChangeAspect="1" noChangeArrowheads="1"/>
+          </p:cNvPicPr>
+          <p:nvPr/>
+        </p:nvPicPr>
+        <p:blipFill>
+          <a:blip r:embed="rId2">
+            <a:extLst>
+              <a:ext uri="{28A0092B-C50C-407E-A947-70E740481C1C}">
+                <a14:useLocalDpi xmlns:a14="http://schemas.microsoft.com/office/drawing/2010/main" val="0"/>
+              </a:ext>
+            </a:extLst>
+          </a:blip>
+          <a:srcRect/>
+          <a:stretch>
+            <a:fillRect/>
+          </a:stretch>
+        </p:blipFill>
+        <p:spPr bwMode="auto">
+          <a:xfrm>
+            <a:off x="1016000" y="3769360"/>
+            <a:ext cx="4610100" cy="2578100"/>
+          </a:xfrm>
+          <a:prstGeom prst="rect">
+            <a:avLst/>
+          </a:prstGeom>
+          <a:noFill/>
+          <a:extLst>
+            <a:ext uri="{909E8E84-426E-40DD-AFC4-6F175D3DCCD1}">
+              <a14:hiddenFill xmlns:a14="http://schemas.microsoft.com/office/drawing/2010/main">
+                <a:solidFill>
+                  <a:srgbClr val="FFFFFF"/>
+                </a:solidFill>
+              </a14:hiddenFill>
+            </a:ext>
+          </a:extLst>
+        </p:spPr>
+      </p:pic>
+    </p:spTree>
+    <p:extLst>
+      <p:ext uri="{BB962C8B-B14F-4D97-AF65-F5344CB8AC3E}">
+        <p14:creationId xmlns:p14="http://schemas.microsoft.com/office/powerpoint/2010/main" val="55490711"/>
+      </p:ext>
+    </p:extLst>
+  </p:cSld>
+  <p:clrMapOvr>
+    <a:masterClrMapping/>
+  </p:clrMapOvr>
+</p:sld>
+</file>
+
+<file path=ppt/slides/slide67.xml><?xml version="1.0" encoding="utf-8"?>
+<p:sld xmlns:a="http://schemas.openxmlformats.org/drawingml/2006/main" xmlns:r="http://schemas.openxmlformats.org/officeDocument/2006/relationships" xmlns:p="http://schemas.openxmlformats.org/presentationml/2006/main">
+  <p:cSld>
+    <p:spTree>
+      <p:nvGrpSpPr>
+        <p:cNvPr id="1" name=""/>
+        <p:cNvGrpSpPr/>
+        <p:nvPr/>
+      </p:nvGrpSpPr>
+      <p:grpSpPr>
+        <a:xfrm>
+          <a:off x="0" y="0"/>
+          <a:ext cx="0" cy="0"/>
+          <a:chOff x="0" y="0"/>
+          <a:chExt cx="0" cy="0"/>
+        </a:xfrm>
+      </p:grpSpPr>
+      <p:sp>
+        <p:nvSpPr>
+          <p:cNvPr id="2" name="Title 1">
+            <a:extLst>
+              <a:ext uri="{FF2B5EF4-FFF2-40B4-BE49-F238E27FC236}">
+                <a16:creationId xmlns:a16="http://schemas.microsoft.com/office/drawing/2014/main" id="{613584A7-4269-694F-B850-39B553C21792}"/>
+              </a:ext>
+            </a:extLst>
+          </p:cNvPr>
+          <p:cNvSpPr>
+            <a:spLocks noGrp="1"/>
+          </p:cNvSpPr>
+          <p:nvPr>
+            <p:ph type="title"/>
+          </p:nvPr>
+        </p:nvSpPr>
+        <p:spPr/>
+        <p:txBody>
+          <a:bodyPr/>
+          <a:lstStyle/>
+          <a:p>
+            <a:r>
+              <a:rPr lang="en-US" b="1" dirty="0" err="1"/>
+              <a:t>clearfix</a:t>
+            </a:r>
+            <a:r>
+              <a:rPr lang="en-US" b="1" dirty="0"/>
+              <a:t> </a:t>
+            </a:r>
+            <a:r>
+              <a:rPr lang="en-US" b="1" dirty="0" err="1"/>
+              <a:t>Schnipsel</a:t>
+            </a:r>
+            <a:r>
+              <a:rPr lang="en-US" b="1" dirty="0"/>
+              <a:t> </a:t>
+            </a:r>
+            <a:endParaRPr lang="en-US" dirty="0"/>
+          </a:p>
+        </p:txBody>
+      </p:sp>
+      <p:sp>
+        <p:nvSpPr>
+          <p:cNvPr id="3" name="Content Placeholder 2">
+            <a:extLst>
+              <a:ext uri="{FF2B5EF4-FFF2-40B4-BE49-F238E27FC236}">
+                <a16:creationId xmlns:a16="http://schemas.microsoft.com/office/drawing/2014/main" id="{864FC542-A969-0747-962A-7C078FE47458}"/>
+              </a:ext>
+            </a:extLst>
+          </p:cNvPr>
+          <p:cNvSpPr>
+            <a:spLocks noGrp="1"/>
+          </p:cNvSpPr>
+          <p:nvPr>
+            <p:ph idx="1"/>
+          </p:nvPr>
+        </p:nvSpPr>
+        <p:spPr/>
+        <p:txBody>
+          <a:bodyPr/>
+          <a:lstStyle/>
+          <a:p>
+            <a:r>
+              <a:rPr lang="de" dirty="0"/>
+              <a:t>Das gängige Schnipsel, mit welchem man das Floating beendet, ist eine </a:t>
+            </a:r>
+            <a:r>
+              <a:rPr lang="de" dirty="0" err="1"/>
+              <a:t>clearfix</a:t>
+            </a:r>
+            <a:r>
+              <a:rPr lang="de" dirty="0"/>
+              <a:t>-Klasse auf dem </a:t>
+            </a:r>
+            <a:r>
+              <a:rPr lang="de" dirty="0" err="1"/>
+              <a:t>umschliessenden</a:t>
+            </a:r>
+            <a:r>
+              <a:rPr lang="de" dirty="0"/>
+              <a:t> oder dem folgenden Element</a:t>
+            </a:r>
+            <a:br>
+              <a:rPr lang="de" dirty="0"/>
+            </a:br>
+            <a:br>
+              <a:rPr lang="de" dirty="0"/>
+            </a:br>
+            <a:r>
+              <a:rPr lang="en-US" dirty="0"/>
+              <a:t>.</a:t>
+            </a:r>
+            <a:r>
+              <a:rPr lang="en-US" dirty="0" err="1"/>
+              <a:t>clearfix</a:t>
+            </a:r>
+            <a:r>
+              <a:rPr lang="en-US" dirty="0"/>
+              <a:t> {</a:t>
+            </a:r>
+            <a:br>
+              <a:rPr lang="en-US" dirty="0"/>
+            </a:br>
+            <a:r>
+              <a:rPr lang="en-US" dirty="0"/>
+              <a:t>    clear: both;</a:t>
+            </a:r>
+            <a:br>
+              <a:rPr lang="en-US" dirty="0"/>
+            </a:br>
+            <a:r>
+              <a:rPr lang="en-US" dirty="0"/>
+              <a:t>}</a:t>
+            </a:r>
+            <a:br>
+              <a:rPr lang="en-US" dirty="0"/>
+            </a:br>
+            <a:endParaRPr lang="en-US" dirty="0"/>
+          </a:p>
+          <a:p>
+            <a:r>
+              <a:rPr lang="en-US" dirty="0">
+                <a:hlinkClick r:id="rId2"/>
+              </a:rPr>
+              <a:t>https://</a:t>
+            </a:r>
+            <a:r>
+              <a:rPr lang="en-US" dirty="0" err="1">
+                <a:hlinkClick r:id="rId2"/>
+              </a:rPr>
+              <a:t>codepen.io</a:t>
+            </a:r>
+            <a:r>
+              <a:rPr lang="en-US" dirty="0">
+                <a:hlinkClick r:id="rId2"/>
+              </a:rPr>
+              <a:t>/</a:t>
+            </a:r>
+            <a:r>
+              <a:rPr lang="en-US" dirty="0" err="1">
+                <a:hlinkClick r:id="rId2"/>
+              </a:rPr>
+              <a:t>KilianSSL</a:t>
+            </a:r>
+            <a:r>
+              <a:rPr lang="en-US" dirty="0">
+                <a:hlinkClick r:id="rId2"/>
+              </a:rPr>
+              <a:t>/pen/</a:t>
+            </a:r>
+            <a:r>
+              <a:rPr lang="en-US" dirty="0" err="1">
+                <a:hlinkClick r:id="rId2"/>
+              </a:rPr>
+              <a:t>OOBPXw</a:t>
+            </a:r>
+            <a:endParaRPr lang="de" dirty="0"/>
+          </a:p>
+        </p:txBody>
+      </p:sp>
+    </p:spTree>
+    <p:extLst>
+      <p:ext uri="{BB962C8B-B14F-4D97-AF65-F5344CB8AC3E}">
+        <p14:creationId xmlns:p14="http://schemas.microsoft.com/office/powerpoint/2010/main" val="1413250145"/>
+      </p:ext>
+    </p:extLst>
+  </p:cSld>
+  <p:clrMapOvr>
+    <a:masterClrMapping/>
+  </p:clrMapOvr>
+</p:sld>
+</file>
+
+<file path=ppt/slides/slide68.xml><?xml version="1.0" encoding="utf-8"?>
+<p:sld xmlns:a="http://schemas.openxmlformats.org/drawingml/2006/main" xmlns:r="http://schemas.openxmlformats.org/officeDocument/2006/relationships" xmlns:p="http://schemas.openxmlformats.org/presentationml/2006/main">
+  <p:cSld>
+    <p:spTree>
+      <p:nvGrpSpPr>
+        <p:cNvPr id="1" name=""/>
+        <p:cNvGrpSpPr/>
+        <p:nvPr/>
+      </p:nvGrpSpPr>
+      <p:grpSpPr>
+        <a:xfrm>
+          <a:off x="0" y="0"/>
+          <a:ext cx="0" cy="0"/>
+          <a:chOff x="0" y="0"/>
+          <a:chExt cx="0" cy="0"/>
+        </a:xfrm>
+      </p:grpSpPr>
+      <p:sp>
+        <p:nvSpPr>
+          <p:cNvPr id="2" name="Title 1">
+            <a:extLst>
+              <a:ext uri="{FF2B5EF4-FFF2-40B4-BE49-F238E27FC236}">
+                <a16:creationId xmlns:a16="http://schemas.microsoft.com/office/drawing/2014/main" id="{6AA98A84-E02F-9F49-9E93-EB12D8847E9C}"/>
+              </a:ext>
+            </a:extLst>
+          </p:cNvPr>
+          <p:cNvSpPr>
+            <a:spLocks noGrp="1"/>
+          </p:cNvSpPr>
+          <p:nvPr>
+            <p:ph type="title"/>
+          </p:nvPr>
+        </p:nvSpPr>
+        <p:spPr/>
+        <p:txBody>
+          <a:bodyPr/>
+          <a:lstStyle/>
+          <a:p>
+            <a:r>
+              <a:rPr lang="en-US" dirty="0" err="1"/>
+              <a:t>Übung</a:t>
+            </a:r>
+            <a:endParaRPr lang="en-US" dirty="0"/>
+          </a:p>
+        </p:txBody>
+      </p:sp>
+      <p:sp>
+        <p:nvSpPr>
+          <p:cNvPr id="3" name="Content Placeholder 2">
+            <a:extLst>
+              <a:ext uri="{FF2B5EF4-FFF2-40B4-BE49-F238E27FC236}">
+                <a16:creationId xmlns:a16="http://schemas.microsoft.com/office/drawing/2014/main" id="{BDF10057-8D8D-6844-A734-9F8016446635}"/>
+              </a:ext>
+            </a:extLst>
+          </p:cNvPr>
+          <p:cNvSpPr>
+            <a:spLocks noGrp="1"/>
+          </p:cNvSpPr>
+          <p:nvPr>
+            <p:ph idx="1"/>
+          </p:nvPr>
+        </p:nvSpPr>
+        <p:spPr/>
+        <p:txBody>
+          <a:bodyPr/>
+          <a:lstStyle/>
+          <a:p>
+            <a:pPr marL="0" indent="0">
+              <a:buNone/>
+            </a:pPr>
+            <a:r>
+              <a:rPr lang="de" dirty="0"/>
+              <a:t>Baue ein Holy-</a:t>
+            </a:r>
+            <a:r>
+              <a:rPr lang="de" dirty="0" err="1"/>
+              <a:t>Grail</a:t>
+            </a:r>
+            <a:r>
+              <a:rPr lang="de" dirty="0"/>
+              <a:t> Layout mit </a:t>
+            </a:r>
+            <a:r>
+              <a:rPr lang="de" dirty="0" err="1"/>
+              <a:t>float</a:t>
+            </a:r>
+            <a:r>
+              <a:rPr lang="de" dirty="0"/>
+              <a:t> und </a:t>
+            </a:r>
+            <a:r>
+              <a:rPr lang="de" dirty="0" err="1"/>
+              <a:t>clear</a:t>
+            </a:r>
+            <a:br>
+              <a:rPr lang="de" dirty="0"/>
+            </a:br>
+            <a:br>
+              <a:rPr lang="de" dirty="0"/>
+            </a:br>
+            <a:r>
+              <a:rPr lang="de" dirty="0"/>
+              <a:t>Verwende Hintergrund-Farben um die Ausdehnung der einzelnen Bereiche zu visualisieren </a:t>
+            </a:r>
+          </a:p>
+          <a:p>
+            <a:endParaRPr lang="en-US" dirty="0"/>
+          </a:p>
+        </p:txBody>
+      </p:sp>
+      <p:pic>
+        <p:nvPicPr>
+          <p:cNvPr id="4" name="Picture 1" descr="page30image31640000">
+            <a:extLst>
+              <a:ext uri="{FF2B5EF4-FFF2-40B4-BE49-F238E27FC236}">
+                <a16:creationId xmlns:a16="http://schemas.microsoft.com/office/drawing/2014/main" id="{4F28245D-443C-7E44-A3B6-C4592EEAC959}"/>
+              </a:ext>
+            </a:extLst>
+          </p:cNvPr>
+          <p:cNvPicPr>
+            <a:picLocks noChangeAspect="1" noChangeArrowheads="1"/>
+          </p:cNvPicPr>
+          <p:nvPr/>
+        </p:nvPicPr>
+        <p:blipFill>
+          <a:blip r:embed="rId2">
+            <a:extLst>
+              <a:ext uri="{28A0092B-C50C-407E-A947-70E740481C1C}">
+                <a14:useLocalDpi xmlns:a14="http://schemas.microsoft.com/office/drawing/2010/main" val="0"/>
+              </a:ext>
+            </a:extLst>
+          </a:blip>
+          <a:srcRect/>
+          <a:stretch>
+            <a:fillRect/>
+          </a:stretch>
+        </p:blipFill>
+        <p:spPr bwMode="auto">
+          <a:xfrm>
+            <a:off x="3833261" y="3966438"/>
+            <a:ext cx="3307979" cy="2472458"/>
+          </a:xfrm>
+          <a:prstGeom prst="rect">
+            <a:avLst/>
+          </a:prstGeom>
+          <a:noFill/>
+          <a:extLst>
+            <a:ext uri="{909E8E84-426E-40DD-AFC4-6F175D3DCCD1}">
+              <a14:hiddenFill xmlns:a14="http://schemas.microsoft.com/office/drawing/2010/main">
+                <a:solidFill>
+                  <a:srgbClr val="FFFFFF"/>
+                </a:solidFill>
+              </a14:hiddenFill>
+            </a:ext>
+          </a:extLst>
+        </p:spPr>
+      </p:pic>
+    </p:spTree>
+    <p:extLst>
+      <p:ext uri="{BB962C8B-B14F-4D97-AF65-F5344CB8AC3E}">
+        <p14:creationId xmlns:p14="http://schemas.microsoft.com/office/powerpoint/2010/main" val="327298654"/>
+      </p:ext>
+    </p:extLst>
+  </p:cSld>
+  <p:clrMapOvr>
+    <a:masterClrMapping/>
+  </p:clrMapOvr>
+</p:sld>
+</file>
+
+<file path=ppt/slides/slide69.xml><?xml version="1.0" encoding="utf-8"?>
+<p:sld xmlns:a="http://schemas.openxmlformats.org/drawingml/2006/main" xmlns:r="http://schemas.openxmlformats.org/officeDocument/2006/relationships" xmlns:p="http://schemas.openxmlformats.org/presentationml/2006/main">
+  <p:cSld>
+    <p:spTree>
+      <p:nvGrpSpPr>
+        <p:cNvPr id="1" name=""/>
+        <p:cNvGrpSpPr/>
+        <p:nvPr/>
+      </p:nvGrpSpPr>
+      <p:grpSpPr>
+        <a:xfrm>
+          <a:off x="0" y="0"/>
+          <a:ext cx="0" cy="0"/>
+          <a:chOff x="0" y="0"/>
+          <a:chExt cx="0" cy="0"/>
+        </a:xfrm>
+      </p:grpSpPr>
+      <p:sp>
+        <p:nvSpPr>
+          <p:cNvPr id="2" name="Title 1">
+            <a:extLst>
+              <a:ext uri="{FF2B5EF4-FFF2-40B4-BE49-F238E27FC236}">
+                <a16:creationId xmlns:a16="http://schemas.microsoft.com/office/drawing/2014/main" id="{D5490CE8-8A1E-3042-991A-E735B45852F1}"/>
+              </a:ext>
+            </a:extLst>
+          </p:cNvPr>
+          <p:cNvSpPr>
+            <a:spLocks noGrp="1"/>
+          </p:cNvSpPr>
+          <p:nvPr>
+            <p:ph type="title"/>
+          </p:nvPr>
+        </p:nvSpPr>
+        <p:spPr/>
+        <p:txBody>
+          <a:bodyPr/>
+          <a:lstStyle/>
+          <a:p>
+            <a:r>
+              <a:rPr lang="en-US" dirty="0"/>
+              <a:t>Flexbox</a:t>
+            </a:r>
+          </a:p>
+        </p:txBody>
+      </p:sp>
+      <p:sp>
+        <p:nvSpPr>
+          <p:cNvPr id="3" name="Content Placeholder 2">
+            <a:extLst>
+              <a:ext uri="{FF2B5EF4-FFF2-40B4-BE49-F238E27FC236}">
+                <a16:creationId xmlns:a16="http://schemas.microsoft.com/office/drawing/2014/main" id="{B1EEE130-C9DD-EF47-BB34-BDD3343135F1}"/>
+              </a:ext>
+            </a:extLst>
+          </p:cNvPr>
+          <p:cNvSpPr>
+            <a:spLocks noGrp="1"/>
+          </p:cNvSpPr>
+          <p:nvPr>
+            <p:ph idx="1"/>
+          </p:nvPr>
+        </p:nvSpPr>
+        <p:spPr>
+          <a:xfrm>
+            <a:off x="680321" y="2336873"/>
+            <a:ext cx="9613861" cy="3599316"/>
+          </a:xfrm>
+        </p:spPr>
+        <p:txBody>
+          <a:bodyPr/>
+          <a:lstStyle/>
+          <a:p>
+            <a:r>
+              <a:rPr lang="en-US" dirty="0"/>
+              <a:t>Flexbox </a:t>
+            </a:r>
+            <a:r>
+              <a:rPr lang="en-US" dirty="0" err="1"/>
+              <a:t>ist</a:t>
+            </a:r>
+            <a:r>
+              <a:rPr lang="en-US" dirty="0"/>
+              <a:t> </a:t>
+            </a:r>
+            <a:r>
+              <a:rPr lang="en-US" dirty="0" err="1"/>
+              <a:t>ein</a:t>
+            </a:r>
+            <a:r>
+              <a:rPr lang="en-US" dirty="0"/>
+              <a:t> </a:t>
+            </a:r>
+            <a:r>
+              <a:rPr lang="en-US" b="1" dirty="0" err="1"/>
+              <a:t>eindimensionales</a:t>
+            </a:r>
+            <a:r>
+              <a:rPr lang="en-US" dirty="0"/>
+              <a:t> </a:t>
+            </a:r>
+            <a:r>
+              <a:rPr lang="en-US" dirty="0" err="1"/>
+              <a:t>Layoutmodell</a:t>
+            </a:r>
+            <a:r>
+              <a:rPr lang="en-US" dirty="0"/>
+              <a:t> </a:t>
+            </a:r>
+            <a:br>
+              <a:rPr lang="en-US" dirty="0"/>
+            </a:br>
+            <a:r>
+              <a:rPr lang="en-US" dirty="0"/>
+              <a:t>(</a:t>
+            </a:r>
+            <a:r>
+              <a:rPr lang="en-US" dirty="0" err="1"/>
+              <a:t>D.h</a:t>
+            </a:r>
+            <a:r>
+              <a:rPr lang="en-US" dirty="0"/>
+              <a:t>. </a:t>
+            </a:r>
+            <a:r>
+              <a:rPr lang="de" dirty="0"/>
+              <a:t>das sich </a:t>
+            </a:r>
+            <a:r>
+              <a:rPr lang="de" dirty="0" err="1"/>
+              <a:t>Flexbox</a:t>
+            </a:r>
+            <a:r>
+              <a:rPr lang="de" dirty="0"/>
+              <a:t> mit dem Layout in einer Dimension zu einem Zeitpunkt beschäftigt - entweder als eine Zeile oder als eine Spalte</a:t>
+            </a:r>
+            <a:r>
+              <a:rPr lang="en-US" dirty="0"/>
+              <a:t>)</a:t>
+            </a:r>
+          </a:p>
+          <a:p>
+            <a:endParaRPr lang="en-US" dirty="0"/>
+          </a:p>
+        </p:txBody>
+      </p:sp>
+      <p:pic>
+        <p:nvPicPr>
+          <p:cNvPr id="7169" name="Picture 1" descr="page10image4335984">
+            <a:extLst>
+              <a:ext uri="{FF2B5EF4-FFF2-40B4-BE49-F238E27FC236}">
+                <a16:creationId xmlns:a16="http://schemas.microsoft.com/office/drawing/2014/main" id="{8D40126D-EE0E-F244-887E-F6B0F2B52323}"/>
+              </a:ext>
+            </a:extLst>
+          </p:cNvPr>
+          <p:cNvPicPr>
+            <a:picLocks noChangeAspect="1" noChangeArrowheads="1"/>
+          </p:cNvPicPr>
+          <p:nvPr/>
+        </p:nvPicPr>
+        <p:blipFill>
+          <a:blip r:embed="rId2">
+            <a:extLst>
+              <a:ext uri="{28A0092B-C50C-407E-A947-70E740481C1C}">
+                <a14:useLocalDpi xmlns:a14="http://schemas.microsoft.com/office/drawing/2010/main" val="0"/>
+              </a:ext>
+            </a:extLst>
+          </a:blip>
+          <a:srcRect/>
+          <a:stretch>
+            <a:fillRect/>
+          </a:stretch>
+        </p:blipFill>
+        <p:spPr bwMode="auto">
+          <a:xfrm>
+            <a:off x="995680" y="4285189"/>
+            <a:ext cx="4089400" cy="1651000"/>
+          </a:xfrm>
+          <a:prstGeom prst="rect">
+            <a:avLst/>
+          </a:prstGeom>
+          <a:noFill/>
+          <a:extLst>
+            <a:ext uri="{909E8E84-426E-40DD-AFC4-6F175D3DCCD1}">
+              <a14:hiddenFill xmlns:a14="http://schemas.microsoft.com/office/drawing/2010/main">
+                <a:solidFill>
+                  <a:srgbClr val="FFFFFF"/>
+                </a:solidFill>
+              </a14:hiddenFill>
+            </a:ext>
+          </a:extLst>
+        </p:spPr>
+      </p:pic>
+      <p:pic>
+        <p:nvPicPr>
+          <p:cNvPr id="7170" name="Picture 2" descr="page10image4330784">
+            <a:extLst>
+              <a:ext uri="{FF2B5EF4-FFF2-40B4-BE49-F238E27FC236}">
+                <a16:creationId xmlns:a16="http://schemas.microsoft.com/office/drawing/2014/main" id="{653EA649-475F-D542-97F8-BE2093C3E006}"/>
+              </a:ext>
+            </a:extLst>
+          </p:cNvPr>
+          <p:cNvPicPr>
+            <a:picLocks noChangeAspect="1" noChangeArrowheads="1"/>
+          </p:cNvPicPr>
+          <p:nvPr/>
+        </p:nvPicPr>
+        <p:blipFill>
+          <a:blip r:embed="rId3">
+            <a:extLst>
+              <a:ext uri="{28A0092B-C50C-407E-A947-70E740481C1C}">
+                <a14:useLocalDpi xmlns:a14="http://schemas.microsoft.com/office/drawing/2010/main" val="0"/>
+              </a:ext>
+            </a:extLst>
+          </a:blip>
+          <a:srcRect/>
+          <a:stretch>
+            <a:fillRect/>
+          </a:stretch>
+        </p:blipFill>
+        <p:spPr bwMode="auto">
+          <a:xfrm>
+            <a:off x="5625881" y="4285189"/>
+            <a:ext cx="4127500" cy="1651000"/>
+          </a:xfrm>
+          <a:prstGeom prst="rect">
+            <a:avLst/>
+          </a:prstGeom>
+          <a:noFill/>
+          <a:extLst>
+            <a:ext uri="{909E8E84-426E-40DD-AFC4-6F175D3DCCD1}">
+              <a14:hiddenFill xmlns:a14="http://schemas.microsoft.com/office/drawing/2010/main">
+                <a:solidFill>
+                  <a:srgbClr val="FFFFFF"/>
+                </a:solidFill>
+              </a14:hiddenFill>
+            </a:ext>
+          </a:extLst>
+        </p:spPr>
+      </p:pic>
+    </p:spTree>
+    <p:extLst>
+      <p:ext uri="{BB962C8B-B14F-4D97-AF65-F5344CB8AC3E}">
+        <p14:creationId xmlns:p14="http://schemas.microsoft.com/office/powerpoint/2010/main" val="3083529883"/>
       </p:ext>
     </p:extLst>
   </p:cSld>
@@ -21752,6 +23622,604 @@
     <p:extLst>
       <p:ext uri="{BB962C8B-B14F-4D97-AF65-F5344CB8AC3E}">
         <p14:creationId xmlns:p14="http://schemas.microsoft.com/office/powerpoint/2010/main" val="2458415932"/>
+      </p:ext>
+    </p:extLst>
+  </p:cSld>
+  <p:clrMapOvr>
+    <a:masterClrMapping/>
+  </p:clrMapOvr>
+</p:sld>
+</file>
+
+<file path=ppt/slides/slide70.xml><?xml version="1.0" encoding="utf-8"?>
+<p:sld xmlns:a="http://schemas.openxmlformats.org/drawingml/2006/main" xmlns:r="http://schemas.openxmlformats.org/officeDocument/2006/relationships" xmlns:p="http://schemas.openxmlformats.org/presentationml/2006/main">
+  <p:cSld>
+    <p:spTree>
+      <p:nvGrpSpPr>
+        <p:cNvPr id="1" name=""/>
+        <p:cNvGrpSpPr/>
+        <p:nvPr/>
+      </p:nvGrpSpPr>
+      <p:grpSpPr>
+        <a:xfrm>
+          <a:off x="0" y="0"/>
+          <a:ext cx="0" cy="0"/>
+          <a:chOff x="0" y="0"/>
+          <a:chExt cx="0" cy="0"/>
+        </a:xfrm>
+      </p:grpSpPr>
+      <p:sp>
+        <p:nvSpPr>
+          <p:cNvPr id="2" name="Title 1">
+            <a:extLst>
+              <a:ext uri="{FF2B5EF4-FFF2-40B4-BE49-F238E27FC236}">
+                <a16:creationId xmlns:a16="http://schemas.microsoft.com/office/drawing/2014/main" id="{DCB8ADAE-CA08-CD44-94D4-FE0CAB5DEC92}"/>
+              </a:ext>
+            </a:extLst>
+          </p:cNvPr>
+          <p:cNvSpPr>
+            <a:spLocks noGrp="1"/>
+          </p:cNvSpPr>
+          <p:nvPr>
+            <p:ph type="title"/>
+          </p:nvPr>
+        </p:nvSpPr>
+        <p:spPr/>
+        <p:txBody>
+          <a:bodyPr/>
+          <a:lstStyle/>
+          <a:p>
+            <a:r>
+              <a:rPr lang="en-US" dirty="0"/>
+              <a:t>Flexbox</a:t>
+            </a:r>
+          </a:p>
+        </p:txBody>
+      </p:sp>
+      <p:sp>
+        <p:nvSpPr>
+          <p:cNvPr id="3" name="Content Placeholder 2">
+            <a:extLst>
+              <a:ext uri="{FF2B5EF4-FFF2-40B4-BE49-F238E27FC236}">
+                <a16:creationId xmlns:a16="http://schemas.microsoft.com/office/drawing/2014/main" id="{ADC744E3-8347-B748-B6F2-C7AB7E2E5363}"/>
+              </a:ext>
+            </a:extLst>
+          </p:cNvPr>
+          <p:cNvSpPr>
+            <a:spLocks noGrp="1"/>
+          </p:cNvSpPr>
+          <p:nvPr>
+            <p:ph idx="1"/>
+          </p:nvPr>
+        </p:nvSpPr>
+        <p:spPr/>
+        <p:txBody>
+          <a:bodyPr/>
+          <a:lstStyle/>
+          <a:p>
+            <a:pPr marL="0" indent="0">
+              <a:buNone/>
+            </a:pPr>
+            <a:r>
+              <a:rPr lang="en-US" dirty="0"/>
+              <a:t>Container Properties</a:t>
+            </a:r>
+          </a:p>
+          <a:p>
+            <a:pPr marL="0" indent="0">
+              <a:buNone/>
+            </a:pPr>
+            <a:endParaRPr lang="en-US" dirty="0"/>
+          </a:p>
+          <a:p>
+            <a:r>
+              <a:rPr lang="en-US" dirty="0"/>
+              <a:t>display: flex</a:t>
+            </a:r>
+            <a:br>
+              <a:rPr lang="en-US" dirty="0"/>
+            </a:br>
+            <a:r>
+              <a:rPr lang="en-US" dirty="0"/>
+              <a:t>flex-direction: row</a:t>
+            </a:r>
+            <a:br>
+              <a:rPr lang="en-US" dirty="0"/>
+            </a:br>
+            <a:br>
+              <a:rPr lang="en-US" dirty="0"/>
+            </a:br>
+            <a:endParaRPr lang="en-US" dirty="0"/>
+          </a:p>
+        </p:txBody>
+      </p:sp>
+    </p:spTree>
+    <p:extLst>
+      <p:ext uri="{BB962C8B-B14F-4D97-AF65-F5344CB8AC3E}">
+        <p14:creationId xmlns:p14="http://schemas.microsoft.com/office/powerpoint/2010/main" val="3185065521"/>
+      </p:ext>
+    </p:extLst>
+  </p:cSld>
+  <p:clrMapOvr>
+    <a:masterClrMapping/>
+  </p:clrMapOvr>
+</p:sld>
+</file>
+
+<file path=ppt/slides/slide71.xml><?xml version="1.0" encoding="utf-8"?>
+<p:sld xmlns:a="http://schemas.openxmlformats.org/drawingml/2006/main" xmlns:r="http://schemas.openxmlformats.org/officeDocument/2006/relationships" xmlns:p="http://schemas.openxmlformats.org/presentationml/2006/main">
+  <p:cSld>
+    <p:spTree>
+      <p:nvGrpSpPr>
+        <p:cNvPr id="1" name=""/>
+        <p:cNvGrpSpPr/>
+        <p:nvPr/>
+      </p:nvGrpSpPr>
+      <p:grpSpPr>
+        <a:xfrm>
+          <a:off x="0" y="0"/>
+          <a:ext cx="0" cy="0"/>
+          <a:chOff x="0" y="0"/>
+          <a:chExt cx="0" cy="0"/>
+        </a:xfrm>
+      </p:grpSpPr>
+      <p:sp>
+        <p:nvSpPr>
+          <p:cNvPr id="2" name="Title 1">
+            <a:extLst>
+              <a:ext uri="{FF2B5EF4-FFF2-40B4-BE49-F238E27FC236}">
+                <a16:creationId xmlns:a16="http://schemas.microsoft.com/office/drawing/2014/main" id="{E1B3D9A2-0FB8-0646-88C3-FE5D6AB11CFC}"/>
+              </a:ext>
+            </a:extLst>
+          </p:cNvPr>
+          <p:cNvSpPr>
+            <a:spLocks noGrp="1"/>
+          </p:cNvSpPr>
+          <p:nvPr>
+            <p:ph type="title"/>
+          </p:nvPr>
+        </p:nvSpPr>
+        <p:spPr/>
+        <p:txBody>
+          <a:bodyPr/>
+          <a:lstStyle/>
+          <a:p>
+            <a:endParaRPr lang="en-US"/>
+          </a:p>
+        </p:txBody>
+      </p:sp>
+      <p:sp>
+        <p:nvSpPr>
+          <p:cNvPr id="3" name="Content Placeholder 2">
+            <a:extLst>
+              <a:ext uri="{FF2B5EF4-FFF2-40B4-BE49-F238E27FC236}">
+                <a16:creationId xmlns:a16="http://schemas.microsoft.com/office/drawing/2014/main" id="{4F332575-B5FE-144F-9D81-EBD8922382A8}"/>
+              </a:ext>
+            </a:extLst>
+          </p:cNvPr>
+          <p:cNvSpPr>
+            <a:spLocks noGrp="1"/>
+          </p:cNvSpPr>
+          <p:nvPr>
+            <p:ph idx="1"/>
+          </p:nvPr>
+        </p:nvSpPr>
+        <p:spPr/>
+        <p:txBody>
+          <a:bodyPr/>
+          <a:lstStyle/>
+          <a:p>
+            <a:endParaRPr lang="en-US"/>
+          </a:p>
+        </p:txBody>
+      </p:sp>
+    </p:spTree>
+    <p:extLst>
+      <p:ext uri="{BB962C8B-B14F-4D97-AF65-F5344CB8AC3E}">
+        <p14:creationId xmlns:p14="http://schemas.microsoft.com/office/powerpoint/2010/main" val="1777042083"/>
+      </p:ext>
+    </p:extLst>
+  </p:cSld>
+  <p:clrMapOvr>
+    <a:masterClrMapping/>
+  </p:clrMapOvr>
+</p:sld>
+</file>
+
+<file path=ppt/slides/slide72.xml><?xml version="1.0" encoding="utf-8"?>
+<p:sld xmlns:a="http://schemas.openxmlformats.org/drawingml/2006/main" xmlns:r="http://schemas.openxmlformats.org/officeDocument/2006/relationships" xmlns:p="http://schemas.openxmlformats.org/presentationml/2006/main">
+  <p:cSld>
+    <p:spTree>
+      <p:nvGrpSpPr>
+        <p:cNvPr id="1" name=""/>
+        <p:cNvGrpSpPr/>
+        <p:nvPr/>
+      </p:nvGrpSpPr>
+      <p:grpSpPr>
+        <a:xfrm>
+          <a:off x="0" y="0"/>
+          <a:ext cx="0" cy="0"/>
+          <a:chOff x="0" y="0"/>
+          <a:chExt cx="0" cy="0"/>
+        </a:xfrm>
+      </p:grpSpPr>
+      <p:sp>
+        <p:nvSpPr>
+          <p:cNvPr id="2" name="Title 1">
+            <a:extLst>
+              <a:ext uri="{FF2B5EF4-FFF2-40B4-BE49-F238E27FC236}">
+                <a16:creationId xmlns:a16="http://schemas.microsoft.com/office/drawing/2014/main" id="{2B2CD961-5709-C241-A54E-238F4D05CD7C}"/>
+              </a:ext>
+            </a:extLst>
+          </p:cNvPr>
+          <p:cNvSpPr>
+            <a:spLocks noGrp="1"/>
+          </p:cNvSpPr>
+          <p:nvPr>
+            <p:ph type="title"/>
+          </p:nvPr>
+        </p:nvSpPr>
+        <p:spPr/>
+        <p:txBody>
+          <a:bodyPr/>
+          <a:lstStyle/>
+          <a:p>
+            <a:endParaRPr lang="en-US"/>
+          </a:p>
+        </p:txBody>
+      </p:sp>
+      <p:sp>
+        <p:nvSpPr>
+          <p:cNvPr id="3" name="Content Placeholder 2">
+            <a:extLst>
+              <a:ext uri="{FF2B5EF4-FFF2-40B4-BE49-F238E27FC236}">
+                <a16:creationId xmlns:a16="http://schemas.microsoft.com/office/drawing/2014/main" id="{A3D67316-99A5-E94E-A390-438B2046BAF7}"/>
+              </a:ext>
+            </a:extLst>
+          </p:cNvPr>
+          <p:cNvSpPr>
+            <a:spLocks noGrp="1"/>
+          </p:cNvSpPr>
+          <p:nvPr>
+            <p:ph idx="1"/>
+          </p:nvPr>
+        </p:nvSpPr>
+        <p:spPr/>
+        <p:txBody>
+          <a:bodyPr/>
+          <a:lstStyle/>
+          <a:p>
+            <a:endParaRPr lang="en-US"/>
+          </a:p>
+        </p:txBody>
+      </p:sp>
+    </p:spTree>
+    <p:extLst>
+      <p:ext uri="{BB962C8B-B14F-4D97-AF65-F5344CB8AC3E}">
+        <p14:creationId xmlns:p14="http://schemas.microsoft.com/office/powerpoint/2010/main" val="2970264264"/>
+      </p:ext>
+    </p:extLst>
+  </p:cSld>
+  <p:clrMapOvr>
+    <a:masterClrMapping/>
+  </p:clrMapOvr>
+</p:sld>
+</file>
+
+<file path=ppt/slides/slide73.xml><?xml version="1.0" encoding="utf-8"?>
+<p:sld xmlns:a="http://schemas.openxmlformats.org/drawingml/2006/main" xmlns:r="http://schemas.openxmlformats.org/officeDocument/2006/relationships" xmlns:p="http://schemas.openxmlformats.org/presentationml/2006/main">
+  <p:cSld>
+    <p:spTree>
+      <p:nvGrpSpPr>
+        <p:cNvPr id="1" name=""/>
+        <p:cNvGrpSpPr/>
+        <p:nvPr/>
+      </p:nvGrpSpPr>
+      <p:grpSpPr>
+        <a:xfrm>
+          <a:off x="0" y="0"/>
+          <a:ext cx="0" cy="0"/>
+          <a:chOff x="0" y="0"/>
+          <a:chExt cx="0" cy="0"/>
+        </a:xfrm>
+      </p:grpSpPr>
+      <p:sp>
+        <p:nvSpPr>
+          <p:cNvPr id="2" name="Title 1">
+            <a:extLst>
+              <a:ext uri="{FF2B5EF4-FFF2-40B4-BE49-F238E27FC236}">
+                <a16:creationId xmlns:a16="http://schemas.microsoft.com/office/drawing/2014/main" id="{BD12F5B6-1D4F-FC43-9C9B-58CB5B6D4246}"/>
+              </a:ext>
+            </a:extLst>
+          </p:cNvPr>
+          <p:cNvSpPr>
+            <a:spLocks noGrp="1"/>
+          </p:cNvSpPr>
+          <p:nvPr>
+            <p:ph type="title"/>
+          </p:nvPr>
+        </p:nvSpPr>
+        <p:spPr/>
+        <p:txBody>
+          <a:bodyPr/>
+          <a:lstStyle/>
+          <a:p>
+            <a:r>
+              <a:rPr lang="en-US" dirty="0"/>
+              <a:t>Grid</a:t>
+            </a:r>
+          </a:p>
+        </p:txBody>
+      </p:sp>
+      <p:sp>
+        <p:nvSpPr>
+          <p:cNvPr id="3" name="Content Placeholder 2">
+            <a:extLst>
+              <a:ext uri="{FF2B5EF4-FFF2-40B4-BE49-F238E27FC236}">
+                <a16:creationId xmlns:a16="http://schemas.microsoft.com/office/drawing/2014/main" id="{CC3FAD12-4AE5-964C-9563-4A3588BB2406}"/>
+              </a:ext>
+            </a:extLst>
+          </p:cNvPr>
+          <p:cNvSpPr>
+            <a:spLocks noGrp="1"/>
+          </p:cNvSpPr>
+          <p:nvPr>
+            <p:ph idx="1"/>
+          </p:nvPr>
+        </p:nvSpPr>
+        <p:spPr/>
+        <p:txBody>
+          <a:bodyPr/>
+          <a:lstStyle/>
+          <a:p>
+            <a:r>
+              <a:rPr lang="en-US" dirty="0"/>
+              <a:t>Grid </a:t>
+            </a:r>
+            <a:r>
+              <a:rPr lang="en-US" dirty="0" err="1"/>
+              <a:t>ist</a:t>
+            </a:r>
+            <a:r>
+              <a:rPr lang="en-US" dirty="0"/>
+              <a:t> </a:t>
+            </a:r>
+            <a:r>
+              <a:rPr lang="en-US" dirty="0" err="1"/>
+              <a:t>ein</a:t>
+            </a:r>
+            <a:r>
+              <a:rPr lang="en-US" dirty="0"/>
+              <a:t> </a:t>
+            </a:r>
+            <a:r>
+              <a:rPr lang="en-US" b="1" dirty="0" err="1"/>
+              <a:t>zweidimensionales</a:t>
+            </a:r>
+            <a:r>
+              <a:rPr lang="en-US" dirty="0"/>
+              <a:t> </a:t>
+            </a:r>
+            <a:r>
+              <a:rPr lang="en-US" dirty="0" err="1"/>
+              <a:t>Layoutmodell</a:t>
+            </a:r>
+            <a:endParaRPr lang="en-US" dirty="0"/>
+          </a:p>
+        </p:txBody>
+      </p:sp>
+    </p:spTree>
+    <p:extLst>
+      <p:ext uri="{BB962C8B-B14F-4D97-AF65-F5344CB8AC3E}">
+        <p14:creationId xmlns:p14="http://schemas.microsoft.com/office/powerpoint/2010/main" val="80854726"/>
+      </p:ext>
+    </p:extLst>
+  </p:cSld>
+  <p:clrMapOvr>
+    <a:masterClrMapping/>
+  </p:clrMapOvr>
+</p:sld>
+</file>
+
+<file path=ppt/slides/slide74.xml><?xml version="1.0" encoding="utf-8"?>
+<p:sld xmlns:a="http://schemas.openxmlformats.org/drawingml/2006/main" xmlns:r="http://schemas.openxmlformats.org/officeDocument/2006/relationships" xmlns:p="http://schemas.openxmlformats.org/presentationml/2006/main">
+  <p:cSld>
+    <p:spTree>
+      <p:nvGrpSpPr>
+        <p:cNvPr id="1" name=""/>
+        <p:cNvGrpSpPr/>
+        <p:nvPr/>
+      </p:nvGrpSpPr>
+      <p:grpSpPr>
+        <a:xfrm>
+          <a:off x="0" y="0"/>
+          <a:ext cx="0" cy="0"/>
+          <a:chOff x="0" y="0"/>
+          <a:chExt cx="0" cy="0"/>
+        </a:xfrm>
+      </p:grpSpPr>
+      <p:sp>
+        <p:nvSpPr>
+          <p:cNvPr id="2" name="Title 1">
+            <a:extLst>
+              <a:ext uri="{FF2B5EF4-FFF2-40B4-BE49-F238E27FC236}">
+                <a16:creationId xmlns:a16="http://schemas.microsoft.com/office/drawing/2014/main" id="{C57CC73E-83AF-9D48-8780-676E6EE6AB4D}"/>
+              </a:ext>
+            </a:extLst>
+          </p:cNvPr>
+          <p:cNvSpPr>
+            <a:spLocks noGrp="1"/>
+          </p:cNvSpPr>
+          <p:nvPr>
+            <p:ph type="title"/>
+          </p:nvPr>
+        </p:nvSpPr>
+        <p:spPr/>
+        <p:txBody>
+          <a:bodyPr/>
+          <a:lstStyle/>
+          <a:p>
+            <a:endParaRPr lang="en-US"/>
+          </a:p>
+        </p:txBody>
+      </p:sp>
+      <p:sp>
+        <p:nvSpPr>
+          <p:cNvPr id="3" name="Content Placeholder 2">
+            <a:extLst>
+              <a:ext uri="{FF2B5EF4-FFF2-40B4-BE49-F238E27FC236}">
+                <a16:creationId xmlns:a16="http://schemas.microsoft.com/office/drawing/2014/main" id="{25799DE7-BC49-E444-A85A-C391B6D9D5F2}"/>
+              </a:ext>
+            </a:extLst>
+          </p:cNvPr>
+          <p:cNvSpPr>
+            <a:spLocks noGrp="1"/>
+          </p:cNvSpPr>
+          <p:nvPr>
+            <p:ph idx="1"/>
+          </p:nvPr>
+        </p:nvSpPr>
+        <p:spPr/>
+        <p:txBody>
+          <a:bodyPr/>
+          <a:lstStyle/>
+          <a:p>
+            <a:endParaRPr lang="en-US"/>
+          </a:p>
+        </p:txBody>
+      </p:sp>
+    </p:spTree>
+    <p:extLst>
+      <p:ext uri="{BB962C8B-B14F-4D97-AF65-F5344CB8AC3E}">
+        <p14:creationId xmlns:p14="http://schemas.microsoft.com/office/powerpoint/2010/main" val="2496049358"/>
+      </p:ext>
+    </p:extLst>
+  </p:cSld>
+  <p:clrMapOvr>
+    <a:masterClrMapping/>
+  </p:clrMapOvr>
+</p:sld>
+</file>
+
+<file path=ppt/slides/slide75.xml><?xml version="1.0" encoding="utf-8"?>
+<p:sld xmlns:a="http://schemas.openxmlformats.org/drawingml/2006/main" xmlns:r="http://schemas.openxmlformats.org/officeDocument/2006/relationships" xmlns:p="http://schemas.openxmlformats.org/presentationml/2006/main">
+  <p:cSld>
+    <p:spTree>
+      <p:nvGrpSpPr>
+        <p:cNvPr id="1" name=""/>
+        <p:cNvGrpSpPr/>
+        <p:nvPr/>
+      </p:nvGrpSpPr>
+      <p:grpSpPr>
+        <a:xfrm>
+          <a:off x="0" y="0"/>
+          <a:ext cx="0" cy="0"/>
+          <a:chOff x="0" y="0"/>
+          <a:chExt cx="0" cy="0"/>
+        </a:xfrm>
+      </p:grpSpPr>
+      <p:sp>
+        <p:nvSpPr>
+          <p:cNvPr id="2" name="Titel 1">
+            <a:extLst>
+              <a:ext uri="{FF2B5EF4-FFF2-40B4-BE49-F238E27FC236}">
+                <a16:creationId xmlns:a16="http://schemas.microsoft.com/office/drawing/2014/main" id="{2D87845B-83AD-7C4C-B581-5E1612E3AFF1}"/>
+              </a:ext>
+            </a:extLst>
+          </p:cNvPr>
+          <p:cNvSpPr>
+            <a:spLocks noGrp="1"/>
+          </p:cNvSpPr>
+          <p:nvPr>
+            <p:ph type="title"/>
+          </p:nvPr>
+        </p:nvSpPr>
+        <p:spPr/>
+        <p:txBody>
+          <a:bodyPr/>
+          <a:lstStyle/>
+          <a:p>
+            <a:r>
+              <a:rPr lang="de-DE" dirty="0"/>
+              <a:t>Literatur / Tutorials</a:t>
+            </a:r>
+          </a:p>
+        </p:txBody>
+      </p:sp>
+      <p:sp>
+        <p:nvSpPr>
+          <p:cNvPr id="3" name="Inhaltsplatzhalter 2">
+            <a:extLst>
+              <a:ext uri="{FF2B5EF4-FFF2-40B4-BE49-F238E27FC236}">
+                <a16:creationId xmlns:a16="http://schemas.microsoft.com/office/drawing/2014/main" id="{180ECAA7-461F-3A48-BB16-AB334C364936}"/>
+              </a:ext>
+            </a:extLst>
+          </p:cNvPr>
+          <p:cNvSpPr>
+            <a:spLocks noGrp="1"/>
+          </p:cNvSpPr>
+          <p:nvPr>
+            <p:ph idx="1"/>
+          </p:nvPr>
+        </p:nvSpPr>
+        <p:spPr/>
+        <p:txBody>
+          <a:bodyPr/>
+          <a:lstStyle/>
+          <a:p>
+            <a:r>
+              <a:rPr lang="de-DE" dirty="0">
+                <a:hlinkClick r:id="rId2"/>
+              </a:rPr>
+              <a:t>http://de.selfhtml.org/</a:t>
+            </a:r>
+            <a:endParaRPr lang="de-DE" dirty="0"/>
+          </a:p>
+          <a:p>
+            <a:r>
+              <a:rPr lang="de-DE" dirty="0">
+                <a:hlinkClick r:id="rId3"/>
+              </a:rPr>
+              <a:t>https://www.w3.org/standards/webdesign/htmlcss</a:t>
+            </a:r>
+            <a:endParaRPr lang="de-DE" dirty="0"/>
+          </a:p>
+          <a:p>
+            <a:r>
+              <a:rPr lang="de-DE" dirty="0">
+                <a:hlinkClick r:id="rId4"/>
+              </a:rPr>
+              <a:t>https://developer.mozilla.org/de/docs/Web/HTML</a:t>
+            </a:r>
+            <a:endParaRPr lang="de-DE" dirty="0"/>
+          </a:p>
+          <a:p>
+            <a:r>
+              <a:rPr lang="de-DE" dirty="0">
+                <a:hlinkClick r:id="rId5"/>
+              </a:rPr>
+              <a:t>https://developer.mozilla.org/de/docs/Web/CSS</a:t>
+            </a:r>
+            <a:endParaRPr lang="de-DE" dirty="0"/>
+          </a:p>
+          <a:p>
+            <a:r>
+              <a:rPr lang="de-DE" dirty="0">
+                <a:hlinkClick r:id="rId6"/>
+              </a:rPr>
+              <a:t>https://devdocs.io/</a:t>
+            </a:r>
+            <a:endParaRPr lang="de-DE" dirty="0"/>
+          </a:p>
+          <a:p>
+            <a:endParaRPr lang="de-DE" dirty="0"/>
+          </a:p>
+        </p:txBody>
+      </p:sp>
+    </p:spTree>
+    <p:extLst>
+      <p:ext uri="{BB962C8B-B14F-4D97-AF65-F5344CB8AC3E}">
+        <p14:creationId xmlns:p14="http://schemas.microsoft.com/office/powerpoint/2010/main" val="2129769489"/>
       </p:ext>
     </p:extLst>
   </p:cSld>

</xml_diff>

<commit_message>
css Flexbox zur PowerPoint Präsentation hinzugefügt.
</commit_message>
<xml_diff>
--- a/html Schulung.pptx
+++ b/html Schulung.pptx
@@ -5,7 +5,7 @@
     <p:sldMasterId id="2147483660" r:id="rId1"/>
   </p:sldMasterIdLst>
   <p:notesMasterIdLst>
-    <p:notesMasterId r:id="rId77"/>
+    <p:notesMasterId r:id="rId81"/>
   </p:notesMasterIdLst>
   <p:sldIdLst>
     <p:sldId id="256" r:id="rId2"/>
@@ -80,9 +80,13 @@
     <p:sldId id="326" r:id="rId71"/>
     <p:sldId id="327" r:id="rId72"/>
     <p:sldId id="328" r:id="rId73"/>
-    <p:sldId id="329" r:id="rId74"/>
-    <p:sldId id="330" r:id="rId75"/>
-    <p:sldId id="264" r:id="rId76"/>
+    <p:sldId id="331" r:id="rId74"/>
+    <p:sldId id="332" r:id="rId75"/>
+    <p:sldId id="333" r:id="rId76"/>
+    <p:sldId id="334" r:id="rId77"/>
+    <p:sldId id="329" r:id="rId78"/>
+    <p:sldId id="330" r:id="rId79"/>
+    <p:sldId id="264" r:id="rId80"/>
   </p:sldIdLst>
   <p:sldSz cx="12192000" cy="6858000"/>
   <p:notesSz cx="6858000" cy="9144000"/>
@@ -23320,12 +23324,14 @@
         </p:nvSpPr>
         <p:spPr>
           <a:xfrm>
-            <a:off x="680321" y="2336873"/>
-            <a:ext cx="9613861" cy="3599316"/>
+            <a:off x="680321" y="2336872"/>
+            <a:ext cx="9613861" cy="4155368"/>
           </a:xfrm>
         </p:spPr>
         <p:txBody>
-          <a:bodyPr/>
+          <a:bodyPr>
+            <a:normAutofit/>
+          </a:bodyPr>
           <a:lstStyle/>
           <a:p>
             <a:r>
@@ -23397,6 +23403,29 @@
             </a:r>
           </a:p>
           <a:p>
+            <a:endParaRPr lang="en-US" dirty="0"/>
+          </a:p>
+          <a:p>
+            <a:endParaRPr lang="en-US" dirty="0"/>
+          </a:p>
+          <a:p>
+            <a:endParaRPr lang="en-US" dirty="0"/>
+          </a:p>
+          <a:p>
+            <a:endParaRPr lang="en-US" dirty="0"/>
+          </a:p>
+          <a:p>
+            <a:endParaRPr lang="en-US" dirty="0">
+              <a:hlinkClick r:id="rId2"/>
+            </a:endParaRPr>
+          </a:p>
+          <a:p>
+            <a:r>
+              <a:rPr lang="en-US" dirty="0">
+                <a:hlinkClick r:id="rId2"/>
+              </a:rPr>
+              <a:t>https://css-tricks.com/snippets/css/a-guide-to-flexbox/</a:t>
+            </a:r>
             <a:endParaRPr lang="en-US" dirty="0"/>
           </a:p>
         </p:txBody>
@@ -23416,7 +23445,7 @@
           <p:nvPr/>
         </p:nvPicPr>
         <p:blipFill>
-          <a:blip r:embed="rId2">
+          <a:blip r:embed="rId3">
             <a:extLst>
               <a:ext uri="{28A0092B-C50C-407E-A947-70E740481C1C}">
                 <a14:useLocalDpi xmlns:a14="http://schemas.microsoft.com/office/drawing/2010/main" val="0"/>
@@ -23430,7 +23459,7 @@
         </p:blipFill>
         <p:spPr bwMode="auto">
           <a:xfrm>
-            <a:off x="995680" y="4285189"/>
+            <a:off x="995680" y="3858469"/>
             <a:ext cx="4089400" cy="1651000"/>
           </a:xfrm>
           <a:prstGeom prst="rect">
@@ -23463,7 +23492,7 @@
           <p:nvPr/>
         </p:nvPicPr>
         <p:blipFill>
-          <a:blip r:embed="rId3">
+          <a:blip r:embed="rId4">
             <a:extLst>
               <a:ext uri="{28A0092B-C50C-407E-A947-70E740481C1C}">
                 <a14:useLocalDpi xmlns:a14="http://schemas.microsoft.com/office/drawing/2010/main" val="0"/>
@@ -23477,7 +23506,7 @@
         </p:blipFill>
         <p:spPr bwMode="auto">
           <a:xfrm>
-            <a:off x="5625881" y="4285189"/>
+            <a:off x="5625881" y="3858469"/>
             <a:ext cx="4127500" cy="1651000"/>
           </a:xfrm>
           <a:prstGeom prst="rect">
@@ -23671,7 +23700,7 @@
           <a:p>
             <a:r>
               <a:rPr lang="en-US" dirty="0"/>
-              <a:t>Flexbox</a:t>
+              <a:t>Flexbox: Container Properties</a:t>
             </a:r>
           </a:p>
         </p:txBody>
@@ -23694,7 +23723,9 @@
         </p:nvSpPr>
         <p:spPr/>
         <p:txBody>
-          <a:bodyPr/>
+          <a:bodyPr>
+            <a:normAutofit/>
+          </a:bodyPr>
           <a:lstStyle/>
           <a:p>
             <a:pPr marL="0" indent="0">
@@ -23722,6 +23753,22 @@
             <a:r>
               <a:rPr lang="en-US" dirty="0"/>
               <a:t>flex-direction: row</a:t>
+            </a:r>
+          </a:p>
+          <a:p>
+            <a:endParaRPr lang="en-US" dirty="0"/>
+          </a:p>
+          <a:p>
+            <a:r>
+              <a:rPr lang="en-US" dirty="0"/>
+              <a:t>display: flex</a:t>
+            </a:r>
+            <a:br>
+              <a:rPr lang="en-US" dirty="0"/>
+            </a:br>
+            <a:r>
+              <a:rPr lang="en-US" dirty="0"/>
+              <a:t>flex-direction: column</a:t>
             </a:r>
             <a:br>
               <a:rPr lang="en-US" dirty="0"/>
@@ -23733,6 +23780,315 @@
           </a:p>
         </p:txBody>
       </p:sp>
+      <p:pic>
+        <p:nvPicPr>
+          <p:cNvPr id="5" name="Picture 4">
+            <a:extLst>
+              <a:ext uri="{FF2B5EF4-FFF2-40B4-BE49-F238E27FC236}">
+                <a16:creationId xmlns:a16="http://schemas.microsoft.com/office/drawing/2014/main" id="{331F4FB1-BD65-794F-A2A4-9C7DCC6A016A}"/>
+              </a:ext>
+            </a:extLst>
+          </p:cNvPr>
+          <p:cNvPicPr>
+            <a:picLocks noChangeAspect="1"/>
+          </p:cNvPicPr>
+          <p:nvPr/>
+        </p:nvPicPr>
+        <p:blipFill>
+          <a:blip r:embed="rId2"/>
+          <a:stretch>
+            <a:fillRect/>
+          </a:stretch>
+        </p:blipFill>
+        <p:spPr>
+          <a:xfrm>
+            <a:off x="5121911" y="3262995"/>
+            <a:ext cx="2325370" cy="802416"/>
+          </a:xfrm>
+          <a:prstGeom prst="rect">
+            <a:avLst/>
+          </a:prstGeom>
+        </p:spPr>
+      </p:pic>
+      <p:pic>
+        <p:nvPicPr>
+          <p:cNvPr id="7" name="Picture 6">
+            <a:extLst>
+              <a:ext uri="{FF2B5EF4-FFF2-40B4-BE49-F238E27FC236}">
+                <a16:creationId xmlns:a16="http://schemas.microsoft.com/office/drawing/2014/main" id="{6C055FDB-A237-A04D-9D96-AAAE8A710F5E}"/>
+              </a:ext>
+            </a:extLst>
+          </p:cNvPr>
+          <p:cNvPicPr>
+            <a:picLocks noChangeAspect="1"/>
+          </p:cNvPicPr>
+          <p:nvPr/>
+        </p:nvPicPr>
+        <p:blipFill>
+          <a:blip r:embed="rId3"/>
+          <a:stretch>
+            <a:fillRect/>
+          </a:stretch>
+        </p:blipFill>
+        <p:spPr>
+          <a:xfrm>
+            <a:off x="5121911" y="4592320"/>
+            <a:ext cx="795387" cy="2062762"/>
+          </a:xfrm>
+          <a:prstGeom prst="rect">
+            <a:avLst/>
+          </a:prstGeom>
+        </p:spPr>
+      </p:pic>
+      <p:cxnSp>
+        <p:nvCxnSpPr>
+          <p:cNvPr id="8" name="Gerade Verbindung mit Pfeil 4">
+            <a:extLst>
+              <a:ext uri="{FF2B5EF4-FFF2-40B4-BE49-F238E27FC236}">
+                <a16:creationId xmlns:a16="http://schemas.microsoft.com/office/drawing/2014/main" id="{1F00EADD-DAA7-1140-97BA-C7C1B31FA401}"/>
+              </a:ext>
+            </a:extLst>
+          </p:cNvPr>
+          <p:cNvCxnSpPr>
+            <a:cxnSpLocks/>
+          </p:cNvCxnSpPr>
+          <p:nvPr/>
+        </p:nvCxnSpPr>
+        <p:spPr>
+          <a:xfrm>
+            <a:off x="5121911" y="3013888"/>
+            <a:ext cx="2325370" cy="0"/>
+          </a:xfrm>
+          <a:prstGeom prst="straightConnector1">
+            <a:avLst/>
+          </a:prstGeom>
+          <a:ln w="38100">
+            <a:solidFill>
+              <a:schemeClr val="bg1"/>
+            </a:solidFill>
+            <a:tailEnd type="triangle"/>
+          </a:ln>
+        </p:spPr>
+        <p:style>
+          <a:lnRef idx="1">
+            <a:schemeClr val="dk1"/>
+          </a:lnRef>
+          <a:fillRef idx="0">
+            <a:schemeClr val="dk1"/>
+          </a:fillRef>
+          <a:effectRef idx="0">
+            <a:schemeClr val="dk1"/>
+          </a:effectRef>
+          <a:fontRef idx="minor">
+            <a:schemeClr val="tx1"/>
+          </a:fontRef>
+        </p:style>
+      </p:cxnSp>
+      <p:cxnSp>
+        <p:nvCxnSpPr>
+          <p:cNvPr id="11" name="Gerade Verbindung mit Pfeil 4">
+            <a:extLst>
+              <a:ext uri="{FF2B5EF4-FFF2-40B4-BE49-F238E27FC236}">
+                <a16:creationId xmlns:a16="http://schemas.microsoft.com/office/drawing/2014/main" id="{9E402FAE-9134-7546-A13F-E01C99F32342}"/>
+              </a:ext>
+            </a:extLst>
+          </p:cNvPr>
+          <p:cNvCxnSpPr>
+            <a:cxnSpLocks/>
+          </p:cNvCxnSpPr>
+          <p:nvPr/>
+        </p:nvCxnSpPr>
+        <p:spPr>
+          <a:xfrm>
+            <a:off x="7915911" y="3283315"/>
+            <a:ext cx="0" cy="802416"/>
+          </a:xfrm>
+          <a:prstGeom prst="straightConnector1">
+            <a:avLst/>
+          </a:prstGeom>
+          <a:ln w="38100">
+            <a:solidFill>
+              <a:schemeClr val="bg1"/>
+            </a:solidFill>
+            <a:tailEnd type="triangle"/>
+          </a:ln>
+        </p:spPr>
+        <p:style>
+          <a:lnRef idx="1">
+            <a:schemeClr val="dk1"/>
+          </a:lnRef>
+          <a:fillRef idx="0">
+            <a:schemeClr val="dk1"/>
+          </a:fillRef>
+          <a:effectRef idx="0">
+            <a:schemeClr val="dk1"/>
+          </a:effectRef>
+          <a:fontRef idx="minor">
+            <a:schemeClr val="tx1"/>
+          </a:fontRef>
+        </p:style>
+      </p:cxnSp>
+      <p:sp>
+        <p:nvSpPr>
+          <p:cNvPr id="13" name="TextBox 12">
+            <a:extLst>
+              <a:ext uri="{FF2B5EF4-FFF2-40B4-BE49-F238E27FC236}">
+                <a16:creationId xmlns:a16="http://schemas.microsoft.com/office/drawing/2014/main" id="{A133A867-7602-5E47-AE28-450B838CB9D0}"/>
+              </a:ext>
+            </a:extLst>
+          </p:cNvPr>
+          <p:cNvSpPr txBox="1"/>
+          <p:nvPr/>
+        </p:nvSpPr>
+        <p:spPr>
+          <a:xfrm>
+            <a:off x="5628640" y="2624694"/>
+            <a:ext cx="1156086" cy="369332"/>
+          </a:xfrm>
+          <a:prstGeom prst="rect">
+            <a:avLst/>
+          </a:prstGeom>
+          <a:noFill/>
+        </p:spPr>
+        <p:txBody>
+          <a:bodyPr wrap="none" rtlCol="0">
+            <a:spAutoFit/>
+          </a:bodyPr>
+          <a:lstStyle/>
+          <a:p>
+            <a:r>
+              <a:rPr lang="en-US" dirty="0">
+                <a:solidFill>
+                  <a:schemeClr val="bg1"/>
+                </a:solidFill>
+              </a:rPr>
+              <a:t>main axis</a:t>
+            </a:r>
+          </a:p>
+        </p:txBody>
+      </p:sp>
+      <p:sp>
+        <p:nvSpPr>
+          <p:cNvPr id="14" name="TextBox 13">
+            <a:extLst>
+              <a:ext uri="{FF2B5EF4-FFF2-40B4-BE49-F238E27FC236}">
+                <a16:creationId xmlns:a16="http://schemas.microsoft.com/office/drawing/2014/main" id="{2DC0F2B5-E421-6A40-9F1F-741F0ECD5FF4}"/>
+              </a:ext>
+            </a:extLst>
+          </p:cNvPr>
+          <p:cNvSpPr txBox="1"/>
+          <p:nvPr/>
+        </p:nvSpPr>
+        <p:spPr>
+          <a:xfrm>
+            <a:off x="7915911" y="3429000"/>
+            <a:ext cx="1162498" cy="369332"/>
+          </a:xfrm>
+          <a:prstGeom prst="rect">
+            <a:avLst/>
+          </a:prstGeom>
+          <a:noFill/>
+        </p:spPr>
+        <p:txBody>
+          <a:bodyPr wrap="none" rtlCol="0">
+            <a:spAutoFit/>
+          </a:bodyPr>
+          <a:lstStyle/>
+          <a:p>
+            <a:r>
+              <a:rPr lang="en-US" dirty="0">
+                <a:solidFill>
+                  <a:schemeClr val="bg1"/>
+                </a:solidFill>
+              </a:rPr>
+              <a:t>cross axis</a:t>
+            </a:r>
+          </a:p>
+        </p:txBody>
+      </p:sp>
+      <p:sp>
+        <p:nvSpPr>
+          <p:cNvPr id="15" name="TextBox 14">
+            <a:extLst>
+              <a:ext uri="{FF2B5EF4-FFF2-40B4-BE49-F238E27FC236}">
+                <a16:creationId xmlns:a16="http://schemas.microsoft.com/office/drawing/2014/main" id="{14EF4F61-D1CA-4F4F-9323-BCCDC85B9E0D}"/>
+              </a:ext>
+            </a:extLst>
+          </p:cNvPr>
+          <p:cNvSpPr txBox="1"/>
+          <p:nvPr/>
+        </p:nvSpPr>
+        <p:spPr>
+          <a:xfrm>
+            <a:off x="6206683" y="5443656"/>
+            <a:ext cx="1156086" cy="369332"/>
+          </a:xfrm>
+          <a:prstGeom prst="rect">
+            <a:avLst/>
+          </a:prstGeom>
+          <a:noFill/>
+        </p:spPr>
+        <p:txBody>
+          <a:bodyPr wrap="none" rtlCol="0">
+            <a:spAutoFit/>
+          </a:bodyPr>
+          <a:lstStyle/>
+          <a:p>
+            <a:r>
+              <a:rPr lang="en-US" dirty="0">
+                <a:solidFill>
+                  <a:schemeClr val="bg1"/>
+                </a:solidFill>
+              </a:rPr>
+              <a:t>main axis</a:t>
+            </a:r>
+          </a:p>
+        </p:txBody>
+      </p:sp>
+      <p:cxnSp>
+        <p:nvCxnSpPr>
+          <p:cNvPr id="16" name="Gerade Verbindung mit Pfeil 4">
+            <a:extLst>
+              <a:ext uri="{FF2B5EF4-FFF2-40B4-BE49-F238E27FC236}">
+                <a16:creationId xmlns:a16="http://schemas.microsoft.com/office/drawing/2014/main" id="{7A6E02A8-197B-8C42-ADBD-F531DC253A35}"/>
+              </a:ext>
+            </a:extLst>
+          </p:cNvPr>
+          <p:cNvCxnSpPr>
+            <a:cxnSpLocks/>
+          </p:cNvCxnSpPr>
+          <p:nvPr/>
+        </p:nvCxnSpPr>
+        <p:spPr>
+          <a:xfrm>
+            <a:off x="6107431" y="4589706"/>
+            <a:ext cx="0" cy="2065376"/>
+          </a:xfrm>
+          <a:prstGeom prst="straightConnector1">
+            <a:avLst/>
+          </a:prstGeom>
+          <a:ln w="38100">
+            <a:solidFill>
+              <a:schemeClr val="bg1"/>
+            </a:solidFill>
+            <a:tailEnd type="triangle"/>
+          </a:ln>
+        </p:spPr>
+        <p:style>
+          <a:lnRef idx="1">
+            <a:schemeClr val="dk1"/>
+          </a:lnRef>
+          <a:fillRef idx="0">
+            <a:schemeClr val="dk1"/>
+          </a:fillRef>
+          <a:effectRef idx="0">
+            <a:schemeClr val="dk1"/>
+          </a:effectRef>
+          <a:fontRef idx="minor">
+            <a:schemeClr val="tx1"/>
+          </a:fontRef>
+        </p:style>
+      </p:cxnSp>
     </p:spTree>
     <p:extLst>
       <p:ext uri="{BB962C8B-B14F-4D97-AF65-F5344CB8AC3E}">
@@ -23784,7 +24140,10 @@
           <a:bodyPr/>
           <a:lstStyle/>
           <a:p>
-            <a:endParaRPr lang="en-US"/>
+            <a:r>
+              <a:rPr lang="en-US" dirty="0"/>
+              <a:t>Flexbox: Container Properties</a:t>
+            </a:r>
           </a:p>
         </p:txBody>
       </p:sp>
@@ -23809,7 +24168,144 @@
           <a:bodyPr/>
           <a:lstStyle/>
           <a:p>
-            <a:endParaRPr lang="en-US"/>
+            <a:r>
+              <a:rPr lang="en-US" dirty="0">
+                <a:solidFill>
+                  <a:schemeClr val="bg1"/>
+                </a:solidFill>
+              </a:rPr>
+              <a:t>flex-wrap</a:t>
+            </a:r>
+            <a:r>
+              <a:rPr lang="en-US" dirty="0"/>
+              <a:t>: </a:t>
+            </a:r>
+            <a:r>
+              <a:rPr lang="en-US" dirty="0" err="1"/>
+              <a:t>versucht</a:t>
+            </a:r>
+            <a:r>
+              <a:rPr lang="en-US" dirty="0"/>
+              <a:t> </a:t>
+            </a:r>
+            <a:r>
+              <a:rPr lang="en-US" dirty="0" err="1"/>
+              <a:t>alle</a:t>
+            </a:r>
+            <a:r>
+              <a:rPr lang="en-US" dirty="0"/>
+              <a:t> Items in </a:t>
+            </a:r>
+            <a:r>
+              <a:rPr lang="en-US" dirty="0" err="1"/>
+              <a:t>eine</a:t>
+            </a:r>
+            <a:r>
+              <a:rPr lang="en-US" dirty="0"/>
+              <a:t> </a:t>
+            </a:r>
+            <a:r>
+              <a:rPr lang="en-US" dirty="0" err="1"/>
+              <a:t>Zeile</a:t>
+            </a:r>
+            <a:r>
+              <a:rPr lang="en-US" dirty="0"/>
+              <a:t> </a:t>
+            </a:r>
+            <a:r>
+              <a:rPr lang="en-US" dirty="0" err="1"/>
+              <a:t>zu</a:t>
+            </a:r>
+            <a:r>
+              <a:rPr lang="en-US" dirty="0"/>
+              <a:t> </a:t>
+            </a:r>
+            <a:r>
+              <a:rPr lang="en-US" dirty="0" err="1"/>
+              <a:t>packen</a:t>
+            </a:r>
+            <a:br>
+              <a:rPr lang="en-US" dirty="0"/>
+            </a:br>
+            <a:br>
+              <a:rPr lang="en-US" dirty="0"/>
+            </a:br>
+            <a:r>
+              <a:rPr lang="en-US" dirty="0"/>
+              <a:t>flex-wrap: </a:t>
+            </a:r>
+            <a:r>
+              <a:rPr lang="en-US" dirty="0" err="1"/>
+              <a:t>nowrap</a:t>
+            </a:r>
+            <a:r>
+              <a:rPr lang="en-US" dirty="0"/>
+              <a:t> | wrap | wrap-reverse</a:t>
+            </a:r>
+            <a:br>
+              <a:rPr lang="en-US" dirty="0"/>
+            </a:br>
+            <a:br>
+              <a:rPr lang="en-US" dirty="0"/>
+            </a:br>
+            <a:endParaRPr lang="en-US" dirty="0"/>
+          </a:p>
+          <a:p>
+            <a:r>
+              <a:rPr lang="en-US" dirty="0">
+                <a:solidFill>
+                  <a:schemeClr val="bg1"/>
+                </a:solidFill>
+              </a:rPr>
+              <a:t>flex-flow</a:t>
+            </a:r>
+            <a:r>
+              <a:rPr lang="en-US" dirty="0"/>
+              <a:t>:</a:t>
+            </a:r>
+            <a:r>
+              <a:rPr lang="en-US" b="1" dirty="0"/>
+              <a:t> </a:t>
+            </a:r>
+            <a:r>
+              <a:rPr lang="en-US" dirty="0" err="1"/>
+              <a:t>ist</a:t>
+            </a:r>
+            <a:r>
+              <a:rPr lang="en-US" dirty="0"/>
+              <a:t> </a:t>
+            </a:r>
+            <a:r>
+              <a:rPr lang="en-US" dirty="0" err="1"/>
+              <a:t>ein</a:t>
+            </a:r>
+            <a:r>
+              <a:rPr lang="en-US" dirty="0"/>
+              <a:t> shorthand </a:t>
+            </a:r>
+            <a:r>
+              <a:rPr lang="en-US" dirty="0" err="1"/>
+              <a:t>für</a:t>
+            </a:r>
+            <a:r>
+              <a:rPr lang="en-US" dirty="0"/>
+              <a:t> flex-direction und flex-wrap</a:t>
+            </a:r>
+            <a:br>
+              <a:rPr lang="en-US" dirty="0"/>
+            </a:br>
+            <a:br>
+              <a:rPr lang="en-US" dirty="0"/>
+            </a:br>
+            <a:r>
+              <a:rPr lang="en-US" dirty="0"/>
+              <a:t>flex-flow: row </a:t>
+            </a:r>
+            <a:r>
+              <a:rPr lang="en-US" dirty="0" err="1"/>
+              <a:t>nowrap</a:t>
+            </a:r>
+            <a:endParaRPr lang="en-US" dirty="0"/>
           </a:p>
         </p:txBody>
       </p:sp>
@@ -23859,12 +24355,20 @@
             <p:ph type="title"/>
           </p:nvPr>
         </p:nvSpPr>
-        <p:spPr/>
+        <p:spPr>
+          <a:xfrm>
+            <a:off x="680321" y="753228"/>
+            <a:ext cx="9613861" cy="1080938"/>
+          </a:xfrm>
+        </p:spPr>
         <p:txBody>
           <a:bodyPr/>
           <a:lstStyle/>
           <a:p>
-            <a:endParaRPr lang="en-US"/>
+            <a:r>
+              <a:rPr lang="en-US" dirty="0"/>
+              <a:t>Flexbox: Container Properties</a:t>
+            </a:r>
           </a:p>
         </p:txBody>
       </p:sp>
@@ -23886,10 +24390,364 @@
         </p:nvSpPr>
         <p:spPr/>
         <p:txBody>
-          <a:bodyPr/>
+          <a:bodyPr>
+            <a:normAutofit fontScale="92500" lnSpcReduction="10000"/>
+          </a:bodyPr>
           <a:lstStyle/>
           <a:p>
-            <a:endParaRPr lang="en-US"/>
+            <a:r>
+              <a:rPr lang="en-US" dirty="0">
+                <a:solidFill>
+                  <a:schemeClr val="bg1"/>
+                </a:solidFill>
+              </a:rPr>
+              <a:t>justify-content</a:t>
+            </a:r>
+            <a:r>
+              <a:rPr lang="en-US" dirty="0"/>
+              <a:t>: </a:t>
+            </a:r>
+            <a:r>
+              <a:rPr lang="en-US" dirty="0" err="1"/>
+              <a:t>Wie</a:t>
+            </a:r>
+            <a:r>
+              <a:rPr lang="en-US" dirty="0"/>
+              <a:t> </a:t>
+            </a:r>
+            <a:r>
+              <a:rPr lang="en-US" dirty="0" err="1"/>
+              <a:t>wird</a:t>
+            </a:r>
+            <a:r>
+              <a:rPr lang="en-US" dirty="0"/>
+              <a:t> extra </a:t>
+            </a:r>
+            <a:r>
+              <a:rPr lang="en-US" dirty="0" err="1"/>
+              <a:t>freier</a:t>
+            </a:r>
+            <a:r>
+              <a:rPr lang="en-US" dirty="0"/>
+              <a:t> Platz </a:t>
+            </a:r>
+            <a:r>
+              <a:rPr lang="en-US" dirty="0" err="1"/>
+              <a:t>zwischen</a:t>
+            </a:r>
+            <a:r>
+              <a:rPr lang="en-US" dirty="0"/>
+              <a:t> den Items </a:t>
+            </a:r>
+            <a:r>
+              <a:rPr lang="en-US" dirty="0" err="1"/>
+              <a:t>entlang</a:t>
+            </a:r>
+            <a:r>
+              <a:rPr lang="en-US" dirty="0"/>
+              <a:t> der </a:t>
+            </a:r>
+            <a:r>
+              <a:rPr lang="en-US" b="1" dirty="0"/>
+              <a:t>main-axis</a:t>
+            </a:r>
+            <a:r>
+              <a:rPr lang="en-US" dirty="0"/>
+              <a:t> </a:t>
+            </a:r>
+            <a:r>
+              <a:rPr lang="en-US" dirty="0" err="1"/>
+              <a:t>verteilt</a:t>
+            </a:r>
+            <a:r>
+              <a:rPr lang="en-US" dirty="0"/>
+              <a:t>.</a:t>
+            </a:r>
+            <a:br>
+              <a:rPr lang="en-US" dirty="0"/>
+            </a:br>
+            <a:r>
+              <a:rPr lang="en-US" sz="1800" dirty="0">
+                <a:latin typeface="Arial" panose="020B0604020202020204" pitchFamily="34" charset="0"/>
+                <a:cs typeface="Arial" panose="020B0604020202020204" pitchFamily="34" charset="0"/>
+              </a:rPr>
+              <a:t>justify-content: flex-start | flex-end | center | space-between | space-around | space-evenly</a:t>
+            </a:r>
+            <a:br>
+              <a:rPr lang="en-US" b="1" dirty="0"/>
+            </a:br>
+            <a:endParaRPr lang="en-US" dirty="0"/>
+          </a:p>
+          <a:p>
+            <a:r>
+              <a:rPr lang="en-US" dirty="0">
+                <a:solidFill>
+                  <a:schemeClr val="bg1"/>
+                </a:solidFill>
+              </a:rPr>
+              <a:t>align-items</a:t>
+            </a:r>
+            <a:r>
+              <a:rPr lang="en-US" b="1" dirty="0"/>
+              <a:t>: </a:t>
+            </a:r>
+            <a:r>
+              <a:rPr lang="en-US" dirty="0" err="1"/>
+              <a:t>Wie</a:t>
+            </a:r>
+            <a:r>
+              <a:rPr lang="en-US" dirty="0"/>
+              <a:t> </a:t>
+            </a:r>
+            <a:r>
+              <a:rPr lang="en-US" dirty="0" err="1"/>
+              <a:t>wird</a:t>
+            </a:r>
+            <a:r>
+              <a:rPr lang="en-US" dirty="0"/>
+              <a:t> extra </a:t>
+            </a:r>
+            <a:r>
+              <a:rPr lang="en-US" dirty="0" err="1"/>
+              <a:t>freier</a:t>
+            </a:r>
+            <a:r>
+              <a:rPr lang="en-US" dirty="0"/>
+              <a:t> Platz </a:t>
+            </a:r>
+            <a:r>
+              <a:rPr lang="en-US" dirty="0" err="1"/>
+              <a:t>zwischen</a:t>
+            </a:r>
+            <a:r>
+              <a:rPr lang="en-US" dirty="0"/>
+              <a:t> den Items </a:t>
+            </a:r>
+            <a:r>
+              <a:rPr lang="en-US" dirty="0" err="1"/>
+              <a:t>entlang</a:t>
+            </a:r>
+            <a:r>
+              <a:rPr lang="en-US" dirty="0"/>
+              <a:t> der </a:t>
+            </a:r>
+            <a:r>
+              <a:rPr lang="en-US" b="1" dirty="0"/>
+              <a:t>cross-axis</a:t>
+            </a:r>
+            <a:r>
+              <a:rPr lang="en-US" dirty="0"/>
+              <a:t> </a:t>
+            </a:r>
+            <a:r>
+              <a:rPr lang="en-US" dirty="0" err="1"/>
+              <a:t>verteilt</a:t>
+            </a:r>
+            <a:r>
+              <a:rPr lang="en-US" dirty="0"/>
+              <a:t>.</a:t>
+            </a:r>
+            <a:br>
+              <a:rPr lang="en-US" b="1" dirty="0"/>
+            </a:br>
+            <a:r>
+              <a:rPr lang="en-US" sz="1800" dirty="0">
+                <a:latin typeface="Arial" panose="020B0604020202020204" pitchFamily="34" charset="0"/>
+                <a:cs typeface="Arial" panose="020B0604020202020204" pitchFamily="34" charset="0"/>
+              </a:rPr>
+              <a:t>align-items: stretch | flex-start | flex-end | center | baseline</a:t>
+            </a:r>
+            <a:br>
+              <a:rPr lang="en-US" sz="1800" dirty="0">
+                <a:latin typeface="Arial" panose="020B0604020202020204" pitchFamily="34" charset="0"/>
+                <a:cs typeface="Arial" panose="020B0604020202020204" pitchFamily="34" charset="0"/>
+              </a:rPr>
+            </a:br>
+            <a:endParaRPr lang="en-US" sz="1800" dirty="0">
+              <a:latin typeface="Arial" panose="020B0604020202020204" pitchFamily="34" charset="0"/>
+              <a:cs typeface="Arial" panose="020B0604020202020204" pitchFamily="34" charset="0"/>
+            </a:endParaRPr>
+          </a:p>
+          <a:p>
+            <a:r>
+              <a:rPr lang="en-US" dirty="0">
+                <a:solidFill>
+                  <a:schemeClr val="bg1"/>
+                </a:solidFill>
+              </a:rPr>
+              <a:t>align-content</a:t>
+            </a:r>
+            <a:r>
+              <a:rPr lang="en-US" b="1" dirty="0"/>
+              <a:t>: </a:t>
+            </a:r>
+            <a:r>
+              <a:rPr lang="en-US" dirty="0" err="1"/>
+              <a:t>Kommt</a:t>
+            </a:r>
+            <a:r>
+              <a:rPr lang="en-US" b="1" dirty="0"/>
+              <a:t> </a:t>
+            </a:r>
+            <a:r>
+              <a:rPr lang="en-US" dirty="0" err="1"/>
+              <a:t>nur</a:t>
+            </a:r>
+            <a:r>
+              <a:rPr lang="en-US" dirty="0"/>
+              <a:t> </a:t>
+            </a:r>
+            <a:r>
+              <a:rPr lang="en-US" dirty="0" err="1"/>
+              <a:t>zum</a:t>
+            </a:r>
+            <a:r>
+              <a:rPr lang="en-US" dirty="0"/>
+              <a:t> </a:t>
+            </a:r>
+            <a:r>
+              <a:rPr lang="en-US" dirty="0" err="1"/>
+              <a:t>tragen</a:t>
+            </a:r>
+            <a:r>
+              <a:rPr lang="en-US" dirty="0"/>
+              <a:t>, </a:t>
+            </a:r>
+            <a:r>
+              <a:rPr lang="en-US" dirty="0" err="1"/>
+              <a:t>wenn</a:t>
+            </a:r>
+            <a:r>
+              <a:rPr lang="en-US" dirty="0"/>
+              <a:t> </a:t>
+            </a:r>
+            <a:r>
+              <a:rPr lang="en-US" dirty="0" err="1"/>
+              <a:t>es</a:t>
+            </a:r>
+            <a:r>
+              <a:rPr lang="en-US" dirty="0"/>
+              <a:t> </a:t>
+            </a:r>
+            <a:r>
+              <a:rPr lang="en-US" dirty="0" err="1"/>
+              <a:t>mehr</a:t>
+            </a:r>
+            <a:r>
+              <a:rPr lang="en-US" dirty="0"/>
+              <a:t> </a:t>
+            </a:r>
+            <a:r>
+              <a:rPr lang="en-US" dirty="0" err="1"/>
+              <a:t>wie</a:t>
+            </a:r>
+            <a:r>
+              <a:rPr lang="en-US" dirty="0"/>
+              <a:t> </a:t>
+            </a:r>
+            <a:r>
+              <a:rPr lang="en-US" dirty="0" err="1"/>
+              <a:t>eine</a:t>
+            </a:r>
+            <a:r>
+              <a:rPr lang="en-US" dirty="0"/>
+              <a:t> </a:t>
+            </a:r>
+            <a:r>
+              <a:rPr lang="en-US" dirty="0" err="1"/>
+              <a:t>Zeile</a:t>
+            </a:r>
+            <a:r>
+              <a:rPr lang="en-US" dirty="0"/>
+              <a:t> Items hat. </a:t>
+            </a:r>
+            <a:r>
+              <a:rPr lang="en-US" dirty="0" err="1"/>
+              <a:t>Wie</a:t>
+            </a:r>
+            <a:r>
+              <a:rPr lang="en-US" dirty="0"/>
+              <a:t> </a:t>
+            </a:r>
+            <a:r>
+              <a:rPr lang="en-US" dirty="0" err="1"/>
+              <a:t>wird</a:t>
+            </a:r>
+            <a:r>
+              <a:rPr lang="en-US" dirty="0"/>
+              <a:t> extra </a:t>
+            </a:r>
+            <a:r>
+              <a:rPr lang="en-US" dirty="0" err="1"/>
+              <a:t>freier</a:t>
+            </a:r>
+            <a:r>
+              <a:rPr lang="en-US" dirty="0"/>
+              <a:t> Platz </a:t>
+            </a:r>
+            <a:r>
+              <a:rPr lang="en-US" dirty="0" err="1"/>
+              <a:t>entlang</a:t>
+            </a:r>
+            <a:r>
+              <a:rPr lang="en-US" dirty="0"/>
+              <a:t> der </a:t>
+            </a:r>
+            <a:r>
+              <a:rPr lang="en-US" b="1" dirty="0"/>
+              <a:t>cross-axis</a:t>
+            </a:r>
+            <a:r>
+              <a:rPr lang="en-US" dirty="0"/>
+              <a:t> </a:t>
+            </a:r>
+            <a:r>
+              <a:rPr lang="en-US" dirty="0" err="1"/>
+              <a:t>zwischen</a:t>
+            </a:r>
+            <a:r>
+              <a:rPr lang="en-US" dirty="0"/>
+              <a:t> den </a:t>
+            </a:r>
+            <a:r>
+              <a:rPr lang="en-US" dirty="0" err="1"/>
+              <a:t>Zeilen</a:t>
+            </a:r>
+            <a:r>
+              <a:rPr lang="en-US" dirty="0"/>
+              <a:t> </a:t>
+            </a:r>
+            <a:r>
+              <a:rPr lang="en-US" dirty="0" err="1"/>
+              <a:t>verteilt</a:t>
+            </a:r>
+            <a:r>
+              <a:rPr lang="en-US" dirty="0"/>
+              <a:t>.</a:t>
+            </a:r>
+            <a:br>
+              <a:rPr lang="en-US" b="1" dirty="0"/>
+            </a:br>
+            <a:r>
+              <a:rPr lang="en-US" sz="1800" dirty="0">
+                <a:latin typeface="Arial" panose="020B0604020202020204" pitchFamily="34" charset="0"/>
+                <a:cs typeface="Arial" panose="020B0604020202020204" pitchFamily="34" charset="0"/>
+              </a:rPr>
+              <a:t>align-content: stretch | flex-start | flex-end | center | space-between | space-around</a:t>
+            </a:r>
+            <a:br>
+              <a:rPr lang="en-US" sz="1800" b="1" dirty="0">
+                <a:latin typeface="Arial" panose="020B0604020202020204" pitchFamily="34" charset="0"/>
+                <a:cs typeface="Arial" panose="020B0604020202020204" pitchFamily="34" charset="0"/>
+              </a:rPr>
+            </a:br>
+            <a:endParaRPr lang="en-US" sz="1800" dirty="0">
+              <a:latin typeface="Arial" panose="020B0604020202020204" pitchFamily="34" charset="0"/>
+              <a:cs typeface="Arial" panose="020B0604020202020204" pitchFamily="34" charset="0"/>
+            </a:endParaRPr>
+          </a:p>
+          <a:p>
+            <a:endParaRPr lang="en-US" dirty="0"/>
           </a:p>
         </p:txBody>
       </p:sp>
@@ -23928,7 +24786,7 @@
           <p:cNvPr id="2" name="Title 1">
             <a:extLst>
               <a:ext uri="{FF2B5EF4-FFF2-40B4-BE49-F238E27FC236}">
-                <a16:creationId xmlns:a16="http://schemas.microsoft.com/office/drawing/2014/main" id="{BD12F5B6-1D4F-FC43-9C9B-58CB5B6D4246}"/>
+                <a16:creationId xmlns:a16="http://schemas.microsoft.com/office/drawing/2014/main" id="{51E96799-DB13-104C-822A-E2CBCB6F4EA1}"/>
               </a:ext>
             </a:extLst>
           </p:cNvPr>
@@ -23946,7 +24804,7 @@
           <a:p>
             <a:r>
               <a:rPr lang="en-US" dirty="0"/>
-              <a:t>Grid</a:t>
+              <a:t>Flexbox: Item Properties</a:t>
             </a:r>
           </a:p>
         </p:txBody>
@@ -23956,7 +24814,7 @@
           <p:cNvPr id="3" name="Content Placeholder 2">
             <a:extLst>
               <a:ext uri="{FF2B5EF4-FFF2-40B4-BE49-F238E27FC236}">
-                <a16:creationId xmlns:a16="http://schemas.microsoft.com/office/drawing/2014/main" id="{CC3FAD12-4AE5-964C-9563-4A3588BB2406}"/>
+                <a16:creationId xmlns:a16="http://schemas.microsoft.com/office/drawing/2014/main" id="{7619FD93-5A5D-2A40-BC02-1E1014F468FE}"/>
               </a:ext>
             </a:extLst>
           </p:cNvPr>
@@ -23969,12 +24827,46 @@
         </p:nvSpPr>
         <p:spPr/>
         <p:txBody>
-          <a:bodyPr/>
+          <a:bodyPr>
+            <a:normAutofit/>
+          </a:bodyPr>
           <a:lstStyle/>
           <a:p>
             <a:r>
+              <a:rPr lang="en-US" dirty="0">
+                <a:solidFill>
+                  <a:schemeClr val="bg1"/>
+                </a:solidFill>
+              </a:rPr>
+              <a:t>order</a:t>
+            </a:r>
+            <a:r>
               <a:rPr lang="en-US" dirty="0"/>
-              <a:t>Grid </a:t>
+              <a:t>: </a:t>
+            </a:r>
+            <a:r>
+              <a:rPr lang="en-US" dirty="0" err="1"/>
+              <a:t>Bestimmt</a:t>
+            </a:r>
+            <a:r>
+              <a:rPr lang="en-US" dirty="0"/>
+              <a:t> die </a:t>
+            </a:r>
+            <a:r>
+              <a:rPr lang="en-US" dirty="0" err="1"/>
+              <a:t>Reihenfolge</a:t>
+            </a:r>
+            <a:r>
+              <a:rPr lang="en-US" dirty="0"/>
+              <a:t> der Items. Default </a:t>
+            </a:r>
+            <a:r>
+              <a:rPr lang="en-US" dirty="0" err="1"/>
+              <a:t>mässig</a:t>
+            </a:r>
+            <a:r>
+              <a:rPr lang="en-US" dirty="0"/>
+              <a:t> </a:t>
             </a:r>
             <a:r>
               <a:rPr lang="en-US" dirty="0" err="1"/>
@@ -23986,32 +24878,145 @@
             </a:r>
             <a:r>
               <a:rPr lang="en-US" dirty="0" err="1"/>
-              <a:t>ein</a:t>
+              <a:t>bestimmt</a:t>
+            </a:r>
+            <a:r>
+              <a:rPr lang="en-US" dirty="0"/>
+              <a:t> das Markup die </a:t>
+            </a:r>
+            <a:r>
+              <a:rPr lang="en-US" dirty="0" err="1"/>
+              <a:t>Reihenfolge</a:t>
+            </a:r>
+            <a:r>
+              <a:rPr lang="en-US" dirty="0"/>
+              <a:t>.</a:t>
+            </a:r>
+            <a:br>
+              <a:rPr lang="en-US" dirty="0"/>
+            </a:br>
+            <a:r>
+              <a:rPr lang="en-US" sz="1900" dirty="0">
+                <a:latin typeface="Arial" panose="020B0604020202020204" pitchFamily="34" charset="0"/>
+                <a:cs typeface="Arial" panose="020B0604020202020204" pitchFamily="34" charset="0"/>
+              </a:rPr>
+              <a:t>order: 0</a:t>
+            </a:r>
+            <a:br>
+              <a:rPr lang="en-US" sz="1900" b="1" dirty="0">
+                <a:latin typeface="Arial" panose="020B0604020202020204" pitchFamily="34" charset="0"/>
+                <a:cs typeface="Arial" panose="020B0604020202020204" pitchFamily="34" charset="0"/>
+              </a:rPr>
+            </a:br>
+            <a:endParaRPr lang="en-US" sz="1900" dirty="0">
+              <a:latin typeface="Arial" panose="020B0604020202020204" pitchFamily="34" charset="0"/>
+              <a:cs typeface="Arial" panose="020B0604020202020204" pitchFamily="34" charset="0"/>
+            </a:endParaRPr>
+          </a:p>
+          <a:p>
+            <a:r>
+              <a:rPr lang="en-US" dirty="0">
+                <a:solidFill>
+                  <a:schemeClr val="bg1"/>
+                </a:solidFill>
+              </a:rPr>
+              <a:t>align-self</a:t>
+            </a:r>
+            <a:r>
+              <a:rPr lang="en-US" b="1" dirty="0"/>
+              <a:t>: </a:t>
+            </a:r>
+            <a:r>
+              <a:rPr lang="en-US" dirty="0" err="1"/>
+              <a:t>Damit</a:t>
             </a:r>
             <a:r>
               <a:rPr lang="en-US" dirty="0"/>
               <a:t> </a:t>
             </a:r>
             <a:r>
-              <a:rPr lang="en-US" b="1" dirty="0" err="1"/>
-              <a:t>zweidimensionales</a:t>
+              <a:rPr lang="en-US" dirty="0" err="1"/>
+              <a:t>kann</a:t>
             </a:r>
             <a:r>
               <a:rPr lang="en-US" dirty="0"/>
-              <a:t> </a:t>
+              <a:t> die </a:t>
             </a:r>
             <a:r>
               <a:rPr lang="en-US" dirty="0" err="1"/>
-              <a:t>Layoutmodell</a:t>
-            </a:r>
-            <a:endParaRPr lang="en-US" dirty="0"/>
+              <a:t>Eigenschaft</a:t>
+            </a:r>
+            <a:r>
+              <a:rPr lang="en-US" dirty="0"/>
+              <a:t> align-items </a:t>
+            </a:r>
+            <a:r>
+              <a:rPr lang="en-US" dirty="0" err="1"/>
+              <a:t>für</a:t>
+            </a:r>
+            <a:r>
+              <a:rPr lang="en-US" dirty="0"/>
+              <a:t> </a:t>
+            </a:r>
+            <a:r>
+              <a:rPr lang="en-US" dirty="0" err="1"/>
+              <a:t>ein</a:t>
+            </a:r>
+            <a:r>
+              <a:rPr lang="en-US" dirty="0"/>
+              <a:t> </a:t>
+            </a:r>
+            <a:r>
+              <a:rPr lang="en-US" dirty="0" err="1"/>
+              <a:t>einzelnens</a:t>
+            </a:r>
+            <a:r>
+              <a:rPr lang="en-US" dirty="0"/>
+              <a:t> Item </a:t>
+            </a:r>
+            <a:r>
+              <a:rPr lang="en-US" dirty="0" err="1"/>
+              <a:t>überschrieben</a:t>
+            </a:r>
+            <a:r>
+              <a:rPr lang="en-US" dirty="0"/>
+              <a:t> </a:t>
+            </a:r>
+            <a:r>
+              <a:rPr lang="en-US" dirty="0" err="1"/>
+              <a:t>werden</a:t>
+            </a:r>
+            <a:r>
+              <a:rPr lang="en-US" dirty="0"/>
+              <a:t>.</a:t>
+            </a:r>
+            <a:br>
+              <a:rPr lang="en-US" dirty="0"/>
+            </a:br>
+            <a:r>
+              <a:rPr lang="en-US" sz="1800" dirty="0">
+                <a:latin typeface="Arial" panose="020B0604020202020204" pitchFamily="34" charset="0"/>
+                <a:cs typeface="Arial" panose="020B0604020202020204" pitchFamily="34" charset="0"/>
+              </a:rPr>
+              <a:t>align-self: auto | flex-start | flex-end | center | baseline | stretch</a:t>
+            </a:r>
+            <a:br>
+              <a:rPr lang="en-US" sz="1800" dirty="0">
+                <a:latin typeface="Arial" panose="020B0604020202020204" pitchFamily="34" charset="0"/>
+                <a:cs typeface="Arial" panose="020B0604020202020204" pitchFamily="34" charset="0"/>
+              </a:rPr>
+            </a:br>
+            <a:endParaRPr lang="en-US" sz="1800" dirty="0">
+              <a:latin typeface="Arial" panose="020B0604020202020204" pitchFamily="34" charset="0"/>
+              <a:cs typeface="Arial" panose="020B0604020202020204" pitchFamily="34" charset="0"/>
+            </a:endParaRPr>
           </a:p>
         </p:txBody>
       </p:sp>
     </p:spTree>
     <p:extLst>
       <p:ext uri="{BB962C8B-B14F-4D97-AF65-F5344CB8AC3E}">
-        <p14:creationId xmlns:p14="http://schemas.microsoft.com/office/powerpoint/2010/main" val="80854726"/>
+        <p14:creationId xmlns:p14="http://schemas.microsoft.com/office/powerpoint/2010/main" val="417935865"/>
       </p:ext>
     </p:extLst>
   </p:cSld>
@@ -24043,6 +25048,613 @@
           <p:cNvPr id="2" name="Title 1">
             <a:extLst>
               <a:ext uri="{FF2B5EF4-FFF2-40B4-BE49-F238E27FC236}">
+                <a16:creationId xmlns:a16="http://schemas.microsoft.com/office/drawing/2014/main" id="{DB34CDB4-B9FE-4647-84E6-47601588F2D4}"/>
+              </a:ext>
+            </a:extLst>
+          </p:cNvPr>
+          <p:cNvSpPr>
+            <a:spLocks noGrp="1"/>
+          </p:cNvSpPr>
+          <p:nvPr>
+            <p:ph type="title"/>
+          </p:nvPr>
+        </p:nvSpPr>
+        <p:spPr/>
+        <p:txBody>
+          <a:bodyPr/>
+          <a:lstStyle/>
+          <a:p>
+            <a:endParaRPr lang="en-US"/>
+          </a:p>
+        </p:txBody>
+      </p:sp>
+      <p:sp>
+        <p:nvSpPr>
+          <p:cNvPr id="3" name="Content Placeholder 2">
+            <a:extLst>
+              <a:ext uri="{FF2B5EF4-FFF2-40B4-BE49-F238E27FC236}">
+                <a16:creationId xmlns:a16="http://schemas.microsoft.com/office/drawing/2014/main" id="{A31325E0-FBB0-0C41-82F0-3238A377AD0E}"/>
+              </a:ext>
+            </a:extLst>
+          </p:cNvPr>
+          <p:cNvSpPr>
+            <a:spLocks noGrp="1"/>
+          </p:cNvSpPr>
+          <p:nvPr>
+            <p:ph idx="1"/>
+          </p:nvPr>
+        </p:nvSpPr>
+        <p:spPr/>
+        <p:txBody>
+          <a:bodyPr/>
+          <a:lstStyle/>
+          <a:p>
+            <a:r>
+              <a:rPr lang="en-US" dirty="0">
+                <a:solidFill>
+                  <a:schemeClr val="bg1"/>
+                </a:solidFill>
+              </a:rPr>
+              <a:t>flex</a:t>
+            </a:r>
+            <a:r>
+              <a:rPr lang="en-US" b="1" dirty="0"/>
+              <a:t>: </a:t>
+            </a:r>
+            <a:r>
+              <a:rPr lang="en-US" dirty="0"/>
+              <a:t>Shorthand </a:t>
+            </a:r>
+            <a:r>
+              <a:rPr lang="en-US" dirty="0" err="1"/>
+              <a:t>für</a:t>
+            </a:r>
+            <a:r>
+              <a:rPr lang="en-US" dirty="0"/>
+              <a:t> </a:t>
+            </a:r>
+            <a:r>
+              <a:rPr lang="en-US" b="1" dirty="0"/>
+              <a:t>flex-basis</a:t>
+            </a:r>
+            <a:r>
+              <a:rPr lang="en-US" dirty="0"/>
+              <a:t>, </a:t>
+            </a:r>
+            <a:r>
+              <a:rPr lang="en-US" b="1" dirty="0"/>
+              <a:t>flex-grow</a:t>
+            </a:r>
+            <a:r>
+              <a:rPr lang="en-US" dirty="0"/>
+              <a:t> und </a:t>
+            </a:r>
+            <a:r>
+              <a:rPr lang="en-US" b="1" dirty="0"/>
+              <a:t>flex- shrink</a:t>
+            </a:r>
+            <a:r>
+              <a:rPr lang="en-US" dirty="0"/>
+              <a:t>.</a:t>
+            </a:r>
+            <a:br>
+              <a:rPr lang="en-US" dirty="0"/>
+            </a:br>
+            <a:r>
+              <a:rPr lang="en-US" dirty="0"/>
+              <a:t>flex: 0 1 auto;</a:t>
+            </a:r>
+            <a:br>
+              <a:rPr lang="en-US" dirty="0"/>
+            </a:br>
+            <a:br>
+              <a:rPr lang="en-US" dirty="0"/>
+            </a:br>
+            <a:r>
+              <a:rPr lang="en-US" dirty="0"/>
+              <a:t>- </a:t>
+            </a:r>
+            <a:r>
+              <a:rPr lang="en-US" dirty="0">
+                <a:solidFill>
+                  <a:schemeClr val="bg1"/>
+                </a:solidFill>
+              </a:rPr>
+              <a:t>flex-grow</a:t>
+            </a:r>
+            <a:r>
+              <a:rPr lang="en-US" dirty="0"/>
+              <a:t>: </a:t>
+            </a:r>
+            <a:r>
+              <a:rPr lang="en-US" dirty="0" err="1"/>
+              <a:t>Wie</a:t>
+            </a:r>
+            <a:r>
+              <a:rPr lang="en-US" dirty="0"/>
+              <a:t> </a:t>
+            </a:r>
+            <a:r>
+              <a:rPr lang="en-US" dirty="0" err="1"/>
+              <a:t>wächst</a:t>
+            </a:r>
+            <a:r>
+              <a:rPr lang="en-US" dirty="0"/>
+              <a:t> </a:t>
+            </a:r>
+            <a:r>
+              <a:rPr lang="en-US" dirty="0" err="1"/>
+              <a:t>ein</a:t>
+            </a:r>
+            <a:r>
+              <a:rPr lang="en-US" dirty="0"/>
+              <a:t> Item</a:t>
+            </a:r>
+            <a:br>
+              <a:rPr lang="en-US" dirty="0"/>
+            </a:br>
+            <a:br>
+              <a:rPr lang="en-US" dirty="0"/>
+            </a:br>
+            <a:r>
+              <a:rPr lang="en-US" dirty="0"/>
+              <a:t>- </a:t>
+            </a:r>
+            <a:r>
+              <a:rPr lang="en-US" dirty="0">
+                <a:solidFill>
+                  <a:schemeClr val="bg1"/>
+                </a:solidFill>
+              </a:rPr>
+              <a:t>flex-shrink</a:t>
+            </a:r>
+            <a:r>
+              <a:rPr lang="en-US" dirty="0"/>
+              <a:t>: </a:t>
+            </a:r>
+            <a:r>
+              <a:rPr lang="en-US" dirty="0" err="1"/>
+              <a:t>Wie</a:t>
+            </a:r>
+            <a:r>
+              <a:rPr lang="en-US" dirty="0"/>
+              <a:t> </a:t>
+            </a:r>
+            <a:r>
+              <a:rPr lang="en-US" dirty="0" err="1"/>
+              <a:t>schrumpft</a:t>
+            </a:r>
+            <a:r>
+              <a:rPr lang="en-US" dirty="0"/>
+              <a:t> </a:t>
+            </a:r>
+            <a:r>
+              <a:rPr lang="en-US" dirty="0" err="1"/>
+              <a:t>ein</a:t>
+            </a:r>
+            <a:r>
+              <a:rPr lang="en-US" dirty="0"/>
+              <a:t> Item</a:t>
+            </a:r>
+            <a:br>
+              <a:rPr lang="en-US" dirty="0"/>
+            </a:br>
+            <a:br>
+              <a:rPr lang="en-US" dirty="0"/>
+            </a:br>
+            <a:r>
+              <a:rPr lang="en-US" dirty="0"/>
+              <a:t>- </a:t>
+            </a:r>
+            <a:r>
+              <a:rPr lang="en-US" dirty="0">
+                <a:solidFill>
+                  <a:schemeClr val="bg1"/>
+                </a:solidFill>
+              </a:rPr>
+              <a:t>flex-basis</a:t>
+            </a:r>
+            <a:r>
+              <a:rPr lang="en-US" dirty="0"/>
+              <a:t>: </a:t>
+            </a:r>
+            <a:r>
+              <a:rPr lang="en-US" dirty="0" err="1"/>
+              <a:t>Definiert</a:t>
+            </a:r>
+            <a:r>
+              <a:rPr lang="en-US" dirty="0"/>
+              <a:t> die default </a:t>
+            </a:r>
+            <a:r>
+              <a:rPr lang="en-US" dirty="0" err="1"/>
+              <a:t>Grösse</a:t>
+            </a:r>
+            <a:r>
+              <a:rPr lang="en-US" dirty="0"/>
+              <a:t> </a:t>
+            </a:r>
+            <a:r>
+              <a:rPr lang="en-US" dirty="0" err="1"/>
+              <a:t>eines</a:t>
+            </a:r>
+            <a:r>
+              <a:rPr lang="en-US" dirty="0"/>
+              <a:t> Items bevor der extra </a:t>
+            </a:r>
+            <a:r>
+              <a:rPr lang="en-US" dirty="0" err="1"/>
+              <a:t>freie</a:t>
+            </a:r>
+            <a:r>
+              <a:rPr lang="en-US" dirty="0"/>
+              <a:t> Platz </a:t>
+            </a:r>
+            <a:r>
+              <a:rPr lang="en-US" dirty="0" err="1"/>
+              <a:t>verteilt</a:t>
+            </a:r>
+            <a:r>
+              <a:rPr lang="en-US" dirty="0"/>
+              <a:t> </a:t>
+            </a:r>
+            <a:r>
+              <a:rPr lang="en-US" dirty="0" err="1"/>
+              <a:t>wird</a:t>
+            </a:r>
+            <a:br>
+              <a:rPr lang="en-US" dirty="0"/>
+            </a:br>
+            <a:endParaRPr lang="en-US" dirty="0"/>
+          </a:p>
+          <a:p>
+            <a:endParaRPr lang="en-US" dirty="0"/>
+          </a:p>
+          <a:p>
+            <a:endParaRPr lang="en-US" dirty="0"/>
+          </a:p>
+        </p:txBody>
+      </p:sp>
+      <p:pic>
+        <p:nvPicPr>
+          <p:cNvPr id="5" name="Picture 4">
+            <a:extLst>
+              <a:ext uri="{FF2B5EF4-FFF2-40B4-BE49-F238E27FC236}">
+                <a16:creationId xmlns:a16="http://schemas.microsoft.com/office/drawing/2014/main" id="{CB7151E4-5AB8-394F-A7F3-9DA68026B33F}"/>
+              </a:ext>
+            </a:extLst>
+          </p:cNvPr>
+          <p:cNvPicPr>
+            <a:picLocks noChangeAspect="1"/>
+          </p:cNvPicPr>
+          <p:nvPr/>
+        </p:nvPicPr>
+        <p:blipFill>
+          <a:blip r:embed="rId2"/>
+          <a:stretch>
+            <a:fillRect/>
+          </a:stretch>
+        </p:blipFill>
+        <p:spPr>
+          <a:xfrm>
+            <a:off x="6647180" y="2889812"/>
+            <a:ext cx="2496820" cy="1078376"/>
+          </a:xfrm>
+          <a:prstGeom prst="rect">
+            <a:avLst/>
+          </a:prstGeom>
+        </p:spPr>
+      </p:pic>
+    </p:spTree>
+    <p:extLst>
+      <p:ext uri="{BB962C8B-B14F-4D97-AF65-F5344CB8AC3E}">
+        <p14:creationId xmlns:p14="http://schemas.microsoft.com/office/powerpoint/2010/main" val="2503588141"/>
+      </p:ext>
+    </p:extLst>
+  </p:cSld>
+  <p:clrMapOvr>
+    <a:masterClrMapping/>
+  </p:clrMapOvr>
+</p:sld>
+</file>
+
+<file path=ppt/slides/slide75.xml><?xml version="1.0" encoding="utf-8"?>
+<p:sld xmlns:a="http://schemas.openxmlformats.org/drawingml/2006/main" xmlns:r="http://schemas.openxmlformats.org/officeDocument/2006/relationships" xmlns:p="http://schemas.openxmlformats.org/presentationml/2006/main">
+  <p:cSld>
+    <p:spTree>
+      <p:nvGrpSpPr>
+        <p:cNvPr id="1" name=""/>
+        <p:cNvGrpSpPr/>
+        <p:nvPr/>
+      </p:nvGrpSpPr>
+      <p:grpSpPr>
+        <a:xfrm>
+          <a:off x="0" y="0"/>
+          <a:ext cx="0" cy="0"/>
+          <a:chOff x="0" y="0"/>
+          <a:chExt cx="0" cy="0"/>
+        </a:xfrm>
+      </p:grpSpPr>
+      <p:sp>
+        <p:nvSpPr>
+          <p:cNvPr id="2" name="Title 1">
+            <a:extLst>
+              <a:ext uri="{FF2B5EF4-FFF2-40B4-BE49-F238E27FC236}">
+                <a16:creationId xmlns:a16="http://schemas.microsoft.com/office/drawing/2014/main" id="{311DD006-2E15-CF47-AE80-2F17BB001567}"/>
+              </a:ext>
+            </a:extLst>
+          </p:cNvPr>
+          <p:cNvSpPr>
+            <a:spLocks noGrp="1"/>
+          </p:cNvSpPr>
+          <p:nvPr>
+            <p:ph type="title"/>
+          </p:nvPr>
+        </p:nvSpPr>
+        <p:spPr/>
+        <p:txBody>
+          <a:bodyPr/>
+          <a:lstStyle/>
+          <a:p>
+            <a:endParaRPr lang="en-US"/>
+          </a:p>
+        </p:txBody>
+      </p:sp>
+      <p:sp>
+        <p:nvSpPr>
+          <p:cNvPr id="3" name="Content Placeholder 2">
+            <a:extLst>
+              <a:ext uri="{FF2B5EF4-FFF2-40B4-BE49-F238E27FC236}">
+                <a16:creationId xmlns:a16="http://schemas.microsoft.com/office/drawing/2014/main" id="{09B9B048-BDDF-3A44-B503-70B0D5B6092D}"/>
+              </a:ext>
+            </a:extLst>
+          </p:cNvPr>
+          <p:cNvSpPr>
+            <a:spLocks noGrp="1"/>
+          </p:cNvSpPr>
+          <p:nvPr>
+            <p:ph idx="1"/>
+          </p:nvPr>
+        </p:nvSpPr>
+        <p:spPr/>
+        <p:txBody>
+          <a:bodyPr/>
+          <a:lstStyle/>
+          <a:p>
+            <a:endParaRPr lang="en-US"/>
+          </a:p>
+        </p:txBody>
+      </p:sp>
+    </p:spTree>
+    <p:extLst>
+      <p:ext uri="{BB962C8B-B14F-4D97-AF65-F5344CB8AC3E}">
+        <p14:creationId xmlns:p14="http://schemas.microsoft.com/office/powerpoint/2010/main" val="34802215"/>
+      </p:ext>
+    </p:extLst>
+  </p:cSld>
+  <p:clrMapOvr>
+    <a:masterClrMapping/>
+  </p:clrMapOvr>
+</p:sld>
+</file>
+
+<file path=ppt/slides/slide76.xml><?xml version="1.0" encoding="utf-8"?>
+<p:sld xmlns:a="http://schemas.openxmlformats.org/drawingml/2006/main" xmlns:r="http://schemas.openxmlformats.org/officeDocument/2006/relationships" xmlns:p="http://schemas.openxmlformats.org/presentationml/2006/main">
+  <p:cSld>
+    <p:spTree>
+      <p:nvGrpSpPr>
+        <p:cNvPr id="1" name=""/>
+        <p:cNvGrpSpPr/>
+        <p:nvPr/>
+      </p:nvGrpSpPr>
+      <p:grpSpPr>
+        <a:xfrm>
+          <a:off x="0" y="0"/>
+          <a:ext cx="0" cy="0"/>
+          <a:chOff x="0" y="0"/>
+          <a:chExt cx="0" cy="0"/>
+        </a:xfrm>
+      </p:grpSpPr>
+      <p:sp>
+        <p:nvSpPr>
+          <p:cNvPr id="2" name="Title 1">
+            <a:extLst>
+              <a:ext uri="{FF2B5EF4-FFF2-40B4-BE49-F238E27FC236}">
+                <a16:creationId xmlns:a16="http://schemas.microsoft.com/office/drawing/2014/main" id="{30F28944-07FC-B04E-A68E-F7242046680A}"/>
+              </a:ext>
+            </a:extLst>
+          </p:cNvPr>
+          <p:cNvSpPr>
+            <a:spLocks noGrp="1"/>
+          </p:cNvSpPr>
+          <p:nvPr>
+            <p:ph type="title"/>
+          </p:nvPr>
+        </p:nvSpPr>
+        <p:spPr/>
+        <p:txBody>
+          <a:bodyPr/>
+          <a:lstStyle/>
+          <a:p>
+            <a:endParaRPr lang="en-US"/>
+          </a:p>
+        </p:txBody>
+      </p:sp>
+      <p:sp>
+        <p:nvSpPr>
+          <p:cNvPr id="3" name="Content Placeholder 2">
+            <a:extLst>
+              <a:ext uri="{FF2B5EF4-FFF2-40B4-BE49-F238E27FC236}">
+                <a16:creationId xmlns:a16="http://schemas.microsoft.com/office/drawing/2014/main" id="{EA9A4C44-C98C-6843-8426-DB104B83B1F4}"/>
+              </a:ext>
+            </a:extLst>
+          </p:cNvPr>
+          <p:cNvSpPr>
+            <a:spLocks noGrp="1"/>
+          </p:cNvSpPr>
+          <p:nvPr>
+            <p:ph idx="1"/>
+          </p:nvPr>
+        </p:nvSpPr>
+        <p:spPr/>
+        <p:txBody>
+          <a:bodyPr/>
+          <a:lstStyle/>
+          <a:p>
+            <a:endParaRPr lang="en-US"/>
+          </a:p>
+        </p:txBody>
+      </p:sp>
+    </p:spTree>
+    <p:extLst>
+      <p:ext uri="{BB962C8B-B14F-4D97-AF65-F5344CB8AC3E}">
+        <p14:creationId xmlns:p14="http://schemas.microsoft.com/office/powerpoint/2010/main" val="4235372035"/>
+      </p:ext>
+    </p:extLst>
+  </p:cSld>
+  <p:clrMapOvr>
+    <a:masterClrMapping/>
+  </p:clrMapOvr>
+</p:sld>
+</file>
+
+<file path=ppt/slides/slide77.xml><?xml version="1.0" encoding="utf-8"?>
+<p:sld xmlns:a="http://schemas.openxmlformats.org/drawingml/2006/main" xmlns:r="http://schemas.openxmlformats.org/officeDocument/2006/relationships" xmlns:p="http://schemas.openxmlformats.org/presentationml/2006/main">
+  <p:cSld>
+    <p:spTree>
+      <p:nvGrpSpPr>
+        <p:cNvPr id="1" name=""/>
+        <p:cNvGrpSpPr/>
+        <p:nvPr/>
+      </p:nvGrpSpPr>
+      <p:grpSpPr>
+        <a:xfrm>
+          <a:off x="0" y="0"/>
+          <a:ext cx="0" cy="0"/>
+          <a:chOff x="0" y="0"/>
+          <a:chExt cx="0" cy="0"/>
+        </a:xfrm>
+      </p:grpSpPr>
+      <p:sp>
+        <p:nvSpPr>
+          <p:cNvPr id="2" name="Title 1">
+            <a:extLst>
+              <a:ext uri="{FF2B5EF4-FFF2-40B4-BE49-F238E27FC236}">
+                <a16:creationId xmlns:a16="http://schemas.microsoft.com/office/drawing/2014/main" id="{BD12F5B6-1D4F-FC43-9C9B-58CB5B6D4246}"/>
+              </a:ext>
+            </a:extLst>
+          </p:cNvPr>
+          <p:cNvSpPr>
+            <a:spLocks noGrp="1"/>
+          </p:cNvSpPr>
+          <p:nvPr>
+            <p:ph type="title"/>
+          </p:nvPr>
+        </p:nvSpPr>
+        <p:spPr/>
+        <p:txBody>
+          <a:bodyPr/>
+          <a:lstStyle/>
+          <a:p>
+            <a:r>
+              <a:rPr lang="en-US" dirty="0"/>
+              <a:t>Grid</a:t>
+            </a:r>
+          </a:p>
+        </p:txBody>
+      </p:sp>
+      <p:sp>
+        <p:nvSpPr>
+          <p:cNvPr id="3" name="Content Placeholder 2">
+            <a:extLst>
+              <a:ext uri="{FF2B5EF4-FFF2-40B4-BE49-F238E27FC236}">
+                <a16:creationId xmlns:a16="http://schemas.microsoft.com/office/drawing/2014/main" id="{CC3FAD12-4AE5-964C-9563-4A3588BB2406}"/>
+              </a:ext>
+            </a:extLst>
+          </p:cNvPr>
+          <p:cNvSpPr>
+            <a:spLocks noGrp="1"/>
+          </p:cNvSpPr>
+          <p:nvPr>
+            <p:ph idx="1"/>
+          </p:nvPr>
+        </p:nvSpPr>
+        <p:spPr/>
+        <p:txBody>
+          <a:bodyPr/>
+          <a:lstStyle/>
+          <a:p>
+            <a:r>
+              <a:rPr lang="en-US" dirty="0"/>
+              <a:t>Grid </a:t>
+            </a:r>
+            <a:r>
+              <a:rPr lang="en-US" dirty="0" err="1"/>
+              <a:t>ist</a:t>
+            </a:r>
+            <a:r>
+              <a:rPr lang="en-US" dirty="0"/>
+              <a:t> </a:t>
+            </a:r>
+            <a:r>
+              <a:rPr lang="en-US" dirty="0" err="1"/>
+              <a:t>ein</a:t>
+            </a:r>
+            <a:r>
+              <a:rPr lang="en-US" dirty="0"/>
+              <a:t> </a:t>
+            </a:r>
+            <a:r>
+              <a:rPr lang="en-US" b="1" dirty="0" err="1"/>
+              <a:t>zweidimensionales</a:t>
+            </a:r>
+            <a:r>
+              <a:rPr lang="en-US" dirty="0"/>
+              <a:t> </a:t>
+            </a:r>
+            <a:r>
+              <a:rPr lang="en-US" dirty="0" err="1"/>
+              <a:t>Layoutmodell</a:t>
+            </a:r>
+            <a:endParaRPr lang="en-US" dirty="0"/>
+          </a:p>
+        </p:txBody>
+      </p:sp>
+    </p:spTree>
+    <p:extLst>
+      <p:ext uri="{BB962C8B-B14F-4D97-AF65-F5344CB8AC3E}">
+        <p14:creationId xmlns:p14="http://schemas.microsoft.com/office/powerpoint/2010/main" val="80854726"/>
+      </p:ext>
+    </p:extLst>
+  </p:cSld>
+  <p:clrMapOvr>
+    <a:masterClrMapping/>
+  </p:clrMapOvr>
+</p:sld>
+</file>
+
+<file path=ppt/slides/slide78.xml><?xml version="1.0" encoding="utf-8"?>
+<p:sld xmlns:a="http://schemas.openxmlformats.org/drawingml/2006/main" xmlns:r="http://schemas.openxmlformats.org/officeDocument/2006/relationships" xmlns:p="http://schemas.openxmlformats.org/presentationml/2006/main">
+  <p:cSld>
+    <p:spTree>
+      <p:nvGrpSpPr>
+        <p:cNvPr id="1" name=""/>
+        <p:cNvGrpSpPr/>
+        <p:nvPr/>
+      </p:nvGrpSpPr>
+      <p:grpSpPr>
+        <a:xfrm>
+          <a:off x="0" y="0"/>
+          <a:ext cx="0" cy="0"/>
+          <a:chOff x="0" y="0"/>
+          <a:chExt cx="0" cy="0"/>
+        </a:xfrm>
+      </p:grpSpPr>
+      <p:sp>
+        <p:nvSpPr>
+          <p:cNvPr id="2" name="Title 1">
+            <a:extLst>
+              <a:ext uri="{FF2B5EF4-FFF2-40B4-BE49-F238E27FC236}">
                 <a16:creationId xmlns:a16="http://schemas.microsoft.com/office/drawing/2014/main" id="{C57CC73E-83AF-9D48-8780-676E6EE6AB4D}"/>
               </a:ext>
             </a:extLst>
@@ -24101,7 +25713,7 @@
 </p:sld>
 </file>
 
-<file path=ppt/slides/slide75.xml><?xml version="1.0" encoding="utf-8"?>
+<file path=ppt/slides/slide79.xml><?xml version="1.0" encoding="utf-8"?>
 <p:sld xmlns:a="http://schemas.openxmlformats.org/drawingml/2006/main" xmlns:r="http://schemas.openxmlformats.org/officeDocument/2006/relationships" xmlns:p="http://schemas.openxmlformats.org/presentationml/2006/main">
   <p:cSld>
     <p:spTree>

</xml_diff>

<commit_message>
css Grid zur PowerPoint Präsentation hinzugefügt.
</commit_message>
<xml_diff>
--- a/html Schulung.pptx
+++ b/html Schulung.pptx
@@ -5,7 +5,7 @@
     <p:sldMasterId id="2147483660" r:id="rId1"/>
   </p:sldMasterIdLst>
   <p:notesMasterIdLst>
-    <p:notesMasterId r:id="rId81"/>
+    <p:notesMasterId r:id="rId86"/>
   </p:notesMasterIdLst>
   <p:sldIdLst>
     <p:sldId id="256" r:id="rId2"/>
@@ -82,11 +82,16 @@
     <p:sldId id="328" r:id="rId73"/>
     <p:sldId id="331" r:id="rId74"/>
     <p:sldId id="332" r:id="rId75"/>
-    <p:sldId id="333" r:id="rId76"/>
-    <p:sldId id="334" r:id="rId77"/>
+    <p:sldId id="334" r:id="rId76"/>
+    <p:sldId id="333" r:id="rId77"/>
     <p:sldId id="329" r:id="rId78"/>
     <p:sldId id="330" r:id="rId79"/>
-    <p:sldId id="264" r:id="rId80"/>
+    <p:sldId id="335" r:id="rId80"/>
+    <p:sldId id="336" r:id="rId81"/>
+    <p:sldId id="339" r:id="rId82"/>
+    <p:sldId id="337" r:id="rId83"/>
+    <p:sldId id="338" r:id="rId84"/>
+    <p:sldId id="264" r:id="rId85"/>
   </p:sldIdLst>
   <p:sldSz cx="12192000" cy="6858000"/>
   <p:notesSz cx="6858000" cy="9144000"/>
@@ -24968,7 +24973,7 @@
             </a:r>
             <a:r>
               <a:rPr lang="en-US" dirty="0" err="1"/>
-              <a:t>einzelnens</a:t>
+              <a:t>einzelnes</a:t>
             </a:r>
             <a:r>
               <a:rPr lang="en-US" dirty="0"/>
@@ -25064,7 +25069,10 @@
           <a:bodyPr/>
           <a:lstStyle/>
           <a:p>
-            <a:endParaRPr lang="en-US"/>
+            <a:r>
+              <a:rPr lang="en-US" dirty="0"/>
+              <a:t>Flexbox: Item Properties</a:t>
+            </a:r>
           </a:p>
         </p:txBody>
       </p:sp>
@@ -25380,7 +25388,7 @@
           <p:cNvPr id="2" name="Title 1">
             <a:extLst>
               <a:ext uri="{FF2B5EF4-FFF2-40B4-BE49-F238E27FC236}">
-                <a16:creationId xmlns:a16="http://schemas.microsoft.com/office/drawing/2014/main" id="{311DD006-2E15-CF47-AE80-2F17BB001567}"/>
+                <a16:creationId xmlns:a16="http://schemas.microsoft.com/office/drawing/2014/main" id="{30F28944-07FC-B04E-A68E-F7242046680A}"/>
               </a:ext>
             </a:extLst>
           </p:cNvPr>
@@ -25396,7 +25404,14 @@
           <a:bodyPr/>
           <a:lstStyle/>
           <a:p>
-            <a:endParaRPr lang="en-US"/>
+            <a:r>
+              <a:rPr lang="en-US" dirty="0" err="1"/>
+              <a:t>Übung</a:t>
+            </a:r>
+            <a:r>
+              <a:rPr lang="en-US" dirty="0"/>
+              <a:t>: Flexbox</a:t>
+            </a:r>
           </a:p>
         </p:txBody>
       </p:sp>
@@ -25405,7 +25420,7 @@
           <p:cNvPr id="3" name="Content Placeholder 2">
             <a:extLst>
               <a:ext uri="{FF2B5EF4-FFF2-40B4-BE49-F238E27FC236}">
-                <a16:creationId xmlns:a16="http://schemas.microsoft.com/office/drawing/2014/main" id="{09B9B048-BDDF-3A44-B503-70B0D5B6092D}"/>
+                <a16:creationId xmlns:a16="http://schemas.microsoft.com/office/drawing/2014/main" id="{EA9A4C44-C98C-6843-8426-DB104B83B1F4}"/>
               </a:ext>
             </a:extLst>
           </p:cNvPr>
@@ -25421,14 +25436,35 @@
           <a:bodyPr/>
           <a:lstStyle/>
           <a:p>
-            <a:endParaRPr lang="en-US"/>
+            <a:r>
+              <a:rPr lang="en-US" dirty="0" err="1"/>
+              <a:t>Spielchen</a:t>
+            </a:r>
+            <a:r>
+              <a:rPr lang="en-US" dirty="0"/>
+              <a:t> </a:t>
+            </a:r>
+            <a:r>
+              <a:rPr lang="en-US" dirty="0" err="1"/>
+              <a:t>spielen</a:t>
+            </a:r>
+            <a:br>
+              <a:rPr lang="en-US" dirty="0"/>
+            </a:br>
+            <a:r>
+              <a:rPr lang="en-US" dirty="0">
+                <a:hlinkClick r:id="rId2"/>
+              </a:rPr>
+              <a:t>http://flexboxfroggy.com/</a:t>
+            </a:r>
+            <a:endParaRPr lang="en-US" dirty="0"/>
           </a:p>
         </p:txBody>
       </p:sp>
     </p:spTree>
     <p:extLst>
       <p:ext uri="{BB962C8B-B14F-4D97-AF65-F5344CB8AC3E}">
-        <p14:creationId xmlns:p14="http://schemas.microsoft.com/office/powerpoint/2010/main" val="34802215"/>
+        <p14:creationId xmlns:p14="http://schemas.microsoft.com/office/powerpoint/2010/main" val="4235372035"/>
       </p:ext>
     </p:extLst>
   </p:cSld>
@@ -25460,7 +25496,7 @@
           <p:cNvPr id="2" name="Title 1">
             <a:extLst>
               <a:ext uri="{FF2B5EF4-FFF2-40B4-BE49-F238E27FC236}">
-                <a16:creationId xmlns:a16="http://schemas.microsoft.com/office/drawing/2014/main" id="{30F28944-07FC-B04E-A68E-F7242046680A}"/>
+                <a16:creationId xmlns:a16="http://schemas.microsoft.com/office/drawing/2014/main" id="{311DD006-2E15-CF47-AE80-2F17BB001567}"/>
               </a:ext>
             </a:extLst>
           </p:cNvPr>
@@ -25476,39 +25512,296 @@
           <a:bodyPr/>
           <a:lstStyle/>
           <a:p>
-            <a:endParaRPr lang="en-US"/>
-          </a:p>
-        </p:txBody>
-      </p:sp>
-      <p:sp>
-        <p:nvSpPr>
-          <p:cNvPr id="3" name="Content Placeholder 2">
+            <a:r>
+              <a:rPr lang="en-US" dirty="0" err="1"/>
+              <a:t>Übung</a:t>
+            </a:r>
+            <a:r>
+              <a:rPr lang="en-US" dirty="0"/>
+              <a:t>: Flexbox</a:t>
+            </a:r>
+          </a:p>
+        </p:txBody>
+      </p:sp>
+      <p:sp>
+        <p:nvSpPr>
+          <p:cNvPr id="4" name="Content Placeholder 2">
             <a:extLst>
               <a:ext uri="{FF2B5EF4-FFF2-40B4-BE49-F238E27FC236}">
-                <a16:creationId xmlns:a16="http://schemas.microsoft.com/office/drawing/2014/main" id="{EA9A4C44-C98C-6843-8426-DB104B83B1F4}"/>
+                <a16:creationId xmlns:a16="http://schemas.microsoft.com/office/drawing/2014/main" id="{487D5504-54C0-0144-BDAD-70D8970C8908}"/>
               </a:ext>
             </a:extLst>
           </p:cNvPr>
-          <p:cNvSpPr>
-            <a:spLocks noGrp="1"/>
-          </p:cNvSpPr>
-          <p:nvPr>
-            <p:ph idx="1"/>
-          </p:nvPr>
-        </p:nvSpPr>
-        <p:spPr/>
-        <p:txBody>
-          <a:bodyPr/>
-          <a:lstStyle/>
-          <a:p>
-            <a:endParaRPr lang="en-US"/>
-          </a:p>
-        </p:txBody>
-      </p:sp>
+          <p:cNvSpPr txBox="1">
+            <a:spLocks/>
+          </p:cNvSpPr>
+          <p:nvPr/>
+        </p:nvSpPr>
+        <p:spPr>
+          <a:xfrm>
+            <a:off x="680321" y="2342896"/>
+            <a:ext cx="9613861" cy="3599316"/>
+          </a:xfrm>
+          <a:prstGeom prst="rect">
+            <a:avLst/>
+          </a:prstGeom>
+        </p:spPr>
+        <p:txBody>
+          <a:bodyPr vert="horz" lIns="91440" tIns="45720" rIns="91440" bIns="45720" rtlCol="0">
+            <a:normAutofit/>
+          </a:bodyPr>
+          <a:lstStyle>
+            <a:lvl1pPr marL="228600" indent="-228600" algn="l" defTabSz="914400" rtl="0" eaLnBrk="1" latinLnBrk="0" hangingPunct="1">
+              <a:lnSpc>
+                <a:spcPct val="90000"/>
+              </a:lnSpc>
+              <a:spcBef>
+                <a:spcPts val="1000"/>
+              </a:spcBef>
+              <a:buFont typeface="Arial" panose="020B0604020202020204" pitchFamily="34" charset="0"/>
+              <a:buChar char="•"/>
+              <a:defRPr sz="2400" kern="1200">
+                <a:solidFill>
+                  <a:schemeClr val="tx1"/>
+                </a:solidFill>
+                <a:latin typeface="+mn-lt"/>
+                <a:ea typeface="+mn-ea"/>
+                <a:cs typeface="+mn-cs"/>
+              </a:defRPr>
+            </a:lvl1pPr>
+            <a:lvl2pPr marL="685800" indent="-228600" algn="l" defTabSz="914400" rtl="0" eaLnBrk="1" latinLnBrk="0" hangingPunct="1">
+              <a:lnSpc>
+                <a:spcPct val="90000"/>
+              </a:lnSpc>
+              <a:spcBef>
+                <a:spcPts val="500"/>
+              </a:spcBef>
+              <a:buFont typeface="Arial" panose="020B0604020202020204" pitchFamily="34" charset="0"/>
+              <a:buChar char="•"/>
+              <a:defRPr sz="2000" kern="1200">
+                <a:solidFill>
+                  <a:schemeClr val="tx1"/>
+                </a:solidFill>
+                <a:latin typeface="+mn-lt"/>
+                <a:ea typeface="+mn-ea"/>
+                <a:cs typeface="+mn-cs"/>
+              </a:defRPr>
+            </a:lvl2pPr>
+            <a:lvl3pPr marL="1143000" indent="-228600" algn="l" defTabSz="914400" rtl="0" eaLnBrk="1" latinLnBrk="0" hangingPunct="1">
+              <a:lnSpc>
+                <a:spcPct val="90000"/>
+              </a:lnSpc>
+              <a:spcBef>
+                <a:spcPts val="500"/>
+              </a:spcBef>
+              <a:buFont typeface="Arial" panose="020B0604020202020204" pitchFamily="34" charset="0"/>
+              <a:buChar char="•"/>
+              <a:defRPr sz="1800" kern="1200">
+                <a:solidFill>
+                  <a:schemeClr val="tx1"/>
+                </a:solidFill>
+                <a:latin typeface="+mn-lt"/>
+                <a:ea typeface="+mn-ea"/>
+                <a:cs typeface="+mn-cs"/>
+              </a:defRPr>
+            </a:lvl3pPr>
+            <a:lvl4pPr marL="1600200" indent="-228600" algn="l" defTabSz="914400" rtl="0" eaLnBrk="1" latinLnBrk="0" hangingPunct="1">
+              <a:lnSpc>
+                <a:spcPct val="90000"/>
+              </a:lnSpc>
+              <a:spcBef>
+                <a:spcPts val="500"/>
+              </a:spcBef>
+              <a:buFont typeface="Arial" panose="020B0604020202020204" pitchFamily="34" charset="0"/>
+              <a:buChar char="•"/>
+              <a:defRPr sz="1600" kern="1200">
+                <a:solidFill>
+                  <a:schemeClr val="tx1"/>
+                </a:solidFill>
+                <a:latin typeface="+mn-lt"/>
+                <a:ea typeface="+mn-ea"/>
+                <a:cs typeface="+mn-cs"/>
+              </a:defRPr>
+            </a:lvl4pPr>
+            <a:lvl5pPr marL="2057400" indent="-228600" algn="l" defTabSz="914400" rtl="0" eaLnBrk="1" latinLnBrk="0" hangingPunct="1">
+              <a:lnSpc>
+                <a:spcPct val="90000"/>
+              </a:lnSpc>
+              <a:spcBef>
+                <a:spcPts val="500"/>
+              </a:spcBef>
+              <a:buFont typeface="Arial" panose="020B0604020202020204" pitchFamily="34" charset="0"/>
+              <a:buChar char="•"/>
+              <a:defRPr sz="1600" kern="1200">
+                <a:solidFill>
+                  <a:schemeClr val="tx1"/>
+                </a:solidFill>
+                <a:latin typeface="+mn-lt"/>
+                <a:ea typeface="+mn-ea"/>
+                <a:cs typeface="+mn-cs"/>
+              </a:defRPr>
+            </a:lvl5pPr>
+            <a:lvl6pPr marL="2514600" indent="-228600" algn="l" defTabSz="914400" rtl="0" eaLnBrk="1" latinLnBrk="0" hangingPunct="1">
+              <a:lnSpc>
+                <a:spcPct val="90000"/>
+              </a:lnSpc>
+              <a:spcBef>
+                <a:spcPts val="500"/>
+              </a:spcBef>
+              <a:buFont typeface="Arial" panose="020B0604020202020204" pitchFamily="34" charset="0"/>
+              <a:buChar char="•"/>
+              <a:defRPr sz="1400" kern="1200">
+                <a:solidFill>
+                  <a:schemeClr val="tx1"/>
+                </a:solidFill>
+                <a:latin typeface="+mn-lt"/>
+                <a:ea typeface="+mn-ea"/>
+                <a:cs typeface="+mn-cs"/>
+              </a:defRPr>
+            </a:lvl6pPr>
+            <a:lvl7pPr marL="2971800" indent="-228600" algn="l" defTabSz="914400" rtl="0" eaLnBrk="1" latinLnBrk="0" hangingPunct="1">
+              <a:lnSpc>
+                <a:spcPct val="90000"/>
+              </a:lnSpc>
+              <a:spcBef>
+                <a:spcPts val="500"/>
+              </a:spcBef>
+              <a:buFont typeface="Arial" panose="020B0604020202020204" pitchFamily="34" charset="0"/>
+              <a:buChar char="•"/>
+              <a:defRPr sz="1400" kern="1200">
+                <a:solidFill>
+                  <a:schemeClr val="tx1"/>
+                </a:solidFill>
+                <a:latin typeface="+mn-lt"/>
+                <a:ea typeface="+mn-ea"/>
+                <a:cs typeface="+mn-cs"/>
+              </a:defRPr>
+            </a:lvl7pPr>
+            <a:lvl8pPr marL="3429000" indent="-228600" algn="l" defTabSz="914400" rtl="0" eaLnBrk="1" latinLnBrk="0" hangingPunct="1">
+              <a:lnSpc>
+                <a:spcPct val="90000"/>
+              </a:lnSpc>
+              <a:spcBef>
+                <a:spcPts val="500"/>
+              </a:spcBef>
+              <a:buFont typeface="Arial" panose="020B0604020202020204" pitchFamily="34" charset="0"/>
+              <a:buChar char="•"/>
+              <a:defRPr sz="1400" kern="1200">
+                <a:solidFill>
+                  <a:schemeClr val="tx1"/>
+                </a:solidFill>
+                <a:latin typeface="+mn-lt"/>
+                <a:ea typeface="+mn-ea"/>
+                <a:cs typeface="+mn-cs"/>
+              </a:defRPr>
+            </a:lvl8pPr>
+            <a:lvl9pPr marL="3886200" indent="-228600" algn="l" defTabSz="914400" rtl="0" eaLnBrk="1" latinLnBrk="0" hangingPunct="1">
+              <a:lnSpc>
+                <a:spcPct val="90000"/>
+              </a:lnSpc>
+              <a:spcBef>
+                <a:spcPts val="500"/>
+              </a:spcBef>
+              <a:buFont typeface="Arial" panose="020B0604020202020204" pitchFamily="34" charset="0"/>
+              <a:buChar char="•"/>
+              <a:defRPr sz="1400" kern="1200">
+                <a:solidFill>
+                  <a:schemeClr val="tx1"/>
+                </a:solidFill>
+                <a:latin typeface="+mn-lt"/>
+                <a:ea typeface="+mn-ea"/>
+                <a:cs typeface="+mn-cs"/>
+              </a:defRPr>
+            </a:lvl9pPr>
+          </a:lstStyle>
+          <a:p>
+            <a:pPr marL="0" indent="0">
+              <a:buFont typeface="Arial" panose="020B0604020202020204" pitchFamily="34" charset="0"/>
+              <a:buNone/>
+            </a:pPr>
+            <a:r>
+              <a:rPr lang="de" dirty="0"/>
+              <a:t>Baue ein Holy-</a:t>
+            </a:r>
+            <a:r>
+              <a:rPr lang="de" dirty="0" err="1"/>
+              <a:t>Grail</a:t>
+            </a:r>
+            <a:r>
+              <a:rPr lang="de" dirty="0"/>
+              <a:t> Layout mit </a:t>
+            </a:r>
+            <a:r>
+              <a:rPr lang="de" dirty="0" err="1"/>
+              <a:t>Flexbox</a:t>
+            </a:r>
+            <a:br>
+              <a:rPr lang="de" dirty="0"/>
+            </a:br>
+            <a:br>
+              <a:rPr lang="de" dirty="0"/>
+            </a:br>
+            <a:r>
+              <a:rPr lang="de" dirty="0"/>
+              <a:t>Verwende Hintergrund-Farben um die Ausdehnung der einzelnen Bereiche zu visualisieren </a:t>
+            </a:r>
+          </a:p>
+          <a:p>
+            <a:endParaRPr lang="en-US" dirty="0"/>
+          </a:p>
+        </p:txBody>
+      </p:sp>
+      <p:pic>
+        <p:nvPicPr>
+          <p:cNvPr id="5" name="Picture 1" descr="page30image31640000">
+            <a:extLst>
+              <a:ext uri="{FF2B5EF4-FFF2-40B4-BE49-F238E27FC236}">
+                <a16:creationId xmlns:a16="http://schemas.microsoft.com/office/drawing/2014/main" id="{644C8C0A-CDF9-3B47-8433-721C0BD747F2}"/>
+              </a:ext>
+            </a:extLst>
+          </p:cNvPr>
+          <p:cNvPicPr>
+            <a:picLocks noChangeAspect="1" noChangeArrowheads="1"/>
+          </p:cNvPicPr>
+          <p:nvPr/>
+        </p:nvPicPr>
+        <p:blipFill>
+          <a:blip r:embed="rId2">
+            <a:extLst>
+              <a:ext uri="{28A0092B-C50C-407E-A947-70E740481C1C}">
+                <a14:useLocalDpi xmlns:a14="http://schemas.microsoft.com/office/drawing/2010/main" val="0"/>
+              </a:ext>
+            </a:extLst>
+          </a:blip>
+          <a:srcRect/>
+          <a:stretch>
+            <a:fillRect/>
+          </a:stretch>
+        </p:blipFill>
+        <p:spPr bwMode="auto">
+          <a:xfrm>
+            <a:off x="3833261" y="3966438"/>
+            <a:ext cx="3307979" cy="2472458"/>
+          </a:xfrm>
+          <a:prstGeom prst="rect">
+            <a:avLst/>
+          </a:prstGeom>
+          <a:noFill/>
+          <a:extLst>
+            <a:ext uri="{909E8E84-426E-40DD-AFC4-6F175D3DCCD1}">
+              <a14:hiddenFill xmlns:a14="http://schemas.microsoft.com/office/drawing/2010/main">
+                <a:solidFill>
+                  <a:srgbClr val="FFFFFF"/>
+                </a:solidFill>
+              </a14:hiddenFill>
+            </a:ext>
+          </a:extLst>
+        </p:spPr>
+      </p:pic>
     </p:spTree>
     <p:extLst>
       <p:ext uri="{BB962C8B-B14F-4D97-AF65-F5344CB8AC3E}">
-        <p14:creationId xmlns:p14="http://schemas.microsoft.com/office/powerpoint/2010/main" val="4235372035"/>
+        <p14:creationId xmlns:p14="http://schemas.microsoft.com/office/powerpoint/2010/main" val="34802215"/>
       </p:ext>
     </p:extLst>
   </p:cSld>
@@ -25616,10 +25909,259 @@
               <a:rPr lang="en-US" dirty="0" err="1"/>
               <a:t>Layoutmodell</a:t>
             </a:r>
+            <a:br>
+              <a:rPr lang="en-US" dirty="0"/>
+            </a:br>
+            <a:r>
+              <a:rPr lang="en-US" dirty="0" err="1"/>
+              <a:t>Somit</a:t>
+            </a:r>
+            <a:r>
+              <a:rPr lang="en-US" dirty="0"/>
+              <a:t> </a:t>
+            </a:r>
+            <a:r>
+              <a:rPr lang="en-US" dirty="0" err="1"/>
+              <a:t>wäre</a:t>
+            </a:r>
+            <a:r>
+              <a:rPr lang="en-US" dirty="0"/>
+              <a:t> Grid am </a:t>
+            </a:r>
+            <a:r>
+              <a:rPr lang="en-US" dirty="0" err="1"/>
+              <a:t>geeignetsten</a:t>
+            </a:r>
+            <a:r>
+              <a:rPr lang="en-US" dirty="0"/>
+              <a:t> </a:t>
+            </a:r>
+            <a:r>
+              <a:rPr lang="en-US" dirty="0" err="1"/>
+              <a:t>für</a:t>
+            </a:r>
+            <a:r>
+              <a:rPr lang="en-US" dirty="0"/>
+              <a:t> </a:t>
+            </a:r>
+            <a:r>
+              <a:rPr lang="en-US" dirty="0" err="1"/>
+              <a:t>ein</a:t>
+            </a:r>
+            <a:r>
+              <a:rPr lang="en-US" dirty="0"/>
+              <a:t> Overall Layout, </a:t>
+            </a:r>
+            <a:r>
+              <a:rPr lang="en-US" dirty="0" err="1"/>
+              <a:t>wie</a:t>
+            </a:r>
+            <a:r>
+              <a:rPr lang="en-US" dirty="0"/>
+              <a:t> das “Holy Grail”.</a:t>
+            </a:r>
+          </a:p>
+          <a:p>
             <a:endParaRPr lang="en-US" dirty="0"/>
           </a:p>
         </p:txBody>
       </p:sp>
+      <p:pic>
+        <p:nvPicPr>
+          <p:cNvPr id="5" name="Picture 4">
+            <a:extLst>
+              <a:ext uri="{FF2B5EF4-FFF2-40B4-BE49-F238E27FC236}">
+                <a16:creationId xmlns:a16="http://schemas.microsoft.com/office/drawing/2014/main" id="{DC1A4F37-09E5-6F4F-985B-5CBCB5CDD59B}"/>
+              </a:ext>
+            </a:extLst>
+          </p:cNvPr>
+          <p:cNvPicPr>
+            <a:picLocks noChangeAspect="1"/>
+          </p:cNvPicPr>
+          <p:nvPr/>
+        </p:nvPicPr>
+        <p:blipFill>
+          <a:blip r:embed="rId2"/>
+          <a:stretch>
+            <a:fillRect/>
+          </a:stretch>
+        </p:blipFill>
+        <p:spPr>
+          <a:xfrm>
+            <a:off x="3058160" y="3429000"/>
+            <a:ext cx="4511040" cy="3077174"/>
+          </a:xfrm>
+          <a:prstGeom prst="rect">
+            <a:avLst/>
+          </a:prstGeom>
+        </p:spPr>
+      </p:pic>
+      <p:sp>
+        <p:nvSpPr>
+          <p:cNvPr id="6" name="TextBox 5">
+            <a:extLst>
+              <a:ext uri="{FF2B5EF4-FFF2-40B4-BE49-F238E27FC236}">
+                <a16:creationId xmlns:a16="http://schemas.microsoft.com/office/drawing/2014/main" id="{CA0D84CC-B286-3F4F-A36B-E8A2692654F6}"/>
+              </a:ext>
+            </a:extLst>
+          </p:cNvPr>
+          <p:cNvSpPr txBox="1"/>
+          <p:nvPr/>
+        </p:nvSpPr>
+        <p:spPr>
+          <a:xfrm>
+            <a:off x="1503732" y="3951865"/>
+            <a:ext cx="1170513" cy="369332"/>
+          </a:xfrm>
+          <a:prstGeom prst="rect">
+            <a:avLst/>
+          </a:prstGeom>
+          <a:noFill/>
+        </p:spPr>
+        <p:txBody>
+          <a:bodyPr wrap="none" rtlCol="0">
+            <a:spAutoFit/>
+          </a:bodyPr>
+          <a:lstStyle/>
+          <a:p>
+            <a:r>
+              <a:rPr lang="en-US" dirty="0">
+                <a:solidFill>
+                  <a:schemeClr val="bg1"/>
+                </a:solidFill>
+              </a:rPr>
+              <a:t>container</a:t>
+            </a:r>
+          </a:p>
+        </p:txBody>
+      </p:sp>
+      <p:sp>
+        <p:nvSpPr>
+          <p:cNvPr id="7" name="TextBox 6">
+            <a:extLst>
+              <a:ext uri="{FF2B5EF4-FFF2-40B4-BE49-F238E27FC236}">
+                <a16:creationId xmlns:a16="http://schemas.microsoft.com/office/drawing/2014/main" id="{1B0ABAD5-C265-5D48-971B-CEF3E69D3F39}"/>
+              </a:ext>
+            </a:extLst>
+          </p:cNvPr>
+          <p:cNvSpPr txBox="1"/>
+          <p:nvPr/>
+        </p:nvSpPr>
+        <p:spPr>
+          <a:xfrm>
+            <a:off x="2013487" y="4598255"/>
+            <a:ext cx="660758" cy="369332"/>
+          </a:xfrm>
+          <a:prstGeom prst="rect">
+            <a:avLst/>
+          </a:prstGeom>
+          <a:noFill/>
+        </p:spPr>
+        <p:txBody>
+          <a:bodyPr wrap="none" rtlCol="0">
+            <a:spAutoFit/>
+          </a:bodyPr>
+          <a:lstStyle/>
+          <a:p>
+            <a:r>
+              <a:rPr lang="en-US" dirty="0">
+                <a:solidFill>
+                  <a:schemeClr val="bg1"/>
+                </a:solidFill>
+              </a:rPr>
+              <a:t>item</a:t>
+            </a:r>
+          </a:p>
+        </p:txBody>
+      </p:sp>
+      <p:cxnSp>
+        <p:nvCxnSpPr>
+          <p:cNvPr id="8" name="Gerade Verbindung mit Pfeil 4">
+            <a:extLst>
+              <a:ext uri="{FF2B5EF4-FFF2-40B4-BE49-F238E27FC236}">
+                <a16:creationId xmlns:a16="http://schemas.microsoft.com/office/drawing/2014/main" id="{051D78F4-22C4-DC4A-B5FB-254504E555FA}"/>
+              </a:ext>
+            </a:extLst>
+          </p:cNvPr>
+          <p:cNvCxnSpPr>
+            <a:cxnSpLocks/>
+          </p:cNvCxnSpPr>
+          <p:nvPr/>
+        </p:nvCxnSpPr>
+        <p:spPr>
+          <a:xfrm flipV="1">
+            <a:off x="2674245" y="3728720"/>
+            <a:ext cx="526155" cy="412928"/>
+          </a:xfrm>
+          <a:prstGeom prst="straightConnector1">
+            <a:avLst/>
+          </a:prstGeom>
+          <a:ln w="38100">
+            <a:solidFill>
+              <a:schemeClr val="bg1"/>
+            </a:solidFill>
+            <a:tailEnd type="triangle"/>
+          </a:ln>
+        </p:spPr>
+        <p:style>
+          <a:lnRef idx="1">
+            <a:schemeClr val="dk1"/>
+          </a:lnRef>
+          <a:fillRef idx="0">
+            <a:schemeClr val="dk1"/>
+          </a:fillRef>
+          <a:effectRef idx="0">
+            <a:schemeClr val="dk1"/>
+          </a:effectRef>
+          <a:fontRef idx="minor">
+            <a:schemeClr val="tx1"/>
+          </a:fontRef>
+        </p:style>
+      </p:cxnSp>
+      <p:cxnSp>
+        <p:nvCxnSpPr>
+          <p:cNvPr id="10" name="Gerade Verbindung mit Pfeil 4">
+            <a:extLst>
+              <a:ext uri="{FF2B5EF4-FFF2-40B4-BE49-F238E27FC236}">
+                <a16:creationId xmlns:a16="http://schemas.microsoft.com/office/drawing/2014/main" id="{4448EDFC-1EB3-8C48-83DE-89F403F81BBE}"/>
+              </a:ext>
+            </a:extLst>
+          </p:cNvPr>
+          <p:cNvCxnSpPr>
+            <a:cxnSpLocks/>
+          </p:cNvCxnSpPr>
+          <p:nvPr/>
+        </p:nvCxnSpPr>
+        <p:spPr>
+          <a:xfrm flipV="1">
+            <a:off x="2664085" y="4364793"/>
+            <a:ext cx="1247515" cy="386013"/>
+          </a:xfrm>
+          <a:prstGeom prst="straightConnector1">
+            <a:avLst/>
+          </a:prstGeom>
+          <a:ln w="38100">
+            <a:solidFill>
+              <a:schemeClr val="bg1"/>
+            </a:solidFill>
+            <a:tailEnd type="triangle"/>
+          </a:ln>
+        </p:spPr>
+        <p:style>
+          <a:lnRef idx="1">
+            <a:schemeClr val="dk1"/>
+          </a:lnRef>
+          <a:fillRef idx="0">
+            <a:schemeClr val="dk1"/>
+          </a:fillRef>
+          <a:effectRef idx="0">
+            <a:schemeClr val="dk1"/>
+          </a:effectRef>
+          <a:fontRef idx="minor">
+            <a:schemeClr val="tx1"/>
+          </a:fontRef>
+        </p:style>
+      </p:cxnSp>
     </p:spTree>
     <p:extLst>
       <p:ext uri="{BB962C8B-B14F-4D97-AF65-F5344CB8AC3E}">
@@ -25671,7 +26213,10 @@
           <a:bodyPr/>
           <a:lstStyle/>
           <a:p>
-            <a:endParaRPr lang="en-US"/>
+            <a:r>
+              <a:rPr lang="en-US" dirty="0"/>
+              <a:t>Grid</a:t>
+            </a:r>
           </a:p>
         </p:txBody>
       </p:sp>
@@ -25696,7 +26241,92 @@
           <a:bodyPr/>
           <a:lstStyle/>
           <a:p>
-            <a:endParaRPr lang="en-US"/>
+            <a:r>
+              <a:rPr lang="en-US" dirty="0"/>
+              <a:t>Das Grid Layout </a:t>
+            </a:r>
+            <a:r>
+              <a:rPr lang="en-US" dirty="0" err="1"/>
+              <a:t>wird</a:t>
+            </a:r>
+            <a:r>
+              <a:rPr lang="en-US" dirty="0"/>
+              <a:t> </a:t>
+            </a:r>
+            <a:r>
+              <a:rPr lang="en-US" dirty="0" err="1"/>
+              <a:t>noch</a:t>
+            </a:r>
+            <a:r>
+              <a:rPr lang="en-US" dirty="0"/>
+              <a:t> </a:t>
+            </a:r>
+            <a:r>
+              <a:rPr lang="en-US" dirty="0" err="1"/>
+              <a:t>nicht</a:t>
+            </a:r>
+            <a:r>
+              <a:rPr lang="en-US" dirty="0"/>
+              <a:t> so </a:t>
+            </a:r>
+            <a:r>
+              <a:rPr lang="en-US" dirty="0" err="1"/>
+              <a:t>lange</a:t>
+            </a:r>
+            <a:r>
+              <a:rPr lang="en-US" dirty="0"/>
+              <a:t> von “</a:t>
+            </a:r>
+            <a:r>
+              <a:rPr lang="en-US" dirty="0" err="1"/>
+              <a:t>allen</a:t>
+            </a:r>
+            <a:r>
+              <a:rPr lang="en-US" dirty="0"/>
+              <a:t>” </a:t>
+            </a:r>
+            <a:r>
+              <a:rPr lang="en-US" dirty="0" err="1"/>
+              <a:t>Browsern</a:t>
+            </a:r>
+            <a:r>
+              <a:rPr lang="en-US" dirty="0"/>
+              <a:t> </a:t>
+            </a:r>
+            <a:r>
+              <a:rPr lang="en-US" dirty="0" err="1"/>
+              <a:t>unterstützt</a:t>
+            </a:r>
+            <a:r>
+              <a:rPr lang="en-US" dirty="0"/>
+              <a:t>. Z.B. IE11 </a:t>
+            </a:r>
+            <a:r>
+              <a:rPr lang="en-US" dirty="0" err="1"/>
+              <a:t>unterstützt</a:t>
+            </a:r>
+            <a:r>
+              <a:rPr lang="en-US" dirty="0"/>
+              <a:t> Grid </a:t>
+            </a:r>
+            <a:r>
+              <a:rPr lang="en-US" dirty="0" err="1"/>
+              <a:t>nicht</a:t>
+            </a:r>
+            <a:r>
+              <a:rPr lang="en-US" dirty="0"/>
+              <a:t>.</a:t>
+            </a:r>
+            <a:br>
+              <a:rPr lang="en-US" dirty="0"/>
+            </a:br>
+            <a:r>
+              <a:rPr lang="en-US" dirty="0">
+                <a:hlinkClick r:id="rId2"/>
+              </a:rPr>
+              <a:t>https://caniuse.com/#search=css-grid</a:t>
+            </a:r>
+            <a:endParaRPr lang="en-US" dirty="0"/>
           </a:p>
         </p:txBody>
       </p:sp>
@@ -25732,10 +26362,10 @@
       </p:grpSpPr>
       <p:sp>
         <p:nvSpPr>
-          <p:cNvPr id="2" name="Titel 1">
+          <p:cNvPr id="2" name="Title 1">
             <a:extLst>
               <a:ext uri="{FF2B5EF4-FFF2-40B4-BE49-F238E27FC236}">
-                <a16:creationId xmlns:a16="http://schemas.microsoft.com/office/drawing/2014/main" id="{2D87845B-83AD-7C4C-B581-5E1612E3AFF1}"/>
+                <a16:creationId xmlns:a16="http://schemas.microsoft.com/office/drawing/2014/main" id="{9A6ADDC8-E056-894B-9087-49C0DEA654AA}"/>
               </a:ext>
             </a:extLst>
           </p:cNvPr>
@@ -25752,86 +26382,201 @@
           <a:lstStyle/>
           <a:p>
             <a:r>
-              <a:rPr lang="de-DE" dirty="0"/>
-              <a:t>Literatur / Tutorials</a:t>
-            </a:r>
-          </a:p>
-        </p:txBody>
-      </p:sp>
-      <p:sp>
-        <p:nvSpPr>
-          <p:cNvPr id="3" name="Inhaltsplatzhalter 2">
+              <a:rPr lang="en-US" dirty="0"/>
+              <a:t>Grid: Line </a:t>
+            </a:r>
+          </a:p>
+        </p:txBody>
+      </p:sp>
+      <p:pic>
+        <p:nvPicPr>
+          <p:cNvPr id="5" name="Content Placeholder 4">
             <a:extLst>
               <a:ext uri="{FF2B5EF4-FFF2-40B4-BE49-F238E27FC236}">
-                <a16:creationId xmlns:a16="http://schemas.microsoft.com/office/drawing/2014/main" id="{180ECAA7-461F-3A48-BB16-AB334C364936}"/>
+                <a16:creationId xmlns:a16="http://schemas.microsoft.com/office/drawing/2014/main" id="{27ABC2B5-7CA8-B549-8F2E-CD7E632C4FF2}"/>
               </a:ext>
             </a:extLst>
           </p:cNvPr>
-          <p:cNvSpPr>
-            <a:spLocks noGrp="1"/>
-          </p:cNvSpPr>
+          <p:cNvPicPr>
+            <a:picLocks noGrp="1" noChangeAspect="1"/>
+          </p:cNvPicPr>
           <p:nvPr>
             <p:ph idx="1"/>
           </p:nvPr>
-        </p:nvSpPr>
-        <p:spPr/>
-        <p:txBody>
-          <a:bodyPr/>
+        </p:nvPicPr>
+        <p:blipFill>
+          <a:blip r:embed="rId2"/>
+          <a:stretch>
+            <a:fillRect/>
+          </a:stretch>
+        </p:blipFill>
+        <p:spPr>
+          <a:xfrm>
+            <a:off x="680321" y="2387600"/>
+            <a:ext cx="4930795" cy="3598863"/>
+          </a:xfrm>
+        </p:spPr>
+      </p:pic>
+      <p:sp>
+        <p:nvSpPr>
+          <p:cNvPr id="7" name="TextBox 6">
+            <a:extLst>
+              <a:ext uri="{FF2B5EF4-FFF2-40B4-BE49-F238E27FC236}">
+                <a16:creationId xmlns:a16="http://schemas.microsoft.com/office/drawing/2014/main" id="{33E5B256-2936-9B42-819B-6B2472E36E61}"/>
+              </a:ext>
+            </a:extLst>
+          </p:cNvPr>
+          <p:cNvSpPr txBox="1"/>
+          <p:nvPr/>
+        </p:nvSpPr>
+        <p:spPr>
+          <a:xfrm>
+            <a:off x="5963920" y="2387600"/>
+            <a:ext cx="5547759" cy="1477328"/>
+          </a:xfrm>
+          <a:prstGeom prst="rect">
+            <a:avLst/>
+          </a:prstGeom>
+          <a:noFill/>
+        </p:spPr>
+        <p:txBody>
+          <a:bodyPr wrap="square" rtlCol="0">
+            <a:spAutoFit/>
+          </a:bodyPr>
           <a:lstStyle/>
           <a:p>
             <a:r>
-              <a:rPr lang="de-DE" dirty="0">
-                <a:hlinkClick r:id="rId2"/>
-              </a:rPr>
-              <a:t>http://de.selfhtml.org/</a:t>
-            </a:r>
-            <a:endParaRPr lang="de-DE" dirty="0"/>
-          </a:p>
-          <a:p>
-            <a:r>
-              <a:rPr lang="de-DE" dirty="0">
-                <a:hlinkClick r:id="rId3"/>
-              </a:rPr>
-              <a:t>https://www.w3.org/standards/webdesign/htmlcss</a:t>
-            </a:r>
-            <a:endParaRPr lang="de-DE" dirty="0"/>
-          </a:p>
-          <a:p>
-            <a:r>
-              <a:rPr lang="de-DE" dirty="0">
-                <a:hlinkClick r:id="rId4"/>
-              </a:rPr>
-              <a:t>https://developer.mozilla.org/de/docs/Web/HTML</a:t>
-            </a:r>
-            <a:endParaRPr lang="de-DE" dirty="0"/>
-          </a:p>
-          <a:p>
-            <a:r>
-              <a:rPr lang="de-DE" dirty="0">
-                <a:hlinkClick r:id="rId5"/>
-              </a:rPr>
-              <a:t>https://developer.mozilla.org/de/docs/Web/CSS</a:t>
-            </a:r>
-            <a:endParaRPr lang="de-DE" dirty="0"/>
-          </a:p>
-          <a:p>
-            <a:r>
-              <a:rPr lang="de-DE" dirty="0">
-                <a:hlinkClick r:id="rId6"/>
-              </a:rPr>
-              <a:t>https://devdocs.io/</a:t>
-            </a:r>
-            <a:endParaRPr lang="de-DE" dirty="0"/>
-          </a:p>
-          <a:p>
-            <a:endParaRPr lang="de-DE" dirty="0"/>
+              <a:rPr lang="en-US" dirty="0"/>
+              <a:t>Grid Lines </a:t>
+            </a:r>
+            <a:r>
+              <a:rPr lang="en-US" dirty="0" err="1"/>
+              <a:t>sind</a:t>
+            </a:r>
+            <a:r>
+              <a:rPr lang="en-US" dirty="0"/>
+              <a:t> die </a:t>
+            </a:r>
+            <a:r>
+              <a:rPr lang="en-US" dirty="0" err="1"/>
+              <a:t>horizontalen</a:t>
+            </a:r>
+            <a:r>
+              <a:rPr lang="en-US" dirty="0"/>
+              <a:t> und </a:t>
+            </a:r>
+            <a:r>
+              <a:rPr lang="en-US" dirty="0" err="1"/>
+              <a:t>vertikalen</a:t>
+            </a:r>
+            <a:br>
+              <a:rPr lang="en-US" dirty="0"/>
+            </a:br>
+            <a:r>
+              <a:rPr lang="en-US" dirty="0"/>
+              <a:t>Linen, die die Basis der Grid </a:t>
+            </a:r>
+            <a:r>
+              <a:rPr lang="en-US" dirty="0" err="1"/>
+              <a:t>Struktur</a:t>
+            </a:r>
+            <a:r>
+              <a:rPr lang="en-US" dirty="0"/>
+              <a:t> </a:t>
+            </a:r>
+            <a:r>
+              <a:rPr lang="en-US" dirty="0" err="1"/>
+              <a:t>bilden</a:t>
+            </a:r>
+            <a:r>
+              <a:rPr lang="en-US" dirty="0"/>
+              <a:t>.</a:t>
+            </a:r>
+            <a:br>
+              <a:rPr lang="en-US" dirty="0"/>
+            </a:br>
+            <a:br>
+              <a:rPr lang="en-US" dirty="0"/>
+            </a:br>
+            <a:r>
+              <a:rPr lang="en-US" dirty="0" err="1"/>
+              <a:t>Wir</a:t>
+            </a:r>
+            <a:r>
+              <a:rPr lang="en-US" dirty="0"/>
+              <a:t> </a:t>
+            </a:r>
+            <a:r>
+              <a:rPr lang="en-US" dirty="0" err="1"/>
+              <a:t>können</a:t>
+            </a:r>
+            <a:r>
+              <a:rPr lang="en-US" dirty="0"/>
+              <a:t> </a:t>
+            </a:r>
+            <a:r>
+              <a:rPr lang="en-US" dirty="0" err="1"/>
+              <a:t>sie</a:t>
+            </a:r>
+            <a:r>
+              <a:rPr lang="en-US" dirty="0"/>
+              <a:t> </a:t>
+            </a:r>
+            <a:r>
+              <a:rPr lang="en-US" dirty="0" err="1"/>
+              <a:t>mit</a:t>
+            </a:r>
+            <a:r>
+              <a:rPr lang="en-US" dirty="0"/>
+              <a:t> </a:t>
+            </a:r>
+            <a:r>
+              <a:rPr lang="en-US" dirty="0" err="1"/>
+              <a:t>einem</a:t>
+            </a:r>
+            <a:r>
+              <a:rPr lang="en-US" dirty="0"/>
+              <a:t> </a:t>
+            </a:r>
+            <a:r>
+              <a:rPr lang="en-US" dirty="0" err="1"/>
+              <a:t>numerischen</a:t>
+            </a:r>
+            <a:r>
+              <a:rPr lang="en-US" dirty="0"/>
+              <a:t> Index </a:t>
+            </a:r>
+            <a:r>
+              <a:rPr lang="en-US" dirty="0" err="1"/>
+              <a:t>ansprechen</a:t>
+            </a:r>
+            <a:r>
+              <a:rPr lang="en-US" dirty="0"/>
+              <a:t>, der </a:t>
+            </a:r>
+            <a:r>
+              <a:rPr lang="en-US" dirty="0" err="1"/>
+              <a:t>mit</a:t>
+            </a:r>
+            <a:r>
+              <a:rPr lang="en-US" dirty="0"/>
+              <a:t> 1 </a:t>
+            </a:r>
+            <a:r>
+              <a:rPr lang="en-US" dirty="0" err="1"/>
+              <a:t>beginnt</a:t>
+            </a:r>
+            <a:r>
+              <a:rPr lang="en-US" dirty="0"/>
+              <a:t>.</a:t>
+            </a:r>
           </a:p>
         </p:txBody>
       </p:sp>
     </p:spTree>
     <p:extLst>
       <p:ext uri="{BB962C8B-B14F-4D97-AF65-F5344CB8AC3E}">
-        <p14:creationId xmlns:p14="http://schemas.microsoft.com/office/powerpoint/2010/main" val="2129769489"/>
+        <p14:creationId xmlns:p14="http://schemas.microsoft.com/office/powerpoint/2010/main" val="3358430858"/>
       </p:ext>
     </p:extLst>
   </p:cSld>
@@ -25952,6 +26697,582 @@
     <p:extLst>
       <p:ext uri="{BB962C8B-B14F-4D97-AF65-F5344CB8AC3E}">
         <p14:creationId xmlns:p14="http://schemas.microsoft.com/office/powerpoint/2010/main" val="632865316"/>
+      </p:ext>
+    </p:extLst>
+  </p:cSld>
+  <p:clrMapOvr>
+    <a:masterClrMapping/>
+  </p:clrMapOvr>
+</p:sld>
+</file>
+
+<file path=ppt/slides/slide80.xml><?xml version="1.0" encoding="utf-8"?>
+<p:sld xmlns:a="http://schemas.openxmlformats.org/drawingml/2006/main" xmlns:r="http://schemas.openxmlformats.org/officeDocument/2006/relationships" xmlns:p="http://schemas.openxmlformats.org/presentationml/2006/main">
+  <p:cSld>
+    <p:spTree>
+      <p:nvGrpSpPr>
+        <p:cNvPr id="1" name=""/>
+        <p:cNvGrpSpPr/>
+        <p:nvPr/>
+      </p:nvGrpSpPr>
+      <p:grpSpPr>
+        <a:xfrm>
+          <a:off x="0" y="0"/>
+          <a:ext cx="0" cy="0"/>
+          <a:chOff x="0" y="0"/>
+          <a:chExt cx="0" cy="0"/>
+        </a:xfrm>
+      </p:grpSpPr>
+      <p:sp>
+        <p:nvSpPr>
+          <p:cNvPr id="2" name="Title 1">
+            <a:extLst>
+              <a:ext uri="{FF2B5EF4-FFF2-40B4-BE49-F238E27FC236}">
+                <a16:creationId xmlns:a16="http://schemas.microsoft.com/office/drawing/2014/main" id="{BA683EE5-5BCB-B446-9775-80D8DA8D16D1}"/>
+              </a:ext>
+            </a:extLst>
+          </p:cNvPr>
+          <p:cNvSpPr>
+            <a:spLocks noGrp="1"/>
+          </p:cNvSpPr>
+          <p:nvPr>
+            <p:ph type="title"/>
+          </p:nvPr>
+        </p:nvSpPr>
+        <p:spPr/>
+        <p:txBody>
+          <a:bodyPr/>
+          <a:lstStyle/>
+          <a:p>
+            <a:r>
+              <a:rPr lang="en-US" dirty="0"/>
+              <a:t>Grid: Track </a:t>
+            </a:r>
+          </a:p>
+        </p:txBody>
+      </p:sp>
+      <p:pic>
+        <p:nvPicPr>
+          <p:cNvPr id="5" name="Content Placeholder 4">
+            <a:extLst>
+              <a:ext uri="{FF2B5EF4-FFF2-40B4-BE49-F238E27FC236}">
+                <a16:creationId xmlns:a16="http://schemas.microsoft.com/office/drawing/2014/main" id="{B49AE085-32BB-0D4A-A056-3B893133E100}"/>
+              </a:ext>
+            </a:extLst>
+          </p:cNvPr>
+          <p:cNvPicPr>
+            <a:picLocks noGrp="1" noChangeAspect="1"/>
+          </p:cNvPicPr>
+          <p:nvPr>
+            <p:ph idx="1"/>
+          </p:nvPr>
+        </p:nvPicPr>
+        <p:blipFill>
+          <a:blip r:embed="rId2"/>
+          <a:stretch>
+            <a:fillRect/>
+          </a:stretch>
+        </p:blipFill>
+        <p:spPr>
+          <a:xfrm>
+            <a:off x="680321" y="2377440"/>
+            <a:ext cx="4841769" cy="3598863"/>
+          </a:xfrm>
+        </p:spPr>
+      </p:pic>
+    </p:spTree>
+    <p:extLst>
+      <p:ext uri="{BB962C8B-B14F-4D97-AF65-F5344CB8AC3E}">
+        <p14:creationId xmlns:p14="http://schemas.microsoft.com/office/powerpoint/2010/main" val="2062539358"/>
+      </p:ext>
+    </p:extLst>
+  </p:cSld>
+  <p:clrMapOvr>
+    <a:masterClrMapping/>
+  </p:clrMapOvr>
+</p:sld>
+</file>
+
+<file path=ppt/slides/slide81.xml><?xml version="1.0" encoding="utf-8"?>
+<p:sld xmlns:a="http://schemas.openxmlformats.org/drawingml/2006/main" xmlns:r="http://schemas.openxmlformats.org/officeDocument/2006/relationships" xmlns:p="http://schemas.openxmlformats.org/presentationml/2006/main">
+  <p:cSld>
+    <p:spTree>
+      <p:nvGrpSpPr>
+        <p:cNvPr id="1" name=""/>
+        <p:cNvGrpSpPr/>
+        <p:nvPr/>
+      </p:nvGrpSpPr>
+      <p:grpSpPr>
+        <a:xfrm>
+          <a:off x="0" y="0"/>
+          <a:ext cx="0" cy="0"/>
+          <a:chOff x="0" y="0"/>
+          <a:chExt cx="0" cy="0"/>
+        </a:xfrm>
+      </p:grpSpPr>
+      <p:sp>
+        <p:nvSpPr>
+          <p:cNvPr id="2" name="Title 1">
+            <a:extLst>
+              <a:ext uri="{FF2B5EF4-FFF2-40B4-BE49-F238E27FC236}">
+                <a16:creationId xmlns:a16="http://schemas.microsoft.com/office/drawing/2014/main" id="{9D70707D-CDCD-8E4A-9738-E3DB279BB242}"/>
+              </a:ext>
+            </a:extLst>
+          </p:cNvPr>
+          <p:cNvSpPr>
+            <a:spLocks noGrp="1"/>
+          </p:cNvSpPr>
+          <p:nvPr>
+            <p:ph type="title"/>
+          </p:nvPr>
+        </p:nvSpPr>
+        <p:spPr/>
+        <p:txBody>
+          <a:bodyPr/>
+          <a:lstStyle/>
+          <a:p>
+            <a:r>
+              <a:rPr lang="en-US" dirty="0"/>
+              <a:t>Grid: Cell</a:t>
+            </a:r>
+          </a:p>
+        </p:txBody>
+      </p:sp>
+      <p:pic>
+        <p:nvPicPr>
+          <p:cNvPr id="5" name="Content Placeholder 4">
+            <a:extLst>
+              <a:ext uri="{FF2B5EF4-FFF2-40B4-BE49-F238E27FC236}">
+                <a16:creationId xmlns:a16="http://schemas.microsoft.com/office/drawing/2014/main" id="{8A33BD41-B2E8-AD40-A533-1CE72D6B0724}"/>
+              </a:ext>
+            </a:extLst>
+          </p:cNvPr>
+          <p:cNvPicPr>
+            <a:picLocks noGrp="1" noChangeAspect="1"/>
+          </p:cNvPicPr>
+          <p:nvPr>
+            <p:ph idx="1"/>
+          </p:nvPr>
+        </p:nvPicPr>
+        <p:blipFill>
+          <a:blip r:embed="rId2"/>
+          <a:stretch>
+            <a:fillRect/>
+          </a:stretch>
+        </p:blipFill>
+        <p:spPr>
+          <a:xfrm>
+            <a:off x="680321" y="2336800"/>
+            <a:ext cx="4986722" cy="3598863"/>
+          </a:xfrm>
+        </p:spPr>
+      </p:pic>
+    </p:spTree>
+    <p:extLst>
+      <p:ext uri="{BB962C8B-B14F-4D97-AF65-F5344CB8AC3E}">
+        <p14:creationId xmlns:p14="http://schemas.microsoft.com/office/powerpoint/2010/main" val="366060195"/>
+      </p:ext>
+    </p:extLst>
+  </p:cSld>
+  <p:clrMapOvr>
+    <a:masterClrMapping/>
+  </p:clrMapOvr>
+</p:sld>
+</file>
+
+<file path=ppt/slides/slide82.xml><?xml version="1.0" encoding="utf-8"?>
+<p:sld xmlns:a="http://schemas.openxmlformats.org/drawingml/2006/main" xmlns:r="http://schemas.openxmlformats.org/officeDocument/2006/relationships" xmlns:p="http://schemas.openxmlformats.org/presentationml/2006/main">
+  <p:cSld>
+    <p:spTree>
+      <p:nvGrpSpPr>
+        <p:cNvPr id="1" name=""/>
+        <p:cNvGrpSpPr/>
+        <p:nvPr/>
+      </p:nvGrpSpPr>
+      <p:grpSpPr>
+        <a:xfrm>
+          <a:off x="0" y="0"/>
+          <a:ext cx="0" cy="0"/>
+          <a:chOff x="0" y="0"/>
+          <a:chExt cx="0" cy="0"/>
+        </a:xfrm>
+      </p:grpSpPr>
+      <p:sp>
+        <p:nvSpPr>
+          <p:cNvPr id="2" name="Title 1">
+            <a:extLst>
+              <a:ext uri="{FF2B5EF4-FFF2-40B4-BE49-F238E27FC236}">
+                <a16:creationId xmlns:a16="http://schemas.microsoft.com/office/drawing/2014/main" id="{D19ADA92-AB07-1841-8DDE-D3B5425A6490}"/>
+              </a:ext>
+            </a:extLst>
+          </p:cNvPr>
+          <p:cNvSpPr>
+            <a:spLocks noGrp="1"/>
+          </p:cNvSpPr>
+          <p:nvPr>
+            <p:ph type="title"/>
+          </p:nvPr>
+        </p:nvSpPr>
+        <p:spPr/>
+        <p:txBody>
+          <a:bodyPr/>
+          <a:lstStyle/>
+          <a:p>
+            <a:r>
+              <a:rPr lang="en-US" dirty="0" err="1"/>
+              <a:t>Übung</a:t>
+            </a:r>
+            <a:r>
+              <a:rPr lang="en-US" dirty="0"/>
+              <a:t>: Grid</a:t>
+            </a:r>
+          </a:p>
+        </p:txBody>
+      </p:sp>
+      <p:sp>
+        <p:nvSpPr>
+          <p:cNvPr id="3" name="Content Placeholder 2">
+            <a:extLst>
+              <a:ext uri="{FF2B5EF4-FFF2-40B4-BE49-F238E27FC236}">
+                <a16:creationId xmlns:a16="http://schemas.microsoft.com/office/drawing/2014/main" id="{C07A7911-8529-6443-A319-D1F59B30DAF5}"/>
+              </a:ext>
+            </a:extLst>
+          </p:cNvPr>
+          <p:cNvSpPr>
+            <a:spLocks noGrp="1"/>
+          </p:cNvSpPr>
+          <p:nvPr>
+            <p:ph idx="1"/>
+          </p:nvPr>
+        </p:nvSpPr>
+        <p:spPr/>
+        <p:txBody>
+          <a:bodyPr/>
+          <a:lstStyle/>
+          <a:p>
+            <a:r>
+              <a:rPr lang="en-US" dirty="0" err="1"/>
+              <a:t>Spielchen</a:t>
+            </a:r>
+            <a:r>
+              <a:rPr lang="en-US" dirty="0"/>
+              <a:t> </a:t>
+            </a:r>
+            <a:r>
+              <a:rPr lang="en-US" dirty="0" err="1"/>
+              <a:t>spielen</a:t>
+            </a:r>
+            <a:br>
+              <a:rPr lang="en-US" dirty="0"/>
+            </a:br>
+            <a:r>
+              <a:rPr lang="en-US" dirty="0">
+                <a:hlinkClick r:id="rId2"/>
+              </a:rPr>
+              <a:t>http://cssgridgarden.com/</a:t>
+            </a:r>
+            <a:endParaRPr lang="en-US" dirty="0"/>
+          </a:p>
+        </p:txBody>
+      </p:sp>
+    </p:spTree>
+    <p:extLst>
+      <p:ext uri="{BB962C8B-B14F-4D97-AF65-F5344CB8AC3E}">
+        <p14:creationId xmlns:p14="http://schemas.microsoft.com/office/powerpoint/2010/main" val="158470080"/>
+      </p:ext>
+    </p:extLst>
+  </p:cSld>
+  <p:clrMapOvr>
+    <a:masterClrMapping/>
+  </p:clrMapOvr>
+</p:sld>
+</file>
+
+<file path=ppt/slides/slide83.xml><?xml version="1.0" encoding="utf-8"?>
+<p:sld xmlns:a="http://schemas.openxmlformats.org/drawingml/2006/main" xmlns:r="http://schemas.openxmlformats.org/officeDocument/2006/relationships" xmlns:p="http://schemas.openxmlformats.org/presentationml/2006/main">
+  <p:cSld>
+    <p:spTree>
+      <p:nvGrpSpPr>
+        <p:cNvPr id="1" name=""/>
+        <p:cNvGrpSpPr/>
+        <p:nvPr/>
+      </p:nvGrpSpPr>
+      <p:grpSpPr>
+        <a:xfrm>
+          <a:off x="0" y="0"/>
+          <a:ext cx="0" cy="0"/>
+          <a:chOff x="0" y="0"/>
+          <a:chExt cx="0" cy="0"/>
+        </a:xfrm>
+      </p:grpSpPr>
+      <p:sp>
+        <p:nvSpPr>
+          <p:cNvPr id="2" name="Title 1">
+            <a:extLst>
+              <a:ext uri="{FF2B5EF4-FFF2-40B4-BE49-F238E27FC236}">
+                <a16:creationId xmlns:a16="http://schemas.microsoft.com/office/drawing/2014/main" id="{58994F0E-647A-0C41-80BC-C60EF5E95A7A}"/>
+              </a:ext>
+            </a:extLst>
+          </p:cNvPr>
+          <p:cNvSpPr>
+            <a:spLocks noGrp="1"/>
+          </p:cNvSpPr>
+          <p:nvPr>
+            <p:ph type="title"/>
+          </p:nvPr>
+        </p:nvSpPr>
+        <p:spPr/>
+        <p:txBody>
+          <a:bodyPr/>
+          <a:lstStyle/>
+          <a:p>
+            <a:r>
+              <a:rPr lang="en-US" dirty="0" err="1"/>
+              <a:t>Übung</a:t>
+            </a:r>
+            <a:r>
+              <a:rPr lang="en-US" dirty="0"/>
+              <a:t>: Grid</a:t>
+            </a:r>
+          </a:p>
+        </p:txBody>
+      </p:sp>
+      <p:sp>
+        <p:nvSpPr>
+          <p:cNvPr id="3" name="Content Placeholder 2">
+            <a:extLst>
+              <a:ext uri="{FF2B5EF4-FFF2-40B4-BE49-F238E27FC236}">
+                <a16:creationId xmlns:a16="http://schemas.microsoft.com/office/drawing/2014/main" id="{75AAAD3E-2855-7643-971B-425BE11FB762}"/>
+              </a:ext>
+            </a:extLst>
+          </p:cNvPr>
+          <p:cNvSpPr>
+            <a:spLocks noGrp="1"/>
+          </p:cNvSpPr>
+          <p:nvPr>
+            <p:ph idx="1"/>
+          </p:nvPr>
+        </p:nvSpPr>
+        <p:spPr/>
+        <p:txBody>
+          <a:bodyPr/>
+          <a:lstStyle/>
+          <a:p>
+            <a:r>
+              <a:rPr lang="de" dirty="0"/>
+              <a:t>Baue ein Holy-</a:t>
+            </a:r>
+            <a:r>
+              <a:rPr lang="de" dirty="0" err="1"/>
+              <a:t>Grail</a:t>
+            </a:r>
+            <a:r>
+              <a:rPr lang="de" dirty="0"/>
+              <a:t> Layout mit </a:t>
+            </a:r>
+            <a:r>
+              <a:rPr lang="de" dirty="0" err="1"/>
+              <a:t>Grid</a:t>
+            </a:r>
+            <a:r>
+              <a:rPr lang="de" dirty="0"/>
+              <a:t> Layout</a:t>
+            </a:r>
+            <a:br>
+              <a:rPr lang="de" dirty="0"/>
+            </a:br>
+            <a:br>
+              <a:rPr lang="de" dirty="0"/>
+            </a:br>
+            <a:r>
+              <a:rPr lang="de" dirty="0"/>
+              <a:t>Verwende Hintergrund-Farben um die Ausdehnung der einzelnen Bereiche zu visualisieren </a:t>
+            </a:r>
+          </a:p>
+          <a:p>
+            <a:endParaRPr lang="en-US" dirty="0"/>
+          </a:p>
+        </p:txBody>
+      </p:sp>
+      <p:pic>
+        <p:nvPicPr>
+          <p:cNvPr id="4" name="Picture 1" descr="page30image31640000">
+            <a:extLst>
+              <a:ext uri="{FF2B5EF4-FFF2-40B4-BE49-F238E27FC236}">
+                <a16:creationId xmlns:a16="http://schemas.microsoft.com/office/drawing/2014/main" id="{C86BE1CC-3176-8549-9191-9834F390617A}"/>
+              </a:ext>
+            </a:extLst>
+          </p:cNvPr>
+          <p:cNvPicPr>
+            <a:picLocks noChangeAspect="1" noChangeArrowheads="1"/>
+          </p:cNvPicPr>
+          <p:nvPr/>
+        </p:nvPicPr>
+        <p:blipFill>
+          <a:blip r:embed="rId2">
+            <a:extLst>
+              <a:ext uri="{28A0092B-C50C-407E-A947-70E740481C1C}">
+                <a14:useLocalDpi xmlns:a14="http://schemas.microsoft.com/office/drawing/2010/main" val="0"/>
+              </a:ext>
+            </a:extLst>
+          </a:blip>
+          <a:srcRect/>
+          <a:stretch>
+            <a:fillRect/>
+          </a:stretch>
+        </p:blipFill>
+        <p:spPr bwMode="auto">
+          <a:xfrm>
+            <a:off x="3833261" y="3834358"/>
+            <a:ext cx="3307979" cy="2472458"/>
+          </a:xfrm>
+          <a:prstGeom prst="rect">
+            <a:avLst/>
+          </a:prstGeom>
+          <a:noFill/>
+          <a:extLst>
+            <a:ext uri="{909E8E84-426E-40DD-AFC4-6F175D3DCCD1}">
+              <a14:hiddenFill xmlns:a14="http://schemas.microsoft.com/office/drawing/2010/main">
+                <a:solidFill>
+                  <a:srgbClr val="FFFFFF"/>
+                </a:solidFill>
+              </a14:hiddenFill>
+            </a:ext>
+          </a:extLst>
+        </p:spPr>
+      </p:pic>
+    </p:spTree>
+    <p:extLst>
+      <p:ext uri="{BB962C8B-B14F-4D97-AF65-F5344CB8AC3E}">
+        <p14:creationId xmlns:p14="http://schemas.microsoft.com/office/powerpoint/2010/main" val="1217868488"/>
+      </p:ext>
+    </p:extLst>
+  </p:cSld>
+  <p:clrMapOvr>
+    <a:masterClrMapping/>
+  </p:clrMapOvr>
+</p:sld>
+</file>
+
+<file path=ppt/slides/slide84.xml><?xml version="1.0" encoding="utf-8"?>
+<p:sld xmlns:a="http://schemas.openxmlformats.org/drawingml/2006/main" xmlns:r="http://schemas.openxmlformats.org/officeDocument/2006/relationships" xmlns:p="http://schemas.openxmlformats.org/presentationml/2006/main">
+  <p:cSld>
+    <p:spTree>
+      <p:nvGrpSpPr>
+        <p:cNvPr id="1" name=""/>
+        <p:cNvGrpSpPr/>
+        <p:nvPr/>
+      </p:nvGrpSpPr>
+      <p:grpSpPr>
+        <a:xfrm>
+          <a:off x="0" y="0"/>
+          <a:ext cx="0" cy="0"/>
+          <a:chOff x="0" y="0"/>
+          <a:chExt cx="0" cy="0"/>
+        </a:xfrm>
+      </p:grpSpPr>
+      <p:sp>
+        <p:nvSpPr>
+          <p:cNvPr id="2" name="Titel 1">
+            <a:extLst>
+              <a:ext uri="{FF2B5EF4-FFF2-40B4-BE49-F238E27FC236}">
+                <a16:creationId xmlns:a16="http://schemas.microsoft.com/office/drawing/2014/main" id="{2D87845B-83AD-7C4C-B581-5E1612E3AFF1}"/>
+              </a:ext>
+            </a:extLst>
+          </p:cNvPr>
+          <p:cNvSpPr>
+            <a:spLocks noGrp="1"/>
+          </p:cNvSpPr>
+          <p:nvPr>
+            <p:ph type="title"/>
+          </p:nvPr>
+        </p:nvSpPr>
+        <p:spPr/>
+        <p:txBody>
+          <a:bodyPr/>
+          <a:lstStyle/>
+          <a:p>
+            <a:r>
+              <a:rPr lang="de-DE" dirty="0"/>
+              <a:t>Literatur / Tutorials</a:t>
+            </a:r>
+          </a:p>
+        </p:txBody>
+      </p:sp>
+      <p:sp>
+        <p:nvSpPr>
+          <p:cNvPr id="3" name="Inhaltsplatzhalter 2">
+            <a:extLst>
+              <a:ext uri="{FF2B5EF4-FFF2-40B4-BE49-F238E27FC236}">
+                <a16:creationId xmlns:a16="http://schemas.microsoft.com/office/drawing/2014/main" id="{180ECAA7-461F-3A48-BB16-AB334C364936}"/>
+              </a:ext>
+            </a:extLst>
+          </p:cNvPr>
+          <p:cNvSpPr>
+            <a:spLocks noGrp="1"/>
+          </p:cNvSpPr>
+          <p:nvPr>
+            <p:ph idx="1"/>
+          </p:nvPr>
+        </p:nvSpPr>
+        <p:spPr/>
+        <p:txBody>
+          <a:bodyPr/>
+          <a:lstStyle/>
+          <a:p>
+            <a:r>
+              <a:rPr lang="de-DE" dirty="0">
+                <a:hlinkClick r:id="rId2"/>
+              </a:rPr>
+              <a:t>http://de.selfhtml.org/</a:t>
+            </a:r>
+            <a:endParaRPr lang="de-DE" dirty="0"/>
+          </a:p>
+          <a:p>
+            <a:r>
+              <a:rPr lang="de-DE" dirty="0">
+                <a:hlinkClick r:id="rId3"/>
+              </a:rPr>
+              <a:t>https://www.w3.org/standards/webdesign/htmlcss</a:t>
+            </a:r>
+            <a:endParaRPr lang="de-DE" dirty="0"/>
+          </a:p>
+          <a:p>
+            <a:r>
+              <a:rPr lang="de-DE" dirty="0">
+                <a:hlinkClick r:id="rId4"/>
+              </a:rPr>
+              <a:t>https://developer.mozilla.org/de/docs/Web/HTML</a:t>
+            </a:r>
+            <a:endParaRPr lang="de-DE" dirty="0"/>
+          </a:p>
+          <a:p>
+            <a:r>
+              <a:rPr lang="de-DE" dirty="0">
+                <a:hlinkClick r:id="rId5"/>
+              </a:rPr>
+              <a:t>https://developer.mozilla.org/de/docs/Web/CSS</a:t>
+            </a:r>
+            <a:endParaRPr lang="de-DE" dirty="0"/>
+          </a:p>
+          <a:p>
+            <a:r>
+              <a:rPr lang="de-DE" dirty="0">
+                <a:hlinkClick r:id="rId6"/>
+              </a:rPr>
+              <a:t>https://devdocs.io/</a:t>
+            </a:r>
+            <a:endParaRPr lang="de-DE" dirty="0"/>
+          </a:p>
+          <a:p>
+            <a:endParaRPr lang="de-DE" dirty="0"/>
+          </a:p>
+        </p:txBody>
+      </p:sp>
+    </p:spTree>
+    <p:extLst>
+      <p:ext uri="{BB962C8B-B14F-4D97-AF65-F5344CB8AC3E}">
+        <p14:creationId xmlns:p14="http://schemas.microsoft.com/office/powerpoint/2010/main" val="2129769489"/>
       </p:ext>
     </p:extLst>
   </p:cSld>

</xml_diff>

<commit_message>
CSS Grid zur PP Präsentation hinzugefügt.
</commit_message>
<xml_diff>
--- a/html Schulung.pptx
+++ b/html Schulung.pptx
@@ -5,7 +5,7 @@
     <p:sldMasterId id="2147483660" r:id="rId1"/>
   </p:sldMasterIdLst>
   <p:notesMasterIdLst>
-    <p:notesMasterId r:id="rId86"/>
+    <p:notesMasterId r:id="rId95"/>
   </p:notesMasterIdLst>
   <p:sldIdLst>
     <p:sldId id="256" r:id="rId2"/>
@@ -89,9 +89,18 @@
     <p:sldId id="335" r:id="rId80"/>
     <p:sldId id="336" r:id="rId81"/>
     <p:sldId id="339" r:id="rId82"/>
-    <p:sldId id="337" r:id="rId83"/>
-    <p:sldId id="338" r:id="rId84"/>
-    <p:sldId id="264" r:id="rId85"/>
+    <p:sldId id="340" r:id="rId83"/>
+    <p:sldId id="341" r:id="rId84"/>
+    <p:sldId id="342" r:id="rId85"/>
+    <p:sldId id="343" r:id="rId86"/>
+    <p:sldId id="344" r:id="rId87"/>
+    <p:sldId id="345" r:id="rId88"/>
+    <p:sldId id="346" r:id="rId89"/>
+    <p:sldId id="347" r:id="rId90"/>
+    <p:sldId id="348" r:id="rId91"/>
+    <p:sldId id="337" r:id="rId92"/>
+    <p:sldId id="338" r:id="rId93"/>
+    <p:sldId id="264" r:id="rId94"/>
   </p:sldIdLst>
   <p:sldSz cx="12192000" cy="6858000"/>
   <p:notesSz cx="6858000" cy="9144000"/>
@@ -433,7 +442,7 @@
           <a:p>
             <a:fld id="{60940F8C-0819-D64A-BC61-6EB4B2E2912A}" type="slidenum">
               <a:rPr lang="de-DE" smtClean="0"/>
-              <a:t>‹#›</a:t>
+              <a:t>‹Nr.›</a:t>
             </a:fld>
             <a:endParaRPr lang="de-DE"/>
           </a:p>
@@ -1535,7 +1544,7 @@
           <a:p>
             <a:fld id="{D90341C6-B83F-F944-B0DF-A5D91789E42C}" type="slidenum">
               <a:rPr lang="de-DE" smtClean="0"/>
-              <a:t>‹#›</a:t>
+              <a:t>‹Nr.›</a:t>
             </a:fld>
             <a:endParaRPr lang="de-DE"/>
           </a:p>
@@ -1954,7 +1963,7 @@
           <a:p>
             <a:fld id="{D90341C6-B83F-F944-B0DF-A5D91789E42C}" type="slidenum">
               <a:rPr lang="de-DE" smtClean="0"/>
-              <a:t>‹#›</a:t>
+              <a:t>‹Nr.›</a:t>
             </a:fld>
             <a:endParaRPr lang="de-DE"/>
           </a:p>
@@ -2295,7 +2304,7 @@
           <a:p>
             <a:fld id="{D90341C6-B83F-F944-B0DF-A5D91789E42C}" type="slidenum">
               <a:rPr lang="de-DE" smtClean="0"/>
-              <a:t>‹#›</a:t>
+              <a:t>‹Nr.›</a:t>
             </a:fld>
             <a:endParaRPr lang="de-DE"/>
           </a:p>
@@ -2710,7 +2719,7 @@
           <a:p>
             <a:fld id="{D90341C6-B83F-F944-B0DF-A5D91789E42C}" type="slidenum">
               <a:rPr lang="de-DE" smtClean="0"/>
-              <a:t>‹#›</a:t>
+              <a:t>‹Nr.›</a:t>
             </a:fld>
             <a:endParaRPr lang="de-DE"/>
           </a:p>
@@ -3283,7 +3292,7 @@
           <a:p>
             <a:fld id="{D90341C6-B83F-F944-B0DF-A5D91789E42C}" type="slidenum">
               <a:rPr lang="de-DE" smtClean="0"/>
-              <a:t>‹#›</a:t>
+              <a:t>‹Nr.›</a:t>
             </a:fld>
             <a:endParaRPr lang="de-DE"/>
           </a:p>
@@ -3989,7 +3998,7 @@
           <a:p>
             <a:fld id="{D90341C6-B83F-F944-B0DF-A5D91789E42C}" type="slidenum">
               <a:rPr lang="de-DE" smtClean="0"/>
-              <a:t>‹#›</a:t>
+              <a:t>‹Nr.›</a:t>
             </a:fld>
             <a:endParaRPr lang="de-DE"/>
           </a:p>
@@ -4932,7 +4941,7 @@
           <a:p>
             <a:fld id="{D90341C6-B83F-F944-B0DF-A5D91789E42C}" type="slidenum">
               <a:rPr lang="de-DE" smtClean="0"/>
-              <a:t>‹#›</a:t>
+              <a:t>‹Nr.›</a:t>
             </a:fld>
             <a:endParaRPr lang="de-DE"/>
           </a:p>
@@ -5221,7 +5230,7 @@
           <a:p>
             <a:fld id="{D90341C6-B83F-F944-B0DF-A5D91789E42C}" type="slidenum">
               <a:rPr lang="de-DE" smtClean="0"/>
-              <a:t>‹#›</a:t>
+              <a:t>‹Nr.›</a:t>
             </a:fld>
             <a:endParaRPr lang="de-DE"/>
           </a:p>
@@ -5475,7 +5484,7 @@
           <a:p>
             <a:fld id="{D90341C6-B83F-F944-B0DF-A5D91789E42C}" type="slidenum">
               <a:rPr lang="de-DE" smtClean="0"/>
-              <a:t>‹#›</a:t>
+              <a:t>‹Nr.›</a:t>
             </a:fld>
             <a:endParaRPr lang="de-DE"/>
           </a:p>
@@ -5760,7 +5769,7 @@
           <a:p>
             <a:fld id="{D90341C6-B83F-F944-B0DF-A5D91789E42C}" type="slidenum">
               <a:rPr lang="de-DE" smtClean="0"/>
-              <a:t>‹#›</a:t>
+              <a:t>‹Nr.›</a:t>
             </a:fld>
             <a:endParaRPr lang="de-DE"/>
           </a:p>
@@ -6159,7 +6168,7 @@
           <a:p>
             <a:fld id="{D90341C6-B83F-F944-B0DF-A5D91789E42C}" type="slidenum">
               <a:rPr lang="de-DE" smtClean="0"/>
-              <a:t>‹#›</a:t>
+              <a:t>‹Nr.›</a:t>
             </a:fld>
             <a:endParaRPr lang="de-DE"/>
           </a:p>
@@ -6482,7 +6491,7 @@
           <a:p>
             <a:fld id="{D90341C6-B83F-F944-B0DF-A5D91789E42C}" type="slidenum">
               <a:rPr lang="de-DE" smtClean="0"/>
-              <a:t>‹#›</a:t>
+              <a:t>‹Nr.›</a:t>
             </a:fld>
             <a:endParaRPr lang="de-DE"/>
           </a:p>
@@ -6950,7 +6959,7 @@
           <a:p>
             <a:fld id="{D90341C6-B83F-F944-B0DF-A5D91789E42C}" type="slidenum">
               <a:rPr lang="de-DE" smtClean="0"/>
-              <a:t>‹#›</a:t>
+              <a:t>‹Nr.›</a:t>
             </a:fld>
             <a:endParaRPr lang="de-DE"/>
           </a:p>
@@ -7207,7 +7216,7 @@
           <a:p>
             <a:fld id="{D90341C6-B83F-F944-B0DF-A5D91789E42C}" type="slidenum">
               <a:rPr lang="de-DE" smtClean="0"/>
-              <a:t>‹#›</a:t>
+              <a:t>‹Nr.›</a:t>
             </a:fld>
             <a:endParaRPr lang="de-DE"/>
           </a:p>
@@ -7370,7 +7379,7 @@
           <a:p>
             <a:fld id="{D90341C6-B83F-F944-B0DF-A5D91789E42C}" type="slidenum">
               <a:rPr lang="de-DE" smtClean="0"/>
-              <a:t>‹#›</a:t>
+              <a:t>‹Nr.›</a:t>
             </a:fld>
             <a:endParaRPr lang="de-DE"/>
           </a:p>
@@ -7741,7 +7750,7 @@
           <a:p>
             <a:fld id="{D90341C6-B83F-F944-B0DF-A5D91789E42C}" type="slidenum">
               <a:rPr lang="de-DE" smtClean="0"/>
-              <a:t>‹#›</a:t>
+              <a:t>‹Nr.›</a:t>
             </a:fld>
             <a:endParaRPr lang="de-DE"/>
           </a:p>
@@ -8155,7 +8164,7 @@
           <a:p>
             <a:fld id="{D90341C6-B83F-F944-B0DF-A5D91789E42C}" type="slidenum">
               <a:rPr lang="de-DE" smtClean="0"/>
-              <a:t>‹#›</a:t>
+              <a:t>‹Nr.›</a:t>
             </a:fld>
             <a:endParaRPr lang="de-DE"/>
           </a:p>
@@ -8411,7 +8420,7 @@
           <a:p>
             <a:fld id="{D90341C6-B83F-F944-B0DF-A5D91789E42C}" type="slidenum">
               <a:rPr lang="de-DE" smtClean="0"/>
-              <a:t>‹#›</a:t>
+              <a:t>‹Nr.›</a:t>
             </a:fld>
             <a:endParaRPr lang="de-DE"/>
           </a:p>
@@ -26746,17 +26755,17 @@
           <a:p>
             <a:r>
               <a:rPr lang="en-US" dirty="0"/>
-              <a:t>Grid: Track </a:t>
+              <a:t>Grid: Track, Cell, Area </a:t>
             </a:r>
           </a:p>
         </p:txBody>
       </p:sp>
       <p:pic>
         <p:nvPicPr>
-          <p:cNvPr id="5" name="Content Placeholder 4">
+          <p:cNvPr id="8" name="Inhaltsplatzhalter 7">
             <a:extLst>
               <a:ext uri="{FF2B5EF4-FFF2-40B4-BE49-F238E27FC236}">
-                <a16:creationId xmlns:a16="http://schemas.microsoft.com/office/drawing/2014/main" id="{B49AE085-32BB-0D4A-A056-3B893133E100}"/>
+                <a16:creationId xmlns:a16="http://schemas.microsoft.com/office/drawing/2014/main" id="{B53AF9A3-D986-604B-94C1-C0CA2C5A5858}"/>
               </a:ext>
             </a:extLst>
           </p:cNvPr>
@@ -26775,8 +26784,8 @@
         </p:blipFill>
         <p:spPr>
           <a:xfrm>
-            <a:off x="680321" y="2377440"/>
-            <a:ext cx="4841769" cy="3598863"/>
+            <a:off x="680321" y="2336800"/>
+            <a:ext cx="6435109" cy="3598863"/>
           </a:xfrm>
         </p:spPr>
       </p:pic>
@@ -26833,40 +26842,84 @@
           <a:p>
             <a:r>
               <a:rPr lang="en-US" dirty="0"/>
-              <a:t>Grid: Cell</a:t>
-            </a:r>
-          </a:p>
-        </p:txBody>
-      </p:sp>
-      <p:pic>
-        <p:nvPicPr>
-          <p:cNvPr id="5" name="Content Placeholder 4">
+              <a:t>Grid</a:t>
+            </a:r>
+          </a:p>
+        </p:txBody>
+      </p:sp>
+      <p:sp>
+        <p:nvSpPr>
+          <p:cNvPr id="4" name="Inhaltsplatzhalter 3">
             <a:extLst>
               <a:ext uri="{FF2B5EF4-FFF2-40B4-BE49-F238E27FC236}">
-                <a16:creationId xmlns:a16="http://schemas.microsoft.com/office/drawing/2014/main" id="{8A33BD41-B2E8-AD40-A533-1CE72D6B0724}"/>
+                <a16:creationId xmlns:a16="http://schemas.microsoft.com/office/drawing/2014/main" id="{5F467F9B-4189-6546-A21B-AF6B8FA98FE2}"/>
               </a:ext>
             </a:extLst>
           </p:cNvPr>
-          <p:cNvPicPr>
-            <a:picLocks noGrp="1" noChangeAspect="1"/>
-          </p:cNvPicPr>
+          <p:cNvSpPr>
+            <a:spLocks noGrp="1"/>
+          </p:cNvSpPr>
           <p:nvPr>
             <p:ph idx="1"/>
           </p:nvPr>
-        </p:nvPicPr>
-        <p:blipFill>
-          <a:blip r:embed="rId2"/>
-          <a:stretch>
-            <a:fillRect/>
-          </a:stretch>
-        </p:blipFill>
-        <p:spPr>
-          <a:xfrm>
-            <a:off x="680321" y="2336800"/>
-            <a:ext cx="4986722" cy="3598863"/>
-          </a:xfrm>
-        </p:spPr>
-      </p:pic>
+        </p:nvSpPr>
+        <p:spPr/>
+        <p:txBody>
+          <a:bodyPr/>
+          <a:lstStyle/>
+          <a:p>
+            <a:r>
+              <a:rPr lang="de-DE" dirty="0" err="1"/>
+              <a:t>Grid</a:t>
+            </a:r>
+            <a:r>
+              <a:rPr lang="de-DE" dirty="0"/>
+              <a:t> Layout auf dem Container (Parent Element) definieren</a:t>
+            </a:r>
+            <a:br>
+              <a:rPr lang="de-DE" dirty="0"/>
+            </a:br>
+            <a:r>
+              <a:rPr lang="de-DE" b="1" dirty="0" err="1"/>
+              <a:t>display</a:t>
+            </a:r>
+            <a:r>
+              <a:rPr lang="de-DE" b="1" dirty="0"/>
+              <a:t>: </a:t>
+            </a:r>
+            <a:r>
+              <a:rPr lang="de-DE" b="1" dirty="0" err="1"/>
+              <a:t>grid</a:t>
+            </a:r>
+            <a:endParaRPr lang="de-DE" b="1" dirty="0"/>
+          </a:p>
+          <a:p>
+            <a:r>
+              <a:rPr lang="de-DE" dirty="0"/>
+              <a:t>Gute Doku:</a:t>
+            </a:r>
+            <a:br>
+              <a:rPr lang="de-DE" dirty="0"/>
+            </a:br>
+            <a:r>
+              <a:rPr lang="de-DE" dirty="0">
+                <a:hlinkClick r:id="rId2"/>
+              </a:rPr>
+              <a:t>https://css-tricks.com/snippets/css/complete-guide-grid/</a:t>
+            </a:r>
+            <a:endParaRPr lang="de-DE" dirty="0"/>
+          </a:p>
+          <a:p>
+            <a:pPr marL="0" indent="0">
+              <a:buNone/>
+            </a:pPr>
+            <a:endParaRPr lang="de-DE" dirty="0"/>
+          </a:p>
+          <a:p>
+            <a:endParaRPr lang="de-DE" dirty="0"/>
+          </a:p>
+        </p:txBody>
+      </p:sp>
     </p:spTree>
     <p:extLst>
       <p:ext uri="{BB962C8B-B14F-4D97-AF65-F5344CB8AC3E}">
@@ -26899,6 +26952,2960 @@
       </p:grpSpPr>
       <p:sp>
         <p:nvSpPr>
+          <p:cNvPr id="2" name="Titel 1">
+            <a:extLst>
+              <a:ext uri="{FF2B5EF4-FFF2-40B4-BE49-F238E27FC236}">
+                <a16:creationId xmlns:a16="http://schemas.microsoft.com/office/drawing/2014/main" id="{19033134-0BFA-AE4B-AAE3-E9131EA31B93}"/>
+              </a:ext>
+            </a:extLst>
+          </p:cNvPr>
+          <p:cNvSpPr>
+            <a:spLocks noGrp="1"/>
+          </p:cNvSpPr>
+          <p:nvPr>
+            <p:ph type="title"/>
+          </p:nvPr>
+        </p:nvSpPr>
+        <p:spPr/>
+        <p:txBody>
+          <a:bodyPr/>
+          <a:lstStyle/>
+          <a:p>
+            <a:r>
+              <a:rPr lang="de-DE" dirty="0" err="1"/>
+              <a:t>Grid</a:t>
+            </a:r>
+            <a:r>
+              <a:rPr lang="de-DE" dirty="0"/>
+              <a:t>: Container Properties</a:t>
+            </a:r>
+          </a:p>
+        </p:txBody>
+      </p:sp>
+      <p:sp>
+        <p:nvSpPr>
+          <p:cNvPr id="7" name="Inhaltsplatzhalter 6">
+            <a:extLst>
+              <a:ext uri="{FF2B5EF4-FFF2-40B4-BE49-F238E27FC236}">
+                <a16:creationId xmlns:a16="http://schemas.microsoft.com/office/drawing/2014/main" id="{662274F8-DBDF-1941-95E5-496B43E07EBD}"/>
+              </a:ext>
+            </a:extLst>
+          </p:cNvPr>
+          <p:cNvSpPr>
+            <a:spLocks noGrp="1"/>
+          </p:cNvSpPr>
+          <p:nvPr>
+            <p:ph idx="1"/>
+          </p:nvPr>
+        </p:nvSpPr>
+        <p:spPr>
+          <a:xfrm>
+            <a:off x="680321" y="2336873"/>
+            <a:ext cx="9915289" cy="3599316"/>
+          </a:xfrm>
+        </p:spPr>
+        <p:txBody>
+          <a:bodyPr/>
+          <a:lstStyle/>
+          <a:p>
+            <a:r>
+              <a:rPr lang="de-CH" dirty="0" err="1">
+                <a:solidFill>
+                  <a:schemeClr val="bg1"/>
+                </a:solidFill>
+              </a:rPr>
+              <a:t>grid</a:t>
+            </a:r>
+            <a:r>
+              <a:rPr lang="de-CH" dirty="0">
+                <a:solidFill>
+                  <a:schemeClr val="bg1"/>
+                </a:solidFill>
+              </a:rPr>
+              <a:t>-template-</a:t>
+            </a:r>
+            <a:r>
+              <a:rPr lang="de-CH" dirty="0" err="1">
+                <a:solidFill>
+                  <a:schemeClr val="bg1"/>
+                </a:solidFill>
+              </a:rPr>
+              <a:t>columns</a:t>
+            </a:r>
+            <a:r>
+              <a:rPr lang="de-CH" dirty="0"/>
+              <a:t>:  Definiert die Anzahl und Grösse der Spalten</a:t>
+            </a:r>
+            <a:r>
+              <a:rPr lang="de-CH" b="1" dirty="0"/>
+              <a:t>.</a:t>
+            </a:r>
+            <a:br>
+              <a:rPr lang="de-CH" b="1" dirty="0"/>
+            </a:br>
+            <a:r>
+              <a:rPr lang="de-CH" sz="2000" dirty="0" err="1">
+                <a:latin typeface="Arial" panose="020B0604020202020204" pitchFamily="34" charset="0"/>
+                <a:cs typeface="Arial" panose="020B0604020202020204" pitchFamily="34" charset="0"/>
+              </a:rPr>
+              <a:t>grid</a:t>
+            </a:r>
+            <a:r>
+              <a:rPr lang="de-CH" sz="2000" dirty="0">
+                <a:latin typeface="Arial" panose="020B0604020202020204" pitchFamily="34" charset="0"/>
+                <a:cs typeface="Arial" panose="020B0604020202020204" pitchFamily="34" charset="0"/>
+              </a:rPr>
+              <a:t>-template-</a:t>
+            </a:r>
+            <a:r>
+              <a:rPr lang="de-CH" sz="2000" dirty="0" err="1">
+                <a:latin typeface="Arial" panose="020B0604020202020204" pitchFamily="34" charset="0"/>
+                <a:cs typeface="Arial" panose="020B0604020202020204" pitchFamily="34" charset="0"/>
+              </a:rPr>
+              <a:t>columns</a:t>
+            </a:r>
+            <a:r>
+              <a:rPr lang="de-CH" sz="2000" dirty="0">
+                <a:latin typeface="Arial" panose="020B0604020202020204" pitchFamily="34" charset="0"/>
+                <a:cs typeface="Arial" panose="020B0604020202020204" pitchFamily="34" charset="0"/>
+              </a:rPr>
+              <a:t>: 20% 60% 20%;</a:t>
+            </a:r>
+            <a:br>
+              <a:rPr lang="de-CH" sz="2000" dirty="0">
+                <a:latin typeface="Arial" panose="020B0604020202020204" pitchFamily="34" charset="0"/>
+                <a:cs typeface="Arial" panose="020B0604020202020204" pitchFamily="34" charset="0"/>
+              </a:rPr>
+            </a:br>
+            <a:r>
+              <a:rPr lang="de-CH" sz="2000" dirty="0" err="1">
+                <a:latin typeface="Arial" panose="020B0604020202020204" pitchFamily="34" charset="0"/>
+                <a:cs typeface="Arial" panose="020B0604020202020204" pitchFamily="34" charset="0"/>
+              </a:rPr>
+              <a:t>grid</a:t>
+            </a:r>
+            <a:r>
+              <a:rPr lang="de-CH" sz="2000" dirty="0">
+                <a:latin typeface="Arial" panose="020B0604020202020204" pitchFamily="34" charset="0"/>
+                <a:cs typeface="Arial" panose="020B0604020202020204" pitchFamily="34" charset="0"/>
+              </a:rPr>
+              <a:t>-template-</a:t>
+            </a:r>
+            <a:r>
+              <a:rPr lang="de-CH" sz="2000" dirty="0" err="1">
+                <a:latin typeface="Arial" panose="020B0604020202020204" pitchFamily="34" charset="0"/>
+                <a:cs typeface="Arial" panose="020B0604020202020204" pitchFamily="34" charset="0"/>
+              </a:rPr>
+              <a:t>columns</a:t>
+            </a:r>
+            <a:r>
+              <a:rPr lang="de-CH" sz="2000" dirty="0">
+                <a:latin typeface="Arial" panose="020B0604020202020204" pitchFamily="34" charset="0"/>
+                <a:cs typeface="Arial" panose="020B0604020202020204" pitchFamily="34" charset="0"/>
+              </a:rPr>
+              <a:t>: [eins] 20% [zwei] 60% [drei] 20% [vier];</a:t>
+            </a:r>
+            <a:br>
+              <a:rPr lang="de-CH" sz="2000" b="1" dirty="0">
+                <a:latin typeface="Arial" panose="020B0604020202020204" pitchFamily="34" charset="0"/>
+                <a:cs typeface="Arial" panose="020B0604020202020204" pitchFamily="34" charset="0"/>
+              </a:rPr>
+            </a:br>
+            <a:endParaRPr lang="de-CH" sz="2000" dirty="0">
+              <a:latin typeface="Arial" panose="020B0604020202020204" pitchFamily="34" charset="0"/>
+              <a:cs typeface="Arial" panose="020B0604020202020204" pitchFamily="34" charset="0"/>
+            </a:endParaRPr>
+          </a:p>
+          <a:p>
+            <a:r>
+              <a:rPr lang="de-CH" dirty="0" err="1">
+                <a:solidFill>
+                  <a:schemeClr val="bg1"/>
+                </a:solidFill>
+              </a:rPr>
+              <a:t>grid</a:t>
+            </a:r>
+            <a:r>
+              <a:rPr lang="de-CH" dirty="0">
+                <a:solidFill>
+                  <a:schemeClr val="bg1"/>
+                </a:solidFill>
+              </a:rPr>
+              <a:t>-template-</a:t>
+            </a:r>
+            <a:r>
+              <a:rPr lang="de-CH" dirty="0" err="1">
+                <a:solidFill>
+                  <a:schemeClr val="bg1"/>
+                </a:solidFill>
+              </a:rPr>
+              <a:t>rows</a:t>
+            </a:r>
+            <a:r>
+              <a:rPr lang="de-CH" dirty="0"/>
+              <a:t>: </a:t>
+            </a:r>
+            <a:r>
+              <a:rPr lang="de-CH" dirty="0" err="1"/>
+              <a:t>Definert</a:t>
+            </a:r>
+            <a:r>
+              <a:rPr lang="de-CH" dirty="0"/>
+              <a:t> die Anzahl und Grösse der Reihen</a:t>
+            </a:r>
+            <a:r>
+              <a:rPr lang="de-CH" b="1" dirty="0"/>
+              <a:t>.</a:t>
+            </a:r>
+            <a:br>
+              <a:rPr lang="de-CH" b="1" dirty="0"/>
+            </a:br>
+            <a:r>
+              <a:rPr lang="de-CH" sz="2000" dirty="0" err="1">
+                <a:latin typeface="Arial" panose="020B0604020202020204" pitchFamily="34" charset="0"/>
+                <a:cs typeface="Arial" panose="020B0604020202020204" pitchFamily="34" charset="0"/>
+              </a:rPr>
+              <a:t>grid</a:t>
+            </a:r>
+            <a:r>
+              <a:rPr lang="de-CH" sz="2000" dirty="0">
+                <a:latin typeface="Arial" panose="020B0604020202020204" pitchFamily="34" charset="0"/>
+                <a:cs typeface="Arial" panose="020B0604020202020204" pitchFamily="34" charset="0"/>
+              </a:rPr>
+              <a:t>-template-</a:t>
+            </a:r>
+            <a:r>
+              <a:rPr lang="de-CH" sz="2000" dirty="0" err="1">
+                <a:latin typeface="Arial" panose="020B0604020202020204" pitchFamily="34" charset="0"/>
+                <a:cs typeface="Arial" panose="020B0604020202020204" pitchFamily="34" charset="0"/>
+              </a:rPr>
+              <a:t>rows</a:t>
+            </a:r>
+            <a:r>
+              <a:rPr lang="de-CH" sz="2000" dirty="0">
+                <a:latin typeface="Arial" panose="020B0604020202020204" pitchFamily="34" charset="0"/>
+                <a:cs typeface="Arial" panose="020B0604020202020204" pitchFamily="34" charset="0"/>
+              </a:rPr>
+              <a:t>: 100px </a:t>
+            </a:r>
+            <a:r>
+              <a:rPr lang="de-CH" sz="2000" dirty="0" err="1">
+                <a:latin typeface="Arial" panose="020B0604020202020204" pitchFamily="34" charset="0"/>
+                <a:cs typeface="Arial" panose="020B0604020202020204" pitchFamily="34" charset="0"/>
+              </a:rPr>
+              <a:t>auto</a:t>
+            </a:r>
+            <a:r>
+              <a:rPr lang="de-CH" sz="2000" dirty="0">
+                <a:latin typeface="Arial" panose="020B0604020202020204" pitchFamily="34" charset="0"/>
+                <a:cs typeface="Arial" panose="020B0604020202020204" pitchFamily="34" charset="0"/>
+              </a:rPr>
+              <a:t> 100px;</a:t>
+            </a:r>
+            <a:br>
+              <a:rPr lang="de-CH" sz="2000" dirty="0">
+                <a:latin typeface="Arial" panose="020B0604020202020204" pitchFamily="34" charset="0"/>
+                <a:cs typeface="Arial" panose="020B0604020202020204" pitchFamily="34" charset="0"/>
+              </a:rPr>
+            </a:br>
+            <a:r>
+              <a:rPr lang="de-CH" sz="2000" dirty="0" err="1">
+                <a:latin typeface="Arial" panose="020B0604020202020204" pitchFamily="34" charset="0"/>
+                <a:cs typeface="Arial" panose="020B0604020202020204" pitchFamily="34" charset="0"/>
+              </a:rPr>
+              <a:t>grid</a:t>
+            </a:r>
+            <a:r>
+              <a:rPr lang="de-CH" sz="2000" dirty="0">
+                <a:latin typeface="Arial" panose="020B0604020202020204" pitchFamily="34" charset="0"/>
+                <a:cs typeface="Arial" panose="020B0604020202020204" pitchFamily="34" charset="0"/>
+              </a:rPr>
+              <a:t>-template-</a:t>
+            </a:r>
+            <a:r>
+              <a:rPr lang="de-CH" sz="2000" dirty="0" err="1">
+                <a:latin typeface="Arial" panose="020B0604020202020204" pitchFamily="34" charset="0"/>
+                <a:cs typeface="Arial" panose="020B0604020202020204" pitchFamily="34" charset="0"/>
+              </a:rPr>
+              <a:t>rows</a:t>
+            </a:r>
+            <a:r>
+              <a:rPr lang="de-CH" sz="2000" dirty="0">
+                <a:latin typeface="Arial" panose="020B0604020202020204" pitchFamily="34" charset="0"/>
+                <a:cs typeface="Arial" panose="020B0604020202020204" pitchFamily="34" charset="0"/>
+              </a:rPr>
+              <a:t>: [row1] 100px [row2] </a:t>
+            </a:r>
+            <a:r>
+              <a:rPr lang="de-CH" sz="2000" dirty="0" err="1">
+                <a:latin typeface="Arial" panose="020B0604020202020204" pitchFamily="34" charset="0"/>
+                <a:cs typeface="Arial" panose="020B0604020202020204" pitchFamily="34" charset="0"/>
+              </a:rPr>
+              <a:t>auto</a:t>
+            </a:r>
+            <a:r>
+              <a:rPr lang="de-CH" sz="2000" dirty="0">
+                <a:latin typeface="Arial" panose="020B0604020202020204" pitchFamily="34" charset="0"/>
+                <a:cs typeface="Arial" panose="020B0604020202020204" pitchFamily="34" charset="0"/>
+              </a:rPr>
+              <a:t> [row3] 100px [ende];</a:t>
+            </a:r>
+          </a:p>
+        </p:txBody>
+      </p:sp>
+    </p:spTree>
+    <p:extLst>
+      <p:ext uri="{BB962C8B-B14F-4D97-AF65-F5344CB8AC3E}">
+        <p14:creationId xmlns:p14="http://schemas.microsoft.com/office/powerpoint/2010/main" val="714284251"/>
+      </p:ext>
+    </p:extLst>
+  </p:cSld>
+  <p:clrMapOvr>
+    <a:masterClrMapping/>
+  </p:clrMapOvr>
+</p:sld>
+</file>
+
+<file path=ppt/slides/slide83.xml><?xml version="1.0" encoding="utf-8"?>
+<p:sld xmlns:a="http://schemas.openxmlformats.org/drawingml/2006/main" xmlns:r="http://schemas.openxmlformats.org/officeDocument/2006/relationships" xmlns:p="http://schemas.openxmlformats.org/presentationml/2006/main">
+  <p:cSld>
+    <p:spTree>
+      <p:nvGrpSpPr>
+        <p:cNvPr id="1" name=""/>
+        <p:cNvGrpSpPr/>
+        <p:nvPr/>
+      </p:nvGrpSpPr>
+      <p:grpSpPr>
+        <a:xfrm>
+          <a:off x="0" y="0"/>
+          <a:ext cx="0" cy="0"/>
+          <a:chOff x="0" y="0"/>
+          <a:chExt cx="0" cy="0"/>
+        </a:xfrm>
+      </p:grpSpPr>
+      <p:sp>
+        <p:nvSpPr>
+          <p:cNvPr id="2" name="Titel 1">
+            <a:extLst>
+              <a:ext uri="{FF2B5EF4-FFF2-40B4-BE49-F238E27FC236}">
+                <a16:creationId xmlns:a16="http://schemas.microsoft.com/office/drawing/2014/main" id="{10085994-E9B3-9C49-88DA-85CB7896D777}"/>
+              </a:ext>
+            </a:extLst>
+          </p:cNvPr>
+          <p:cNvSpPr>
+            <a:spLocks noGrp="1"/>
+          </p:cNvSpPr>
+          <p:nvPr>
+            <p:ph type="title"/>
+          </p:nvPr>
+        </p:nvSpPr>
+        <p:spPr/>
+        <p:txBody>
+          <a:bodyPr/>
+          <a:lstStyle/>
+          <a:p>
+            <a:r>
+              <a:rPr lang="de-DE" dirty="0" err="1"/>
+              <a:t>Grid</a:t>
+            </a:r>
+            <a:r>
+              <a:rPr lang="de-DE" dirty="0"/>
+              <a:t>: Container Properties</a:t>
+            </a:r>
+          </a:p>
+        </p:txBody>
+      </p:sp>
+      <p:pic>
+        <p:nvPicPr>
+          <p:cNvPr id="9" name="Inhaltsplatzhalter 8">
+            <a:extLst>
+              <a:ext uri="{FF2B5EF4-FFF2-40B4-BE49-F238E27FC236}">
+                <a16:creationId xmlns:a16="http://schemas.microsoft.com/office/drawing/2014/main" id="{C644C42D-72EF-2A48-816F-36D82961D15D}"/>
+              </a:ext>
+            </a:extLst>
+          </p:cNvPr>
+          <p:cNvPicPr>
+            <a:picLocks noGrp="1" noChangeAspect="1"/>
+          </p:cNvPicPr>
+          <p:nvPr>
+            <p:ph idx="1"/>
+          </p:nvPr>
+        </p:nvPicPr>
+        <p:blipFill>
+          <a:blip r:embed="rId2"/>
+          <a:stretch>
+            <a:fillRect/>
+          </a:stretch>
+        </p:blipFill>
+        <p:spPr>
+          <a:xfrm>
+            <a:off x="889798" y="3389272"/>
+            <a:ext cx="6592171" cy="2916163"/>
+          </a:xfrm>
+        </p:spPr>
+      </p:pic>
+      <p:sp>
+        <p:nvSpPr>
+          <p:cNvPr id="10" name="Rechteck 9">
+            <a:extLst>
+              <a:ext uri="{FF2B5EF4-FFF2-40B4-BE49-F238E27FC236}">
+                <a16:creationId xmlns:a16="http://schemas.microsoft.com/office/drawing/2014/main" id="{5C1814EE-CFB9-BA40-8AAF-2BE7E486CDD9}"/>
+              </a:ext>
+            </a:extLst>
+          </p:cNvPr>
+          <p:cNvSpPr/>
+          <p:nvPr/>
+        </p:nvSpPr>
+        <p:spPr>
+          <a:xfrm>
+            <a:off x="889798" y="2281276"/>
+            <a:ext cx="4172937" cy="369332"/>
+          </a:xfrm>
+          <a:prstGeom prst="rect">
+            <a:avLst/>
+          </a:prstGeom>
+        </p:spPr>
+        <p:txBody>
+          <a:bodyPr wrap="none">
+            <a:spAutoFit/>
+          </a:bodyPr>
+          <a:lstStyle/>
+          <a:p>
+            <a:r>
+              <a:rPr lang="de-CH" dirty="0" err="1">
+                <a:latin typeface="Arial" panose="020B0604020202020204" pitchFamily="34" charset="0"/>
+                <a:cs typeface="Arial" panose="020B0604020202020204" pitchFamily="34" charset="0"/>
+              </a:rPr>
+              <a:t>grid</a:t>
+            </a:r>
+            <a:r>
+              <a:rPr lang="de-CH" dirty="0">
+                <a:latin typeface="Arial" panose="020B0604020202020204" pitchFamily="34" charset="0"/>
+                <a:cs typeface="Arial" panose="020B0604020202020204" pitchFamily="34" charset="0"/>
+              </a:rPr>
+              <a:t>-template-</a:t>
+            </a:r>
+            <a:r>
+              <a:rPr lang="de-CH" dirty="0" err="1">
+                <a:latin typeface="Arial" panose="020B0604020202020204" pitchFamily="34" charset="0"/>
+                <a:cs typeface="Arial" panose="020B0604020202020204" pitchFamily="34" charset="0"/>
+              </a:rPr>
+              <a:t>columns</a:t>
+            </a:r>
+            <a:r>
+              <a:rPr lang="de-CH" dirty="0">
+                <a:latin typeface="Arial" panose="020B0604020202020204" pitchFamily="34" charset="0"/>
+                <a:cs typeface="Arial" panose="020B0604020202020204" pitchFamily="34" charset="0"/>
+              </a:rPr>
+              <a:t>: 20% 60% 20%;</a:t>
+            </a:r>
+            <a:endParaRPr lang="de-DE" dirty="0"/>
+          </a:p>
+        </p:txBody>
+      </p:sp>
+      <p:sp>
+        <p:nvSpPr>
+          <p:cNvPr id="11" name="Rechteck 10">
+            <a:extLst>
+              <a:ext uri="{FF2B5EF4-FFF2-40B4-BE49-F238E27FC236}">
+                <a16:creationId xmlns:a16="http://schemas.microsoft.com/office/drawing/2014/main" id="{E743F98C-590F-2345-AA1A-E117AC7E1BAF}"/>
+              </a:ext>
+            </a:extLst>
+          </p:cNvPr>
+          <p:cNvSpPr/>
+          <p:nvPr/>
+        </p:nvSpPr>
+        <p:spPr>
+          <a:xfrm>
+            <a:off x="889798" y="2650608"/>
+            <a:ext cx="6096000" cy="369332"/>
+          </a:xfrm>
+          <a:prstGeom prst="rect">
+            <a:avLst/>
+          </a:prstGeom>
+        </p:spPr>
+        <p:txBody>
+          <a:bodyPr>
+            <a:spAutoFit/>
+          </a:bodyPr>
+          <a:lstStyle/>
+          <a:p>
+            <a:r>
+              <a:rPr lang="de-CH" dirty="0" err="1">
+                <a:latin typeface="Arial" panose="020B0604020202020204" pitchFamily="34" charset="0"/>
+                <a:cs typeface="Arial" panose="020B0604020202020204" pitchFamily="34" charset="0"/>
+              </a:rPr>
+              <a:t>grid</a:t>
+            </a:r>
+            <a:r>
+              <a:rPr lang="de-CH" dirty="0">
+                <a:latin typeface="Arial" panose="020B0604020202020204" pitchFamily="34" charset="0"/>
+                <a:cs typeface="Arial" panose="020B0604020202020204" pitchFamily="34" charset="0"/>
+              </a:rPr>
+              <a:t>-template-</a:t>
+            </a:r>
+            <a:r>
+              <a:rPr lang="de-CH" dirty="0" err="1">
+                <a:latin typeface="Arial" panose="020B0604020202020204" pitchFamily="34" charset="0"/>
+                <a:cs typeface="Arial" panose="020B0604020202020204" pitchFamily="34" charset="0"/>
+              </a:rPr>
+              <a:t>rows</a:t>
+            </a:r>
+            <a:r>
+              <a:rPr lang="de-CH" dirty="0">
+                <a:latin typeface="Arial" panose="020B0604020202020204" pitchFamily="34" charset="0"/>
+                <a:cs typeface="Arial" panose="020B0604020202020204" pitchFamily="34" charset="0"/>
+              </a:rPr>
+              <a:t>: 100px </a:t>
+            </a:r>
+            <a:r>
+              <a:rPr lang="de-CH" dirty="0" err="1">
+                <a:latin typeface="Arial" panose="020B0604020202020204" pitchFamily="34" charset="0"/>
+                <a:cs typeface="Arial" panose="020B0604020202020204" pitchFamily="34" charset="0"/>
+              </a:rPr>
+              <a:t>auto</a:t>
+            </a:r>
+            <a:r>
+              <a:rPr lang="de-CH" dirty="0">
+                <a:latin typeface="Arial" panose="020B0604020202020204" pitchFamily="34" charset="0"/>
+                <a:cs typeface="Arial" panose="020B0604020202020204" pitchFamily="34" charset="0"/>
+              </a:rPr>
+              <a:t> 100px;</a:t>
+            </a:r>
+            <a:endParaRPr lang="de-DE" dirty="0"/>
+          </a:p>
+        </p:txBody>
+      </p:sp>
+    </p:spTree>
+    <p:extLst>
+      <p:ext uri="{BB962C8B-B14F-4D97-AF65-F5344CB8AC3E}">
+        <p14:creationId xmlns:p14="http://schemas.microsoft.com/office/powerpoint/2010/main" val="3096845263"/>
+      </p:ext>
+    </p:extLst>
+  </p:cSld>
+  <p:clrMapOvr>
+    <a:masterClrMapping/>
+  </p:clrMapOvr>
+</p:sld>
+</file>
+
+<file path=ppt/slides/slide84.xml><?xml version="1.0" encoding="utf-8"?>
+<p:sld xmlns:a="http://schemas.openxmlformats.org/drawingml/2006/main" xmlns:r="http://schemas.openxmlformats.org/officeDocument/2006/relationships" xmlns:p="http://schemas.openxmlformats.org/presentationml/2006/main">
+  <p:cSld>
+    <p:spTree>
+      <p:nvGrpSpPr>
+        <p:cNvPr id="1" name=""/>
+        <p:cNvGrpSpPr/>
+        <p:nvPr/>
+      </p:nvGrpSpPr>
+      <p:grpSpPr>
+        <a:xfrm>
+          <a:off x="0" y="0"/>
+          <a:ext cx="0" cy="0"/>
+          <a:chOff x="0" y="0"/>
+          <a:chExt cx="0" cy="0"/>
+        </a:xfrm>
+      </p:grpSpPr>
+      <p:sp>
+        <p:nvSpPr>
+          <p:cNvPr id="2" name="Titel 1">
+            <a:extLst>
+              <a:ext uri="{FF2B5EF4-FFF2-40B4-BE49-F238E27FC236}">
+                <a16:creationId xmlns:a16="http://schemas.microsoft.com/office/drawing/2014/main" id="{42A5B1AA-ADEF-F348-A0E4-381E0CA6525F}"/>
+              </a:ext>
+            </a:extLst>
+          </p:cNvPr>
+          <p:cNvSpPr>
+            <a:spLocks noGrp="1"/>
+          </p:cNvSpPr>
+          <p:nvPr>
+            <p:ph type="title"/>
+          </p:nvPr>
+        </p:nvSpPr>
+        <p:spPr/>
+        <p:txBody>
+          <a:bodyPr/>
+          <a:lstStyle/>
+          <a:p>
+            <a:r>
+              <a:rPr lang="de-DE" dirty="0" err="1"/>
+              <a:t>Grid</a:t>
+            </a:r>
+            <a:r>
+              <a:rPr lang="de-DE" dirty="0"/>
+              <a:t>: Container Properties</a:t>
+            </a:r>
+          </a:p>
+        </p:txBody>
+      </p:sp>
+      <p:pic>
+        <p:nvPicPr>
+          <p:cNvPr id="5" name="Inhaltsplatzhalter 4">
+            <a:extLst>
+              <a:ext uri="{FF2B5EF4-FFF2-40B4-BE49-F238E27FC236}">
+                <a16:creationId xmlns:a16="http://schemas.microsoft.com/office/drawing/2014/main" id="{09F627C6-0BE4-2145-A7D3-7F54CD309458}"/>
+              </a:ext>
+            </a:extLst>
+          </p:cNvPr>
+          <p:cNvPicPr>
+            <a:picLocks noGrp="1" noChangeAspect="1"/>
+          </p:cNvPicPr>
+          <p:nvPr>
+            <p:ph idx="1"/>
+          </p:nvPr>
+        </p:nvPicPr>
+        <p:blipFill>
+          <a:blip r:embed="rId2"/>
+          <a:stretch>
+            <a:fillRect/>
+          </a:stretch>
+        </p:blipFill>
+        <p:spPr>
+          <a:xfrm>
+            <a:off x="680321" y="3343910"/>
+            <a:ext cx="7013709" cy="3022600"/>
+          </a:xfrm>
+        </p:spPr>
+      </p:pic>
+      <p:sp>
+        <p:nvSpPr>
+          <p:cNvPr id="6" name="Rechteck 5">
+            <a:extLst>
+              <a:ext uri="{FF2B5EF4-FFF2-40B4-BE49-F238E27FC236}">
+                <a16:creationId xmlns:a16="http://schemas.microsoft.com/office/drawing/2014/main" id="{1EEC8D5E-3E9D-3E4E-B228-D0BB3D94818B}"/>
+              </a:ext>
+            </a:extLst>
+          </p:cNvPr>
+          <p:cNvSpPr/>
+          <p:nvPr/>
+        </p:nvSpPr>
+        <p:spPr>
+          <a:xfrm>
+            <a:off x="680321" y="2317165"/>
+            <a:ext cx="6873240" cy="369332"/>
+          </a:xfrm>
+          <a:prstGeom prst="rect">
+            <a:avLst/>
+          </a:prstGeom>
+        </p:spPr>
+        <p:txBody>
+          <a:bodyPr wrap="square">
+            <a:spAutoFit/>
+          </a:bodyPr>
+          <a:lstStyle/>
+          <a:p>
+            <a:r>
+              <a:rPr lang="de-CH" dirty="0" err="1">
+                <a:latin typeface="Arial" panose="020B0604020202020204" pitchFamily="34" charset="0"/>
+                <a:cs typeface="Arial" panose="020B0604020202020204" pitchFamily="34" charset="0"/>
+              </a:rPr>
+              <a:t>grid</a:t>
+            </a:r>
+            <a:r>
+              <a:rPr lang="de-CH" dirty="0">
+                <a:latin typeface="Arial" panose="020B0604020202020204" pitchFamily="34" charset="0"/>
+                <a:cs typeface="Arial" panose="020B0604020202020204" pitchFamily="34" charset="0"/>
+              </a:rPr>
+              <a:t>-template-</a:t>
+            </a:r>
+            <a:r>
+              <a:rPr lang="de-CH" dirty="0" err="1">
+                <a:latin typeface="Arial" panose="020B0604020202020204" pitchFamily="34" charset="0"/>
+                <a:cs typeface="Arial" panose="020B0604020202020204" pitchFamily="34" charset="0"/>
+              </a:rPr>
+              <a:t>columns</a:t>
+            </a:r>
+            <a:r>
+              <a:rPr lang="de-CH" dirty="0">
+                <a:latin typeface="Arial" panose="020B0604020202020204" pitchFamily="34" charset="0"/>
+                <a:cs typeface="Arial" panose="020B0604020202020204" pitchFamily="34" charset="0"/>
+              </a:rPr>
+              <a:t>: [eins] 20% [zwei] 60% [drei] 20% [vier];</a:t>
+            </a:r>
+            <a:endParaRPr lang="de-DE" dirty="0"/>
+          </a:p>
+        </p:txBody>
+      </p:sp>
+      <p:sp>
+        <p:nvSpPr>
+          <p:cNvPr id="7" name="Rechteck 6">
+            <a:extLst>
+              <a:ext uri="{FF2B5EF4-FFF2-40B4-BE49-F238E27FC236}">
+                <a16:creationId xmlns:a16="http://schemas.microsoft.com/office/drawing/2014/main" id="{DEBF59EC-59FB-C14F-A76E-FCF584425CF1}"/>
+              </a:ext>
+            </a:extLst>
+          </p:cNvPr>
+          <p:cNvSpPr/>
+          <p:nvPr/>
+        </p:nvSpPr>
+        <p:spPr>
+          <a:xfrm>
+            <a:off x="680321" y="2686497"/>
+            <a:ext cx="7044690" cy="369332"/>
+          </a:xfrm>
+          <a:prstGeom prst="rect">
+            <a:avLst/>
+          </a:prstGeom>
+        </p:spPr>
+        <p:txBody>
+          <a:bodyPr wrap="square">
+            <a:spAutoFit/>
+          </a:bodyPr>
+          <a:lstStyle/>
+          <a:p>
+            <a:r>
+              <a:rPr lang="de-CH" dirty="0" err="1">
+                <a:latin typeface="Arial" panose="020B0604020202020204" pitchFamily="34" charset="0"/>
+                <a:cs typeface="Arial" panose="020B0604020202020204" pitchFamily="34" charset="0"/>
+              </a:rPr>
+              <a:t>grid</a:t>
+            </a:r>
+            <a:r>
+              <a:rPr lang="de-CH" dirty="0">
+                <a:latin typeface="Arial" panose="020B0604020202020204" pitchFamily="34" charset="0"/>
+                <a:cs typeface="Arial" panose="020B0604020202020204" pitchFamily="34" charset="0"/>
+              </a:rPr>
+              <a:t>-template-</a:t>
+            </a:r>
+            <a:r>
+              <a:rPr lang="de-CH" dirty="0" err="1">
+                <a:latin typeface="Arial" panose="020B0604020202020204" pitchFamily="34" charset="0"/>
+                <a:cs typeface="Arial" panose="020B0604020202020204" pitchFamily="34" charset="0"/>
+              </a:rPr>
+              <a:t>rows</a:t>
+            </a:r>
+            <a:r>
+              <a:rPr lang="de-CH" dirty="0">
+                <a:latin typeface="Arial" panose="020B0604020202020204" pitchFamily="34" charset="0"/>
+                <a:cs typeface="Arial" panose="020B0604020202020204" pitchFamily="34" charset="0"/>
+              </a:rPr>
+              <a:t>: [row1] 100px [row2] </a:t>
+            </a:r>
+            <a:r>
+              <a:rPr lang="de-CH" dirty="0" err="1">
+                <a:latin typeface="Arial" panose="020B0604020202020204" pitchFamily="34" charset="0"/>
+                <a:cs typeface="Arial" panose="020B0604020202020204" pitchFamily="34" charset="0"/>
+              </a:rPr>
+              <a:t>auto</a:t>
+            </a:r>
+            <a:r>
+              <a:rPr lang="de-CH" dirty="0">
+                <a:latin typeface="Arial" panose="020B0604020202020204" pitchFamily="34" charset="0"/>
+                <a:cs typeface="Arial" panose="020B0604020202020204" pitchFamily="34" charset="0"/>
+              </a:rPr>
+              <a:t> [row3] 100px [ende];</a:t>
+            </a:r>
+            <a:endParaRPr lang="de-DE" dirty="0"/>
+          </a:p>
+        </p:txBody>
+      </p:sp>
+    </p:spTree>
+    <p:extLst>
+      <p:ext uri="{BB962C8B-B14F-4D97-AF65-F5344CB8AC3E}">
+        <p14:creationId xmlns:p14="http://schemas.microsoft.com/office/powerpoint/2010/main" val="1020404966"/>
+      </p:ext>
+    </p:extLst>
+  </p:cSld>
+  <p:clrMapOvr>
+    <a:masterClrMapping/>
+  </p:clrMapOvr>
+</p:sld>
+</file>
+
+<file path=ppt/slides/slide85.xml><?xml version="1.0" encoding="utf-8"?>
+<p:sld xmlns:a="http://schemas.openxmlformats.org/drawingml/2006/main" xmlns:r="http://schemas.openxmlformats.org/officeDocument/2006/relationships" xmlns:p="http://schemas.openxmlformats.org/presentationml/2006/main">
+  <p:cSld>
+    <p:spTree>
+      <p:nvGrpSpPr>
+        <p:cNvPr id="1" name=""/>
+        <p:cNvGrpSpPr/>
+        <p:nvPr/>
+      </p:nvGrpSpPr>
+      <p:grpSpPr>
+        <a:xfrm>
+          <a:off x="0" y="0"/>
+          <a:ext cx="0" cy="0"/>
+          <a:chOff x="0" y="0"/>
+          <a:chExt cx="0" cy="0"/>
+        </a:xfrm>
+      </p:grpSpPr>
+      <p:sp>
+        <p:nvSpPr>
+          <p:cNvPr id="2" name="Titel 1">
+            <a:extLst>
+              <a:ext uri="{FF2B5EF4-FFF2-40B4-BE49-F238E27FC236}">
+                <a16:creationId xmlns:a16="http://schemas.microsoft.com/office/drawing/2014/main" id="{D519ED13-21BE-A54C-A031-AD61373B520E}"/>
+              </a:ext>
+            </a:extLst>
+          </p:cNvPr>
+          <p:cNvSpPr>
+            <a:spLocks noGrp="1"/>
+          </p:cNvSpPr>
+          <p:nvPr>
+            <p:ph type="title"/>
+          </p:nvPr>
+        </p:nvSpPr>
+        <p:spPr/>
+        <p:txBody>
+          <a:bodyPr/>
+          <a:lstStyle/>
+          <a:p>
+            <a:r>
+              <a:rPr lang="de-DE" dirty="0" err="1"/>
+              <a:t>Grid</a:t>
+            </a:r>
+            <a:r>
+              <a:rPr lang="de-DE" dirty="0"/>
+              <a:t>: Container Properties</a:t>
+            </a:r>
+          </a:p>
+        </p:txBody>
+      </p:sp>
+      <p:sp>
+        <p:nvSpPr>
+          <p:cNvPr id="3" name="Inhaltsplatzhalter 2">
+            <a:extLst>
+              <a:ext uri="{FF2B5EF4-FFF2-40B4-BE49-F238E27FC236}">
+                <a16:creationId xmlns:a16="http://schemas.microsoft.com/office/drawing/2014/main" id="{1075717F-3424-DD43-B1A5-3040F7F72125}"/>
+              </a:ext>
+            </a:extLst>
+          </p:cNvPr>
+          <p:cNvSpPr>
+            <a:spLocks noGrp="1"/>
+          </p:cNvSpPr>
+          <p:nvPr>
+            <p:ph idx="1"/>
+          </p:nvPr>
+        </p:nvSpPr>
+        <p:spPr/>
+        <p:txBody>
+          <a:bodyPr/>
+          <a:lstStyle/>
+          <a:p>
+            <a:r>
+              <a:rPr lang="de-CH" dirty="0" err="1">
+                <a:solidFill>
+                  <a:schemeClr val="bg1"/>
+                </a:solidFill>
+              </a:rPr>
+              <a:t>grid</a:t>
+            </a:r>
+            <a:r>
+              <a:rPr lang="de-CH" dirty="0">
+                <a:solidFill>
+                  <a:schemeClr val="bg1"/>
+                </a:solidFill>
+              </a:rPr>
+              <a:t>-template-areas</a:t>
+            </a:r>
+            <a:r>
+              <a:rPr lang="de-CH" dirty="0"/>
+              <a:t>: Definiert eine </a:t>
+            </a:r>
+            <a:r>
+              <a:rPr lang="de-CH" dirty="0" err="1"/>
+              <a:t>Grid</a:t>
+            </a:r>
+            <a:r>
+              <a:rPr lang="de-CH" dirty="0"/>
+              <a:t> Area mit Namen. Dadurch kann der Code lesbarer werden.</a:t>
+            </a:r>
+            <a:br>
+              <a:rPr lang="de-CH" dirty="0"/>
+            </a:br>
+            <a:r>
+              <a:rPr lang="de-CH" sz="2000" dirty="0" err="1">
+                <a:latin typeface="Arial" panose="020B0604020202020204" pitchFamily="34" charset="0"/>
+                <a:cs typeface="Arial" panose="020B0604020202020204" pitchFamily="34" charset="0"/>
+              </a:rPr>
+              <a:t>grid</a:t>
+            </a:r>
+            <a:r>
+              <a:rPr lang="de-CH" sz="2000" dirty="0">
+                <a:latin typeface="Arial" panose="020B0604020202020204" pitchFamily="34" charset="0"/>
+                <a:cs typeface="Arial" panose="020B0604020202020204" pitchFamily="34" charset="0"/>
+              </a:rPr>
+              <a:t>-template-areas: “</a:t>
+            </a:r>
+            <a:r>
+              <a:rPr lang="de-CH" sz="2000" dirty="0" err="1">
+                <a:latin typeface="Arial" panose="020B0604020202020204" pitchFamily="34" charset="0"/>
+                <a:cs typeface="Arial" panose="020B0604020202020204" pitchFamily="34" charset="0"/>
+              </a:rPr>
+              <a:t>header</a:t>
+            </a:r>
+            <a:r>
+              <a:rPr lang="de-CH" sz="2000" dirty="0">
+                <a:latin typeface="Arial" panose="020B0604020202020204" pitchFamily="34" charset="0"/>
+                <a:cs typeface="Arial" panose="020B0604020202020204" pitchFamily="34" charset="0"/>
+              </a:rPr>
+              <a:t> </a:t>
+            </a:r>
+            <a:r>
+              <a:rPr lang="de-CH" sz="2000" dirty="0" err="1">
+                <a:latin typeface="Arial" panose="020B0604020202020204" pitchFamily="34" charset="0"/>
+                <a:cs typeface="Arial" panose="020B0604020202020204" pitchFamily="34" charset="0"/>
+              </a:rPr>
+              <a:t>header</a:t>
+            </a:r>
+            <a:r>
+              <a:rPr lang="de-CH" sz="2000" dirty="0">
+                <a:latin typeface="Arial" panose="020B0604020202020204" pitchFamily="34" charset="0"/>
+                <a:cs typeface="Arial" panose="020B0604020202020204" pitchFamily="34" charset="0"/>
+              </a:rPr>
+              <a:t> </a:t>
+            </a:r>
+            <a:r>
+              <a:rPr lang="de-CH" sz="2000" dirty="0" err="1">
+                <a:latin typeface="Arial" panose="020B0604020202020204" pitchFamily="34" charset="0"/>
+                <a:cs typeface="Arial" panose="020B0604020202020204" pitchFamily="34" charset="0"/>
+              </a:rPr>
+              <a:t>header</a:t>
+            </a:r>
+            <a:r>
+              <a:rPr lang="de-CH" sz="2000" dirty="0">
+                <a:latin typeface="Arial" panose="020B0604020202020204" pitchFamily="34" charset="0"/>
+                <a:cs typeface="Arial" panose="020B0604020202020204" pitchFamily="34" charset="0"/>
+              </a:rPr>
+              <a:t>“ </a:t>
+            </a:r>
+            <a:br>
+              <a:rPr lang="de-CH" sz="2000" dirty="0">
+                <a:latin typeface="Arial" panose="020B0604020202020204" pitchFamily="34" charset="0"/>
+                <a:cs typeface="Arial" panose="020B0604020202020204" pitchFamily="34" charset="0"/>
+              </a:rPr>
+            </a:br>
+            <a:r>
+              <a:rPr lang="de-CH" sz="2000" dirty="0">
+                <a:latin typeface="Arial" panose="020B0604020202020204" pitchFamily="34" charset="0"/>
+                <a:cs typeface="Arial" panose="020B0604020202020204" pitchFamily="34" charset="0"/>
+              </a:rPr>
+              <a:t>		          “</a:t>
+            </a:r>
+            <a:r>
+              <a:rPr lang="de-CH" sz="2000" dirty="0" err="1">
+                <a:latin typeface="Arial" panose="020B0604020202020204" pitchFamily="34" charset="0"/>
+                <a:cs typeface="Arial" panose="020B0604020202020204" pitchFamily="34" charset="0"/>
+              </a:rPr>
+              <a:t>nav</a:t>
+            </a:r>
+            <a:r>
+              <a:rPr lang="de-CH" sz="2000" dirty="0">
+                <a:latin typeface="Arial" panose="020B0604020202020204" pitchFamily="34" charset="0"/>
+                <a:cs typeface="Arial" panose="020B0604020202020204" pitchFamily="34" charset="0"/>
+              </a:rPr>
+              <a:t> </a:t>
+            </a:r>
+            <a:r>
+              <a:rPr lang="de-CH" sz="2000" dirty="0" err="1">
+                <a:latin typeface="Arial" panose="020B0604020202020204" pitchFamily="34" charset="0"/>
+                <a:cs typeface="Arial" panose="020B0604020202020204" pitchFamily="34" charset="0"/>
+              </a:rPr>
+              <a:t>article</a:t>
+            </a:r>
+            <a:r>
+              <a:rPr lang="de-CH" sz="2000" dirty="0">
+                <a:latin typeface="Arial" panose="020B0604020202020204" pitchFamily="34" charset="0"/>
+                <a:cs typeface="Arial" panose="020B0604020202020204" pitchFamily="34" charset="0"/>
+              </a:rPr>
+              <a:t> </a:t>
+            </a:r>
+            <a:r>
+              <a:rPr lang="de-CH" sz="2000" dirty="0" err="1">
+                <a:latin typeface="Arial" panose="020B0604020202020204" pitchFamily="34" charset="0"/>
+                <a:cs typeface="Arial" panose="020B0604020202020204" pitchFamily="34" charset="0"/>
+              </a:rPr>
+              <a:t>sidebar</a:t>
+            </a:r>
+            <a:r>
+              <a:rPr lang="de-CH" sz="2000" dirty="0">
+                <a:latin typeface="Arial" panose="020B0604020202020204" pitchFamily="34" charset="0"/>
+                <a:cs typeface="Arial" panose="020B0604020202020204" pitchFamily="34" charset="0"/>
+              </a:rPr>
+              <a:t>“ </a:t>
+            </a:r>
+            <a:br>
+              <a:rPr lang="de-CH" sz="2000" dirty="0">
+                <a:latin typeface="Arial" panose="020B0604020202020204" pitchFamily="34" charset="0"/>
+                <a:cs typeface="Arial" panose="020B0604020202020204" pitchFamily="34" charset="0"/>
+              </a:rPr>
+            </a:br>
+            <a:r>
+              <a:rPr lang="de-CH" sz="2000" dirty="0">
+                <a:latin typeface="Arial" panose="020B0604020202020204" pitchFamily="34" charset="0"/>
+                <a:cs typeface="Arial" panose="020B0604020202020204" pitchFamily="34" charset="0"/>
+              </a:rPr>
+              <a:t>		          “</a:t>
+            </a:r>
+            <a:r>
+              <a:rPr lang="de-CH" sz="2000" dirty="0" err="1">
+                <a:latin typeface="Arial" panose="020B0604020202020204" pitchFamily="34" charset="0"/>
+                <a:cs typeface="Arial" panose="020B0604020202020204" pitchFamily="34" charset="0"/>
+              </a:rPr>
+              <a:t>footer</a:t>
+            </a:r>
+            <a:r>
+              <a:rPr lang="de-CH" sz="2000" dirty="0">
+                <a:latin typeface="Arial" panose="020B0604020202020204" pitchFamily="34" charset="0"/>
+                <a:cs typeface="Arial" panose="020B0604020202020204" pitchFamily="34" charset="0"/>
+              </a:rPr>
+              <a:t> </a:t>
+            </a:r>
+            <a:r>
+              <a:rPr lang="de-CH" sz="2000" dirty="0" err="1">
+                <a:latin typeface="Arial" panose="020B0604020202020204" pitchFamily="34" charset="0"/>
+                <a:cs typeface="Arial" panose="020B0604020202020204" pitchFamily="34" charset="0"/>
+              </a:rPr>
+              <a:t>footer</a:t>
+            </a:r>
+            <a:r>
+              <a:rPr lang="de-CH" sz="2000" dirty="0">
+                <a:latin typeface="Arial" panose="020B0604020202020204" pitchFamily="34" charset="0"/>
+                <a:cs typeface="Arial" panose="020B0604020202020204" pitchFamily="34" charset="0"/>
+              </a:rPr>
+              <a:t> </a:t>
+            </a:r>
+            <a:r>
+              <a:rPr lang="de-CH" sz="2000" dirty="0" err="1">
+                <a:latin typeface="Arial" panose="020B0604020202020204" pitchFamily="34" charset="0"/>
+                <a:cs typeface="Arial" panose="020B0604020202020204" pitchFamily="34" charset="0"/>
+              </a:rPr>
+              <a:t>footer</a:t>
+            </a:r>
+            <a:r>
+              <a:rPr lang="de-CH" sz="2000" dirty="0">
+                <a:latin typeface="Arial" panose="020B0604020202020204" pitchFamily="34" charset="0"/>
+                <a:cs typeface="Arial" panose="020B0604020202020204" pitchFamily="34" charset="0"/>
+              </a:rPr>
+              <a:t>“;</a:t>
+            </a:r>
+            <a:br>
+              <a:rPr lang="de-CH" sz="2000" dirty="0"/>
+            </a:br>
+            <a:endParaRPr lang="de-CH" sz="2000" dirty="0"/>
+          </a:p>
+          <a:p>
+            <a:endParaRPr lang="de-DE" dirty="0"/>
+          </a:p>
+        </p:txBody>
+      </p:sp>
+    </p:spTree>
+    <p:extLst>
+      <p:ext uri="{BB962C8B-B14F-4D97-AF65-F5344CB8AC3E}">
+        <p14:creationId xmlns:p14="http://schemas.microsoft.com/office/powerpoint/2010/main" val="857944133"/>
+      </p:ext>
+    </p:extLst>
+  </p:cSld>
+  <p:clrMapOvr>
+    <a:masterClrMapping/>
+  </p:clrMapOvr>
+</p:sld>
+</file>
+
+<file path=ppt/slides/slide86.xml><?xml version="1.0" encoding="utf-8"?>
+<p:sld xmlns:a="http://schemas.openxmlformats.org/drawingml/2006/main" xmlns:r="http://schemas.openxmlformats.org/officeDocument/2006/relationships" xmlns:p="http://schemas.openxmlformats.org/presentationml/2006/main">
+  <p:cSld>
+    <p:spTree>
+      <p:nvGrpSpPr>
+        <p:cNvPr id="1" name=""/>
+        <p:cNvGrpSpPr/>
+        <p:nvPr/>
+      </p:nvGrpSpPr>
+      <p:grpSpPr>
+        <a:xfrm>
+          <a:off x="0" y="0"/>
+          <a:ext cx="0" cy="0"/>
+          <a:chOff x="0" y="0"/>
+          <a:chExt cx="0" cy="0"/>
+        </a:xfrm>
+      </p:grpSpPr>
+      <p:sp>
+        <p:nvSpPr>
+          <p:cNvPr id="2" name="Titel 1">
+            <a:extLst>
+              <a:ext uri="{FF2B5EF4-FFF2-40B4-BE49-F238E27FC236}">
+                <a16:creationId xmlns:a16="http://schemas.microsoft.com/office/drawing/2014/main" id="{97B75D3F-B46C-3443-AD68-39440D9E12EB}"/>
+              </a:ext>
+            </a:extLst>
+          </p:cNvPr>
+          <p:cNvSpPr>
+            <a:spLocks noGrp="1"/>
+          </p:cNvSpPr>
+          <p:nvPr>
+            <p:ph type="title"/>
+          </p:nvPr>
+        </p:nvSpPr>
+        <p:spPr/>
+        <p:txBody>
+          <a:bodyPr/>
+          <a:lstStyle/>
+          <a:p>
+            <a:r>
+              <a:rPr lang="de-DE" dirty="0" err="1"/>
+              <a:t>Grid</a:t>
+            </a:r>
+            <a:r>
+              <a:rPr lang="de-DE" dirty="0"/>
+              <a:t>: Container Properties</a:t>
+            </a:r>
+          </a:p>
+        </p:txBody>
+      </p:sp>
+      <p:sp>
+        <p:nvSpPr>
+          <p:cNvPr id="3" name="Inhaltsplatzhalter 2">
+            <a:extLst>
+              <a:ext uri="{FF2B5EF4-FFF2-40B4-BE49-F238E27FC236}">
+                <a16:creationId xmlns:a16="http://schemas.microsoft.com/office/drawing/2014/main" id="{3806C9C9-59F1-F44D-8CDC-48E35F0B88E5}"/>
+              </a:ext>
+            </a:extLst>
+          </p:cNvPr>
+          <p:cNvSpPr>
+            <a:spLocks noGrp="1"/>
+          </p:cNvSpPr>
+          <p:nvPr>
+            <p:ph idx="1"/>
+          </p:nvPr>
+        </p:nvSpPr>
+        <p:spPr/>
+        <p:txBody>
+          <a:bodyPr/>
+          <a:lstStyle/>
+          <a:p>
+            <a:pPr marL="0" indent="0">
+              <a:buNone/>
+            </a:pPr>
+            <a:r>
+              <a:rPr lang="de-CH" sz="2000" dirty="0" err="1">
+                <a:latin typeface="Arial" panose="020B0604020202020204" pitchFamily="34" charset="0"/>
+                <a:cs typeface="Arial" panose="020B0604020202020204" pitchFamily="34" charset="0"/>
+              </a:rPr>
+              <a:t>grid</a:t>
+            </a:r>
+            <a:r>
+              <a:rPr lang="de-CH" sz="2000" dirty="0">
+                <a:latin typeface="Arial" panose="020B0604020202020204" pitchFamily="34" charset="0"/>
+                <a:cs typeface="Arial" panose="020B0604020202020204" pitchFamily="34" charset="0"/>
+              </a:rPr>
+              <a:t>-template-</a:t>
+            </a:r>
+            <a:r>
+              <a:rPr lang="de-CH" sz="2000" dirty="0" err="1">
+                <a:latin typeface="Arial" panose="020B0604020202020204" pitchFamily="34" charset="0"/>
+                <a:cs typeface="Arial" panose="020B0604020202020204" pitchFamily="34" charset="0"/>
+              </a:rPr>
+              <a:t>columns</a:t>
+            </a:r>
+            <a:r>
+              <a:rPr lang="de-CH" sz="2000" dirty="0">
+                <a:latin typeface="Arial" panose="020B0604020202020204" pitchFamily="34" charset="0"/>
+                <a:cs typeface="Arial" panose="020B0604020202020204" pitchFamily="34" charset="0"/>
+              </a:rPr>
+              <a:t>: 20% 60% 20%;</a:t>
+            </a:r>
+            <a:br>
+              <a:rPr lang="de-CH" sz="2000" dirty="0">
+                <a:latin typeface="Arial" panose="020B0604020202020204" pitchFamily="34" charset="0"/>
+                <a:cs typeface="Arial" panose="020B0604020202020204" pitchFamily="34" charset="0"/>
+              </a:rPr>
+            </a:br>
+            <a:r>
+              <a:rPr lang="de-CH" sz="2000" dirty="0" err="1">
+                <a:latin typeface="Arial" panose="020B0604020202020204" pitchFamily="34" charset="0"/>
+                <a:cs typeface="Arial" panose="020B0604020202020204" pitchFamily="34" charset="0"/>
+              </a:rPr>
+              <a:t>grid</a:t>
+            </a:r>
+            <a:r>
+              <a:rPr lang="de-CH" sz="2000" dirty="0">
+                <a:latin typeface="Arial" panose="020B0604020202020204" pitchFamily="34" charset="0"/>
+                <a:cs typeface="Arial" panose="020B0604020202020204" pitchFamily="34" charset="0"/>
+              </a:rPr>
+              <a:t>-template-</a:t>
+            </a:r>
+            <a:r>
+              <a:rPr lang="de-CH" sz="2000" dirty="0" err="1">
+                <a:latin typeface="Arial" panose="020B0604020202020204" pitchFamily="34" charset="0"/>
+                <a:cs typeface="Arial" panose="020B0604020202020204" pitchFamily="34" charset="0"/>
+              </a:rPr>
+              <a:t>rows</a:t>
+            </a:r>
+            <a:r>
+              <a:rPr lang="de-CH" sz="2000" dirty="0">
+                <a:latin typeface="Arial" panose="020B0604020202020204" pitchFamily="34" charset="0"/>
+                <a:cs typeface="Arial" panose="020B0604020202020204" pitchFamily="34" charset="0"/>
+              </a:rPr>
+              <a:t>: 100px </a:t>
+            </a:r>
+            <a:r>
+              <a:rPr lang="de-CH" sz="2000" dirty="0" err="1">
+                <a:latin typeface="Arial" panose="020B0604020202020204" pitchFamily="34" charset="0"/>
+                <a:cs typeface="Arial" panose="020B0604020202020204" pitchFamily="34" charset="0"/>
+              </a:rPr>
+              <a:t>auto</a:t>
+            </a:r>
+            <a:r>
+              <a:rPr lang="de-CH" sz="2000" dirty="0">
+                <a:latin typeface="Arial" panose="020B0604020202020204" pitchFamily="34" charset="0"/>
+                <a:cs typeface="Arial" panose="020B0604020202020204" pitchFamily="34" charset="0"/>
+              </a:rPr>
+              <a:t> 100px;</a:t>
+            </a:r>
+            <a:br>
+              <a:rPr lang="de-CH" sz="2000" dirty="0">
+                <a:latin typeface="Arial" panose="020B0604020202020204" pitchFamily="34" charset="0"/>
+                <a:cs typeface="Arial" panose="020B0604020202020204" pitchFamily="34" charset="0"/>
+              </a:rPr>
+            </a:br>
+            <a:r>
+              <a:rPr lang="de-CH" sz="2000" dirty="0" err="1">
+                <a:latin typeface="Arial" panose="020B0604020202020204" pitchFamily="34" charset="0"/>
+                <a:cs typeface="Arial" panose="020B0604020202020204" pitchFamily="34" charset="0"/>
+              </a:rPr>
+              <a:t>grid</a:t>
+            </a:r>
+            <a:r>
+              <a:rPr lang="de-CH" sz="2000" dirty="0">
+                <a:latin typeface="Arial" panose="020B0604020202020204" pitchFamily="34" charset="0"/>
+                <a:cs typeface="Arial" panose="020B0604020202020204" pitchFamily="34" charset="0"/>
+              </a:rPr>
+              <a:t>-template-areas: “</a:t>
+            </a:r>
+            <a:r>
+              <a:rPr lang="de-CH" sz="2000" dirty="0" err="1">
+                <a:latin typeface="Arial" panose="020B0604020202020204" pitchFamily="34" charset="0"/>
+                <a:cs typeface="Arial" panose="020B0604020202020204" pitchFamily="34" charset="0"/>
+              </a:rPr>
+              <a:t>header</a:t>
+            </a:r>
+            <a:r>
+              <a:rPr lang="de-CH" sz="2000" dirty="0">
+                <a:latin typeface="Arial" panose="020B0604020202020204" pitchFamily="34" charset="0"/>
+                <a:cs typeface="Arial" panose="020B0604020202020204" pitchFamily="34" charset="0"/>
+              </a:rPr>
+              <a:t> </a:t>
+            </a:r>
+            <a:r>
+              <a:rPr lang="de-CH" sz="2000" dirty="0" err="1">
+                <a:latin typeface="Arial" panose="020B0604020202020204" pitchFamily="34" charset="0"/>
+                <a:cs typeface="Arial" panose="020B0604020202020204" pitchFamily="34" charset="0"/>
+              </a:rPr>
+              <a:t>header</a:t>
+            </a:r>
+            <a:r>
+              <a:rPr lang="de-CH" sz="2000" dirty="0">
+                <a:latin typeface="Arial" panose="020B0604020202020204" pitchFamily="34" charset="0"/>
+                <a:cs typeface="Arial" panose="020B0604020202020204" pitchFamily="34" charset="0"/>
+              </a:rPr>
+              <a:t> </a:t>
+            </a:r>
+            <a:r>
+              <a:rPr lang="de-CH" sz="2000" dirty="0" err="1">
+                <a:latin typeface="Arial" panose="020B0604020202020204" pitchFamily="34" charset="0"/>
+                <a:cs typeface="Arial" panose="020B0604020202020204" pitchFamily="34" charset="0"/>
+              </a:rPr>
+              <a:t>header</a:t>
+            </a:r>
+            <a:r>
+              <a:rPr lang="de-CH" sz="2000" dirty="0">
+                <a:latin typeface="Arial" panose="020B0604020202020204" pitchFamily="34" charset="0"/>
+                <a:cs typeface="Arial" panose="020B0604020202020204" pitchFamily="34" charset="0"/>
+              </a:rPr>
+              <a:t>“ </a:t>
+            </a:r>
+            <a:br>
+              <a:rPr lang="de-CH" sz="2000" dirty="0">
+                <a:latin typeface="Arial" panose="020B0604020202020204" pitchFamily="34" charset="0"/>
+                <a:cs typeface="Arial" panose="020B0604020202020204" pitchFamily="34" charset="0"/>
+              </a:rPr>
+            </a:br>
+            <a:r>
+              <a:rPr lang="de-CH" sz="2000" dirty="0">
+                <a:latin typeface="Arial" panose="020B0604020202020204" pitchFamily="34" charset="0"/>
+                <a:cs typeface="Arial" panose="020B0604020202020204" pitchFamily="34" charset="0"/>
+              </a:rPr>
+              <a:t>		        “</a:t>
+            </a:r>
+            <a:r>
+              <a:rPr lang="de-CH" sz="2000" dirty="0" err="1">
+                <a:latin typeface="Arial" panose="020B0604020202020204" pitchFamily="34" charset="0"/>
+                <a:cs typeface="Arial" panose="020B0604020202020204" pitchFamily="34" charset="0"/>
+              </a:rPr>
+              <a:t>nav</a:t>
+            </a:r>
+            <a:r>
+              <a:rPr lang="de-CH" sz="2000" dirty="0">
+                <a:latin typeface="Arial" panose="020B0604020202020204" pitchFamily="34" charset="0"/>
+                <a:cs typeface="Arial" panose="020B0604020202020204" pitchFamily="34" charset="0"/>
+              </a:rPr>
+              <a:t> </a:t>
+            </a:r>
+            <a:r>
+              <a:rPr lang="de-CH" sz="2000" dirty="0" err="1">
+                <a:latin typeface="Arial" panose="020B0604020202020204" pitchFamily="34" charset="0"/>
+                <a:cs typeface="Arial" panose="020B0604020202020204" pitchFamily="34" charset="0"/>
+              </a:rPr>
+              <a:t>article</a:t>
+            </a:r>
+            <a:r>
+              <a:rPr lang="de-CH" sz="2000" dirty="0">
+                <a:latin typeface="Arial" panose="020B0604020202020204" pitchFamily="34" charset="0"/>
+                <a:cs typeface="Arial" panose="020B0604020202020204" pitchFamily="34" charset="0"/>
+              </a:rPr>
+              <a:t> </a:t>
+            </a:r>
+            <a:r>
+              <a:rPr lang="de-CH" sz="2000" dirty="0" err="1">
+                <a:latin typeface="Arial" panose="020B0604020202020204" pitchFamily="34" charset="0"/>
+                <a:cs typeface="Arial" panose="020B0604020202020204" pitchFamily="34" charset="0"/>
+              </a:rPr>
+              <a:t>sidebar</a:t>
+            </a:r>
+            <a:r>
+              <a:rPr lang="de-CH" sz="2000" dirty="0">
+                <a:latin typeface="Arial" panose="020B0604020202020204" pitchFamily="34" charset="0"/>
+                <a:cs typeface="Arial" panose="020B0604020202020204" pitchFamily="34" charset="0"/>
+              </a:rPr>
+              <a:t>“ </a:t>
+            </a:r>
+            <a:br>
+              <a:rPr lang="de-CH" sz="2000" dirty="0">
+                <a:latin typeface="Arial" panose="020B0604020202020204" pitchFamily="34" charset="0"/>
+                <a:cs typeface="Arial" panose="020B0604020202020204" pitchFamily="34" charset="0"/>
+              </a:rPr>
+            </a:br>
+            <a:r>
+              <a:rPr lang="de-CH" sz="2000" dirty="0">
+                <a:latin typeface="Arial" panose="020B0604020202020204" pitchFamily="34" charset="0"/>
+                <a:cs typeface="Arial" panose="020B0604020202020204" pitchFamily="34" charset="0"/>
+              </a:rPr>
+              <a:t>		        “</a:t>
+            </a:r>
+            <a:r>
+              <a:rPr lang="de-CH" sz="2000" dirty="0" err="1">
+                <a:latin typeface="Arial" panose="020B0604020202020204" pitchFamily="34" charset="0"/>
+                <a:cs typeface="Arial" panose="020B0604020202020204" pitchFamily="34" charset="0"/>
+              </a:rPr>
+              <a:t>footer</a:t>
+            </a:r>
+            <a:r>
+              <a:rPr lang="de-CH" sz="2000" dirty="0">
+                <a:latin typeface="Arial" panose="020B0604020202020204" pitchFamily="34" charset="0"/>
+                <a:cs typeface="Arial" panose="020B0604020202020204" pitchFamily="34" charset="0"/>
+              </a:rPr>
+              <a:t> </a:t>
+            </a:r>
+            <a:r>
+              <a:rPr lang="de-CH" sz="2000" dirty="0" err="1">
+                <a:latin typeface="Arial" panose="020B0604020202020204" pitchFamily="34" charset="0"/>
+                <a:cs typeface="Arial" panose="020B0604020202020204" pitchFamily="34" charset="0"/>
+              </a:rPr>
+              <a:t>footer</a:t>
+            </a:r>
+            <a:r>
+              <a:rPr lang="de-CH" sz="2000" dirty="0">
+                <a:latin typeface="Arial" panose="020B0604020202020204" pitchFamily="34" charset="0"/>
+                <a:cs typeface="Arial" panose="020B0604020202020204" pitchFamily="34" charset="0"/>
+              </a:rPr>
+              <a:t> </a:t>
+            </a:r>
+            <a:r>
+              <a:rPr lang="de-CH" sz="2000" dirty="0" err="1">
+                <a:latin typeface="Arial" panose="020B0604020202020204" pitchFamily="34" charset="0"/>
+                <a:cs typeface="Arial" panose="020B0604020202020204" pitchFamily="34" charset="0"/>
+              </a:rPr>
+              <a:t>footer</a:t>
+            </a:r>
+            <a:r>
+              <a:rPr lang="de-CH" sz="2000" dirty="0">
+                <a:latin typeface="Arial" panose="020B0604020202020204" pitchFamily="34" charset="0"/>
+                <a:cs typeface="Arial" panose="020B0604020202020204" pitchFamily="34" charset="0"/>
+              </a:rPr>
+              <a:t>“;</a:t>
+            </a:r>
+            <a:br>
+              <a:rPr lang="de-CH" dirty="0"/>
+            </a:br>
+            <a:endParaRPr lang="de-DE" dirty="0"/>
+          </a:p>
+        </p:txBody>
+      </p:sp>
+      <p:pic>
+        <p:nvPicPr>
+          <p:cNvPr id="5" name="Grafik 4">
+            <a:extLst>
+              <a:ext uri="{FF2B5EF4-FFF2-40B4-BE49-F238E27FC236}">
+                <a16:creationId xmlns:a16="http://schemas.microsoft.com/office/drawing/2014/main" id="{1331DA03-898F-C54D-8AC4-17507C089029}"/>
+              </a:ext>
+            </a:extLst>
+          </p:cNvPr>
+          <p:cNvPicPr>
+            <a:picLocks noChangeAspect="1"/>
+          </p:cNvPicPr>
+          <p:nvPr/>
+        </p:nvPicPr>
+        <p:blipFill>
+          <a:blip r:embed="rId2"/>
+          <a:stretch>
+            <a:fillRect/>
+          </a:stretch>
+        </p:blipFill>
+        <p:spPr>
+          <a:xfrm>
+            <a:off x="680321" y="3886108"/>
+            <a:ext cx="6060440" cy="2744562"/>
+          </a:xfrm>
+          <a:prstGeom prst="rect">
+            <a:avLst/>
+          </a:prstGeom>
+        </p:spPr>
+      </p:pic>
+    </p:spTree>
+    <p:extLst>
+      <p:ext uri="{BB962C8B-B14F-4D97-AF65-F5344CB8AC3E}">
+        <p14:creationId xmlns:p14="http://schemas.microsoft.com/office/powerpoint/2010/main" val="43950196"/>
+      </p:ext>
+    </p:extLst>
+  </p:cSld>
+  <p:clrMapOvr>
+    <a:masterClrMapping/>
+  </p:clrMapOvr>
+</p:sld>
+</file>
+
+<file path=ppt/slides/slide87.xml><?xml version="1.0" encoding="utf-8"?>
+<p:sld xmlns:a="http://schemas.openxmlformats.org/drawingml/2006/main" xmlns:r="http://schemas.openxmlformats.org/officeDocument/2006/relationships" xmlns:p="http://schemas.openxmlformats.org/presentationml/2006/main">
+  <p:cSld>
+    <p:spTree>
+      <p:nvGrpSpPr>
+        <p:cNvPr id="1" name=""/>
+        <p:cNvGrpSpPr/>
+        <p:nvPr/>
+      </p:nvGrpSpPr>
+      <p:grpSpPr>
+        <a:xfrm>
+          <a:off x="0" y="0"/>
+          <a:ext cx="0" cy="0"/>
+          <a:chOff x="0" y="0"/>
+          <a:chExt cx="0" cy="0"/>
+        </a:xfrm>
+      </p:grpSpPr>
+      <p:sp>
+        <p:nvSpPr>
+          <p:cNvPr id="2" name="Titel 1">
+            <a:extLst>
+              <a:ext uri="{FF2B5EF4-FFF2-40B4-BE49-F238E27FC236}">
+                <a16:creationId xmlns:a16="http://schemas.microsoft.com/office/drawing/2014/main" id="{14CA3937-0194-2640-AEEF-B26DF6B33988}"/>
+              </a:ext>
+            </a:extLst>
+          </p:cNvPr>
+          <p:cNvSpPr>
+            <a:spLocks noGrp="1"/>
+          </p:cNvSpPr>
+          <p:nvPr>
+            <p:ph type="title"/>
+          </p:nvPr>
+        </p:nvSpPr>
+        <p:spPr/>
+        <p:txBody>
+          <a:bodyPr/>
+          <a:lstStyle/>
+          <a:p>
+            <a:r>
+              <a:rPr lang="de-DE" dirty="0" err="1"/>
+              <a:t>Grid</a:t>
+            </a:r>
+            <a:r>
+              <a:rPr lang="de-DE" dirty="0"/>
+              <a:t>: Item Property</a:t>
+            </a:r>
+          </a:p>
+        </p:txBody>
+      </p:sp>
+      <p:pic>
+        <p:nvPicPr>
+          <p:cNvPr id="4" name="Grafik 3">
+            <a:extLst>
+              <a:ext uri="{FF2B5EF4-FFF2-40B4-BE49-F238E27FC236}">
+                <a16:creationId xmlns:a16="http://schemas.microsoft.com/office/drawing/2014/main" id="{84BD0C20-3226-6D41-A20F-1BCFE39D5334}"/>
+              </a:ext>
+            </a:extLst>
+          </p:cNvPr>
+          <p:cNvPicPr>
+            <a:picLocks noChangeAspect="1"/>
+          </p:cNvPicPr>
+          <p:nvPr/>
+        </p:nvPicPr>
+        <p:blipFill>
+          <a:blip r:embed="rId2"/>
+          <a:stretch>
+            <a:fillRect/>
+          </a:stretch>
+        </p:blipFill>
+        <p:spPr>
+          <a:xfrm>
+            <a:off x="680321" y="2937418"/>
+            <a:ext cx="6060440" cy="2744562"/>
+          </a:xfrm>
+          <a:prstGeom prst="rect">
+            <a:avLst/>
+          </a:prstGeom>
+        </p:spPr>
+      </p:pic>
+      <p:sp>
+        <p:nvSpPr>
+          <p:cNvPr id="5" name="Textfeld 4">
+            <a:extLst>
+              <a:ext uri="{FF2B5EF4-FFF2-40B4-BE49-F238E27FC236}">
+                <a16:creationId xmlns:a16="http://schemas.microsoft.com/office/drawing/2014/main" id="{AA97C151-D2C8-BF47-8D16-CF8048FBD452}"/>
+              </a:ext>
+            </a:extLst>
+          </p:cNvPr>
+          <p:cNvSpPr txBox="1"/>
+          <p:nvPr/>
+        </p:nvSpPr>
+        <p:spPr>
+          <a:xfrm>
+            <a:off x="7825302" y="2377440"/>
+            <a:ext cx="2468880" cy="923330"/>
+          </a:xfrm>
+          <a:prstGeom prst="rect">
+            <a:avLst/>
+          </a:prstGeom>
+          <a:noFill/>
+        </p:spPr>
+        <p:txBody>
+          <a:bodyPr wrap="square" rtlCol="0">
+            <a:spAutoFit/>
+          </a:bodyPr>
+          <a:lstStyle/>
+          <a:p>
+            <a:r>
+              <a:rPr lang="de-DE" dirty="0" err="1"/>
+              <a:t>header</a:t>
+            </a:r>
+            <a:r>
+              <a:rPr lang="de-DE" dirty="0"/>
+              <a:t> {</a:t>
+            </a:r>
+            <a:br>
+              <a:rPr lang="de-DE" dirty="0"/>
+            </a:br>
+            <a:r>
+              <a:rPr lang="de-DE" dirty="0"/>
+              <a:t>   </a:t>
+            </a:r>
+            <a:r>
+              <a:rPr lang="de-DE" dirty="0" err="1"/>
+              <a:t>grid</a:t>
+            </a:r>
+            <a:r>
+              <a:rPr lang="de-DE" dirty="0"/>
+              <a:t>-area: </a:t>
+            </a:r>
+            <a:r>
+              <a:rPr lang="de-DE" dirty="0" err="1"/>
+              <a:t>header</a:t>
+            </a:r>
+            <a:r>
+              <a:rPr lang="de-DE" dirty="0"/>
+              <a:t>;</a:t>
+            </a:r>
+            <a:br>
+              <a:rPr lang="de-DE" dirty="0"/>
+            </a:br>
+            <a:r>
+              <a:rPr lang="de-DE" dirty="0"/>
+              <a:t>}</a:t>
+            </a:r>
+          </a:p>
+        </p:txBody>
+      </p:sp>
+      <p:cxnSp>
+        <p:nvCxnSpPr>
+          <p:cNvPr id="6" name="Gerade Verbindung mit Pfeil 4">
+            <a:extLst>
+              <a:ext uri="{FF2B5EF4-FFF2-40B4-BE49-F238E27FC236}">
+                <a16:creationId xmlns:a16="http://schemas.microsoft.com/office/drawing/2014/main" id="{F1849A78-53EE-2F41-B52A-4935184D6F57}"/>
+              </a:ext>
+            </a:extLst>
+          </p:cNvPr>
+          <p:cNvCxnSpPr>
+            <a:cxnSpLocks/>
+          </p:cNvCxnSpPr>
+          <p:nvPr/>
+        </p:nvCxnSpPr>
+        <p:spPr>
+          <a:xfrm flipV="1">
+            <a:off x="6822892" y="2839105"/>
+            <a:ext cx="1034593" cy="291320"/>
+          </a:xfrm>
+          <a:prstGeom prst="straightConnector1">
+            <a:avLst/>
+          </a:prstGeom>
+          <a:ln w="38100">
+            <a:solidFill>
+              <a:schemeClr val="bg1"/>
+            </a:solidFill>
+            <a:tailEnd type="triangle"/>
+          </a:ln>
+        </p:spPr>
+        <p:style>
+          <a:lnRef idx="1">
+            <a:schemeClr val="dk1"/>
+          </a:lnRef>
+          <a:fillRef idx="0">
+            <a:schemeClr val="dk1"/>
+          </a:fillRef>
+          <a:effectRef idx="0">
+            <a:schemeClr val="dk1"/>
+          </a:effectRef>
+          <a:fontRef idx="minor">
+            <a:schemeClr val="tx1"/>
+          </a:fontRef>
+        </p:style>
+      </p:cxnSp>
+    </p:spTree>
+    <p:extLst>
+      <p:ext uri="{BB962C8B-B14F-4D97-AF65-F5344CB8AC3E}">
+        <p14:creationId xmlns:p14="http://schemas.microsoft.com/office/powerpoint/2010/main" val="1075044925"/>
+      </p:ext>
+    </p:extLst>
+  </p:cSld>
+  <p:clrMapOvr>
+    <a:masterClrMapping/>
+  </p:clrMapOvr>
+</p:sld>
+</file>
+
+<file path=ppt/slides/slide88.xml><?xml version="1.0" encoding="utf-8"?>
+<p:sld xmlns:a="http://schemas.openxmlformats.org/drawingml/2006/main" xmlns:r="http://schemas.openxmlformats.org/officeDocument/2006/relationships" xmlns:p="http://schemas.openxmlformats.org/presentationml/2006/main">
+  <p:cSld>
+    <p:spTree>
+      <p:nvGrpSpPr>
+        <p:cNvPr id="1" name=""/>
+        <p:cNvGrpSpPr/>
+        <p:nvPr/>
+      </p:nvGrpSpPr>
+      <p:grpSpPr>
+        <a:xfrm>
+          <a:off x="0" y="0"/>
+          <a:ext cx="0" cy="0"/>
+          <a:chOff x="0" y="0"/>
+          <a:chExt cx="0" cy="0"/>
+        </a:xfrm>
+      </p:grpSpPr>
+      <p:sp>
+        <p:nvSpPr>
+          <p:cNvPr id="2" name="Titel 1">
+            <a:extLst>
+              <a:ext uri="{FF2B5EF4-FFF2-40B4-BE49-F238E27FC236}">
+                <a16:creationId xmlns:a16="http://schemas.microsoft.com/office/drawing/2014/main" id="{C6066D15-E228-B241-B77F-49B0F5396229}"/>
+              </a:ext>
+            </a:extLst>
+          </p:cNvPr>
+          <p:cNvSpPr>
+            <a:spLocks noGrp="1"/>
+          </p:cNvSpPr>
+          <p:nvPr>
+            <p:ph type="title"/>
+          </p:nvPr>
+        </p:nvSpPr>
+        <p:spPr/>
+        <p:txBody>
+          <a:bodyPr/>
+          <a:lstStyle/>
+          <a:p>
+            <a:r>
+              <a:rPr lang="de-DE" dirty="0" err="1"/>
+              <a:t>Grid</a:t>
+            </a:r>
+            <a:r>
+              <a:rPr lang="de-DE" dirty="0"/>
+              <a:t>: Container Properties</a:t>
+            </a:r>
+          </a:p>
+        </p:txBody>
+      </p:sp>
+      <p:sp>
+        <p:nvSpPr>
+          <p:cNvPr id="3" name="Inhaltsplatzhalter 2">
+            <a:extLst>
+              <a:ext uri="{FF2B5EF4-FFF2-40B4-BE49-F238E27FC236}">
+                <a16:creationId xmlns:a16="http://schemas.microsoft.com/office/drawing/2014/main" id="{5D2AB79C-8C57-1644-9417-D4E86FEE69C4}"/>
+              </a:ext>
+            </a:extLst>
+          </p:cNvPr>
+          <p:cNvSpPr>
+            <a:spLocks noGrp="1"/>
+          </p:cNvSpPr>
+          <p:nvPr>
+            <p:ph idx="1"/>
+          </p:nvPr>
+        </p:nvSpPr>
+        <p:spPr>
+          <a:xfrm>
+            <a:off x="680321" y="2336873"/>
+            <a:ext cx="9613861" cy="3599316"/>
+          </a:xfrm>
+        </p:spPr>
+        <p:txBody>
+          <a:bodyPr/>
+          <a:lstStyle/>
+          <a:p>
+            <a:r>
+              <a:rPr lang="de-CH" dirty="0" err="1">
+                <a:solidFill>
+                  <a:schemeClr val="bg1"/>
+                </a:solidFill>
+              </a:rPr>
+              <a:t>grid</a:t>
+            </a:r>
+            <a:r>
+              <a:rPr lang="de-CH" dirty="0">
+                <a:solidFill>
+                  <a:schemeClr val="bg1"/>
+                </a:solidFill>
+              </a:rPr>
+              <a:t>-template</a:t>
+            </a:r>
+            <a:r>
+              <a:rPr lang="de-CH" dirty="0"/>
+              <a:t>: Ist ein eine </a:t>
+            </a:r>
+            <a:r>
+              <a:rPr lang="de-CH" dirty="0" err="1"/>
+              <a:t>shorthand</a:t>
+            </a:r>
+            <a:r>
+              <a:rPr lang="de-CH" dirty="0"/>
+              <a:t> Definition für </a:t>
+            </a:r>
+            <a:r>
+              <a:rPr lang="de-CH" dirty="0" err="1"/>
+              <a:t>grid</a:t>
+            </a:r>
+            <a:r>
+              <a:rPr lang="de-CH" dirty="0"/>
+              <a:t>-template-</a:t>
+            </a:r>
+            <a:r>
+              <a:rPr lang="de-CH" dirty="0" err="1"/>
+              <a:t>rows</a:t>
+            </a:r>
+            <a:r>
+              <a:rPr lang="de-CH" dirty="0"/>
+              <a:t>, </a:t>
+            </a:r>
+            <a:r>
+              <a:rPr lang="de-CH" dirty="0" err="1"/>
+              <a:t>grid</a:t>
+            </a:r>
+            <a:r>
+              <a:rPr lang="de-CH" dirty="0"/>
+              <a:t>-template-</a:t>
+            </a:r>
+            <a:r>
+              <a:rPr lang="de-CH" dirty="0" err="1"/>
+              <a:t>columns</a:t>
+            </a:r>
+            <a:r>
+              <a:rPr lang="de-CH" dirty="0"/>
+              <a:t>, </a:t>
+            </a:r>
+            <a:r>
+              <a:rPr lang="de-CH" dirty="0" err="1"/>
+              <a:t>grid</a:t>
+            </a:r>
+            <a:r>
+              <a:rPr lang="de-CH" dirty="0"/>
+              <a:t>-template-areas.</a:t>
+            </a:r>
+            <a:br>
+              <a:rPr lang="de-CH" dirty="0"/>
+            </a:br>
+            <a:br>
+              <a:rPr lang="de-CH" dirty="0"/>
+            </a:br>
+            <a:br>
+              <a:rPr lang="de-CH" dirty="0"/>
+            </a:br>
+            <a:endParaRPr lang="de-DE" dirty="0"/>
+          </a:p>
+          <a:p>
+            <a:endParaRPr lang="de-CH" dirty="0"/>
+          </a:p>
+          <a:p>
+            <a:endParaRPr lang="de-DE" dirty="0"/>
+          </a:p>
+        </p:txBody>
+      </p:sp>
+      <p:sp>
+        <p:nvSpPr>
+          <p:cNvPr id="4" name="Textfeld 3">
+            <a:extLst>
+              <a:ext uri="{FF2B5EF4-FFF2-40B4-BE49-F238E27FC236}">
+                <a16:creationId xmlns:a16="http://schemas.microsoft.com/office/drawing/2014/main" id="{C496C4D1-CA81-064D-B000-1E6D79AF7EE5}"/>
+              </a:ext>
+            </a:extLst>
+          </p:cNvPr>
+          <p:cNvSpPr txBox="1"/>
+          <p:nvPr/>
+        </p:nvSpPr>
+        <p:spPr>
+          <a:xfrm>
+            <a:off x="772612" y="3397867"/>
+            <a:ext cx="4714639" cy="1477328"/>
+          </a:xfrm>
+          <a:prstGeom prst="rect">
+            <a:avLst/>
+          </a:prstGeom>
+          <a:noFill/>
+        </p:spPr>
+        <p:txBody>
+          <a:bodyPr wrap="square" rtlCol="0">
+            <a:spAutoFit/>
+          </a:bodyPr>
+          <a:lstStyle/>
+          <a:p>
+            <a:r>
+              <a:rPr lang="de-CH" dirty="0" err="1">
+                <a:latin typeface="Arial" panose="020B0604020202020204" pitchFamily="34" charset="0"/>
+                <a:cs typeface="Arial" panose="020B0604020202020204" pitchFamily="34" charset="0"/>
+              </a:rPr>
+              <a:t>grid</a:t>
+            </a:r>
+            <a:r>
+              <a:rPr lang="de-CH" dirty="0">
+                <a:latin typeface="Arial" panose="020B0604020202020204" pitchFamily="34" charset="0"/>
+                <a:cs typeface="Arial" panose="020B0604020202020204" pitchFamily="34" charset="0"/>
+              </a:rPr>
+              <a:t>-template-</a:t>
+            </a:r>
+            <a:r>
+              <a:rPr lang="de-CH" dirty="0" err="1">
+                <a:latin typeface="Arial" panose="020B0604020202020204" pitchFamily="34" charset="0"/>
+                <a:cs typeface="Arial" panose="020B0604020202020204" pitchFamily="34" charset="0"/>
+              </a:rPr>
+              <a:t>columns</a:t>
+            </a:r>
+            <a:r>
+              <a:rPr lang="de-CH" dirty="0">
+                <a:latin typeface="Arial" panose="020B0604020202020204" pitchFamily="34" charset="0"/>
+                <a:cs typeface="Arial" panose="020B0604020202020204" pitchFamily="34" charset="0"/>
+              </a:rPr>
+              <a:t>: 20% 60% 20%;</a:t>
+            </a:r>
+            <a:br>
+              <a:rPr lang="de-CH" dirty="0">
+                <a:latin typeface="Arial" panose="020B0604020202020204" pitchFamily="34" charset="0"/>
+                <a:cs typeface="Arial" panose="020B0604020202020204" pitchFamily="34" charset="0"/>
+              </a:rPr>
+            </a:br>
+            <a:r>
+              <a:rPr lang="de-CH" dirty="0" err="1">
+                <a:latin typeface="Arial" panose="020B0604020202020204" pitchFamily="34" charset="0"/>
+                <a:cs typeface="Arial" panose="020B0604020202020204" pitchFamily="34" charset="0"/>
+              </a:rPr>
+              <a:t>grid</a:t>
+            </a:r>
+            <a:r>
+              <a:rPr lang="de-CH" dirty="0">
+                <a:latin typeface="Arial" panose="020B0604020202020204" pitchFamily="34" charset="0"/>
+                <a:cs typeface="Arial" panose="020B0604020202020204" pitchFamily="34" charset="0"/>
+              </a:rPr>
+              <a:t>-template-</a:t>
+            </a:r>
+            <a:r>
+              <a:rPr lang="de-CH" dirty="0" err="1">
+                <a:latin typeface="Arial" panose="020B0604020202020204" pitchFamily="34" charset="0"/>
+                <a:cs typeface="Arial" panose="020B0604020202020204" pitchFamily="34" charset="0"/>
+              </a:rPr>
+              <a:t>rows</a:t>
+            </a:r>
+            <a:r>
+              <a:rPr lang="de-CH" dirty="0">
+                <a:latin typeface="Arial" panose="020B0604020202020204" pitchFamily="34" charset="0"/>
+                <a:cs typeface="Arial" panose="020B0604020202020204" pitchFamily="34" charset="0"/>
+              </a:rPr>
+              <a:t>: 100px </a:t>
+            </a:r>
+            <a:r>
+              <a:rPr lang="de-CH" dirty="0" err="1">
+                <a:latin typeface="Arial" panose="020B0604020202020204" pitchFamily="34" charset="0"/>
+                <a:cs typeface="Arial" panose="020B0604020202020204" pitchFamily="34" charset="0"/>
+              </a:rPr>
+              <a:t>auto</a:t>
+            </a:r>
+            <a:r>
+              <a:rPr lang="de-CH" dirty="0">
+                <a:latin typeface="Arial" panose="020B0604020202020204" pitchFamily="34" charset="0"/>
+                <a:cs typeface="Arial" panose="020B0604020202020204" pitchFamily="34" charset="0"/>
+              </a:rPr>
+              <a:t> 100px;</a:t>
+            </a:r>
+            <a:br>
+              <a:rPr lang="de-CH" dirty="0">
+                <a:latin typeface="Arial" panose="020B0604020202020204" pitchFamily="34" charset="0"/>
+                <a:cs typeface="Arial" panose="020B0604020202020204" pitchFamily="34" charset="0"/>
+              </a:rPr>
+            </a:br>
+            <a:r>
+              <a:rPr lang="de-CH" dirty="0" err="1">
+                <a:latin typeface="Arial" panose="020B0604020202020204" pitchFamily="34" charset="0"/>
+                <a:cs typeface="Arial" panose="020B0604020202020204" pitchFamily="34" charset="0"/>
+              </a:rPr>
+              <a:t>grid</a:t>
+            </a:r>
+            <a:r>
+              <a:rPr lang="de-CH" dirty="0">
+                <a:latin typeface="Arial" panose="020B0604020202020204" pitchFamily="34" charset="0"/>
+                <a:cs typeface="Arial" panose="020B0604020202020204" pitchFamily="34" charset="0"/>
+              </a:rPr>
+              <a:t>-template-areas: “</a:t>
+            </a:r>
+            <a:r>
+              <a:rPr lang="de-CH" dirty="0" err="1">
+                <a:latin typeface="Arial" panose="020B0604020202020204" pitchFamily="34" charset="0"/>
+                <a:cs typeface="Arial" panose="020B0604020202020204" pitchFamily="34" charset="0"/>
+              </a:rPr>
+              <a:t>header</a:t>
+            </a:r>
+            <a:r>
+              <a:rPr lang="de-CH" dirty="0">
+                <a:latin typeface="Arial" panose="020B0604020202020204" pitchFamily="34" charset="0"/>
+                <a:cs typeface="Arial" panose="020B0604020202020204" pitchFamily="34" charset="0"/>
+              </a:rPr>
+              <a:t> </a:t>
+            </a:r>
+            <a:r>
+              <a:rPr lang="de-CH" dirty="0" err="1">
+                <a:latin typeface="Arial" panose="020B0604020202020204" pitchFamily="34" charset="0"/>
+                <a:cs typeface="Arial" panose="020B0604020202020204" pitchFamily="34" charset="0"/>
+              </a:rPr>
+              <a:t>header</a:t>
+            </a:r>
+            <a:r>
+              <a:rPr lang="de-CH" dirty="0">
+                <a:latin typeface="Arial" panose="020B0604020202020204" pitchFamily="34" charset="0"/>
+                <a:cs typeface="Arial" panose="020B0604020202020204" pitchFamily="34" charset="0"/>
+              </a:rPr>
+              <a:t> </a:t>
+            </a:r>
+            <a:r>
+              <a:rPr lang="de-CH" dirty="0" err="1">
+                <a:latin typeface="Arial" panose="020B0604020202020204" pitchFamily="34" charset="0"/>
+                <a:cs typeface="Arial" panose="020B0604020202020204" pitchFamily="34" charset="0"/>
+              </a:rPr>
+              <a:t>header</a:t>
+            </a:r>
+            <a:r>
+              <a:rPr lang="de-CH" dirty="0">
+                <a:latin typeface="Arial" panose="020B0604020202020204" pitchFamily="34" charset="0"/>
+                <a:cs typeface="Arial" panose="020B0604020202020204" pitchFamily="34" charset="0"/>
+              </a:rPr>
+              <a:t>“ </a:t>
+            </a:r>
+            <a:br>
+              <a:rPr lang="de-CH" dirty="0">
+                <a:latin typeface="Arial" panose="020B0604020202020204" pitchFamily="34" charset="0"/>
+                <a:cs typeface="Arial" panose="020B0604020202020204" pitchFamily="34" charset="0"/>
+              </a:rPr>
+            </a:br>
+            <a:r>
+              <a:rPr lang="de-CH" dirty="0">
+                <a:latin typeface="Arial" panose="020B0604020202020204" pitchFamily="34" charset="0"/>
+                <a:cs typeface="Arial" panose="020B0604020202020204" pitchFamily="34" charset="0"/>
+              </a:rPr>
+              <a:t>		     “</a:t>
+            </a:r>
+            <a:r>
+              <a:rPr lang="de-CH" dirty="0" err="1">
+                <a:latin typeface="Arial" panose="020B0604020202020204" pitchFamily="34" charset="0"/>
+                <a:cs typeface="Arial" panose="020B0604020202020204" pitchFamily="34" charset="0"/>
+              </a:rPr>
+              <a:t>nav</a:t>
+            </a:r>
+            <a:r>
+              <a:rPr lang="de-CH" dirty="0">
+                <a:latin typeface="Arial" panose="020B0604020202020204" pitchFamily="34" charset="0"/>
+                <a:cs typeface="Arial" panose="020B0604020202020204" pitchFamily="34" charset="0"/>
+              </a:rPr>
+              <a:t> </a:t>
+            </a:r>
+            <a:r>
+              <a:rPr lang="de-CH" dirty="0" err="1">
+                <a:latin typeface="Arial" panose="020B0604020202020204" pitchFamily="34" charset="0"/>
+                <a:cs typeface="Arial" panose="020B0604020202020204" pitchFamily="34" charset="0"/>
+              </a:rPr>
+              <a:t>article</a:t>
+            </a:r>
+            <a:r>
+              <a:rPr lang="de-CH" dirty="0">
+                <a:latin typeface="Arial" panose="020B0604020202020204" pitchFamily="34" charset="0"/>
+                <a:cs typeface="Arial" panose="020B0604020202020204" pitchFamily="34" charset="0"/>
+              </a:rPr>
+              <a:t> </a:t>
+            </a:r>
+            <a:r>
+              <a:rPr lang="de-CH" dirty="0" err="1">
+                <a:latin typeface="Arial" panose="020B0604020202020204" pitchFamily="34" charset="0"/>
+                <a:cs typeface="Arial" panose="020B0604020202020204" pitchFamily="34" charset="0"/>
+              </a:rPr>
+              <a:t>sidebar</a:t>
+            </a:r>
+            <a:r>
+              <a:rPr lang="de-CH" dirty="0">
+                <a:latin typeface="Arial" panose="020B0604020202020204" pitchFamily="34" charset="0"/>
+                <a:cs typeface="Arial" panose="020B0604020202020204" pitchFamily="34" charset="0"/>
+              </a:rPr>
+              <a:t>“ </a:t>
+            </a:r>
+            <a:br>
+              <a:rPr lang="de-CH" dirty="0">
+                <a:latin typeface="Arial" panose="020B0604020202020204" pitchFamily="34" charset="0"/>
+                <a:cs typeface="Arial" panose="020B0604020202020204" pitchFamily="34" charset="0"/>
+              </a:rPr>
+            </a:br>
+            <a:r>
+              <a:rPr lang="de-CH" dirty="0">
+                <a:latin typeface="Arial" panose="020B0604020202020204" pitchFamily="34" charset="0"/>
+                <a:cs typeface="Arial" panose="020B0604020202020204" pitchFamily="34" charset="0"/>
+              </a:rPr>
+              <a:t>		        “</a:t>
+            </a:r>
+            <a:r>
+              <a:rPr lang="de-CH" dirty="0" err="1">
+                <a:latin typeface="Arial" panose="020B0604020202020204" pitchFamily="34" charset="0"/>
+                <a:cs typeface="Arial" panose="020B0604020202020204" pitchFamily="34" charset="0"/>
+              </a:rPr>
+              <a:t>footer</a:t>
+            </a:r>
+            <a:r>
+              <a:rPr lang="de-CH" dirty="0">
+                <a:latin typeface="Arial" panose="020B0604020202020204" pitchFamily="34" charset="0"/>
+                <a:cs typeface="Arial" panose="020B0604020202020204" pitchFamily="34" charset="0"/>
+              </a:rPr>
+              <a:t> </a:t>
+            </a:r>
+            <a:r>
+              <a:rPr lang="de-CH" dirty="0" err="1">
+                <a:latin typeface="Arial" panose="020B0604020202020204" pitchFamily="34" charset="0"/>
+                <a:cs typeface="Arial" panose="020B0604020202020204" pitchFamily="34" charset="0"/>
+              </a:rPr>
+              <a:t>footer</a:t>
+            </a:r>
+            <a:r>
+              <a:rPr lang="de-CH" dirty="0">
+                <a:latin typeface="Arial" panose="020B0604020202020204" pitchFamily="34" charset="0"/>
+                <a:cs typeface="Arial" panose="020B0604020202020204" pitchFamily="34" charset="0"/>
+              </a:rPr>
+              <a:t> </a:t>
+            </a:r>
+            <a:r>
+              <a:rPr lang="de-CH" dirty="0" err="1">
+                <a:latin typeface="Arial" panose="020B0604020202020204" pitchFamily="34" charset="0"/>
+                <a:cs typeface="Arial" panose="020B0604020202020204" pitchFamily="34" charset="0"/>
+              </a:rPr>
+              <a:t>footer</a:t>
+            </a:r>
+            <a:r>
+              <a:rPr lang="de-CH" dirty="0">
+                <a:latin typeface="Arial" panose="020B0604020202020204" pitchFamily="34" charset="0"/>
+                <a:cs typeface="Arial" panose="020B0604020202020204" pitchFamily="34" charset="0"/>
+              </a:rPr>
+              <a:t>“;</a:t>
+            </a:r>
+            <a:endParaRPr lang="de-DE" dirty="0"/>
+          </a:p>
+        </p:txBody>
+      </p:sp>
+      <p:sp>
+        <p:nvSpPr>
+          <p:cNvPr id="5" name="Textfeld 4">
+            <a:extLst>
+              <a:ext uri="{FF2B5EF4-FFF2-40B4-BE49-F238E27FC236}">
+                <a16:creationId xmlns:a16="http://schemas.microsoft.com/office/drawing/2014/main" id="{A1D56991-ABFB-0A43-A77E-DED928ED6E1D}"/>
+              </a:ext>
+            </a:extLst>
+          </p:cNvPr>
+          <p:cNvSpPr txBox="1"/>
+          <p:nvPr/>
+        </p:nvSpPr>
+        <p:spPr>
+          <a:xfrm>
+            <a:off x="772612" y="5584939"/>
+            <a:ext cx="10915650" cy="923330"/>
+          </a:xfrm>
+          <a:prstGeom prst="rect">
+            <a:avLst/>
+          </a:prstGeom>
+          <a:noFill/>
+        </p:spPr>
+        <p:txBody>
+          <a:bodyPr wrap="square" rtlCol="0">
+            <a:spAutoFit/>
+          </a:bodyPr>
+          <a:lstStyle/>
+          <a:p>
+            <a:r>
+              <a:rPr lang="de-CH" dirty="0" err="1">
+                <a:latin typeface="Arial" panose="020B0604020202020204" pitchFamily="34" charset="0"/>
+                <a:cs typeface="Arial" panose="020B0604020202020204" pitchFamily="34" charset="0"/>
+              </a:rPr>
+              <a:t>grid</a:t>
+            </a:r>
+            <a:r>
+              <a:rPr lang="de-CH" dirty="0">
+                <a:latin typeface="Arial" panose="020B0604020202020204" pitchFamily="34" charset="0"/>
+                <a:cs typeface="Arial" panose="020B0604020202020204" pitchFamily="34" charset="0"/>
+              </a:rPr>
+              <a:t>-template: “</a:t>
+            </a:r>
+            <a:r>
+              <a:rPr lang="de-CH" dirty="0" err="1">
+                <a:latin typeface="Arial" panose="020B0604020202020204" pitchFamily="34" charset="0"/>
+                <a:cs typeface="Arial" panose="020B0604020202020204" pitchFamily="34" charset="0"/>
+              </a:rPr>
+              <a:t>header</a:t>
+            </a:r>
+            <a:r>
+              <a:rPr lang="de-CH" dirty="0">
+                <a:latin typeface="Arial" panose="020B0604020202020204" pitchFamily="34" charset="0"/>
+                <a:cs typeface="Arial" panose="020B0604020202020204" pitchFamily="34" charset="0"/>
+              </a:rPr>
+              <a:t> </a:t>
+            </a:r>
+            <a:r>
+              <a:rPr lang="de-CH" dirty="0" err="1">
+                <a:latin typeface="Arial" panose="020B0604020202020204" pitchFamily="34" charset="0"/>
+                <a:cs typeface="Arial" panose="020B0604020202020204" pitchFamily="34" charset="0"/>
+              </a:rPr>
+              <a:t>header</a:t>
+            </a:r>
+            <a:r>
+              <a:rPr lang="de-CH" dirty="0">
+                <a:latin typeface="Arial" panose="020B0604020202020204" pitchFamily="34" charset="0"/>
+                <a:cs typeface="Arial" panose="020B0604020202020204" pitchFamily="34" charset="0"/>
+              </a:rPr>
+              <a:t> </a:t>
+            </a:r>
+            <a:r>
+              <a:rPr lang="de-CH" dirty="0" err="1">
+                <a:latin typeface="Arial" panose="020B0604020202020204" pitchFamily="34" charset="0"/>
+                <a:cs typeface="Arial" panose="020B0604020202020204" pitchFamily="34" charset="0"/>
+              </a:rPr>
+              <a:t>header</a:t>
+            </a:r>
+            <a:r>
+              <a:rPr lang="de-CH" dirty="0">
+                <a:latin typeface="Arial" panose="020B0604020202020204" pitchFamily="34" charset="0"/>
+                <a:cs typeface="Arial" panose="020B0604020202020204" pitchFamily="34" charset="0"/>
+              </a:rPr>
+              <a:t>“ 100px “</a:t>
+            </a:r>
+            <a:r>
+              <a:rPr lang="de-CH" dirty="0" err="1">
+                <a:latin typeface="Arial" panose="020B0604020202020204" pitchFamily="34" charset="0"/>
+                <a:cs typeface="Arial" panose="020B0604020202020204" pitchFamily="34" charset="0"/>
+              </a:rPr>
+              <a:t>nav</a:t>
+            </a:r>
+            <a:r>
+              <a:rPr lang="de-CH" dirty="0">
+                <a:latin typeface="Arial" panose="020B0604020202020204" pitchFamily="34" charset="0"/>
+                <a:cs typeface="Arial" panose="020B0604020202020204" pitchFamily="34" charset="0"/>
+              </a:rPr>
+              <a:t> </a:t>
+            </a:r>
+            <a:r>
+              <a:rPr lang="de-CH" dirty="0" err="1">
+                <a:latin typeface="Arial" panose="020B0604020202020204" pitchFamily="34" charset="0"/>
+                <a:cs typeface="Arial" panose="020B0604020202020204" pitchFamily="34" charset="0"/>
+              </a:rPr>
+              <a:t>article</a:t>
+            </a:r>
+            <a:r>
+              <a:rPr lang="de-CH" dirty="0">
+                <a:latin typeface="Arial" panose="020B0604020202020204" pitchFamily="34" charset="0"/>
+                <a:cs typeface="Arial" panose="020B0604020202020204" pitchFamily="34" charset="0"/>
+              </a:rPr>
+              <a:t> </a:t>
+            </a:r>
+            <a:r>
+              <a:rPr lang="de-CH" dirty="0" err="1">
+                <a:latin typeface="Arial" panose="020B0604020202020204" pitchFamily="34" charset="0"/>
+                <a:cs typeface="Arial" panose="020B0604020202020204" pitchFamily="34" charset="0"/>
+              </a:rPr>
+              <a:t>sidebar</a:t>
+            </a:r>
+            <a:r>
+              <a:rPr lang="de-CH" dirty="0">
+                <a:latin typeface="Arial" panose="020B0604020202020204" pitchFamily="34" charset="0"/>
+                <a:cs typeface="Arial" panose="020B0604020202020204" pitchFamily="34" charset="0"/>
+              </a:rPr>
+              <a:t>“ </a:t>
+            </a:r>
+            <a:r>
+              <a:rPr lang="de-CH" dirty="0" err="1">
+                <a:latin typeface="Arial" panose="020B0604020202020204" pitchFamily="34" charset="0"/>
+                <a:cs typeface="Arial" panose="020B0604020202020204" pitchFamily="34" charset="0"/>
+              </a:rPr>
+              <a:t>auto</a:t>
+            </a:r>
+            <a:r>
+              <a:rPr lang="de-CH" dirty="0">
+                <a:latin typeface="Arial" panose="020B0604020202020204" pitchFamily="34" charset="0"/>
+                <a:cs typeface="Arial" panose="020B0604020202020204" pitchFamily="34" charset="0"/>
+              </a:rPr>
+              <a:t> “</a:t>
+            </a:r>
+            <a:r>
+              <a:rPr lang="de-CH" dirty="0" err="1">
+                <a:latin typeface="Arial" panose="020B0604020202020204" pitchFamily="34" charset="0"/>
+                <a:cs typeface="Arial" panose="020B0604020202020204" pitchFamily="34" charset="0"/>
+              </a:rPr>
+              <a:t>footer</a:t>
+            </a:r>
+            <a:r>
+              <a:rPr lang="de-CH" dirty="0">
+                <a:latin typeface="Arial" panose="020B0604020202020204" pitchFamily="34" charset="0"/>
+                <a:cs typeface="Arial" panose="020B0604020202020204" pitchFamily="34" charset="0"/>
+              </a:rPr>
+              <a:t> </a:t>
+            </a:r>
+            <a:r>
+              <a:rPr lang="de-CH" dirty="0" err="1">
+                <a:latin typeface="Arial" panose="020B0604020202020204" pitchFamily="34" charset="0"/>
+                <a:cs typeface="Arial" panose="020B0604020202020204" pitchFamily="34" charset="0"/>
+              </a:rPr>
+              <a:t>footer</a:t>
+            </a:r>
+            <a:r>
+              <a:rPr lang="de-CH" dirty="0">
+                <a:latin typeface="Arial" panose="020B0604020202020204" pitchFamily="34" charset="0"/>
+                <a:cs typeface="Arial" panose="020B0604020202020204" pitchFamily="34" charset="0"/>
+              </a:rPr>
+              <a:t> </a:t>
+            </a:r>
+            <a:r>
+              <a:rPr lang="de-CH" dirty="0" err="1">
+                <a:latin typeface="Arial" panose="020B0604020202020204" pitchFamily="34" charset="0"/>
+                <a:cs typeface="Arial" panose="020B0604020202020204" pitchFamily="34" charset="0"/>
+              </a:rPr>
+              <a:t>footer</a:t>
+            </a:r>
+            <a:r>
+              <a:rPr lang="de-CH" dirty="0">
+                <a:latin typeface="Arial" panose="020B0604020202020204" pitchFamily="34" charset="0"/>
+                <a:cs typeface="Arial" panose="020B0604020202020204" pitchFamily="34" charset="0"/>
+              </a:rPr>
+              <a:t>“ 100px </a:t>
+            </a:r>
+          </a:p>
+          <a:p>
+            <a:r>
+              <a:rPr lang="de-CH" dirty="0">
+                <a:latin typeface="Arial" panose="020B0604020202020204" pitchFamily="34" charset="0"/>
+                <a:cs typeface="Arial" panose="020B0604020202020204" pitchFamily="34" charset="0"/>
+              </a:rPr>
+              <a:t>                       / 20% 60% 20%;</a:t>
+            </a:r>
+            <a:br>
+              <a:rPr lang="de-CH" dirty="0">
+                <a:latin typeface="Arial" panose="020B0604020202020204" pitchFamily="34" charset="0"/>
+                <a:cs typeface="Arial" panose="020B0604020202020204" pitchFamily="34" charset="0"/>
+              </a:rPr>
+            </a:br>
+            <a:endParaRPr lang="de-DE" dirty="0"/>
+          </a:p>
+        </p:txBody>
+      </p:sp>
+      <p:cxnSp>
+        <p:nvCxnSpPr>
+          <p:cNvPr id="6" name="Gerade Verbindung mit Pfeil 4">
+            <a:extLst>
+              <a:ext uri="{FF2B5EF4-FFF2-40B4-BE49-F238E27FC236}">
+                <a16:creationId xmlns:a16="http://schemas.microsoft.com/office/drawing/2014/main" id="{B705ACEA-412E-6A48-A111-FEDB05D02BF8}"/>
+              </a:ext>
+            </a:extLst>
+          </p:cNvPr>
+          <p:cNvCxnSpPr>
+            <a:cxnSpLocks/>
+          </p:cNvCxnSpPr>
+          <p:nvPr/>
+        </p:nvCxnSpPr>
+        <p:spPr>
+          <a:xfrm>
+            <a:off x="3234690" y="4875195"/>
+            <a:ext cx="0" cy="571539"/>
+          </a:xfrm>
+          <a:prstGeom prst="straightConnector1">
+            <a:avLst/>
+          </a:prstGeom>
+          <a:ln w="38100">
+            <a:solidFill>
+              <a:schemeClr val="bg1"/>
+            </a:solidFill>
+            <a:tailEnd type="triangle"/>
+          </a:ln>
+        </p:spPr>
+        <p:style>
+          <a:lnRef idx="1">
+            <a:schemeClr val="dk1"/>
+          </a:lnRef>
+          <a:fillRef idx="0">
+            <a:schemeClr val="dk1"/>
+          </a:fillRef>
+          <a:effectRef idx="0">
+            <a:schemeClr val="dk1"/>
+          </a:effectRef>
+          <a:fontRef idx="minor">
+            <a:schemeClr val="tx1"/>
+          </a:fontRef>
+        </p:style>
+      </p:cxnSp>
+    </p:spTree>
+    <p:extLst>
+      <p:ext uri="{BB962C8B-B14F-4D97-AF65-F5344CB8AC3E}">
+        <p14:creationId xmlns:p14="http://schemas.microsoft.com/office/powerpoint/2010/main" val="2453386478"/>
+      </p:ext>
+    </p:extLst>
+  </p:cSld>
+  <p:clrMapOvr>
+    <a:masterClrMapping/>
+  </p:clrMapOvr>
+</p:sld>
+</file>
+
+<file path=ppt/slides/slide89.xml><?xml version="1.0" encoding="utf-8"?>
+<p:sld xmlns:a="http://schemas.openxmlformats.org/drawingml/2006/main" xmlns:r="http://schemas.openxmlformats.org/officeDocument/2006/relationships" xmlns:p="http://schemas.openxmlformats.org/presentationml/2006/main">
+  <p:cSld>
+    <p:spTree>
+      <p:nvGrpSpPr>
+        <p:cNvPr id="1" name=""/>
+        <p:cNvGrpSpPr/>
+        <p:nvPr/>
+      </p:nvGrpSpPr>
+      <p:grpSpPr>
+        <a:xfrm>
+          <a:off x="0" y="0"/>
+          <a:ext cx="0" cy="0"/>
+          <a:chOff x="0" y="0"/>
+          <a:chExt cx="0" cy="0"/>
+        </a:xfrm>
+      </p:grpSpPr>
+      <p:sp>
+        <p:nvSpPr>
+          <p:cNvPr id="2" name="Titel 1">
+            <a:extLst>
+              <a:ext uri="{FF2B5EF4-FFF2-40B4-BE49-F238E27FC236}">
+                <a16:creationId xmlns:a16="http://schemas.microsoft.com/office/drawing/2014/main" id="{AF291B26-8D81-6E41-9D56-468BA39AAAEB}"/>
+              </a:ext>
+            </a:extLst>
+          </p:cNvPr>
+          <p:cNvSpPr>
+            <a:spLocks noGrp="1"/>
+          </p:cNvSpPr>
+          <p:nvPr>
+            <p:ph type="title"/>
+          </p:nvPr>
+        </p:nvSpPr>
+        <p:spPr/>
+        <p:txBody>
+          <a:bodyPr/>
+          <a:lstStyle/>
+          <a:p>
+            <a:endParaRPr lang="de-DE"/>
+          </a:p>
+        </p:txBody>
+      </p:sp>
+      <p:sp>
+        <p:nvSpPr>
+          <p:cNvPr id="3" name="Inhaltsplatzhalter 2">
+            <a:extLst>
+              <a:ext uri="{FF2B5EF4-FFF2-40B4-BE49-F238E27FC236}">
+                <a16:creationId xmlns:a16="http://schemas.microsoft.com/office/drawing/2014/main" id="{4D3977DA-9BC2-944B-B95C-E22F84E99A06}"/>
+              </a:ext>
+            </a:extLst>
+          </p:cNvPr>
+          <p:cNvSpPr>
+            <a:spLocks noGrp="1"/>
+          </p:cNvSpPr>
+          <p:nvPr>
+            <p:ph idx="1"/>
+          </p:nvPr>
+        </p:nvSpPr>
+        <p:spPr/>
+        <p:txBody>
+          <a:bodyPr/>
+          <a:lstStyle/>
+          <a:p>
+            <a:endParaRPr lang="de-DE"/>
+          </a:p>
+        </p:txBody>
+      </p:sp>
+    </p:spTree>
+    <p:extLst>
+      <p:ext uri="{BB962C8B-B14F-4D97-AF65-F5344CB8AC3E}">
+        <p14:creationId xmlns:p14="http://schemas.microsoft.com/office/powerpoint/2010/main" val="3059955227"/>
+      </p:ext>
+    </p:extLst>
+  </p:cSld>
+  <p:clrMapOvr>
+    <a:masterClrMapping/>
+  </p:clrMapOvr>
+</p:sld>
+</file>
+
+<file path=ppt/slides/slide9.xml><?xml version="1.0" encoding="utf-8"?>
+<p:sld xmlns:a="http://schemas.openxmlformats.org/drawingml/2006/main" xmlns:r="http://schemas.openxmlformats.org/officeDocument/2006/relationships" xmlns:p="http://schemas.openxmlformats.org/presentationml/2006/main">
+  <p:cSld>
+    <p:spTree>
+      <p:nvGrpSpPr>
+        <p:cNvPr id="1" name=""/>
+        <p:cNvGrpSpPr/>
+        <p:nvPr/>
+      </p:nvGrpSpPr>
+      <p:grpSpPr>
+        <a:xfrm>
+          <a:off x="0" y="0"/>
+          <a:ext cx="0" cy="0"/>
+          <a:chOff x="0" y="0"/>
+          <a:chExt cx="0" cy="0"/>
+        </a:xfrm>
+      </p:grpSpPr>
+      <p:sp>
+        <p:nvSpPr>
+          <p:cNvPr id="2" name="Titel 1">
+            <a:extLst>
+              <a:ext uri="{FF2B5EF4-FFF2-40B4-BE49-F238E27FC236}">
+                <a16:creationId xmlns:a16="http://schemas.microsoft.com/office/drawing/2014/main" id="{A8A16281-5764-1B47-B5C4-7078B0822F9E}"/>
+              </a:ext>
+            </a:extLst>
+          </p:cNvPr>
+          <p:cNvSpPr>
+            <a:spLocks noGrp="1"/>
+          </p:cNvSpPr>
+          <p:nvPr>
+            <p:ph type="title"/>
+          </p:nvPr>
+        </p:nvSpPr>
+        <p:spPr/>
+        <p:txBody>
+          <a:bodyPr/>
+          <a:lstStyle/>
+          <a:p>
+            <a:r>
+              <a:rPr lang="de-DE" dirty="0"/>
+              <a:t>Übung: meine erste HTML Seite</a:t>
+            </a:r>
+          </a:p>
+        </p:txBody>
+      </p:sp>
+      <p:sp>
+        <p:nvSpPr>
+          <p:cNvPr id="3" name="Inhaltsplatzhalter 2">
+            <a:extLst>
+              <a:ext uri="{FF2B5EF4-FFF2-40B4-BE49-F238E27FC236}">
+                <a16:creationId xmlns:a16="http://schemas.microsoft.com/office/drawing/2014/main" id="{B095F6AB-14D7-AC40-8B3C-34AC47813967}"/>
+              </a:ext>
+            </a:extLst>
+          </p:cNvPr>
+          <p:cNvSpPr>
+            <a:spLocks noGrp="1"/>
+          </p:cNvSpPr>
+          <p:nvPr>
+            <p:ph idx="1"/>
+          </p:nvPr>
+        </p:nvSpPr>
+        <p:spPr/>
+        <p:txBody>
+          <a:bodyPr>
+            <a:normAutofit fontScale="77500" lnSpcReduction="20000"/>
+          </a:bodyPr>
+          <a:lstStyle/>
+          <a:p>
+            <a:pPr marL="0" indent="0">
+              <a:buNone/>
+            </a:pPr>
+            <a:r>
+              <a:rPr lang="de-CH" sz="2200" dirty="0">
+                <a:latin typeface="Arial" panose="020B0604020202020204" pitchFamily="34" charset="0"/>
+                <a:cs typeface="Arial" panose="020B0604020202020204" pitchFamily="34" charset="0"/>
+              </a:rPr>
+              <a:t>&lt;!</a:t>
+            </a:r>
+            <a:r>
+              <a:rPr lang="de-CH" sz="2200" dirty="0" err="1">
+                <a:latin typeface="Arial" panose="020B0604020202020204" pitchFamily="34" charset="0"/>
+                <a:cs typeface="Arial" panose="020B0604020202020204" pitchFamily="34" charset="0"/>
+              </a:rPr>
+              <a:t>doctype</a:t>
+            </a:r>
+            <a:r>
+              <a:rPr lang="de-CH" sz="2200" dirty="0">
+                <a:latin typeface="Arial" panose="020B0604020202020204" pitchFamily="34" charset="0"/>
+                <a:cs typeface="Arial" panose="020B0604020202020204" pitchFamily="34" charset="0"/>
+              </a:rPr>
+              <a:t> </a:t>
+            </a:r>
+            <a:r>
+              <a:rPr lang="de-CH" sz="2200" dirty="0" err="1">
+                <a:latin typeface="Arial" panose="020B0604020202020204" pitchFamily="34" charset="0"/>
+                <a:cs typeface="Arial" panose="020B0604020202020204" pitchFamily="34" charset="0"/>
+              </a:rPr>
+              <a:t>html</a:t>
+            </a:r>
+            <a:r>
+              <a:rPr lang="de-CH" sz="2200" dirty="0">
+                <a:latin typeface="Arial" panose="020B0604020202020204" pitchFamily="34" charset="0"/>
+                <a:cs typeface="Arial" panose="020B0604020202020204" pitchFamily="34" charset="0"/>
+              </a:rPr>
+              <a:t>&gt; </a:t>
+            </a:r>
+          </a:p>
+          <a:p>
+            <a:pPr marL="0" indent="0">
+              <a:buNone/>
+            </a:pPr>
+            <a:r>
+              <a:rPr lang="de-CH" sz="2200" dirty="0">
+                <a:latin typeface="Arial" panose="020B0604020202020204" pitchFamily="34" charset="0"/>
+                <a:cs typeface="Arial" panose="020B0604020202020204" pitchFamily="34" charset="0"/>
+              </a:rPr>
+              <a:t>&lt;</a:t>
+            </a:r>
+            <a:r>
+              <a:rPr lang="de-CH" sz="2200" dirty="0" err="1">
+                <a:latin typeface="Arial" panose="020B0604020202020204" pitchFamily="34" charset="0"/>
+                <a:cs typeface="Arial" panose="020B0604020202020204" pitchFamily="34" charset="0"/>
+              </a:rPr>
+              <a:t>html</a:t>
+            </a:r>
+            <a:r>
+              <a:rPr lang="de-CH" sz="2200" dirty="0">
+                <a:latin typeface="Arial" panose="020B0604020202020204" pitchFamily="34" charset="0"/>
+                <a:cs typeface="Arial" panose="020B0604020202020204" pitchFamily="34" charset="0"/>
+              </a:rPr>
+              <a:t> lang="de"&gt; </a:t>
+            </a:r>
+          </a:p>
+          <a:p>
+            <a:pPr marL="0" indent="0">
+              <a:buNone/>
+            </a:pPr>
+            <a:r>
+              <a:rPr lang="de-CH" sz="2200" dirty="0">
+                <a:latin typeface="Arial" panose="020B0604020202020204" pitchFamily="34" charset="0"/>
+                <a:cs typeface="Arial" panose="020B0604020202020204" pitchFamily="34" charset="0"/>
+              </a:rPr>
+              <a:t>    &lt;</a:t>
+            </a:r>
+            <a:r>
+              <a:rPr lang="de-CH" sz="2200" dirty="0" err="1">
+                <a:latin typeface="Arial" panose="020B0604020202020204" pitchFamily="34" charset="0"/>
+                <a:cs typeface="Arial" panose="020B0604020202020204" pitchFamily="34" charset="0"/>
+              </a:rPr>
+              <a:t>head</a:t>
+            </a:r>
+            <a:r>
+              <a:rPr lang="de-CH" sz="2200" dirty="0">
+                <a:latin typeface="Arial" panose="020B0604020202020204" pitchFamily="34" charset="0"/>
+                <a:cs typeface="Arial" panose="020B0604020202020204" pitchFamily="34" charset="0"/>
+              </a:rPr>
+              <a:t>&gt; </a:t>
+            </a:r>
+          </a:p>
+          <a:p>
+            <a:pPr marL="0" indent="0">
+              <a:buNone/>
+            </a:pPr>
+            <a:r>
+              <a:rPr lang="de-CH" sz="2200" dirty="0">
+                <a:latin typeface="Arial" panose="020B0604020202020204" pitchFamily="34" charset="0"/>
+                <a:cs typeface="Arial" panose="020B0604020202020204" pitchFamily="34" charset="0"/>
+              </a:rPr>
+              <a:t>        &lt;</a:t>
+            </a:r>
+            <a:r>
+              <a:rPr lang="de-CH" sz="2200" dirty="0" err="1">
+                <a:latin typeface="Arial" panose="020B0604020202020204" pitchFamily="34" charset="0"/>
+                <a:cs typeface="Arial" panose="020B0604020202020204" pitchFamily="34" charset="0"/>
+              </a:rPr>
+              <a:t>meta</a:t>
+            </a:r>
+            <a:r>
+              <a:rPr lang="de-CH" sz="2200" dirty="0">
+                <a:latin typeface="Arial" panose="020B0604020202020204" pitchFamily="34" charset="0"/>
+                <a:cs typeface="Arial" panose="020B0604020202020204" pitchFamily="34" charset="0"/>
+              </a:rPr>
+              <a:t> </a:t>
+            </a:r>
+            <a:r>
+              <a:rPr lang="de-CH" sz="2200" dirty="0" err="1">
+                <a:latin typeface="Arial" panose="020B0604020202020204" pitchFamily="34" charset="0"/>
+                <a:cs typeface="Arial" panose="020B0604020202020204" pitchFamily="34" charset="0"/>
+              </a:rPr>
+              <a:t>charset</a:t>
+            </a:r>
+            <a:r>
+              <a:rPr lang="de-CH" sz="2200" dirty="0">
+                <a:latin typeface="Arial" panose="020B0604020202020204" pitchFamily="34" charset="0"/>
+                <a:cs typeface="Arial" panose="020B0604020202020204" pitchFamily="34" charset="0"/>
+              </a:rPr>
+              <a:t>="UTF-8"&gt; </a:t>
+            </a:r>
+          </a:p>
+          <a:p>
+            <a:pPr marL="0" indent="0">
+              <a:buNone/>
+            </a:pPr>
+            <a:r>
+              <a:rPr lang="de-CH" sz="2200" dirty="0">
+                <a:latin typeface="Arial" panose="020B0604020202020204" pitchFamily="34" charset="0"/>
+                <a:cs typeface="Arial" panose="020B0604020202020204" pitchFamily="34" charset="0"/>
+              </a:rPr>
+              <a:t>        &lt;title&gt;Willkommen!&lt;/title&gt; </a:t>
+            </a:r>
+          </a:p>
+          <a:p>
+            <a:pPr marL="0" indent="0">
+              <a:buNone/>
+            </a:pPr>
+            <a:r>
+              <a:rPr lang="de-CH" sz="2200" dirty="0">
+                <a:latin typeface="Arial" panose="020B0604020202020204" pitchFamily="34" charset="0"/>
+                <a:cs typeface="Arial" panose="020B0604020202020204" pitchFamily="34" charset="0"/>
+              </a:rPr>
+              <a:t>    &lt;/</a:t>
+            </a:r>
+            <a:r>
+              <a:rPr lang="de-CH" sz="2200" dirty="0" err="1">
+                <a:latin typeface="Arial" panose="020B0604020202020204" pitchFamily="34" charset="0"/>
+                <a:cs typeface="Arial" panose="020B0604020202020204" pitchFamily="34" charset="0"/>
+              </a:rPr>
+              <a:t>head</a:t>
+            </a:r>
+            <a:r>
+              <a:rPr lang="de-CH" sz="2200" dirty="0">
+                <a:latin typeface="Arial" panose="020B0604020202020204" pitchFamily="34" charset="0"/>
+                <a:cs typeface="Arial" panose="020B0604020202020204" pitchFamily="34" charset="0"/>
+              </a:rPr>
+              <a:t>&gt; </a:t>
+            </a:r>
+          </a:p>
+          <a:p>
+            <a:pPr marL="0" indent="0">
+              <a:buNone/>
+            </a:pPr>
+            <a:r>
+              <a:rPr lang="de-CH" sz="2200" dirty="0">
+                <a:latin typeface="Arial" panose="020B0604020202020204" pitchFamily="34" charset="0"/>
+                <a:cs typeface="Arial" panose="020B0604020202020204" pitchFamily="34" charset="0"/>
+              </a:rPr>
+              <a:t>    &lt;</a:t>
+            </a:r>
+            <a:r>
+              <a:rPr lang="de-CH" sz="2200" dirty="0" err="1">
+                <a:latin typeface="Arial" panose="020B0604020202020204" pitchFamily="34" charset="0"/>
+                <a:cs typeface="Arial" panose="020B0604020202020204" pitchFamily="34" charset="0"/>
+              </a:rPr>
+              <a:t>body</a:t>
+            </a:r>
+            <a:r>
+              <a:rPr lang="de-CH" sz="2200" dirty="0">
+                <a:latin typeface="Arial" panose="020B0604020202020204" pitchFamily="34" charset="0"/>
+                <a:cs typeface="Arial" panose="020B0604020202020204" pitchFamily="34" charset="0"/>
+              </a:rPr>
+              <a:t>&gt;</a:t>
+            </a:r>
+            <a:br>
+              <a:rPr lang="de-CH" sz="2200" dirty="0">
+                <a:latin typeface="Arial" panose="020B0604020202020204" pitchFamily="34" charset="0"/>
+                <a:cs typeface="Arial" panose="020B0604020202020204" pitchFamily="34" charset="0"/>
+              </a:rPr>
+            </a:br>
+            <a:r>
+              <a:rPr lang="de-CH" sz="2200" dirty="0">
+                <a:latin typeface="Arial" panose="020B0604020202020204" pitchFamily="34" charset="0"/>
+                <a:cs typeface="Arial" panose="020B0604020202020204" pitchFamily="34" charset="0"/>
+              </a:rPr>
+              <a:t>         &lt;h1&gt;Hallo Welt!&lt;/h1&gt;</a:t>
+            </a:r>
+            <a:br>
+              <a:rPr lang="de-CH" sz="2200" dirty="0">
+                <a:latin typeface="Arial" panose="020B0604020202020204" pitchFamily="34" charset="0"/>
+                <a:cs typeface="Arial" panose="020B0604020202020204" pitchFamily="34" charset="0"/>
+              </a:rPr>
+            </a:br>
+            <a:r>
+              <a:rPr lang="de-CH" sz="2200" dirty="0">
+                <a:latin typeface="Arial" panose="020B0604020202020204" pitchFamily="34" charset="0"/>
+                <a:cs typeface="Arial" panose="020B0604020202020204" pitchFamily="34" charset="0"/>
+              </a:rPr>
+              <a:t>         &lt;p&gt;Dies ist meine erste </a:t>
+            </a:r>
+            <a:r>
+              <a:rPr lang="de-CH" dirty="0"/>
+              <a:t>&lt;span&gt;</a:t>
+            </a:r>
+            <a:r>
+              <a:rPr lang="de-CH" sz="2000" dirty="0"/>
+              <a:t>HTML</a:t>
+            </a:r>
+            <a:r>
+              <a:rPr lang="de-CH" dirty="0"/>
+              <a:t>&lt;/span&gt;</a:t>
+            </a:r>
+            <a:r>
+              <a:rPr lang="de-CH" sz="2200" dirty="0">
+                <a:latin typeface="Arial" panose="020B0604020202020204" pitchFamily="34" charset="0"/>
+                <a:cs typeface="Arial" panose="020B0604020202020204" pitchFamily="34" charset="0"/>
+              </a:rPr>
+              <a:t> Seite </a:t>
+            </a:r>
+            <a:r>
+              <a:rPr lang="de-CH" sz="2200" dirty="0" err="1">
+                <a:latin typeface="Arial" panose="020B0604020202020204" pitchFamily="34" charset="0"/>
+                <a:cs typeface="Arial" panose="020B0604020202020204" pitchFamily="34" charset="0"/>
+              </a:rPr>
+              <a:t>gesponsort</a:t>
+            </a:r>
+            <a:r>
+              <a:rPr lang="de-CH" sz="2200" dirty="0">
+                <a:latin typeface="Arial" panose="020B0604020202020204" pitchFamily="34" charset="0"/>
+                <a:cs typeface="Arial" panose="020B0604020202020204" pitchFamily="34" charset="0"/>
+              </a:rPr>
+              <a:t> von </a:t>
+            </a:r>
+          </a:p>
+          <a:p>
+            <a:pPr marL="0" indent="0">
+              <a:buNone/>
+            </a:pPr>
+            <a:r>
+              <a:rPr lang="de-CH" sz="2200" dirty="0">
+                <a:latin typeface="Arial" panose="020B0604020202020204" pitchFamily="34" charset="0"/>
+                <a:cs typeface="Arial" panose="020B0604020202020204" pitchFamily="34" charset="0"/>
+              </a:rPr>
+              <a:t>         &lt;a </a:t>
+            </a:r>
+            <a:r>
+              <a:rPr lang="de-CH" sz="2200" dirty="0" err="1">
+                <a:latin typeface="Arial" panose="020B0604020202020204" pitchFamily="34" charset="0"/>
+                <a:cs typeface="Arial" panose="020B0604020202020204" pitchFamily="34" charset="0"/>
+              </a:rPr>
+              <a:t>href</a:t>
+            </a:r>
+            <a:r>
+              <a:rPr lang="de-CH" sz="2200" dirty="0">
+                <a:latin typeface="Arial" panose="020B0604020202020204" pitchFamily="34" charset="0"/>
+                <a:cs typeface="Arial" panose="020B0604020202020204" pitchFamily="34" charset="0"/>
+              </a:rPr>
+              <a:t>="http://</a:t>
+            </a:r>
+            <a:r>
+              <a:rPr lang="de-CH" sz="2200" dirty="0" err="1">
+                <a:latin typeface="Arial" panose="020B0604020202020204" pitchFamily="34" charset="0"/>
+                <a:cs typeface="Arial" panose="020B0604020202020204" pitchFamily="34" charset="0"/>
+              </a:rPr>
+              <a:t>www.finnova.com</a:t>
+            </a:r>
+            <a:r>
+              <a:rPr lang="de-CH" sz="2200" dirty="0">
+                <a:latin typeface="Arial" panose="020B0604020202020204" pitchFamily="34" charset="0"/>
+                <a:cs typeface="Arial" panose="020B0604020202020204" pitchFamily="34" charset="0"/>
+              </a:rPr>
+              <a:t>"&gt;</a:t>
+            </a:r>
+            <a:r>
+              <a:rPr lang="de-CH" sz="2200" dirty="0" err="1">
+                <a:latin typeface="Arial" panose="020B0604020202020204" pitchFamily="34" charset="0"/>
+                <a:cs typeface="Arial" panose="020B0604020202020204" pitchFamily="34" charset="0"/>
+              </a:rPr>
+              <a:t>Finnova</a:t>
+            </a:r>
+            <a:r>
+              <a:rPr lang="de-CH" sz="2200" dirty="0">
+                <a:latin typeface="Arial" panose="020B0604020202020204" pitchFamily="34" charset="0"/>
+                <a:cs typeface="Arial" panose="020B0604020202020204" pitchFamily="34" charset="0"/>
+              </a:rPr>
+              <a:t>&lt;/a&gt;.&lt;/p&gt; </a:t>
+            </a:r>
+          </a:p>
+          <a:p>
+            <a:pPr marL="0" indent="0">
+              <a:buNone/>
+            </a:pPr>
+            <a:r>
+              <a:rPr lang="de-CH" sz="2200" dirty="0">
+                <a:latin typeface="Arial" panose="020B0604020202020204" pitchFamily="34" charset="0"/>
+                <a:cs typeface="Arial" panose="020B0604020202020204" pitchFamily="34" charset="0"/>
+              </a:rPr>
+              <a:t>    &lt;/</a:t>
+            </a:r>
+            <a:r>
+              <a:rPr lang="de-CH" sz="2200" dirty="0" err="1">
+                <a:latin typeface="Arial" panose="020B0604020202020204" pitchFamily="34" charset="0"/>
+                <a:cs typeface="Arial" panose="020B0604020202020204" pitchFamily="34" charset="0"/>
+              </a:rPr>
+              <a:t>body</a:t>
+            </a:r>
+            <a:r>
+              <a:rPr lang="de-CH" sz="2200" dirty="0">
+                <a:latin typeface="Arial" panose="020B0604020202020204" pitchFamily="34" charset="0"/>
+                <a:cs typeface="Arial" panose="020B0604020202020204" pitchFamily="34" charset="0"/>
+              </a:rPr>
+              <a:t>&gt; </a:t>
+            </a:r>
+          </a:p>
+          <a:p>
+            <a:pPr marL="0" indent="0">
+              <a:buNone/>
+            </a:pPr>
+            <a:r>
+              <a:rPr lang="de-CH" sz="2200" dirty="0">
+                <a:latin typeface="Arial" panose="020B0604020202020204" pitchFamily="34" charset="0"/>
+                <a:cs typeface="Arial" panose="020B0604020202020204" pitchFamily="34" charset="0"/>
+              </a:rPr>
+              <a:t>&lt;/</a:t>
+            </a:r>
+            <a:r>
+              <a:rPr lang="de-CH" sz="2200" dirty="0" err="1">
+                <a:latin typeface="Arial" panose="020B0604020202020204" pitchFamily="34" charset="0"/>
+                <a:cs typeface="Arial" panose="020B0604020202020204" pitchFamily="34" charset="0"/>
+              </a:rPr>
+              <a:t>html</a:t>
+            </a:r>
+            <a:r>
+              <a:rPr lang="de-CH" sz="2200" dirty="0">
+                <a:latin typeface="Arial" panose="020B0604020202020204" pitchFamily="34" charset="0"/>
+                <a:cs typeface="Arial" panose="020B0604020202020204" pitchFamily="34" charset="0"/>
+              </a:rPr>
+              <a:t>&gt; </a:t>
+            </a:r>
+          </a:p>
+          <a:p>
+            <a:pPr marL="0" indent="0">
+              <a:buNone/>
+            </a:pPr>
+            <a:endParaRPr lang="de-DE" dirty="0"/>
+          </a:p>
+        </p:txBody>
+      </p:sp>
+    </p:spTree>
+    <p:extLst>
+      <p:ext uri="{BB962C8B-B14F-4D97-AF65-F5344CB8AC3E}">
+        <p14:creationId xmlns:p14="http://schemas.microsoft.com/office/powerpoint/2010/main" val="914521488"/>
+      </p:ext>
+    </p:extLst>
+  </p:cSld>
+  <p:clrMapOvr>
+    <a:masterClrMapping/>
+  </p:clrMapOvr>
+</p:sld>
+</file>
+
+<file path=ppt/slides/slide90.xml><?xml version="1.0" encoding="utf-8"?>
+<p:sld xmlns:a="http://schemas.openxmlformats.org/drawingml/2006/main" xmlns:r="http://schemas.openxmlformats.org/officeDocument/2006/relationships" xmlns:p="http://schemas.openxmlformats.org/presentationml/2006/main">
+  <p:cSld>
+    <p:spTree>
+      <p:nvGrpSpPr>
+        <p:cNvPr id="1" name=""/>
+        <p:cNvGrpSpPr/>
+        <p:nvPr/>
+      </p:nvGrpSpPr>
+      <p:grpSpPr>
+        <a:xfrm>
+          <a:off x="0" y="0"/>
+          <a:ext cx="0" cy="0"/>
+          <a:chOff x="0" y="0"/>
+          <a:chExt cx="0" cy="0"/>
+        </a:xfrm>
+      </p:grpSpPr>
+      <p:sp>
+        <p:nvSpPr>
+          <p:cNvPr id="2" name="Titel 1">
+            <a:extLst>
+              <a:ext uri="{FF2B5EF4-FFF2-40B4-BE49-F238E27FC236}">
+                <a16:creationId xmlns:a16="http://schemas.microsoft.com/office/drawing/2014/main" id="{0CC467E0-2B4E-D94E-9545-469513B5DF9C}"/>
+              </a:ext>
+            </a:extLst>
+          </p:cNvPr>
+          <p:cNvSpPr>
+            <a:spLocks noGrp="1"/>
+          </p:cNvSpPr>
+          <p:nvPr>
+            <p:ph type="title"/>
+          </p:nvPr>
+        </p:nvSpPr>
+        <p:spPr/>
+        <p:txBody>
+          <a:bodyPr/>
+          <a:lstStyle/>
+          <a:p>
+            <a:endParaRPr lang="de-DE"/>
+          </a:p>
+        </p:txBody>
+      </p:sp>
+      <p:sp>
+        <p:nvSpPr>
+          <p:cNvPr id="3" name="Inhaltsplatzhalter 2">
+            <a:extLst>
+              <a:ext uri="{FF2B5EF4-FFF2-40B4-BE49-F238E27FC236}">
+                <a16:creationId xmlns:a16="http://schemas.microsoft.com/office/drawing/2014/main" id="{51424325-0549-D545-B91C-5496B67B995F}"/>
+              </a:ext>
+            </a:extLst>
+          </p:cNvPr>
+          <p:cNvSpPr>
+            <a:spLocks noGrp="1"/>
+          </p:cNvSpPr>
+          <p:nvPr>
+            <p:ph idx="1"/>
+          </p:nvPr>
+        </p:nvSpPr>
+        <p:spPr/>
+        <p:txBody>
+          <a:bodyPr/>
+          <a:lstStyle/>
+          <a:p>
+            <a:endParaRPr lang="de-DE"/>
+          </a:p>
+        </p:txBody>
+      </p:sp>
+    </p:spTree>
+    <p:extLst>
+      <p:ext uri="{BB962C8B-B14F-4D97-AF65-F5344CB8AC3E}">
+        <p14:creationId xmlns:p14="http://schemas.microsoft.com/office/powerpoint/2010/main" val="4282559993"/>
+      </p:ext>
+    </p:extLst>
+  </p:cSld>
+  <p:clrMapOvr>
+    <a:masterClrMapping/>
+  </p:clrMapOvr>
+</p:sld>
+</file>
+
+<file path=ppt/slides/slide91.xml><?xml version="1.0" encoding="utf-8"?>
+<p:sld xmlns:a="http://schemas.openxmlformats.org/drawingml/2006/main" xmlns:r="http://schemas.openxmlformats.org/officeDocument/2006/relationships" xmlns:p="http://schemas.openxmlformats.org/presentationml/2006/main">
+  <p:cSld>
+    <p:spTree>
+      <p:nvGrpSpPr>
+        <p:cNvPr id="1" name=""/>
+        <p:cNvGrpSpPr/>
+        <p:nvPr/>
+      </p:nvGrpSpPr>
+      <p:grpSpPr>
+        <a:xfrm>
+          <a:off x="0" y="0"/>
+          <a:ext cx="0" cy="0"/>
+          <a:chOff x="0" y="0"/>
+          <a:chExt cx="0" cy="0"/>
+        </a:xfrm>
+      </p:grpSpPr>
+      <p:sp>
+        <p:nvSpPr>
           <p:cNvPr id="2" name="Title 1">
             <a:extLst>
               <a:ext uri="{FF2B5EF4-FFF2-40B4-BE49-F238E27FC236}">
@@ -26988,7 +29995,7 @@
 </p:sld>
 </file>
 
-<file path=ppt/slides/slide83.xml><?xml version="1.0" encoding="utf-8"?>
+<file path=ppt/slides/slide92.xml><?xml version="1.0" encoding="utf-8"?>
 <p:sld xmlns:a="http://schemas.openxmlformats.org/drawingml/2006/main" xmlns:r="http://schemas.openxmlformats.org/officeDocument/2006/relationships" xmlns:p="http://schemas.openxmlformats.org/presentationml/2006/main">
   <p:cSld>
     <p:spTree>
@@ -27154,7 +30161,7 @@
 </p:sld>
 </file>
 
-<file path=ppt/slides/slide84.xml><?xml version="1.0" encoding="utf-8"?>
+<file path=ppt/slides/slide93.xml><?xml version="1.0" encoding="utf-8"?>
 <p:sld xmlns:a="http://schemas.openxmlformats.org/drawingml/2006/main" xmlns:r="http://schemas.openxmlformats.org/officeDocument/2006/relationships" xmlns:p="http://schemas.openxmlformats.org/presentationml/2006/main">
   <p:cSld>
     <p:spTree>
@@ -27273,455 +30280,6 @@
     <p:extLst>
       <p:ext uri="{BB962C8B-B14F-4D97-AF65-F5344CB8AC3E}">
         <p14:creationId xmlns:p14="http://schemas.microsoft.com/office/powerpoint/2010/main" val="2129769489"/>
-      </p:ext>
-    </p:extLst>
-  </p:cSld>
-  <p:clrMapOvr>
-    <a:masterClrMapping/>
-  </p:clrMapOvr>
-</p:sld>
-</file>
-
-<file path=ppt/slides/slide9.xml><?xml version="1.0" encoding="utf-8"?>
-<p:sld xmlns:a="http://schemas.openxmlformats.org/drawingml/2006/main" xmlns:r="http://schemas.openxmlformats.org/officeDocument/2006/relationships" xmlns:p="http://schemas.openxmlformats.org/presentationml/2006/main">
-  <p:cSld>
-    <p:spTree>
-      <p:nvGrpSpPr>
-        <p:cNvPr id="1" name=""/>
-        <p:cNvGrpSpPr/>
-        <p:nvPr/>
-      </p:nvGrpSpPr>
-      <p:grpSpPr>
-        <a:xfrm>
-          <a:off x="0" y="0"/>
-          <a:ext cx="0" cy="0"/>
-          <a:chOff x="0" y="0"/>
-          <a:chExt cx="0" cy="0"/>
-        </a:xfrm>
-      </p:grpSpPr>
-      <p:sp>
-        <p:nvSpPr>
-          <p:cNvPr id="2" name="Titel 1">
-            <a:extLst>
-              <a:ext uri="{FF2B5EF4-FFF2-40B4-BE49-F238E27FC236}">
-                <a16:creationId xmlns:a16="http://schemas.microsoft.com/office/drawing/2014/main" id="{A8A16281-5764-1B47-B5C4-7078B0822F9E}"/>
-              </a:ext>
-            </a:extLst>
-          </p:cNvPr>
-          <p:cNvSpPr>
-            <a:spLocks noGrp="1"/>
-          </p:cNvSpPr>
-          <p:nvPr>
-            <p:ph type="title"/>
-          </p:nvPr>
-        </p:nvSpPr>
-        <p:spPr/>
-        <p:txBody>
-          <a:bodyPr/>
-          <a:lstStyle/>
-          <a:p>
-            <a:r>
-              <a:rPr lang="de-DE" dirty="0"/>
-              <a:t>Übung: meine erste HTML Seite</a:t>
-            </a:r>
-          </a:p>
-        </p:txBody>
-      </p:sp>
-      <p:sp>
-        <p:nvSpPr>
-          <p:cNvPr id="3" name="Inhaltsplatzhalter 2">
-            <a:extLst>
-              <a:ext uri="{FF2B5EF4-FFF2-40B4-BE49-F238E27FC236}">
-                <a16:creationId xmlns:a16="http://schemas.microsoft.com/office/drawing/2014/main" id="{B095F6AB-14D7-AC40-8B3C-34AC47813967}"/>
-              </a:ext>
-            </a:extLst>
-          </p:cNvPr>
-          <p:cNvSpPr>
-            <a:spLocks noGrp="1"/>
-          </p:cNvSpPr>
-          <p:nvPr>
-            <p:ph idx="1"/>
-          </p:nvPr>
-        </p:nvSpPr>
-        <p:spPr/>
-        <p:txBody>
-          <a:bodyPr>
-            <a:normAutofit fontScale="77500" lnSpcReduction="20000"/>
-          </a:bodyPr>
-          <a:lstStyle/>
-          <a:p>
-            <a:pPr marL="0" indent="0">
-              <a:buNone/>
-            </a:pPr>
-            <a:r>
-              <a:rPr lang="de-CH" sz="2200" dirty="0">
-                <a:latin typeface="Arial" panose="020B0604020202020204" pitchFamily="34" charset="0"/>
-                <a:cs typeface="Arial" panose="020B0604020202020204" pitchFamily="34" charset="0"/>
-              </a:rPr>
-              <a:t>&lt;!</a:t>
-            </a:r>
-            <a:r>
-              <a:rPr lang="de-CH" sz="2200" dirty="0" err="1">
-                <a:latin typeface="Arial" panose="020B0604020202020204" pitchFamily="34" charset="0"/>
-                <a:cs typeface="Arial" panose="020B0604020202020204" pitchFamily="34" charset="0"/>
-              </a:rPr>
-              <a:t>doctype</a:t>
-            </a:r>
-            <a:r>
-              <a:rPr lang="de-CH" sz="2200" dirty="0">
-                <a:latin typeface="Arial" panose="020B0604020202020204" pitchFamily="34" charset="0"/>
-                <a:cs typeface="Arial" panose="020B0604020202020204" pitchFamily="34" charset="0"/>
-              </a:rPr>
-              <a:t> </a:t>
-            </a:r>
-            <a:r>
-              <a:rPr lang="de-CH" sz="2200" dirty="0" err="1">
-                <a:latin typeface="Arial" panose="020B0604020202020204" pitchFamily="34" charset="0"/>
-                <a:cs typeface="Arial" panose="020B0604020202020204" pitchFamily="34" charset="0"/>
-              </a:rPr>
-              <a:t>html</a:t>
-            </a:r>
-            <a:r>
-              <a:rPr lang="de-CH" sz="2200" dirty="0">
-                <a:latin typeface="Arial" panose="020B0604020202020204" pitchFamily="34" charset="0"/>
-                <a:cs typeface="Arial" panose="020B0604020202020204" pitchFamily="34" charset="0"/>
-              </a:rPr>
-              <a:t>&gt; </a:t>
-            </a:r>
-          </a:p>
-          <a:p>
-            <a:pPr marL="0" indent="0">
-              <a:buNone/>
-            </a:pPr>
-            <a:r>
-              <a:rPr lang="de-CH" sz="2200" dirty="0">
-                <a:latin typeface="Arial" panose="020B0604020202020204" pitchFamily="34" charset="0"/>
-                <a:cs typeface="Arial" panose="020B0604020202020204" pitchFamily="34" charset="0"/>
-              </a:rPr>
-              <a:t>&lt;</a:t>
-            </a:r>
-            <a:r>
-              <a:rPr lang="de-CH" sz="2200" dirty="0" err="1">
-                <a:latin typeface="Arial" panose="020B0604020202020204" pitchFamily="34" charset="0"/>
-                <a:cs typeface="Arial" panose="020B0604020202020204" pitchFamily="34" charset="0"/>
-              </a:rPr>
-              <a:t>html</a:t>
-            </a:r>
-            <a:r>
-              <a:rPr lang="de-CH" sz="2200" dirty="0">
-                <a:latin typeface="Arial" panose="020B0604020202020204" pitchFamily="34" charset="0"/>
-                <a:cs typeface="Arial" panose="020B0604020202020204" pitchFamily="34" charset="0"/>
-              </a:rPr>
-              <a:t> lang="de"&gt; </a:t>
-            </a:r>
-          </a:p>
-          <a:p>
-            <a:pPr marL="0" indent="0">
-              <a:buNone/>
-            </a:pPr>
-            <a:r>
-              <a:rPr lang="de-CH" sz="2200" dirty="0">
-                <a:latin typeface="Arial" panose="020B0604020202020204" pitchFamily="34" charset="0"/>
-                <a:cs typeface="Arial" panose="020B0604020202020204" pitchFamily="34" charset="0"/>
-              </a:rPr>
-              <a:t>    &lt;</a:t>
-            </a:r>
-            <a:r>
-              <a:rPr lang="de-CH" sz="2200" dirty="0" err="1">
-                <a:latin typeface="Arial" panose="020B0604020202020204" pitchFamily="34" charset="0"/>
-                <a:cs typeface="Arial" panose="020B0604020202020204" pitchFamily="34" charset="0"/>
-              </a:rPr>
-              <a:t>head</a:t>
-            </a:r>
-            <a:r>
-              <a:rPr lang="de-CH" sz="2200" dirty="0">
-                <a:latin typeface="Arial" panose="020B0604020202020204" pitchFamily="34" charset="0"/>
-                <a:cs typeface="Arial" panose="020B0604020202020204" pitchFamily="34" charset="0"/>
-              </a:rPr>
-              <a:t>&gt; </a:t>
-            </a:r>
-          </a:p>
-          <a:p>
-            <a:pPr marL="0" indent="0">
-              <a:buNone/>
-            </a:pPr>
-            <a:r>
-              <a:rPr lang="de-CH" sz="2200" dirty="0">
-                <a:latin typeface="Arial" panose="020B0604020202020204" pitchFamily="34" charset="0"/>
-                <a:cs typeface="Arial" panose="020B0604020202020204" pitchFamily="34" charset="0"/>
-              </a:rPr>
-              <a:t>        &lt;</a:t>
-            </a:r>
-            <a:r>
-              <a:rPr lang="de-CH" sz="2200" dirty="0" err="1">
-                <a:latin typeface="Arial" panose="020B0604020202020204" pitchFamily="34" charset="0"/>
-                <a:cs typeface="Arial" panose="020B0604020202020204" pitchFamily="34" charset="0"/>
-              </a:rPr>
-              <a:t>meta</a:t>
-            </a:r>
-            <a:r>
-              <a:rPr lang="de-CH" sz="2200" dirty="0">
-                <a:latin typeface="Arial" panose="020B0604020202020204" pitchFamily="34" charset="0"/>
-                <a:cs typeface="Arial" panose="020B0604020202020204" pitchFamily="34" charset="0"/>
-              </a:rPr>
-              <a:t> </a:t>
-            </a:r>
-            <a:r>
-              <a:rPr lang="de-CH" sz="2200" dirty="0" err="1">
-                <a:latin typeface="Arial" panose="020B0604020202020204" pitchFamily="34" charset="0"/>
-                <a:cs typeface="Arial" panose="020B0604020202020204" pitchFamily="34" charset="0"/>
-              </a:rPr>
-              <a:t>charset</a:t>
-            </a:r>
-            <a:r>
-              <a:rPr lang="de-CH" sz="2200" dirty="0">
-                <a:latin typeface="Arial" panose="020B0604020202020204" pitchFamily="34" charset="0"/>
-                <a:cs typeface="Arial" panose="020B0604020202020204" pitchFamily="34" charset="0"/>
-              </a:rPr>
-              <a:t>="UTF-8"&gt; </a:t>
-            </a:r>
-          </a:p>
-          <a:p>
-            <a:pPr marL="0" indent="0">
-              <a:buNone/>
-            </a:pPr>
-            <a:r>
-              <a:rPr lang="de-CH" sz="2200" dirty="0">
-                <a:latin typeface="Arial" panose="020B0604020202020204" pitchFamily="34" charset="0"/>
-                <a:cs typeface="Arial" panose="020B0604020202020204" pitchFamily="34" charset="0"/>
-              </a:rPr>
-              <a:t>        &lt;title&gt;Willkommen!&lt;/title&gt; </a:t>
-            </a:r>
-          </a:p>
-          <a:p>
-            <a:pPr marL="0" indent="0">
-              <a:buNone/>
-            </a:pPr>
-            <a:r>
-              <a:rPr lang="de-CH" sz="2200" dirty="0">
-                <a:latin typeface="Arial" panose="020B0604020202020204" pitchFamily="34" charset="0"/>
-                <a:cs typeface="Arial" panose="020B0604020202020204" pitchFamily="34" charset="0"/>
-              </a:rPr>
-              <a:t>    &lt;/</a:t>
-            </a:r>
-            <a:r>
-              <a:rPr lang="de-CH" sz="2200" dirty="0" err="1">
-                <a:latin typeface="Arial" panose="020B0604020202020204" pitchFamily="34" charset="0"/>
-                <a:cs typeface="Arial" panose="020B0604020202020204" pitchFamily="34" charset="0"/>
-              </a:rPr>
-              <a:t>head</a:t>
-            </a:r>
-            <a:r>
-              <a:rPr lang="de-CH" sz="2200" dirty="0">
-                <a:latin typeface="Arial" panose="020B0604020202020204" pitchFamily="34" charset="0"/>
-                <a:cs typeface="Arial" panose="020B0604020202020204" pitchFamily="34" charset="0"/>
-              </a:rPr>
-              <a:t>&gt; </a:t>
-            </a:r>
-          </a:p>
-          <a:p>
-            <a:pPr marL="0" indent="0">
-              <a:buNone/>
-            </a:pPr>
-            <a:r>
-              <a:rPr lang="de-CH" sz="2200" dirty="0">
-                <a:latin typeface="Arial" panose="020B0604020202020204" pitchFamily="34" charset="0"/>
-                <a:cs typeface="Arial" panose="020B0604020202020204" pitchFamily="34" charset="0"/>
-              </a:rPr>
-              <a:t>    &lt;</a:t>
-            </a:r>
-            <a:r>
-              <a:rPr lang="de-CH" sz="2200" dirty="0" err="1">
-                <a:latin typeface="Arial" panose="020B0604020202020204" pitchFamily="34" charset="0"/>
-                <a:cs typeface="Arial" panose="020B0604020202020204" pitchFamily="34" charset="0"/>
-              </a:rPr>
-              <a:t>body</a:t>
-            </a:r>
-            <a:r>
-              <a:rPr lang="de-CH" sz="2200" dirty="0">
-                <a:latin typeface="Arial" panose="020B0604020202020204" pitchFamily="34" charset="0"/>
-                <a:cs typeface="Arial" panose="020B0604020202020204" pitchFamily="34" charset="0"/>
-              </a:rPr>
-              <a:t>&gt;</a:t>
-            </a:r>
-            <a:br>
-              <a:rPr lang="de-CH" sz="2200" dirty="0">
-                <a:latin typeface="Arial" panose="020B0604020202020204" pitchFamily="34" charset="0"/>
-                <a:cs typeface="Arial" panose="020B0604020202020204" pitchFamily="34" charset="0"/>
-              </a:rPr>
-            </a:br>
-            <a:r>
-              <a:rPr lang="de-CH" sz="2200" dirty="0">
-                <a:latin typeface="Arial" panose="020B0604020202020204" pitchFamily="34" charset="0"/>
-                <a:cs typeface="Arial" panose="020B0604020202020204" pitchFamily="34" charset="0"/>
-              </a:rPr>
-              <a:t>         &lt;h1&gt;Hallo Welt!&lt;/h1&gt;</a:t>
-            </a:r>
-            <a:br>
-              <a:rPr lang="de-CH" sz="2200" dirty="0">
-                <a:latin typeface="Arial" panose="020B0604020202020204" pitchFamily="34" charset="0"/>
-                <a:cs typeface="Arial" panose="020B0604020202020204" pitchFamily="34" charset="0"/>
-              </a:rPr>
-            </a:br>
-            <a:r>
-              <a:rPr lang="de-CH" sz="2200" dirty="0">
-                <a:latin typeface="Arial" panose="020B0604020202020204" pitchFamily="34" charset="0"/>
-                <a:cs typeface="Arial" panose="020B0604020202020204" pitchFamily="34" charset="0"/>
-              </a:rPr>
-              <a:t>         &lt;p&gt;Dies ist meine erste </a:t>
-            </a:r>
-            <a:r>
-              <a:rPr lang="de-CH" dirty="0"/>
-              <a:t>&lt;span&gt;</a:t>
-            </a:r>
-            <a:r>
-              <a:rPr lang="de-CH" sz="2000" dirty="0"/>
-              <a:t>HTML</a:t>
-            </a:r>
-            <a:r>
-              <a:rPr lang="de-CH" dirty="0"/>
-              <a:t>&lt;/span&gt;</a:t>
-            </a:r>
-            <a:r>
-              <a:rPr lang="de-CH" sz="2200" dirty="0">
-                <a:latin typeface="Arial" panose="020B0604020202020204" pitchFamily="34" charset="0"/>
-                <a:cs typeface="Arial" panose="020B0604020202020204" pitchFamily="34" charset="0"/>
-              </a:rPr>
-              <a:t> Seite </a:t>
-            </a:r>
-            <a:r>
-              <a:rPr lang="de-CH" sz="2200" dirty="0" err="1">
-                <a:latin typeface="Arial" panose="020B0604020202020204" pitchFamily="34" charset="0"/>
-                <a:cs typeface="Arial" panose="020B0604020202020204" pitchFamily="34" charset="0"/>
-              </a:rPr>
-              <a:t>gesponsort</a:t>
-            </a:r>
-            <a:r>
-              <a:rPr lang="de-CH" sz="2200" dirty="0">
-                <a:latin typeface="Arial" panose="020B0604020202020204" pitchFamily="34" charset="0"/>
-                <a:cs typeface="Arial" panose="020B0604020202020204" pitchFamily="34" charset="0"/>
-              </a:rPr>
-              <a:t> von </a:t>
-            </a:r>
-          </a:p>
-          <a:p>
-            <a:pPr marL="0" indent="0">
-              <a:buNone/>
-            </a:pPr>
-            <a:r>
-              <a:rPr lang="de-CH" sz="2200" dirty="0">
-                <a:latin typeface="Arial" panose="020B0604020202020204" pitchFamily="34" charset="0"/>
-                <a:cs typeface="Arial" panose="020B0604020202020204" pitchFamily="34" charset="0"/>
-              </a:rPr>
-              <a:t>         &lt;a </a:t>
-            </a:r>
-            <a:r>
-              <a:rPr lang="de-CH" sz="2200" dirty="0" err="1">
-                <a:latin typeface="Arial" panose="020B0604020202020204" pitchFamily="34" charset="0"/>
-                <a:cs typeface="Arial" panose="020B0604020202020204" pitchFamily="34" charset="0"/>
-              </a:rPr>
-              <a:t>href</a:t>
-            </a:r>
-            <a:r>
-              <a:rPr lang="de-CH" sz="2200" dirty="0">
-                <a:latin typeface="Arial" panose="020B0604020202020204" pitchFamily="34" charset="0"/>
-                <a:cs typeface="Arial" panose="020B0604020202020204" pitchFamily="34" charset="0"/>
-              </a:rPr>
-              <a:t>="http://</a:t>
-            </a:r>
-            <a:r>
-              <a:rPr lang="de-CH" sz="2200" dirty="0" err="1">
-                <a:latin typeface="Arial" panose="020B0604020202020204" pitchFamily="34" charset="0"/>
-                <a:cs typeface="Arial" panose="020B0604020202020204" pitchFamily="34" charset="0"/>
-              </a:rPr>
-              <a:t>www.finnova.com</a:t>
-            </a:r>
-            <a:r>
-              <a:rPr lang="de-CH" sz="2200" dirty="0">
-                <a:latin typeface="Arial" panose="020B0604020202020204" pitchFamily="34" charset="0"/>
-                <a:cs typeface="Arial" panose="020B0604020202020204" pitchFamily="34" charset="0"/>
-              </a:rPr>
-              <a:t>"&gt;</a:t>
-            </a:r>
-            <a:r>
-              <a:rPr lang="de-CH" sz="2200" dirty="0" err="1">
-                <a:latin typeface="Arial" panose="020B0604020202020204" pitchFamily="34" charset="0"/>
-                <a:cs typeface="Arial" panose="020B0604020202020204" pitchFamily="34" charset="0"/>
-              </a:rPr>
-              <a:t>Finnova</a:t>
-            </a:r>
-            <a:r>
-              <a:rPr lang="de-CH" sz="2200" dirty="0">
-                <a:latin typeface="Arial" panose="020B0604020202020204" pitchFamily="34" charset="0"/>
-                <a:cs typeface="Arial" panose="020B0604020202020204" pitchFamily="34" charset="0"/>
-              </a:rPr>
-              <a:t>&lt;/a&gt;.&lt;/p&gt; </a:t>
-            </a:r>
-          </a:p>
-          <a:p>
-            <a:pPr marL="0" indent="0">
-              <a:buNone/>
-            </a:pPr>
-            <a:r>
-              <a:rPr lang="de-CH" sz="2200" dirty="0">
-                <a:latin typeface="Arial" panose="020B0604020202020204" pitchFamily="34" charset="0"/>
-                <a:cs typeface="Arial" panose="020B0604020202020204" pitchFamily="34" charset="0"/>
-              </a:rPr>
-              <a:t>    &lt;/</a:t>
-            </a:r>
-            <a:r>
-              <a:rPr lang="de-CH" sz="2200" dirty="0" err="1">
-                <a:latin typeface="Arial" panose="020B0604020202020204" pitchFamily="34" charset="0"/>
-                <a:cs typeface="Arial" panose="020B0604020202020204" pitchFamily="34" charset="0"/>
-              </a:rPr>
-              <a:t>body</a:t>
-            </a:r>
-            <a:r>
-              <a:rPr lang="de-CH" sz="2200" dirty="0">
-                <a:latin typeface="Arial" panose="020B0604020202020204" pitchFamily="34" charset="0"/>
-                <a:cs typeface="Arial" panose="020B0604020202020204" pitchFamily="34" charset="0"/>
-              </a:rPr>
-              <a:t>&gt; </a:t>
-            </a:r>
-          </a:p>
-          <a:p>
-            <a:pPr marL="0" indent="0">
-              <a:buNone/>
-            </a:pPr>
-            <a:r>
-              <a:rPr lang="de-CH" sz="2200" dirty="0">
-                <a:latin typeface="Arial" panose="020B0604020202020204" pitchFamily="34" charset="0"/>
-                <a:cs typeface="Arial" panose="020B0604020202020204" pitchFamily="34" charset="0"/>
-              </a:rPr>
-              <a:t>&lt;/</a:t>
-            </a:r>
-            <a:r>
-              <a:rPr lang="de-CH" sz="2200" dirty="0" err="1">
-                <a:latin typeface="Arial" panose="020B0604020202020204" pitchFamily="34" charset="0"/>
-                <a:cs typeface="Arial" panose="020B0604020202020204" pitchFamily="34" charset="0"/>
-              </a:rPr>
-              <a:t>html</a:t>
-            </a:r>
-            <a:r>
-              <a:rPr lang="de-CH" sz="2200" dirty="0">
-                <a:latin typeface="Arial" panose="020B0604020202020204" pitchFamily="34" charset="0"/>
-                <a:cs typeface="Arial" panose="020B0604020202020204" pitchFamily="34" charset="0"/>
-              </a:rPr>
-              <a:t>&gt; </a:t>
-            </a:r>
-          </a:p>
-          <a:p>
-            <a:pPr marL="0" indent="0">
-              <a:buNone/>
-            </a:pPr>
-            <a:endParaRPr lang="de-DE" dirty="0"/>
-          </a:p>
-        </p:txBody>
-      </p:sp>
-    </p:spTree>
-    <p:extLst>
-      <p:ext uri="{BB962C8B-B14F-4D97-AF65-F5344CB8AC3E}">
-        <p14:creationId xmlns:p14="http://schemas.microsoft.com/office/powerpoint/2010/main" val="914521488"/>
       </p:ext>
     </p:extLst>
   </p:cSld>

</xml_diff>

<commit_message>
Neue Slides zur Positionierung
</commit_message>
<xml_diff>
--- a/html Schulung.pptx
+++ b/html Schulung.pptx
@@ -25766,7 +25766,15 @@
             </a:r>
             <a:r>
               <a:rPr lang="en-US" dirty="0"/>
-              <a:t> fixed Elements </a:t>
+              <a:t> fixed </a:t>
+            </a:r>
+            <a:r>
+              <a:rPr lang="en-US" dirty="0" err="1"/>
+              <a:t>Elementen</a:t>
+            </a:r>
+            <a:r>
+              <a:rPr lang="en-US" dirty="0"/>
+              <a:t> </a:t>
             </a:r>
             <a:r>
               <a:rPr lang="en-US" dirty="0" err="1"/>
@@ -25861,10 +25869,9 @@
               <a:t>mit</a:t>
             </a:r>
             <a:r>
-              <a:rPr lang="en-US"/>
+              <a:rPr lang="en-US" dirty="0"/>
               <a:t>.</a:t>
             </a:r>
-            <a:endParaRPr lang="en-US" dirty="0"/>
           </a:p>
         </p:txBody>
       </p:sp>

</xml_diff>

<commit_message>
Übung zu einem fixierten Header hinzugefügt.
</commit_message>
<xml_diff>
--- a/html Schulung.pptx
+++ b/html Schulung.pptx
@@ -5,7 +5,7 @@
     <p:sldMasterId id="2147483660" r:id="rId1"/>
   </p:sldMasterIdLst>
   <p:notesMasterIdLst>
-    <p:notesMasterId r:id="rId111"/>
+    <p:notesMasterId r:id="rId113"/>
   </p:notesMasterIdLst>
   <p:sldIdLst>
     <p:sldId id="256" r:id="rId2"/>
@@ -92,31 +92,33 @@
     <p:sldId id="357" r:id="rId83"/>
     <p:sldId id="358" r:id="rId84"/>
     <p:sldId id="356" r:id="rId85"/>
-    <p:sldId id="325" r:id="rId86"/>
-    <p:sldId id="326" r:id="rId87"/>
-    <p:sldId id="327" r:id="rId88"/>
-    <p:sldId id="328" r:id="rId89"/>
-    <p:sldId id="331" r:id="rId90"/>
-    <p:sldId id="332" r:id="rId91"/>
-    <p:sldId id="334" r:id="rId92"/>
-    <p:sldId id="333" r:id="rId93"/>
-    <p:sldId id="329" r:id="rId94"/>
-    <p:sldId id="330" r:id="rId95"/>
-    <p:sldId id="335" r:id="rId96"/>
-    <p:sldId id="336" r:id="rId97"/>
-    <p:sldId id="339" r:id="rId98"/>
-    <p:sldId id="340" r:id="rId99"/>
-    <p:sldId id="341" r:id="rId100"/>
-    <p:sldId id="342" r:id="rId101"/>
-    <p:sldId id="343" r:id="rId102"/>
-    <p:sldId id="344" r:id="rId103"/>
-    <p:sldId id="345" r:id="rId104"/>
-    <p:sldId id="346" r:id="rId105"/>
-    <p:sldId id="347" r:id="rId106"/>
-    <p:sldId id="348" r:id="rId107"/>
-    <p:sldId id="337" r:id="rId108"/>
-    <p:sldId id="338" r:id="rId109"/>
-    <p:sldId id="264" r:id="rId110"/>
+    <p:sldId id="366" r:id="rId86"/>
+    <p:sldId id="365" r:id="rId87"/>
+    <p:sldId id="325" r:id="rId88"/>
+    <p:sldId id="326" r:id="rId89"/>
+    <p:sldId id="327" r:id="rId90"/>
+    <p:sldId id="328" r:id="rId91"/>
+    <p:sldId id="331" r:id="rId92"/>
+    <p:sldId id="332" r:id="rId93"/>
+    <p:sldId id="334" r:id="rId94"/>
+    <p:sldId id="333" r:id="rId95"/>
+    <p:sldId id="329" r:id="rId96"/>
+    <p:sldId id="330" r:id="rId97"/>
+    <p:sldId id="335" r:id="rId98"/>
+    <p:sldId id="336" r:id="rId99"/>
+    <p:sldId id="339" r:id="rId100"/>
+    <p:sldId id="340" r:id="rId101"/>
+    <p:sldId id="341" r:id="rId102"/>
+    <p:sldId id="342" r:id="rId103"/>
+    <p:sldId id="343" r:id="rId104"/>
+    <p:sldId id="344" r:id="rId105"/>
+    <p:sldId id="345" r:id="rId106"/>
+    <p:sldId id="346" r:id="rId107"/>
+    <p:sldId id="347" r:id="rId108"/>
+    <p:sldId id="348" r:id="rId109"/>
+    <p:sldId id="337" r:id="rId110"/>
+    <p:sldId id="338" r:id="rId111"/>
+    <p:sldId id="264" r:id="rId112"/>
   </p:sldIdLst>
   <p:sldSz cx="12192000" cy="6858000"/>
   <p:notesSz cx="6858000" cy="9144000"/>
@@ -8991,7 +8993,7 @@
           <p:cNvPr id="2" name="Titel 1">
             <a:extLst>
               <a:ext uri="{FF2B5EF4-FFF2-40B4-BE49-F238E27FC236}">
-                <a16:creationId xmlns:a16="http://schemas.microsoft.com/office/drawing/2014/main" id="{42A5B1AA-ADEF-F348-A0E4-381E0CA6525F}"/>
+                <a16:creationId xmlns:a16="http://schemas.microsoft.com/office/drawing/2014/main" id="{19033134-0BFA-AE4B-AAE3-E9131EA31B93}"/>
               </a:ext>
             </a:extLst>
           </p:cNvPr>
@@ -9018,171 +9020,281 @@
           </a:p>
         </p:txBody>
       </p:sp>
-      <p:pic>
-        <p:nvPicPr>
-          <p:cNvPr id="5" name="Inhaltsplatzhalter 4">
+      <p:sp>
+        <p:nvSpPr>
+          <p:cNvPr id="7" name="Inhaltsplatzhalter 6">
             <a:extLst>
               <a:ext uri="{FF2B5EF4-FFF2-40B4-BE49-F238E27FC236}">
-                <a16:creationId xmlns:a16="http://schemas.microsoft.com/office/drawing/2014/main" id="{09F627C6-0BE4-2145-A7D3-7F54CD309458}"/>
+                <a16:creationId xmlns:a16="http://schemas.microsoft.com/office/drawing/2014/main" id="{662274F8-DBDF-1941-95E5-496B43E07EBD}"/>
               </a:ext>
             </a:extLst>
           </p:cNvPr>
-          <p:cNvPicPr>
-            <a:picLocks noGrp="1" noChangeAspect="1"/>
-          </p:cNvPicPr>
+          <p:cNvSpPr>
+            <a:spLocks noGrp="1"/>
+          </p:cNvSpPr>
           <p:nvPr>
             <p:ph idx="1"/>
           </p:nvPr>
-        </p:nvPicPr>
-        <p:blipFill>
-          <a:blip r:embed="rId2"/>
-          <a:stretch>
-            <a:fillRect/>
-          </a:stretch>
-        </p:blipFill>
+        </p:nvSpPr>
         <p:spPr>
           <a:xfrm>
-            <a:off x="680321" y="3343910"/>
-            <a:ext cx="7013709" cy="3022600"/>
+            <a:off x="680321" y="2336873"/>
+            <a:ext cx="9915289" cy="3599316"/>
           </a:xfrm>
         </p:spPr>
-      </p:pic>
-      <p:sp>
-        <p:nvSpPr>
-          <p:cNvPr id="6" name="Rechteck 5">
-            <a:extLst>
-              <a:ext uri="{FF2B5EF4-FFF2-40B4-BE49-F238E27FC236}">
-                <a16:creationId xmlns:a16="http://schemas.microsoft.com/office/drawing/2014/main" id="{1EEC8D5E-3E9D-3E4E-B228-D0BB3D94818B}"/>
-              </a:ext>
-            </a:extLst>
-          </p:cNvPr>
-          <p:cNvSpPr/>
-          <p:nvPr/>
-        </p:nvSpPr>
-        <p:spPr>
-          <a:xfrm>
-            <a:off x="680321" y="2317165"/>
-            <a:ext cx="6873240" cy="369332"/>
-          </a:xfrm>
-          <a:prstGeom prst="rect">
-            <a:avLst/>
-          </a:prstGeom>
-        </p:spPr>
-        <p:txBody>
-          <a:bodyPr wrap="square">
-            <a:spAutoFit/>
-          </a:bodyPr>
+        <p:txBody>
+          <a:bodyPr/>
           <a:lstStyle/>
           <a:p>
             <a:r>
               <a:rPr lang="de-CH" dirty="0" err="1">
-                <a:latin typeface="Arial" panose="020B0604020202020204" pitchFamily="34" charset="0"/>
-                <a:cs typeface="Arial" panose="020B0604020202020204" pitchFamily="34" charset="0"/>
+                <a:solidFill>
+                  <a:schemeClr val="bg1"/>
+                </a:solidFill>
               </a:rPr>
               <a:t>grid</a:t>
             </a:r>
             <a:r>
               <a:rPr lang="de-CH" dirty="0">
-                <a:latin typeface="Arial" panose="020B0604020202020204" pitchFamily="34" charset="0"/>
-                <a:cs typeface="Arial" panose="020B0604020202020204" pitchFamily="34" charset="0"/>
+                <a:solidFill>
+                  <a:schemeClr val="bg1"/>
+                </a:solidFill>
               </a:rPr>
               <a:t>-template-</a:t>
             </a:r>
             <a:r>
               <a:rPr lang="de-CH" dirty="0" err="1">
-                <a:latin typeface="Arial" panose="020B0604020202020204" pitchFamily="34" charset="0"/>
-                <a:cs typeface="Arial" panose="020B0604020202020204" pitchFamily="34" charset="0"/>
+                <a:solidFill>
+                  <a:schemeClr val="bg1"/>
+                </a:solidFill>
               </a:rPr>
               <a:t>columns</a:t>
             </a:r>
             <a:r>
+              <a:rPr lang="de-CH" dirty="0"/>
+              <a:t>:  Definiert die Anzahl und Grösse der Spalten</a:t>
+            </a:r>
+            <a:r>
+              <a:rPr lang="de-CH" b="1" dirty="0"/>
+              <a:t>.</a:t>
+            </a:r>
+            <a:br>
+              <a:rPr lang="de-CH" b="1" dirty="0"/>
+            </a:br>
+            <a:r>
+              <a:rPr lang="de-CH" sz="2000" dirty="0" err="1">
+                <a:latin typeface="Arial" panose="020B0604020202020204" pitchFamily="34" charset="0"/>
+                <a:cs typeface="Arial" panose="020B0604020202020204" pitchFamily="34" charset="0"/>
+              </a:rPr>
+              <a:t>grid</a:t>
+            </a:r>
+            <a:r>
+              <a:rPr lang="de-CH" sz="2000" dirty="0">
+                <a:latin typeface="Arial" panose="020B0604020202020204" pitchFamily="34" charset="0"/>
+                <a:cs typeface="Arial" panose="020B0604020202020204" pitchFamily="34" charset="0"/>
+              </a:rPr>
+              <a:t>-template-</a:t>
+            </a:r>
+            <a:r>
+              <a:rPr lang="de-CH" sz="2000" dirty="0" err="1">
+                <a:latin typeface="Arial" panose="020B0604020202020204" pitchFamily="34" charset="0"/>
+                <a:cs typeface="Arial" panose="020B0604020202020204" pitchFamily="34" charset="0"/>
+              </a:rPr>
+              <a:t>columns</a:t>
+            </a:r>
+            <a:r>
+              <a:rPr lang="de-CH" sz="2000" dirty="0">
+                <a:latin typeface="Arial" panose="020B0604020202020204" pitchFamily="34" charset="0"/>
+                <a:cs typeface="Arial" panose="020B0604020202020204" pitchFamily="34" charset="0"/>
+              </a:rPr>
+              <a:t>: 20% 60% 20%;</a:t>
+            </a:r>
+            <a:br>
+              <a:rPr lang="de-CH" sz="2000" dirty="0">
+                <a:latin typeface="Arial" panose="020B0604020202020204" pitchFamily="34" charset="0"/>
+                <a:cs typeface="Arial" panose="020B0604020202020204" pitchFamily="34" charset="0"/>
+              </a:rPr>
+            </a:br>
+            <a:r>
+              <a:rPr lang="de-CH" sz="2000" dirty="0" err="1">
+                <a:latin typeface="Arial" panose="020B0604020202020204" pitchFamily="34" charset="0"/>
+                <a:cs typeface="Arial" panose="020B0604020202020204" pitchFamily="34" charset="0"/>
+              </a:rPr>
+              <a:t>grid</a:t>
+            </a:r>
+            <a:r>
+              <a:rPr lang="de-CH" sz="2000" dirty="0">
+                <a:latin typeface="Arial" panose="020B0604020202020204" pitchFamily="34" charset="0"/>
+                <a:cs typeface="Arial" panose="020B0604020202020204" pitchFamily="34" charset="0"/>
+              </a:rPr>
+              <a:t>-template-</a:t>
+            </a:r>
+            <a:r>
+              <a:rPr lang="de-CH" sz="2000" dirty="0" err="1">
+                <a:latin typeface="Arial" panose="020B0604020202020204" pitchFamily="34" charset="0"/>
+                <a:cs typeface="Arial" panose="020B0604020202020204" pitchFamily="34" charset="0"/>
+              </a:rPr>
+              <a:t>columns</a:t>
+            </a:r>
+            <a:r>
+              <a:rPr lang="de-CH" sz="2000" dirty="0">
+                <a:latin typeface="Arial" panose="020B0604020202020204" pitchFamily="34" charset="0"/>
+                <a:cs typeface="Arial" panose="020B0604020202020204" pitchFamily="34" charset="0"/>
+              </a:rPr>
+              <a:t>: [eins] 20% [zwei] 60% [drei] 20% [vier];</a:t>
+            </a:r>
+            <a:br>
+              <a:rPr lang="de-CH" sz="2000" b="1" dirty="0">
+                <a:latin typeface="Arial" panose="020B0604020202020204" pitchFamily="34" charset="0"/>
+                <a:cs typeface="Arial" panose="020B0604020202020204" pitchFamily="34" charset="0"/>
+              </a:rPr>
+            </a:br>
+            <a:endParaRPr lang="de-CH" sz="2000" dirty="0">
+              <a:latin typeface="Arial" panose="020B0604020202020204" pitchFamily="34" charset="0"/>
+              <a:cs typeface="Arial" panose="020B0604020202020204" pitchFamily="34" charset="0"/>
+            </a:endParaRPr>
+          </a:p>
+          <a:p>
+            <a:r>
+              <a:rPr lang="de-CH" dirty="0" err="1">
+                <a:solidFill>
+                  <a:schemeClr val="bg1"/>
+                </a:solidFill>
+              </a:rPr>
+              <a:t>grid</a:t>
+            </a:r>
+            <a:r>
               <a:rPr lang="de-CH" dirty="0">
-                <a:latin typeface="Arial" panose="020B0604020202020204" pitchFamily="34" charset="0"/>
-                <a:cs typeface="Arial" panose="020B0604020202020204" pitchFamily="34" charset="0"/>
-              </a:rPr>
-              <a:t>: [eins] 20% [zwei] 60% [drei] 20% [vier];</a:t>
-            </a:r>
-            <a:endParaRPr lang="de-DE" dirty="0"/>
-          </a:p>
-        </p:txBody>
-      </p:sp>
-      <p:sp>
-        <p:nvSpPr>
-          <p:cNvPr id="7" name="Rechteck 6">
-            <a:extLst>
-              <a:ext uri="{FF2B5EF4-FFF2-40B4-BE49-F238E27FC236}">
-                <a16:creationId xmlns:a16="http://schemas.microsoft.com/office/drawing/2014/main" id="{DEBF59EC-59FB-C14F-A76E-FCF584425CF1}"/>
-              </a:ext>
-            </a:extLst>
-          </p:cNvPr>
-          <p:cNvSpPr/>
-          <p:nvPr/>
-        </p:nvSpPr>
-        <p:spPr>
-          <a:xfrm>
-            <a:off x="680321" y="2686497"/>
-            <a:ext cx="7044690" cy="369332"/>
-          </a:xfrm>
-          <a:prstGeom prst="rect">
-            <a:avLst/>
-          </a:prstGeom>
-        </p:spPr>
-        <p:txBody>
-          <a:bodyPr wrap="square">
-            <a:spAutoFit/>
-          </a:bodyPr>
-          <a:lstStyle/>
-          <a:p>
+                <a:solidFill>
+                  <a:schemeClr val="bg1"/>
+                </a:solidFill>
+              </a:rPr>
+              <a:t>-template-</a:t>
+            </a:r>
             <a:r>
               <a:rPr lang="de-CH" dirty="0" err="1">
+                <a:solidFill>
+                  <a:schemeClr val="bg1"/>
+                </a:solidFill>
+              </a:rPr>
+              <a:t>rows</a:t>
+            </a:r>
+            <a:r>
+              <a:rPr lang="de-CH" dirty="0"/>
+              <a:t>: </a:t>
+            </a:r>
+            <a:r>
+              <a:rPr lang="de-CH" dirty="0" err="1"/>
+              <a:t>Definert</a:t>
+            </a:r>
+            <a:r>
+              <a:rPr lang="de-CH" dirty="0"/>
+              <a:t> die Anzahl und Grösse der Reihen</a:t>
+            </a:r>
+            <a:r>
+              <a:rPr lang="de-CH" b="1" dirty="0"/>
+              <a:t>.</a:t>
+            </a:r>
+            <a:br>
+              <a:rPr lang="de-CH" b="1" dirty="0"/>
+            </a:br>
+            <a:r>
+              <a:rPr lang="de-CH" sz="2000" dirty="0" err="1">
                 <a:latin typeface="Arial" panose="020B0604020202020204" pitchFamily="34" charset="0"/>
                 <a:cs typeface="Arial" panose="020B0604020202020204" pitchFamily="34" charset="0"/>
               </a:rPr>
               <a:t>grid</a:t>
             </a:r>
             <a:r>
-              <a:rPr lang="de-CH" dirty="0">
+              <a:rPr lang="de-CH" sz="2000" dirty="0">
                 <a:latin typeface="Arial" panose="020B0604020202020204" pitchFamily="34" charset="0"/>
                 <a:cs typeface="Arial" panose="020B0604020202020204" pitchFamily="34" charset="0"/>
               </a:rPr>
               <a:t>-template-</a:t>
             </a:r>
             <a:r>
-              <a:rPr lang="de-CH" dirty="0" err="1">
+              <a:rPr lang="de-CH" sz="2000" dirty="0" err="1">
                 <a:latin typeface="Arial" panose="020B0604020202020204" pitchFamily="34" charset="0"/>
                 <a:cs typeface="Arial" panose="020B0604020202020204" pitchFamily="34" charset="0"/>
               </a:rPr>
               <a:t>rows</a:t>
             </a:r>
             <a:r>
-              <a:rPr lang="de-CH" dirty="0">
+              <a:rPr lang="de-CH" sz="2000" dirty="0">
+                <a:latin typeface="Arial" panose="020B0604020202020204" pitchFamily="34" charset="0"/>
+                <a:cs typeface="Arial" panose="020B0604020202020204" pitchFamily="34" charset="0"/>
+              </a:rPr>
+              <a:t>: 100px </a:t>
+            </a:r>
+            <a:r>
+              <a:rPr lang="de-CH" sz="2000" dirty="0" err="1">
+                <a:latin typeface="Arial" panose="020B0604020202020204" pitchFamily="34" charset="0"/>
+                <a:cs typeface="Arial" panose="020B0604020202020204" pitchFamily="34" charset="0"/>
+              </a:rPr>
+              <a:t>auto</a:t>
+            </a:r>
+            <a:r>
+              <a:rPr lang="de-CH" sz="2000" dirty="0">
+                <a:latin typeface="Arial" panose="020B0604020202020204" pitchFamily="34" charset="0"/>
+                <a:cs typeface="Arial" panose="020B0604020202020204" pitchFamily="34" charset="0"/>
+              </a:rPr>
+              <a:t> 100px;</a:t>
+            </a:r>
+            <a:br>
+              <a:rPr lang="de-CH" sz="2000" dirty="0">
+                <a:latin typeface="Arial" panose="020B0604020202020204" pitchFamily="34" charset="0"/>
+                <a:cs typeface="Arial" panose="020B0604020202020204" pitchFamily="34" charset="0"/>
+              </a:rPr>
+            </a:br>
+            <a:r>
+              <a:rPr lang="de-CH" sz="2000" dirty="0" err="1">
+                <a:latin typeface="Arial" panose="020B0604020202020204" pitchFamily="34" charset="0"/>
+                <a:cs typeface="Arial" panose="020B0604020202020204" pitchFamily="34" charset="0"/>
+              </a:rPr>
+              <a:t>grid</a:t>
+            </a:r>
+            <a:r>
+              <a:rPr lang="de-CH" sz="2000" dirty="0">
+                <a:latin typeface="Arial" panose="020B0604020202020204" pitchFamily="34" charset="0"/>
+                <a:cs typeface="Arial" panose="020B0604020202020204" pitchFamily="34" charset="0"/>
+              </a:rPr>
+              <a:t>-template-</a:t>
+            </a:r>
+            <a:r>
+              <a:rPr lang="de-CH" sz="2000" dirty="0" err="1">
+                <a:latin typeface="Arial" panose="020B0604020202020204" pitchFamily="34" charset="0"/>
+                <a:cs typeface="Arial" panose="020B0604020202020204" pitchFamily="34" charset="0"/>
+              </a:rPr>
+              <a:t>rows</a:t>
+            </a:r>
+            <a:r>
+              <a:rPr lang="de-CH" sz="2000" dirty="0">
                 <a:latin typeface="Arial" panose="020B0604020202020204" pitchFamily="34" charset="0"/>
                 <a:cs typeface="Arial" panose="020B0604020202020204" pitchFamily="34" charset="0"/>
               </a:rPr>
               <a:t>: [row1] 100px [row2] </a:t>
             </a:r>
             <a:r>
-              <a:rPr lang="de-CH" dirty="0" err="1">
+              <a:rPr lang="de-CH" sz="2000" dirty="0" err="1">
                 <a:latin typeface="Arial" panose="020B0604020202020204" pitchFamily="34" charset="0"/>
                 <a:cs typeface="Arial" panose="020B0604020202020204" pitchFamily="34" charset="0"/>
               </a:rPr>
               <a:t>auto</a:t>
             </a:r>
             <a:r>
-              <a:rPr lang="de-CH" dirty="0">
+              <a:rPr lang="de-CH" sz="2000" dirty="0">
                 <a:latin typeface="Arial" panose="020B0604020202020204" pitchFamily="34" charset="0"/>
                 <a:cs typeface="Arial" panose="020B0604020202020204" pitchFamily="34" charset="0"/>
               </a:rPr>
               <a:t> [row3] 100px [ende];</a:t>
             </a:r>
-            <a:endParaRPr lang="de-DE" dirty="0"/>
           </a:p>
         </p:txBody>
       </p:sp>
     </p:spTree>
     <p:extLst>
       <p:ext uri="{BB962C8B-B14F-4D97-AF65-F5344CB8AC3E}">
-        <p14:creationId xmlns:p14="http://schemas.microsoft.com/office/powerpoint/2010/main" val="1020404966"/>
+        <p14:creationId xmlns:p14="http://schemas.microsoft.com/office/powerpoint/2010/main" val="714284251"/>
       </p:ext>
     </p:extLst>
   </p:cSld>
@@ -9214,6 +9326,452 @@
           <p:cNvPr id="2" name="Titel 1">
             <a:extLst>
               <a:ext uri="{FF2B5EF4-FFF2-40B4-BE49-F238E27FC236}">
+                <a16:creationId xmlns:a16="http://schemas.microsoft.com/office/drawing/2014/main" id="{10085994-E9B3-9C49-88DA-85CB7896D777}"/>
+              </a:ext>
+            </a:extLst>
+          </p:cNvPr>
+          <p:cNvSpPr>
+            <a:spLocks noGrp="1"/>
+          </p:cNvSpPr>
+          <p:nvPr>
+            <p:ph type="title"/>
+          </p:nvPr>
+        </p:nvSpPr>
+        <p:spPr/>
+        <p:txBody>
+          <a:bodyPr/>
+          <a:lstStyle/>
+          <a:p>
+            <a:r>
+              <a:rPr lang="de-DE" dirty="0" err="1"/>
+              <a:t>Grid</a:t>
+            </a:r>
+            <a:r>
+              <a:rPr lang="de-DE" dirty="0"/>
+              <a:t>: Container Properties</a:t>
+            </a:r>
+          </a:p>
+        </p:txBody>
+      </p:sp>
+      <p:pic>
+        <p:nvPicPr>
+          <p:cNvPr id="9" name="Inhaltsplatzhalter 8">
+            <a:extLst>
+              <a:ext uri="{FF2B5EF4-FFF2-40B4-BE49-F238E27FC236}">
+                <a16:creationId xmlns:a16="http://schemas.microsoft.com/office/drawing/2014/main" id="{C644C42D-72EF-2A48-816F-36D82961D15D}"/>
+              </a:ext>
+            </a:extLst>
+          </p:cNvPr>
+          <p:cNvPicPr>
+            <a:picLocks noGrp="1" noChangeAspect="1"/>
+          </p:cNvPicPr>
+          <p:nvPr>
+            <p:ph idx="1"/>
+          </p:nvPr>
+        </p:nvPicPr>
+        <p:blipFill>
+          <a:blip r:embed="rId2"/>
+          <a:stretch>
+            <a:fillRect/>
+          </a:stretch>
+        </p:blipFill>
+        <p:spPr>
+          <a:xfrm>
+            <a:off x="889798" y="3389272"/>
+            <a:ext cx="6592171" cy="2916163"/>
+          </a:xfrm>
+        </p:spPr>
+      </p:pic>
+      <p:sp>
+        <p:nvSpPr>
+          <p:cNvPr id="10" name="Rechteck 9">
+            <a:extLst>
+              <a:ext uri="{FF2B5EF4-FFF2-40B4-BE49-F238E27FC236}">
+                <a16:creationId xmlns:a16="http://schemas.microsoft.com/office/drawing/2014/main" id="{5C1814EE-CFB9-BA40-8AAF-2BE7E486CDD9}"/>
+              </a:ext>
+            </a:extLst>
+          </p:cNvPr>
+          <p:cNvSpPr/>
+          <p:nvPr/>
+        </p:nvSpPr>
+        <p:spPr>
+          <a:xfrm>
+            <a:off x="889798" y="2281276"/>
+            <a:ext cx="4172937" cy="369332"/>
+          </a:xfrm>
+          <a:prstGeom prst="rect">
+            <a:avLst/>
+          </a:prstGeom>
+        </p:spPr>
+        <p:txBody>
+          <a:bodyPr wrap="none">
+            <a:spAutoFit/>
+          </a:bodyPr>
+          <a:lstStyle/>
+          <a:p>
+            <a:r>
+              <a:rPr lang="de-CH" dirty="0" err="1">
+                <a:latin typeface="Arial" panose="020B0604020202020204" pitchFamily="34" charset="0"/>
+                <a:cs typeface="Arial" panose="020B0604020202020204" pitchFamily="34" charset="0"/>
+              </a:rPr>
+              <a:t>grid</a:t>
+            </a:r>
+            <a:r>
+              <a:rPr lang="de-CH" dirty="0">
+                <a:latin typeface="Arial" panose="020B0604020202020204" pitchFamily="34" charset="0"/>
+                <a:cs typeface="Arial" panose="020B0604020202020204" pitchFamily="34" charset="0"/>
+              </a:rPr>
+              <a:t>-template-</a:t>
+            </a:r>
+            <a:r>
+              <a:rPr lang="de-CH" dirty="0" err="1">
+                <a:latin typeface="Arial" panose="020B0604020202020204" pitchFamily="34" charset="0"/>
+                <a:cs typeface="Arial" panose="020B0604020202020204" pitchFamily="34" charset="0"/>
+              </a:rPr>
+              <a:t>columns</a:t>
+            </a:r>
+            <a:r>
+              <a:rPr lang="de-CH" dirty="0">
+                <a:latin typeface="Arial" panose="020B0604020202020204" pitchFamily="34" charset="0"/>
+                <a:cs typeface="Arial" panose="020B0604020202020204" pitchFamily="34" charset="0"/>
+              </a:rPr>
+              <a:t>: 20% 60% 20%;</a:t>
+            </a:r>
+            <a:endParaRPr lang="de-DE" dirty="0"/>
+          </a:p>
+        </p:txBody>
+      </p:sp>
+      <p:sp>
+        <p:nvSpPr>
+          <p:cNvPr id="11" name="Rechteck 10">
+            <a:extLst>
+              <a:ext uri="{FF2B5EF4-FFF2-40B4-BE49-F238E27FC236}">
+                <a16:creationId xmlns:a16="http://schemas.microsoft.com/office/drawing/2014/main" id="{E743F98C-590F-2345-AA1A-E117AC7E1BAF}"/>
+              </a:ext>
+            </a:extLst>
+          </p:cNvPr>
+          <p:cNvSpPr/>
+          <p:nvPr/>
+        </p:nvSpPr>
+        <p:spPr>
+          <a:xfrm>
+            <a:off x="889798" y="2650608"/>
+            <a:ext cx="6096000" cy="369332"/>
+          </a:xfrm>
+          <a:prstGeom prst="rect">
+            <a:avLst/>
+          </a:prstGeom>
+        </p:spPr>
+        <p:txBody>
+          <a:bodyPr>
+            <a:spAutoFit/>
+          </a:bodyPr>
+          <a:lstStyle/>
+          <a:p>
+            <a:r>
+              <a:rPr lang="de-CH" dirty="0" err="1">
+                <a:latin typeface="Arial" panose="020B0604020202020204" pitchFamily="34" charset="0"/>
+                <a:cs typeface="Arial" panose="020B0604020202020204" pitchFamily="34" charset="0"/>
+              </a:rPr>
+              <a:t>grid</a:t>
+            </a:r>
+            <a:r>
+              <a:rPr lang="de-CH" dirty="0">
+                <a:latin typeface="Arial" panose="020B0604020202020204" pitchFamily="34" charset="0"/>
+                <a:cs typeface="Arial" panose="020B0604020202020204" pitchFamily="34" charset="0"/>
+              </a:rPr>
+              <a:t>-template-</a:t>
+            </a:r>
+            <a:r>
+              <a:rPr lang="de-CH" dirty="0" err="1">
+                <a:latin typeface="Arial" panose="020B0604020202020204" pitchFamily="34" charset="0"/>
+                <a:cs typeface="Arial" panose="020B0604020202020204" pitchFamily="34" charset="0"/>
+              </a:rPr>
+              <a:t>rows</a:t>
+            </a:r>
+            <a:r>
+              <a:rPr lang="de-CH" dirty="0">
+                <a:latin typeface="Arial" panose="020B0604020202020204" pitchFamily="34" charset="0"/>
+                <a:cs typeface="Arial" panose="020B0604020202020204" pitchFamily="34" charset="0"/>
+              </a:rPr>
+              <a:t>: 100px </a:t>
+            </a:r>
+            <a:r>
+              <a:rPr lang="de-CH" dirty="0" err="1">
+                <a:latin typeface="Arial" panose="020B0604020202020204" pitchFamily="34" charset="0"/>
+                <a:cs typeface="Arial" panose="020B0604020202020204" pitchFamily="34" charset="0"/>
+              </a:rPr>
+              <a:t>auto</a:t>
+            </a:r>
+            <a:r>
+              <a:rPr lang="de-CH" dirty="0">
+                <a:latin typeface="Arial" panose="020B0604020202020204" pitchFamily="34" charset="0"/>
+                <a:cs typeface="Arial" panose="020B0604020202020204" pitchFamily="34" charset="0"/>
+              </a:rPr>
+              <a:t> 100px;</a:t>
+            </a:r>
+            <a:endParaRPr lang="de-DE" dirty="0"/>
+          </a:p>
+        </p:txBody>
+      </p:sp>
+    </p:spTree>
+    <p:extLst>
+      <p:ext uri="{BB962C8B-B14F-4D97-AF65-F5344CB8AC3E}">
+        <p14:creationId xmlns:p14="http://schemas.microsoft.com/office/powerpoint/2010/main" val="3096845263"/>
+      </p:ext>
+    </p:extLst>
+  </p:cSld>
+  <p:clrMapOvr>
+    <a:masterClrMapping/>
+  </p:clrMapOvr>
+</p:sld>
+</file>
+
+<file path=ppt/slides/slide102.xml><?xml version="1.0" encoding="utf-8"?>
+<p:sld xmlns:a="http://schemas.openxmlformats.org/drawingml/2006/main" xmlns:r="http://schemas.openxmlformats.org/officeDocument/2006/relationships" xmlns:p="http://schemas.openxmlformats.org/presentationml/2006/main">
+  <p:cSld>
+    <p:spTree>
+      <p:nvGrpSpPr>
+        <p:cNvPr id="1" name=""/>
+        <p:cNvGrpSpPr/>
+        <p:nvPr/>
+      </p:nvGrpSpPr>
+      <p:grpSpPr>
+        <a:xfrm>
+          <a:off x="0" y="0"/>
+          <a:ext cx="0" cy="0"/>
+          <a:chOff x="0" y="0"/>
+          <a:chExt cx="0" cy="0"/>
+        </a:xfrm>
+      </p:grpSpPr>
+      <p:sp>
+        <p:nvSpPr>
+          <p:cNvPr id="2" name="Titel 1">
+            <a:extLst>
+              <a:ext uri="{FF2B5EF4-FFF2-40B4-BE49-F238E27FC236}">
+                <a16:creationId xmlns:a16="http://schemas.microsoft.com/office/drawing/2014/main" id="{42A5B1AA-ADEF-F348-A0E4-381E0CA6525F}"/>
+              </a:ext>
+            </a:extLst>
+          </p:cNvPr>
+          <p:cNvSpPr>
+            <a:spLocks noGrp="1"/>
+          </p:cNvSpPr>
+          <p:nvPr>
+            <p:ph type="title"/>
+          </p:nvPr>
+        </p:nvSpPr>
+        <p:spPr/>
+        <p:txBody>
+          <a:bodyPr/>
+          <a:lstStyle/>
+          <a:p>
+            <a:r>
+              <a:rPr lang="de-DE" dirty="0" err="1"/>
+              <a:t>Grid</a:t>
+            </a:r>
+            <a:r>
+              <a:rPr lang="de-DE" dirty="0"/>
+              <a:t>: Container Properties</a:t>
+            </a:r>
+          </a:p>
+        </p:txBody>
+      </p:sp>
+      <p:pic>
+        <p:nvPicPr>
+          <p:cNvPr id="5" name="Inhaltsplatzhalter 4">
+            <a:extLst>
+              <a:ext uri="{FF2B5EF4-FFF2-40B4-BE49-F238E27FC236}">
+                <a16:creationId xmlns:a16="http://schemas.microsoft.com/office/drawing/2014/main" id="{09F627C6-0BE4-2145-A7D3-7F54CD309458}"/>
+              </a:ext>
+            </a:extLst>
+          </p:cNvPr>
+          <p:cNvPicPr>
+            <a:picLocks noGrp="1" noChangeAspect="1"/>
+          </p:cNvPicPr>
+          <p:nvPr>
+            <p:ph idx="1"/>
+          </p:nvPr>
+        </p:nvPicPr>
+        <p:blipFill>
+          <a:blip r:embed="rId2"/>
+          <a:stretch>
+            <a:fillRect/>
+          </a:stretch>
+        </p:blipFill>
+        <p:spPr>
+          <a:xfrm>
+            <a:off x="680321" y="3343910"/>
+            <a:ext cx="7013709" cy="3022600"/>
+          </a:xfrm>
+        </p:spPr>
+      </p:pic>
+      <p:sp>
+        <p:nvSpPr>
+          <p:cNvPr id="6" name="Rechteck 5">
+            <a:extLst>
+              <a:ext uri="{FF2B5EF4-FFF2-40B4-BE49-F238E27FC236}">
+                <a16:creationId xmlns:a16="http://schemas.microsoft.com/office/drawing/2014/main" id="{1EEC8D5E-3E9D-3E4E-B228-D0BB3D94818B}"/>
+              </a:ext>
+            </a:extLst>
+          </p:cNvPr>
+          <p:cNvSpPr/>
+          <p:nvPr/>
+        </p:nvSpPr>
+        <p:spPr>
+          <a:xfrm>
+            <a:off x="680321" y="2317165"/>
+            <a:ext cx="6873240" cy="369332"/>
+          </a:xfrm>
+          <a:prstGeom prst="rect">
+            <a:avLst/>
+          </a:prstGeom>
+        </p:spPr>
+        <p:txBody>
+          <a:bodyPr wrap="square">
+            <a:spAutoFit/>
+          </a:bodyPr>
+          <a:lstStyle/>
+          <a:p>
+            <a:r>
+              <a:rPr lang="de-CH" dirty="0" err="1">
+                <a:latin typeface="Arial" panose="020B0604020202020204" pitchFamily="34" charset="0"/>
+                <a:cs typeface="Arial" panose="020B0604020202020204" pitchFamily="34" charset="0"/>
+              </a:rPr>
+              <a:t>grid</a:t>
+            </a:r>
+            <a:r>
+              <a:rPr lang="de-CH" dirty="0">
+                <a:latin typeface="Arial" panose="020B0604020202020204" pitchFamily="34" charset="0"/>
+                <a:cs typeface="Arial" panose="020B0604020202020204" pitchFamily="34" charset="0"/>
+              </a:rPr>
+              <a:t>-template-</a:t>
+            </a:r>
+            <a:r>
+              <a:rPr lang="de-CH" dirty="0" err="1">
+                <a:latin typeface="Arial" panose="020B0604020202020204" pitchFamily="34" charset="0"/>
+                <a:cs typeface="Arial" panose="020B0604020202020204" pitchFamily="34" charset="0"/>
+              </a:rPr>
+              <a:t>columns</a:t>
+            </a:r>
+            <a:r>
+              <a:rPr lang="de-CH" dirty="0">
+                <a:latin typeface="Arial" panose="020B0604020202020204" pitchFamily="34" charset="0"/>
+                <a:cs typeface="Arial" panose="020B0604020202020204" pitchFamily="34" charset="0"/>
+              </a:rPr>
+              <a:t>: [eins] 20% [zwei] 60% [drei] 20% [vier];</a:t>
+            </a:r>
+            <a:endParaRPr lang="de-DE" dirty="0"/>
+          </a:p>
+        </p:txBody>
+      </p:sp>
+      <p:sp>
+        <p:nvSpPr>
+          <p:cNvPr id="7" name="Rechteck 6">
+            <a:extLst>
+              <a:ext uri="{FF2B5EF4-FFF2-40B4-BE49-F238E27FC236}">
+                <a16:creationId xmlns:a16="http://schemas.microsoft.com/office/drawing/2014/main" id="{DEBF59EC-59FB-C14F-A76E-FCF584425CF1}"/>
+              </a:ext>
+            </a:extLst>
+          </p:cNvPr>
+          <p:cNvSpPr/>
+          <p:nvPr/>
+        </p:nvSpPr>
+        <p:spPr>
+          <a:xfrm>
+            <a:off x="680321" y="2686497"/>
+            <a:ext cx="7044690" cy="369332"/>
+          </a:xfrm>
+          <a:prstGeom prst="rect">
+            <a:avLst/>
+          </a:prstGeom>
+        </p:spPr>
+        <p:txBody>
+          <a:bodyPr wrap="square">
+            <a:spAutoFit/>
+          </a:bodyPr>
+          <a:lstStyle/>
+          <a:p>
+            <a:r>
+              <a:rPr lang="de-CH" dirty="0" err="1">
+                <a:latin typeface="Arial" panose="020B0604020202020204" pitchFamily="34" charset="0"/>
+                <a:cs typeface="Arial" panose="020B0604020202020204" pitchFamily="34" charset="0"/>
+              </a:rPr>
+              <a:t>grid</a:t>
+            </a:r>
+            <a:r>
+              <a:rPr lang="de-CH" dirty="0">
+                <a:latin typeface="Arial" panose="020B0604020202020204" pitchFamily="34" charset="0"/>
+                <a:cs typeface="Arial" panose="020B0604020202020204" pitchFamily="34" charset="0"/>
+              </a:rPr>
+              <a:t>-template-</a:t>
+            </a:r>
+            <a:r>
+              <a:rPr lang="de-CH" dirty="0" err="1">
+                <a:latin typeface="Arial" panose="020B0604020202020204" pitchFamily="34" charset="0"/>
+                <a:cs typeface="Arial" panose="020B0604020202020204" pitchFamily="34" charset="0"/>
+              </a:rPr>
+              <a:t>rows</a:t>
+            </a:r>
+            <a:r>
+              <a:rPr lang="de-CH" dirty="0">
+                <a:latin typeface="Arial" panose="020B0604020202020204" pitchFamily="34" charset="0"/>
+                <a:cs typeface="Arial" panose="020B0604020202020204" pitchFamily="34" charset="0"/>
+              </a:rPr>
+              <a:t>: [row1] 100px [row2] </a:t>
+            </a:r>
+            <a:r>
+              <a:rPr lang="de-CH" dirty="0" err="1">
+                <a:latin typeface="Arial" panose="020B0604020202020204" pitchFamily="34" charset="0"/>
+                <a:cs typeface="Arial" panose="020B0604020202020204" pitchFamily="34" charset="0"/>
+              </a:rPr>
+              <a:t>auto</a:t>
+            </a:r>
+            <a:r>
+              <a:rPr lang="de-CH" dirty="0">
+                <a:latin typeface="Arial" panose="020B0604020202020204" pitchFamily="34" charset="0"/>
+                <a:cs typeface="Arial" panose="020B0604020202020204" pitchFamily="34" charset="0"/>
+              </a:rPr>
+              <a:t> [row3] 100px [ende];</a:t>
+            </a:r>
+            <a:endParaRPr lang="de-DE" dirty="0"/>
+          </a:p>
+        </p:txBody>
+      </p:sp>
+    </p:spTree>
+    <p:extLst>
+      <p:ext uri="{BB962C8B-B14F-4D97-AF65-F5344CB8AC3E}">
+        <p14:creationId xmlns:p14="http://schemas.microsoft.com/office/powerpoint/2010/main" val="1020404966"/>
+      </p:ext>
+    </p:extLst>
+  </p:cSld>
+  <p:clrMapOvr>
+    <a:masterClrMapping/>
+  </p:clrMapOvr>
+</p:sld>
+</file>
+
+<file path=ppt/slides/slide103.xml><?xml version="1.0" encoding="utf-8"?>
+<p:sld xmlns:a="http://schemas.openxmlformats.org/drawingml/2006/main" xmlns:r="http://schemas.openxmlformats.org/officeDocument/2006/relationships" xmlns:p="http://schemas.openxmlformats.org/presentationml/2006/main">
+  <p:cSld>
+    <p:spTree>
+      <p:nvGrpSpPr>
+        <p:cNvPr id="1" name=""/>
+        <p:cNvGrpSpPr/>
+        <p:nvPr/>
+      </p:nvGrpSpPr>
+      <p:grpSpPr>
+        <a:xfrm>
+          <a:off x="0" y="0"/>
+          <a:ext cx="0" cy="0"/>
+          <a:chOff x="0" y="0"/>
+          <a:chExt cx="0" cy="0"/>
+        </a:xfrm>
+      </p:grpSpPr>
+      <p:sp>
+        <p:nvSpPr>
+          <p:cNvPr id="2" name="Titel 1">
+            <a:extLst>
+              <a:ext uri="{FF2B5EF4-FFF2-40B4-BE49-F238E27FC236}">
                 <a16:creationId xmlns:a16="http://schemas.microsoft.com/office/drawing/2014/main" id="{D519ED13-21BE-A54C-A031-AD61373B520E}"/>
               </a:ext>
             </a:extLst>
@@ -9482,7 +10040,7 @@
 </p:sld>
 </file>
 
-<file path=ppt/slides/slide102.xml><?xml version="1.0" encoding="utf-8"?>
+<file path=ppt/slides/slide104.xml><?xml version="1.0" encoding="utf-8"?>
 <p:sld xmlns:a="http://schemas.openxmlformats.org/drawingml/2006/main" xmlns:r="http://schemas.openxmlformats.org/officeDocument/2006/relationships" xmlns:p="http://schemas.openxmlformats.org/presentationml/2006/main">
   <p:cSld>
     <p:spTree>
@@ -9853,7 +10411,7 @@
 </p:sld>
 </file>
 
-<file path=ppt/slides/slide103.xml><?xml version="1.0" encoding="utf-8"?>
+<file path=ppt/slides/slide105.xml><?xml version="1.0" encoding="utf-8"?>
 <p:sld xmlns:a="http://schemas.openxmlformats.org/drawingml/2006/main" xmlns:r="http://schemas.openxmlformats.org/officeDocument/2006/relationships" xmlns:p="http://schemas.openxmlformats.org/presentationml/2006/main">
   <p:cSld>
     <p:spTree>
@@ -10058,7 +10616,7 @@
 </p:sld>
 </file>
 
-<file path=ppt/slides/slide104.xml><?xml version="1.0" encoding="utf-8"?>
+<file path=ppt/slides/slide106.xml><?xml version="1.0" encoding="utf-8"?>
 <p:sld xmlns:a="http://schemas.openxmlformats.org/drawingml/2006/main" xmlns:r="http://schemas.openxmlformats.org/officeDocument/2006/relationships" xmlns:p="http://schemas.openxmlformats.org/presentationml/2006/main">
   <p:cSld>
     <p:spTree>
@@ -10758,166 +11316,6 @@
 </p:sld>
 </file>
 
-<file path=ppt/slides/slide105.xml><?xml version="1.0" encoding="utf-8"?>
-<p:sld xmlns:a="http://schemas.openxmlformats.org/drawingml/2006/main" xmlns:r="http://schemas.openxmlformats.org/officeDocument/2006/relationships" xmlns:p="http://schemas.openxmlformats.org/presentationml/2006/main">
-  <p:cSld>
-    <p:spTree>
-      <p:nvGrpSpPr>
-        <p:cNvPr id="1" name=""/>
-        <p:cNvGrpSpPr/>
-        <p:nvPr/>
-      </p:nvGrpSpPr>
-      <p:grpSpPr>
-        <a:xfrm>
-          <a:off x="0" y="0"/>
-          <a:ext cx="0" cy="0"/>
-          <a:chOff x="0" y="0"/>
-          <a:chExt cx="0" cy="0"/>
-        </a:xfrm>
-      </p:grpSpPr>
-      <p:sp>
-        <p:nvSpPr>
-          <p:cNvPr id="2" name="Titel 1">
-            <a:extLst>
-              <a:ext uri="{FF2B5EF4-FFF2-40B4-BE49-F238E27FC236}">
-                <a16:creationId xmlns:a16="http://schemas.microsoft.com/office/drawing/2014/main" id="{AF291B26-8D81-6E41-9D56-468BA39AAAEB}"/>
-              </a:ext>
-            </a:extLst>
-          </p:cNvPr>
-          <p:cNvSpPr>
-            <a:spLocks noGrp="1"/>
-          </p:cNvSpPr>
-          <p:nvPr>
-            <p:ph type="title"/>
-          </p:nvPr>
-        </p:nvSpPr>
-        <p:spPr/>
-        <p:txBody>
-          <a:bodyPr/>
-          <a:lstStyle/>
-          <a:p>
-            <a:endParaRPr lang="de-DE"/>
-          </a:p>
-        </p:txBody>
-      </p:sp>
-      <p:sp>
-        <p:nvSpPr>
-          <p:cNvPr id="3" name="Inhaltsplatzhalter 2">
-            <a:extLst>
-              <a:ext uri="{FF2B5EF4-FFF2-40B4-BE49-F238E27FC236}">
-                <a16:creationId xmlns:a16="http://schemas.microsoft.com/office/drawing/2014/main" id="{4D3977DA-9BC2-944B-B95C-E22F84E99A06}"/>
-              </a:ext>
-            </a:extLst>
-          </p:cNvPr>
-          <p:cNvSpPr>
-            <a:spLocks noGrp="1"/>
-          </p:cNvSpPr>
-          <p:nvPr>
-            <p:ph idx="1"/>
-          </p:nvPr>
-        </p:nvSpPr>
-        <p:spPr/>
-        <p:txBody>
-          <a:bodyPr/>
-          <a:lstStyle/>
-          <a:p>
-            <a:endParaRPr lang="de-DE"/>
-          </a:p>
-        </p:txBody>
-      </p:sp>
-    </p:spTree>
-    <p:extLst>
-      <p:ext uri="{BB962C8B-B14F-4D97-AF65-F5344CB8AC3E}">
-        <p14:creationId xmlns:p14="http://schemas.microsoft.com/office/powerpoint/2010/main" val="3059955227"/>
-      </p:ext>
-    </p:extLst>
-  </p:cSld>
-  <p:clrMapOvr>
-    <a:masterClrMapping/>
-  </p:clrMapOvr>
-</p:sld>
-</file>
-
-<file path=ppt/slides/slide106.xml><?xml version="1.0" encoding="utf-8"?>
-<p:sld xmlns:a="http://schemas.openxmlformats.org/drawingml/2006/main" xmlns:r="http://schemas.openxmlformats.org/officeDocument/2006/relationships" xmlns:p="http://schemas.openxmlformats.org/presentationml/2006/main">
-  <p:cSld>
-    <p:spTree>
-      <p:nvGrpSpPr>
-        <p:cNvPr id="1" name=""/>
-        <p:cNvGrpSpPr/>
-        <p:nvPr/>
-      </p:nvGrpSpPr>
-      <p:grpSpPr>
-        <a:xfrm>
-          <a:off x="0" y="0"/>
-          <a:ext cx="0" cy="0"/>
-          <a:chOff x="0" y="0"/>
-          <a:chExt cx="0" cy="0"/>
-        </a:xfrm>
-      </p:grpSpPr>
-      <p:sp>
-        <p:nvSpPr>
-          <p:cNvPr id="2" name="Titel 1">
-            <a:extLst>
-              <a:ext uri="{FF2B5EF4-FFF2-40B4-BE49-F238E27FC236}">
-                <a16:creationId xmlns:a16="http://schemas.microsoft.com/office/drawing/2014/main" id="{0CC467E0-2B4E-D94E-9545-469513B5DF9C}"/>
-              </a:ext>
-            </a:extLst>
-          </p:cNvPr>
-          <p:cNvSpPr>
-            <a:spLocks noGrp="1"/>
-          </p:cNvSpPr>
-          <p:nvPr>
-            <p:ph type="title"/>
-          </p:nvPr>
-        </p:nvSpPr>
-        <p:spPr/>
-        <p:txBody>
-          <a:bodyPr/>
-          <a:lstStyle/>
-          <a:p>
-            <a:endParaRPr lang="de-DE"/>
-          </a:p>
-        </p:txBody>
-      </p:sp>
-      <p:sp>
-        <p:nvSpPr>
-          <p:cNvPr id="3" name="Inhaltsplatzhalter 2">
-            <a:extLst>
-              <a:ext uri="{FF2B5EF4-FFF2-40B4-BE49-F238E27FC236}">
-                <a16:creationId xmlns:a16="http://schemas.microsoft.com/office/drawing/2014/main" id="{51424325-0549-D545-B91C-5496B67B995F}"/>
-              </a:ext>
-            </a:extLst>
-          </p:cNvPr>
-          <p:cNvSpPr>
-            <a:spLocks noGrp="1"/>
-          </p:cNvSpPr>
-          <p:nvPr>
-            <p:ph idx="1"/>
-          </p:nvPr>
-        </p:nvSpPr>
-        <p:spPr/>
-        <p:txBody>
-          <a:bodyPr/>
-          <a:lstStyle/>
-          <a:p>
-            <a:endParaRPr lang="de-DE"/>
-          </a:p>
-        </p:txBody>
-      </p:sp>
-    </p:spTree>
-    <p:extLst>
-      <p:ext uri="{BB962C8B-B14F-4D97-AF65-F5344CB8AC3E}">
-        <p14:creationId xmlns:p14="http://schemas.microsoft.com/office/powerpoint/2010/main" val="4282559993"/>
-      </p:ext>
-    </p:extLst>
-  </p:cSld>
-  <p:clrMapOvr>
-    <a:masterClrMapping/>
-  </p:clrMapOvr>
-</p:sld>
-</file>
-
 <file path=ppt/slides/slide107.xml><?xml version="1.0" encoding="utf-8"?>
 <p:sld xmlns:a="http://schemas.openxmlformats.org/drawingml/2006/main" xmlns:r="http://schemas.openxmlformats.org/officeDocument/2006/relationships" xmlns:p="http://schemas.openxmlformats.org/presentationml/2006/main">
   <p:cSld>
@@ -10937,6 +11335,166 @@
       </p:grpSpPr>
       <p:sp>
         <p:nvSpPr>
+          <p:cNvPr id="2" name="Titel 1">
+            <a:extLst>
+              <a:ext uri="{FF2B5EF4-FFF2-40B4-BE49-F238E27FC236}">
+                <a16:creationId xmlns:a16="http://schemas.microsoft.com/office/drawing/2014/main" id="{AF291B26-8D81-6E41-9D56-468BA39AAAEB}"/>
+              </a:ext>
+            </a:extLst>
+          </p:cNvPr>
+          <p:cNvSpPr>
+            <a:spLocks noGrp="1"/>
+          </p:cNvSpPr>
+          <p:nvPr>
+            <p:ph type="title"/>
+          </p:nvPr>
+        </p:nvSpPr>
+        <p:spPr/>
+        <p:txBody>
+          <a:bodyPr/>
+          <a:lstStyle/>
+          <a:p>
+            <a:endParaRPr lang="de-DE"/>
+          </a:p>
+        </p:txBody>
+      </p:sp>
+      <p:sp>
+        <p:nvSpPr>
+          <p:cNvPr id="3" name="Inhaltsplatzhalter 2">
+            <a:extLst>
+              <a:ext uri="{FF2B5EF4-FFF2-40B4-BE49-F238E27FC236}">
+                <a16:creationId xmlns:a16="http://schemas.microsoft.com/office/drawing/2014/main" id="{4D3977DA-9BC2-944B-B95C-E22F84E99A06}"/>
+              </a:ext>
+            </a:extLst>
+          </p:cNvPr>
+          <p:cNvSpPr>
+            <a:spLocks noGrp="1"/>
+          </p:cNvSpPr>
+          <p:nvPr>
+            <p:ph idx="1"/>
+          </p:nvPr>
+        </p:nvSpPr>
+        <p:spPr/>
+        <p:txBody>
+          <a:bodyPr/>
+          <a:lstStyle/>
+          <a:p>
+            <a:endParaRPr lang="de-DE"/>
+          </a:p>
+        </p:txBody>
+      </p:sp>
+    </p:spTree>
+    <p:extLst>
+      <p:ext uri="{BB962C8B-B14F-4D97-AF65-F5344CB8AC3E}">
+        <p14:creationId xmlns:p14="http://schemas.microsoft.com/office/powerpoint/2010/main" val="3059955227"/>
+      </p:ext>
+    </p:extLst>
+  </p:cSld>
+  <p:clrMapOvr>
+    <a:masterClrMapping/>
+  </p:clrMapOvr>
+</p:sld>
+</file>
+
+<file path=ppt/slides/slide108.xml><?xml version="1.0" encoding="utf-8"?>
+<p:sld xmlns:a="http://schemas.openxmlformats.org/drawingml/2006/main" xmlns:r="http://schemas.openxmlformats.org/officeDocument/2006/relationships" xmlns:p="http://schemas.openxmlformats.org/presentationml/2006/main">
+  <p:cSld>
+    <p:spTree>
+      <p:nvGrpSpPr>
+        <p:cNvPr id="1" name=""/>
+        <p:cNvGrpSpPr/>
+        <p:nvPr/>
+      </p:nvGrpSpPr>
+      <p:grpSpPr>
+        <a:xfrm>
+          <a:off x="0" y="0"/>
+          <a:ext cx="0" cy="0"/>
+          <a:chOff x="0" y="0"/>
+          <a:chExt cx="0" cy="0"/>
+        </a:xfrm>
+      </p:grpSpPr>
+      <p:sp>
+        <p:nvSpPr>
+          <p:cNvPr id="2" name="Titel 1">
+            <a:extLst>
+              <a:ext uri="{FF2B5EF4-FFF2-40B4-BE49-F238E27FC236}">
+                <a16:creationId xmlns:a16="http://schemas.microsoft.com/office/drawing/2014/main" id="{0CC467E0-2B4E-D94E-9545-469513B5DF9C}"/>
+              </a:ext>
+            </a:extLst>
+          </p:cNvPr>
+          <p:cNvSpPr>
+            <a:spLocks noGrp="1"/>
+          </p:cNvSpPr>
+          <p:nvPr>
+            <p:ph type="title"/>
+          </p:nvPr>
+        </p:nvSpPr>
+        <p:spPr/>
+        <p:txBody>
+          <a:bodyPr/>
+          <a:lstStyle/>
+          <a:p>
+            <a:endParaRPr lang="de-DE"/>
+          </a:p>
+        </p:txBody>
+      </p:sp>
+      <p:sp>
+        <p:nvSpPr>
+          <p:cNvPr id="3" name="Inhaltsplatzhalter 2">
+            <a:extLst>
+              <a:ext uri="{FF2B5EF4-FFF2-40B4-BE49-F238E27FC236}">
+                <a16:creationId xmlns:a16="http://schemas.microsoft.com/office/drawing/2014/main" id="{51424325-0549-D545-B91C-5496B67B995F}"/>
+              </a:ext>
+            </a:extLst>
+          </p:cNvPr>
+          <p:cNvSpPr>
+            <a:spLocks noGrp="1"/>
+          </p:cNvSpPr>
+          <p:nvPr>
+            <p:ph idx="1"/>
+          </p:nvPr>
+        </p:nvSpPr>
+        <p:spPr/>
+        <p:txBody>
+          <a:bodyPr/>
+          <a:lstStyle/>
+          <a:p>
+            <a:endParaRPr lang="de-DE"/>
+          </a:p>
+        </p:txBody>
+      </p:sp>
+    </p:spTree>
+    <p:extLst>
+      <p:ext uri="{BB962C8B-B14F-4D97-AF65-F5344CB8AC3E}">
+        <p14:creationId xmlns:p14="http://schemas.microsoft.com/office/powerpoint/2010/main" val="4282559993"/>
+      </p:ext>
+    </p:extLst>
+  </p:cSld>
+  <p:clrMapOvr>
+    <a:masterClrMapping/>
+  </p:clrMapOvr>
+</p:sld>
+</file>
+
+<file path=ppt/slides/slide109.xml><?xml version="1.0" encoding="utf-8"?>
+<p:sld xmlns:a="http://schemas.openxmlformats.org/drawingml/2006/main" xmlns:r="http://schemas.openxmlformats.org/officeDocument/2006/relationships" xmlns:p="http://schemas.openxmlformats.org/presentationml/2006/main">
+  <p:cSld>
+    <p:spTree>
+      <p:nvGrpSpPr>
+        <p:cNvPr id="1" name=""/>
+        <p:cNvGrpSpPr/>
+        <p:nvPr/>
+      </p:nvGrpSpPr>
+      <p:grpSpPr>
+        <a:xfrm>
+          <a:off x="0" y="0"/>
+          <a:ext cx="0" cy="0"/>
+          <a:chOff x="0" y="0"/>
+          <a:chExt cx="0" cy="0"/>
+        </a:xfrm>
+      </p:grpSpPr>
+      <p:sp>
+        <p:nvSpPr>
           <p:cNvPr id="2" name="Title 1">
             <a:extLst>
               <a:ext uri="{FF2B5EF4-FFF2-40B4-BE49-F238E27FC236}">
@@ -11026,7 +11584,94 @@
 </p:sld>
 </file>
 
-<file path=ppt/slides/slide108.xml><?xml version="1.0" encoding="utf-8"?>
+<file path=ppt/slides/slide11.xml><?xml version="1.0" encoding="utf-8"?>
+<p:sld xmlns:a="http://schemas.openxmlformats.org/drawingml/2006/main" xmlns:r="http://schemas.openxmlformats.org/officeDocument/2006/relationships" xmlns:p="http://schemas.openxmlformats.org/presentationml/2006/main">
+  <p:cSld>
+    <p:spTree>
+      <p:nvGrpSpPr>
+        <p:cNvPr id="1" name=""/>
+        <p:cNvGrpSpPr/>
+        <p:nvPr/>
+      </p:nvGrpSpPr>
+      <p:grpSpPr>
+        <a:xfrm>
+          <a:off x="0" y="0"/>
+          <a:ext cx="0" cy="0"/>
+          <a:chOff x="0" y="0"/>
+          <a:chExt cx="0" cy="0"/>
+        </a:xfrm>
+      </p:grpSpPr>
+      <p:sp>
+        <p:nvSpPr>
+          <p:cNvPr id="2" name="Title 1">
+            <a:extLst>
+              <a:ext uri="{FF2B5EF4-FFF2-40B4-BE49-F238E27FC236}">
+                <a16:creationId xmlns:a16="http://schemas.microsoft.com/office/drawing/2014/main" id="{D4842EE6-90FE-4D4F-8FD5-8BF05E56109F}"/>
+              </a:ext>
+            </a:extLst>
+          </p:cNvPr>
+          <p:cNvSpPr>
+            <a:spLocks noGrp="1"/>
+          </p:cNvSpPr>
+          <p:nvPr>
+            <p:ph type="title"/>
+          </p:nvPr>
+        </p:nvSpPr>
+        <p:spPr/>
+        <p:txBody>
+          <a:bodyPr/>
+          <a:lstStyle/>
+          <a:p>
+            <a:r>
+              <a:rPr lang="en-US" dirty="0"/>
+              <a:t>DOM</a:t>
+            </a:r>
+          </a:p>
+        </p:txBody>
+      </p:sp>
+      <p:pic>
+        <p:nvPicPr>
+          <p:cNvPr id="5" name="Content Placeholder 4">
+            <a:extLst>
+              <a:ext uri="{FF2B5EF4-FFF2-40B4-BE49-F238E27FC236}">
+                <a16:creationId xmlns:a16="http://schemas.microsoft.com/office/drawing/2014/main" id="{578B15D8-F54D-294D-9CF9-5CCCA0E3553F}"/>
+              </a:ext>
+            </a:extLst>
+          </p:cNvPr>
+          <p:cNvPicPr>
+            <a:picLocks noGrp="1" noChangeAspect="1"/>
+          </p:cNvPicPr>
+          <p:nvPr>
+            <p:ph idx="1"/>
+          </p:nvPr>
+        </p:nvPicPr>
+        <p:blipFill>
+          <a:blip r:embed="rId2"/>
+          <a:stretch>
+            <a:fillRect/>
+          </a:stretch>
+        </p:blipFill>
+        <p:spPr>
+          <a:xfrm>
+            <a:off x="2921596" y="2116083"/>
+            <a:ext cx="6348807" cy="4370462"/>
+          </a:xfrm>
+        </p:spPr>
+      </p:pic>
+    </p:spTree>
+    <p:extLst>
+      <p:ext uri="{BB962C8B-B14F-4D97-AF65-F5344CB8AC3E}">
+        <p14:creationId xmlns:p14="http://schemas.microsoft.com/office/powerpoint/2010/main" val="777804555"/>
+      </p:ext>
+    </p:extLst>
+  </p:cSld>
+  <p:clrMapOvr>
+    <a:masterClrMapping/>
+  </p:clrMapOvr>
+</p:sld>
+</file>
+
+<file path=ppt/slides/slide110.xml><?xml version="1.0" encoding="utf-8"?>
 <p:sld xmlns:a="http://schemas.openxmlformats.org/drawingml/2006/main" xmlns:r="http://schemas.openxmlformats.org/officeDocument/2006/relationships" xmlns:p="http://schemas.openxmlformats.org/presentationml/2006/main">
   <p:cSld>
     <p:spTree>
@@ -11192,7 +11837,7 @@
 </p:sld>
 </file>
 
-<file path=ppt/slides/slide109.xml><?xml version="1.0" encoding="utf-8"?>
+<file path=ppt/slides/slide111.xml><?xml version="1.0" encoding="utf-8"?>
 <p:sld xmlns:a="http://schemas.openxmlformats.org/drawingml/2006/main" xmlns:r="http://schemas.openxmlformats.org/officeDocument/2006/relationships" xmlns:p="http://schemas.openxmlformats.org/presentationml/2006/main">
   <p:cSld>
     <p:spTree>
@@ -11311,93 +11956,6 @@
     <p:extLst>
       <p:ext uri="{BB962C8B-B14F-4D97-AF65-F5344CB8AC3E}">
         <p14:creationId xmlns:p14="http://schemas.microsoft.com/office/powerpoint/2010/main" val="2129769489"/>
-      </p:ext>
-    </p:extLst>
-  </p:cSld>
-  <p:clrMapOvr>
-    <a:masterClrMapping/>
-  </p:clrMapOvr>
-</p:sld>
-</file>
-
-<file path=ppt/slides/slide11.xml><?xml version="1.0" encoding="utf-8"?>
-<p:sld xmlns:a="http://schemas.openxmlformats.org/drawingml/2006/main" xmlns:r="http://schemas.openxmlformats.org/officeDocument/2006/relationships" xmlns:p="http://schemas.openxmlformats.org/presentationml/2006/main">
-  <p:cSld>
-    <p:spTree>
-      <p:nvGrpSpPr>
-        <p:cNvPr id="1" name=""/>
-        <p:cNvGrpSpPr/>
-        <p:nvPr/>
-      </p:nvGrpSpPr>
-      <p:grpSpPr>
-        <a:xfrm>
-          <a:off x="0" y="0"/>
-          <a:ext cx="0" cy="0"/>
-          <a:chOff x="0" y="0"/>
-          <a:chExt cx="0" cy="0"/>
-        </a:xfrm>
-      </p:grpSpPr>
-      <p:sp>
-        <p:nvSpPr>
-          <p:cNvPr id="2" name="Title 1">
-            <a:extLst>
-              <a:ext uri="{FF2B5EF4-FFF2-40B4-BE49-F238E27FC236}">
-                <a16:creationId xmlns:a16="http://schemas.microsoft.com/office/drawing/2014/main" id="{D4842EE6-90FE-4D4F-8FD5-8BF05E56109F}"/>
-              </a:ext>
-            </a:extLst>
-          </p:cNvPr>
-          <p:cNvSpPr>
-            <a:spLocks noGrp="1"/>
-          </p:cNvSpPr>
-          <p:nvPr>
-            <p:ph type="title"/>
-          </p:nvPr>
-        </p:nvSpPr>
-        <p:spPr/>
-        <p:txBody>
-          <a:bodyPr/>
-          <a:lstStyle/>
-          <a:p>
-            <a:r>
-              <a:rPr lang="en-US" dirty="0"/>
-              <a:t>DOM</a:t>
-            </a:r>
-          </a:p>
-        </p:txBody>
-      </p:sp>
-      <p:pic>
-        <p:nvPicPr>
-          <p:cNvPr id="5" name="Content Placeholder 4">
-            <a:extLst>
-              <a:ext uri="{FF2B5EF4-FFF2-40B4-BE49-F238E27FC236}">
-                <a16:creationId xmlns:a16="http://schemas.microsoft.com/office/drawing/2014/main" id="{578B15D8-F54D-294D-9CF9-5CCCA0E3553F}"/>
-              </a:ext>
-            </a:extLst>
-          </p:cNvPr>
-          <p:cNvPicPr>
-            <a:picLocks noGrp="1" noChangeAspect="1"/>
-          </p:cNvPicPr>
-          <p:nvPr>
-            <p:ph idx="1"/>
-          </p:nvPr>
-        </p:nvPicPr>
-        <p:blipFill>
-          <a:blip r:embed="rId2"/>
-          <a:stretch>
-            <a:fillRect/>
-          </a:stretch>
-        </p:blipFill>
-        <p:spPr>
-          <a:xfrm>
-            <a:off x="2921596" y="2116083"/>
-            <a:ext cx="6348807" cy="4370462"/>
-          </a:xfrm>
-        </p:spPr>
-      </p:pic>
-    </p:spTree>
-    <p:extLst>
-      <p:ext uri="{BB962C8B-B14F-4D97-AF65-F5344CB8AC3E}">
-        <p14:creationId xmlns:p14="http://schemas.microsoft.com/office/powerpoint/2010/main" val="777804555"/>
       </p:ext>
     </p:extLst>
   </p:cSld>
@@ -29336,6 +29894,253 @@
           <p:cNvPr id="2" name="Title 1">
             <a:extLst>
               <a:ext uri="{FF2B5EF4-FFF2-40B4-BE49-F238E27FC236}">
+                <a16:creationId xmlns:a16="http://schemas.microsoft.com/office/drawing/2014/main" id="{D5CB0FB0-D7D2-1242-AF44-2FE5F4D441DF}"/>
+              </a:ext>
+            </a:extLst>
+          </p:cNvPr>
+          <p:cNvSpPr>
+            <a:spLocks noGrp="1"/>
+          </p:cNvSpPr>
+          <p:nvPr>
+            <p:ph type="title"/>
+          </p:nvPr>
+        </p:nvSpPr>
+        <p:spPr/>
+        <p:txBody>
+          <a:bodyPr/>
+          <a:lstStyle/>
+          <a:p>
+            <a:r>
+              <a:rPr lang="en-US" dirty="0" err="1"/>
+              <a:t>Übung</a:t>
+            </a:r>
+            <a:endParaRPr lang="en-US" dirty="0"/>
+          </a:p>
+        </p:txBody>
+      </p:sp>
+      <p:sp>
+        <p:nvSpPr>
+          <p:cNvPr id="3" name="Content Placeholder 2">
+            <a:extLst>
+              <a:ext uri="{FF2B5EF4-FFF2-40B4-BE49-F238E27FC236}">
+                <a16:creationId xmlns:a16="http://schemas.microsoft.com/office/drawing/2014/main" id="{8E512378-F689-4B43-8D8C-5961C0830D92}"/>
+              </a:ext>
+            </a:extLst>
+          </p:cNvPr>
+          <p:cNvSpPr>
+            <a:spLocks noGrp="1"/>
+          </p:cNvSpPr>
+          <p:nvPr>
+            <p:ph idx="1"/>
+          </p:nvPr>
+        </p:nvSpPr>
+        <p:spPr/>
+        <p:txBody>
+          <a:bodyPr/>
+          <a:lstStyle/>
+          <a:p>
+            <a:r>
+              <a:rPr lang="en-US" dirty="0" err="1"/>
+              <a:t>Fixiere</a:t>
+            </a:r>
+            <a:r>
+              <a:rPr lang="en-US" dirty="0"/>
+              <a:t> den Header</a:t>
+            </a:r>
+          </a:p>
+        </p:txBody>
+      </p:sp>
+      <p:pic>
+        <p:nvPicPr>
+          <p:cNvPr id="4" name="Picture 3">
+            <a:extLst>
+              <a:ext uri="{FF2B5EF4-FFF2-40B4-BE49-F238E27FC236}">
+                <a16:creationId xmlns:a16="http://schemas.microsoft.com/office/drawing/2014/main" id="{2DE6B367-D731-194E-A9C3-1EE9B2ACFE99}"/>
+              </a:ext>
+            </a:extLst>
+          </p:cNvPr>
+          <p:cNvPicPr>
+            <a:picLocks noChangeAspect="1"/>
+          </p:cNvPicPr>
+          <p:nvPr/>
+        </p:nvPicPr>
+        <p:blipFill>
+          <a:blip r:embed="rId2"/>
+          <a:stretch>
+            <a:fillRect/>
+          </a:stretch>
+        </p:blipFill>
+        <p:spPr>
+          <a:xfrm>
+            <a:off x="2046881" y="2961066"/>
+            <a:ext cx="8098237" cy="3371511"/>
+          </a:xfrm>
+          <a:prstGeom prst="rect">
+            <a:avLst/>
+          </a:prstGeom>
+        </p:spPr>
+      </p:pic>
+    </p:spTree>
+    <p:extLst>
+      <p:ext uri="{BB962C8B-B14F-4D97-AF65-F5344CB8AC3E}">
+        <p14:creationId xmlns:p14="http://schemas.microsoft.com/office/powerpoint/2010/main" val="4144744613"/>
+      </p:ext>
+    </p:extLst>
+  </p:cSld>
+  <p:clrMapOvr>
+    <a:masterClrMapping/>
+  </p:clrMapOvr>
+</p:sld>
+</file>
+
+<file path=ppt/slides/slide86.xml><?xml version="1.0" encoding="utf-8"?>
+<p:sld xmlns:a="http://schemas.openxmlformats.org/drawingml/2006/main" xmlns:r="http://schemas.openxmlformats.org/officeDocument/2006/relationships" xmlns:p="http://schemas.openxmlformats.org/presentationml/2006/main">
+  <p:cSld>
+    <p:spTree>
+      <p:nvGrpSpPr>
+        <p:cNvPr id="1" name=""/>
+        <p:cNvGrpSpPr/>
+        <p:nvPr/>
+      </p:nvGrpSpPr>
+      <p:grpSpPr>
+        <a:xfrm>
+          <a:off x="0" y="0"/>
+          <a:ext cx="0" cy="0"/>
+          <a:chOff x="0" y="0"/>
+          <a:chExt cx="0" cy="0"/>
+        </a:xfrm>
+      </p:grpSpPr>
+      <p:sp>
+        <p:nvSpPr>
+          <p:cNvPr id="2" name="Title 1">
+            <a:extLst>
+              <a:ext uri="{FF2B5EF4-FFF2-40B4-BE49-F238E27FC236}">
+                <a16:creationId xmlns:a16="http://schemas.microsoft.com/office/drawing/2014/main" id="{6DE61EB9-9431-ED49-AE1D-C75F1F7FC588}"/>
+              </a:ext>
+            </a:extLst>
+          </p:cNvPr>
+          <p:cNvSpPr>
+            <a:spLocks noGrp="1"/>
+          </p:cNvSpPr>
+          <p:nvPr>
+            <p:ph type="title"/>
+          </p:nvPr>
+        </p:nvSpPr>
+        <p:spPr/>
+        <p:txBody>
+          <a:bodyPr/>
+          <a:lstStyle/>
+          <a:p>
+            <a:r>
+              <a:rPr lang="en-US" dirty="0" err="1"/>
+              <a:t>Übung</a:t>
+            </a:r>
+            <a:endParaRPr lang="en-US" dirty="0"/>
+          </a:p>
+        </p:txBody>
+      </p:sp>
+      <p:sp>
+        <p:nvSpPr>
+          <p:cNvPr id="3" name="Content Placeholder 2">
+            <a:extLst>
+              <a:ext uri="{FF2B5EF4-FFF2-40B4-BE49-F238E27FC236}">
+                <a16:creationId xmlns:a16="http://schemas.microsoft.com/office/drawing/2014/main" id="{1DEC266C-1D0F-3445-A3EA-E38F0F05201C}"/>
+              </a:ext>
+            </a:extLst>
+          </p:cNvPr>
+          <p:cNvSpPr>
+            <a:spLocks noGrp="1"/>
+          </p:cNvSpPr>
+          <p:nvPr>
+            <p:ph idx="1"/>
+          </p:nvPr>
+        </p:nvSpPr>
+        <p:spPr/>
+        <p:txBody>
+          <a:bodyPr/>
+          <a:lstStyle/>
+          <a:p>
+            <a:pPr marL="0" indent="0">
+              <a:buNone/>
+            </a:pPr>
+            <a:r>
+              <a:rPr lang="en-US" dirty="0"/>
+              <a:t>Sticky Footer</a:t>
+            </a:r>
+          </a:p>
+          <a:p>
+            <a:pPr marL="0" indent="0">
+              <a:buNone/>
+            </a:pPr>
+            <a:endParaRPr lang="en-US" dirty="0"/>
+          </a:p>
+        </p:txBody>
+      </p:sp>
+      <p:pic>
+        <p:nvPicPr>
+          <p:cNvPr id="5" name="Picture 4">
+            <a:extLst>
+              <a:ext uri="{FF2B5EF4-FFF2-40B4-BE49-F238E27FC236}">
+                <a16:creationId xmlns:a16="http://schemas.microsoft.com/office/drawing/2014/main" id="{FE2B2155-E13F-BD41-B8E8-C79D64F49438}"/>
+              </a:ext>
+            </a:extLst>
+          </p:cNvPr>
+          <p:cNvPicPr>
+            <a:picLocks noChangeAspect="1"/>
+          </p:cNvPicPr>
+          <p:nvPr/>
+        </p:nvPicPr>
+        <p:blipFill>
+          <a:blip r:embed="rId2"/>
+          <a:stretch>
+            <a:fillRect/>
+          </a:stretch>
+        </p:blipFill>
+        <p:spPr>
+          <a:xfrm>
+            <a:off x="3077403" y="2336873"/>
+            <a:ext cx="6037193" cy="4094489"/>
+          </a:xfrm>
+          <a:prstGeom prst="rect">
+            <a:avLst/>
+          </a:prstGeom>
+        </p:spPr>
+      </p:pic>
+    </p:spTree>
+    <p:extLst>
+      <p:ext uri="{BB962C8B-B14F-4D97-AF65-F5344CB8AC3E}">
+        <p14:creationId xmlns:p14="http://schemas.microsoft.com/office/powerpoint/2010/main" val="46457091"/>
+      </p:ext>
+    </p:extLst>
+  </p:cSld>
+  <p:clrMapOvr>
+    <a:masterClrMapping/>
+  </p:clrMapOvr>
+</p:sld>
+</file>
+
+<file path=ppt/slides/slide87.xml><?xml version="1.0" encoding="utf-8"?>
+<p:sld xmlns:a="http://schemas.openxmlformats.org/drawingml/2006/main" xmlns:r="http://schemas.openxmlformats.org/officeDocument/2006/relationships" xmlns:p="http://schemas.openxmlformats.org/presentationml/2006/main">
+  <p:cSld>
+    <p:spTree>
+      <p:nvGrpSpPr>
+        <p:cNvPr id="1" name=""/>
+        <p:cNvGrpSpPr/>
+        <p:nvPr/>
+      </p:nvGrpSpPr>
+      <p:grpSpPr>
+        <a:xfrm>
+          <a:off x="0" y="0"/>
+          <a:ext cx="0" cy="0"/>
+          <a:chOff x="0" y="0"/>
+          <a:chExt cx="0" cy="0"/>
+        </a:xfrm>
+      </p:grpSpPr>
+      <p:sp>
+        <p:nvSpPr>
+          <p:cNvPr id="2" name="Title 1">
+            <a:extLst>
+              <a:ext uri="{FF2B5EF4-FFF2-40B4-BE49-F238E27FC236}">
                 <a16:creationId xmlns:a16="http://schemas.microsoft.com/office/drawing/2014/main" id="{D5490CE8-8A1E-3042-991A-E735B45852F1}"/>
               </a:ext>
             </a:extLst>
@@ -29590,7 +30395,7 @@
 </p:sld>
 </file>
 
-<file path=ppt/slides/slide86.xml><?xml version="1.0" encoding="utf-8"?>
+<file path=ppt/slides/slide88.xml><?xml version="1.0" encoding="utf-8"?>
 <p:sld xmlns:a="http://schemas.openxmlformats.org/drawingml/2006/main" xmlns:r="http://schemas.openxmlformats.org/officeDocument/2006/relationships" xmlns:p="http://schemas.openxmlformats.org/presentationml/2006/main">
   <p:cSld>
     <p:spTree>
@@ -30032,668 +30837,6 @@
 </p:sld>
 </file>
 
-<file path=ppt/slides/slide87.xml><?xml version="1.0" encoding="utf-8"?>
-<p:sld xmlns:a="http://schemas.openxmlformats.org/drawingml/2006/main" xmlns:r="http://schemas.openxmlformats.org/officeDocument/2006/relationships" xmlns:p="http://schemas.openxmlformats.org/presentationml/2006/main">
-  <p:cSld>
-    <p:spTree>
-      <p:nvGrpSpPr>
-        <p:cNvPr id="1" name=""/>
-        <p:cNvGrpSpPr/>
-        <p:nvPr/>
-      </p:nvGrpSpPr>
-      <p:grpSpPr>
-        <a:xfrm>
-          <a:off x="0" y="0"/>
-          <a:ext cx="0" cy="0"/>
-          <a:chOff x="0" y="0"/>
-          <a:chExt cx="0" cy="0"/>
-        </a:xfrm>
-      </p:grpSpPr>
-      <p:sp>
-        <p:nvSpPr>
-          <p:cNvPr id="2" name="Title 1">
-            <a:extLst>
-              <a:ext uri="{FF2B5EF4-FFF2-40B4-BE49-F238E27FC236}">
-                <a16:creationId xmlns:a16="http://schemas.microsoft.com/office/drawing/2014/main" id="{E1B3D9A2-0FB8-0646-88C3-FE5D6AB11CFC}"/>
-              </a:ext>
-            </a:extLst>
-          </p:cNvPr>
-          <p:cNvSpPr>
-            <a:spLocks noGrp="1"/>
-          </p:cNvSpPr>
-          <p:nvPr>
-            <p:ph type="title"/>
-          </p:nvPr>
-        </p:nvSpPr>
-        <p:spPr/>
-        <p:txBody>
-          <a:bodyPr/>
-          <a:lstStyle/>
-          <a:p>
-            <a:r>
-              <a:rPr lang="en-US" dirty="0"/>
-              <a:t>Flexbox: Container Properties</a:t>
-            </a:r>
-          </a:p>
-        </p:txBody>
-      </p:sp>
-      <p:sp>
-        <p:nvSpPr>
-          <p:cNvPr id="3" name="Content Placeholder 2">
-            <a:extLst>
-              <a:ext uri="{FF2B5EF4-FFF2-40B4-BE49-F238E27FC236}">
-                <a16:creationId xmlns:a16="http://schemas.microsoft.com/office/drawing/2014/main" id="{4F332575-B5FE-144F-9D81-EBD8922382A8}"/>
-              </a:ext>
-            </a:extLst>
-          </p:cNvPr>
-          <p:cNvSpPr>
-            <a:spLocks noGrp="1"/>
-          </p:cNvSpPr>
-          <p:nvPr>
-            <p:ph idx="1"/>
-          </p:nvPr>
-        </p:nvSpPr>
-        <p:spPr/>
-        <p:txBody>
-          <a:bodyPr/>
-          <a:lstStyle/>
-          <a:p>
-            <a:r>
-              <a:rPr lang="en-US" dirty="0">
-                <a:solidFill>
-                  <a:schemeClr val="bg1"/>
-                </a:solidFill>
-              </a:rPr>
-              <a:t>flex-wrap</a:t>
-            </a:r>
-            <a:r>
-              <a:rPr lang="en-US" dirty="0"/>
-              <a:t>: </a:t>
-            </a:r>
-            <a:r>
-              <a:rPr lang="en-US" dirty="0" err="1"/>
-              <a:t>versucht</a:t>
-            </a:r>
-            <a:r>
-              <a:rPr lang="en-US" dirty="0"/>
-              <a:t> </a:t>
-            </a:r>
-            <a:r>
-              <a:rPr lang="en-US" dirty="0" err="1"/>
-              <a:t>alle</a:t>
-            </a:r>
-            <a:r>
-              <a:rPr lang="en-US" dirty="0"/>
-              <a:t> Items in </a:t>
-            </a:r>
-            <a:r>
-              <a:rPr lang="en-US" dirty="0" err="1"/>
-              <a:t>eine</a:t>
-            </a:r>
-            <a:r>
-              <a:rPr lang="en-US" dirty="0"/>
-              <a:t> </a:t>
-            </a:r>
-            <a:r>
-              <a:rPr lang="en-US" dirty="0" err="1"/>
-              <a:t>Zeile</a:t>
-            </a:r>
-            <a:r>
-              <a:rPr lang="en-US" dirty="0"/>
-              <a:t> </a:t>
-            </a:r>
-            <a:r>
-              <a:rPr lang="en-US" dirty="0" err="1"/>
-              <a:t>zu</a:t>
-            </a:r>
-            <a:r>
-              <a:rPr lang="en-US" dirty="0"/>
-              <a:t> </a:t>
-            </a:r>
-            <a:r>
-              <a:rPr lang="en-US" dirty="0" err="1"/>
-              <a:t>packen</a:t>
-            </a:r>
-            <a:br>
-              <a:rPr lang="en-US" dirty="0"/>
-            </a:br>
-            <a:br>
-              <a:rPr lang="en-US" dirty="0"/>
-            </a:br>
-            <a:r>
-              <a:rPr lang="en-US" dirty="0"/>
-              <a:t>flex-wrap: </a:t>
-            </a:r>
-            <a:r>
-              <a:rPr lang="en-US" dirty="0" err="1"/>
-              <a:t>nowrap</a:t>
-            </a:r>
-            <a:r>
-              <a:rPr lang="en-US" dirty="0"/>
-              <a:t> | wrap | wrap-reverse</a:t>
-            </a:r>
-            <a:br>
-              <a:rPr lang="en-US" dirty="0"/>
-            </a:br>
-            <a:br>
-              <a:rPr lang="en-US" dirty="0"/>
-            </a:br>
-            <a:endParaRPr lang="en-US" dirty="0"/>
-          </a:p>
-          <a:p>
-            <a:r>
-              <a:rPr lang="en-US" dirty="0">
-                <a:solidFill>
-                  <a:schemeClr val="bg1"/>
-                </a:solidFill>
-              </a:rPr>
-              <a:t>flex-flow</a:t>
-            </a:r>
-            <a:r>
-              <a:rPr lang="en-US" dirty="0"/>
-              <a:t>:</a:t>
-            </a:r>
-            <a:r>
-              <a:rPr lang="en-US" b="1" dirty="0"/>
-              <a:t> </a:t>
-            </a:r>
-            <a:r>
-              <a:rPr lang="en-US" dirty="0" err="1"/>
-              <a:t>ist</a:t>
-            </a:r>
-            <a:r>
-              <a:rPr lang="en-US" dirty="0"/>
-              <a:t> </a:t>
-            </a:r>
-            <a:r>
-              <a:rPr lang="en-US" dirty="0" err="1"/>
-              <a:t>ein</a:t>
-            </a:r>
-            <a:r>
-              <a:rPr lang="en-US" dirty="0"/>
-              <a:t> shorthand </a:t>
-            </a:r>
-            <a:r>
-              <a:rPr lang="en-US" dirty="0" err="1"/>
-              <a:t>für</a:t>
-            </a:r>
-            <a:r>
-              <a:rPr lang="en-US" dirty="0"/>
-              <a:t> flex-direction und flex-wrap</a:t>
-            </a:r>
-            <a:br>
-              <a:rPr lang="en-US" dirty="0"/>
-            </a:br>
-            <a:br>
-              <a:rPr lang="en-US" dirty="0"/>
-            </a:br>
-            <a:r>
-              <a:rPr lang="en-US" dirty="0"/>
-              <a:t>flex-flow: row </a:t>
-            </a:r>
-            <a:r>
-              <a:rPr lang="en-US" dirty="0" err="1"/>
-              <a:t>nowrap</a:t>
-            </a:r>
-            <a:endParaRPr lang="en-US" dirty="0"/>
-          </a:p>
-        </p:txBody>
-      </p:sp>
-    </p:spTree>
-    <p:extLst>
-      <p:ext uri="{BB962C8B-B14F-4D97-AF65-F5344CB8AC3E}">
-        <p14:creationId xmlns:p14="http://schemas.microsoft.com/office/powerpoint/2010/main" val="1777042083"/>
-      </p:ext>
-    </p:extLst>
-  </p:cSld>
-  <p:clrMapOvr>
-    <a:masterClrMapping/>
-  </p:clrMapOvr>
-</p:sld>
-</file>
-
-<file path=ppt/slides/slide88.xml><?xml version="1.0" encoding="utf-8"?>
-<p:sld xmlns:a="http://schemas.openxmlformats.org/drawingml/2006/main" xmlns:r="http://schemas.openxmlformats.org/officeDocument/2006/relationships" xmlns:p="http://schemas.openxmlformats.org/presentationml/2006/main">
-  <p:cSld>
-    <p:spTree>
-      <p:nvGrpSpPr>
-        <p:cNvPr id="1" name=""/>
-        <p:cNvGrpSpPr/>
-        <p:nvPr/>
-      </p:nvGrpSpPr>
-      <p:grpSpPr>
-        <a:xfrm>
-          <a:off x="0" y="0"/>
-          <a:ext cx="0" cy="0"/>
-          <a:chOff x="0" y="0"/>
-          <a:chExt cx="0" cy="0"/>
-        </a:xfrm>
-      </p:grpSpPr>
-      <p:sp>
-        <p:nvSpPr>
-          <p:cNvPr id="2" name="Title 1">
-            <a:extLst>
-              <a:ext uri="{FF2B5EF4-FFF2-40B4-BE49-F238E27FC236}">
-                <a16:creationId xmlns:a16="http://schemas.microsoft.com/office/drawing/2014/main" id="{2B2CD961-5709-C241-A54E-238F4D05CD7C}"/>
-              </a:ext>
-            </a:extLst>
-          </p:cNvPr>
-          <p:cNvSpPr>
-            <a:spLocks noGrp="1"/>
-          </p:cNvSpPr>
-          <p:nvPr>
-            <p:ph type="title"/>
-          </p:nvPr>
-        </p:nvSpPr>
-        <p:spPr>
-          <a:xfrm>
-            <a:off x="680321" y="753228"/>
-            <a:ext cx="9613861" cy="1080938"/>
-          </a:xfrm>
-        </p:spPr>
-        <p:txBody>
-          <a:bodyPr/>
-          <a:lstStyle/>
-          <a:p>
-            <a:r>
-              <a:rPr lang="en-US" dirty="0"/>
-              <a:t>Flexbox: Container Properties</a:t>
-            </a:r>
-          </a:p>
-        </p:txBody>
-      </p:sp>
-      <p:sp>
-        <p:nvSpPr>
-          <p:cNvPr id="3" name="Content Placeholder 2">
-            <a:extLst>
-              <a:ext uri="{FF2B5EF4-FFF2-40B4-BE49-F238E27FC236}">
-                <a16:creationId xmlns:a16="http://schemas.microsoft.com/office/drawing/2014/main" id="{A3D67316-99A5-E94E-A390-438B2046BAF7}"/>
-              </a:ext>
-            </a:extLst>
-          </p:cNvPr>
-          <p:cNvSpPr>
-            <a:spLocks noGrp="1"/>
-          </p:cNvSpPr>
-          <p:nvPr>
-            <p:ph idx="1"/>
-          </p:nvPr>
-        </p:nvSpPr>
-        <p:spPr/>
-        <p:txBody>
-          <a:bodyPr>
-            <a:normAutofit fontScale="92500" lnSpcReduction="10000"/>
-          </a:bodyPr>
-          <a:lstStyle/>
-          <a:p>
-            <a:r>
-              <a:rPr lang="en-US" dirty="0">
-                <a:solidFill>
-                  <a:schemeClr val="bg1"/>
-                </a:solidFill>
-              </a:rPr>
-              <a:t>justify-content</a:t>
-            </a:r>
-            <a:r>
-              <a:rPr lang="en-US" dirty="0"/>
-              <a:t>: </a:t>
-            </a:r>
-            <a:r>
-              <a:rPr lang="en-US" dirty="0" err="1"/>
-              <a:t>Wie</a:t>
-            </a:r>
-            <a:r>
-              <a:rPr lang="en-US" dirty="0"/>
-              <a:t> </a:t>
-            </a:r>
-            <a:r>
-              <a:rPr lang="en-US" dirty="0" err="1"/>
-              <a:t>wird</a:t>
-            </a:r>
-            <a:r>
-              <a:rPr lang="en-US" dirty="0"/>
-              <a:t> extra </a:t>
-            </a:r>
-            <a:r>
-              <a:rPr lang="en-US" dirty="0" err="1"/>
-              <a:t>freier</a:t>
-            </a:r>
-            <a:r>
-              <a:rPr lang="en-US" dirty="0"/>
-              <a:t> Platz </a:t>
-            </a:r>
-            <a:r>
-              <a:rPr lang="en-US" dirty="0" err="1"/>
-              <a:t>zwischen</a:t>
-            </a:r>
-            <a:r>
-              <a:rPr lang="en-US" dirty="0"/>
-              <a:t> den Items </a:t>
-            </a:r>
-            <a:r>
-              <a:rPr lang="en-US" dirty="0" err="1"/>
-              <a:t>entlang</a:t>
-            </a:r>
-            <a:r>
-              <a:rPr lang="en-US" dirty="0"/>
-              <a:t> der </a:t>
-            </a:r>
-            <a:r>
-              <a:rPr lang="en-US" b="1" dirty="0"/>
-              <a:t>main-axis</a:t>
-            </a:r>
-            <a:r>
-              <a:rPr lang="en-US" dirty="0"/>
-              <a:t> </a:t>
-            </a:r>
-            <a:r>
-              <a:rPr lang="en-US" dirty="0" err="1"/>
-              <a:t>verteilt</a:t>
-            </a:r>
-            <a:r>
-              <a:rPr lang="en-US" dirty="0"/>
-              <a:t>.</a:t>
-            </a:r>
-            <a:br>
-              <a:rPr lang="en-US" dirty="0"/>
-            </a:br>
-            <a:r>
-              <a:rPr lang="en-US" sz="1800" dirty="0">
-                <a:latin typeface="Arial" panose="020B0604020202020204" pitchFamily="34" charset="0"/>
-                <a:cs typeface="Arial" panose="020B0604020202020204" pitchFamily="34" charset="0"/>
-              </a:rPr>
-              <a:t>justify-content: flex-start | flex-end | center | space-between | space-around | space-evenly</a:t>
-            </a:r>
-            <a:br>
-              <a:rPr lang="en-US" b="1" dirty="0"/>
-            </a:br>
-            <a:endParaRPr lang="en-US" dirty="0"/>
-          </a:p>
-          <a:p>
-            <a:r>
-              <a:rPr lang="en-US" dirty="0">
-                <a:solidFill>
-                  <a:schemeClr val="bg1"/>
-                </a:solidFill>
-              </a:rPr>
-              <a:t>align-items</a:t>
-            </a:r>
-            <a:r>
-              <a:rPr lang="en-US" b="1" dirty="0"/>
-              <a:t>: </a:t>
-            </a:r>
-            <a:r>
-              <a:rPr lang="en-US" dirty="0" err="1"/>
-              <a:t>Wie</a:t>
-            </a:r>
-            <a:r>
-              <a:rPr lang="en-US" dirty="0"/>
-              <a:t> </a:t>
-            </a:r>
-            <a:r>
-              <a:rPr lang="en-US" dirty="0" err="1"/>
-              <a:t>wird</a:t>
-            </a:r>
-            <a:r>
-              <a:rPr lang="en-US" dirty="0"/>
-              <a:t> extra </a:t>
-            </a:r>
-            <a:r>
-              <a:rPr lang="en-US" dirty="0" err="1"/>
-              <a:t>freier</a:t>
-            </a:r>
-            <a:r>
-              <a:rPr lang="en-US" dirty="0"/>
-              <a:t> Platz </a:t>
-            </a:r>
-            <a:r>
-              <a:rPr lang="en-US" dirty="0" err="1"/>
-              <a:t>zwischen</a:t>
-            </a:r>
-            <a:r>
-              <a:rPr lang="en-US" dirty="0"/>
-              <a:t> den Items </a:t>
-            </a:r>
-            <a:r>
-              <a:rPr lang="en-US" dirty="0" err="1"/>
-              <a:t>entlang</a:t>
-            </a:r>
-            <a:r>
-              <a:rPr lang="en-US" dirty="0"/>
-              <a:t> der </a:t>
-            </a:r>
-            <a:r>
-              <a:rPr lang="en-US" b="1" dirty="0"/>
-              <a:t>cross-axis</a:t>
-            </a:r>
-            <a:r>
-              <a:rPr lang="en-US" dirty="0"/>
-              <a:t> </a:t>
-            </a:r>
-            <a:r>
-              <a:rPr lang="en-US" dirty="0" err="1"/>
-              <a:t>verteilt</a:t>
-            </a:r>
-            <a:r>
-              <a:rPr lang="en-US" dirty="0"/>
-              <a:t>.</a:t>
-            </a:r>
-            <a:br>
-              <a:rPr lang="en-US" b="1" dirty="0"/>
-            </a:br>
-            <a:r>
-              <a:rPr lang="en-US" sz="1800" dirty="0">
-                <a:latin typeface="Arial" panose="020B0604020202020204" pitchFamily="34" charset="0"/>
-                <a:cs typeface="Arial" panose="020B0604020202020204" pitchFamily="34" charset="0"/>
-              </a:rPr>
-              <a:t>align-items: stretch | flex-start | flex-end | center | baseline</a:t>
-            </a:r>
-            <a:br>
-              <a:rPr lang="en-US" sz="1800" dirty="0">
-                <a:latin typeface="Arial" panose="020B0604020202020204" pitchFamily="34" charset="0"/>
-                <a:cs typeface="Arial" panose="020B0604020202020204" pitchFamily="34" charset="0"/>
-              </a:rPr>
-            </a:br>
-            <a:endParaRPr lang="en-US" sz="1800" dirty="0">
-              <a:latin typeface="Arial" panose="020B0604020202020204" pitchFamily="34" charset="0"/>
-              <a:cs typeface="Arial" panose="020B0604020202020204" pitchFamily="34" charset="0"/>
-            </a:endParaRPr>
-          </a:p>
-          <a:p>
-            <a:r>
-              <a:rPr lang="en-US" dirty="0">
-                <a:solidFill>
-                  <a:schemeClr val="bg1"/>
-                </a:solidFill>
-              </a:rPr>
-              <a:t>align-content</a:t>
-            </a:r>
-            <a:r>
-              <a:rPr lang="en-US" b="1" dirty="0"/>
-              <a:t>: </a:t>
-            </a:r>
-            <a:r>
-              <a:rPr lang="en-US" dirty="0" err="1"/>
-              <a:t>Kommt</a:t>
-            </a:r>
-            <a:r>
-              <a:rPr lang="en-US" b="1" dirty="0"/>
-              <a:t> </a:t>
-            </a:r>
-            <a:r>
-              <a:rPr lang="en-US" dirty="0" err="1"/>
-              <a:t>nur</a:t>
-            </a:r>
-            <a:r>
-              <a:rPr lang="en-US" dirty="0"/>
-              <a:t> </a:t>
-            </a:r>
-            <a:r>
-              <a:rPr lang="en-US" dirty="0" err="1"/>
-              <a:t>zum</a:t>
-            </a:r>
-            <a:r>
-              <a:rPr lang="en-US" dirty="0"/>
-              <a:t> </a:t>
-            </a:r>
-            <a:r>
-              <a:rPr lang="en-US" dirty="0" err="1"/>
-              <a:t>tragen</a:t>
-            </a:r>
-            <a:r>
-              <a:rPr lang="en-US" dirty="0"/>
-              <a:t>, </a:t>
-            </a:r>
-            <a:r>
-              <a:rPr lang="en-US" dirty="0" err="1"/>
-              <a:t>wenn</a:t>
-            </a:r>
-            <a:r>
-              <a:rPr lang="en-US" dirty="0"/>
-              <a:t> </a:t>
-            </a:r>
-            <a:r>
-              <a:rPr lang="en-US" dirty="0" err="1"/>
-              <a:t>es</a:t>
-            </a:r>
-            <a:r>
-              <a:rPr lang="en-US" dirty="0"/>
-              <a:t> </a:t>
-            </a:r>
-            <a:r>
-              <a:rPr lang="en-US" dirty="0" err="1"/>
-              <a:t>mehr</a:t>
-            </a:r>
-            <a:r>
-              <a:rPr lang="en-US" dirty="0"/>
-              <a:t> </a:t>
-            </a:r>
-            <a:r>
-              <a:rPr lang="en-US" dirty="0" err="1"/>
-              <a:t>wie</a:t>
-            </a:r>
-            <a:r>
-              <a:rPr lang="en-US" dirty="0"/>
-              <a:t> </a:t>
-            </a:r>
-            <a:r>
-              <a:rPr lang="en-US" dirty="0" err="1"/>
-              <a:t>eine</a:t>
-            </a:r>
-            <a:r>
-              <a:rPr lang="en-US" dirty="0"/>
-              <a:t> </a:t>
-            </a:r>
-            <a:r>
-              <a:rPr lang="en-US" dirty="0" err="1"/>
-              <a:t>Zeile</a:t>
-            </a:r>
-            <a:r>
-              <a:rPr lang="en-US" dirty="0"/>
-              <a:t> Items hat. </a:t>
-            </a:r>
-            <a:r>
-              <a:rPr lang="en-US" dirty="0" err="1"/>
-              <a:t>Wie</a:t>
-            </a:r>
-            <a:r>
-              <a:rPr lang="en-US" dirty="0"/>
-              <a:t> </a:t>
-            </a:r>
-            <a:r>
-              <a:rPr lang="en-US" dirty="0" err="1"/>
-              <a:t>wird</a:t>
-            </a:r>
-            <a:r>
-              <a:rPr lang="en-US" dirty="0"/>
-              <a:t> extra </a:t>
-            </a:r>
-            <a:r>
-              <a:rPr lang="en-US" dirty="0" err="1"/>
-              <a:t>freier</a:t>
-            </a:r>
-            <a:r>
-              <a:rPr lang="en-US" dirty="0"/>
-              <a:t> Platz </a:t>
-            </a:r>
-            <a:r>
-              <a:rPr lang="en-US" dirty="0" err="1"/>
-              <a:t>entlang</a:t>
-            </a:r>
-            <a:r>
-              <a:rPr lang="en-US" dirty="0"/>
-              <a:t> der </a:t>
-            </a:r>
-            <a:r>
-              <a:rPr lang="en-US" b="1" dirty="0"/>
-              <a:t>cross-axis</a:t>
-            </a:r>
-            <a:r>
-              <a:rPr lang="en-US" dirty="0"/>
-              <a:t> </a:t>
-            </a:r>
-            <a:r>
-              <a:rPr lang="en-US" dirty="0" err="1"/>
-              <a:t>zwischen</a:t>
-            </a:r>
-            <a:r>
-              <a:rPr lang="en-US" dirty="0"/>
-              <a:t> den </a:t>
-            </a:r>
-            <a:r>
-              <a:rPr lang="en-US" dirty="0" err="1"/>
-              <a:t>Zeilen</a:t>
-            </a:r>
-            <a:r>
-              <a:rPr lang="en-US" dirty="0"/>
-              <a:t> </a:t>
-            </a:r>
-            <a:r>
-              <a:rPr lang="en-US" dirty="0" err="1"/>
-              <a:t>verteilt</a:t>
-            </a:r>
-            <a:r>
-              <a:rPr lang="en-US" dirty="0"/>
-              <a:t>.</a:t>
-            </a:r>
-            <a:br>
-              <a:rPr lang="en-US" b="1" dirty="0"/>
-            </a:br>
-            <a:r>
-              <a:rPr lang="en-US" sz="1800" dirty="0">
-                <a:latin typeface="Arial" panose="020B0604020202020204" pitchFamily="34" charset="0"/>
-                <a:cs typeface="Arial" panose="020B0604020202020204" pitchFamily="34" charset="0"/>
-              </a:rPr>
-              <a:t>align-content: stretch | flex-start | flex-end | center | space-between | space-around</a:t>
-            </a:r>
-            <a:br>
-              <a:rPr lang="en-US" sz="1800" b="1" dirty="0">
-                <a:latin typeface="Arial" panose="020B0604020202020204" pitchFamily="34" charset="0"/>
-                <a:cs typeface="Arial" panose="020B0604020202020204" pitchFamily="34" charset="0"/>
-              </a:rPr>
-            </a:br>
-            <a:endParaRPr lang="en-US" sz="1800" dirty="0">
-              <a:latin typeface="Arial" panose="020B0604020202020204" pitchFamily="34" charset="0"/>
-              <a:cs typeface="Arial" panose="020B0604020202020204" pitchFamily="34" charset="0"/>
-            </a:endParaRPr>
-          </a:p>
-          <a:p>
-            <a:endParaRPr lang="en-US" dirty="0"/>
-          </a:p>
-        </p:txBody>
-      </p:sp>
-    </p:spTree>
-    <p:extLst>
-      <p:ext uri="{BB962C8B-B14F-4D97-AF65-F5344CB8AC3E}">
-        <p14:creationId xmlns:p14="http://schemas.microsoft.com/office/powerpoint/2010/main" val="2970264264"/>
-      </p:ext>
-    </p:extLst>
-  </p:cSld>
-  <p:clrMapOvr>
-    <a:masterClrMapping/>
-  </p:clrMapOvr>
-</p:sld>
-</file>
-
 <file path=ppt/slides/slide89.xml><?xml version="1.0" encoding="utf-8"?>
 <p:sld xmlns:a="http://schemas.openxmlformats.org/drawingml/2006/main" xmlns:r="http://schemas.openxmlformats.org/officeDocument/2006/relationships" xmlns:p="http://schemas.openxmlformats.org/presentationml/2006/main">
   <p:cSld>
@@ -30716,7 +30859,7 @@
           <p:cNvPr id="2" name="Title 1">
             <a:extLst>
               <a:ext uri="{FF2B5EF4-FFF2-40B4-BE49-F238E27FC236}">
-                <a16:creationId xmlns:a16="http://schemas.microsoft.com/office/drawing/2014/main" id="{51E96799-DB13-104C-822A-E2CBCB6F4EA1}"/>
+                <a16:creationId xmlns:a16="http://schemas.microsoft.com/office/drawing/2014/main" id="{E1B3D9A2-0FB8-0646-88C3-FE5D6AB11CFC}"/>
               </a:ext>
             </a:extLst>
           </p:cNvPr>
@@ -30734,7 +30877,7 @@
           <a:p>
             <a:r>
               <a:rPr lang="en-US" dirty="0"/>
-              <a:t>Flexbox: Item Properties</a:t>
+              <a:t>Flexbox: Container Properties</a:t>
             </a:r>
           </a:p>
         </p:txBody>
@@ -30744,7 +30887,7 @@
           <p:cNvPr id="3" name="Content Placeholder 2">
             <a:extLst>
               <a:ext uri="{FF2B5EF4-FFF2-40B4-BE49-F238E27FC236}">
-                <a16:creationId xmlns:a16="http://schemas.microsoft.com/office/drawing/2014/main" id="{7619FD93-5A5D-2A40-BC02-1E1014F468FE}"/>
+                <a16:creationId xmlns:a16="http://schemas.microsoft.com/office/drawing/2014/main" id="{4F332575-B5FE-144F-9D81-EBD8922382A8}"/>
               </a:ext>
             </a:extLst>
           </p:cNvPr>
@@ -30757,9 +30900,7 @@
         </p:nvSpPr>
         <p:spPr/>
         <p:txBody>
-          <a:bodyPr>
-            <a:normAutofit/>
-          </a:bodyPr>
+          <a:bodyPr/>
           <a:lstStyle/>
           <a:p>
             <a:r>
@@ -30768,7 +30909,7 @@
                   <a:schemeClr val="bg1"/>
                 </a:solidFill>
               </a:rPr>
-              <a:t>order</a:t>
+              <a:t>flex-wrap</a:t>
             </a:r>
             <a:r>
               <a:rPr lang="en-US" dirty="0"/>
@@ -30776,23 +30917,23 @@
             </a:r>
             <a:r>
               <a:rPr lang="en-US" dirty="0" err="1"/>
-              <a:t>Bestimmt</a:t>
-            </a:r>
-            <a:r>
-              <a:rPr lang="en-US" dirty="0"/>
-              <a:t> die </a:t>
+              <a:t>versucht</a:t>
+            </a:r>
+            <a:r>
+              <a:rPr lang="en-US" dirty="0"/>
+              <a:t> </a:t>
             </a:r>
             <a:r>
               <a:rPr lang="en-US" dirty="0" err="1"/>
-              <a:t>Reihenfolge</a:t>
-            </a:r>
-            <a:r>
-              <a:rPr lang="en-US" dirty="0"/>
-              <a:t> der Items. Default </a:t>
+              <a:t>alle</a:t>
+            </a:r>
+            <a:r>
+              <a:rPr lang="en-US" dirty="0"/>
+              <a:t> Items in </a:t>
             </a:r>
             <a:r>
               <a:rPr lang="en-US" dirty="0" err="1"/>
-              <a:t>mässig</a:t>
+              <a:t>eine</a:t>
             </a:r>
             <a:r>
               <a:rPr lang="en-US" dirty="0"/>
@@ -30800,7 +30941,7 @@
             </a:r>
             <a:r>
               <a:rPr lang="en-US" dirty="0" err="1"/>
-              <a:t>ist</a:t>
+              <a:t>Zeile</a:t>
             </a:r>
             <a:r>
               <a:rPr lang="en-US" dirty="0"/>
@@ -30808,40 +30949,41 @@
             </a:r>
             <a:r>
               <a:rPr lang="en-US" dirty="0" err="1"/>
-              <a:t>bestimmt</a:t>
-            </a:r>
-            <a:r>
-              <a:rPr lang="en-US" dirty="0"/>
-              <a:t> das Markup die </a:t>
+              <a:t>zu</a:t>
+            </a:r>
+            <a:r>
+              <a:rPr lang="en-US" dirty="0"/>
+              <a:t> </a:t>
             </a:r>
             <a:r>
               <a:rPr lang="en-US" dirty="0" err="1"/>
-              <a:t>Reihenfolge</a:t>
-            </a:r>
-            <a:r>
-              <a:rPr lang="en-US" dirty="0"/>
-              <a:t>.</a:t>
+              <a:t>packen</a:t>
             </a:r>
             <a:br>
               <a:rPr lang="en-US" dirty="0"/>
             </a:br>
-            <a:r>
-              <a:rPr lang="en-US" sz="1900" dirty="0">
-                <a:latin typeface="Arial" panose="020B0604020202020204" pitchFamily="34" charset="0"/>
-                <a:cs typeface="Arial" panose="020B0604020202020204" pitchFamily="34" charset="0"/>
-              </a:rPr>
-              <a:t>order: 0</a:t>
-            </a:r>
             <a:br>
-              <a:rPr lang="en-US" sz="1900" b="1" dirty="0">
-                <a:latin typeface="Arial" panose="020B0604020202020204" pitchFamily="34" charset="0"/>
-                <a:cs typeface="Arial" panose="020B0604020202020204" pitchFamily="34" charset="0"/>
-              </a:rPr>
+              <a:rPr lang="en-US" dirty="0"/>
             </a:br>
-            <a:endParaRPr lang="en-US" sz="1900" dirty="0">
-              <a:latin typeface="Arial" panose="020B0604020202020204" pitchFamily="34" charset="0"/>
-              <a:cs typeface="Arial" panose="020B0604020202020204" pitchFamily="34" charset="0"/>
-            </a:endParaRPr>
+            <a:r>
+              <a:rPr lang="en-US" dirty="0"/>
+              <a:t>flex-wrap: </a:t>
+            </a:r>
+            <a:r>
+              <a:rPr lang="en-US" dirty="0" err="1"/>
+              <a:t>nowrap</a:t>
+            </a:r>
+            <a:r>
+              <a:rPr lang="en-US" dirty="0"/>
+              <a:t> | wrap | wrap-reverse</a:t>
+            </a:r>
+            <a:br>
+              <a:rPr lang="en-US" dirty="0"/>
+            </a:br>
+            <a:br>
+              <a:rPr lang="en-US" dirty="0"/>
+            </a:br>
+            <a:endParaRPr lang="en-US" dirty="0"/>
           </a:p>
           <a:p>
             <a:r>
@@ -30850,15 +30992,19 @@
                   <a:schemeClr val="bg1"/>
                 </a:solidFill>
               </a:rPr>
-              <a:t>align-self</a:t>
+              <a:t>flex-flow</a:t>
+            </a:r>
+            <a:r>
+              <a:rPr lang="en-US" dirty="0"/>
+              <a:t>:</a:t>
             </a:r>
             <a:r>
               <a:rPr lang="en-US" b="1" dirty="0"/>
-              <a:t>: </a:t>
+              <a:t> </a:t>
             </a:r>
             <a:r>
               <a:rPr lang="en-US" dirty="0" err="1"/>
-              <a:t>Damit</a:t>
+              <a:t>ist</a:t>
             </a:r>
             <a:r>
               <a:rPr lang="en-US" dirty="0"/>
@@ -30866,19 +31012,11 @@
             </a:r>
             <a:r>
               <a:rPr lang="en-US" dirty="0" err="1"/>
-              <a:t>kann</a:t>
-            </a:r>
-            <a:r>
-              <a:rPr lang="en-US" dirty="0"/>
-              <a:t> die </a:t>
-            </a:r>
-            <a:r>
-              <a:rPr lang="en-US" dirty="0" err="1"/>
-              <a:t>Eigenschaft</a:t>
-            </a:r>
-            <a:r>
-              <a:rPr lang="en-US" dirty="0"/>
-              <a:t> align-items </a:t>
+              <a:t>ein</a:t>
+            </a:r>
+            <a:r>
+              <a:rPr lang="en-US" dirty="0"/>
+              <a:t> shorthand </a:t>
             </a:r>
             <a:r>
               <a:rPr lang="en-US" dirty="0" err="1"/>
@@ -30886,67 +31024,30 @@
             </a:r>
             <a:r>
               <a:rPr lang="en-US" dirty="0"/>
-              <a:t> </a:t>
+              <a:t> flex-direction und flex-wrap</a:t>
+            </a:r>
+            <a:br>
+              <a:rPr lang="en-US" dirty="0"/>
+            </a:br>
+            <a:br>
+              <a:rPr lang="en-US" dirty="0"/>
+            </a:br>
+            <a:r>
+              <a:rPr lang="en-US" dirty="0"/>
+              <a:t>flex-flow: row </a:t>
             </a:r>
             <a:r>
               <a:rPr lang="en-US" dirty="0" err="1"/>
-              <a:t>ein</a:t>
-            </a:r>
-            <a:r>
-              <a:rPr lang="en-US" dirty="0"/>
-              <a:t> </a:t>
-            </a:r>
-            <a:r>
-              <a:rPr lang="en-US" dirty="0" err="1"/>
-              <a:t>einzelnes</a:t>
-            </a:r>
-            <a:r>
-              <a:rPr lang="en-US" dirty="0"/>
-              <a:t> Item </a:t>
-            </a:r>
-            <a:r>
-              <a:rPr lang="en-US" dirty="0" err="1"/>
-              <a:t>überschrieben</a:t>
-            </a:r>
-            <a:r>
-              <a:rPr lang="en-US" dirty="0"/>
-              <a:t> </a:t>
-            </a:r>
-            <a:r>
-              <a:rPr lang="en-US" dirty="0" err="1"/>
-              <a:t>werden</a:t>
-            </a:r>
-            <a:r>
-              <a:rPr lang="en-US" dirty="0"/>
-              <a:t>.</a:t>
-            </a:r>
-            <a:br>
-              <a:rPr lang="en-US" dirty="0"/>
-            </a:br>
-            <a:r>
-              <a:rPr lang="en-US" sz="1800" dirty="0">
-                <a:latin typeface="Arial" panose="020B0604020202020204" pitchFamily="34" charset="0"/>
-                <a:cs typeface="Arial" panose="020B0604020202020204" pitchFamily="34" charset="0"/>
-              </a:rPr>
-              <a:t>align-self: auto | flex-start | flex-end | center | baseline | stretch</a:t>
-            </a:r>
-            <a:br>
-              <a:rPr lang="en-US" sz="1800" dirty="0">
-                <a:latin typeface="Arial" panose="020B0604020202020204" pitchFamily="34" charset="0"/>
-                <a:cs typeface="Arial" panose="020B0604020202020204" pitchFamily="34" charset="0"/>
-              </a:rPr>
-            </a:br>
-            <a:endParaRPr lang="en-US" sz="1800" dirty="0">
-              <a:latin typeface="Arial" panose="020B0604020202020204" pitchFamily="34" charset="0"/>
-              <a:cs typeface="Arial" panose="020B0604020202020204" pitchFamily="34" charset="0"/>
-            </a:endParaRPr>
+              <a:t>nowrap</a:t>
+            </a:r>
+            <a:endParaRPr lang="en-US" dirty="0"/>
           </a:p>
         </p:txBody>
       </p:sp>
     </p:spTree>
     <p:extLst>
       <p:ext uri="{BB962C8B-B14F-4D97-AF65-F5344CB8AC3E}">
-        <p14:creationId xmlns:p14="http://schemas.microsoft.com/office/powerpoint/2010/main" val="417935865"/>
+        <p14:creationId xmlns:p14="http://schemas.microsoft.com/office/powerpoint/2010/main" val="1777042083"/>
       </p:ext>
     </p:extLst>
   </p:cSld>
@@ -31406,6 +31507,710 @@
 </file>
 
 <file path=ppt/slides/slide90.xml><?xml version="1.0" encoding="utf-8"?>
+<p:sld xmlns:a="http://schemas.openxmlformats.org/drawingml/2006/main" xmlns:r="http://schemas.openxmlformats.org/officeDocument/2006/relationships" xmlns:p="http://schemas.openxmlformats.org/presentationml/2006/main">
+  <p:cSld>
+    <p:spTree>
+      <p:nvGrpSpPr>
+        <p:cNvPr id="1" name=""/>
+        <p:cNvGrpSpPr/>
+        <p:nvPr/>
+      </p:nvGrpSpPr>
+      <p:grpSpPr>
+        <a:xfrm>
+          <a:off x="0" y="0"/>
+          <a:ext cx="0" cy="0"/>
+          <a:chOff x="0" y="0"/>
+          <a:chExt cx="0" cy="0"/>
+        </a:xfrm>
+      </p:grpSpPr>
+      <p:sp>
+        <p:nvSpPr>
+          <p:cNvPr id="2" name="Title 1">
+            <a:extLst>
+              <a:ext uri="{FF2B5EF4-FFF2-40B4-BE49-F238E27FC236}">
+                <a16:creationId xmlns:a16="http://schemas.microsoft.com/office/drawing/2014/main" id="{2B2CD961-5709-C241-A54E-238F4D05CD7C}"/>
+              </a:ext>
+            </a:extLst>
+          </p:cNvPr>
+          <p:cNvSpPr>
+            <a:spLocks noGrp="1"/>
+          </p:cNvSpPr>
+          <p:nvPr>
+            <p:ph type="title"/>
+          </p:nvPr>
+        </p:nvSpPr>
+        <p:spPr>
+          <a:xfrm>
+            <a:off x="680321" y="753228"/>
+            <a:ext cx="9613861" cy="1080938"/>
+          </a:xfrm>
+        </p:spPr>
+        <p:txBody>
+          <a:bodyPr/>
+          <a:lstStyle/>
+          <a:p>
+            <a:r>
+              <a:rPr lang="en-US" dirty="0"/>
+              <a:t>Flexbox: Container Properties</a:t>
+            </a:r>
+          </a:p>
+        </p:txBody>
+      </p:sp>
+      <p:sp>
+        <p:nvSpPr>
+          <p:cNvPr id="3" name="Content Placeholder 2">
+            <a:extLst>
+              <a:ext uri="{FF2B5EF4-FFF2-40B4-BE49-F238E27FC236}">
+                <a16:creationId xmlns:a16="http://schemas.microsoft.com/office/drawing/2014/main" id="{A3D67316-99A5-E94E-A390-438B2046BAF7}"/>
+              </a:ext>
+            </a:extLst>
+          </p:cNvPr>
+          <p:cNvSpPr>
+            <a:spLocks noGrp="1"/>
+          </p:cNvSpPr>
+          <p:nvPr>
+            <p:ph idx="1"/>
+          </p:nvPr>
+        </p:nvSpPr>
+        <p:spPr/>
+        <p:txBody>
+          <a:bodyPr>
+            <a:normAutofit fontScale="92500" lnSpcReduction="10000"/>
+          </a:bodyPr>
+          <a:lstStyle/>
+          <a:p>
+            <a:r>
+              <a:rPr lang="en-US" dirty="0">
+                <a:solidFill>
+                  <a:schemeClr val="bg1"/>
+                </a:solidFill>
+              </a:rPr>
+              <a:t>justify-content</a:t>
+            </a:r>
+            <a:r>
+              <a:rPr lang="en-US" dirty="0"/>
+              <a:t>: </a:t>
+            </a:r>
+            <a:r>
+              <a:rPr lang="en-US" dirty="0" err="1"/>
+              <a:t>Wie</a:t>
+            </a:r>
+            <a:r>
+              <a:rPr lang="en-US" dirty="0"/>
+              <a:t> </a:t>
+            </a:r>
+            <a:r>
+              <a:rPr lang="en-US" dirty="0" err="1"/>
+              <a:t>wird</a:t>
+            </a:r>
+            <a:r>
+              <a:rPr lang="en-US" dirty="0"/>
+              <a:t> extra </a:t>
+            </a:r>
+            <a:r>
+              <a:rPr lang="en-US" dirty="0" err="1"/>
+              <a:t>freier</a:t>
+            </a:r>
+            <a:r>
+              <a:rPr lang="en-US" dirty="0"/>
+              <a:t> Platz </a:t>
+            </a:r>
+            <a:r>
+              <a:rPr lang="en-US" dirty="0" err="1"/>
+              <a:t>zwischen</a:t>
+            </a:r>
+            <a:r>
+              <a:rPr lang="en-US" dirty="0"/>
+              <a:t> den Items </a:t>
+            </a:r>
+            <a:r>
+              <a:rPr lang="en-US" dirty="0" err="1"/>
+              <a:t>entlang</a:t>
+            </a:r>
+            <a:r>
+              <a:rPr lang="en-US" dirty="0"/>
+              <a:t> der </a:t>
+            </a:r>
+            <a:r>
+              <a:rPr lang="en-US" b="1" dirty="0"/>
+              <a:t>main-axis</a:t>
+            </a:r>
+            <a:r>
+              <a:rPr lang="en-US" dirty="0"/>
+              <a:t> </a:t>
+            </a:r>
+            <a:r>
+              <a:rPr lang="en-US" dirty="0" err="1"/>
+              <a:t>verteilt</a:t>
+            </a:r>
+            <a:r>
+              <a:rPr lang="en-US" dirty="0"/>
+              <a:t>.</a:t>
+            </a:r>
+            <a:br>
+              <a:rPr lang="en-US" dirty="0"/>
+            </a:br>
+            <a:r>
+              <a:rPr lang="en-US" sz="1800" dirty="0">
+                <a:latin typeface="Arial" panose="020B0604020202020204" pitchFamily="34" charset="0"/>
+                <a:cs typeface="Arial" panose="020B0604020202020204" pitchFamily="34" charset="0"/>
+              </a:rPr>
+              <a:t>justify-content: flex-start | flex-end | center | space-between | space-around | space-evenly</a:t>
+            </a:r>
+            <a:br>
+              <a:rPr lang="en-US" b="1" dirty="0"/>
+            </a:br>
+            <a:endParaRPr lang="en-US" dirty="0"/>
+          </a:p>
+          <a:p>
+            <a:r>
+              <a:rPr lang="en-US" dirty="0">
+                <a:solidFill>
+                  <a:schemeClr val="bg1"/>
+                </a:solidFill>
+              </a:rPr>
+              <a:t>align-items</a:t>
+            </a:r>
+            <a:r>
+              <a:rPr lang="en-US" b="1" dirty="0"/>
+              <a:t>: </a:t>
+            </a:r>
+            <a:r>
+              <a:rPr lang="en-US" dirty="0" err="1"/>
+              <a:t>Wie</a:t>
+            </a:r>
+            <a:r>
+              <a:rPr lang="en-US" dirty="0"/>
+              <a:t> </a:t>
+            </a:r>
+            <a:r>
+              <a:rPr lang="en-US" dirty="0" err="1"/>
+              <a:t>wird</a:t>
+            </a:r>
+            <a:r>
+              <a:rPr lang="en-US" dirty="0"/>
+              <a:t> extra </a:t>
+            </a:r>
+            <a:r>
+              <a:rPr lang="en-US" dirty="0" err="1"/>
+              <a:t>freier</a:t>
+            </a:r>
+            <a:r>
+              <a:rPr lang="en-US" dirty="0"/>
+              <a:t> Platz </a:t>
+            </a:r>
+            <a:r>
+              <a:rPr lang="en-US" dirty="0" err="1"/>
+              <a:t>zwischen</a:t>
+            </a:r>
+            <a:r>
+              <a:rPr lang="en-US" dirty="0"/>
+              <a:t> den Items </a:t>
+            </a:r>
+            <a:r>
+              <a:rPr lang="en-US" dirty="0" err="1"/>
+              <a:t>entlang</a:t>
+            </a:r>
+            <a:r>
+              <a:rPr lang="en-US" dirty="0"/>
+              <a:t> der </a:t>
+            </a:r>
+            <a:r>
+              <a:rPr lang="en-US" b="1" dirty="0"/>
+              <a:t>cross-axis</a:t>
+            </a:r>
+            <a:r>
+              <a:rPr lang="en-US" dirty="0"/>
+              <a:t> </a:t>
+            </a:r>
+            <a:r>
+              <a:rPr lang="en-US" dirty="0" err="1"/>
+              <a:t>verteilt</a:t>
+            </a:r>
+            <a:r>
+              <a:rPr lang="en-US" dirty="0"/>
+              <a:t>.</a:t>
+            </a:r>
+            <a:br>
+              <a:rPr lang="en-US" b="1" dirty="0"/>
+            </a:br>
+            <a:r>
+              <a:rPr lang="en-US" sz="1800" dirty="0">
+                <a:latin typeface="Arial" panose="020B0604020202020204" pitchFamily="34" charset="0"/>
+                <a:cs typeface="Arial" panose="020B0604020202020204" pitchFamily="34" charset="0"/>
+              </a:rPr>
+              <a:t>align-items: stretch | flex-start | flex-end | center | baseline</a:t>
+            </a:r>
+            <a:br>
+              <a:rPr lang="en-US" sz="1800" dirty="0">
+                <a:latin typeface="Arial" panose="020B0604020202020204" pitchFamily="34" charset="0"/>
+                <a:cs typeface="Arial" panose="020B0604020202020204" pitchFamily="34" charset="0"/>
+              </a:rPr>
+            </a:br>
+            <a:endParaRPr lang="en-US" sz="1800" dirty="0">
+              <a:latin typeface="Arial" panose="020B0604020202020204" pitchFamily="34" charset="0"/>
+              <a:cs typeface="Arial" panose="020B0604020202020204" pitchFamily="34" charset="0"/>
+            </a:endParaRPr>
+          </a:p>
+          <a:p>
+            <a:r>
+              <a:rPr lang="en-US" dirty="0">
+                <a:solidFill>
+                  <a:schemeClr val="bg1"/>
+                </a:solidFill>
+              </a:rPr>
+              <a:t>align-content</a:t>
+            </a:r>
+            <a:r>
+              <a:rPr lang="en-US" b="1" dirty="0"/>
+              <a:t>: </a:t>
+            </a:r>
+            <a:r>
+              <a:rPr lang="en-US" dirty="0" err="1"/>
+              <a:t>Kommt</a:t>
+            </a:r>
+            <a:r>
+              <a:rPr lang="en-US" b="1" dirty="0"/>
+              <a:t> </a:t>
+            </a:r>
+            <a:r>
+              <a:rPr lang="en-US" dirty="0" err="1"/>
+              <a:t>nur</a:t>
+            </a:r>
+            <a:r>
+              <a:rPr lang="en-US" dirty="0"/>
+              <a:t> </a:t>
+            </a:r>
+            <a:r>
+              <a:rPr lang="en-US" dirty="0" err="1"/>
+              <a:t>zum</a:t>
+            </a:r>
+            <a:r>
+              <a:rPr lang="en-US" dirty="0"/>
+              <a:t> </a:t>
+            </a:r>
+            <a:r>
+              <a:rPr lang="en-US" dirty="0" err="1"/>
+              <a:t>tragen</a:t>
+            </a:r>
+            <a:r>
+              <a:rPr lang="en-US" dirty="0"/>
+              <a:t>, </a:t>
+            </a:r>
+            <a:r>
+              <a:rPr lang="en-US" dirty="0" err="1"/>
+              <a:t>wenn</a:t>
+            </a:r>
+            <a:r>
+              <a:rPr lang="en-US" dirty="0"/>
+              <a:t> </a:t>
+            </a:r>
+            <a:r>
+              <a:rPr lang="en-US" dirty="0" err="1"/>
+              <a:t>es</a:t>
+            </a:r>
+            <a:r>
+              <a:rPr lang="en-US" dirty="0"/>
+              <a:t> </a:t>
+            </a:r>
+            <a:r>
+              <a:rPr lang="en-US" dirty="0" err="1"/>
+              <a:t>mehr</a:t>
+            </a:r>
+            <a:r>
+              <a:rPr lang="en-US" dirty="0"/>
+              <a:t> </a:t>
+            </a:r>
+            <a:r>
+              <a:rPr lang="en-US" dirty="0" err="1"/>
+              <a:t>wie</a:t>
+            </a:r>
+            <a:r>
+              <a:rPr lang="en-US" dirty="0"/>
+              <a:t> </a:t>
+            </a:r>
+            <a:r>
+              <a:rPr lang="en-US" dirty="0" err="1"/>
+              <a:t>eine</a:t>
+            </a:r>
+            <a:r>
+              <a:rPr lang="en-US" dirty="0"/>
+              <a:t> </a:t>
+            </a:r>
+            <a:r>
+              <a:rPr lang="en-US" dirty="0" err="1"/>
+              <a:t>Zeile</a:t>
+            </a:r>
+            <a:r>
+              <a:rPr lang="en-US" dirty="0"/>
+              <a:t> Items hat. </a:t>
+            </a:r>
+            <a:r>
+              <a:rPr lang="en-US" dirty="0" err="1"/>
+              <a:t>Wie</a:t>
+            </a:r>
+            <a:r>
+              <a:rPr lang="en-US" dirty="0"/>
+              <a:t> </a:t>
+            </a:r>
+            <a:r>
+              <a:rPr lang="en-US" dirty="0" err="1"/>
+              <a:t>wird</a:t>
+            </a:r>
+            <a:r>
+              <a:rPr lang="en-US" dirty="0"/>
+              <a:t> extra </a:t>
+            </a:r>
+            <a:r>
+              <a:rPr lang="en-US" dirty="0" err="1"/>
+              <a:t>freier</a:t>
+            </a:r>
+            <a:r>
+              <a:rPr lang="en-US" dirty="0"/>
+              <a:t> Platz </a:t>
+            </a:r>
+            <a:r>
+              <a:rPr lang="en-US" dirty="0" err="1"/>
+              <a:t>entlang</a:t>
+            </a:r>
+            <a:r>
+              <a:rPr lang="en-US" dirty="0"/>
+              <a:t> der </a:t>
+            </a:r>
+            <a:r>
+              <a:rPr lang="en-US" b="1" dirty="0"/>
+              <a:t>cross-axis</a:t>
+            </a:r>
+            <a:r>
+              <a:rPr lang="en-US" dirty="0"/>
+              <a:t> </a:t>
+            </a:r>
+            <a:r>
+              <a:rPr lang="en-US" dirty="0" err="1"/>
+              <a:t>zwischen</a:t>
+            </a:r>
+            <a:r>
+              <a:rPr lang="en-US" dirty="0"/>
+              <a:t> den </a:t>
+            </a:r>
+            <a:r>
+              <a:rPr lang="en-US" dirty="0" err="1"/>
+              <a:t>Zeilen</a:t>
+            </a:r>
+            <a:r>
+              <a:rPr lang="en-US" dirty="0"/>
+              <a:t> </a:t>
+            </a:r>
+            <a:r>
+              <a:rPr lang="en-US" dirty="0" err="1"/>
+              <a:t>verteilt</a:t>
+            </a:r>
+            <a:r>
+              <a:rPr lang="en-US" dirty="0"/>
+              <a:t>.</a:t>
+            </a:r>
+            <a:br>
+              <a:rPr lang="en-US" b="1" dirty="0"/>
+            </a:br>
+            <a:r>
+              <a:rPr lang="en-US" sz="1800" dirty="0">
+                <a:latin typeface="Arial" panose="020B0604020202020204" pitchFamily="34" charset="0"/>
+                <a:cs typeface="Arial" panose="020B0604020202020204" pitchFamily="34" charset="0"/>
+              </a:rPr>
+              <a:t>align-content: stretch | flex-start | flex-end | center | space-between | space-around</a:t>
+            </a:r>
+            <a:br>
+              <a:rPr lang="en-US" sz="1800" b="1" dirty="0">
+                <a:latin typeface="Arial" panose="020B0604020202020204" pitchFamily="34" charset="0"/>
+                <a:cs typeface="Arial" panose="020B0604020202020204" pitchFamily="34" charset="0"/>
+              </a:rPr>
+            </a:br>
+            <a:endParaRPr lang="en-US" sz="1800" dirty="0">
+              <a:latin typeface="Arial" panose="020B0604020202020204" pitchFamily="34" charset="0"/>
+              <a:cs typeface="Arial" panose="020B0604020202020204" pitchFamily="34" charset="0"/>
+            </a:endParaRPr>
+          </a:p>
+          <a:p>
+            <a:endParaRPr lang="en-US" dirty="0"/>
+          </a:p>
+        </p:txBody>
+      </p:sp>
+    </p:spTree>
+    <p:extLst>
+      <p:ext uri="{BB962C8B-B14F-4D97-AF65-F5344CB8AC3E}">
+        <p14:creationId xmlns:p14="http://schemas.microsoft.com/office/powerpoint/2010/main" val="2970264264"/>
+      </p:ext>
+    </p:extLst>
+  </p:cSld>
+  <p:clrMapOvr>
+    <a:masterClrMapping/>
+  </p:clrMapOvr>
+</p:sld>
+</file>
+
+<file path=ppt/slides/slide91.xml><?xml version="1.0" encoding="utf-8"?>
+<p:sld xmlns:a="http://schemas.openxmlformats.org/drawingml/2006/main" xmlns:r="http://schemas.openxmlformats.org/officeDocument/2006/relationships" xmlns:p="http://schemas.openxmlformats.org/presentationml/2006/main">
+  <p:cSld>
+    <p:spTree>
+      <p:nvGrpSpPr>
+        <p:cNvPr id="1" name=""/>
+        <p:cNvGrpSpPr/>
+        <p:nvPr/>
+      </p:nvGrpSpPr>
+      <p:grpSpPr>
+        <a:xfrm>
+          <a:off x="0" y="0"/>
+          <a:ext cx="0" cy="0"/>
+          <a:chOff x="0" y="0"/>
+          <a:chExt cx="0" cy="0"/>
+        </a:xfrm>
+      </p:grpSpPr>
+      <p:sp>
+        <p:nvSpPr>
+          <p:cNvPr id="2" name="Title 1">
+            <a:extLst>
+              <a:ext uri="{FF2B5EF4-FFF2-40B4-BE49-F238E27FC236}">
+                <a16:creationId xmlns:a16="http://schemas.microsoft.com/office/drawing/2014/main" id="{51E96799-DB13-104C-822A-E2CBCB6F4EA1}"/>
+              </a:ext>
+            </a:extLst>
+          </p:cNvPr>
+          <p:cNvSpPr>
+            <a:spLocks noGrp="1"/>
+          </p:cNvSpPr>
+          <p:nvPr>
+            <p:ph type="title"/>
+          </p:nvPr>
+        </p:nvSpPr>
+        <p:spPr/>
+        <p:txBody>
+          <a:bodyPr/>
+          <a:lstStyle/>
+          <a:p>
+            <a:r>
+              <a:rPr lang="en-US" dirty="0"/>
+              <a:t>Flexbox: Item Properties</a:t>
+            </a:r>
+          </a:p>
+        </p:txBody>
+      </p:sp>
+      <p:sp>
+        <p:nvSpPr>
+          <p:cNvPr id="3" name="Content Placeholder 2">
+            <a:extLst>
+              <a:ext uri="{FF2B5EF4-FFF2-40B4-BE49-F238E27FC236}">
+                <a16:creationId xmlns:a16="http://schemas.microsoft.com/office/drawing/2014/main" id="{7619FD93-5A5D-2A40-BC02-1E1014F468FE}"/>
+              </a:ext>
+            </a:extLst>
+          </p:cNvPr>
+          <p:cNvSpPr>
+            <a:spLocks noGrp="1"/>
+          </p:cNvSpPr>
+          <p:nvPr>
+            <p:ph idx="1"/>
+          </p:nvPr>
+        </p:nvSpPr>
+        <p:spPr/>
+        <p:txBody>
+          <a:bodyPr>
+            <a:normAutofit/>
+          </a:bodyPr>
+          <a:lstStyle/>
+          <a:p>
+            <a:r>
+              <a:rPr lang="en-US" dirty="0">
+                <a:solidFill>
+                  <a:schemeClr val="bg1"/>
+                </a:solidFill>
+              </a:rPr>
+              <a:t>order</a:t>
+            </a:r>
+            <a:r>
+              <a:rPr lang="en-US" dirty="0"/>
+              <a:t>: </a:t>
+            </a:r>
+            <a:r>
+              <a:rPr lang="en-US" dirty="0" err="1"/>
+              <a:t>Bestimmt</a:t>
+            </a:r>
+            <a:r>
+              <a:rPr lang="en-US" dirty="0"/>
+              <a:t> die </a:t>
+            </a:r>
+            <a:r>
+              <a:rPr lang="en-US" dirty="0" err="1"/>
+              <a:t>Reihenfolge</a:t>
+            </a:r>
+            <a:r>
+              <a:rPr lang="en-US" dirty="0"/>
+              <a:t> der Items. Default </a:t>
+            </a:r>
+            <a:r>
+              <a:rPr lang="en-US" dirty="0" err="1"/>
+              <a:t>mässig</a:t>
+            </a:r>
+            <a:r>
+              <a:rPr lang="en-US" dirty="0"/>
+              <a:t> </a:t>
+            </a:r>
+            <a:r>
+              <a:rPr lang="en-US" dirty="0" err="1"/>
+              <a:t>ist</a:t>
+            </a:r>
+            <a:r>
+              <a:rPr lang="en-US" dirty="0"/>
+              <a:t> </a:t>
+            </a:r>
+            <a:r>
+              <a:rPr lang="en-US" dirty="0" err="1"/>
+              <a:t>bestimmt</a:t>
+            </a:r>
+            <a:r>
+              <a:rPr lang="en-US" dirty="0"/>
+              <a:t> das Markup die </a:t>
+            </a:r>
+            <a:r>
+              <a:rPr lang="en-US" dirty="0" err="1"/>
+              <a:t>Reihenfolge</a:t>
+            </a:r>
+            <a:r>
+              <a:rPr lang="en-US" dirty="0"/>
+              <a:t>.</a:t>
+            </a:r>
+            <a:br>
+              <a:rPr lang="en-US" dirty="0"/>
+            </a:br>
+            <a:r>
+              <a:rPr lang="en-US" sz="1900" dirty="0">
+                <a:latin typeface="Arial" panose="020B0604020202020204" pitchFamily="34" charset="0"/>
+                <a:cs typeface="Arial" panose="020B0604020202020204" pitchFamily="34" charset="0"/>
+              </a:rPr>
+              <a:t>order: 0</a:t>
+            </a:r>
+            <a:br>
+              <a:rPr lang="en-US" sz="1900" b="1" dirty="0">
+                <a:latin typeface="Arial" panose="020B0604020202020204" pitchFamily="34" charset="0"/>
+                <a:cs typeface="Arial" panose="020B0604020202020204" pitchFamily="34" charset="0"/>
+              </a:rPr>
+            </a:br>
+            <a:endParaRPr lang="en-US" sz="1900" dirty="0">
+              <a:latin typeface="Arial" panose="020B0604020202020204" pitchFamily="34" charset="0"/>
+              <a:cs typeface="Arial" panose="020B0604020202020204" pitchFamily="34" charset="0"/>
+            </a:endParaRPr>
+          </a:p>
+          <a:p>
+            <a:r>
+              <a:rPr lang="en-US" dirty="0">
+                <a:solidFill>
+                  <a:schemeClr val="bg1"/>
+                </a:solidFill>
+              </a:rPr>
+              <a:t>align-self</a:t>
+            </a:r>
+            <a:r>
+              <a:rPr lang="en-US" b="1" dirty="0"/>
+              <a:t>: </a:t>
+            </a:r>
+            <a:r>
+              <a:rPr lang="en-US" dirty="0" err="1"/>
+              <a:t>Damit</a:t>
+            </a:r>
+            <a:r>
+              <a:rPr lang="en-US" dirty="0"/>
+              <a:t> </a:t>
+            </a:r>
+            <a:r>
+              <a:rPr lang="en-US" dirty="0" err="1"/>
+              <a:t>kann</a:t>
+            </a:r>
+            <a:r>
+              <a:rPr lang="en-US" dirty="0"/>
+              <a:t> die </a:t>
+            </a:r>
+            <a:r>
+              <a:rPr lang="en-US" dirty="0" err="1"/>
+              <a:t>Eigenschaft</a:t>
+            </a:r>
+            <a:r>
+              <a:rPr lang="en-US" dirty="0"/>
+              <a:t> align-items </a:t>
+            </a:r>
+            <a:r>
+              <a:rPr lang="en-US" dirty="0" err="1"/>
+              <a:t>für</a:t>
+            </a:r>
+            <a:r>
+              <a:rPr lang="en-US" dirty="0"/>
+              <a:t> </a:t>
+            </a:r>
+            <a:r>
+              <a:rPr lang="en-US" dirty="0" err="1"/>
+              <a:t>ein</a:t>
+            </a:r>
+            <a:r>
+              <a:rPr lang="en-US" dirty="0"/>
+              <a:t> </a:t>
+            </a:r>
+            <a:r>
+              <a:rPr lang="en-US" dirty="0" err="1"/>
+              <a:t>einzelnes</a:t>
+            </a:r>
+            <a:r>
+              <a:rPr lang="en-US" dirty="0"/>
+              <a:t> Item </a:t>
+            </a:r>
+            <a:r>
+              <a:rPr lang="en-US" dirty="0" err="1"/>
+              <a:t>überschrieben</a:t>
+            </a:r>
+            <a:r>
+              <a:rPr lang="en-US" dirty="0"/>
+              <a:t> </a:t>
+            </a:r>
+            <a:r>
+              <a:rPr lang="en-US" dirty="0" err="1"/>
+              <a:t>werden</a:t>
+            </a:r>
+            <a:r>
+              <a:rPr lang="en-US" dirty="0"/>
+              <a:t>.</a:t>
+            </a:r>
+            <a:br>
+              <a:rPr lang="en-US" dirty="0"/>
+            </a:br>
+            <a:r>
+              <a:rPr lang="en-US" sz="1800" dirty="0">
+                <a:latin typeface="Arial" panose="020B0604020202020204" pitchFamily="34" charset="0"/>
+                <a:cs typeface="Arial" panose="020B0604020202020204" pitchFamily="34" charset="0"/>
+              </a:rPr>
+              <a:t>align-self: auto | flex-start | flex-end | center | baseline | stretch</a:t>
+            </a:r>
+            <a:br>
+              <a:rPr lang="en-US" sz="1800" dirty="0">
+                <a:latin typeface="Arial" panose="020B0604020202020204" pitchFamily="34" charset="0"/>
+                <a:cs typeface="Arial" panose="020B0604020202020204" pitchFamily="34" charset="0"/>
+              </a:rPr>
+            </a:br>
+            <a:endParaRPr lang="en-US" sz="1800" dirty="0">
+              <a:latin typeface="Arial" panose="020B0604020202020204" pitchFamily="34" charset="0"/>
+              <a:cs typeface="Arial" panose="020B0604020202020204" pitchFamily="34" charset="0"/>
+            </a:endParaRPr>
+          </a:p>
+        </p:txBody>
+      </p:sp>
+    </p:spTree>
+    <p:extLst>
+      <p:ext uri="{BB962C8B-B14F-4D97-AF65-F5344CB8AC3E}">
+        <p14:creationId xmlns:p14="http://schemas.microsoft.com/office/powerpoint/2010/main" val="417935865"/>
+      </p:ext>
+    </p:extLst>
+  </p:cSld>
+  <p:clrMapOvr>
+    <a:masterClrMapping/>
+  </p:clrMapOvr>
+</p:sld>
+</file>
+
+<file path=ppt/slides/slide92.xml><?xml version="1.0" encoding="utf-8"?>
 <p:sld xmlns:a="http://schemas.openxmlformats.org/drawingml/2006/main" xmlns:r="http://schemas.openxmlformats.org/officeDocument/2006/relationships" xmlns:p="http://schemas.openxmlformats.org/presentationml/2006/main">
   <p:cSld>
     <p:spTree>
@@ -31740,7 +32545,7 @@
 </p:sld>
 </file>
 
-<file path=ppt/slides/slide91.xml><?xml version="1.0" encoding="utf-8"?>
+<file path=ppt/slides/slide93.xml><?xml version="1.0" encoding="utf-8"?>
 <p:sld xmlns:a="http://schemas.openxmlformats.org/drawingml/2006/main" xmlns:r="http://schemas.openxmlformats.org/officeDocument/2006/relationships" xmlns:p="http://schemas.openxmlformats.org/presentationml/2006/main">
   <p:cSld>
     <p:spTree>
@@ -31848,7 +32653,7 @@
 </p:sld>
 </file>
 
-<file path=ppt/slides/slide92.xml><?xml version="1.0" encoding="utf-8"?>
+<file path=ppt/slides/slide94.xml><?xml version="1.0" encoding="utf-8"?>
 <p:sld xmlns:a="http://schemas.openxmlformats.org/drawingml/2006/main" xmlns:r="http://schemas.openxmlformats.org/officeDocument/2006/relationships" xmlns:p="http://schemas.openxmlformats.org/presentationml/2006/main">
   <p:cSld>
     <p:spTree>
@@ -32185,7 +32990,7 @@
 </p:sld>
 </file>
 
-<file path=ppt/slides/slide93.xml><?xml version="1.0" encoding="utf-8"?>
+<file path=ppt/slides/slide95.xml><?xml version="1.0" encoding="utf-8"?>
 <p:sld xmlns:a="http://schemas.openxmlformats.org/drawingml/2006/main" xmlns:r="http://schemas.openxmlformats.org/officeDocument/2006/relationships" xmlns:p="http://schemas.openxmlformats.org/presentationml/2006/main">
   <p:cSld>
     <p:spTree>
@@ -32549,7 +33354,7 @@
 </p:sld>
 </file>
 
-<file path=ppt/slides/slide94.xml><?xml version="1.0" encoding="utf-8"?>
+<file path=ppt/slides/slide96.xml><?xml version="1.0" encoding="utf-8"?>
 <p:sld xmlns:a="http://schemas.openxmlformats.org/drawingml/2006/main" xmlns:r="http://schemas.openxmlformats.org/officeDocument/2006/relationships" xmlns:p="http://schemas.openxmlformats.org/presentationml/2006/main">
   <p:cSld>
     <p:spTree>
@@ -32717,7 +33522,7 @@
 </p:sld>
 </file>
 
-<file path=ppt/slides/slide95.xml><?xml version="1.0" encoding="utf-8"?>
+<file path=ppt/slides/slide97.xml><?xml version="1.0" encoding="utf-8"?>
 <p:sld xmlns:a="http://schemas.openxmlformats.org/drawingml/2006/main" xmlns:r="http://schemas.openxmlformats.org/officeDocument/2006/relationships" xmlns:p="http://schemas.openxmlformats.org/presentationml/2006/main">
   <p:cSld>
     <p:spTree>
@@ -32960,7 +33765,7 @@
 </p:sld>
 </file>
 
-<file path=ppt/slides/slide96.xml><?xml version="1.0" encoding="utf-8"?>
+<file path=ppt/slides/slide98.xml><?xml version="1.0" encoding="utf-8"?>
 <p:sld xmlns:a="http://schemas.openxmlformats.org/drawingml/2006/main" xmlns:r="http://schemas.openxmlformats.org/officeDocument/2006/relationships" xmlns:p="http://schemas.openxmlformats.org/presentationml/2006/main">
   <p:cSld>
     <p:spTree>
@@ -33047,470 +33852,6 @@
 </p:sld>
 </file>
 
-<file path=ppt/slides/slide97.xml><?xml version="1.0" encoding="utf-8"?>
-<p:sld xmlns:a="http://schemas.openxmlformats.org/drawingml/2006/main" xmlns:r="http://schemas.openxmlformats.org/officeDocument/2006/relationships" xmlns:p="http://schemas.openxmlformats.org/presentationml/2006/main">
-  <p:cSld>
-    <p:spTree>
-      <p:nvGrpSpPr>
-        <p:cNvPr id="1" name=""/>
-        <p:cNvGrpSpPr/>
-        <p:nvPr/>
-      </p:nvGrpSpPr>
-      <p:grpSpPr>
-        <a:xfrm>
-          <a:off x="0" y="0"/>
-          <a:ext cx="0" cy="0"/>
-          <a:chOff x="0" y="0"/>
-          <a:chExt cx="0" cy="0"/>
-        </a:xfrm>
-      </p:grpSpPr>
-      <p:sp>
-        <p:nvSpPr>
-          <p:cNvPr id="2" name="Title 1">
-            <a:extLst>
-              <a:ext uri="{FF2B5EF4-FFF2-40B4-BE49-F238E27FC236}">
-                <a16:creationId xmlns:a16="http://schemas.microsoft.com/office/drawing/2014/main" id="{9D70707D-CDCD-8E4A-9738-E3DB279BB242}"/>
-              </a:ext>
-            </a:extLst>
-          </p:cNvPr>
-          <p:cNvSpPr>
-            <a:spLocks noGrp="1"/>
-          </p:cNvSpPr>
-          <p:nvPr>
-            <p:ph type="title"/>
-          </p:nvPr>
-        </p:nvSpPr>
-        <p:spPr/>
-        <p:txBody>
-          <a:bodyPr/>
-          <a:lstStyle/>
-          <a:p>
-            <a:r>
-              <a:rPr lang="en-US" dirty="0"/>
-              <a:t>Grid</a:t>
-            </a:r>
-          </a:p>
-        </p:txBody>
-      </p:sp>
-      <p:sp>
-        <p:nvSpPr>
-          <p:cNvPr id="4" name="Inhaltsplatzhalter 3">
-            <a:extLst>
-              <a:ext uri="{FF2B5EF4-FFF2-40B4-BE49-F238E27FC236}">
-                <a16:creationId xmlns:a16="http://schemas.microsoft.com/office/drawing/2014/main" id="{5F467F9B-4189-6546-A21B-AF6B8FA98FE2}"/>
-              </a:ext>
-            </a:extLst>
-          </p:cNvPr>
-          <p:cNvSpPr>
-            <a:spLocks noGrp="1"/>
-          </p:cNvSpPr>
-          <p:nvPr>
-            <p:ph idx="1"/>
-          </p:nvPr>
-        </p:nvSpPr>
-        <p:spPr/>
-        <p:txBody>
-          <a:bodyPr/>
-          <a:lstStyle/>
-          <a:p>
-            <a:r>
-              <a:rPr lang="de-DE" dirty="0" err="1"/>
-              <a:t>Grid</a:t>
-            </a:r>
-            <a:r>
-              <a:rPr lang="de-DE" dirty="0"/>
-              <a:t> Layout auf dem Container (Parent Element) definieren</a:t>
-            </a:r>
-            <a:br>
-              <a:rPr lang="de-DE" dirty="0"/>
-            </a:br>
-            <a:r>
-              <a:rPr lang="de-DE" b="1" dirty="0" err="1"/>
-              <a:t>display</a:t>
-            </a:r>
-            <a:r>
-              <a:rPr lang="de-DE" b="1" dirty="0"/>
-              <a:t>: </a:t>
-            </a:r>
-            <a:r>
-              <a:rPr lang="de-DE" b="1" dirty="0" err="1"/>
-              <a:t>grid</a:t>
-            </a:r>
-            <a:endParaRPr lang="de-DE" b="1" dirty="0"/>
-          </a:p>
-          <a:p>
-            <a:r>
-              <a:rPr lang="de-DE" dirty="0"/>
-              <a:t>Gute Doku:</a:t>
-            </a:r>
-            <a:br>
-              <a:rPr lang="de-DE" dirty="0"/>
-            </a:br>
-            <a:r>
-              <a:rPr lang="de-DE" dirty="0">
-                <a:hlinkClick r:id="rId2"/>
-              </a:rPr>
-              <a:t>https://css-tricks.com/snippets/css/complete-guide-grid/</a:t>
-            </a:r>
-            <a:endParaRPr lang="de-DE" dirty="0"/>
-          </a:p>
-          <a:p>
-            <a:pPr marL="0" indent="0">
-              <a:buNone/>
-            </a:pPr>
-            <a:endParaRPr lang="de-DE" dirty="0"/>
-          </a:p>
-          <a:p>
-            <a:endParaRPr lang="de-DE" dirty="0"/>
-          </a:p>
-        </p:txBody>
-      </p:sp>
-    </p:spTree>
-    <p:extLst>
-      <p:ext uri="{BB962C8B-B14F-4D97-AF65-F5344CB8AC3E}">
-        <p14:creationId xmlns:p14="http://schemas.microsoft.com/office/powerpoint/2010/main" val="366060195"/>
-      </p:ext>
-    </p:extLst>
-  </p:cSld>
-  <p:clrMapOvr>
-    <a:masterClrMapping/>
-  </p:clrMapOvr>
-</p:sld>
-</file>
-
-<file path=ppt/slides/slide98.xml><?xml version="1.0" encoding="utf-8"?>
-<p:sld xmlns:a="http://schemas.openxmlformats.org/drawingml/2006/main" xmlns:r="http://schemas.openxmlformats.org/officeDocument/2006/relationships" xmlns:p="http://schemas.openxmlformats.org/presentationml/2006/main">
-  <p:cSld>
-    <p:spTree>
-      <p:nvGrpSpPr>
-        <p:cNvPr id="1" name=""/>
-        <p:cNvGrpSpPr/>
-        <p:nvPr/>
-      </p:nvGrpSpPr>
-      <p:grpSpPr>
-        <a:xfrm>
-          <a:off x="0" y="0"/>
-          <a:ext cx="0" cy="0"/>
-          <a:chOff x="0" y="0"/>
-          <a:chExt cx="0" cy="0"/>
-        </a:xfrm>
-      </p:grpSpPr>
-      <p:sp>
-        <p:nvSpPr>
-          <p:cNvPr id="2" name="Titel 1">
-            <a:extLst>
-              <a:ext uri="{FF2B5EF4-FFF2-40B4-BE49-F238E27FC236}">
-                <a16:creationId xmlns:a16="http://schemas.microsoft.com/office/drawing/2014/main" id="{19033134-0BFA-AE4B-AAE3-E9131EA31B93}"/>
-              </a:ext>
-            </a:extLst>
-          </p:cNvPr>
-          <p:cNvSpPr>
-            <a:spLocks noGrp="1"/>
-          </p:cNvSpPr>
-          <p:nvPr>
-            <p:ph type="title"/>
-          </p:nvPr>
-        </p:nvSpPr>
-        <p:spPr/>
-        <p:txBody>
-          <a:bodyPr/>
-          <a:lstStyle/>
-          <a:p>
-            <a:r>
-              <a:rPr lang="de-DE" dirty="0" err="1"/>
-              <a:t>Grid</a:t>
-            </a:r>
-            <a:r>
-              <a:rPr lang="de-DE" dirty="0"/>
-              <a:t>: Container Properties</a:t>
-            </a:r>
-          </a:p>
-        </p:txBody>
-      </p:sp>
-      <p:sp>
-        <p:nvSpPr>
-          <p:cNvPr id="7" name="Inhaltsplatzhalter 6">
-            <a:extLst>
-              <a:ext uri="{FF2B5EF4-FFF2-40B4-BE49-F238E27FC236}">
-                <a16:creationId xmlns:a16="http://schemas.microsoft.com/office/drawing/2014/main" id="{662274F8-DBDF-1941-95E5-496B43E07EBD}"/>
-              </a:ext>
-            </a:extLst>
-          </p:cNvPr>
-          <p:cNvSpPr>
-            <a:spLocks noGrp="1"/>
-          </p:cNvSpPr>
-          <p:nvPr>
-            <p:ph idx="1"/>
-          </p:nvPr>
-        </p:nvSpPr>
-        <p:spPr>
-          <a:xfrm>
-            <a:off x="680321" y="2336873"/>
-            <a:ext cx="9915289" cy="3599316"/>
-          </a:xfrm>
-        </p:spPr>
-        <p:txBody>
-          <a:bodyPr/>
-          <a:lstStyle/>
-          <a:p>
-            <a:r>
-              <a:rPr lang="de-CH" dirty="0" err="1">
-                <a:solidFill>
-                  <a:schemeClr val="bg1"/>
-                </a:solidFill>
-              </a:rPr>
-              <a:t>grid</a:t>
-            </a:r>
-            <a:r>
-              <a:rPr lang="de-CH" dirty="0">
-                <a:solidFill>
-                  <a:schemeClr val="bg1"/>
-                </a:solidFill>
-              </a:rPr>
-              <a:t>-template-</a:t>
-            </a:r>
-            <a:r>
-              <a:rPr lang="de-CH" dirty="0" err="1">
-                <a:solidFill>
-                  <a:schemeClr val="bg1"/>
-                </a:solidFill>
-              </a:rPr>
-              <a:t>columns</a:t>
-            </a:r>
-            <a:r>
-              <a:rPr lang="de-CH" dirty="0"/>
-              <a:t>:  Definiert die Anzahl und Grösse der Spalten</a:t>
-            </a:r>
-            <a:r>
-              <a:rPr lang="de-CH" b="1" dirty="0"/>
-              <a:t>.</a:t>
-            </a:r>
-            <a:br>
-              <a:rPr lang="de-CH" b="1" dirty="0"/>
-            </a:br>
-            <a:r>
-              <a:rPr lang="de-CH" sz="2000" dirty="0" err="1">
-                <a:latin typeface="Arial" panose="020B0604020202020204" pitchFamily="34" charset="0"/>
-                <a:cs typeface="Arial" panose="020B0604020202020204" pitchFamily="34" charset="0"/>
-              </a:rPr>
-              <a:t>grid</a:t>
-            </a:r>
-            <a:r>
-              <a:rPr lang="de-CH" sz="2000" dirty="0">
-                <a:latin typeface="Arial" panose="020B0604020202020204" pitchFamily="34" charset="0"/>
-                <a:cs typeface="Arial" panose="020B0604020202020204" pitchFamily="34" charset="0"/>
-              </a:rPr>
-              <a:t>-template-</a:t>
-            </a:r>
-            <a:r>
-              <a:rPr lang="de-CH" sz="2000" dirty="0" err="1">
-                <a:latin typeface="Arial" panose="020B0604020202020204" pitchFamily="34" charset="0"/>
-                <a:cs typeface="Arial" panose="020B0604020202020204" pitchFamily="34" charset="0"/>
-              </a:rPr>
-              <a:t>columns</a:t>
-            </a:r>
-            <a:r>
-              <a:rPr lang="de-CH" sz="2000" dirty="0">
-                <a:latin typeface="Arial" panose="020B0604020202020204" pitchFamily="34" charset="0"/>
-                <a:cs typeface="Arial" panose="020B0604020202020204" pitchFamily="34" charset="0"/>
-              </a:rPr>
-              <a:t>: 20% 60% 20%;</a:t>
-            </a:r>
-            <a:br>
-              <a:rPr lang="de-CH" sz="2000" dirty="0">
-                <a:latin typeface="Arial" panose="020B0604020202020204" pitchFamily="34" charset="0"/>
-                <a:cs typeface="Arial" panose="020B0604020202020204" pitchFamily="34" charset="0"/>
-              </a:rPr>
-            </a:br>
-            <a:r>
-              <a:rPr lang="de-CH" sz="2000" dirty="0" err="1">
-                <a:latin typeface="Arial" panose="020B0604020202020204" pitchFamily="34" charset="0"/>
-                <a:cs typeface="Arial" panose="020B0604020202020204" pitchFamily="34" charset="0"/>
-              </a:rPr>
-              <a:t>grid</a:t>
-            </a:r>
-            <a:r>
-              <a:rPr lang="de-CH" sz="2000" dirty="0">
-                <a:latin typeface="Arial" panose="020B0604020202020204" pitchFamily="34" charset="0"/>
-                <a:cs typeface="Arial" panose="020B0604020202020204" pitchFamily="34" charset="0"/>
-              </a:rPr>
-              <a:t>-template-</a:t>
-            </a:r>
-            <a:r>
-              <a:rPr lang="de-CH" sz="2000" dirty="0" err="1">
-                <a:latin typeface="Arial" panose="020B0604020202020204" pitchFamily="34" charset="0"/>
-                <a:cs typeface="Arial" panose="020B0604020202020204" pitchFamily="34" charset="0"/>
-              </a:rPr>
-              <a:t>columns</a:t>
-            </a:r>
-            <a:r>
-              <a:rPr lang="de-CH" sz="2000" dirty="0">
-                <a:latin typeface="Arial" panose="020B0604020202020204" pitchFamily="34" charset="0"/>
-                <a:cs typeface="Arial" panose="020B0604020202020204" pitchFamily="34" charset="0"/>
-              </a:rPr>
-              <a:t>: [eins] 20% [zwei] 60% [drei] 20% [vier];</a:t>
-            </a:r>
-            <a:br>
-              <a:rPr lang="de-CH" sz="2000" b="1" dirty="0">
-                <a:latin typeface="Arial" panose="020B0604020202020204" pitchFamily="34" charset="0"/>
-                <a:cs typeface="Arial" panose="020B0604020202020204" pitchFamily="34" charset="0"/>
-              </a:rPr>
-            </a:br>
-            <a:endParaRPr lang="de-CH" sz="2000" dirty="0">
-              <a:latin typeface="Arial" panose="020B0604020202020204" pitchFamily="34" charset="0"/>
-              <a:cs typeface="Arial" panose="020B0604020202020204" pitchFamily="34" charset="0"/>
-            </a:endParaRPr>
-          </a:p>
-          <a:p>
-            <a:r>
-              <a:rPr lang="de-CH" dirty="0" err="1">
-                <a:solidFill>
-                  <a:schemeClr val="bg1"/>
-                </a:solidFill>
-              </a:rPr>
-              <a:t>grid</a:t>
-            </a:r>
-            <a:r>
-              <a:rPr lang="de-CH" dirty="0">
-                <a:solidFill>
-                  <a:schemeClr val="bg1"/>
-                </a:solidFill>
-              </a:rPr>
-              <a:t>-template-</a:t>
-            </a:r>
-            <a:r>
-              <a:rPr lang="de-CH" dirty="0" err="1">
-                <a:solidFill>
-                  <a:schemeClr val="bg1"/>
-                </a:solidFill>
-              </a:rPr>
-              <a:t>rows</a:t>
-            </a:r>
-            <a:r>
-              <a:rPr lang="de-CH" dirty="0"/>
-              <a:t>: </a:t>
-            </a:r>
-            <a:r>
-              <a:rPr lang="de-CH" dirty="0" err="1"/>
-              <a:t>Definert</a:t>
-            </a:r>
-            <a:r>
-              <a:rPr lang="de-CH" dirty="0"/>
-              <a:t> die Anzahl und Grösse der Reihen</a:t>
-            </a:r>
-            <a:r>
-              <a:rPr lang="de-CH" b="1" dirty="0"/>
-              <a:t>.</a:t>
-            </a:r>
-            <a:br>
-              <a:rPr lang="de-CH" b="1" dirty="0"/>
-            </a:br>
-            <a:r>
-              <a:rPr lang="de-CH" sz="2000" dirty="0" err="1">
-                <a:latin typeface="Arial" panose="020B0604020202020204" pitchFamily="34" charset="0"/>
-                <a:cs typeface="Arial" panose="020B0604020202020204" pitchFamily="34" charset="0"/>
-              </a:rPr>
-              <a:t>grid</a:t>
-            </a:r>
-            <a:r>
-              <a:rPr lang="de-CH" sz="2000" dirty="0">
-                <a:latin typeface="Arial" panose="020B0604020202020204" pitchFamily="34" charset="0"/>
-                <a:cs typeface="Arial" panose="020B0604020202020204" pitchFamily="34" charset="0"/>
-              </a:rPr>
-              <a:t>-template-</a:t>
-            </a:r>
-            <a:r>
-              <a:rPr lang="de-CH" sz="2000" dirty="0" err="1">
-                <a:latin typeface="Arial" panose="020B0604020202020204" pitchFamily="34" charset="0"/>
-                <a:cs typeface="Arial" panose="020B0604020202020204" pitchFamily="34" charset="0"/>
-              </a:rPr>
-              <a:t>rows</a:t>
-            </a:r>
-            <a:r>
-              <a:rPr lang="de-CH" sz="2000" dirty="0">
-                <a:latin typeface="Arial" panose="020B0604020202020204" pitchFamily="34" charset="0"/>
-                <a:cs typeface="Arial" panose="020B0604020202020204" pitchFamily="34" charset="0"/>
-              </a:rPr>
-              <a:t>: 100px </a:t>
-            </a:r>
-            <a:r>
-              <a:rPr lang="de-CH" sz="2000" dirty="0" err="1">
-                <a:latin typeface="Arial" panose="020B0604020202020204" pitchFamily="34" charset="0"/>
-                <a:cs typeface="Arial" panose="020B0604020202020204" pitchFamily="34" charset="0"/>
-              </a:rPr>
-              <a:t>auto</a:t>
-            </a:r>
-            <a:r>
-              <a:rPr lang="de-CH" sz="2000" dirty="0">
-                <a:latin typeface="Arial" panose="020B0604020202020204" pitchFamily="34" charset="0"/>
-                <a:cs typeface="Arial" panose="020B0604020202020204" pitchFamily="34" charset="0"/>
-              </a:rPr>
-              <a:t> 100px;</a:t>
-            </a:r>
-            <a:br>
-              <a:rPr lang="de-CH" sz="2000" dirty="0">
-                <a:latin typeface="Arial" panose="020B0604020202020204" pitchFamily="34" charset="0"/>
-                <a:cs typeface="Arial" panose="020B0604020202020204" pitchFamily="34" charset="0"/>
-              </a:rPr>
-            </a:br>
-            <a:r>
-              <a:rPr lang="de-CH" sz="2000" dirty="0" err="1">
-                <a:latin typeface="Arial" panose="020B0604020202020204" pitchFamily="34" charset="0"/>
-                <a:cs typeface="Arial" panose="020B0604020202020204" pitchFamily="34" charset="0"/>
-              </a:rPr>
-              <a:t>grid</a:t>
-            </a:r>
-            <a:r>
-              <a:rPr lang="de-CH" sz="2000" dirty="0">
-                <a:latin typeface="Arial" panose="020B0604020202020204" pitchFamily="34" charset="0"/>
-                <a:cs typeface="Arial" panose="020B0604020202020204" pitchFamily="34" charset="0"/>
-              </a:rPr>
-              <a:t>-template-</a:t>
-            </a:r>
-            <a:r>
-              <a:rPr lang="de-CH" sz="2000" dirty="0" err="1">
-                <a:latin typeface="Arial" panose="020B0604020202020204" pitchFamily="34" charset="0"/>
-                <a:cs typeface="Arial" panose="020B0604020202020204" pitchFamily="34" charset="0"/>
-              </a:rPr>
-              <a:t>rows</a:t>
-            </a:r>
-            <a:r>
-              <a:rPr lang="de-CH" sz="2000" dirty="0">
-                <a:latin typeface="Arial" panose="020B0604020202020204" pitchFamily="34" charset="0"/>
-                <a:cs typeface="Arial" panose="020B0604020202020204" pitchFamily="34" charset="0"/>
-              </a:rPr>
-              <a:t>: [row1] 100px [row2] </a:t>
-            </a:r>
-            <a:r>
-              <a:rPr lang="de-CH" sz="2000" dirty="0" err="1">
-                <a:latin typeface="Arial" panose="020B0604020202020204" pitchFamily="34" charset="0"/>
-                <a:cs typeface="Arial" panose="020B0604020202020204" pitchFamily="34" charset="0"/>
-              </a:rPr>
-              <a:t>auto</a:t>
-            </a:r>
-            <a:r>
-              <a:rPr lang="de-CH" sz="2000" dirty="0">
-                <a:latin typeface="Arial" panose="020B0604020202020204" pitchFamily="34" charset="0"/>
-                <a:cs typeface="Arial" panose="020B0604020202020204" pitchFamily="34" charset="0"/>
-              </a:rPr>
-              <a:t> [row3] 100px [ende];</a:t>
-            </a:r>
-          </a:p>
-        </p:txBody>
-      </p:sp>
-    </p:spTree>
-    <p:extLst>
-      <p:ext uri="{BB962C8B-B14F-4D97-AF65-F5344CB8AC3E}">
-        <p14:creationId xmlns:p14="http://schemas.microsoft.com/office/powerpoint/2010/main" val="714284251"/>
-      </p:ext>
-    </p:extLst>
-  </p:cSld>
-  <p:clrMapOvr>
-    <a:masterClrMapping/>
-  </p:clrMapOvr>
-</p:sld>
-</file>
-
 <file path=ppt/slides/slide99.xml><?xml version="1.0" encoding="utf-8"?>
 <p:sld xmlns:a="http://schemas.openxmlformats.org/drawingml/2006/main" xmlns:r="http://schemas.openxmlformats.org/officeDocument/2006/relationships" xmlns:p="http://schemas.openxmlformats.org/presentationml/2006/main">
   <p:cSld>
@@ -33530,10 +33871,10 @@
       </p:grpSpPr>
       <p:sp>
         <p:nvSpPr>
-          <p:cNvPr id="2" name="Titel 1">
+          <p:cNvPr id="2" name="Title 1">
             <a:extLst>
               <a:ext uri="{FF2B5EF4-FFF2-40B4-BE49-F238E27FC236}">
-                <a16:creationId xmlns:a16="http://schemas.microsoft.com/office/drawing/2014/main" id="{10085994-E9B3-9C49-88DA-85CB7896D777}"/>
+                <a16:creationId xmlns:a16="http://schemas.microsoft.com/office/drawing/2014/main" id="{9D70707D-CDCD-8E4A-9738-E3DB279BB242}"/>
               </a:ext>
             </a:extLst>
           </p:cNvPr>
@@ -33550,173 +33891,81 @@
           <a:lstStyle/>
           <a:p>
             <a:r>
-              <a:rPr lang="de-DE" dirty="0" err="1"/>
+              <a:rPr lang="en-US" dirty="0"/>
               <a:t>Grid</a:t>
             </a:r>
-            <a:r>
-              <a:rPr lang="de-DE" dirty="0"/>
-              <a:t>: Container Properties</a:t>
-            </a:r>
-          </a:p>
-        </p:txBody>
-      </p:sp>
-      <p:pic>
-        <p:nvPicPr>
-          <p:cNvPr id="9" name="Inhaltsplatzhalter 8">
+          </a:p>
+        </p:txBody>
+      </p:sp>
+      <p:sp>
+        <p:nvSpPr>
+          <p:cNvPr id="4" name="Inhaltsplatzhalter 3">
             <a:extLst>
               <a:ext uri="{FF2B5EF4-FFF2-40B4-BE49-F238E27FC236}">
-                <a16:creationId xmlns:a16="http://schemas.microsoft.com/office/drawing/2014/main" id="{C644C42D-72EF-2A48-816F-36D82961D15D}"/>
+                <a16:creationId xmlns:a16="http://schemas.microsoft.com/office/drawing/2014/main" id="{5F467F9B-4189-6546-A21B-AF6B8FA98FE2}"/>
               </a:ext>
             </a:extLst>
           </p:cNvPr>
-          <p:cNvPicPr>
-            <a:picLocks noGrp="1" noChangeAspect="1"/>
-          </p:cNvPicPr>
+          <p:cNvSpPr>
+            <a:spLocks noGrp="1"/>
+          </p:cNvSpPr>
           <p:nvPr>
             <p:ph idx="1"/>
           </p:nvPr>
-        </p:nvPicPr>
-        <p:blipFill>
-          <a:blip r:embed="rId2"/>
-          <a:stretch>
-            <a:fillRect/>
-          </a:stretch>
-        </p:blipFill>
-        <p:spPr>
-          <a:xfrm>
-            <a:off x="889798" y="3389272"/>
-            <a:ext cx="6592171" cy="2916163"/>
-          </a:xfrm>
-        </p:spPr>
-      </p:pic>
-      <p:sp>
-        <p:nvSpPr>
-          <p:cNvPr id="10" name="Rechteck 9">
-            <a:extLst>
-              <a:ext uri="{FF2B5EF4-FFF2-40B4-BE49-F238E27FC236}">
-                <a16:creationId xmlns:a16="http://schemas.microsoft.com/office/drawing/2014/main" id="{5C1814EE-CFB9-BA40-8AAF-2BE7E486CDD9}"/>
-              </a:ext>
-            </a:extLst>
-          </p:cNvPr>
-          <p:cNvSpPr/>
-          <p:nvPr/>
-        </p:nvSpPr>
-        <p:spPr>
-          <a:xfrm>
-            <a:off x="889798" y="2281276"/>
-            <a:ext cx="4172937" cy="369332"/>
-          </a:xfrm>
-          <a:prstGeom prst="rect">
-            <a:avLst/>
-          </a:prstGeom>
-        </p:spPr>
-        <p:txBody>
-          <a:bodyPr wrap="none">
-            <a:spAutoFit/>
-          </a:bodyPr>
+        </p:nvSpPr>
+        <p:spPr/>
+        <p:txBody>
+          <a:bodyPr/>
           <a:lstStyle/>
           <a:p>
             <a:r>
-              <a:rPr lang="de-CH" dirty="0" err="1">
-                <a:latin typeface="Arial" panose="020B0604020202020204" pitchFamily="34" charset="0"/>
-                <a:cs typeface="Arial" panose="020B0604020202020204" pitchFamily="34" charset="0"/>
-              </a:rPr>
+              <a:rPr lang="de-DE" dirty="0" err="1"/>
+              <a:t>Grid</a:t>
+            </a:r>
+            <a:r>
+              <a:rPr lang="de-DE" dirty="0"/>
+              <a:t> Layout auf dem Container (Parent Element) definieren</a:t>
+            </a:r>
+            <a:br>
+              <a:rPr lang="de-DE" dirty="0"/>
+            </a:br>
+            <a:r>
+              <a:rPr lang="de-DE" b="1" dirty="0" err="1"/>
+              <a:t>display</a:t>
+            </a:r>
+            <a:r>
+              <a:rPr lang="de-DE" b="1" dirty="0"/>
+              <a:t>: </a:t>
+            </a:r>
+            <a:r>
+              <a:rPr lang="de-DE" b="1" dirty="0" err="1"/>
               <a:t>grid</a:t>
             </a:r>
-            <a:r>
-              <a:rPr lang="de-CH" dirty="0">
-                <a:latin typeface="Arial" panose="020B0604020202020204" pitchFamily="34" charset="0"/>
-                <a:cs typeface="Arial" panose="020B0604020202020204" pitchFamily="34" charset="0"/>
-              </a:rPr>
-              <a:t>-template-</a:t>
-            </a:r>
-            <a:r>
-              <a:rPr lang="de-CH" dirty="0" err="1">
-                <a:latin typeface="Arial" panose="020B0604020202020204" pitchFamily="34" charset="0"/>
-                <a:cs typeface="Arial" panose="020B0604020202020204" pitchFamily="34" charset="0"/>
-              </a:rPr>
-              <a:t>columns</a:t>
-            </a:r>
-            <a:r>
-              <a:rPr lang="de-CH" dirty="0">
-                <a:latin typeface="Arial" panose="020B0604020202020204" pitchFamily="34" charset="0"/>
-                <a:cs typeface="Arial" panose="020B0604020202020204" pitchFamily="34" charset="0"/>
-              </a:rPr>
-              <a:t>: 20% 60% 20%;</a:t>
+            <a:endParaRPr lang="de-DE" b="1" dirty="0"/>
+          </a:p>
+          <a:p>
+            <a:r>
+              <a:rPr lang="de-DE" dirty="0"/>
+              <a:t>Gute Doku:</a:t>
+            </a:r>
+            <a:br>
+              <a:rPr lang="de-DE" dirty="0"/>
+            </a:br>
+            <a:r>
+              <a:rPr lang="de-DE" dirty="0">
+                <a:hlinkClick r:id="rId2"/>
+              </a:rPr>
+              <a:t>https://css-tricks.com/snippets/css/complete-guide-grid/</a:t>
             </a:r>
             <a:endParaRPr lang="de-DE" dirty="0"/>
           </a:p>
-        </p:txBody>
-      </p:sp>
-      <p:sp>
-        <p:nvSpPr>
-          <p:cNvPr id="11" name="Rechteck 10">
-            <a:extLst>
-              <a:ext uri="{FF2B5EF4-FFF2-40B4-BE49-F238E27FC236}">
-                <a16:creationId xmlns:a16="http://schemas.microsoft.com/office/drawing/2014/main" id="{E743F98C-590F-2345-AA1A-E117AC7E1BAF}"/>
-              </a:ext>
-            </a:extLst>
-          </p:cNvPr>
-          <p:cNvSpPr/>
-          <p:nvPr/>
-        </p:nvSpPr>
-        <p:spPr>
-          <a:xfrm>
-            <a:off x="889798" y="2650608"/>
-            <a:ext cx="6096000" cy="369332"/>
-          </a:xfrm>
-          <a:prstGeom prst="rect">
-            <a:avLst/>
-          </a:prstGeom>
-        </p:spPr>
-        <p:txBody>
-          <a:bodyPr>
-            <a:spAutoFit/>
-          </a:bodyPr>
-          <a:lstStyle/>
-          <a:p>
-            <a:r>
-              <a:rPr lang="de-CH" dirty="0" err="1">
-                <a:latin typeface="Arial" panose="020B0604020202020204" pitchFamily="34" charset="0"/>
-                <a:cs typeface="Arial" panose="020B0604020202020204" pitchFamily="34" charset="0"/>
-              </a:rPr>
-              <a:t>grid</a:t>
-            </a:r>
-            <a:r>
-              <a:rPr lang="de-CH" dirty="0">
-                <a:latin typeface="Arial" panose="020B0604020202020204" pitchFamily="34" charset="0"/>
-                <a:cs typeface="Arial" panose="020B0604020202020204" pitchFamily="34" charset="0"/>
-              </a:rPr>
-              <a:t>-template-</a:t>
-            </a:r>
-            <a:r>
-              <a:rPr lang="de-CH" dirty="0" err="1">
-                <a:latin typeface="Arial" panose="020B0604020202020204" pitchFamily="34" charset="0"/>
-                <a:cs typeface="Arial" panose="020B0604020202020204" pitchFamily="34" charset="0"/>
-              </a:rPr>
-              <a:t>rows</a:t>
-            </a:r>
-            <a:r>
-              <a:rPr lang="de-CH" dirty="0">
-                <a:latin typeface="Arial" panose="020B0604020202020204" pitchFamily="34" charset="0"/>
-                <a:cs typeface="Arial" panose="020B0604020202020204" pitchFamily="34" charset="0"/>
-              </a:rPr>
-              <a:t>: 100px </a:t>
-            </a:r>
-            <a:r>
-              <a:rPr lang="de-CH" dirty="0" err="1">
-                <a:latin typeface="Arial" panose="020B0604020202020204" pitchFamily="34" charset="0"/>
-                <a:cs typeface="Arial" panose="020B0604020202020204" pitchFamily="34" charset="0"/>
-              </a:rPr>
-              <a:t>auto</a:t>
-            </a:r>
-            <a:r>
-              <a:rPr lang="de-CH" dirty="0">
-                <a:latin typeface="Arial" panose="020B0604020202020204" pitchFamily="34" charset="0"/>
-                <a:cs typeface="Arial" panose="020B0604020202020204" pitchFamily="34" charset="0"/>
-              </a:rPr>
-              <a:t> 100px;</a:t>
-            </a:r>
+          <a:p>
+            <a:pPr marL="0" indent="0">
+              <a:buNone/>
+            </a:pPr>
+            <a:endParaRPr lang="de-DE" dirty="0"/>
+          </a:p>
+          <a:p>
             <a:endParaRPr lang="de-DE" dirty="0"/>
           </a:p>
         </p:txBody>
@@ -33724,7 +33973,7 @@
     </p:spTree>
     <p:extLst>
       <p:ext uri="{BB962C8B-B14F-4D97-AF65-F5344CB8AC3E}">
-        <p14:creationId xmlns:p14="http://schemas.microsoft.com/office/powerpoint/2010/main" val="3096845263"/>
+        <p14:creationId xmlns:p14="http://schemas.microsoft.com/office/powerpoint/2010/main" val="366060195"/>
       </p:ext>
     </p:extLst>
   </p:cSld>

</xml_diff>

<commit_message>
Übungen zur zentrierten Box mit und ohne Flexbox hinzugefügt.
</commit_message>
<xml_diff>
--- a/html Schulung.pptx
+++ b/html Schulung.pptx
@@ -5,7 +5,7 @@
     <p:sldMasterId id="2147483660" r:id="rId1"/>
   </p:sldMasterIdLst>
   <p:notesMasterIdLst>
-    <p:notesMasterId r:id="rId113"/>
+    <p:notesMasterId r:id="rId114"/>
   </p:notesMasterIdLst>
   <p:sldIdLst>
     <p:sldId id="256" r:id="rId2"/>
@@ -102,23 +102,24 @@
     <p:sldId id="332" r:id="rId93"/>
     <p:sldId id="334" r:id="rId94"/>
     <p:sldId id="333" r:id="rId95"/>
-    <p:sldId id="329" r:id="rId96"/>
-    <p:sldId id="330" r:id="rId97"/>
-    <p:sldId id="335" r:id="rId98"/>
-    <p:sldId id="336" r:id="rId99"/>
-    <p:sldId id="339" r:id="rId100"/>
-    <p:sldId id="340" r:id="rId101"/>
-    <p:sldId id="341" r:id="rId102"/>
-    <p:sldId id="342" r:id="rId103"/>
-    <p:sldId id="343" r:id="rId104"/>
-    <p:sldId id="344" r:id="rId105"/>
-    <p:sldId id="345" r:id="rId106"/>
-    <p:sldId id="346" r:id="rId107"/>
-    <p:sldId id="347" r:id="rId108"/>
-    <p:sldId id="348" r:id="rId109"/>
-    <p:sldId id="337" r:id="rId110"/>
-    <p:sldId id="338" r:id="rId111"/>
-    <p:sldId id="264" r:id="rId112"/>
+    <p:sldId id="367" r:id="rId96"/>
+    <p:sldId id="329" r:id="rId97"/>
+    <p:sldId id="330" r:id="rId98"/>
+    <p:sldId id="335" r:id="rId99"/>
+    <p:sldId id="336" r:id="rId100"/>
+    <p:sldId id="339" r:id="rId101"/>
+    <p:sldId id="340" r:id="rId102"/>
+    <p:sldId id="341" r:id="rId103"/>
+    <p:sldId id="342" r:id="rId104"/>
+    <p:sldId id="343" r:id="rId105"/>
+    <p:sldId id="344" r:id="rId106"/>
+    <p:sldId id="345" r:id="rId107"/>
+    <p:sldId id="346" r:id="rId108"/>
+    <p:sldId id="347" r:id="rId109"/>
+    <p:sldId id="348" r:id="rId110"/>
+    <p:sldId id="337" r:id="rId111"/>
+    <p:sldId id="338" r:id="rId112"/>
+    <p:sldId id="264" r:id="rId113"/>
   </p:sldIdLst>
   <p:sldSz cx="12192000" cy="6858000"/>
   <p:notesSz cx="6858000" cy="9144000"/>
@@ -8990,10 +8991,10 @@
       </p:grpSpPr>
       <p:sp>
         <p:nvSpPr>
-          <p:cNvPr id="2" name="Titel 1">
+          <p:cNvPr id="2" name="Title 1">
             <a:extLst>
               <a:ext uri="{FF2B5EF4-FFF2-40B4-BE49-F238E27FC236}">
-                <a16:creationId xmlns:a16="http://schemas.microsoft.com/office/drawing/2014/main" id="{19033134-0BFA-AE4B-AAE3-E9131EA31B93}"/>
+                <a16:creationId xmlns:a16="http://schemas.microsoft.com/office/drawing/2014/main" id="{9D70707D-CDCD-8E4A-9738-E3DB279BB242}"/>
               </a:ext>
             </a:extLst>
           </p:cNvPr>
@@ -9010,22 +9011,18 @@
           <a:lstStyle/>
           <a:p>
             <a:r>
-              <a:rPr lang="de-DE" dirty="0" err="1"/>
+              <a:rPr lang="en-US" dirty="0"/>
               <a:t>Grid</a:t>
             </a:r>
-            <a:r>
-              <a:rPr lang="de-DE" dirty="0"/>
-              <a:t>: Container Properties</a:t>
-            </a:r>
-          </a:p>
-        </p:txBody>
-      </p:sp>
-      <p:sp>
-        <p:nvSpPr>
-          <p:cNvPr id="7" name="Inhaltsplatzhalter 6">
+          </a:p>
+        </p:txBody>
+      </p:sp>
+      <p:sp>
+        <p:nvSpPr>
+          <p:cNvPr id="4" name="Inhaltsplatzhalter 3">
             <a:extLst>
               <a:ext uri="{FF2B5EF4-FFF2-40B4-BE49-F238E27FC236}">
-                <a16:creationId xmlns:a16="http://schemas.microsoft.com/office/drawing/2014/main" id="{662274F8-DBDF-1941-95E5-496B43E07EBD}"/>
+                <a16:creationId xmlns:a16="http://schemas.microsoft.com/office/drawing/2014/main" id="{5F467F9B-4189-6546-A21B-AF6B8FA98FE2}"/>
               </a:ext>
             </a:extLst>
           </p:cNvPr>
@@ -9036,265 +9033,67 @@
             <p:ph idx="1"/>
           </p:nvPr>
         </p:nvSpPr>
-        <p:spPr>
-          <a:xfrm>
-            <a:off x="680321" y="2336873"/>
-            <a:ext cx="9915289" cy="3599316"/>
-          </a:xfrm>
-        </p:spPr>
+        <p:spPr/>
         <p:txBody>
           <a:bodyPr/>
           <a:lstStyle/>
           <a:p>
             <a:r>
-              <a:rPr lang="de-CH" dirty="0" err="1">
-                <a:solidFill>
-                  <a:schemeClr val="bg1"/>
-                </a:solidFill>
-              </a:rPr>
+              <a:rPr lang="de-DE" dirty="0" err="1"/>
+              <a:t>Grid</a:t>
+            </a:r>
+            <a:r>
+              <a:rPr lang="de-DE" dirty="0"/>
+              <a:t> Layout auf dem Container (Parent Element) definieren</a:t>
+            </a:r>
+            <a:br>
+              <a:rPr lang="de-DE" dirty="0"/>
+            </a:br>
+            <a:r>
+              <a:rPr lang="de-DE" b="1" dirty="0" err="1"/>
+              <a:t>display</a:t>
+            </a:r>
+            <a:r>
+              <a:rPr lang="de-DE" b="1" dirty="0"/>
+              <a:t>: </a:t>
+            </a:r>
+            <a:r>
+              <a:rPr lang="de-DE" b="1" dirty="0" err="1"/>
               <a:t>grid</a:t>
             </a:r>
-            <a:r>
-              <a:rPr lang="de-CH" dirty="0">
-                <a:solidFill>
-                  <a:schemeClr val="bg1"/>
-                </a:solidFill>
-              </a:rPr>
-              <a:t>-template-</a:t>
-            </a:r>
-            <a:r>
-              <a:rPr lang="de-CH" dirty="0" err="1">
-                <a:solidFill>
-                  <a:schemeClr val="bg1"/>
-                </a:solidFill>
-              </a:rPr>
-              <a:t>columns</a:t>
-            </a:r>
-            <a:r>
-              <a:rPr lang="de-CH" dirty="0"/>
-              <a:t>:  Definiert die Anzahl und Grösse der Spalten</a:t>
-            </a:r>
-            <a:r>
-              <a:rPr lang="de-CH" b="1" dirty="0"/>
-              <a:t>.</a:t>
+            <a:endParaRPr lang="de-DE" b="1" dirty="0"/>
+          </a:p>
+          <a:p>
+            <a:r>
+              <a:rPr lang="de-DE" dirty="0"/>
+              <a:t>Gute Doku:</a:t>
             </a:r>
             <a:br>
-              <a:rPr lang="de-CH" b="1" dirty="0"/>
+              <a:rPr lang="de-DE" dirty="0"/>
             </a:br>
             <a:r>
-              <a:rPr lang="de-CH" sz="2000" dirty="0" err="1">
-                <a:latin typeface="Arial" panose="020B0604020202020204" pitchFamily="34" charset="0"/>
-                <a:cs typeface="Arial" panose="020B0604020202020204" pitchFamily="34" charset="0"/>
-              </a:rPr>
-              <a:t>grid</a:t>
-            </a:r>
-            <a:r>
-              <a:rPr lang="de-CH" sz="2000" dirty="0">
-                <a:latin typeface="Arial" panose="020B0604020202020204" pitchFamily="34" charset="0"/>
-                <a:cs typeface="Arial" panose="020B0604020202020204" pitchFamily="34" charset="0"/>
-              </a:rPr>
-              <a:t>-template-</a:t>
-            </a:r>
-            <a:r>
-              <a:rPr lang="de-CH" sz="2000" dirty="0" err="1">
-                <a:latin typeface="Arial" panose="020B0604020202020204" pitchFamily="34" charset="0"/>
-                <a:cs typeface="Arial" panose="020B0604020202020204" pitchFamily="34" charset="0"/>
-              </a:rPr>
-              <a:t>columns</a:t>
-            </a:r>
-            <a:r>
-              <a:rPr lang="de-CH" sz="2000" dirty="0">
-                <a:latin typeface="Arial" panose="020B0604020202020204" pitchFamily="34" charset="0"/>
-                <a:cs typeface="Arial" panose="020B0604020202020204" pitchFamily="34" charset="0"/>
-              </a:rPr>
-              <a:t>: 20% 60% 20%;</a:t>
-            </a:r>
-            <a:br>
-              <a:rPr lang="de-CH" sz="2000" dirty="0">
-                <a:latin typeface="Arial" panose="020B0604020202020204" pitchFamily="34" charset="0"/>
-                <a:cs typeface="Arial" panose="020B0604020202020204" pitchFamily="34" charset="0"/>
-              </a:rPr>
-            </a:br>
-            <a:r>
-              <a:rPr lang="de-CH" sz="2000" dirty="0" err="1">
-                <a:latin typeface="Arial" panose="020B0604020202020204" pitchFamily="34" charset="0"/>
-                <a:cs typeface="Arial" panose="020B0604020202020204" pitchFamily="34" charset="0"/>
-              </a:rPr>
-              <a:t>grid</a:t>
-            </a:r>
-            <a:r>
-              <a:rPr lang="de-CH" sz="2000" dirty="0">
-                <a:latin typeface="Arial" panose="020B0604020202020204" pitchFamily="34" charset="0"/>
-                <a:cs typeface="Arial" panose="020B0604020202020204" pitchFamily="34" charset="0"/>
-              </a:rPr>
-              <a:t>-template-</a:t>
-            </a:r>
-            <a:r>
-              <a:rPr lang="de-CH" sz="2000" dirty="0" err="1">
-                <a:latin typeface="Arial" panose="020B0604020202020204" pitchFamily="34" charset="0"/>
-                <a:cs typeface="Arial" panose="020B0604020202020204" pitchFamily="34" charset="0"/>
-              </a:rPr>
-              <a:t>columns</a:t>
-            </a:r>
-            <a:r>
-              <a:rPr lang="de-CH" sz="2000" dirty="0">
-                <a:latin typeface="Arial" panose="020B0604020202020204" pitchFamily="34" charset="0"/>
-                <a:cs typeface="Arial" panose="020B0604020202020204" pitchFamily="34" charset="0"/>
-              </a:rPr>
-              <a:t>: [eins] 20% [zwei] 60% [drei] 20% [vier];</a:t>
-            </a:r>
-            <a:br>
-              <a:rPr lang="de-CH" sz="2000" b="1" dirty="0">
-                <a:latin typeface="Arial" panose="020B0604020202020204" pitchFamily="34" charset="0"/>
-                <a:cs typeface="Arial" panose="020B0604020202020204" pitchFamily="34" charset="0"/>
-              </a:rPr>
-            </a:br>
-            <a:endParaRPr lang="de-CH" sz="2000" dirty="0">
-              <a:latin typeface="Arial" panose="020B0604020202020204" pitchFamily="34" charset="0"/>
-              <a:cs typeface="Arial" panose="020B0604020202020204" pitchFamily="34" charset="0"/>
-            </a:endParaRPr>
-          </a:p>
-          <a:p>
-            <a:r>
-              <a:rPr lang="de-CH" dirty="0" err="1">
-                <a:solidFill>
-                  <a:schemeClr val="bg1"/>
-                </a:solidFill>
-              </a:rPr>
-              <a:t>grid</a:t>
-            </a:r>
-            <a:r>
-              <a:rPr lang="de-CH" dirty="0">
-                <a:solidFill>
-                  <a:schemeClr val="bg1"/>
-                </a:solidFill>
-              </a:rPr>
-              <a:t>-template-</a:t>
-            </a:r>
-            <a:r>
-              <a:rPr lang="de-CH" dirty="0" err="1">
-                <a:solidFill>
-                  <a:schemeClr val="bg1"/>
-                </a:solidFill>
-              </a:rPr>
-              <a:t>rows</a:t>
-            </a:r>
-            <a:r>
-              <a:rPr lang="de-CH" dirty="0"/>
-              <a:t>: </a:t>
-            </a:r>
-            <a:r>
-              <a:rPr lang="de-CH" dirty="0" err="1"/>
-              <a:t>Definert</a:t>
-            </a:r>
-            <a:r>
-              <a:rPr lang="de-CH" dirty="0"/>
-              <a:t> die Anzahl und Grösse der Reihen</a:t>
-            </a:r>
-            <a:r>
-              <a:rPr lang="de-CH" b="1" dirty="0"/>
-              <a:t>.</a:t>
-            </a:r>
-            <a:br>
-              <a:rPr lang="de-CH" b="1" dirty="0"/>
-            </a:br>
-            <a:r>
-              <a:rPr lang="de-CH" sz="2000" dirty="0" err="1">
-                <a:latin typeface="Arial" panose="020B0604020202020204" pitchFamily="34" charset="0"/>
-                <a:cs typeface="Arial" panose="020B0604020202020204" pitchFamily="34" charset="0"/>
-              </a:rPr>
-              <a:t>grid</a:t>
-            </a:r>
-            <a:r>
-              <a:rPr lang="de-CH" sz="2000" dirty="0">
-                <a:latin typeface="Arial" panose="020B0604020202020204" pitchFamily="34" charset="0"/>
-                <a:cs typeface="Arial" panose="020B0604020202020204" pitchFamily="34" charset="0"/>
-              </a:rPr>
-              <a:t>-template-</a:t>
-            </a:r>
-            <a:r>
-              <a:rPr lang="de-CH" sz="2000" dirty="0" err="1">
-                <a:latin typeface="Arial" panose="020B0604020202020204" pitchFamily="34" charset="0"/>
-                <a:cs typeface="Arial" panose="020B0604020202020204" pitchFamily="34" charset="0"/>
-              </a:rPr>
-              <a:t>rows</a:t>
-            </a:r>
-            <a:r>
-              <a:rPr lang="de-CH" sz="2000" dirty="0">
-                <a:latin typeface="Arial" panose="020B0604020202020204" pitchFamily="34" charset="0"/>
-                <a:cs typeface="Arial" panose="020B0604020202020204" pitchFamily="34" charset="0"/>
-              </a:rPr>
-              <a:t>: 100px </a:t>
-            </a:r>
-            <a:r>
-              <a:rPr lang="de-CH" sz="2000" dirty="0" err="1">
-                <a:latin typeface="Arial" panose="020B0604020202020204" pitchFamily="34" charset="0"/>
-                <a:cs typeface="Arial" panose="020B0604020202020204" pitchFamily="34" charset="0"/>
-              </a:rPr>
-              <a:t>auto</a:t>
-            </a:r>
-            <a:r>
-              <a:rPr lang="de-CH" sz="2000" dirty="0">
-                <a:latin typeface="Arial" panose="020B0604020202020204" pitchFamily="34" charset="0"/>
-                <a:cs typeface="Arial" panose="020B0604020202020204" pitchFamily="34" charset="0"/>
-              </a:rPr>
-              <a:t> 100px;</a:t>
-            </a:r>
-            <a:br>
-              <a:rPr lang="de-CH" sz="2000" dirty="0">
-                <a:latin typeface="Arial" panose="020B0604020202020204" pitchFamily="34" charset="0"/>
-                <a:cs typeface="Arial" panose="020B0604020202020204" pitchFamily="34" charset="0"/>
-              </a:rPr>
-            </a:br>
-            <a:r>
-              <a:rPr lang="de-CH" sz="2000" dirty="0" err="1">
-                <a:latin typeface="Arial" panose="020B0604020202020204" pitchFamily="34" charset="0"/>
-                <a:cs typeface="Arial" panose="020B0604020202020204" pitchFamily="34" charset="0"/>
-              </a:rPr>
-              <a:t>grid</a:t>
-            </a:r>
-            <a:r>
-              <a:rPr lang="de-CH" sz="2000" dirty="0">
-                <a:latin typeface="Arial" panose="020B0604020202020204" pitchFamily="34" charset="0"/>
-                <a:cs typeface="Arial" panose="020B0604020202020204" pitchFamily="34" charset="0"/>
-              </a:rPr>
-              <a:t>-template-</a:t>
-            </a:r>
-            <a:r>
-              <a:rPr lang="de-CH" sz="2000" dirty="0" err="1">
-                <a:latin typeface="Arial" panose="020B0604020202020204" pitchFamily="34" charset="0"/>
-                <a:cs typeface="Arial" panose="020B0604020202020204" pitchFamily="34" charset="0"/>
-              </a:rPr>
-              <a:t>rows</a:t>
-            </a:r>
-            <a:r>
-              <a:rPr lang="de-CH" sz="2000" dirty="0">
-                <a:latin typeface="Arial" panose="020B0604020202020204" pitchFamily="34" charset="0"/>
-                <a:cs typeface="Arial" panose="020B0604020202020204" pitchFamily="34" charset="0"/>
-              </a:rPr>
-              <a:t>: [row1] 100px [row2] </a:t>
-            </a:r>
-            <a:r>
-              <a:rPr lang="de-CH" sz="2000" dirty="0" err="1">
-                <a:latin typeface="Arial" panose="020B0604020202020204" pitchFamily="34" charset="0"/>
-                <a:cs typeface="Arial" panose="020B0604020202020204" pitchFamily="34" charset="0"/>
-              </a:rPr>
-              <a:t>auto</a:t>
-            </a:r>
-            <a:r>
-              <a:rPr lang="de-CH" sz="2000" dirty="0">
-                <a:latin typeface="Arial" panose="020B0604020202020204" pitchFamily="34" charset="0"/>
-                <a:cs typeface="Arial" panose="020B0604020202020204" pitchFamily="34" charset="0"/>
-              </a:rPr>
-              <a:t> [row3] 100px [ende];</a:t>
-            </a:r>
+              <a:rPr lang="de-DE" dirty="0">
+                <a:hlinkClick r:id="rId2"/>
+              </a:rPr>
+              <a:t>https://css-tricks.com/snippets/css/complete-guide-grid/</a:t>
+            </a:r>
+            <a:endParaRPr lang="de-DE" dirty="0"/>
+          </a:p>
+          <a:p>
+            <a:pPr marL="0" indent="0">
+              <a:buNone/>
+            </a:pPr>
+            <a:endParaRPr lang="de-DE" dirty="0"/>
+          </a:p>
+          <a:p>
+            <a:endParaRPr lang="de-DE" dirty="0"/>
           </a:p>
         </p:txBody>
       </p:sp>
     </p:spTree>
     <p:extLst>
       <p:ext uri="{BB962C8B-B14F-4D97-AF65-F5344CB8AC3E}">
-        <p14:creationId xmlns:p14="http://schemas.microsoft.com/office/powerpoint/2010/main" val="714284251"/>
+        <p14:creationId xmlns:p14="http://schemas.microsoft.com/office/powerpoint/2010/main" val="366060195"/>
       </p:ext>
     </p:extLst>
   </p:cSld>
@@ -9326,7 +9125,7 @@
           <p:cNvPr id="2" name="Titel 1">
             <a:extLst>
               <a:ext uri="{FF2B5EF4-FFF2-40B4-BE49-F238E27FC236}">
-                <a16:creationId xmlns:a16="http://schemas.microsoft.com/office/drawing/2014/main" id="{10085994-E9B3-9C49-88DA-85CB7896D777}"/>
+                <a16:creationId xmlns:a16="http://schemas.microsoft.com/office/drawing/2014/main" id="{19033134-0BFA-AE4B-AAE3-E9131EA31B93}"/>
               </a:ext>
             </a:extLst>
           </p:cNvPr>
@@ -9353,171 +9152,281 @@
           </a:p>
         </p:txBody>
       </p:sp>
-      <p:pic>
-        <p:nvPicPr>
-          <p:cNvPr id="9" name="Inhaltsplatzhalter 8">
+      <p:sp>
+        <p:nvSpPr>
+          <p:cNvPr id="7" name="Inhaltsplatzhalter 6">
             <a:extLst>
               <a:ext uri="{FF2B5EF4-FFF2-40B4-BE49-F238E27FC236}">
-                <a16:creationId xmlns:a16="http://schemas.microsoft.com/office/drawing/2014/main" id="{C644C42D-72EF-2A48-816F-36D82961D15D}"/>
+                <a16:creationId xmlns:a16="http://schemas.microsoft.com/office/drawing/2014/main" id="{662274F8-DBDF-1941-95E5-496B43E07EBD}"/>
               </a:ext>
             </a:extLst>
           </p:cNvPr>
-          <p:cNvPicPr>
-            <a:picLocks noGrp="1" noChangeAspect="1"/>
-          </p:cNvPicPr>
+          <p:cNvSpPr>
+            <a:spLocks noGrp="1"/>
+          </p:cNvSpPr>
           <p:nvPr>
             <p:ph idx="1"/>
           </p:nvPr>
-        </p:nvPicPr>
-        <p:blipFill>
-          <a:blip r:embed="rId2"/>
-          <a:stretch>
-            <a:fillRect/>
-          </a:stretch>
-        </p:blipFill>
+        </p:nvSpPr>
         <p:spPr>
           <a:xfrm>
-            <a:off x="889798" y="3389272"/>
-            <a:ext cx="6592171" cy="2916163"/>
+            <a:off x="680321" y="2336873"/>
+            <a:ext cx="9915289" cy="3599316"/>
           </a:xfrm>
         </p:spPr>
-      </p:pic>
-      <p:sp>
-        <p:nvSpPr>
-          <p:cNvPr id="10" name="Rechteck 9">
-            <a:extLst>
-              <a:ext uri="{FF2B5EF4-FFF2-40B4-BE49-F238E27FC236}">
-                <a16:creationId xmlns:a16="http://schemas.microsoft.com/office/drawing/2014/main" id="{5C1814EE-CFB9-BA40-8AAF-2BE7E486CDD9}"/>
-              </a:ext>
-            </a:extLst>
-          </p:cNvPr>
-          <p:cNvSpPr/>
-          <p:nvPr/>
-        </p:nvSpPr>
-        <p:spPr>
-          <a:xfrm>
-            <a:off x="889798" y="2281276"/>
-            <a:ext cx="4172937" cy="369332"/>
-          </a:xfrm>
-          <a:prstGeom prst="rect">
-            <a:avLst/>
-          </a:prstGeom>
-        </p:spPr>
-        <p:txBody>
-          <a:bodyPr wrap="none">
-            <a:spAutoFit/>
-          </a:bodyPr>
+        <p:txBody>
+          <a:bodyPr/>
           <a:lstStyle/>
           <a:p>
             <a:r>
               <a:rPr lang="de-CH" dirty="0" err="1">
-                <a:latin typeface="Arial" panose="020B0604020202020204" pitchFamily="34" charset="0"/>
-                <a:cs typeface="Arial" panose="020B0604020202020204" pitchFamily="34" charset="0"/>
+                <a:solidFill>
+                  <a:schemeClr val="bg1"/>
+                </a:solidFill>
               </a:rPr>
               <a:t>grid</a:t>
             </a:r>
             <a:r>
               <a:rPr lang="de-CH" dirty="0">
-                <a:latin typeface="Arial" panose="020B0604020202020204" pitchFamily="34" charset="0"/>
-                <a:cs typeface="Arial" panose="020B0604020202020204" pitchFamily="34" charset="0"/>
+                <a:solidFill>
+                  <a:schemeClr val="bg1"/>
+                </a:solidFill>
               </a:rPr>
               <a:t>-template-</a:t>
             </a:r>
             <a:r>
               <a:rPr lang="de-CH" dirty="0" err="1">
-                <a:latin typeface="Arial" panose="020B0604020202020204" pitchFamily="34" charset="0"/>
-                <a:cs typeface="Arial" panose="020B0604020202020204" pitchFamily="34" charset="0"/>
+                <a:solidFill>
+                  <a:schemeClr val="bg1"/>
+                </a:solidFill>
               </a:rPr>
               <a:t>columns</a:t>
             </a:r>
             <a:r>
+              <a:rPr lang="de-CH" dirty="0"/>
+              <a:t>:  Definiert die Anzahl und Grösse der Spalten</a:t>
+            </a:r>
+            <a:r>
+              <a:rPr lang="de-CH" b="1" dirty="0"/>
+              <a:t>.</a:t>
+            </a:r>
+            <a:br>
+              <a:rPr lang="de-CH" b="1" dirty="0"/>
+            </a:br>
+            <a:r>
+              <a:rPr lang="de-CH" sz="2000" dirty="0" err="1">
+                <a:latin typeface="Arial" panose="020B0604020202020204" pitchFamily="34" charset="0"/>
+                <a:cs typeface="Arial" panose="020B0604020202020204" pitchFamily="34" charset="0"/>
+              </a:rPr>
+              <a:t>grid</a:t>
+            </a:r>
+            <a:r>
+              <a:rPr lang="de-CH" sz="2000" dirty="0">
+                <a:latin typeface="Arial" panose="020B0604020202020204" pitchFamily="34" charset="0"/>
+                <a:cs typeface="Arial" panose="020B0604020202020204" pitchFamily="34" charset="0"/>
+              </a:rPr>
+              <a:t>-template-</a:t>
+            </a:r>
+            <a:r>
+              <a:rPr lang="de-CH" sz="2000" dirty="0" err="1">
+                <a:latin typeface="Arial" panose="020B0604020202020204" pitchFamily="34" charset="0"/>
+                <a:cs typeface="Arial" panose="020B0604020202020204" pitchFamily="34" charset="0"/>
+              </a:rPr>
+              <a:t>columns</a:t>
+            </a:r>
+            <a:r>
+              <a:rPr lang="de-CH" sz="2000" dirty="0">
+                <a:latin typeface="Arial" panose="020B0604020202020204" pitchFamily="34" charset="0"/>
+                <a:cs typeface="Arial" panose="020B0604020202020204" pitchFamily="34" charset="0"/>
+              </a:rPr>
+              <a:t>: 20% 60% 20%;</a:t>
+            </a:r>
+            <a:br>
+              <a:rPr lang="de-CH" sz="2000" dirty="0">
+                <a:latin typeface="Arial" panose="020B0604020202020204" pitchFamily="34" charset="0"/>
+                <a:cs typeface="Arial" panose="020B0604020202020204" pitchFamily="34" charset="0"/>
+              </a:rPr>
+            </a:br>
+            <a:r>
+              <a:rPr lang="de-CH" sz="2000" dirty="0" err="1">
+                <a:latin typeface="Arial" panose="020B0604020202020204" pitchFamily="34" charset="0"/>
+                <a:cs typeface="Arial" panose="020B0604020202020204" pitchFamily="34" charset="0"/>
+              </a:rPr>
+              <a:t>grid</a:t>
+            </a:r>
+            <a:r>
+              <a:rPr lang="de-CH" sz="2000" dirty="0">
+                <a:latin typeface="Arial" panose="020B0604020202020204" pitchFamily="34" charset="0"/>
+                <a:cs typeface="Arial" panose="020B0604020202020204" pitchFamily="34" charset="0"/>
+              </a:rPr>
+              <a:t>-template-</a:t>
+            </a:r>
+            <a:r>
+              <a:rPr lang="de-CH" sz="2000" dirty="0" err="1">
+                <a:latin typeface="Arial" panose="020B0604020202020204" pitchFamily="34" charset="0"/>
+                <a:cs typeface="Arial" panose="020B0604020202020204" pitchFamily="34" charset="0"/>
+              </a:rPr>
+              <a:t>columns</a:t>
+            </a:r>
+            <a:r>
+              <a:rPr lang="de-CH" sz="2000" dirty="0">
+                <a:latin typeface="Arial" panose="020B0604020202020204" pitchFamily="34" charset="0"/>
+                <a:cs typeface="Arial" panose="020B0604020202020204" pitchFamily="34" charset="0"/>
+              </a:rPr>
+              <a:t>: [eins] 20% [zwei] 60% [drei] 20% [vier];</a:t>
+            </a:r>
+            <a:br>
+              <a:rPr lang="de-CH" sz="2000" b="1" dirty="0">
+                <a:latin typeface="Arial" panose="020B0604020202020204" pitchFamily="34" charset="0"/>
+                <a:cs typeface="Arial" panose="020B0604020202020204" pitchFamily="34" charset="0"/>
+              </a:rPr>
+            </a:br>
+            <a:endParaRPr lang="de-CH" sz="2000" dirty="0">
+              <a:latin typeface="Arial" panose="020B0604020202020204" pitchFamily="34" charset="0"/>
+              <a:cs typeface="Arial" panose="020B0604020202020204" pitchFamily="34" charset="0"/>
+            </a:endParaRPr>
+          </a:p>
+          <a:p>
+            <a:r>
+              <a:rPr lang="de-CH" dirty="0" err="1">
+                <a:solidFill>
+                  <a:schemeClr val="bg1"/>
+                </a:solidFill>
+              </a:rPr>
+              <a:t>grid</a:t>
+            </a:r>
+            <a:r>
               <a:rPr lang="de-CH" dirty="0">
-                <a:latin typeface="Arial" panose="020B0604020202020204" pitchFamily="34" charset="0"/>
-                <a:cs typeface="Arial" panose="020B0604020202020204" pitchFamily="34" charset="0"/>
-              </a:rPr>
-              <a:t>: 20% 60% 20%;</a:t>
-            </a:r>
-            <a:endParaRPr lang="de-DE" dirty="0"/>
-          </a:p>
-        </p:txBody>
-      </p:sp>
-      <p:sp>
-        <p:nvSpPr>
-          <p:cNvPr id="11" name="Rechteck 10">
-            <a:extLst>
-              <a:ext uri="{FF2B5EF4-FFF2-40B4-BE49-F238E27FC236}">
-                <a16:creationId xmlns:a16="http://schemas.microsoft.com/office/drawing/2014/main" id="{E743F98C-590F-2345-AA1A-E117AC7E1BAF}"/>
-              </a:ext>
-            </a:extLst>
-          </p:cNvPr>
-          <p:cNvSpPr/>
-          <p:nvPr/>
-        </p:nvSpPr>
-        <p:spPr>
-          <a:xfrm>
-            <a:off x="889798" y="2650608"/>
-            <a:ext cx="6096000" cy="369332"/>
-          </a:xfrm>
-          <a:prstGeom prst="rect">
-            <a:avLst/>
-          </a:prstGeom>
-        </p:spPr>
-        <p:txBody>
-          <a:bodyPr>
-            <a:spAutoFit/>
-          </a:bodyPr>
-          <a:lstStyle/>
-          <a:p>
+                <a:solidFill>
+                  <a:schemeClr val="bg1"/>
+                </a:solidFill>
+              </a:rPr>
+              <a:t>-template-</a:t>
+            </a:r>
             <a:r>
               <a:rPr lang="de-CH" dirty="0" err="1">
+                <a:solidFill>
+                  <a:schemeClr val="bg1"/>
+                </a:solidFill>
+              </a:rPr>
+              <a:t>rows</a:t>
+            </a:r>
+            <a:r>
+              <a:rPr lang="de-CH" dirty="0"/>
+              <a:t>: </a:t>
+            </a:r>
+            <a:r>
+              <a:rPr lang="de-CH" dirty="0" err="1"/>
+              <a:t>Definert</a:t>
+            </a:r>
+            <a:r>
+              <a:rPr lang="de-CH" dirty="0"/>
+              <a:t> die Anzahl und Grösse der Reihen</a:t>
+            </a:r>
+            <a:r>
+              <a:rPr lang="de-CH" b="1" dirty="0"/>
+              <a:t>.</a:t>
+            </a:r>
+            <a:br>
+              <a:rPr lang="de-CH" b="1" dirty="0"/>
+            </a:br>
+            <a:r>
+              <a:rPr lang="de-CH" sz="2000" dirty="0" err="1">
                 <a:latin typeface="Arial" panose="020B0604020202020204" pitchFamily="34" charset="0"/>
                 <a:cs typeface="Arial" panose="020B0604020202020204" pitchFamily="34" charset="0"/>
               </a:rPr>
               <a:t>grid</a:t>
             </a:r>
             <a:r>
-              <a:rPr lang="de-CH" dirty="0">
+              <a:rPr lang="de-CH" sz="2000" dirty="0">
                 <a:latin typeface="Arial" panose="020B0604020202020204" pitchFamily="34" charset="0"/>
                 <a:cs typeface="Arial" panose="020B0604020202020204" pitchFamily="34" charset="0"/>
               </a:rPr>
               <a:t>-template-</a:t>
             </a:r>
             <a:r>
-              <a:rPr lang="de-CH" dirty="0" err="1">
+              <a:rPr lang="de-CH" sz="2000" dirty="0" err="1">
                 <a:latin typeface="Arial" panose="020B0604020202020204" pitchFamily="34" charset="0"/>
                 <a:cs typeface="Arial" panose="020B0604020202020204" pitchFamily="34" charset="0"/>
               </a:rPr>
               <a:t>rows</a:t>
             </a:r>
             <a:r>
-              <a:rPr lang="de-CH" dirty="0">
+              <a:rPr lang="de-CH" sz="2000" dirty="0">
                 <a:latin typeface="Arial" panose="020B0604020202020204" pitchFamily="34" charset="0"/>
                 <a:cs typeface="Arial" panose="020B0604020202020204" pitchFamily="34" charset="0"/>
               </a:rPr>
               <a:t>: 100px </a:t>
             </a:r>
             <a:r>
-              <a:rPr lang="de-CH" dirty="0" err="1">
+              <a:rPr lang="de-CH" sz="2000" dirty="0" err="1">
                 <a:latin typeface="Arial" panose="020B0604020202020204" pitchFamily="34" charset="0"/>
                 <a:cs typeface="Arial" panose="020B0604020202020204" pitchFamily="34" charset="0"/>
               </a:rPr>
               <a:t>auto</a:t>
             </a:r>
             <a:r>
-              <a:rPr lang="de-CH" dirty="0">
+              <a:rPr lang="de-CH" sz="2000" dirty="0">
                 <a:latin typeface="Arial" panose="020B0604020202020204" pitchFamily="34" charset="0"/>
                 <a:cs typeface="Arial" panose="020B0604020202020204" pitchFamily="34" charset="0"/>
               </a:rPr>
               <a:t> 100px;</a:t>
             </a:r>
-            <a:endParaRPr lang="de-DE" dirty="0"/>
+            <a:br>
+              <a:rPr lang="de-CH" sz="2000" dirty="0">
+                <a:latin typeface="Arial" panose="020B0604020202020204" pitchFamily="34" charset="0"/>
+                <a:cs typeface="Arial" panose="020B0604020202020204" pitchFamily="34" charset="0"/>
+              </a:rPr>
+            </a:br>
+            <a:r>
+              <a:rPr lang="de-CH" sz="2000" dirty="0" err="1">
+                <a:latin typeface="Arial" panose="020B0604020202020204" pitchFamily="34" charset="0"/>
+                <a:cs typeface="Arial" panose="020B0604020202020204" pitchFamily="34" charset="0"/>
+              </a:rPr>
+              <a:t>grid</a:t>
+            </a:r>
+            <a:r>
+              <a:rPr lang="de-CH" sz="2000" dirty="0">
+                <a:latin typeface="Arial" panose="020B0604020202020204" pitchFamily="34" charset="0"/>
+                <a:cs typeface="Arial" panose="020B0604020202020204" pitchFamily="34" charset="0"/>
+              </a:rPr>
+              <a:t>-template-</a:t>
+            </a:r>
+            <a:r>
+              <a:rPr lang="de-CH" sz="2000" dirty="0" err="1">
+                <a:latin typeface="Arial" panose="020B0604020202020204" pitchFamily="34" charset="0"/>
+                <a:cs typeface="Arial" panose="020B0604020202020204" pitchFamily="34" charset="0"/>
+              </a:rPr>
+              <a:t>rows</a:t>
+            </a:r>
+            <a:r>
+              <a:rPr lang="de-CH" sz="2000" dirty="0">
+                <a:latin typeface="Arial" panose="020B0604020202020204" pitchFamily="34" charset="0"/>
+                <a:cs typeface="Arial" panose="020B0604020202020204" pitchFamily="34" charset="0"/>
+              </a:rPr>
+              <a:t>: [row1] 100px [row2] </a:t>
+            </a:r>
+            <a:r>
+              <a:rPr lang="de-CH" sz="2000" dirty="0" err="1">
+                <a:latin typeface="Arial" panose="020B0604020202020204" pitchFamily="34" charset="0"/>
+                <a:cs typeface="Arial" panose="020B0604020202020204" pitchFamily="34" charset="0"/>
+              </a:rPr>
+              <a:t>auto</a:t>
+            </a:r>
+            <a:r>
+              <a:rPr lang="de-CH" sz="2000" dirty="0">
+                <a:latin typeface="Arial" panose="020B0604020202020204" pitchFamily="34" charset="0"/>
+                <a:cs typeface="Arial" panose="020B0604020202020204" pitchFamily="34" charset="0"/>
+              </a:rPr>
+              <a:t> [row3] 100px [ende];</a:t>
+            </a:r>
           </a:p>
         </p:txBody>
       </p:sp>
     </p:spTree>
     <p:extLst>
       <p:ext uri="{BB962C8B-B14F-4D97-AF65-F5344CB8AC3E}">
-        <p14:creationId xmlns:p14="http://schemas.microsoft.com/office/powerpoint/2010/main" val="3096845263"/>
+        <p14:creationId xmlns:p14="http://schemas.microsoft.com/office/powerpoint/2010/main" val="714284251"/>
       </p:ext>
     </p:extLst>
   </p:cSld>
@@ -9549,7 +9458,7 @@
           <p:cNvPr id="2" name="Titel 1">
             <a:extLst>
               <a:ext uri="{FF2B5EF4-FFF2-40B4-BE49-F238E27FC236}">
-                <a16:creationId xmlns:a16="http://schemas.microsoft.com/office/drawing/2014/main" id="{42A5B1AA-ADEF-F348-A0E4-381E0CA6525F}"/>
+                <a16:creationId xmlns:a16="http://schemas.microsoft.com/office/drawing/2014/main" id="{10085994-E9B3-9C49-88DA-85CB7896D777}"/>
               </a:ext>
             </a:extLst>
           </p:cNvPr>
@@ -9578,10 +9487,10 @@
       </p:sp>
       <p:pic>
         <p:nvPicPr>
-          <p:cNvPr id="5" name="Inhaltsplatzhalter 4">
+          <p:cNvPr id="9" name="Inhaltsplatzhalter 8">
             <a:extLst>
               <a:ext uri="{FF2B5EF4-FFF2-40B4-BE49-F238E27FC236}">
-                <a16:creationId xmlns:a16="http://schemas.microsoft.com/office/drawing/2014/main" id="{09F627C6-0BE4-2145-A7D3-7F54CD309458}"/>
+                <a16:creationId xmlns:a16="http://schemas.microsoft.com/office/drawing/2014/main" id="{C644C42D-72EF-2A48-816F-36D82961D15D}"/>
               </a:ext>
             </a:extLst>
           </p:cNvPr>
@@ -9600,17 +9509,17 @@
         </p:blipFill>
         <p:spPr>
           <a:xfrm>
-            <a:off x="680321" y="3343910"/>
-            <a:ext cx="7013709" cy="3022600"/>
+            <a:off x="889798" y="3389272"/>
+            <a:ext cx="6592171" cy="2916163"/>
           </a:xfrm>
         </p:spPr>
       </p:pic>
       <p:sp>
         <p:nvSpPr>
-          <p:cNvPr id="6" name="Rechteck 5">
+          <p:cNvPr id="10" name="Rechteck 9">
             <a:extLst>
               <a:ext uri="{FF2B5EF4-FFF2-40B4-BE49-F238E27FC236}">
-                <a16:creationId xmlns:a16="http://schemas.microsoft.com/office/drawing/2014/main" id="{1EEC8D5E-3E9D-3E4E-B228-D0BB3D94818B}"/>
+                <a16:creationId xmlns:a16="http://schemas.microsoft.com/office/drawing/2014/main" id="{5C1814EE-CFB9-BA40-8AAF-2BE7E486CDD9}"/>
               </a:ext>
             </a:extLst>
           </p:cNvPr>
@@ -9619,15 +9528,15 @@
         </p:nvSpPr>
         <p:spPr>
           <a:xfrm>
-            <a:off x="680321" y="2317165"/>
-            <a:ext cx="6873240" cy="369332"/>
+            <a:off x="889798" y="2281276"/>
+            <a:ext cx="4172937" cy="369332"/>
           </a:xfrm>
           <a:prstGeom prst="rect">
             <a:avLst/>
           </a:prstGeom>
         </p:spPr>
         <p:txBody>
-          <a:bodyPr wrap="square">
+          <a:bodyPr wrap="none">
             <a:spAutoFit/>
           </a:bodyPr>
           <a:lstStyle/>
@@ -9658,7 +9567,7 @@
                 <a:latin typeface="Arial" panose="020B0604020202020204" pitchFamily="34" charset="0"/>
                 <a:cs typeface="Arial" panose="020B0604020202020204" pitchFamily="34" charset="0"/>
               </a:rPr>
-              <a:t>: [eins] 20% [zwei] 60% [drei] 20% [vier];</a:t>
+              <a:t>: 20% 60% 20%;</a:t>
             </a:r>
             <a:endParaRPr lang="de-DE" dirty="0"/>
           </a:p>
@@ -9666,10 +9575,10 @@
       </p:sp>
       <p:sp>
         <p:nvSpPr>
-          <p:cNvPr id="7" name="Rechteck 6">
+          <p:cNvPr id="11" name="Rechteck 10">
             <a:extLst>
               <a:ext uri="{FF2B5EF4-FFF2-40B4-BE49-F238E27FC236}">
-                <a16:creationId xmlns:a16="http://schemas.microsoft.com/office/drawing/2014/main" id="{DEBF59EC-59FB-C14F-A76E-FCF584425CF1}"/>
+                <a16:creationId xmlns:a16="http://schemas.microsoft.com/office/drawing/2014/main" id="{E743F98C-590F-2345-AA1A-E117AC7E1BAF}"/>
               </a:ext>
             </a:extLst>
           </p:cNvPr>
@@ -9678,15 +9587,15 @@
         </p:nvSpPr>
         <p:spPr>
           <a:xfrm>
-            <a:off x="680321" y="2686497"/>
-            <a:ext cx="7044690" cy="369332"/>
+            <a:off x="889798" y="2650608"/>
+            <a:ext cx="6096000" cy="369332"/>
           </a:xfrm>
           <a:prstGeom prst="rect">
             <a:avLst/>
           </a:prstGeom>
         </p:spPr>
         <p:txBody>
-          <a:bodyPr wrap="square">
+          <a:bodyPr>
             <a:spAutoFit/>
           </a:bodyPr>
           <a:lstStyle/>
@@ -9717,7 +9626,7 @@
                 <a:latin typeface="Arial" panose="020B0604020202020204" pitchFamily="34" charset="0"/>
                 <a:cs typeface="Arial" panose="020B0604020202020204" pitchFamily="34" charset="0"/>
               </a:rPr>
-              <a:t>: [row1] 100px [row2] </a:t>
+              <a:t>: 100px </a:t>
             </a:r>
             <a:r>
               <a:rPr lang="de-CH" dirty="0" err="1">
@@ -9731,7 +9640,7 @@
                 <a:latin typeface="Arial" panose="020B0604020202020204" pitchFamily="34" charset="0"/>
                 <a:cs typeface="Arial" panose="020B0604020202020204" pitchFamily="34" charset="0"/>
               </a:rPr>
-              <a:t> [row3] 100px [ende];</a:t>
+              <a:t> 100px;</a:t>
             </a:r>
             <a:endParaRPr lang="de-DE" dirty="0"/>
           </a:p>
@@ -9740,7 +9649,7 @@
     </p:spTree>
     <p:extLst>
       <p:ext uri="{BB962C8B-B14F-4D97-AF65-F5344CB8AC3E}">
-        <p14:creationId xmlns:p14="http://schemas.microsoft.com/office/powerpoint/2010/main" val="1020404966"/>
+        <p14:creationId xmlns:p14="http://schemas.microsoft.com/office/powerpoint/2010/main" val="3096845263"/>
       </p:ext>
     </p:extLst>
   </p:cSld>
@@ -9772,6 +9681,229 @@
           <p:cNvPr id="2" name="Titel 1">
             <a:extLst>
               <a:ext uri="{FF2B5EF4-FFF2-40B4-BE49-F238E27FC236}">
+                <a16:creationId xmlns:a16="http://schemas.microsoft.com/office/drawing/2014/main" id="{42A5B1AA-ADEF-F348-A0E4-381E0CA6525F}"/>
+              </a:ext>
+            </a:extLst>
+          </p:cNvPr>
+          <p:cNvSpPr>
+            <a:spLocks noGrp="1"/>
+          </p:cNvSpPr>
+          <p:nvPr>
+            <p:ph type="title"/>
+          </p:nvPr>
+        </p:nvSpPr>
+        <p:spPr/>
+        <p:txBody>
+          <a:bodyPr/>
+          <a:lstStyle/>
+          <a:p>
+            <a:r>
+              <a:rPr lang="de-DE" dirty="0" err="1"/>
+              <a:t>Grid</a:t>
+            </a:r>
+            <a:r>
+              <a:rPr lang="de-DE" dirty="0"/>
+              <a:t>: Container Properties</a:t>
+            </a:r>
+          </a:p>
+        </p:txBody>
+      </p:sp>
+      <p:pic>
+        <p:nvPicPr>
+          <p:cNvPr id="5" name="Inhaltsplatzhalter 4">
+            <a:extLst>
+              <a:ext uri="{FF2B5EF4-FFF2-40B4-BE49-F238E27FC236}">
+                <a16:creationId xmlns:a16="http://schemas.microsoft.com/office/drawing/2014/main" id="{09F627C6-0BE4-2145-A7D3-7F54CD309458}"/>
+              </a:ext>
+            </a:extLst>
+          </p:cNvPr>
+          <p:cNvPicPr>
+            <a:picLocks noGrp="1" noChangeAspect="1"/>
+          </p:cNvPicPr>
+          <p:nvPr>
+            <p:ph idx="1"/>
+          </p:nvPr>
+        </p:nvPicPr>
+        <p:blipFill>
+          <a:blip r:embed="rId2"/>
+          <a:stretch>
+            <a:fillRect/>
+          </a:stretch>
+        </p:blipFill>
+        <p:spPr>
+          <a:xfrm>
+            <a:off x="680321" y="3343910"/>
+            <a:ext cx="7013709" cy="3022600"/>
+          </a:xfrm>
+        </p:spPr>
+      </p:pic>
+      <p:sp>
+        <p:nvSpPr>
+          <p:cNvPr id="6" name="Rechteck 5">
+            <a:extLst>
+              <a:ext uri="{FF2B5EF4-FFF2-40B4-BE49-F238E27FC236}">
+                <a16:creationId xmlns:a16="http://schemas.microsoft.com/office/drawing/2014/main" id="{1EEC8D5E-3E9D-3E4E-B228-D0BB3D94818B}"/>
+              </a:ext>
+            </a:extLst>
+          </p:cNvPr>
+          <p:cNvSpPr/>
+          <p:nvPr/>
+        </p:nvSpPr>
+        <p:spPr>
+          <a:xfrm>
+            <a:off x="680321" y="2317165"/>
+            <a:ext cx="6873240" cy="369332"/>
+          </a:xfrm>
+          <a:prstGeom prst="rect">
+            <a:avLst/>
+          </a:prstGeom>
+        </p:spPr>
+        <p:txBody>
+          <a:bodyPr wrap="square">
+            <a:spAutoFit/>
+          </a:bodyPr>
+          <a:lstStyle/>
+          <a:p>
+            <a:r>
+              <a:rPr lang="de-CH" dirty="0" err="1">
+                <a:latin typeface="Arial" panose="020B0604020202020204" pitchFamily="34" charset="0"/>
+                <a:cs typeface="Arial" panose="020B0604020202020204" pitchFamily="34" charset="0"/>
+              </a:rPr>
+              <a:t>grid</a:t>
+            </a:r>
+            <a:r>
+              <a:rPr lang="de-CH" dirty="0">
+                <a:latin typeface="Arial" panose="020B0604020202020204" pitchFamily="34" charset="0"/>
+                <a:cs typeface="Arial" panose="020B0604020202020204" pitchFamily="34" charset="0"/>
+              </a:rPr>
+              <a:t>-template-</a:t>
+            </a:r>
+            <a:r>
+              <a:rPr lang="de-CH" dirty="0" err="1">
+                <a:latin typeface="Arial" panose="020B0604020202020204" pitchFamily="34" charset="0"/>
+                <a:cs typeface="Arial" panose="020B0604020202020204" pitchFamily="34" charset="0"/>
+              </a:rPr>
+              <a:t>columns</a:t>
+            </a:r>
+            <a:r>
+              <a:rPr lang="de-CH" dirty="0">
+                <a:latin typeface="Arial" panose="020B0604020202020204" pitchFamily="34" charset="0"/>
+                <a:cs typeface="Arial" panose="020B0604020202020204" pitchFamily="34" charset="0"/>
+              </a:rPr>
+              <a:t>: [eins] 20% [zwei] 60% [drei] 20% [vier];</a:t>
+            </a:r>
+            <a:endParaRPr lang="de-DE" dirty="0"/>
+          </a:p>
+        </p:txBody>
+      </p:sp>
+      <p:sp>
+        <p:nvSpPr>
+          <p:cNvPr id="7" name="Rechteck 6">
+            <a:extLst>
+              <a:ext uri="{FF2B5EF4-FFF2-40B4-BE49-F238E27FC236}">
+                <a16:creationId xmlns:a16="http://schemas.microsoft.com/office/drawing/2014/main" id="{DEBF59EC-59FB-C14F-A76E-FCF584425CF1}"/>
+              </a:ext>
+            </a:extLst>
+          </p:cNvPr>
+          <p:cNvSpPr/>
+          <p:nvPr/>
+        </p:nvSpPr>
+        <p:spPr>
+          <a:xfrm>
+            <a:off x="680321" y="2686497"/>
+            <a:ext cx="7044690" cy="369332"/>
+          </a:xfrm>
+          <a:prstGeom prst="rect">
+            <a:avLst/>
+          </a:prstGeom>
+        </p:spPr>
+        <p:txBody>
+          <a:bodyPr wrap="square">
+            <a:spAutoFit/>
+          </a:bodyPr>
+          <a:lstStyle/>
+          <a:p>
+            <a:r>
+              <a:rPr lang="de-CH" dirty="0" err="1">
+                <a:latin typeface="Arial" panose="020B0604020202020204" pitchFamily="34" charset="0"/>
+                <a:cs typeface="Arial" panose="020B0604020202020204" pitchFamily="34" charset="0"/>
+              </a:rPr>
+              <a:t>grid</a:t>
+            </a:r>
+            <a:r>
+              <a:rPr lang="de-CH" dirty="0">
+                <a:latin typeface="Arial" panose="020B0604020202020204" pitchFamily="34" charset="0"/>
+                <a:cs typeface="Arial" panose="020B0604020202020204" pitchFamily="34" charset="0"/>
+              </a:rPr>
+              <a:t>-template-</a:t>
+            </a:r>
+            <a:r>
+              <a:rPr lang="de-CH" dirty="0" err="1">
+                <a:latin typeface="Arial" panose="020B0604020202020204" pitchFamily="34" charset="0"/>
+                <a:cs typeface="Arial" panose="020B0604020202020204" pitchFamily="34" charset="0"/>
+              </a:rPr>
+              <a:t>rows</a:t>
+            </a:r>
+            <a:r>
+              <a:rPr lang="de-CH" dirty="0">
+                <a:latin typeface="Arial" panose="020B0604020202020204" pitchFamily="34" charset="0"/>
+                <a:cs typeface="Arial" panose="020B0604020202020204" pitchFamily="34" charset="0"/>
+              </a:rPr>
+              <a:t>: [row1] 100px [row2] </a:t>
+            </a:r>
+            <a:r>
+              <a:rPr lang="de-CH" dirty="0" err="1">
+                <a:latin typeface="Arial" panose="020B0604020202020204" pitchFamily="34" charset="0"/>
+                <a:cs typeface="Arial" panose="020B0604020202020204" pitchFamily="34" charset="0"/>
+              </a:rPr>
+              <a:t>auto</a:t>
+            </a:r>
+            <a:r>
+              <a:rPr lang="de-CH" dirty="0">
+                <a:latin typeface="Arial" panose="020B0604020202020204" pitchFamily="34" charset="0"/>
+                <a:cs typeface="Arial" panose="020B0604020202020204" pitchFamily="34" charset="0"/>
+              </a:rPr>
+              <a:t> [row3] 100px [ende];</a:t>
+            </a:r>
+            <a:endParaRPr lang="de-DE" dirty="0"/>
+          </a:p>
+        </p:txBody>
+      </p:sp>
+    </p:spTree>
+    <p:extLst>
+      <p:ext uri="{BB962C8B-B14F-4D97-AF65-F5344CB8AC3E}">
+        <p14:creationId xmlns:p14="http://schemas.microsoft.com/office/powerpoint/2010/main" val="1020404966"/>
+      </p:ext>
+    </p:extLst>
+  </p:cSld>
+  <p:clrMapOvr>
+    <a:masterClrMapping/>
+  </p:clrMapOvr>
+</p:sld>
+</file>
+
+<file path=ppt/slides/slide104.xml><?xml version="1.0" encoding="utf-8"?>
+<p:sld xmlns:a="http://schemas.openxmlformats.org/drawingml/2006/main" xmlns:r="http://schemas.openxmlformats.org/officeDocument/2006/relationships" xmlns:p="http://schemas.openxmlformats.org/presentationml/2006/main">
+  <p:cSld>
+    <p:spTree>
+      <p:nvGrpSpPr>
+        <p:cNvPr id="1" name=""/>
+        <p:cNvGrpSpPr/>
+        <p:nvPr/>
+      </p:nvGrpSpPr>
+      <p:grpSpPr>
+        <a:xfrm>
+          <a:off x="0" y="0"/>
+          <a:ext cx="0" cy="0"/>
+          <a:chOff x="0" y="0"/>
+          <a:chExt cx="0" cy="0"/>
+        </a:xfrm>
+      </p:grpSpPr>
+      <p:sp>
+        <p:nvSpPr>
+          <p:cNvPr id="2" name="Titel 1">
+            <a:extLst>
+              <a:ext uri="{FF2B5EF4-FFF2-40B4-BE49-F238E27FC236}">
                 <a16:creationId xmlns:a16="http://schemas.microsoft.com/office/drawing/2014/main" id="{D519ED13-21BE-A54C-A031-AD61373B520E}"/>
               </a:ext>
             </a:extLst>
@@ -10040,7 +10172,7 @@
 </p:sld>
 </file>
 
-<file path=ppt/slides/slide104.xml><?xml version="1.0" encoding="utf-8"?>
+<file path=ppt/slides/slide105.xml><?xml version="1.0" encoding="utf-8"?>
 <p:sld xmlns:a="http://schemas.openxmlformats.org/drawingml/2006/main" xmlns:r="http://schemas.openxmlformats.org/officeDocument/2006/relationships" xmlns:p="http://schemas.openxmlformats.org/presentationml/2006/main">
   <p:cSld>
     <p:spTree>
@@ -10411,7 +10543,7 @@
 </p:sld>
 </file>
 
-<file path=ppt/slides/slide105.xml><?xml version="1.0" encoding="utf-8"?>
+<file path=ppt/slides/slide106.xml><?xml version="1.0" encoding="utf-8"?>
 <p:sld xmlns:a="http://schemas.openxmlformats.org/drawingml/2006/main" xmlns:r="http://schemas.openxmlformats.org/officeDocument/2006/relationships" xmlns:p="http://schemas.openxmlformats.org/presentationml/2006/main">
   <p:cSld>
     <p:spTree>
@@ -10616,7 +10748,7 @@
 </p:sld>
 </file>
 
-<file path=ppt/slides/slide106.xml><?xml version="1.0" encoding="utf-8"?>
+<file path=ppt/slides/slide107.xml><?xml version="1.0" encoding="utf-8"?>
 <p:sld xmlns:a="http://schemas.openxmlformats.org/drawingml/2006/main" xmlns:r="http://schemas.openxmlformats.org/officeDocument/2006/relationships" xmlns:p="http://schemas.openxmlformats.org/presentationml/2006/main">
   <p:cSld>
     <p:spTree>
@@ -11316,86 +11448,6 @@
 </p:sld>
 </file>
 
-<file path=ppt/slides/slide107.xml><?xml version="1.0" encoding="utf-8"?>
-<p:sld xmlns:a="http://schemas.openxmlformats.org/drawingml/2006/main" xmlns:r="http://schemas.openxmlformats.org/officeDocument/2006/relationships" xmlns:p="http://schemas.openxmlformats.org/presentationml/2006/main">
-  <p:cSld>
-    <p:spTree>
-      <p:nvGrpSpPr>
-        <p:cNvPr id="1" name=""/>
-        <p:cNvGrpSpPr/>
-        <p:nvPr/>
-      </p:nvGrpSpPr>
-      <p:grpSpPr>
-        <a:xfrm>
-          <a:off x="0" y="0"/>
-          <a:ext cx="0" cy="0"/>
-          <a:chOff x="0" y="0"/>
-          <a:chExt cx="0" cy="0"/>
-        </a:xfrm>
-      </p:grpSpPr>
-      <p:sp>
-        <p:nvSpPr>
-          <p:cNvPr id="2" name="Titel 1">
-            <a:extLst>
-              <a:ext uri="{FF2B5EF4-FFF2-40B4-BE49-F238E27FC236}">
-                <a16:creationId xmlns:a16="http://schemas.microsoft.com/office/drawing/2014/main" id="{AF291B26-8D81-6E41-9D56-468BA39AAAEB}"/>
-              </a:ext>
-            </a:extLst>
-          </p:cNvPr>
-          <p:cNvSpPr>
-            <a:spLocks noGrp="1"/>
-          </p:cNvSpPr>
-          <p:nvPr>
-            <p:ph type="title"/>
-          </p:nvPr>
-        </p:nvSpPr>
-        <p:spPr/>
-        <p:txBody>
-          <a:bodyPr/>
-          <a:lstStyle/>
-          <a:p>
-            <a:endParaRPr lang="de-DE"/>
-          </a:p>
-        </p:txBody>
-      </p:sp>
-      <p:sp>
-        <p:nvSpPr>
-          <p:cNvPr id="3" name="Inhaltsplatzhalter 2">
-            <a:extLst>
-              <a:ext uri="{FF2B5EF4-FFF2-40B4-BE49-F238E27FC236}">
-                <a16:creationId xmlns:a16="http://schemas.microsoft.com/office/drawing/2014/main" id="{4D3977DA-9BC2-944B-B95C-E22F84E99A06}"/>
-              </a:ext>
-            </a:extLst>
-          </p:cNvPr>
-          <p:cNvSpPr>
-            <a:spLocks noGrp="1"/>
-          </p:cNvSpPr>
-          <p:nvPr>
-            <p:ph idx="1"/>
-          </p:nvPr>
-        </p:nvSpPr>
-        <p:spPr/>
-        <p:txBody>
-          <a:bodyPr/>
-          <a:lstStyle/>
-          <a:p>
-            <a:endParaRPr lang="de-DE"/>
-          </a:p>
-        </p:txBody>
-      </p:sp>
-    </p:spTree>
-    <p:extLst>
-      <p:ext uri="{BB962C8B-B14F-4D97-AF65-F5344CB8AC3E}">
-        <p14:creationId xmlns:p14="http://schemas.microsoft.com/office/powerpoint/2010/main" val="3059955227"/>
-      </p:ext>
-    </p:extLst>
-  </p:cSld>
-  <p:clrMapOvr>
-    <a:masterClrMapping/>
-  </p:clrMapOvr>
-</p:sld>
-</file>
-
 <file path=ppt/slides/slide108.xml><?xml version="1.0" encoding="utf-8"?>
 <p:sld xmlns:a="http://schemas.openxmlformats.org/drawingml/2006/main" xmlns:r="http://schemas.openxmlformats.org/officeDocument/2006/relationships" xmlns:p="http://schemas.openxmlformats.org/presentationml/2006/main">
   <p:cSld>
@@ -11418,7 +11470,7 @@
           <p:cNvPr id="2" name="Titel 1">
             <a:extLst>
               <a:ext uri="{FF2B5EF4-FFF2-40B4-BE49-F238E27FC236}">
-                <a16:creationId xmlns:a16="http://schemas.microsoft.com/office/drawing/2014/main" id="{0CC467E0-2B4E-D94E-9545-469513B5DF9C}"/>
+                <a16:creationId xmlns:a16="http://schemas.microsoft.com/office/drawing/2014/main" id="{AF291B26-8D81-6E41-9D56-468BA39AAAEB}"/>
               </a:ext>
             </a:extLst>
           </p:cNvPr>
@@ -11443,7 +11495,7 @@
           <p:cNvPr id="3" name="Inhaltsplatzhalter 2">
             <a:extLst>
               <a:ext uri="{FF2B5EF4-FFF2-40B4-BE49-F238E27FC236}">
-                <a16:creationId xmlns:a16="http://schemas.microsoft.com/office/drawing/2014/main" id="{51424325-0549-D545-B91C-5496B67B995F}"/>
+                <a16:creationId xmlns:a16="http://schemas.microsoft.com/office/drawing/2014/main" id="{4D3977DA-9BC2-944B-B95C-E22F84E99A06}"/>
               </a:ext>
             </a:extLst>
           </p:cNvPr>
@@ -11466,7 +11518,7 @@
     </p:spTree>
     <p:extLst>
       <p:ext uri="{BB962C8B-B14F-4D97-AF65-F5344CB8AC3E}">
-        <p14:creationId xmlns:p14="http://schemas.microsoft.com/office/powerpoint/2010/main" val="4282559993"/>
+        <p14:creationId xmlns:p14="http://schemas.microsoft.com/office/powerpoint/2010/main" val="3059955227"/>
       </p:ext>
     </p:extLst>
   </p:cSld>
@@ -11495,10 +11547,10 @@
       </p:grpSpPr>
       <p:sp>
         <p:nvSpPr>
-          <p:cNvPr id="2" name="Title 1">
+          <p:cNvPr id="2" name="Titel 1">
             <a:extLst>
               <a:ext uri="{FF2B5EF4-FFF2-40B4-BE49-F238E27FC236}">
-                <a16:creationId xmlns:a16="http://schemas.microsoft.com/office/drawing/2014/main" id="{D19ADA92-AB07-1841-8DDE-D3B5425A6490}"/>
+                <a16:creationId xmlns:a16="http://schemas.microsoft.com/office/drawing/2014/main" id="{0CC467E0-2B4E-D94E-9545-469513B5DF9C}"/>
               </a:ext>
             </a:extLst>
           </p:cNvPr>
@@ -11514,23 +11566,16 @@
           <a:bodyPr/>
           <a:lstStyle/>
           <a:p>
-            <a:r>
-              <a:rPr lang="en-US" dirty="0" err="1"/>
-              <a:t>Übung</a:t>
-            </a:r>
-            <a:r>
-              <a:rPr lang="en-US" dirty="0"/>
-              <a:t>: Grid</a:t>
-            </a:r>
-          </a:p>
-        </p:txBody>
-      </p:sp>
-      <p:sp>
-        <p:nvSpPr>
-          <p:cNvPr id="3" name="Content Placeholder 2">
+            <a:endParaRPr lang="de-DE"/>
+          </a:p>
+        </p:txBody>
+      </p:sp>
+      <p:sp>
+        <p:nvSpPr>
+          <p:cNvPr id="3" name="Inhaltsplatzhalter 2">
             <a:extLst>
               <a:ext uri="{FF2B5EF4-FFF2-40B4-BE49-F238E27FC236}">
-                <a16:creationId xmlns:a16="http://schemas.microsoft.com/office/drawing/2014/main" id="{C07A7911-8529-6443-A319-D1F59B30DAF5}"/>
+                <a16:creationId xmlns:a16="http://schemas.microsoft.com/office/drawing/2014/main" id="{51424325-0549-D545-B91C-5496B67B995F}"/>
               </a:ext>
             </a:extLst>
           </p:cNvPr>
@@ -11546,35 +11591,14 @@
           <a:bodyPr/>
           <a:lstStyle/>
           <a:p>
-            <a:r>
-              <a:rPr lang="en-US" dirty="0" err="1"/>
-              <a:t>Spielchen</a:t>
-            </a:r>
-            <a:r>
-              <a:rPr lang="en-US" dirty="0"/>
-              <a:t> </a:t>
-            </a:r>
-            <a:r>
-              <a:rPr lang="en-US" dirty="0" err="1"/>
-              <a:t>spielen</a:t>
-            </a:r>
-            <a:br>
-              <a:rPr lang="en-US" dirty="0"/>
-            </a:br>
-            <a:r>
-              <a:rPr lang="en-US" dirty="0">
-                <a:hlinkClick r:id="rId2"/>
-              </a:rPr>
-              <a:t>http://cssgridgarden.com/</a:t>
-            </a:r>
-            <a:endParaRPr lang="en-US" dirty="0"/>
+            <a:endParaRPr lang="de-DE"/>
           </a:p>
         </p:txBody>
       </p:sp>
     </p:spTree>
     <p:extLst>
       <p:ext uri="{BB962C8B-B14F-4D97-AF65-F5344CB8AC3E}">
-        <p14:creationId xmlns:p14="http://schemas.microsoft.com/office/powerpoint/2010/main" val="158470080"/>
+        <p14:creationId xmlns:p14="http://schemas.microsoft.com/office/powerpoint/2010/main" val="4282559993"/>
       </p:ext>
     </p:extLst>
   </p:cSld>
@@ -11672,6 +11696,114 @@
 </file>
 
 <file path=ppt/slides/slide110.xml><?xml version="1.0" encoding="utf-8"?>
+<p:sld xmlns:a="http://schemas.openxmlformats.org/drawingml/2006/main" xmlns:r="http://schemas.openxmlformats.org/officeDocument/2006/relationships" xmlns:p="http://schemas.openxmlformats.org/presentationml/2006/main">
+  <p:cSld>
+    <p:spTree>
+      <p:nvGrpSpPr>
+        <p:cNvPr id="1" name=""/>
+        <p:cNvGrpSpPr/>
+        <p:nvPr/>
+      </p:nvGrpSpPr>
+      <p:grpSpPr>
+        <a:xfrm>
+          <a:off x="0" y="0"/>
+          <a:ext cx="0" cy="0"/>
+          <a:chOff x="0" y="0"/>
+          <a:chExt cx="0" cy="0"/>
+        </a:xfrm>
+      </p:grpSpPr>
+      <p:sp>
+        <p:nvSpPr>
+          <p:cNvPr id="2" name="Title 1">
+            <a:extLst>
+              <a:ext uri="{FF2B5EF4-FFF2-40B4-BE49-F238E27FC236}">
+                <a16:creationId xmlns:a16="http://schemas.microsoft.com/office/drawing/2014/main" id="{D19ADA92-AB07-1841-8DDE-D3B5425A6490}"/>
+              </a:ext>
+            </a:extLst>
+          </p:cNvPr>
+          <p:cNvSpPr>
+            <a:spLocks noGrp="1"/>
+          </p:cNvSpPr>
+          <p:nvPr>
+            <p:ph type="title"/>
+          </p:nvPr>
+        </p:nvSpPr>
+        <p:spPr/>
+        <p:txBody>
+          <a:bodyPr/>
+          <a:lstStyle/>
+          <a:p>
+            <a:r>
+              <a:rPr lang="en-US" dirty="0" err="1"/>
+              <a:t>Übung</a:t>
+            </a:r>
+            <a:r>
+              <a:rPr lang="en-US" dirty="0"/>
+              <a:t>: Grid</a:t>
+            </a:r>
+          </a:p>
+        </p:txBody>
+      </p:sp>
+      <p:sp>
+        <p:nvSpPr>
+          <p:cNvPr id="3" name="Content Placeholder 2">
+            <a:extLst>
+              <a:ext uri="{FF2B5EF4-FFF2-40B4-BE49-F238E27FC236}">
+                <a16:creationId xmlns:a16="http://schemas.microsoft.com/office/drawing/2014/main" id="{C07A7911-8529-6443-A319-D1F59B30DAF5}"/>
+              </a:ext>
+            </a:extLst>
+          </p:cNvPr>
+          <p:cNvSpPr>
+            <a:spLocks noGrp="1"/>
+          </p:cNvSpPr>
+          <p:nvPr>
+            <p:ph idx="1"/>
+          </p:nvPr>
+        </p:nvSpPr>
+        <p:spPr/>
+        <p:txBody>
+          <a:bodyPr/>
+          <a:lstStyle/>
+          <a:p>
+            <a:r>
+              <a:rPr lang="en-US" dirty="0" err="1"/>
+              <a:t>Spielchen</a:t>
+            </a:r>
+            <a:r>
+              <a:rPr lang="en-US" dirty="0"/>
+              <a:t> </a:t>
+            </a:r>
+            <a:r>
+              <a:rPr lang="en-US" dirty="0" err="1"/>
+              <a:t>spielen</a:t>
+            </a:r>
+            <a:br>
+              <a:rPr lang="en-US" dirty="0"/>
+            </a:br>
+            <a:r>
+              <a:rPr lang="en-US" dirty="0">
+                <a:hlinkClick r:id="rId2"/>
+              </a:rPr>
+              <a:t>http://cssgridgarden.com/</a:t>
+            </a:r>
+            <a:endParaRPr lang="en-US" dirty="0"/>
+          </a:p>
+        </p:txBody>
+      </p:sp>
+    </p:spTree>
+    <p:extLst>
+      <p:ext uri="{BB962C8B-B14F-4D97-AF65-F5344CB8AC3E}">
+        <p14:creationId xmlns:p14="http://schemas.microsoft.com/office/powerpoint/2010/main" val="158470080"/>
+      </p:ext>
+    </p:extLst>
+  </p:cSld>
+  <p:clrMapOvr>
+    <a:masterClrMapping/>
+  </p:clrMapOvr>
+</p:sld>
+</file>
+
+<file path=ppt/slides/slide111.xml><?xml version="1.0" encoding="utf-8"?>
 <p:sld xmlns:a="http://schemas.openxmlformats.org/drawingml/2006/main" xmlns:r="http://schemas.openxmlformats.org/officeDocument/2006/relationships" xmlns:p="http://schemas.openxmlformats.org/presentationml/2006/main">
   <p:cSld>
     <p:spTree>
@@ -11837,7 +11969,7 @@
 </p:sld>
 </file>
 
-<file path=ppt/slides/slide111.xml><?xml version="1.0" encoding="utf-8"?>
+<file path=ppt/slides/slide112.xml><?xml version="1.0" encoding="utf-8"?>
 <p:sld xmlns:a="http://schemas.openxmlformats.org/drawingml/2006/main" xmlns:r="http://schemas.openxmlformats.org/officeDocument/2006/relationships" xmlns:p="http://schemas.openxmlformats.org/presentationml/2006/main">
   <p:cSld>
     <p:spTree>
@@ -33012,6 +33144,162 @@
           <p:cNvPr id="2" name="Title 1">
             <a:extLst>
               <a:ext uri="{FF2B5EF4-FFF2-40B4-BE49-F238E27FC236}">
+                <a16:creationId xmlns:a16="http://schemas.microsoft.com/office/drawing/2014/main" id="{5E1DAD1A-F3A0-AA4C-B6AB-318848BAA22E}"/>
+              </a:ext>
+            </a:extLst>
+          </p:cNvPr>
+          <p:cNvSpPr>
+            <a:spLocks noGrp="1"/>
+          </p:cNvSpPr>
+          <p:nvPr>
+            <p:ph type="title"/>
+          </p:nvPr>
+        </p:nvSpPr>
+        <p:spPr/>
+        <p:txBody>
+          <a:bodyPr/>
+          <a:lstStyle/>
+          <a:p>
+            <a:r>
+              <a:rPr lang="en-US" dirty="0" err="1"/>
+              <a:t>Übung</a:t>
+            </a:r>
+            <a:r>
+              <a:rPr lang="en-US" dirty="0"/>
+              <a:t>: Flexbox</a:t>
+            </a:r>
+          </a:p>
+        </p:txBody>
+      </p:sp>
+      <p:sp>
+        <p:nvSpPr>
+          <p:cNvPr id="3" name="Content Placeholder 2">
+            <a:extLst>
+              <a:ext uri="{FF2B5EF4-FFF2-40B4-BE49-F238E27FC236}">
+                <a16:creationId xmlns:a16="http://schemas.microsoft.com/office/drawing/2014/main" id="{5C994837-6695-164F-985B-F20B2F2F86CA}"/>
+              </a:ext>
+            </a:extLst>
+          </p:cNvPr>
+          <p:cNvSpPr>
+            <a:spLocks noGrp="1"/>
+          </p:cNvSpPr>
+          <p:nvPr>
+            <p:ph idx="1"/>
+          </p:nvPr>
+        </p:nvSpPr>
+        <p:spPr/>
+        <p:txBody>
+          <a:bodyPr/>
+          <a:lstStyle/>
+          <a:p>
+            <a:r>
+              <a:rPr lang="en-US" dirty="0" err="1"/>
+              <a:t>Zentiere</a:t>
+            </a:r>
+            <a:r>
+              <a:rPr lang="en-US" dirty="0"/>
+              <a:t> </a:t>
+            </a:r>
+            <a:r>
+              <a:rPr lang="en-US" dirty="0" err="1"/>
+              <a:t>eine</a:t>
+            </a:r>
+            <a:r>
+              <a:rPr lang="en-US" dirty="0"/>
+              <a:t> Box, </a:t>
+            </a:r>
+            <a:r>
+              <a:rPr lang="en-US" dirty="0" err="1"/>
+              <a:t>mit</a:t>
+            </a:r>
+            <a:r>
+              <a:rPr lang="en-US" dirty="0"/>
+              <a:t> </a:t>
+            </a:r>
+            <a:r>
+              <a:rPr lang="en-US" dirty="0" err="1"/>
+              <a:t>unbekannter</a:t>
+            </a:r>
+            <a:r>
+              <a:rPr lang="en-US" dirty="0"/>
+              <a:t> </a:t>
+            </a:r>
+            <a:r>
+              <a:rPr lang="en-US" dirty="0" err="1"/>
+              <a:t>Höhe</a:t>
+            </a:r>
+            <a:r>
+              <a:rPr lang="en-US" dirty="0"/>
+              <a:t>, vertical und horizontal</a:t>
+            </a:r>
+          </a:p>
+        </p:txBody>
+      </p:sp>
+      <p:pic>
+        <p:nvPicPr>
+          <p:cNvPr id="5" name="Picture 4">
+            <a:extLst>
+              <a:ext uri="{FF2B5EF4-FFF2-40B4-BE49-F238E27FC236}">
+                <a16:creationId xmlns:a16="http://schemas.microsoft.com/office/drawing/2014/main" id="{6B4A5B10-B378-7142-B93F-3EEB0D6741B6}"/>
+              </a:ext>
+            </a:extLst>
+          </p:cNvPr>
+          <p:cNvPicPr>
+            <a:picLocks noChangeAspect="1"/>
+          </p:cNvPicPr>
+          <p:nvPr/>
+        </p:nvPicPr>
+        <p:blipFill>
+          <a:blip r:embed="rId2"/>
+          <a:stretch>
+            <a:fillRect/>
+          </a:stretch>
+        </p:blipFill>
+        <p:spPr>
+          <a:xfrm>
+            <a:off x="2756613" y="2962203"/>
+            <a:ext cx="5461276" cy="3142569"/>
+          </a:xfrm>
+          <a:prstGeom prst="rect">
+            <a:avLst/>
+          </a:prstGeom>
+        </p:spPr>
+      </p:pic>
+    </p:spTree>
+    <p:extLst>
+      <p:ext uri="{BB962C8B-B14F-4D97-AF65-F5344CB8AC3E}">
+        <p14:creationId xmlns:p14="http://schemas.microsoft.com/office/powerpoint/2010/main" val="1944770292"/>
+      </p:ext>
+    </p:extLst>
+  </p:cSld>
+  <p:clrMapOvr>
+    <a:masterClrMapping/>
+  </p:clrMapOvr>
+</p:sld>
+</file>
+
+<file path=ppt/slides/slide96.xml><?xml version="1.0" encoding="utf-8"?>
+<p:sld xmlns:a="http://schemas.openxmlformats.org/drawingml/2006/main" xmlns:r="http://schemas.openxmlformats.org/officeDocument/2006/relationships" xmlns:p="http://schemas.openxmlformats.org/presentationml/2006/main">
+  <p:cSld>
+    <p:spTree>
+      <p:nvGrpSpPr>
+        <p:cNvPr id="1" name=""/>
+        <p:cNvGrpSpPr/>
+        <p:nvPr/>
+      </p:nvGrpSpPr>
+      <p:grpSpPr>
+        <a:xfrm>
+          <a:off x="0" y="0"/>
+          <a:ext cx="0" cy="0"/>
+          <a:chOff x="0" y="0"/>
+          <a:chExt cx="0" cy="0"/>
+        </a:xfrm>
+      </p:grpSpPr>
+      <p:sp>
+        <p:nvSpPr>
+          <p:cNvPr id="2" name="Title 1">
+            <a:extLst>
+              <a:ext uri="{FF2B5EF4-FFF2-40B4-BE49-F238E27FC236}">
                 <a16:creationId xmlns:a16="http://schemas.microsoft.com/office/drawing/2014/main" id="{BD12F5B6-1D4F-FC43-9C9B-58CB5B6D4246}"/>
               </a:ext>
             </a:extLst>
@@ -33354,174 +33642,6 @@
 </p:sld>
 </file>
 
-<file path=ppt/slides/slide96.xml><?xml version="1.0" encoding="utf-8"?>
-<p:sld xmlns:a="http://schemas.openxmlformats.org/drawingml/2006/main" xmlns:r="http://schemas.openxmlformats.org/officeDocument/2006/relationships" xmlns:p="http://schemas.openxmlformats.org/presentationml/2006/main">
-  <p:cSld>
-    <p:spTree>
-      <p:nvGrpSpPr>
-        <p:cNvPr id="1" name=""/>
-        <p:cNvGrpSpPr/>
-        <p:nvPr/>
-      </p:nvGrpSpPr>
-      <p:grpSpPr>
-        <a:xfrm>
-          <a:off x="0" y="0"/>
-          <a:ext cx="0" cy="0"/>
-          <a:chOff x="0" y="0"/>
-          <a:chExt cx="0" cy="0"/>
-        </a:xfrm>
-      </p:grpSpPr>
-      <p:sp>
-        <p:nvSpPr>
-          <p:cNvPr id="2" name="Title 1">
-            <a:extLst>
-              <a:ext uri="{FF2B5EF4-FFF2-40B4-BE49-F238E27FC236}">
-                <a16:creationId xmlns:a16="http://schemas.microsoft.com/office/drawing/2014/main" id="{C57CC73E-83AF-9D48-8780-676E6EE6AB4D}"/>
-              </a:ext>
-            </a:extLst>
-          </p:cNvPr>
-          <p:cNvSpPr>
-            <a:spLocks noGrp="1"/>
-          </p:cNvSpPr>
-          <p:nvPr>
-            <p:ph type="title"/>
-          </p:nvPr>
-        </p:nvSpPr>
-        <p:spPr/>
-        <p:txBody>
-          <a:bodyPr/>
-          <a:lstStyle/>
-          <a:p>
-            <a:r>
-              <a:rPr lang="en-US" dirty="0"/>
-              <a:t>Grid</a:t>
-            </a:r>
-          </a:p>
-        </p:txBody>
-      </p:sp>
-      <p:sp>
-        <p:nvSpPr>
-          <p:cNvPr id="3" name="Content Placeholder 2">
-            <a:extLst>
-              <a:ext uri="{FF2B5EF4-FFF2-40B4-BE49-F238E27FC236}">
-                <a16:creationId xmlns:a16="http://schemas.microsoft.com/office/drawing/2014/main" id="{25799DE7-BC49-E444-A85A-C391B6D9D5F2}"/>
-              </a:ext>
-            </a:extLst>
-          </p:cNvPr>
-          <p:cNvSpPr>
-            <a:spLocks noGrp="1"/>
-          </p:cNvSpPr>
-          <p:nvPr>
-            <p:ph idx="1"/>
-          </p:nvPr>
-        </p:nvSpPr>
-        <p:spPr/>
-        <p:txBody>
-          <a:bodyPr/>
-          <a:lstStyle/>
-          <a:p>
-            <a:r>
-              <a:rPr lang="en-US" dirty="0"/>
-              <a:t>Das Grid Layout </a:t>
-            </a:r>
-            <a:r>
-              <a:rPr lang="en-US" dirty="0" err="1"/>
-              <a:t>wird</a:t>
-            </a:r>
-            <a:r>
-              <a:rPr lang="en-US" dirty="0"/>
-              <a:t> </a:t>
-            </a:r>
-            <a:r>
-              <a:rPr lang="en-US" dirty="0" err="1"/>
-              <a:t>noch</a:t>
-            </a:r>
-            <a:r>
-              <a:rPr lang="en-US" dirty="0"/>
-              <a:t> </a:t>
-            </a:r>
-            <a:r>
-              <a:rPr lang="en-US" dirty="0" err="1"/>
-              <a:t>nicht</a:t>
-            </a:r>
-            <a:r>
-              <a:rPr lang="en-US" dirty="0"/>
-              <a:t> so </a:t>
-            </a:r>
-            <a:r>
-              <a:rPr lang="en-US" dirty="0" err="1"/>
-              <a:t>lange</a:t>
-            </a:r>
-            <a:r>
-              <a:rPr lang="en-US" dirty="0"/>
-              <a:t> von “</a:t>
-            </a:r>
-            <a:r>
-              <a:rPr lang="en-US" dirty="0" err="1"/>
-              <a:t>allen</a:t>
-            </a:r>
-            <a:r>
-              <a:rPr lang="en-US" dirty="0"/>
-              <a:t>” </a:t>
-            </a:r>
-            <a:r>
-              <a:rPr lang="en-US" dirty="0" err="1"/>
-              <a:t>Browsern</a:t>
-            </a:r>
-            <a:r>
-              <a:rPr lang="en-US" dirty="0"/>
-              <a:t> </a:t>
-            </a:r>
-            <a:r>
-              <a:rPr lang="en-US" dirty="0" err="1"/>
-              <a:t>unterstützt</a:t>
-            </a:r>
-            <a:r>
-              <a:rPr lang="en-US" dirty="0"/>
-              <a:t>. Z.B. IE11 </a:t>
-            </a:r>
-            <a:r>
-              <a:rPr lang="en-US" dirty="0" err="1"/>
-              <a:t>unterstützt</a:t>
-            </a:r>
-            <a:r>
-              <a:rPr lang="en-US" dirty="0"/>
-              <a:t> Grid </a:t>
-            </a:r>
-            <a:r>
-              <a:rPr lang="en-US" dirty="0" err="1"/>
-              <a:t>nicht</a:t>
-            </a:r>
-            <a:r>
-              <a:rPr lang="en-US" dirty="0"/>
-              <a:t>.</a:t>
-            </a:r>
-            <a:br>
-              <a:rPr lang="en-US" dirty="0"/>
-            </a:br>
-            <a:r>
-              <a:rPr lang="en-US" dirty="0">
-                <a:hlinkClick r:id="rId2"/>
-              </a:rPr>
-              <a:t>https://caniuse.com/#search=css-grid</a:t>
-            </a:r>
-            <a:endParaRPr lang="en-US" dirty="0"/>
-          </a:p>
-        </p:txBody>
-      </p:sp>
-    </p:spTree>
-    <p:extLst>
-      <p:ext uri="{BB962C8B-B14F-4D97-AF65-F5344CB8AC3E}">
-        <p14:creationId xmlns:p14="http://schemas.microsoft.com/office/powerpoint/2010/main" val="2496049358"/>
-      </p:ext>
-    </p:extLst>
-  </p:cSld>
-  <p:clrMapOvr>
-    <a:masterClrMapping/>
-  </p:clrMapOvr>
-</p:sld>
-</file>
-
 <file path=ppt/slides/slide97.xml><?xml version="1.0" encoding="utf-8"?>
 <p:sld xmlns:a="http://schemas.openxmlformats.org/drawingml/2006/main" xmlns:r="http://schemas.openxmlformats.org/officeDocument/2006/relationships" xmlns:p="http://schemas.openxmlformats.org/presentationml/2006/main">
   <p:cSld>
@@ -33544,7 +33664,7 @@
           <p:cNvPr id="2" name="Title 1">
             <a:extLst>
               <a:ext uri="{FF2B5EF4-FFF2-40B4-BE49-F238E27FC236}">
-                <a16:creationId xmlns:a16="http://schemas.microsoft.com/office/drawing/2014/main" id="{9A6ADDC8-E056-894B-9087-49C0DEA654AA}"/>
+                <a16:creationId xmlns:a16="http://schemas.microsoft.com/office/drawing/2014/main" id="{C57CC73E-83AF-9D48-8780-676E6EE6AB4D}"/>
               </a:ext>
             </a:extLst>
           </p:cNvPr>
@@ -33562,200 +33682,125 @@
           <a:p>
             <a:r>
               <a:rPr lang="en-US" dirty="0"/>
-              <a:t>Grid: Line </a:t>
-            </a:r>
-          </a:p>
-        </p:txBody>
-      </p:sp>
-      <p:pic>
-        <p:nvPicPr>
-          <p:cNvPr id="5" name="Content Placeholder 4">
+              <a:t>Grid</a:t>
+            </a:r>
+          </a:p>
+        </p:txBody>
+      </p:sp>
+      <p:sp>
+        <p:nvSpPr>
+          <p:cNvPr id="3" name="Content Placeholder 2">
             <a:extLst>
               <a:ext uri="{FF2B5EF4-FFF2-40B4-BE49-F238E27FC236}">
-                <a16:creationId xmlns:a16="http://schemas.microsoft.com/office/drawing/2014/main" id="{27ABC2B5-7CA8-B549-8F2E-CD7E632C4FF2}"/>
+                <a16:creationId xmlns:a16="http://schemas.microsoft.com/office/drawing/2014/main" id="{25799DE7-BC49-E444-A85A-C391B6D9D5F2}"/>
               </a:ext>
             </a:extLst>
           </p:cNvPr>
-          <p:cNvPicPr>
-            <a:picLocks noGrp="1" noChangeAspect="1"/>
-          </p:cNvPicPr>
+          <p:cNvSpPr>
+            <a:spLocks noGrp="1"/>
+          </p:cNvSpPr>
           <p:nvPr>
             <p:ph idx="1"/>
           </p:nvPr>
-        </p:nvPicPr>
-        <p:blipFill>
-          <a:blip r:embed="rId2"/>
-          <a:stretch>
-            <a:fillRect/>
-          </a:stretch>
-        </p:blipFill>
-        <p:spPr>
-          <a:xfrm>
-            <a:off x="680321" y="2387600"/>
-            <a:ext cx="4930795" cy="3598863"/>
-          </a:xfrm>
-        </p:spPr>
-      </p:pic>
-      <p:sp>
-        <p:nvSpPr>
-          <p:cNvPr id="7" name="TextBox 6">
-            <a:extLst>
-              <a:ext uri="{FF2B5EF4-FFF2-40B4-BE49-F238E27FC236}">
-                <a16:creationId xmlns:a16="http://schemas.microsoft.com/office/drawing/2014/main" id="{33E5B256-2936-9B42-819B-6B2472E36E61}"/>
-              </a:ext>
-            </a:extLst>
-          </p:cNvPr>
-          <p:cNvSpPr txBox="1"/>
-          <p:nvPr/>
-        </p:nvSpPr>
-        <p:spPr>
-          <a:xfrm>
-            <a:off x="5963920" y="2387600"/>
-            <a:ext cx="5547759" cy="1477328"/>
-          </a:xfrm>
-          <a:prstGeom prst="rect">
-            <a:avLst/>
-          </a:prstGeom>
-          <a:noFill/>
-        </p:spPr>
-        <p:txBody>
-          <a:bodyPr wrap="square" rtlCol="0">
-            <a:spAutoFit/>
-          </a:bodyPr>
+        </p:nvSpPr>
+        <p:spPr/>
+        <p:txBody>
+          <a:bodyPr/>
           <a:lstStyle/>
           <a:p>
             <a:r>
               <a:rPr lang="en-US" dirty="0"/>
-              <a:t>Grid Lines </a:t>
+              <a:t>Das Grid Layout </a:t>
             </a:r>
             <a:r>
               <a:rPr lang="en-US" dirty="0" err="1"/>
-              <a:t>sind</a:t>
-            </a:r>
-            <a:r>
-              <a:rPr lang="en-US" dirty="0"/>
-              <a:t> die </a:t>
+              <a:t>wird</a:t>
+            </a:r>
+            <a:r>
+              <a:rPr lang="en-US" dirty="0"/>
+              <a:t> </a:t>
             </a:r>
             <a:r>
               <a:rPr lang="en-US" dirty="0" err="1"/>
-              <a:t>horizontalen</a:t>
-            </a:r>
-            <a:r>
-              <a:rPr lang="en-US" dirty="0"/>
-              <a:t> und </a:t>
+              <a:t>noch</a:t>
+            </a:r>
+            <a:r>
+              <a:rPr lang="en-US" dirty="0"/>
+              <a:t> </a:t>
             </a:r>
             <a:r>
               <a:rPr lang="en-US" dirty="0" err="1"/>
-              <a:t>vertikalen</a:t>
+              <a:t>nicht</a:t>
+            </a:r>
+            <a:r>
+              <a:rPr lang="en-US" dirty="0"/>
+              <a:t> so </a:t>
+            </a:r>
+            <a:r>
+              <a:rPr lang="en-US" dirty="0" err="1"/>
+              <a:t>lange</a:t>
+            </a:r>
+            <a:r>
+              <a:rPr lang="en-US" dirty="0"/>
+              <a:t> von “</a:t>
+            </a:r>
+            <a:r>
+              <a:rPr lang="en-US" dirty="0" err="1"/>
+              <a:t>allen</a:t>
+            </a:r>
+            <a:r>
+              <a:rPr lang="en-US" dirty="0"/>
+              <a:t>” </a:t>
+            </a:r>
+            <a:r>
+              <a:rPr lang="en-US" dirty="0" err="1"/>
+              <a:t>Browsern</a:t>
+            </a:r>
+            <a:r>
+              <a:rPr lang="en-US" dirty="0"/>
+              <a:t> </a:t>
+            </a:r>
+            <a:r>
+              <a:rPr lang="en-US" dirty="0" err="1"/>
+              <a:t>unterstützt</a:t>
+            </a:r>
+            <a:r>
+              <a:rPr lang="en-US" dirty="0"/>
+              <a:t>. Z.B. IE11 </a:t>
+            </a:r>
+            <a:r>
+              <a:rPr lang="en-US" dirty="0" err="1"/>
+              <a:t>unterstützt</a:t>
+            </a:r>
+            <a:r>
+              <a:rPr lang="en-US" dirty="0"/>
+              <a:t> Grid </a:t>
+            </a:r>
+            <a:r>
+              <a:rPr lang="en-US" dirty="0" err="1"/>
+              <a:t>nicht</a:t>
+            </a:r>
+            <a:r>
+              <a:rPr lang="en-US" dirty="0"/>
+              <a:t>.</a:t>
             </a:r>
             <a:br>
               <a:rPr lang="en-US" dirty="0"/>
             </a:br>
             <a:r>
-              <a:rPr lang="en-US" dirty="0"/>
-              <a:t>Linen, die die Basis der Grid </a:t>
-            </a:r>
-            <a:r>
-              <a:rPr lang="en-US" dirty="0" err="1"/>
-              <a:t>Struktur</a:t>
-            </a:r>
-            <a:r>
-              <a:rPr lang="en-US" dirty="0"/>
-              <a:t> </a:t>
-            </a:r>
-            <a:r>
-              <a:rPr lang="en-US" dirty="0" err="1"/>
-              <a:t>bilden</a:t>
-            </a:r>
-            <a:r>
-              <a:rPr lang="en-US" dirty="0"/>
-              <a:t>.</a:t>
-            </a:r>
-            <a:br>
-              <a:rPr lang="en-US" dirty="0"/>
-            </a:br>
-            <a:br>
-              <a:rPr lang="en-US" dirty="0"/>
-            </a:br>
-            <a:r>
-              <a:rPr lang="en-US" dirty="0" err="1"/>
-              <a:t>Wir</a:t>
-            </a:r>
-            <a:r>
-              <a:rPr lang="en-US" dirty="0"/>
-              <a:t> </a:t>
-            </a:r>
-            <a:r>
-              <a:rPr lang="en-US" dirty="0" err="1"/>
-              <a:t>können</a:t>
-            </a:r>
-            <a:r>
-              <a:rPr lang="en-US" dirty="0"/>
-              <a:t> </a:t>
-            </a:r>
-            <a:r>
-              <a:rPr lang="en-US" dirty="0" err="1"/>
-              <a:t>sie</a:t>
-            </a:r>
-            <a:r>
-              <a:rPr lang="en-US" dirty="0"/>
-              <a:t> </a:t>
-            </a:r>
-            <a:r>
-              <a:rPr lang="en-US" dirty="0" err="1"/>
-              <a:t>mit</a:t>
-            </a:r>
-            <a:r>
-              <a:rPr lang="en-US" dirty="0"/>
-              <a:t> </a:t>
-            </a:r>
-            <a:r>
-              <a:rPr lang="en-US" dirty="0" err="1"/>
-              <a:t>einem</a:t>
-            </a:r>
-            <a:r>
-              <a:rPr lang="en-US" dirty="0"/>
-              <a:t> </a:t>
-            </a:r>
-            <a:r>
-              <a:rPr lang="en-US" dirty="0" err="1"/>
-              <a:t>numerischen</a:t>
-            </a:r>
-            <a:r>
-              <a:rPr lang="en-US" dirty="0"/>
-              <a:t> Index </a:t>
-            </a:r>
-            <a:r>
-              <a:rPr lang="en-US" dirty="0" err="1"/>
-              <a:t>ansprechen</a:t>
-            </a:r>
-            <a:r>
-              <a:rPr lang="en-US" dirty="0"/>
-              <a:t>, der </a:t>
-            </a:r>
-            <a:r>
-              <a:rPr lang="en-US" dirty="0" err="1"/>
-              <a:t>mit</a:t>
-            </a:r>
-            <a:r>
-              <a:rPr lang="en-US" dirty="0"/>
-              <a:t> 1 </a:t>
-            </a:r>
-            <a:r>
-              <a:rPr lang="en-US" dirty="0" err="1"/>
-              <a:t>beginnt</a:t>
-            </a:r>
-            <a:r>
-              <a:rPr lang="en-US" dirty="0"/>
-              <a:t>.</a:t>
-            </a:r>
+              <a:rPr lang="en-US" dirty="0">
+                <a:hlinkClick r:id="rId2"/>
+              </a:rPr>
+              <a:t>https://caniuse.com/#search=css-grid</a:t>
+            </a:r>
+            <a:endParaRPr lang="en-US" dirty="0"/>
           </a:p>
         </p:txBody>
       </p:sp>
     </p:spTree>
     <p:extLst>
       <p:ext uri="{BB962C8B-B14F-4D97-AF65-F5344CB8AC3E}">
-        <p14:creationId xmlns:p14="http://schemas.microsoft.com/office/powerpoint/2010/main" val="3358430858"/>
+        <p14:creationId xmlns:p14="http://schemas.microsoft.com/office/powerpoint/2010/main" val="2496049358"/>
       </p:ext>
     </p:extLst>
   </p:cSld>
@@ -33787,7 +33832,7 @@
           <p:cNvPr id="2" name="Title 1">
             <a:extLst>
               <a:ext uri="{FF2B5EF4-FFF2-40B4-BE49-F238E27FC236}">
-                <a16:creationId xmlns:a16="http://schemas.microsoft.com/office/drawing/2014/main" id="{BA683EE5-5BCB-B446-9775-80D8DA8D16D1}"/>
+                <a16:creationId xmlns:a16="http://schemas.microsoft.com/office/drawing/2014/main" id="{9A6ADDC8-E056-894B-9087-49C0DEA654AA}"/>
               </a:ext>
             </a:extLst>
           </p:cNvPr>
@@ -33805,17 +33850,17 @@
           <a:p>
             <a:r>
               <a:rPr lang="en-US" dirty="0"/>
-              <a:t>Grid: Track, Cell, Area </a:t>
+              <a:t>Grid: Line </a:t>
             </a:r>
           </a:p>
         </p:txBody>
       </p:sp>
       <p:pic>
         <p:nvPicPr>
-          <p:cNvPr id="8" name="Inhaltsplatzhalter 7">
+          <p:cNvPr id="5" name="Content Placeholder 4">
             <a:extLst>
               <a:ext uri="{FF2B5EF4-FFF2-40B4-BE49-F238E27FC236}">
-                <a16:creationId xmlns:a16="http://schemas.microsoft.com/office/drawing/2014/main" id="{B53AF9A3-D986-604B-94C1-C0CA2C5A5858}"/>
+                <a16:creationId xmlns:a16="http://schemas.microsoft.com/office/drawing/2014/main" id="{27ABC2B5-7CA8-B549-8F2E-CD7E632C4FF2}"/>
               </a:ext>
             </a:extLst>
           </p:cNvPr>
@@ -33834,15 +33879,171 @@
         </p:blipFill>
         <p:spPr>
           <a:xfrm>
-            <a:off x="680321" y="2336800"/>
-            <a:ext cx="6435109" cy="3598863"/>
+            <a:off x="680321" y="2387600"/>
+            <a:ext cx="4930795" cy="3598863"/>
           </a:xfrm>
         </p:spPr>
       </p:pic>
+      <p:sp>
+        <p:nvSpPr>
+          <p:cNvPr id="7" name="TextBox 6">
+            <a:extLst>
+              <a:ext uri="{FF2B5EF4-FFF2-40B4-BE49-F238E27FC236}">
+                <a16:creationId xmlns:a16="http://schemas.microsoft.com/office/drawing/2014/main" id="{33E5B256-2936-9B42-819B-6B2472E36E61}"/>
+              </a:ext>
+            </a:extLst>
+          </p:cNvPr>
+          <p:cNvSpPr txBox="1"/>
+          <p:nvPr/>
+        </p:nvSpPr>
+        <p:spPr>
+          <a:xfrm>
+            <a:off x="5963920" y="2387600"/>
+            <a:ext cx="5547759" cy="1477328"/>
+          </a:xfrm>
+          <a:prstGeom prst="rect">
+            <a:avLst/>
+          </a:prstGeom>
+          <a:noFill/>
+        </p:spPr>
+        <p:txBody>
+          <a:bodyPr wrap="square" rtlCol="0">
+            <a:spAutoFit/>
+          </a:bodyPr>
+          <a:lstStyle/>
+          <a:p>
+            <a:r>
+              <a:rPr lang="en-US" dirty="0"/>
+              <a:t>Grid Lines </a:t>
+            </a:r>
+            <a:r>
+              <a:rPr lang="en-US" dirty="0" err="1"/>
+              <a:t>sind</a:t>
+            </a:r>
+            <a:r>
+              <a:rPr lang="en-US" dirty="0"/>
+              <a:t> die </a:t>
+            </a:r>
+            <a:r>
+              <a:rPr lang="en-US" dirty="0" err="1"/>
+              <a:t>horizontalen</a:t>
+            </a:r>
+            <a:r>
+              <a:rPr lang="en-US" dirty="0"/>
+              <a:t> und </a:t>
+            </a:r>
+            <a:r>
+              <a:rPr lang="en-US" dirty="0" err="1"/>
+              <a:t>vertikalen</a:t>
+            </a:r>
+            <a:br>
+              <a:rPr lang="en-US" dirty="0"/>
+            </a:br>
+            <a:r>
+              <a:rPr lang="en-US" dirty="0"/>
+              <a:t>Linen, die die Basis der Grid </a:t>
+            </a:r>
+            <a:r>
+              <a:rPr lang="en-US" dirty="0" err="1"/>
+              <a:t>Struktur</a:t>
+            </a:r>
+            <a:r>
+              <a:rPr lang="en-US" dirty="0"/>
+              <a:t> </a:t>
+            </a:r>
+            <a:r>
+              <a:rPr lang="en-US" dirty="0" err="1"/>
+              <a:t>bilden</a:t>
+            </a:r>
+            <a:r>
+              <a:rPr lang="en-US" dirty="0"/>
+              <a:t>.</a:t>
+            </a:r>
+            <a:br>
+              <a:rPr lang="en-US" dirty="0"/>
+            </a:br>
+            <a:br>
+              <a:rPr lang="en-US" dirty="0"/>
+            </a:br>
+            <a:r>
+              <a:rPr lang="en-US" dirty="0" err="1"/>
+              <a:t>Wir</a:t>
+            </a:r>
+            <a:r>
+              <a:rPr lang="en-US" dirty="0"/>
+              <a:t> </a:t>
+            </a:r>
+            <a:r>
+              <a:rPr lang="en-US" dirty="0" err="1"/>
+              <a:t>können</a:t>
+            </a:r>
+            <a:r>
+              <a:rPr lang="en-US" dirty="0"/>
+              <a:t> </a:t>
+            </a:r>
+            <a:r>
+              <a:rPr lang="en-US" dirty="0" err="1"/>
+              <a:t>sie</a:t>
+            </a:r>
+            <a:r>
+              <a:rPr lang="en-US" dirty="0"/>
+              <a:t> </a:t>
+            </a:r>
+            <a:r>
+              <a:rPr lang="en-US" dirty="0" err="1"/>
+              <a:t>mit</a:t>
+            </a:r>
+            <a:r>
+              <a:rPr lang="en-US" dirty="0"/>
+              <a:t> </a:t>
+            </a:r>
+            <a:r>
+              <a:rPr lang="en-US" dirty="0" err="1"/>
+              <a:t>einem</a:t>
+            </a:r>
+            <a:r>
+              <a:rPr lang="en-US" dirty="0"/>
+              <a:t> </a:t>
+            </a:r>
+            <a:r>
+              <a:rPr lang="en-US" dirty="0" err="1"/>
+              <a:t>numerischen</a:t>
+            </a:r>
+            <a:r>
+              <a:rPr lang="en-US" dirty="0"/>
+              <a:t> Index </a:t>
+            </a:r>
+            <a:r>
+              <a:rPr lang="en-US" dirty="0" err="1"/>
+              <a:t>ansprechen</a:t>
+            </a:r>
+            <a:r>
+              <a:rPr lang="en-US" dirty="0"/>
+              <a:t>, der </a:t>
+            </a:r>
+            <a:r>
+              <a:rPr lang="en-US" dirty="0" err="1"/>
+              <a:t>mit</a:t>
+            </a:r>
+            <a:r>
+              <a:rPr lang="en-US" dirty="0"/>
+              <a:t> 1 </a:t>
+            </a:r>
+            <a:r>
+              <a:rPr lang="en-US" dirty="0" err="1"/>
+              <a:t>beginnt</a:t>
+            </a:r>
+            <a:r>
+              <a:rPr lang="en-US" dirty="0"/>
+              <a:t>.</a:t>
+            </a:r>
+          </a:p>
+        </p:txBody>
+      </p:sp>
     </p:spTree>
     <p:extLst>
       <p:ext uri="{BB962C8B-B14F-4D97-AF65-F5344CB8AC3E}">
-        <p14:creationId xmlns:p14="http://schemas.microsoft.com/office/powerpoint/2010/main" val="2062539358"/>
+        <p14:creationId xmlns:p14="http://schemas.microsoft.com/office/powerpoint/2010/main" val="3358430858"/>
       </p:ext>
     </p:extLst>
   </p:cSld>
@@ -33874,7 +34075,7 @@
           <p:cNvPr id="2" name="Title 1">
             <a:extLst>
               <a:ext uri="{FF2B5EF4-FFF2-40B4-BE49-F238E27FC236}">
-                <a16:creationId xmlns:a16="http://schemas.microsoft.com/office/drawing/2014/main" id="{9D70707D-CDCD-8E4A-9738-E3DB279BB242}"/>
+                <a16:creationId xmlns:a16="http://schemas.microsoft.com/office/drawing/2014/main" id="{BA683EE5-5BCB-B446-9775-80D8DA8D16D1}"/>
               </a:ext>
             </a:extLst>
           </p:cNvPr>
@@ -33892,88 +34093,44 @@
           <a:p>
             <a:r>
               <a:rPr lang="en-US" dirty="0"/>
-              <a:t>Grid</a:t>
-            </a:r>
-          </a:p>
-        </p:txBody>
-      </p:sp>
-      <p:sp>
-        <p:nvSpPr>
-          <p:cNvPr id="4" name="Inhaltsplatzhalter 3">
+              <a:t>Grid: Track, Cell, Area </a:t>
+            </a:r>
+          </a:p>
+        </p:txBody>
+      </p:sp>
+      <p:pic>
+        <p:nvPicPr>
+          <p:cNvPr id="8" name="Inhaltsplatzhalter 7">
             <a:extLst>
               <a:ext uri="{FF2B5EF4-FFF2-40B4-BE49-F238E27FC236}">
-                <a16:creationId xmlns:a16="http://schemas.microsoft.com/office/drawing/2014/main" id="{5F467F9B-4189-6546-A21B-AF6B8FA98FE2}"/>
+                <a16:creationId xmlns:a16="http://schemas.microsoft.com/office/drawing/2014/main" id="{B53AF9A3-D986-604B-94C1-C0CA2C5A5858}"/>
               </a:ext>
             </a:extLst>
           </p:cNvPr>
-          <p:cNvSpPr>
-            <a:spLocks noGrp="1"/>
-          </p:cNvSpPr>
+          <p:cNvPicPr>
+            <a:picLocks noGrp="1" noChangeAspect="1"/>
+          </p:cNvPicPr>
           <p:nvPr>
             <p:ph idx="1"/>
           </p:nvPr>
-        </p:nvSpPr>
-        <p:spPr/>
-        <p:txBody>
-          <a:bodyPr/>
-          <a:lstStyle/>
-          <a:p>
-            <a:r>
-              <a:rPr lang="de-DE" dirty="0" err="1"/>
-              <a:t>Grid</a:t>
-            </a:r>
-            <a:r>
-              <a:rPr lang="de-DE" dirty="0"/>
-              <a:t> Layout auf dem Container (Parent Element) definieren</a:t>
-            </a:r>
-            <a:br>
-              <a:rPr lang="de-DE" dirty="0"/>
-            </a:br>
-            <a:r>
-              <a:rPr lang="de-DE" b="1" dirty="0" err="1"/>
-              <a:t>display</a:t>
-            </a:r>
-            <a:r>
-              <a:rPr lang="de-DE" b="1" dirty="0"/>
-              <a:t>: </a:t>
-            </a:r>
-            <a:r>
-              <a:rPr lang="de-DE" b="1" dirty="0" err="1"/>
-              <a:t>grid</a:t>
-            </a:r>
-            <a:endParaRPr lang="de-DE" b="1" dirty="0"/>
-          </a:p>
-          <a:p>
-            <a:r>
-              <a:rPr lang="de-DE" dirty="0"/>
-              <a:t>Gute Doku:</a:t>
-            </a:r>
-            <a:br>
-              <a:rPr lang="de-DE" dirty="0"/>
-            </a:br>
-            <a:r>
-              <a:rPr lang="de-DE" dirty="0">
-                <a:hlinkClick r:id="rId2"/>
-              </a:rPr>
-              <a:t>https://css-tricks.com/snippets/css/complete-guide-grid/</a:t>
-            </a:r>
-            <a:endParaRPr lang="de-DE" dirty="0"/>
-          </a:p>
-          <a:p>
-            <a:pPr marL="0" indent="0">
-              <a:buNone/>
-            </a:pPr>
-            <a:endParaRPr lang="de-DE" dirty="0"/>
-          </a:p>
-          <a:p>
-            <a:endParaRPr lang="de-DE" dirty="0"/>
-          </a:p>
-        </p:txBody>
-      </p:sp>
+        </p:nvPicPr>
+        <p:blipFill>
+          <a:blip r:embed="rId2"/>
+          <a:stretch>
+            <a:fillRect/>
+          </a:stretch>
+        </p:blipFill>
+        <p:spPr>
+          <a:xfrm>
+            <a:off x="680321" y="2336800"/>
+            <a:ext cx="6435109" cy="3598863"/>
+          </a:xfrm>
+        </p:spPr>
+      </p:pic>
     </p:spTree>
     <p:extLst>
       <p:ext uri="{BB962C8B-B14F-4D97-AF65-F5344CB8AC3E}">
-        <p14:creationId xmlns:p14="http://schemas.microsoft.com/office/powerpoint/2010/main" val="366060195"/>
+        <p14:creationId xmlns:p14="http://schemas.microsoft.com/office/powerpoint/2010/main" val="2062539358"/>
       </p:ext>
     </p:extLst>
   </p:cSld>

</xml_diff>

<commit_message>
Übung für Sticky Footer im Holy Grail Layout
</commit_message>
<xml_diff>
--- a/html Schulung.pptx
+++ b/html Schulung.pptx
@@ -5,7 +5,7 @@
     <p:sldMasterId id="2147483660" r:id="rId1"/>
   </p:sldMasterIdLst>
   <p:notesMasterIdLst>
-    <p:notesMasterId r:id="rId114"/>
+    <p:notesMasterId r:id="rId116"/>
   </p:notesMasterIdLst>
   <p:sldIdLst>
     <p:sldId id="256" r:id="rId2"/>
@@ -103,23 +103,25 @@
     <p:sldId id="334" r:id="rId94"/>
     <p:sldId id="333" r:id="rId95"/>
     <p:sldId id="367" r:id="rId96"/>
-    <p:sldId id="329" r:id="rId97"/>
-    <p:sldId id="330" r:id="rId98"/>
-    <p:sldId id="335" r:id="rId99"/>
-    <p:sldId id="336" r:id="rId100"/>
-    <p:sldId id="339" r:id="rId101"/>
-    <p:sldId id="340" r:id="rId102"/>
-    <p:sldId id="341" r:id="rId103"/>
-    <p:sldId id="342" r:id="rId104"/>
-    <p:sldId id="343" r:id="rId105"/>
-    <p:sldId id="344" r:id="rId106"/>
-    <p:sldId id="345" r:id="rId107"/>
-    <p:sldId id="346" r:id="rId108"/>
-    <p:sldId id="347" r:id="rId109"/>
-    <p:sldId id="348" r:id="rId110"/>
-    <p:sldId id="337" r:id="rId111"/>
-    <p:sldId id="338" r:id="rId112"/>
-    <p:sldId id="264" r:id="rId113"/>
+    <p:sldId id="368" r:id="rId97"/>
+    <p:sldId id="369" r:id="rId98"/>
+    <p:sldId id="329" r:id="rId99"/>
+    <p:sldId id="330" r:id="rId100"/>
+    <p:sldId id="335" r:id="rId101"/>
+    <p:sldId id="336" r:id="rId102"/>
+    <p:sldId id="339" r:id="rId103"/>
+    <p:sldId id="340" r:id="rId104"/>
+    <p:sldId id="341" r:id="rId105"/>
+    <p:sldId id="342" r:id="rId106"/>
+    <p:sldId id="343" r:id="rId107"/>
+    <p:sldId id="344" r:id="rId108"/>
+    <p:sldId id="345" r:id="rId109"/>
+    <p:sldId id="346" r:id="rId110"/>
+    <p:sldId id="347" r:id="rId111"/>
+    <p:sldId id="348" r:id="rId112"/>
+    <p:sldId id="337" r:id="rId113"/>
+    <p:sldId id="338" r:id="rId114"/>
+    <p:sldId id="264" r:id="rId115"/>
   </p:sldIdLst>
   <p:sldSz cx="12192000" cy="6858000"/>
   <p:notesSz cx="6858000" cy="9144000"/>
@@ -8994,7 +8996,7 @@
           <p:cNvPr id="2" name="Title 1">
             <a:extLst>
               <a:ext uri="{FF2B5EF4-FFF2-40B4-BE49-F238E27FC236}">
-                <a16:creationId xmlns:a16="http://schemas.microsoft.com/office/drawing/2014/main" id="{9D70707D-CDCD-8E4A-9738-E3DB279BB242}"/>
+                <a16:creationId xmlns:a16="http://schemas.microsoft.com/office/drawing/2014/main" id="{9A6ADDC8-E056-894B-9087-49C0DEA654AA}"/>
               </a:ext>
             </a:extLst>
           </p:cNvPr>
@@ -9012,88 +9014,200 @@
           <a:p>
             <a:r>
               <a:rPr lang="en-US" dirty="0"/>
-              <a:t>Grid</a:t>
-            </a:r>
-          </a:p>
-        </p:txBody>
-      </p:sp>
-      <p:sp>
-        <p:nvSpPr>
-          <p:cNvPr id="4" name="Inhaltsplatzhalter 3">
+              <a:t>Grid: Line </a:t>
+            </a:r>
+          </a:p>
+        </p:txBody>
+      </p:sp>
+      <p:pic>
+        <p:nvPicPr>
+          <p:cNvPr id="5" name="Content Placeholder 4">
             <a:extLst>
               <a:ext uri="{FF2B5EF4-FFF2-40B4-BE49-F238E27FC236}">
-                <a16:creationId xmlns:a16="http://schemas.microsoft.com/office/drawing/2014/main" id="{5F467F9B-4189-6546-A21B-AF6B8FA98FE2}"/>
+                <a16:creationId xmlns:a16="http://schemas.microsoft.com/office/drawing/2014/main" id="{27ABC2B5-7CA8-B549-8F2E-CD7E632C4FF2}"/>
               </a:ext>
             </a:extLst>
           </p:cNvPr>
-          <p:cNvSpPr>
-            <a:spLocks noGrp="1"/>
-          </p:cNvSpPr>
+          <p:cNvPicPr>
+            <a:picLocks noGrp="1" noChangeAspect="1"/>
+          </p:cNvPicPr>
           <p:nvPr>
             <p:ph idx="1"/>
           </p:nvPr>
-        </p:nvSpPr>
-        <p:spPr/>
-        <p:txBody>
-          <a:bodyPr/>
+        </p:nvPicPr>
+        <p:blipFill>
+          <a:blip r:embed="rId2"/>
+          <a:stretch>
+            <a:fillRect/>
+          </a:stretch>
+        </p:blipFill>
+        <p:spPr>
+          <a:xfrm>
+            <a:off x="680321" y="2387600"/>
+            <a:ext cx="4930795" cy="3598863"/>
+          </a:xfrm>
+        </p:spPr>
+      </p:pic>
+      <p:sp>
+        <p:nvSpPr>
+          <p:cNvPr id="7" name="TextBox 6">
+            <a:extLst>
+              <a:ext uri="{FF2B5EF4-FFF2-40B4-BE49-F238E27FC236}">
+                <a16:creationId xmlns:a16="http://schemas.microsoft.com/office/drawing/2014/main" id="{33E5B256-2936-9B42-819B-6B2472E36E61}"/>
+              </a:ext>
+            </a:extLst>
+          </p:cNvPr>
+          <p:cNvSpPr txBox="1"/>
+          <p:nvPr/>
+        </p:nvSpPr>
+        <p:spPr>
+          <a:xfrm>
+            <a:off x="5963920" y="2387600"/>
+            <a:ext cx="5547759" cy="1477328"/>
+          </a:xfrm>
+          <a:prstGeom prst="rect">
+            <a:avLst/>
+          </a:prstGeom>
+          <a:noFill/>
+        </p:spPr>
+        <p:txBody>
+          <a:bodyPr wrap="square" rtlCol="0">
+            <a:spAutoFit/>
+          </a:bodyPr>
           <a:lstStyle/>
           <a:p>
             <a:r>
-              <a:rPr lang="de-DE" dirty="0" err="1"/>
-              <a:t>Grid</a:t>
-            </a:r>
-            <a:r>
-              <a:rPr lang="de-DE" dirty="0"/>
-              <a:t> Layout auf dem Container (Parent Element) definieren</a:t>
+              <a:rPr lang="en-US" dirty="0"/>
+              <a:t>Grid Lines </a:t>
+            </a:r>
+            <a:r>
+              <a:rPr lang="en-US" dirty="0" err="1"/>
+              <a:t>sind</a:t>
+            </a:r>
+            <a:r>
+              <a:rPr lang="en-US" dirty="0"/>
+              <a:t> die </a:t>
+            </a:r>
+            <a:r>
+              <a:rPr lang="en-US" dirty="0" err="1"/>
+              <a:t>horizontalen</a:t>
+            </a:r>
+            <a:r>
+              <a:rPr lang="en-US" dirty="0"/>
+              <a:t> und </a:t>
+            </a:r>
+            <a:r>
+              <a:rPr lang="en-US" dirty="0" err="1"/>
+              <a:t>vertikalen</a:t>
             </a:r>
             <a:br>
-              <a:rPr lang="de-DE" dirty="0"/>
+              <a:rPr lang="en-US" dirty="0"/>
             </a:br>
             <a:r>
-              <a:rPr lang="de-DE" b="1" dirty="0" err="1"/>
-              <a:t>display</a:t>
-            </a:r>
-            <a:r>
-              <a:rPr lang="de-DE" b="1" dirty="0"/>
-              <a:t>: </a:t>
-            </a:r>
-            <a:r>
-              <a:rPr lang="de-DE" b="1" dirty="0" err="1"/>
-              <a:t>grid</a:t>
-            </a:r>
-            <a:endParaRPr lang="de-DE" b="1" dirty="0"/>
-          </a:p>
-          <a:p>
-            <a:r>
-              <a:rPr lang="de-DE" dirty="0"/>
-              <a:t>Gute Doku:</a:t>
+              <a:rPr lang="en-US" dirty="0"/>
+              <a:t>Linen, die die Basis der Grid </a:t>
+            </a:r>
+            <a:r>
+              <a:rPr lang="en-US" dirty="0" err="1"/>
+              <a:t>Struktur</a:t>
+            </a:r>
+            <a:r>
+              <a:rPr lang="en-US" dirty="0"/>
+              <a:t> </a:t>
+            </a:r>
+            <a:r>
+              <a:rPr lang="en-US" dirty="0" err="1"/>
+              <a:t>bilden</a:t>
+            </a:r>
+            <a:r>
+              <a:rPr lang="en-US" dirty="0"/>
+              <a:t>.</a:t>
             </a:r>
             <a:br>
-              <a:rPr lang="de-DE" dirty="0"/>
+              <a:rPr lang="en-US" dirty="0"/>
             </a:br>
-            <a:r>
-              <a:rPr lang="de-DE" dirty="0">
-                <a:hlinkClick r:id="rId2"/>
-              </a:rPr>
-              <a:t>https://css-tricks.com/snippets/css/complete-guide-grid/</a:t>
-            </a:r>
-            <a:endParaRPr lang="de-DE" dirty="0"/>
-          </a:p>
-          <a:p>
-            <a:pPr marL="0" indent="0">
-              <a:buNone/>
-            </a:pPr>
-            <a:endParaRPr lang="de-DE" dirty="0"/>
-          </a:p>
-          <a:p>
-            <a:endParaRPr lang="de-DE" dirty="0"/>
+            <a:br>
+              <a:rPr lang="en-US" dirty="0"/>
+            </a:br>
+            <a:r>
+              <a:rPr lang="en-US" dirty="0" err="1"/>
+              <a:t>Wir</a:t>
+            </a:r>
+            <a:r>
+              <a:rPr lang="en-US" dirty="0"/>
+              <a:t> </a:t>
+            </a:r>
+            <a:r>
+              <a:rPr lang="en-US" dirty="0" err="1"/>
+              <a:t>können</a:t>
+            </a:r>
+            <a:r>
+              <a:rPr lang="en-US" dirty="0"/>
+              <a:t> </a:t>
+            </a:r>
+            <a:r>
+              <a:rPr lang="en-US" dirty="0" err="1"/>
+              <a:t>sie</a:t>
+            </a:r>
+            <a:r>
+              <a:rPr lang="en-US" dirty="0"/>
+              <a:t> </a:t>
+            </a:r>
+            <a:r>
+              <a:rPr lang="en-US" dirty="0" err="1"/>
+              <a:t>mit</a:t>
+            </a:r>
+            <a:r>
+              <a:rPr lang="en-US" dirty="0"/>
+              <a:t> </a:t>
+            </a:r>
+            <a:r>
+              <a:rPr lang="en-US" dirty="0" err="1"/>
+              <a:t>einem</a:t>
+            </a:r>
+            <a:r>
+              <a:rPr lang="en-US" dirty="0"/>
+              <a:t> </a:t>
+            </a:r>
+            <a:r>
+              <a:rPr lang="en-US" dirty="0" err="1"/>
+              <a:t>numerischen</a:t>
+            </a:r>
+            <a:r>
+              <a:rPr lang="en-US" dirty="0"/>
+              <a:t> Index </a:t>
+            </a:r>
+            <a:r>
+              <a:rPr lang="en-US" dirty="0" err="1"/>
+              <a:t>ansprechen</a:t>
+            </a:r>
+            <a:r>
+              <a:rPr lang="en-US" dirty="0"/>
+              <a:t>, der </a:t>
+            </a:r>
+            <a:r>
+              <a:rPr lang="en-US" dirty="0" err="1"/>
+              <a:t>mit</a:t>
+            </a:r>
+            <a:r>
+              <a:rPr lang="en-US" dirty="0"/>
+              <a:t> 1 </a:t>
+            </a:r>
+            <a:r>
+              <a:rPr lang="en-US" dirty="0" err="1"/>
+              <a:t>beginnt</a:t>
+            </a:r>
+            <a:r>
+              <a:rPr lang="en-US" dirty="0"/>
+              <a:t>.</a:t>
+            </a:r>
           </a:p>
         </p:txBody>
       </p:sp>
     </p:spTree>
     <p:extLst>
       <p:ext uri="{BB962C8B-B14F-4D97-AF65-F5344CB8AC3E}">
-        <p14:creationId xmlns:p14="http://schemas.microsoft.com/office/powerpoint/2010/main" val="366060195"/>
+        <p14:creationId xmlns:p14="http://schemas.microsoft.com/office/powerpoint/2010/main" val="3358430858"/>
       </p:ext>
     </p:extLst>
   </p:cSld>
@@ -9122,10 +9236,10 @@
       </p:grpSpPr>
       <p:sp>
         <p:nvSpPr>
-          <p:cNvPr id="2" name="Titel 1">
+          <p:cNvPr id="2" name="Title 1">
             <a:extLst>
               <a:ext uri="{FF2B5EF4-FFF2-40B4-BE49-F238E27FC236}">
-                <a16:creationId xmlns:a16="http://schemas.microsoft.com/office/drawing/2014/main" id="{19033134-0BFA-AE4B-AAE3-E9131EA31B93}"/>
+                <a16:creationId xmlns:a16="http://schemas.microsoft.com/office/drawing/2014/main" id="{BA683EE5-5BCB-B446-9775-80D8DA8D16D1}"/>
               </a:ext>
             </a:extLst>
           </p:cNvPr>
@@ -9142,291 +9256,45 @@
           <a:lstStyle/>
           <a:p>
             <a:r>
-              <a:rPr lang="de-DE" dirty="0" err="1"/>
-              <a:t>Grid</a:t>
-            </a:r>
-            <a:r>
-              <a:rPr lang="de-DE" dirty="0"/>
-              <a:t>: Container Properties</a:t>
-            </a:r>
-          </a:p>
-        </p:txBody>
-      </p:sp>
-      <p:sp>
-        <p:nvSpPr>
-          <p:cNvPr id="7" name="Inhaltsplatzhalter 6">
+              <a:rPr lang="en-US" dirty="0"/>
+              <a:t>Grid: Track, Cell, Area </a:t>
+            </a:r>
+          </a:p>
+        </p:txBody>
+      </p:sp>
+      <p:pic>
+        <p:nvPicPr>
+          <p:cNvPr id="8" name="Inhaltsplatzhalter 7">
             <a:extLst>
               <a:ext uri="{FF2B5EF4-FFF2-40B4-BE49-F238E27FC236}">
-                <a16:creationId xmlns:a16="http://schemas.microsoft.com/office/drawing/2014/main" id="{662274F8-DBDF-1941-95E5-496B43E07EBD}"/>
+                <a16:creationId xmlns:a16="http://schemas.microsoft.com/office/drawing/2014/main" id="{B53AF9A3-D986-604B-94C1-C0CA2C5A5858}"/>
               </a:ext>
             </a:extLst>
           </p:cNvPr>
-          <p:cNvSpPr>
-            <a:spLocks noGrp="1"/>
-          </p:cNvSpPr>
+          <p:cNvPicPr>
+            <a:picLocks noGrp="1" noChangeAspect="1"/>
+          </p:cNvPicPr>
           <p:nvPr>
             <p:ph idx="1"/>
           </p:nvPr>
-        </p:nvSpPr>
+        </p:nvPicPr>
+        <p:blipFill>
+          <a:blip r:embed="rId2"/>
+          <a:stretch>
+            <a:fillRect/>
+          </a:stretch>
+        </p:blipFill>
         <p:spPr>
           <a:xfrm>
-            <a:off x="680321" y="2336873"/>
-            <a:ext cx="9915289" cy="3599316"/>
+            <a:off x="680321" y="2336800"/>
+            <a:ext cx="6435109" cy="3598863"/>
           </a:xfrm>
         </p:spPr>
-        <p:txBody>
-          <a:bodyPr/>
-          <a:lstStyle/>
-          <a:p>
-            <a:r>
-              <a:rPr lang="de-CH" dirty="0" err="1">
-                <a:solidFill>
-                  <a:schemeClr val="bg1"/>
-                </a:solidFill>
-              </a:rPr>
-              <a:t>grid</a:t>
-            </a:r>
-            <a:r>
-              <a:rPr lang="de-CH" dirty="0">
-                <a:solidFill>
-                  <a:schemeClr val="bg1"/>
-                </a:solidFill>
-              </a:rPr>
-              <a:t>-template-</a:t>
-            </a:r>
-            <a:r>
-              <a:rPr lang="de-CH" dirty="0" err="1">
-                <a:solidFill>
-                  <a:schemeClr val="bg1"/>
-                </a:solidFill>
-              </a:rPr>
-              <a:t>columns</a:t>
-            </a:r>
-            <a:r>
-              <a:rPr lang="de-CH" dirty="0"/>
-              <a:t>:  Definiert die Anzahl und Grösse der Spalten</a:t>
-            </a:r>
-            <a:r>
-              <a:rPr lang="de-CH" b="1" dirty="0"/>
-              <a:t>.</a:t>
-            </a:r>
-            <a:br>
-              <a:rPr lang="de-CH" b="1" dirty="0"/>
-            </a:br>
-            <a:r>
-              <a:rPr lang="de-CH" sz="2000" dirty="0" err="1">
-                <a:latin typeface="Arial" panose="020B0604020202020204" pitchFamily="34" charset="0"/>
-                <a:cs typeface="Arial" panose="020B0604020202020204" pitchFamily="34" charset="0"/>
-              </a:rPr>
-              <a:t>grid</a:t>
-            </a:r>
-            <a:r>
-              <a:rPr lang="de-CH" sz="2000" dirty="0">
-                <a:latin typeface="Arial" panose="020B0604020202020204" pitchFamily="34" charset="0"/>
-                <a:cs typeface="Arial" panose="020B0604020202020204" pitchFamily="34" charset="0"/>
-              </a:rPr>
-              <a:t>-template-</a:t>
-            </a:r>
-            <a:r>
-              <a:rPr lang="de-CH" sz="2000" dirty="0" err="1">
-                <a:latin typeface="Arial" panose="020B0604020202020204" pitchFamily="34" charset="0"/>
-                <a:cs typeface="Arial" panose="020B0604020202020204" pitchFamily="34" charset="0"/>
-              </a:rPr>
-              <a:t>columns</a:t>
-            </a:r>
-            <a:r>
-              <a:rPr lang="de-CH" sz="2000" dirty="0">
-                <a:latin typeface="Arial" panose="020B0604020202020204" pitchFamily="34" charset="0"/>
-                <a:cs typeface="Arial" panose="020B0604020202020204" pitchFamily="34" charset="0"/>
-              </a:rPr>
-              <a:t>: 20% 60% 20%;</a:t>
-            </a:r>
-            <a:br>
-              <a:rPr lang="de-CH" sz="2000" dirty="0">
-                <a:latin typeface="Arial" panose="020B0604020202020204" pitchFamily="34" charset="0"/>
-                <a:cs typeface="Arial" panose="020B0604020202020204" pitchFamily="34" charset="0"/>
-              </a:rPr>
-            </a:br>
-            <a:r>
-              <a:rPr lang="de-CH" sz="2000" dirty="0" err="1">
-                <a:latin typeface="Arial" panose="020B0604020202020204" pitchFamily="34" charset="0"/>
-                <a:cs typeface="Arial" panose="020B0604020202020204" pitchFamily="34" charset="0"/>
-              </a:rPr>
-              <a:t>grid</a:t>
-            </a:r>
-            <a:r>
-              <a:rPr lang="de-CH" sz="2000" dirty="0">
-                <a:latin typeface="Arial" panose="020B0604020202020204" pitchFamily="34" charset="0"/>
-                <a:cs typeface="Arial" panose="020B0604020202020204" pitchFamily="34" charset="0"/>
-              </a:rPr>
-              <a:t>-template-</a:t>
-            </a:r>
-            <a:r>
-              <a:rPr lang="de-CH" sz="2000" dirty="0" err="1">
-                <a:latin typeface="Arial" panose="020B0604020202020204" pitchFamily="34" charset="0"/>
-                <a:cs typeface="Arial" panose="020B0604020202020204" pitchFamily="34" charset="0"/>
-              </a:rPr>
-              <a:t>columns</a:t>
-            </a:r>
-            <a:r>
-              <a:rPr lang="de-CH" sz="2000" dirty="0">
-                <a:latin typeface="Arial" panose="020B0604020202020204" pitchFamily="34" charset="0"/>
-                <a:cs typeface="Arial" panose="020B0604020202020204" pitchFamily="34" charset="0"/>
-              </a:rPr>
-              <a:t>: [eins] 20% [zwei] 60% [drei] 20% [vier];</a:t>
-            </a:r>
-            <a:br>
-              <a:rPr lang="de-CH" sz="2000" b="1" dirty="0">
-                <a:latin typeface="Arial" panose="020B0604020202020204" pitchFamily="34" charset="0"/>
-                <a:cs typeface="Arial" panose="020B0604020202020204" pitchFamily="34" charset="0"/>
-              </a:rPr>
-            </a:br>
-            <a:endParaRPr lang="de-CH" sz="2000" dirty="0">
-              <a:latin typeface="Arial" panose="020B0604020202020204" pitchFamily="34" charset="0"/>
-              <a:cs typeface="Arial" panose="020B0604020202020204" pitchFamily="34" charset="0"/>
-            </a:endParaRPr>
-          </a:p>
-          <a:p>
-            <a:r>
-              <a:rPr lang="de-CH" dirty="0" err="1">
-                <a:solidFill>
-                  <a:schemeClr val="bg1"/>
-                </a:solidFill>
-              </a:rPr>
-              <a:t>grid</a:t>
-            </a:r>
-            <a:r>
-              <a:rPr lang="de-CH" dirty="0">
-                <a:solidFill>
-                  <a:schemeClr val="bg1"/>
-                </a:solidFill>
-              </a:rPr>
-              <a:t>-template-</a:t>
-            </a:r>
-            <a:r>
-              <a:rPr lang="de-CH" dirty="0" err="1">
-                <a:solidFill>
-                  <a:schemeClr val="bg1"/>
-                </a:solidFill>
-              </a:rPr>
-              <a:t>rows</a:t>
-            </a:r>
-            <a:r>
-              <a:rPr lang="de-CH" dirty="0"/>
-              <a:t>: </a:t>
-            </a:r>
-            <a:r>
-              <a:rPr lang="de-CH" dirty="0" err="1"/>
-              <a:t>Definert</a:t>
-            </a:r>
-            <a:r>
-              <a:rPr lang="de-CH" dirty="0"/>
-              <a:t> die Anzahl und Grösse der Reihen</a:t>
-            </a:r>
-            <a:r>
-              <a:rPr lang="de-CH" b="1" dirty="0"/>
-              <a:t>.</a:t>
-            </a:r>
-            <a:br>
-              <a:rPr lang="de-CH" b="1" dirty="0"/>
-            </a:br>
-            <a:r>
-              <a:rPr lang="de-CH" sz="2000" dirty="0" err="1">
-                <a:latin typeface="Arial" panose="020B0604020202020204" pitchFamily="34" charset="0"/>
-                <a:cs typeface="Arial" panose="020B0604020202020204" pitchFamily="34" charset="0"/>
-              </a:rPr>
-              <a:t>grid</a:t>
-            </a:r>
-            <a:r>
-              <a:rPr lang="de-CH" sz="2000" dirty="0">
-                <a:latin typeface="Arial" panose="020B0604020202020204" pitchFamily="34" charset="0"/>
-                <a:cs typeface="Arial" panose="020B0604020202020204" pitchFamily="34" charset="0"/>
-              </a:rPr>
-              <a:t>-template-</a:t>
-            </a:r>
-            <a:r>
-              <a:rPr lang="de-CH" sz="2000" dirty="0" err="1">
-                <a:latin typeface="Arial" panose="020B0604020202020204" pitchFamily="34" charset="0"/>
-                <a:cs typeface="Arial" panose="020B0604020202020204" pitchFamily="34" charset="0"/>
-              </a:rPr>
-              <a:t>rows</a:t>
-            </a:r>
-            <a:r>
-              <a:rPr lang="de-CH" sz="2000" dirty="0">
-                <a:latin typeface="Arial" panose="020B0604020202020204" pitchFamily="34" charset="0"/>
-                <a:cs typeface="Arial" panose="020B0604020202020204" pitchFamily="34" charset="0"/>
-              </a:rPr>
-              <a:t>: 100px </a:t>
-            </a:r>
-            <a:r>
-              <a:rPr lang="de-CH" sz="2000" dirty="0" err="1">
-                <a:latin typeface="Arial" panose="020B0604020202020204" pitchFamily="34" charset="0"/>
-                <a:cs typeface="Arial" panose="020B0604020202020204" pitchFamily="34" charset="0"/>
-              </a:rPr>
-              <a:t>auto</a:t>
-            </a:r>
-            <a:r>
-              <a:rPr lang="de-CH" sz="2000" dirty="0">
-                <a:latin typeface="Arial" panose="020B0604020202020204" pitchFamily="34" charset="0"/>
-                <a:cs typeface="Arial" panose="020B0604020202020204" pitchFamily="34" charset="0"/>
-              </a:rPr>
-              <a:t> 100px;</a:t>
-            </a:r>
-            <a:br>
-              <a:rPr lang="de-CH" sz="2000" dirty="0">
-                <a:latin typeface="Arial" panose="020B0604020202020204" pitchFamily="34" charset="0"/>
-                <a:cs typeface="Arial" panose="020B0604020202020204" pitchFamily="34" charset="0"/>
-              </a:rPr>
-            </a:br>
-            <a:r>
-              <a:rPr lang="de-CH" sz="2000" dirty="0" err="1">
-                <a:latin typeface="Arial" panose="020B0604020202020204" pitchFamily="34" charset="0"/>
-                <a:cs typeface="Arial" panose="020B0604020202020204" pitchFamily="34" charset="0"/>
-              </a:rPr>
-              <a:t>grid</a:t>
-            </a:r>
-            <a:r>
-              <a:rPr lang="de-CH" sz="2000" dirty="0">
-                <a:latin typeface="Arial" panose="020B0604020202020204" pitchFamily="34" charset="0"/>
-                <a:cs typeface="Arial" panose="020B0604020202020204" pitchFamily="34" charset="0"/>
-              </a:rPr>
-              <a:t>-template-</a:t>
-            </a:r>
-            <a:r>
-              <a:rPr lang="de-CH" sz="2000" dirty="0" err="1">
-                <a:latin typeface="Arial" panose="020B0604020202020204" pitchFamily="34" charset="0"/>
-                <a:cs typeface="Arial" panose="020B0604020202020204" pitchFamily="34" charset="0"/>
-              </a:rPr>
-              <a:t>rows</a:t>
-            </a:r>
-            <a:r>
-              <a:rPr lang="de-CH" sz="2000" dirty="0">
-                <a:latin typeface="Arial" panose="020B0604020202020204" pitchFamily="34" charset="0"/>
-                <a:cs typeface="Arial" panose="020B0604020202020204" pitchFamily="34" charset="0"/>
-              </a:rPr>
-              <a:t>: [row1] 100px [row2] </a:t>
-            </a:r>
-            <a:r>
-              <a:rPr lang="de-CH" sz="2000" dirty="0" err="1">
-                <a:latin typeface="Arial" panose="020B0604020202020204" pitchFamily="34" charset="0"/>
-                <a:cs typeface="Arial" panose="020B0604020202020204" pitchFamily="34" charset="0"/>
-              </a:rPr>
-              <a:t>auto</a:t>
-            </a:r>
-            <a:r>
-              <a:rPr lang="de-CH" sz="2000" dirty="0">
-                <a:latin typeface="Arial" panose="020B0604020202020204" pitchFamily="34" charset="0"/>
-                <a:cs typeface="Arial" panose="020B0604020202020204" pitchFamily="34" charset="0"/>
-              </a:rPr>
-              <a:t> [row3] 100px [ende];</a:t>
-            </a:r>
-          </a:p>
-        </p:txBody>
-      </p:sp>
+      </p:pic>
     </p:spTree>
     <p:extLst>
       <p:ext uri="{BB962C8B-B14F-4D97-AF65-F5344CB8AC3E}">
-        <p14:creationId xmlns:p14="http://schemas.microsoft.com/office/powerpoint/2010/main" val="714284251"/>
+        <p14:creationId xmlns:p14="http://schemas.microsoft.com/office/powerpoint/2010/main" val="2062539358"/>
       </p:ext>
     </p:extLst>
   </p:cSld>
@@ -9455,10 +9323,10 @@
       </p:grpSpPr>
       <p:sp>
         <p:nvSpPr>
-          <p:cNvPr id="2" name="Titel 1">
+          <p:cNvPr id="2" name="Title 1">
             <a:extLst>
               <a:ext uri="{FF2B5EF4-FFF2-40B4-BE49-F238E27FC236}">
-                <a16:creationId xmlns:a16="http://schemas.microsoft.com/office/drawing/2014/main" id="{10085994-E9B3-9C49-88DA-85CB7896D777}"/>
+                <a16:creationId xmlns:a16="http://schemas.microsoft.com/office/drawing/2014/main" id="{9D70707D-CDCD-8E4A-9738-E3DB279BB242}"/>
               </a:ext>
             </a:extLst>
           </p:cNvPr>
@@ -9475,173 +9343,81 @@
           <a:lstStyle/>
           <a:p>
             <a:r>
-              <a:rPr lang="de-DE" dirty="0" err="1"/>
+              <a:rPr lang="en-US" dirty="0"/>
               <a:t>Grid</a:t>
             </a:r>
-            <a:r>
-              <a:rPr lang="de-DE" dirty="0"/>
-              <a:t>: Container Properties</a:t>
-            </a:r>
-          </a:p>
-        </p:txBody>
-      </p:sp>
-      <p:pic>
-        <p:nvPicPr>
-          <p:cNvPr id="9" name="Inhaltsplatzhalter 8">
+          </a:p>
+        </p:txBody>
+      </p:sp>
+      <p:sp>
+        <p:nvSpPr>
+          <p:cNvPr id="4" name="Inhaltsplatzhalter 3">
             <a:extLst>
               <a:ext uri="{FF2B5EF4-FFF2-40B4-BE49-F238E27FC236}">
-                <a16:creationId xmlns:a16="http://schemas.microsoft.com/office/drawing/2014/main" id="{C644C42D-72EF-2A48-816F-36D82961D15D}"/>
+                <a16:creationId xmlns:a16="http://schemas.microsoft.com/office/drawing/2014/main" id="{5F467F9B-4189-6546-A21B-AF6B8FA98FE2}"/>
               </a:ext>
             </a:extLst>
           </p:cNvPr>
-          <p:cNvPicPr>
-            <a:picLocks noGrp="1" noChangeAspect="1"/>
-          </p:cNvPicPr>
+          <p:cNvSpPr>
+            <a:spLocks noGrp="1"/>
+          </p:cNvSpPr>
           <p:nvPr>
             <p:ph idx="1"/>
           </p:nvPr>
-        </p:nvPicPr>
-        <p:blipFill>
-          <a:blip r:embed="rId2"/>
-          <a:stretch>
-            <a:fillRect/>
-          </a:stretch>
-        </p:blipFill>
-        <p:spPr>
-          <a:xfrm>
-            <a:off x="889798" y="3389272"/>
-            <a:ext cx="6592171" cy="2916163"/>
-          </a:xfrm>
-        </p:spPr>
-      </p:pic>
-      <p:sp>
-        <p:nvSpPr>
-          <p:cNvPr id="10" name="Rechteck 9">
-            <a:extLst>
-              <a:ext uri="{FF2B5EF4-FFF2-40B4-BE49-F238E27FC236}">
-                <a16:creationId xmlns:a16="http://schemas.microsoft.com/office/drawing/2014/main" id="{5C1814EE-CFB9-BA40-8AAF-2BE7E486CDD9}"/>
-              </a:ext>
-            </a:extLst>
-          </p:cNvPr>
-          <p:cNvSpPr/>
-          <p:nvPr/>
-        </p:nvSpPr>
-        <p:spPr>
-          <a:xfrm>
-            <a:off x="889798" y="2281276"/>
-            <a:ext cx="4172937" cy="369332"/>
-          </a:xfrm>
-          <a:prstGeom prst="rect">
-            <a:avLst/>
-          </a:prstGeom>
-        </p:spPr>
-        <p:txBody>
-          <a:bodyPr wrap="none">
-            <a:spAutoFit/>
-          </a:bodyPr>
+        </p:nvSpPr>
+        <p:spPr/>
+        <p:txBody>
+          <a:bodyPr/>
           <a:lstStyle/>
           <a:p>
             <a:r>
-              <a:rPr lang="de-CH" dirty="0" err="1">
-                <a:latin typeface="Arial" panose="020B0604020202020204" pitchFamily="34" charset="0"/>
-                <a:cs typeface="Arial" panose="020B0604020202020204" pitchFamily="34" charset="0"/>
-              </a:rPr>
+              <a:rPr lang="de-DE" dirty="0" err="1"/>
+              <a:t>Grid</a:t>
+            </a:r>
+            <a:r>
+              <a:rPr lang="de-DE" dirty="0"/>
+              <a:t> Layout auf dem Container (Parent Element) definieren</a:t>
+            </a:r>
+            <a:br>
+              <a:rPr lang="de-DE" dirty="0"/>
+            </a:br>
+            <a:r>
+              <a:rPr lang="de-DE" b="1" dirty="0" err="1"/>
+              <a:t>display</a:t>
+            </a:r>
+            <a:r>
+              <a:rPr lang="de-DE" b="1" dirty="0"/>
+              <a:t>: </a:t>
+            </a:r>
+            <a:r>
+              <a:rPr lang="de-DE" b="1" dirty="0" err="1"/>
               <a:t>grid</a:t>
             </a:r>
-            <a:r>
-              <a:rPr lang="de-CH" dirty="0">
-                <a:latin typeface="Arial" panose="020B0604020202020204" pitchFamily="34" charset="0"/>
-                <a:cs typeface="Arial" panose="020B0604020202020204" pitchFamily="34" charset="0"/>
-              </a:rPr>
-              <a:t>-template-</a:t>
-            </a:r>
-            <a:r>
-              <a:rPr lang="de-CH" dirty="0" err="1">
-                <a:latin typeface="Arial" panose="020B0604020202020204" pitchFamily="34" charset="0"/>
-                <a:cs typeface="Arial" panose="020B0604020202020204" pitchFamily="34" charset="0"/>
-              </a:rPr>
-              <a:t>columns</a:t>
-            </a:r>
-            <a:r>
-              <a:rPr lang="de-CH" dirty="0">
-                <a:latin typeface="Arial" panose="020B0604020202020204" pitchFamily="34" charset="0"/>
-                <a:cs typeface="Arial" panose="020B0604020202020204" pitchFamily="34" charset="0"/>
-              </a:rPr>
-              <a:t>: 20% 60% 20%;</a:t>
+            <a:endParaRPr lang="de-DE" b="1" dirty="0"/>
+          </a:p>
+          <a:p>
+            <a:r>
+              <a:rPr lang="de-DE" dirty="0"/>
+              <a:t>Gute Doku:</a:t>
+            </a:r>
+            <a:br>
+              <a:rPr lang="de-DE" dirty="0"/>
+            </a:br>
+            <a:r>
+              <a:rPr lang="de-DE" dirty="0">
+                <a:hlinkClick r:id="rId2"/>
+              </a:rPr>
+              <a:t>https://css-tricks.com/snippets/css/complete-guide-grid/</a:t>
             </a:r>
             <a:endParaRPr lang="de-DE" dirty="0"/>
           </a:p>
-        </p:txBody>
-      </p:sp>
-      <p:sp>
-        <p:nvSpPr>
-          <p:cNvPr id="11" name="Rechteck 10">
-            <a:extLst>
-              <a:ext uri="{FF2B5EF4-FFF2-40B4-BE49-F238E27FC236}">
-                <a16:creationId xmlns:a16="http://schemas.microsoft.com/office/drawing/2014/main" id="{E743F98C-590F-2345-AA1A-E117AC7E1BAF}"/>
-              </a:ext>
-            </a:extLst>
-          </p:cNvPr>
-          <p:cNvSpPr/>
-          <p:nvPr/>
-        </p:nvSpPr>
-        <p:spPr>
-          <a:xfrm>
-            <a:off x="889798" y="2650608"/>
-            <a:ext cx="6096000" cy="369332"/>
-          </a:xfrm>
-          <a:prstGeom prst="rect">
-            <a:avLst/>
-          </a:prstGeom>
-        </p:spPr>
-        <p:txBody>
-          <a:bodyPr>
-            <a:spAutoFit/>
-          </a:bodyPr>
-          <a:lstStyle/>
-          <a:p>
-            <a:r>
-              <a:rPr lang="de-CH" dirty="0" err="1">
-                <a:latin typeface="Arial" panose="020B0604020202020204" pitchFamily="34" charset="0"/>
-                <a:cs typeface="Arial" panose="020B0604020202020204" pitchFamily="34" charset="0"/>
-              </a:rPr>
-              <a:t>grid</a:t>
-            </a:r>
-            <a:r>
-              <a:rPr lang="de-CH" dirty="0">
-                <a:latin typeface="Arial" panose="020B0604020202020204" pitchFamily="34" charset="0"/>
-                <a:cs typeface="Arial" panose="020B0604020202020204" pitchFamily="34" charset="0"/>
-              </a:rPr>
-              <a:t>-template-</a:t>
-            </a:r>
-            <a:r>
-              <a:rPr lang="de-CH" dirty="0" err="1">
-                <a:latin typeface="Arial" panose="020B0604020202020204" pitchFamily="34" charset="0"/>
-                <a:cs typeface="Arial" panose="020B0604020202020204" pitchFamily="34" charset="0"/>
-              </a:rPr>
-              <a:t>rows</a:t>
-            </a:r>
-            <a:r>
-              <a:rPr lang="de-CH" dirty="0">
-                <a:latin typeface="Arial" panose="020B0604020202020204" pitchFamily="34" charset="0"/>
-                <a:cs typeface="Arial" panose="020B0604020202020204" pitchFamily="34" charset="0"/>
-              </a:rPr>
-              <a:t>: 100px </a:t>
-            </a:r>
-            <a:r>
-              <a:rPr lang="de-CH" dirty="0" err="1">
-                <a:latin typeface="Arial" panose="020B0604020202020204" pitchFamily="34" charset="0"/>
-                <a:cs typeface="Arial" panose="020B0604020202020204" pitchFamily="34" charset="0"/>
-              </a:rPr>
-              <a:t>auto</a:t>
-            </a:r>
-            <a:r>
-              <a:rPr lang="de-CH" dirty="0">
-                <a:latin typeface="Arial" panose="020B0604020202020204" pitchFamily="34" charset="0"/>
-                <a:cs typeface="Arial" panose="020B0604020202020204" pitchFamily="34" charset="0"/>
-              </a:rPr>
-              <a:t> 100px;</a:t>
-            </a:r>
+          <a:p>
+            <a:pPr marL="0" indent="0">
+              <a:buNone/>
+            </a:pPr>
+            <a:endParaRPr lang="de-DE" dirty="0"/>
+          </a:p>
+          <a:p>
             <a:endParaRPr lang="de-DE" dirty="0"/>
           </a:p>
         </p:txBody>
@@ -9649,7 +9425,7 @@
     </p:spTree>
     <p:extLst>
       <p:ext uri="{BB962C8B-B14F-4D97-AF65-F5344CB8AC3E}">
-        <p14:creationId xmlns:p14="http://schemas.microsoft.com/office/powerpoint/2010/main" val="3096845263"/>
+        <p14:creationId xmlns:p14="http://schemas.microsoft.com/office/powerpoint/2010/main" val="366060195"/>
       </p:ext>
     </p:extLst>
   </p:cSld>
@@ -9681,7 +9457,7 @@
           <p:cNvPr id="2" name="Titel 1">
             <a:extLst>
               <a:ext uri="{FF2B5EF4-FFF2-40B4-BE49-F238E27FC236}">
-                <a16:creationId xmlns:a16="http://schemas.microsoft.com/office/drawing/2014/main" id="{42A5B1AA-ADEF-F348-A0E4-381E0CA6525F}"/>
+                <a16:creationId xmlns:a16="http://schemas.microsoft.com/office/drawing/2014/main" id="{19033134-0BFA-AE4B-AAE3-E9131EA31B93}"/>
               </a:ext>
             </a:extLst>
           </p:cNvPr>
@@ -9708,171 +9484,281 @@
           </a:p>
         </p:txBody>
       </p:sp>
-      <p:pic>
-        <p:nvPicPr>
-          <p:cNvPr id="5" name="Inhaltsplatzhalter 4">
+      <p:sp>
+        <p:nvSpPr>
+          <p:cNvPr id="7" name="Inhaltsplatzhalter 6">
             <a:extLst>
               <a:ext uri="{FF2B5EF4-FFF2-40B4-BE49-F238E27FC236}">
-                <a16:creationId xmlns:a16="http://schemas.microsoft.com/office/drawing/2014/main" id="{09F627C6-0BE4-2145-A7D3-7F54CD309458}"/>
+                <a16:creationId xmlns:a16="http://schemas.microsoft.com/office/drawing/2014/main" id="{662274F8-DBDF-1941-95E5-496B43E07EBD}"/>
               </a:ext>
             </a:extLst>
           </p:cNvPr>
-          <p:cNvPicPr>
-            <a:picLocks noGrp="1" noChangeAspect="1"/>
-          </p:cNvPicPr>
+          <p:cNvSpPr>
+            <a:spLocks noGrp="1"/>
+          </p:cNvSpPr>
           <p:nvPr>
             <p:ph idx="1"/>
           </p:nvPr>
-        </p:nvPicPr>
-        <p:blipFill>
-          <a:blip r:embed="rId2"/>
-          <a:stretch>
-            <a:fillRect/>
-          </a:stretch>
-        </p:blipFill>
+        </p:nvSpPr>
         <p:spPr>
           <a:xfrm>
-            <a:off x="680321" y="3343910"/>
-            <a:ext cx="7013709" cy="3022600"/>
+            <a:off x="680321" y="2336873"/>
+            <a:ext cx="9915289" cy="3599316"/>
           </a:xfrm>
         </p:spPr>
-      </p:pic>
-      <p:sp>
-        <p:nvSpPr>
-          <p:cNvPr id="6" name="Rechteck 5">
-            <a:extLst>
-              <a:ext uri="{FF2B5EF4-FFF2-40B4-BE49-F238E27FC236}">
-                <a16:creationId xmlns:a16="http://schemas.microsoft.com/office/drawing/2014/main" id="{1EEC8D5E-3E9D-3E4E-B228-D0BB3D94818B}"/>
-              </a:ext>
-            </a:extLst>
-          </p:cNvPr>
-          <p:cNvSpPr/>
-          <p:nvPr/>
-        </p:nvSpPr>
-        <p:spPr>
-          <a:xfrm>
-            <a:off x="680321" y="2317165"/>
-            <a:ext cx="6873240" cy="369332"/>
-          </a:xfrm>
-          <a:prstGeom prst="rect">
-            <a:avLst/>
-          </a:prstGeom>
-        </p:spPr>
-        <p:txBody>
-          <a:bodyPr wrap="square">
-            <a:spAutoFit/>
-          </a:bodyPr>
+        <p:txBody>
+          <a:bodyPr/>
           <a:lstStyle/>
           <a:p>
             <a:r>
               <a:rPr lang="de-CH" dirty="0" err="1">
-                <a:latin typeface="Arial" panose="020B0604020202020204" pitchFamily="34" charset="0"/>
-                <a:cs typeface="Arial" panose="020B0604020202020204" pitchFamily="34" charset="0"/>
+                <a:solidFill>
+                  <a:schemeClr val="bg1"/>
+                </a:solidFill>
               </a:rPr>
               <a:t>grid</a:t>
             </a:r>
             <a:r>
               <a:rPr lang="de-CH" dirty="0">
-                <a:latin typeface="Arial" panose="020B0604020202020204" pitchFamily="34" charset="0"/>
-                <a:cs typeface="Arial" panose="020B0604020202020204" pitchFamily="34" charset="0"/>
+                <a:solidFill>
+                  <a:schemeClr val="bg1"/>
+                </a:solidFill>
               </a:rPr>
               <a:t>-template-</a:t>
             </a:r>
             <a:r>
               <a:rPr lang="de-CH" dirty="0" err="1">
-                <a:latin typeface="Arial" panose="020B0604020202020204" pitchFamily="34" charset="0"/>
-                <a:cs typeface="Arial" panose="020B0604020202020204" pitchFamily="34" charset="0"/>
+                <a:solidFill>
+                  <a:schemeClr val="bg1"/>
+                </a:solidFill>
               </a:rPr>
               <a:t>columns</a:t>
             </a:r>
             <a:r>
+              <a:rPr lang="de-CH" dirty="0"/>
+              <a:t>:  Definiert die Anzahl und Grösse der Spalten</a:t>
+            </a:r>
+            <a:r>
+              <a:rPr lang="de-CH" b="1" dirty="0"/>
+              <a:t>.</a:t>
+            </a:r>
+            <a:br>
+              <a:rPr lang="de-CH" b="1" dirty="0"/>
+            </a:br>
+            <a:r>
+              <a:rPr lang="de-CH" sz="2000" dirty="0" err="1">
+                <a:latin typeface="Arial" panose="020B0604020202020204" pitchFamily="34" charset="0"/>
+                <a:cs typeface="Arial" panose="020B0604020202020204" pitchFamily="34" charset="0"/>
+              </a:rPr>
+              <a:t>grid</a:t>
+            </a:r>
+            <a:r>
+              <a:rPr lang="de-CH" sz="2000" dirty="0">
+                <a:latin typeface="Arial" panose="020B0604020202020204" pitchFamily="34" charset="0"/>
+                <a:cs typeface="Arial" panose="020B0604020202020204" pitchFamily="34" charset="0"/>
+              </a:rPr>
+              <a:t>-template-</a:t>
+            </a:r>
+            <a:r>
+              <a:rPr lang="de-CH" sz="2000" dirty="0" err="1">
+                <a:latin typeface="Arial" panose="020B0604020202020204" pitchFamily="34" charset="0"/>
+                <a:cs typeface="Arial" panose="020B0604020202020204" pitchFamily="34" charset="0"/>
+              </a:rPr>
+              <a:t>columns</a:t>
+            </a:r>
+            <a:r>
+              <a:rPr lang="de-CH" sz="2000" dirty="0">
+                <a:latin typeface="Arial" panose="020B0604020202020204" pitchFamily="34" charset="0"/>
+                <a:cs typeface="Arial" panose="020B0604020202020204" pitchFamily="34" charset="0"/>
+              </a:rPr>
+              <a:t>: 20% 60% 20%;</a:t>
+            </a:r>
+            <a:br>
+              <a:rPr lang="de-CH" sz="2000" dirty="0">
+                <a:latin typeface="Arial" panose="020B0604020202020204" pitchFamily="34" charset="0"/>
+                <a:cs typeface="Arial" panose="020B0604020202020204" pitchFamily="34" charset="0"/>
+              </a:rPr>
+            </a:br>
+            <a:r>
+              <a:rPr lang="de-CH" sz="2000" dirty="0" err="1">
+                <a:latin typeface="Arial" panose="020B0604020202020204" pitchFamily="34" charset="0"/>
+                <a:cs typeface="Arial" panose="020B0604020202020204" pitchFamily="34" charset="0"/>
+              </a:rPr>
+              <a:t>grid</a:t>
+            </a:r>
+            <a:r>
+              <a:rPr lang="de-CH" sz="2000" dirty="0">
+                <a:latin typeface="Arial" panose="020B0604020202020204" pitchFamily="34" charset="0"/>
+                <a:cs typeface="Arial" panose="020B0604020202020204" pitchFamily="34" charset="0"/>
+              </a:rPr>
+              <a:t>-template-</a:t>
+            </a:r>
+            <a:r>
+              <a:rPr lang="de-CH" sz="2000" dirty="0" err="1">
+                <a:latin typeface="Arial" panose="020B0604020202020204" pitchFamily="34" charset="0"/>
+                <a:cs typeface="Arial" panose="020B0604020202020204" pitchFamily="34" charset="0"/>
+              </a:rPr>
+              <a:t>columns</a:t>
+            </a:r>
+            <a:r>
+              <a:rPr lang="de-CH" sz="2000" dirty="0">
+                <a:latin typeface="Arial" panose="020B0604020202020204" pitchFamily="34" charset="0"/>
+                <a:cs typeface="Arial" panose="020B0604020202020204" pitchFamily="34" charset="0"/>
+              </a:rPr>
+              <a:t>: [eins] 20% [zwei] 60% [drei] 20% [vier];</a:t>
+            </a:r>
+            <a:br>
+              <a:rPr lang="de-CH" sz="2000" b="1" dirty="0">
+                <a:latin typeface="Arial" panose="020B0604020202020204" pitchFamily="34" charset="0"/>
+                <a:cs typeface="Arial" panose="020B0604020202020204" pitchFamily="34" charset="0"/>
+              </a:rPr>
+            </a:br>
+            <a:endParaRPr lang="de-CH" sz="2000" dirty="0">
+              <a:latin typeface="Arial" panose="020B0604020202020204" pitchFamily="34" charset="0"/>
+              <a:cs typeface="Arial" panose="020B0604020202020204" pitchFamily="34" charset="0"/>
+            </a:endParaRPr>
+          </a:p>
+          <a:p>
+            <a:r>
+              <a:rPr lang="de-CH" dirty="0" err="1">
+                <a:solidFill>
+                  <a:schemeClr val="bg1"/>
+                </a:solidFill>
+              </a:rPr>
+              <a:t>grid</a:t>
+            </a:r>
+            <a:r>
               <a:rPr lang="de-CH" dirty="0">
-                <a:latin typeface="Arial" panose="020B0604020202020204" pitchFamily="34" charset="0"/>
-                <a:cs typeface="Arial" panose="020B0604020202020204" pitchFamily="34" charset="0"/>
-              </a:rPr>
-              <a:t>: [eins] 20% [zwei] 60% [drei] 20% [vier];</a:t>
-            </a:r>
-            <a:endParaRPr lang="de-DE" dirty="0"/>
-          </a:p>
-        </p:txBody>
-      </p:sp>
-      <p:sp>
-        <p:nvSpPr>
-          <p:cNvPr id="7" name="Rechteck 6">
-            <a:extLst>
-              <a:ext uri="{FF2B5EF4-FFF2-40B4-BE49-F238E27FC236}">
-                <a16:creationId xmlns:a16="http://schemas.microsoft.com/office/drawing/2014/main" id="{DEBF59EC-59FB-C14F-A76E-FCF584425CF1}"/>
-              </a:ext>
-            </a:extLst>
-          </p:cNvPr>
-          <p:cNvSpPr/>
-          <p:nvPr/>
-        </p:nvSpPr>
-        <p:spPr>
-          <a:xfrm>
-            <a:off x="680321" y="2686497"/>
-            <a:ext cx="7044690" cy="369332"/>
-          </a:xfrm>
-          <a:prstGeom prst="rect">
-            <a:avLst/>
-          </a:prstGeom>
-        </p:spPr>
-        <p:txBody>
-          <a:bodyPr wrap="square">
-            <a:spAutoFit/>
-          </a:bodyPr>
-          <a:lstStyle/>
-          <a:p>
+                <a:solidFill>
+                  <a:schemeClr val="bg1"/>
+                </a:solidFill>
+              </a:rPr>
+              <a:t>-template-</a:t>
+            </a:r>
             <a:r>
               <a:rPr lang="de-CH" dirty="0" err="1">
+                <a:solidFill>
+                  <a:schemeClr val="bg1"/>
+                </a:solidFill>
+              </a:rPr>
+              <a:t>rows</a:t>
+            </a:r>
+            <a:r>
+              <a:rPr lang="de-CH" dirty="0"/>
+              <a:t>: </a:t>
+            </a:r>
+            <a:r>
+              <a:rPr lang="de-CH" dirty="0" err="1"/>
+              <a:t>Definert</a:t>
+            </a:r>
+            <a:r>
+              <a:rPr lang="de-CH" dirty="0"/>
+              <a:t> die Anzahl und Grösse der Reihen</a:t>
+            </a:r>
+            <a:r>
+              <a:rPr lang="de-CH" b="1" dirty="0"/>
+              <a:t>.</a:t>
+            </a:r>
+            <a:br>
+              <a:rPr lang="de-CH" b="1" dirty="0"/>
+            </a:br>
+            <a:r>
+              <a:rPr lang="de-CH" sz="2000" dirty="0" err="1">
                 <a:latin typeface="Arial" panose="020B0604020202020204" pitchFamily="34" charset="0"/>
                 <a:cs typeface="Arial" panose="020B0604020202020204" pitchFamily="34" charset="0"/>
               </a:rPr>
               <a:t>grid</a:t>
             </a:r>
             <a:r>
-              <a:rPr lang="de-CH" dirty="0">
+              <a:rPr lang="de-CH" sz="2000" dirty="0">
                 <a:latin typeface="Arial" panose="020B0604020202020204" pitchFamily="34" charset="0"/>
                 <a:cs typeface="Arial" panose="020B0604020202020204" pitchFamily="34" charset="0"/>
               </a:rPr>
               <a:t>-template-</a:t>
             </a:r>
             <a:r>
-              <a:rPr lang="de-CH" dirty="0" err="1">
+              <a:rPr lang="de-CH" sz="2000" dirty="0" err="1">
                 <a:latin typeface="Arial" panose="020B0604020202020204" pitchFamily="34" charset="0"/>
                 <a:cs typeface="Arial" panose="020B0604020202020204" pitchFamily="34" charset="0"/>
               </a:rPr>
               <a:t>rows</a:t>
             </a:r>
             <a:r>
-              <a:rPr lang="de-CH" dirty="0">
+              <a:rPr lang="de-CH" sz="2000" dirty="0">
+                <a:latin typeface="Arial" panose="020B0604020202020204" pitchFamily="34" charset="0"/>
+                <a:cs typeface="Arial" panose="020B0604020202020204" pitchFamily="34" charset="0"/>
+              </a:rPr>
+              <a:t>: 100px </a:t>
+            </a:r>
+            <a:r>
+              <a:rPr lang="de-CH" sz="2000" dirty="0" err="1">
+                <a:latin typeface="Arial" panose="020B0604020202020204" pitchFamily="34" charset="0"/>
+                <a:cs typeface="Arial" panose="020B0604020202020204" pitchFamily="34" charset="0"/>
+              </a:rPr>
+              <a:t>auto</a:t>
+            </a:r>
+            <a:r>
+              <a:rPr lang="de-CH" sz="2000" dirty="0">
+                <a:latin typeface="Arial" panose="020B0604020202020204" pitchFamily="34" charset="0"/>
+                <a:cs typeface="Arial" panose="020B0604020202020204" pitchFamily="34" charset="0"/>
+              </a:rPr>
+              <a:t> 100px;</a:t>
+            </a:r>
+            <a:br>
+              <a:rPr lang="de-CH" sz="2000" dirty="0">
+                <a:latin typeface="Arial" panose="020B0604020202020204" pitchFamily="34" charset="0"/>
+                <a:cs typeface="Arial" panose="020B0604020202020204" pitchFamily="34" charset="0"/>
+              </a:rPr>
+            </a:br>
+            <a:r>
+              <a:rPr lang="de-CH" sz="2000" dirty="0" err="1">
+                <a:latin typeface="Arial" panose="020B0604020202020204" pitchFamily="34" charset="0"/>
+                <a:cs typeface="Arial" panose="020B0604020202020204" pitchFamily="34" charset="0"/>
+              </a:rPr>
+              <a:t>grid</a:t>
+            </a:r>
+            <a:r>
+              <a:rPr lang="de-CH" sz="2000" dirty="0">
+                <a:latin typeface="Arial" panose="020B0604020202020204" pitchFamily="34" charset="0"/>
+                <a:cs typeface="Arial" panose="020B0604020202020204" pitchFamily="34" charset="0"/>
+              </a:rPr>
+              <a:t>-template-</a:t>
+            </a:r>
+            <a:r>
+              <a:rPr lang="de-CH" sz="2000" dirty="0" err="1">
+                <a:latin typeface="Arial" panose="020B0604020202020204" pitchFamily="34" charset="0"/>
+                <a:cs typeface="Arial" panose="020B0604020202020204" pitchFamily="34" charset="0"/>
+              </a:rPr>
+              <a:t>rows</a:t>
+            </a:r>
+            <a:r>
+              <a:rPr lang="de-CH" sz="2000" dirty="0">
                 <a:latin typeface="Arial" panose="020B0604020202020204" pitchFamily="34" charset="0"/>
                 <a:cs typeface="Arial" panose="020B0604020202020204" pitchFamily="34" charset="0"/>
               </a:rPr>
               <a:t>: [row1] 100px [row2] </a:t>
             </a:r>
             <a:r>
-              <a:rPr lang="de-CH" dirty="0" err="1">
+              <a:rPr lang="de-CH" sz="2000" dirty="0" err="1">
                 <a:latin typeface="Arial" panose="020B0604020202020204" pitchFamily="34" charset="0"/>
                 <a:cs typeface="Arial" panose="020B0604020202020204" pitchFamily="34" charset="0"/>
               </a:rPr>
               <a:t>auto</a:t>
             </a:r>
             <a:r>
-              <a:rPr lang="de-CH" dirty="0">
+              <a:rPr lang="de-CH" sz="2000" dirty="0">
                 <a:latin typeface="Arial" panose="020B0604020202020204" pitchFamily="34" charset="0"/>
                 <a:cs typeface="Arial" panose="020B0604020202020204" pitchFamily="34" charset="0"/>
               </a:rPr>
               <a:t> [row3] 100px [ende];</a:t>
             </a:r>
-            <a:endParaRPr lang="de-DE" dirty="0"/>
           </a:p>
         </p:txBody>
       </p:sp>
     </p:spTree>
     <p:extLst>
       <p:ext uri="{BB962C8B-B14F-4D97-AF65-F5344CB8AC3E}">
-        <p14:creationId xmlns:p14="http://schemas.microsoft.com/office/powerpoint/2010/main" val="1020404966"/>
+        <p14:creationId xmlns:p14="http://schemas.microsoft.com/office/powerpoint/2010/main" val="714284251"/>
       </p:ext>
     </p:extLst>
   </p:cSld>
@@ -9904,6 +9790,452 @@
           <p:cNvPr id="2" name="Titel 1">
             <a:extLst>
               <a:ext uri="{FF2B5EF4-FFF2-40B4-BE49-F238E27FC236}">
+                <a16:creationId xmlns:a16="http://schemas.microsoft.com/office/drawing/2014/main" id="{10085994-E9B3-9C49-88DA-85CB7896D777}"/>
+              </a:ext>
+            </a:extLst>
+          </p:cNvPr>
+          <p:cNvSpPr>
+            <a:spLocks noGrp="1"/>
+          </p:cNvSpPr>
+          <p:nvPr>
+            <p:ph type="title"/>
+          </p:nvPr>
+        </p:nvSpPr>
+        <p:spPr/>
+        <p:txBody>
+          <a:bodyPr/>
+          <a:lstStyle/>
+          <a:p>
+            <a:r>
+              <a:rPr lang="de-DE" dirty="0" err="1"/>
+              <a:t>Grid</a:t>
+            </a:r>
+            <a:r>
+              <a:rPr lang="de-DE" dirty="0"/>
+              <a:t>: Container Properties</a:t>
+            </a:r>
+          </a:p>
+        </p:txBody>
+      </p:sp>
+      <p:pic>
+        <p:nvPicPr>
+          <p:cNvPr id="9" name="Inhaltsplatzhalter 8">
+            <a:extLst>
+              <a:ext uri="{FF2B5EF4-FFF2-40B4-BE49-F238E27FC236}">
+                <a16:creationId xmlns:a16="http://schemas.microsoft.com/office/drawing/2014/main" id="{C644C42D-72EF-2A48-816F-36D82961D15D}"/>
+              </a:ext>
+            </a:extLst>
+          </p:cNvPr>
+          <p:cNvPicPr>
+            <a:picLocks noGrp="1" noChangeAspect="1"/>
+          </p:cNvPicPr>
+          <p:nvPr>
+            <p:ph idx="1"/>
+          </p:nvPr>
+        </p:nvPicPr>
+        <p:blipFill>
+          <a:blip r:embed="rId2"/>
+          <a:stretch>
+            <a:fillRect/>
+          </a:stretch>
+        </p:blipFill>
+        <p:spPr>
+          <a:xfrm>
+            <a:off x="889798" y="3389272"/>
+            <a:ext cx="6592171" cy="2916163"/>
+          </a:xfrm>
+        </p:spPr>
+      </p:pic>
+      <p:sp>
+        <p:nvSpPr>
+          <p:cNvPr id="10" name="Rechteck 9">
+            <a:extLst>
+              <a:ext uri="{FF2B5EF4-FFF2-40B4-BE49-F238E27FC236}">
+                <a16:creationId xmlns:a16="http://schemas.microsoft.com/office/drawing/2014/main" id="{5C1814EE-CFB9-BA40-8AAF-2BE7E486CDD9}"/>
+              </a:ext>
+            </a:extLst>
+          </p:cNvPr>
+          <p:cNvSpPr/>
+          <p:nvPr/>
+        </p:nvSpPr>
+        <p:spPr>
+          <a:xfrm>
+            <a:off x="889798" y="2281276"/>
+            <a:ext cx="4172937" cy="369332"/>
+          </a:xfrm>
+          <a:prstGeom prst="rect">
+            <a:avLst/>
+          </a:prstGeom>
+        </p:spPr>
+        <p:txBody>
+          <a:bodyPr wrap="none">
+            <a:spAutoFit/>
+          </a:bodyPr>
+          <a:lstStyle/>
+          <a:p>
+            <a:r>
+              <a:rPr lang="de-CH" dirty="0" err="1">
+                <a:latin typeface="Arial" panose="020B0604020202020204" pitchFamily="34" charset="0"/>
+                <a:cs typeface="Arial" panose="020B0604020202020204" pitchFamily="34" charset="0"/>
+              </a:rPr>
+              <a:t>grid</a:t>
+            </a:r>
+            <a:r>
+              <a:rPr lang="de-CH" dirty="0">
+                <a:latin typeface="Arial" panose="020B0604020202020204" pitchFamily="34" charset="0"/>
+                <a:cs typeface="Arial" panose="020B0604020202020204" pitchFamily="34" charset="0"/>
+              </a:rPr>
+              <a:t>-template-</a:t>
+            </a:r>
+            <a:r>
+              <a:rPr lang="de-CH" dirty="0" err="1">
+                <a:latin typeface="Arial" panose="020B0604020202020204" pitchFamily="34" charset="0"/>
+                <a:cs typeface="Arial" panose="020B0604020202020204" pitchFamily="34" charset="0"/>
+              </a:rPr>
+              <a:t>columns</a:t>
+            </a:r>
+            <a:r>
+              <a:rPr lang="de-CH" dirty="0">
+                <a:latin typeface="Arial" panose="020B0604020202020204" pitchFamily="34" charset="0"/>
+                <a:cs typeface="Arial" panose="020B0604020202020204" pitchFamily="34" charset="0"/>
+              </a:rPr>
+              <a:t>: 20% 60% 20%;</a:t>
+            </a:r>
+            <a:endParaRPr lang="de-DE" dirty="0"/>
+          </a:p>
+        </p:txBody>
+      </p:sp>
+      <p:sp>
+        <p:nvSpPr>
+          <p:cNvPr id="11" name="Rechteck 10">
+            <a:extLst>
+              <a:ext uri="{FF2B5EF4-FFF2-40B4-BE49-F238E27FC236}">
+                <a16:creationId xmlns:a16="http://schemas.microsoft.com/office/drawing/2014/main" id="{E743F98C-590F-2345-AA1A-E117AC7E1BAF}"/>
+              </a:ext>
+            </a:extLst>
+          </p:cNvPr>
+          <p:cNvSpPr/>
+          <p:nvPr/>
+        </p:nvSpPr>
+        <p:spPr>
+          <a:xfrm>
+            <a:off x="889798" y="2650608"/>
+            <a:ext cx="6096000" cy="369332"/>
+          </a:xfrm>
+          <a:prstGeom prst="rect">
+            <a:avLst/>
+          </a:prstGeom>
+        </p:spPr>
+        <p:txBody>
+          <a:bodyPr>
+            <a:spAutoFit/>
+          </a:bodyPr>
+          <a:lstStyle/>
+          <a:p>
+            <a:r>
+              <a:rPr lang="de-CH" dirty="0" err="1">
+                <a:latin typeface="Arial" panose="020B0604020202020204" pitchFamily="34" charset="0"/>
+                <a:cs typeface="Arial" panose="020B0604020202020204" pitchFamily="34" charset="0"/>
+              </a:rPr>
+              <a:t>grid</a:t>
+            </a:r>
+            <a:r>
+              <a:rPr lang="de-CH" dirty="0">
+                <a:latin typeface="Arial" panose="020B0604020202020204" pitchFamily="34" charset="0"/>
+                <a:cs typeface="Arial" panose="020B0604020202020204" pitchFamily="34" charset="0"/>
+              </a:rPr>
+              <a:t>-template-</a:t>
+            </a:r>
+            <a:r>
+              <a:rPr lang="de-CH" dirty="0" err="1">
+                <a:latin typeface="Arial" panose="020B0604020202020204" pitchFamily="34" charset="0"/>
+                <a:cs typeface="Arial" panose="020B0604020202020204" pitchFamily="34" charset="0"/>
+              </a:rPr>
+              <a:t>rows</a:t>
+            </a:r>
+            <a:r>
+              <a:rPr lang="de-CH" dirty="0">
+                <a:latin typeface="Arial" panose="020B0604020202020204" pitchFamily="34" charset="0"/>
+                <a:cs typeface="Arial" panose="020B0604020202020204" pitchFamily="34" charset="0"/>
+              </a:rPr>
+              <a:t>: 100px </a:t>
+            </a:r>
+            <a:r>
+              <a:rPr lang="de-CH" dirty="0" err="1">
+                <a:latin typeface="Arial" panose="020B0604020202020204" pitchFamily="34" charset="0"/>
+                <a:cs typeface="Arial" panose="020B0604020202020204" pitchFamily="34" charset="0"/>
+              </a:rPr>
+              <a:t>auto</a:t>
+            </a:r>
+            <a:r>
+              <a:rPr lang="de-CH" dirty="0">
+                <a:latin typeface="Arial" panose="020B0604020202020204" pitchFamily="34" charset="0"/>
+                <a:cs typeface="Arial" panose="020B0604020202020204" pitchFamily="34" charset="0"/>
+              </a:rPr>
+              <a:t> 100px;</a:t>
+            </a:r>
+            <a:endParaRPr lang="de-DE" dirty="0"/>
+          </a:p>
+        </p:txBody>
+      </p:sp>
+    </p:spTree>
+    <p:extLst>
+      <p:ext uri="{BB962C8B-B14F-4D97-AF65-F5344CB8AC3E}">
+        <p14:creationId xmlns:p14="http://schemas.microsoft.com/office/powerpoint/2010/main" val="3096845263"/>
+      </p:ext>
+    </p:extLst>
+  </p:cSld>
+  <p:clrMapOvr>
+    <a:masterClrMapping/>
+  </p:clrMapOvr>
+</p:sld>
+</file>
+
+<file path=ppt/slides/slide105.xml><?xml version="1.0" encoding="utf-8"?>
+<p:sld xmlns:a="http://schemas.openxmlformats.org/drawingml/2006/main" xmlns:r="http://schemas.openxmlformats.org/officeDocument/2006/relationships" xmlns:p="http://schemas.openxmlformats.org/presentationml/2006/main">
+  <p:cSld>
+    <p:spTree>
+      <p:nvGrpSpPr>
+        <p:cNvPr id="1" name=""/>
+        <p:cNvGrpSpPr/>
+        <p:nvPr/>
+      </p:nvGrpSpPr>
+      <p:grpSpPr>
+        <a:xfrm>
+          <a:off x="0" y="0"/>
+          <a:ext cx="0" cy="0"/>
+          <a:chOff x="0" y="0"/>
+          <a:chExt cx="0" cy="0"/>
+        </a:xfrm>
+      </p:grpSpPr>
+      <p:sp>
+        <p:nvSpPr>
+          <p:cNvPr id="2" name="Titel 1">
+            <a:extLst>
+              <a:ext uri="{FF2B5EF4-FFF2-40B4-BE49-F238E27FC236}">
+                <a16:creationId xmlns:a16="http://schemas.microsoft.com/office/drawing/2014/main" id="{42A5B1AA-ADEF-F348-A0E4-381E0CA6525F}"/>
+              </a:ext>
+            </a:extLst>
+          </p:cNvPr>
+          <p:cNvSpPr>
+            <a:spLocks noGrp="1"/>
+          </p:cNvSpPr>
+          <p:nvPr>
+            <p:ph type="title"/>
+          </p:nvPr>
+        </p:nvSpPr>
+        <p:spPr/>
+        <p:txBody>
+          <a:bodyPr/>
+          <a:lstStyle/>
+          <a:p>
+            <a:r>
+              <a:rPr lang="de-DE" dirty="0" err="1"/>
+              <a:t>Grid</a:t>
+            </a:r>
+            <a:r>
+              <a:rPr lang="de-DE" dirty="0"/>
+              <a:t>: Container Properties</a:t>
+            </a:r>
+          </a:p>
+        </p:txBody>
+      </p:sp>
+      <p:pic>
+        <p:nvPicPr>
+          <p:cNvPr id="5" name="Inhaltsplatzhalter 4">
+            <a:extLst>
+              <a:ext uri="{FF2B5EF4-FFF2-40B4-BE49-F238E27FC236}">
+                <a16:creationId xmlns:a16="http://schemas.microsoft.com/office/drawing/2014/main" id="{09F627C6-0BE4-2145-A7D3-7F54CD309458}"/>
+              </a:ext>
+            </a:extLst>
+          </p:cNvPr>
+          <p:cNvPicPr>
+            <a:picLocks noGrp="1" noChangeAspect="1"/>
+          </p:cNvPicPr>
+          <p:nvPr>
+            <p:ph idx="1"/>
+          </p:nvPr>
+        </p:nvPicPr>
+        <p:blipFill>
+          <a:blip r:embed="rId2"/>
+          <a:stretch>
+            <a:fillRect/>
+          </a:stretch>
+        </p:blipFill>
+        <p:spPr>
+          <a:xfrm>
+            <a:off x="680321" y="3343910"/>
+            <a:ext cx="7013709" cy="3022600"/>
+          </a:xfrm>
+        </p:spPr>
+      </p:pic>
+      <p:sp>
+        <p:nvSpPr>
+          <p:cNvPr id="6" name="Rechteck 5">
+            <a:extLst>
+              <a:ext uri="{FF2B5EF4-FFF2-40B4-BE49-F238E27FC236}">
+                <a16:creationId xmlns:a16="http://schemas.microsoft.com/office/drawing/2014/main" id="{1EEC8D5E-3E9D-3E4E-B228-D0BB3D94818B}"/>
+              </a:ext>
+            </a:extLst>
+          </p:cNvPr>
+          <p:cNvSpPr/>
+          <p:nvPr/>
+        </p:nvSpPr>
+        <p:spPr>
+          <a:xfrm>
+            <a:off x="680321" y="2317165"/>
+            <a:ext cx="6873240" cy="369332"/>
+          </a:xfrm>
+          <a:prstGeom prst="rect">
+            <a:avLst/>
+          </a:prstGeom>
+        </p:spPr>
+        <p:txBody>
+          <a:bodyPr wrap="square">
+            <a:spAutoFit/>
+          </a:bodyPr>
+          <a:lstStyle/>
+          <a:p>
+            <a:r>
+              <a:rPr lang="de-CH" dirty="0" err="1">
+                <a:latin typeface="Arial" panose="020B0604020202020204" pitchFamily="34" charset="0"/>
+                <a:cs typeface="Arial" panose="020B0604020202020204" pitchFamily="34" charset="0"/>
+              </a:rPr>
+              <a:t>grid</a:t>
+            </a:r>
+            <a:r>
+              <a:rPr lang="de-CH" dirty="0">
+                <a:latin typeface="Arial" panose="020B0604020202020204" pitchFamily="34" charset="0"/>
+                <a:cs typeface="Arial" panose="020B0604020202020204" pitchFamily="34" charset="0"/>
+              </a:rPr>
+              <a:t>-template-</a:t>
+            </a:r>
+            <a:r>
+              <a:rPr lang="de-CH" dirty="0" err="1">
+                <a:latin typeface="Arial" panose="020B0604020202020204" pitchFamily="34" charset="0"/>
+                <a:cs typeface="Arial" panose="020B0604020202020204" pitchFamily="34" charset="0"/>
+              </a:rPr>
+              <a:t>columns</a:t>
+            </a:r>
+            <a:r>
+              <a:rPr lang="de-CH" dirty="0">
+                <a:latin typeface="Arial" panose="020B0604020202020204" pitchFamily="34" charset="0"/>
+                <a:cs typeface="Arial" panose="020B0604020202020204" pitchFamily="34" charset="0"/>
+              </a:rPr>
+              <a:t>: [eins] 20% [zwei] 60% [drei] 20% [vier];</a:t>
+            </a:r>
+            <a:endParaRPr lang="de-DE" dirty="0"/>
+          </a:p>
+        </p:txBody>
+      </p:sp>
+      <p:sp>
+        <p:nvSpPr>
+          <p:cNvPr id="7" name="Rechteck 6">
+            <a:extLst>
+              <a:ext uri="{FF2B5EF4-FFF2-40B4-BE49-F238E27FC236}">
+                <a16:creationId xmlns:a16="http://schemas.microsoft.com/office/drawing/2014/main" id="{DEBF59EC-59FB-C14F-A76E-FCF584425CF1}"/>
+              </a:ext>
+            </a:extLst>
+          </p:cNvPr>
+          <p:cNvSpPr/>
+          <p:nvPr/>
+        </p:nvSpPr>
+        <p:spPr>
+          <a:xfrm>
+            <a:off x="680321" y="2686497"/>
+            <a:ext cx="7044690" cy="369332"/>
+          </a:xfrm>
+          <a:prstGeom prst="rect">
+            <a:avLst/>
+          </a:prstGeom>
+        </p:spPr>
+        <p:txBody>
+          <a:bodyPr wrap="square">
+            <a:spAutoFit/>
+          </a:bodyPr>
+          <a:lstStyle/>
+          <a:p>
+            <a:r>
+              <a:rPr lang="de-CH" dirty="0" err="1">
+                <a:latin typeface="Arial" panose="020B0604020202020204" pitchFamily="34" charset="0"/>
+                <a:cs typeface="Arial" panose="020B0604020202020204" pitchFamily="34" charset="0"/>
+              </a:rPr>
+              <a:t>grid</a:t>
+            </a:r>
+            <a:r>
+              <a:rPr lang="de-CH" dirty="0">
+                <a:latin typeface="Arial" panose="020B0604020202020204" pitchFamily="34" charset="0"/>
+                <a:cs typeface="Arial" panose="020B0604020202020204" pitchFamily="34" charset="0"/>
+              </a:rPr>
+              <a:t>-template-</a:t>
+            </a:r>
+            <a:r>
+              <a:rPr lang="de-CH" dirty="0" err="1">
+                <a:latin typeface="Arial" panose="020B0604020202020204" pitchFamily="34" charset="0"/>
+                <a:cs typeface="Arial" panose="020B0604020202020204" pitchFamily="34" charset="0"/>
+              </a:rPr>
+              <a:t>rows</a:t>
+            </a:r>
+            <a:r>
+              <a:rPr lang="de-CH" dirty="0">
+                <a:latin typeface="Arial" panose="020B0604020202020204" pitchFamily="34" charset="0"/>
+                <a:cs typeface="Arial" panose="020B0604020202020204" pitchFamily="34" charset="0"/>
+              </a:rPr>
+              <a:t>: [row1] 100px [row2] </a:t>
+            </a:r>
+            <a:r>
+              <a:rPr lang="de-CH" dirty="0" err="1">
+                <a:latin typeface="Arial" panose="020B0604020202020204" pitchFamily="34" charset="0"/>
+                <a:cs typeface="Arial" panose="020B0604020202020204" pitchFamily="34" charset="0"/>
+              </a:rPr>
+              <a:t>auto</a:t>
+            </a:r>
+            <a:r>
+              <a:rPr lang="de-CH" dirty="0">
+                <a:latin typeface="Arial" panose="020B0604020202020204" pitchFamily="34" charset="0"/>
+                <a:cs typeface="Arial" panose="020B0604020202020204" pitchFamily="34" charset="0"/>
+              </a:rPr>
+              <a:t> [row3] 100px [ende];</a:t>
+            </a:r>
+            <a:endParaRPr lang="de-DE" dirty="0"/>
+          </a:p>
+        </p:txBody>
+      </p:sp>
+    </p:spTree>
+    <p:extLst>
+      <p:ext uri="{BB962C8B-B14F-4D97-AF65-F5344CB8AC3E}">
+        <p14:creationId xmlns:p14="http://schemas.microsoft.com/office/powerpoint/2010/main" val="1020404966"/>
+      </p:ext>
+    </p:extLst>
+  </p:cSld>
+  <p:clrMapOvr>
+    <a:masterClrMapping/>
+  </p:clrMapOvr>
+</p:sld>
+</file>
+
+<file path=ppt/slides/slide106.xml><?xml version="1.0" encoding="utf-8"?>
+<p:sld xmlns:a="http://schemas.openxmlformats.org/drawingml/2006/main" xmlns:r="http://schemas.openxmlformats.org/officeDocument/2006/relationships" xmlns:p="http://schemas.openxmlformats.org/presentationml/2006/main">
+  <p:cSld>
+    <p:spTree>
+      <p:nvGrpSpPr>
+        <p:cNvPr id="1" name=""/>
+        <p:cNvGrpSpPr/>
+        <p:nvPr/>
+      </p:nvGrpSpPr>
+      <p:grpSpPr>
+        <a:xfrm>
+          <a:off x="0" y="0"/>
+          <a:ext cx="0" cy="0"/>
+          <a:chOff x="0" y="0"/>
+          <a:chExt cx="0" cy="0"/>
+        </a:xfrm>
+      </p:grpSpPr>
+      <p:sp>
+        <p:nvSpPr>
+          <p:cNvPr id="2" name="Titel 1">
+            <a:extLst>
+              <a:ext uri="{FF2B5EF4-FFF2-40B4-BE49-F238E27FC236}">
                 <a16:creationId xmlns:a16="http://schemas.microsoft.com/office/drawing/2014/main" id="{D519ED13-21BE-A54C-A031-AD61373B520E}"/>
               </a:ext>
             </a:extLst>
@@ -10172,7 +10504,7 @@
 </p:sld>
 </file>
 
-<file path=ppt/slides/slide105.xml><?xml version="1.0" encoding="utf-8"?>
+<file path=ppt/slides/slide107.xml><?xml version="1.0" encoding="utf-8"?>
 <p:sld xmlns:a="http://schemas.openxmlformats.org/drawingml/2006/main" xmlns:r="http://schemas.openxmlformats.org/officeDocument/2006/relationships" xmlns:p="http://schemas.openxmlformats.org/presentationml/2006/main">
   <p:cSld>
     <p:spTree>
@@ -10543,7 +10875,7 @@
 </p:sld>
 </file>
 
-<file path=ppt/slides/slide106.xml><?xml version="1.0" encoding="utf-8"?>
+<file path=ppt/slides/slide108.xml><?xml version="1.0" encoding="utf-8"?>
 <p:sld xmlns:a="http://schemas.openxmlformats.org/drawingml/2006/main" xmlns:r="http://schemas.openxmlformats.org/officeDocument/2006/relationships" xmlns:p="http://schemas.openxmlformats.org/presentationml/2006/main">
   <p:cSld>
     <p:spTree>
@@ -10748,7 +11080,7 @@
 </p:sld>
 </file>
 
-<file path=ppt/slides/slide107.xml><?xml version="1.0" encoding="utf-8"?>
+<file path=ppt/slides/slide109.xml><?xml version="1.0" encoding="utf-8"?>
 <p:sld xmlns:a="http://schemas.openxmlformats.org/drawingml/2006/main" xmlns:r="http://schemas.openxmlformats.org/officeDocument/2006/relationships" xmlns:p="http://schemas.openxmlformats.org/presentationml/2006/main">
   <p:cSld>
     <p:spTree>
@@ -11448,166 +11780,6 @@
 </p:sld>
 </file>
 
-<file path=ppt/slides/slide108.xml><?xml version="1.0" encoding="utf-8"?>
-<p:sld xmlns:a="http://schemas.openxmlformats.org/drawingml/2006/main" xmlns:r="http://schemas.openxmlformats.org/officeDocument/2006/relationships" xmlns:p="http://schemas.openxmlformats.org/presentationml/2006/main">
-  <p:cSld>
-    <p:spTree>
-      <p:nvGrpSpPr>
-        <p:cNvPr id="1" name=""/>
-        <p:cNvGrpSpPr/>
-        <p:nvPr/>
-      </p:nvGrpSpPr>
-      <p:grpSpPr>
-        <a:xfrm>
-          <a:off x="0" y="0"/>
-          <a:ext cx="0" cy="0"/>
-          <a:chOff x="0" y="0"/>
-          <a:chExt cx="0" cy="0"/>
-        </a:xfrm>
-      </p:grpSpPr>
-      <p:sp>
-        <p:nvSpPr>
-          <p:cNvPr id="2" name="Titel 1">
-            <a:extLst>
-              <a:ext uri="{FF2B5EF4-FFF2-40B4-BE49-F238E27FC236}">
-                <a16:creationId xmlns:a16="http://schemas.microsoft.com/office/drawing/2014/main" id="{AF291B26-8D81-6E41-9D56-468BA39AAAEB}"/>
-              </a:ext>
-            </a:extLst>
-          </p:cNvPr>
-          <p:cNvSpPr>
-            <a:spLocks noGrp="1"/>
-          </p:cNvSpPr>
-          <p:nvPr>
-            <p:ph type="title"/>
-          </p:nvPr>
-        </p:nvSpPr>
-        <p:spPr/>
-        <p:txBody>
-          <a:bodyPr/>
-          <a:lstStyle/>
-          <a:p>
-            <a:endParaRPr lang="de-DE"/>
-          </a:p>
-        </p:txBody>
-      </p:sp>
-      <p:sp>
-        <p:nvSpPr>
-          <p:cNvPr id="3" name="Inhaltsplatzhalter 2">
-            <a:extLst>
-              <a:ext uri="{FF2B5EF4-FFF2-40B4-BE49-F238E27FC236}">
-                <a16:creationId xmlns:a16="http://schemas.microsoft.com/office/drawing/2014/main" id="{4D3977DA-9BC2-944B-B95C-E22F84E99A06}"/>
-              </a:ext>
-            </a:extLst>
-          </p:cNvPr>
-          <p:cNvSpPr>
-            <a:spLocks noGrp="1"/>
-          </p:cNvSpPr>
-          <p:nvPr>
-            <p:ph idx="1"/>
-          </p:nvPr>
-        </p:nvSpPr>
-        <p:spPr/>
-        <p:txBody>
-          <a:bodyPr/>
-          <a:lstStyle/>
-          <a:p>
-            <a:endParaRPr lang="de-DE"/>
-          </a:p>
-        </p:txBody>
-      </p:sp>
-    </p:spTree>
-    <p:extLst>
-      <p:ext uri="{BB962C8B-B14F-4D97-AF65-F5344CB8AC3E}">
-        <p14:creationId xmlns:p14="http://schemas.microsoft.com/office/powerpoint/2010/main" val="3059955227"/>
-      </p:ext>
-    </p:extLst>
-  </p:cSld>
-  <p:clrMapOvr>
-    <a:masterClrMapping/>
-  </p:clrMapOvr>
-</p:sld>
-</file>
-
-<file path=ppt/slides/slide109.xml><?xml version="1.0" encoding="utf-8"?>
-<p:sld xmlns:a="http://schemas.openxmlformats.org/drawingml/2006/main" xmlns:r="http://schemas.openxmlformats.org/officeDocument/2006/relationships" xmlns:p="http://schemas.openxmlformats.org/presentationml/2006/main">
-  <p:cSld>
-    <p:spTree>
-      <p:nvGrpSpPr>
-        <p:cNvPr id="1" name=""/>
-        <p:cNvGrpSpPr/>
-        <p:nvPr/>
-      </p:nvGrpSpPr>
-      <p:grpSpPr>
-        <a:xfrm>
-          <a:off x="0" y="0"/>
-          <a:ext cx="0" cy="0"/>
-          <a:chOff x="0" y="0"/>
-          <a:chExt cx="0" cy="0"/>
-        </a:xfrm>
-      </p:grpSpPr>
-      <p:sp>
-        <p:nvSpPr>
-          <p:cNvPr id="2" name="Titel 1">
-            <a:extLst>
-              <a:ext uri="{FF2B5EF4-FFF2-40B4-BE49-F238E27FC236}">
-                <a16:creationId xmlns:a16="http://schemas.microsoft.com/office/drawing/2014/main" id="{0CC467E0-2B4E-D94E-9545-469513B5DF9C}"/>
-              </a:ext>
-            </a:extLst>
-          </p:cNvPr>
-          <p:cNvSpPr>
-            <a:spLocks noGrp="1"/>
-          </p:cNvSpPr>
-          <p:nvPr>
-            <p:ph type="title"/>
-          </p:nvPr>
-        </p:nvSpPr>
-        <p:spPr/>
-        <p:txBody>
-          <a:bodyPr/>
-          <a:lstStyle/>
-          <a:p>
-            <a:endParaRPr lang="de-DE"/>
-          </a:p>
-        </p:txBody>
-      </p:sp>
-      <p:sp>
-        <p:nvSpPr>
-          <p:cNvPr id="3" name="Inhaltsplatzhalter 2">
-            <a:extLst>
-              <a:ext uri="{FF2B5EF4-FFF2-40B4-BE49-F238E27FC236}">
-                <a16:creationId xmlns:a16="http://schemas.microsoft.com/office/drawing/2014/main" id="{51424325-0549-D545-B91C-5496B67B995F}"/>
-              </a:ext>
-            </a:extLst>
-          </p:cNvPr>
-          <p:cNvSpPr>
-            <a:spLocks noGrp="1"/>
-          </p:cNvSpPr>
-          <p:nvPr>
-            <p:ph idx="1"/>
-          </p:nvPr>
-        </p:nvSpPr>
-        <p:spPr/>
-        <p:txBody>
-          <a:bodyPr/>
-          <a:lstStyle/>
-          <a:p>
-            <a:endParaRPr lang="de-DE"/>
-          </a:p>
-        </p:txBody>
-      </p:sp>
-    </p:spTree>
-    <p:extLst>
-      <p:ext uri="{BB962C8B-B14F-4D97-AF65-F5344CB8AC3E}">
-        <p14:creationId xmlns:p14="http://schemas.microsoft.com/office/powerpoint/2010/main" val="4282559993"/>
-      </p:ext>
-    </p:extLst>
-  </p:cSld>
-  <p:clrMapOvr>
-    <a:masterClrMapping/>
-  </p:clrMapOvr>
-</p:sld>
-</file>
-
 <file path=ppt/slides/slide11.xml><?xml version="1.0" encoding="utf-8"?>
 <p:sld xmlns:a="http://schemas.openxmlformats.org/drawingml/2006/main" xmlns:r="http://schemas.openxmlformats.org/officeDocument/2006/relationships" xmlns:p="http://schemas.openxmlformats.org/presentationml/2006/main">
   <p:cSld>
@@ -11714,6 +11886,166 @@
       </p:grpSpPr>
       <p:sp>
         <p:nvSpPr>
+          <p:cNvPr id="2" name="Titel 1">
+            <a:extLst>
+              <a:ext uri="{FF2B5EF4-FFF2-40B4-BE49-F238E27FC236}">
+                <a16:creationId xmlns:a16="http://schemas.microsoft.com/office/drawing/2014/main" id="{AF291B26-8D81-6E41-9D56-468BA39AAAEB}"/>
+              </a:ext>
+            </a:extLst>
+          </p:cNvPr>
+          <p:cNvSpPr>
+            <a:spLocks noGrp="1"/>
+          </p:cNvSpPr>
+          <p:nvPr>
+            <p:ph type="title"/>
+          </p:nvPr>
+        </p:nvSpPr>
+        <p:spPr/>
+        <p:txBody>
+          <a:bodyPr/>
+          <a:lstStyle/>
+          <a:p>
+            <a:endParaRPr lang="de-DE"/>
+          </a:p>
+        </p:txBody>
+      </p:sp>
+      <p:sp>
+        <p:nvSpPr>
+          <p:cNvPr id="3" name="Inhaltsplatzhalter 2">
+            <a:extLst>
+              <a:ext uri="{FF2B5EF4-FFF2-40B4-BE49-F238E27FC236}">
+                <a16:creationId xmlns:a16="http://schemas.microsoft.com/office/drawing/2014/main" id="{4D3977DA-9BC2-944B-B95C-E22F84E99A06}"/>
+              </a:ext>
+            </a:extLst>
+          </p:cNvPr>
+          <p:cNvSpPr>
+            <a:spLocks noGrp="1"/>
+          </p:cNvSpPr>
+          <p:nvPr>
+            <p:ph idx="1"/>
+          </p:nvPr>
+        </p:nvSpPr>
+        <p:spPr/>
+        <p:txBody>
+          <a:bodyPr/>
+          <a:lstStyle/>
+          <a:p>
+            <a:endParaRPr lang="de-DE"/>
+          </a:p>
+        </p:txBody>
+      </p:sp>
+    </p:spTree>
+    <p:extLst>
+      <p:ext uri="{BB962C8B-B14F-4D97-AF65-F5344CB8AC3E}">
+        <p14:creationId xmlns:p14="http://schemas.microsoft.com/office/powerpoint/2010/main" val="3059955227"/>
+      </p:ext>
+    </p:extLst>
+  </p:cSld>
+  <p:clrMapOvr>
+    <a:masterClrMapping/>
+  </p:clrMapOvr>
+</p:sld>
+</file>
+
+<file path=ppt/slides/slide111.xml><?xml version="1.0" encoding="utf-8"?>
+<p:sld xmlns:a="http://schemas.openxmlformats.org/drawingml/2006/main" xmlns:r="http://schemas.openxmlformats.org/officeDocument/2006/relationships" xmlns:p="http://schemas.openxmlformats.org/presentationml/2006/main">
+  <p:cSld>
+    <p:spTree>
+      <p:nvGrpSpPr>
+        <p:cNvPr id="1" name=""/>
+        <p:cNvGrpSpPr/>
+        <p:nvPr/>
+      </p:nvGrpSpPr>
+      <p:grpSpPr>
+        <a:xfrm>
+          <a:off x="0" y="0"/>
+          <a:ext cx="0" cy="0"/>
+          <a:chOff x="0" y="0"/>
+          <a:chExt cx="0" cy="0"/>
+        </a:xfrm>
+      </p:grpSpPr>
+      <p:sp>
+        <p:nvSpPr>
+          <p:cNvPr id="2" name="Titel 1">
+            <a:extLst>
+              <a:ext uri="{FF2B5EF4-FFF2-40B4-BE49-F238E27FC236}">
+                <a16:creationId xmlns:a16="http://schemas.microsoft.com/office/drawing/2014/main" id="{0CC467E0-2B4E-D94E-9545-469513B5DF9C}"/>
+              </a:ext>
+            </a:extLst>
+          </p:cNvPr>
+          <p:cNvSpPr>
+            <a:spLocks noGrp="1"/>
+          </p:cNvSpPr>
+          <p:nvPr>
+            <p:ph type="title"/>
+          </p:nvPr>
+        </p:nvSpPr>
+        <p:spPr/>
+        <p:txBody>
+          <a:bodyPr/>
+          <a:lstStyle/>
+          <a:p>
+            <a:endParaRPr lang="de-DE"/>
+          </a:p>
+        </p:txBody>
+      </p:sp>
+      <p:sp>
+        <p:nvSpPr>
+          <p:cNvPr id="3" name="Inhaltsplatzhalter 2">
+            <a:extLst>
+              <a:ext uri="{FF2B5EF4-FFF2-40B4-BE49-F238E27FC236}">
+                <a16:creationId xmlns:a16="http://schemas.microsoft.com/office/drawing/2014/main" id="{51424325-0549-D545-B91C-5496B67B995F}"/>
+              </a:ext>
+            </a:extLst>
+          </p:cNvPr>
+          <p:cNvSpPr>
+            <a:spLocks noGrp="1"/>
+          </p:cNvSpPr>
+          <p:nvPr>
+            <p:ph idx="1"/>
+          </p:nvPr>
+        </p:nvSpPr>
+        <p:spPr/>
+        <p:txBody>
+          <a:bodyPr/>
+          <a:lstStyle/>
+          <a:p>
+            <a:endParaRPr lang="de-DE"/>
+          </a:p>
+        </p:txBody>
+      </p:sp>
+    </p:spTree>
+    <p:extLst>
+      <p:ext uri="{BB962C8B-B14F-4D97-AF65-F5344CB8AC3E}">
+        <p14:creationId xmlns:p14="http://schemas.microsoft.com/office/powerpoint/2010/main" val="4282559993"/>
+      </p:ext>
+    </p:extLst>
+  </p:cSld>
+  <p:clrMapOvr>
+    <a:masterClrMapping/>
+  </p:clrMapOvr>
+</p:sld>
+</file>
+
+<file path=ppt/slides/slide112.xml><?xml version="1.0" encoding="utf-8"?>
+<p:sld xmlns:a="http://schemas.openxmlformats.org/drawingml/2006/main" xmlns:r="http://schemas.openxmlformats.org/officeDocument/2006/relationships" xmlns:p="http://schemas.openxmlformats.org/presentationml/2006/main">
+  <p:cSld>
+    <p:spTree>
+      <p:nvGrpSpPr>
+        <p:cNvPr id="1" name=""/>
+        <p:cNvGrpSpPr/>
+        <p:nvPr/>
+      </p:nvGrpSpPr>
+      <p:grpSpPr>
+        <a:xfrm>
+          <a:off x="0" y="0"/>
+          <a:ext cx="0" cy="0"/>
+          <a:chOff x="0" y="0"/>
+          <a:chExt cx="0" cy="0"/>
+        </a:xfrm>
+      </p:grpSpPr>
+      <p:sp>
+        <p:nvSpPr>
           <p:cNvPr id="2" name="Title 1">
             <a:extLst>
               <a:ext uri="{FF2B5EF4-FFF2-40B4-BE49-F238E27FC236}">
@@ -11803,7 +12135,7 @@
 </p:sld>
 </file>
 
-<file path=ppt/slides/slide111.xml><?xml version="1.0" encoding="utf-8"?>
+<file path=ppt/slides/slide113.xml><?xml version="1.0" encoding="utf-8"?>
 <p:sld xmlns:a="http://schemas.openxmlformats.org/drawingml/2006/main" xmlns:r="http://schemas.openxmlformats.org/officeDocument/2006/relationships" xmlns:p="http://schemas.openxmlformats.org/presentationml/2006/main">
   <p:cSld>
     <p:spTree>
@@ -11969,7 +12301,7 @@
 </p:sld>
 </file>
 
-<file path=ppt/slides/slide112.xml><?xml version="1.0" encoding="utf-8"?>
+<file path=ppt/slides/slide114.xml><?xml version="1.0" encoding="utf-8"?>
 <p:sld xmlns:a="http://schemas.openxmlformats.org/drawingml/2006/main" xmlns:r="http://schemas.openxmlformats.org/officeDocument/2006/relationships" xmlns:p="http://schemas.openxmlformats.org/presentationml/2006/main">
   <p:cSld>
     <p:spTree>
@@ -33230,7 +33562,7 @@
             </a:r>
             <a:r>
               <a:rPr lang="en-US" dirty="0"/>
-              <a:t>, vertical und horizontal</a:t>
+              <a:t>, vertical und horizontal…</a:t>
             </a:r>
           </a:p>
         </p:txBody>
@@ -33257,7 +33589,7 @@
         </p:blipFill>
         <p:spPr>
           <a:xfrm>
-            <a:off x="2756613" y="2962203"/>
+            <a:off x="2756613" y="3101351"/>
             <a:ext cx="5461276" cy="3142569"/>
           </a:xfrm>
           <a:prstGeom prst="rect">
@@ -33279,6 +33611,313 @@
 </file>
 
 <file path=ppt/slides/slide96.xml><?xml version="1.0" encoding="utf-8"?>
+<p:sld xmlns:a="http://schemas.openxmlformats.org/drawingml/2006/main" xmlns:r="http://schemas.openxmlformats.org/officeDocument/2006/relationships" xmlns:p="http://schemas.openxmlformats.org/presentationml/2006/main">
+  <p:cSld>
+    <p:spTree>
+      <p:nvGrpSpPr>
+        <p:cNvPr id="1" name=""/>
+        <p:cNvGrpSpPr/>
+        <p:nvPr/>
+      </p:nvGrpSpPr>
+      <p:grpSpPr>
+        <a:xfrm>
+          <a:off x="0" y="0"/>
+          <a:ext cx="0" cy="0"/>
+          <a:chOff x="0" y="0"/>
+          <a:chExt cx="0" cy="0"/>
+        </a:xfrm>
+      </p:grpSpPr>
+      <p:sp>
+        <p:nvSpPr>
+          <p:cNvPr id="2" name="Title 1">
+            <a:extLst>
+              <a:ext uri="{FF2B5EF4-FFF2-40B4-BE49-F238E27FC236}">
+                <a16:creationId xmlns:a16="http://schemas.microsoft.com/office/drawing/2014/main" id="{E592D2E0-C762-534E-A33B-1D3F14B050D7}"/>
+              </a:ext>
+            </a:extLst>
+          </p:cNvPr>
+          <p:cNvSpPr>
+            <a:spLocks noGrp="1"/>
+          </p:cNvSpPr>
+          <p:nvPr>
+            <p:ph type="title"/>
+          </p:nvPr>
+        </p:nvSpPr>
+        <p:spPr/>
+        <p:txBody>
+          <a:bodyPr/>
+          <a:lstStyle/>
+          <a:p>
+            <a:r>
+              <a:rPr lang="en-US" dirty="0" err="1"/>
+              <a:t>Übung</a:t>
+            </a:r>
+            <a:r>
+              <a:rPr lang="en-US" dirty="0"/>
+              <a:t>: </a:t>
+            </a:r>
+            <a:r>
+              <a:rPr lang="en-US" dirty="0" err="1"/>
+              <a:t>ohne</a:t>
+            </a:r>
+            <a:r>
+              <a:rPr lang="en-US" dirty="0"/>
+              <a:t> Flexbox</a:t>
+            </a:r>
+          </a:p>
+        </p:txBody>
+      </p:sp>
+      <p:sp>
+        <p:nvSpPr>
+          <p:cNvPr id="3" name="Content Placeholder 2">
+            <a:extLst>
+              <a:ext uri="{FF2B5EF4-FFF2-40B4-BE49-F238E27FC236}">
+                <a16:creationId xmlns:a16="http://schemas.microsoft.com/office/drawing/2014/main" id="{9E7DFB14-2A4A-544E-9013-0F04C7E11125}"/>
+              </a:ext>
+            </a:extLst>
+          </p:cNvPr>
+          <p:cNvSpPr>
+            <a:spLocks noGrp="1"/>
+          </p:cNvSpPr>
+          <p:nvPr>
+            <p:ph idx="1"/>
+          </p:nvPr>
+        </p:nvSpPr>
+        <p:spPr/>
+        <p:txBody>
+          <a:bodyPr/>
+          <a:lstStyle/>
+          <a:p>
+            <a:r>
+              <a:rPr lang="en-US" dirty="0" err="1"/>
+              <a:t>Zentiere</a:t>
+            </a:r>
+            <a:r>
+              <a:rPr lang="en-US" dirty="0"/>
+              <a:t> </a:t>
+            </a:r>
+            <a:r>
+              <a:rPr lang="en-US" dirty="0" err="1"/>
+              <a:t>eine</a:t>
+            </a:r>
+            <a:r>
+              <a:rPr lang="en-US" dirty="0"/>
+              <a:t> Box, </a:t>
+            </a:r>
+            <a:r>
+              <a:rPr lang="en-US" dirty="0" err="1"/>
+              <a:t>mit</a:t>
+            </a:r>
+            <a:r>
+              <a:rPr lang="en-US" dirty="0"/>
+              <a:t> </a:t>
+            </a:r>
+            <a:r>
+              <a:rPr lang="en-US" dirty="0" err="1"/>
+              <a:t>unbekannter</a:t>
+            </a:r>
+            <a:r>
+              <a:rPr lang="en-US" dirty="0"/>
+              <a:t> </a:t>
+            </a:r>
+            <a:r>
+              <a:rPr lang="en-US" dirty="0" err="1"/>
+              <a:t>Höhe</a:t>
+            </a:r>
+            <a:r>
+              <a:rPr lang="en-US" dirty="0"/>
+              <a:t>, vertical und horizontal </a:t>
+            </a:r>
+            <a:r>
+              <a:rPr lang="en-US" dirty="0" err="1"/>
+              <a:t>diesesmal</a:t>
+            </a:r>
+            <a:r>
+              <a:rPr lang="en-US" dirty="0"/>
+              <a:t> </a:t>
+            </a:r>
+            <a:r>
+              <a:rPr lang="en-US" dirty="0" err="1"/>
+              <a:t>ohne</a:t>
+            </a:r>
+            <a:r>
+              <a:rPr lang="en-US" dirty="0"/>
+              <a:t> Flexbox…</a:t>
+            </a:r>
+          </a:p>
+        </p:txBody>
+      </p:sp>
+      <p:pic>
+        <p:nvPicPr>
+          <p:cNvPr id="4" name="Picture 3">
+            <a:extLst>
+              <a:ext uri="{FF2B5EF4-FFF2-40B4-BE49-F238E27FC236}">
+                <a16:creationId xmlns:a16="http://schemas.microsoft.com/office/drawing/2014/main" id="{26372E44-2797-8E4B-BA2F-DD574D1AC462}"/>
+              </a:ext>
+            </a:extLst>
+          </p:cNvPr>
+          <p:cNvPicPr>
+            <a:picLocks noChangeAspect="1"/>
+          </p:cNvPicPr>
+          <p:nvPr/>
+        </p:nvPicPr>
+        <p:blipFill>
+          <a:blip r:embed="rId2"/>
+          <a:stretch>
+            <a:fillRect/>
+          </a:stretch>
+        </p:blipFill>
+        <p:spPr>
+          <a:xfrm>
+            <a:off x="2756613" y="3296327"/>
+            <a:ext cx="5461276" cy="3142569"/>
+          </a:xfrm>
+          <a:prstGeom prst="rect">
+            <a:avLst/>
+          </a:prstGeom>
+        </p:spPr>
+      </p:pic>
+    </p:spTree>
+    <p:extLst>
+      <p:ext uri="{BB962C8B-B14F-4D97-AF65-F5344CB8AC3E}">
+        <p14:creationId xmlns:p14="http://schemas.microsoft.com/office/powerpoint/2010/main" val="2985869211"/>
+      </p:ext>
+    </p:extLst>
+  </p:cSld>
+  <p:clrMapOvr>
+    <a:masterClrMapping/>
+  </p:clrMapOvr>
+</p:sld>
+</file>
+
+<file path=ppt/slides/slide97.xml><?xml version="1.0" encoding="utf-8"?>
+<p:sld xmlns:a="http://schemas.openxmlformats.org/drawingml/2006/main" xmlns:r="http://schemas.openxmlformats.org/officeDocument/2006/relationships" xmlns:p="http://schemas.openxmlformats.org/presentationml/2006/main">
+  <p:cSld>
+    <p:spTree>
+      <p:nvGrpSpPr>
+        <p:cNvPr id="1" name=""/>
+        <p:cNvGrpSpPr/>
+        <p:nvPr/>
+      </p:nvGrpSpPr>
+      <p:grpSpPr>
+        <a:xfrm>
+          <a:off x="0" y="0"/>
+          <a:ext cx="0" cy="0"/>
+          <a:chOff x="0" y="0"/>
+          <a:chExt cx="0" cy="0"/>
+        </a:xfrm>
+      </p:grpSpPr>
+      <p:sp>
+        <p:nvSpPr>
+          <p:cNvPr id="2" name="Title 1">
+            <a:extLst>
+              <a:ext uri="{FF2B5EF4-FFF2-40B4-BE49-F238E27FC236}">
+                <a16:creationId xmlns:a16="http://schemas.microsoft.com/office/drawing/2014/main" id="{CB8A9F7C-4BB9-BC47-BA48-609B597702FB}"/>
+              </a:ext>
+            </a:extLst>
+          </p:cNvPr>
+          <p:cNvSpPr>
+            <a:spLocks noGrp="1"/>
+          </p:cNvSpPr>
+          <p:nvPr>
+            <p:ph type="title"/>
+          </p:nvPr>
+        </p:nvSpPr>
+        <p:spPr/>
+        <p:txBody>
+          <a:bodyPr/>
+          <a:lstStyle/>
+          <a:p>
+            <a:r>
+              <a:rPr lang="en-US" dirty="0" err="1"/>
+              <a:t>Übung</a:t>
+            </a:r>
+            <a:r>
+              <a:rPr lang="en-US" dirty="0"/>
+              <a:t> </a:t>
+            </a:r>
+          </a:p>
+        </p:txBody>
+      </p:sp>
+      <p:sp>
+        <p:nvSpPr>
+          <p:cNvPr id="3" name="Content Placeholder 2">
+            <a:extLst>
+              <a:ext uri="{FF2B5EF4-FFF2-40B4-BE49-F238E27FC236}">
+                <a16:creationId xmlns:a16="http://schemas.microsoft.com/office/drawing/2014/main" id="{BFF94DDA-1D44-4F4C-9D8E-7A74AC7A6D96}"/>
+              </a:ext>
+            </a:extLst>
+          </p:cNvPr>
+          <p:cNvSpPr>
+            <a:spLocks noGrp="1"/>
+          </p:cNvSpPr>
+          <p:nvPr>
+            <p:ph idx="1"/>
+          </p:nvPr>
+        </p:nvSpPr>
+        <p:spPr/>
+        <p:txBody>
+          <a:bodyPr/>
+          <a:lstStyle/>
+          <a:p>
+            <a:r>
+              <a:rPr lang="en-US" dirty="0" err="1"/>
+              <a:t>Baue</a:t>
+            </a:r>
+            <a:r>
+              <a:rPr lang="en-US" dirty="0"/>
+              <a:t> in </a:t>
+            </a:r>
+            <a:r>
+              <a:rPr lang="en-US" dirty="0" err="1"/>
+              <a:t>dein</a:t>
+            </a:r>
+            <a:r>
+              <a:rPr lang="en-US" dirty="0"/>
+              <a:t> Holy Grail Layout </a:t>
+            </a:r>
+            <a:r>
+              <a:rPr lang="en-US" dirty="0" err="1"/>
+              <a:t>noch</a:t>
+            </a:r>
+            <a:r>
+              <a:rPr lang="en-US" dirty="0"/>
+              <a:t> </a:t>
+            </a:r>
+            <a:r>
+              <a:rPr lang="en-US" dirty="0" err="1"/>
+              <a:t>einen</a:t>
+            </a:r>
+            <a:r>
+              <a:rPr lang="en-US" dirty="0"/>
+              <a:t> Sticky Footer </a:t>
+            </a:r>
+            <a:r>
+              <a:rPr lang="en-US" dirty="0" err="1"/>
+              <a:t>ein</a:t>
+            </a:r>
+            <a:r>
+              <a:rPr lang="en-US"/>
+              <a:t>…</a:t>
+            </a:r>
+            <a:endParaRPr lang="en-US" dirty="0"/>
+          </a:p>
+        </p:txBody>
+      </p:sp>
+    </p:spTree>
+    <p:extLst>
+      <p:ext uri="{BB962C8B-B14F-4D97-AF65-F5344CB8AC3E}">
+        <p14:creationId xmlns:p14="http://schemas.microsoft.com/office/powerpoint/2010/main" val="3885824606"/>
+      </p:ext>
+    </p:extLst>
+  </p:cSld>
+  <p:clrMapOvr>
+    <a:masterClrMapping/>
+  </p:clrMapOvr>
+</p:sld>
+</file>
+
+<file path=ppt/slides/slide98.xml><?xml version="1.0" encoding="utf-8"?>
 <p:sld xmlns:a="http://schemas.openxmlformats.org/drawingml/2006/main" xmlns:r="http://schemas.openxmlformats.org/officeDocument/2006/relationships" xmlns:p="http://schemas.openxmlformats.org/presentationml/2006/main">
   <p:cSld>
     <p:spTree>
@@ -33642,417 +34281,6 @@
 </p:sld>
 </file>
 
-<file path=ppt/slides/slide97.xml><?xml version="1.0" encoding="utf-8"?>
-<p:sld xmlns:a="http://schemas.openxmlformats.org/drawingml/2006/main" xmlns:r="http://schemas.openxmlformats.org/officeDocument/2006/relationships" xmlns:p="http://schemas.openxmlformats.org/presentationml/2006/main">
-  <p:cSld>
-    <p:spTree>
-      <p:nvGrpSpPr>
-        <p:cNvPr id="1" name=""/>
-        <p:cNvGrpSpPr/>
-        <p:nvPr/>
-      </p:nvGrpSpPr>
-      <p:grpSpPr>
-        <a:xfrm>
-          <a:off x="0" y="0"/>
-          <a:ext cx="0" cy="0"/>
-          <a:chOff x="0" y="0"/>
-          <a:chExt cx="0" cy="0"/>
-        </a:xfrm>
-      </p:grpSpPr>
-      <p:sp>
-        <p:nvSpPr>
-          <p:cNvPr id="2" name="Title 1">
-            <a:extLst>
-              <a:ext uri="{FF2B5EF4-FFF2-40B4-BE49-F238E27FC236}">
-                <a16:creationId xmlns:a16="http://schemas.microsoft.com/office/drawing/2014/main" id="{C57CC73E-83AF-9D48-8780-676E6EE6AB4D}"/>
-              </a:ext>
-            </a:extLst>
-          </p:cNvPr>
-          <p:cNvSpPr>
-            <a:spLocks noGrp="1"/>
-          </p:cNvSpPr>
-          <p:nvPr>
-            <p:ph type="title"/>
-          </p:nvPr>
-        </p:nvSpPr>
-        <p:spPr/>
-        <p:txBody>
-          <a:bodyPr/>
-          <a:lstStyle/>
-          <a:p>
-            <a:r>
-              <a:rPr lang="en-US" dirty="0"/>
-              <a:t>Grid</a:t>
-            </a:r>
-          </a:p>
-        </p:txBody>
-      </p:sp>
-      <p:sp>
-        <p:nvSpPr>
-          <p:cNvPr id="3" name="Content Placeholder 2">
-            <a:extLst>
-              <a:ext uri="{FF2B5EF4-FFF2-40B4-BE49-F238E27FC236}">
-                <a16:creationId xmlns:a16="http://schemas.microsoft.com/office/drawing/2014/main" id="{25799DE7-BC49-E444-A85A-C391B6D9D5F2}"/>
-              </a:ext>
-            </a:extLst>
-          </p:cNvPr>
-          <p:cNvSpPr>
-            <a:spLocks noGrp="1"/>
-          </p:cNvSpPr>
-          <p:nvPr>
-            <p:ph idx="1"/>
-          </p:nvPr>
-        </p:nvSpPr>
-        <p:spPr/>
-        <p:txBody>
-          <a:bodyPr/>
-          <a:lstStyle/>
-          <a:p>
-            <a:r>
-              <a:rPr lang="en-US" dirty="0"/>
-              <a:t>Das Grid Layout </a:t>
-            </a:r>
-            <a:r>
-              <a:rPr lang="en-US" dirty="0" err="1"/>
-              <a:t>wird</a:t>
-            </a:r>
-            <a:r>
-              <a:rPr lang="en-US" dirty="0"/>
-              <a:t> </a:t>
-            </a:r>
-            <a:r>
-              <a:rPr lang="en-US" dirty="0" err="1"/>
-              <a:t>noch</a:t>
-            </a:r>
-            <a:r>
-              <a:rPr lang="en-US" dirty="0"/>
-              <a:t> </a:t>
-            </a:r>
-            <a:r>
-              <a:rPr lang="en-US" dirty="0" err="1"/>
-              <a:t>nicht</a:t>
-            </a:r>
-            <a:r>
-              <a:rPr lang="en-US" dirty="0"/>
-              <a:t> so </a:t>
-            </a:r>
-            <a:r>
-              <a:rPr lang="en-US" dirty="0" err="1"/>
-              <a:t>lange</a:t>
-            </a:r>
-            <a:r>
-              <a:rPr lang="en-US" dirty="0"/>
-              <a:t> von “</a:t>
-            </a:r>
-            <a:r>
-              <a:rPr lang="en-US" dirty="0" err="1"/>
-              <a:t>allen</a:t>
-            </a:r>
-            <a:r>
-              <a:rPr lang="en-US" dirty="0"/>
-              <a:t>” </a:t>
-            </a:r>
-            <a:r>
-              <a:rPr lang="en-US" dirty="0" err="1"/>
-              <a:t>Browsern</a:t>
-            </a:r>
-            <a:r>
-              <a:rPr lang="en-US" dirty="0"/>
-              <a:t> </a:t>
-            </a:r>
-            <a:r>
-              <a:rPr lang="en-US" dirty="0" err="1"/>
-              <a:t>unterstützt</a:t>
-            </a:r>
-            <a:r>
-              <a:rPr lang="en-US" dirty="0"/>
-              <a:t>. Z.B. IE11 </a:t>
-            </a:r>
-            <a:r>
-              <a:rPr lang="en-US" dirty="0" err="1"/>
-              <a:t>unterstützt</a:t>
-            </a:r>
-            <a:r>
-              <a:rPr lang="en-US" dirty="0"/>
-              <a:t> Grid </a:t>
-            </a:r>
-            <a:r>
-              <a:rPr lang="en-US" dirty="0" err="1"/>
-              <a:t>nicht</a:t>
-            </a:r>
-            <a:r>
-              <a:rPr lang="en-US" dirty="0"/>
-              <a:t>.</a:t>
-            </a:r>
-            <a:br>
-              <a:rPr lang="en-US" dirty="0"/>
-            </a:br>
-            <a:r>
-              <a:rPr lang="en-US" dirty="0">
-                <a:hlinkClick r:id="rId2"/>
-              </a:rPr>
-              <a:t>https://caniuse.com/#search=css-grid</a:t>
-            </a:r>
-            <a:endParaRPr lang="en-US" dirty="0"/>
-          </a:p>
-        </p:txBody>
-      </p:sp>
-    </p:spTree>
-    <p:extLst>
-      <p:ext uri="{BB962C8B-B14F-4D97-AF65-F5344CB8AC3E}">
-        <p14:creationId xmlns:p14="http://schemas.microsoft.com/office/powerpoint/2010/main" val="2496049358"/>
-      </p:ext>
-    </p:extLst>
-  </p:cSld>
-  <p:clrMapOvr>
-    <a:masterClrMapping/>
-  </p:clrMapOvr>
-</p:sld>
-</file>
-
-<file path=ppt/slides/slide98.xml><?xml version="1.0" encoding="utf-8"?>
-<p:sld xmlns:a="http://schemas.openxmlformats.org/drawingml/2006/main" xmlns:r="http://schemas.openxmlformats.org/officeDocument/2006/relationships" xmlns:p="http://schemas.openxmlformats.org/presentationml/2006/main">
-  <p:cSld>
-    <p:spTree>
-      <p:nvGrpSpPr>
-        <p:cNvPr id="1" name=""/>
-        <p:cNvGrpSpPr/>
-        <p:nvPr/>
-      </p:nvGrpSpPr>
-      <p:grpSpPr>
-        <a:xfrm>
-          <a:off x="0" y="0"/>
-          <a:ext cx="0" cy="0"/>
-          <a:chOff x="0" y="0"/>
-          <a:chExt cx="0" cy="0"/>
-        </a:xfrm>
-      </p:grpSpPr>
-      <p:sp>
-        <p:nvSpPr>
-          <p:cNvPr id="2" name="Title 1">
-            <a:extLst>
-              <a:ext uri="{FF2B5EF4-FFF2-40B4-BE49-F238E27FC236}">
-                <a16:creationId xmlns:a16="http://schemas.microsoft.com/office/drawing/2014/main" id="{9A6ADDC8-E056-894B-9087-49C0DEA654AA}"/>
-              </a:ext>
-            </a:extLst>
-          </p:cNvPr>
-          <p:cNvSpPr>
-            <a:spLocks noGrp="1"/>
-          </p:cNvSpPr>
-          <p:nvPr>
-            <p:ph type="title"/>
-          </p:nvPr>
-        </p:nvSpPr>
-        <p:spPr/>
-        <p:txBody>
-          <a:bodyPr/>
-          <a:lstStyle/>
-          <a:p>
-            <a:r>
-              <a:rPr lang="en-US" dirty="0"/>
-              <a:t>Grid: Line </a:t>
-            </a:r>
-          </a:p>
-        </p:txBody>
-      </p:sp>
-      <p:pic>
-        <p:nvPicPr>
-          <p:cNvPr id="5" name="Content Placeholder 4">
-            <a:extLst>
-              <a:ext uri="{FF2B5EF4-FFF2-40B4-BE49-F238E27FC236}">
-                <a16:creationId xmlns:a16="http://schemas.microsoft.com/office/drawing/2014/main" id="{27ABC2B5-7CA8-B549-8F2E-CD7E632C4FF2}"/>
-              </a:ext>
-            </a:extLst>
-          </p:cNvPr>
-          <p:cNvPicPr>
-            <a:picLocks noGrp="1" noChangeAspect="1"/>
-          </p:cNvPicPr>
-          <p:nvPr>
-            <p:ph idx="1"/>
-          </p:nvPr>
-        </p:nvPicPr>
-        <p:blipFill>
-          <a:blip r:embed="rId2"/>
-          <a:stretch>
-            <a:fillRect/>
-          </a:stretch>
-        </p:blipFill>
-        <p:spPr>
-          <a:xfrm>
-            <a:off x="680321" y="2387600"/>
-            <a:ext cx="4930795" cy="3598863"/>
-          </a:xfrm>
-        </p:spPr>
-      </p:pic>
-      <p:sp>
-        <p:nvSpPr>
-          <p:cNvPr id="7" name="TextBox 6">
-            <a:extLst>
-              <a:ext uri="{FF2B5EF4-FFF2-40B4-BE49-F238E27FC236}">
-                <a16:creationId xmlns:a16="http://schemas.microsoft.com/office/drawing/2014/main" id="{33E5B256-2936-9B42-819B-6B2472E36E61}"/>
-              </a:ext>
-            </a:extLst>
-          </p:cNvPr>
-          <p:cNvSpPr txBox="1"/>
-          <p:nvPr/>
-        </p:nvSpPr>
-        <p:spPr>
-          <a:xfrm>
-            <a:off x="5963920" y="2387600"/>
-            <a:ext cx="5547759" cy="1477328"/>
-          </a:xfrm>
-          <a:prstGeom prst="rect">
-            <a:avLst/>
-          </a:prstGeom>
-          <a:noFill/>
-        </p:spPr>
-        <p:txBody>
-          <a:bodyPr wrap="square" rtlCol="0">
-            <a:spAutoFit/>
-          </a:bodyPr>
-          <a:lstStyle/>
-          <a:p>
-            <a:r>
-              <a:rPr lang="en-US" dirty="0"/>
-              <a:t>Grid Lines </a:t>
-            </a:r>
-            <a:r>
-              <a:rPr lang="en-US" dirty="0" err="1"/>
-              <a:t>sind</a:t>
-            </a:r>
-            <a:r>
-              <a:rPr lang="en-US" dirty="0"/>
-              <a:t> die </a:t>
-            </a:r>
-            <a:r>
-              <a:rPr lang="en-US" dirty="0" err="1"/>
-              <a:t>horizontalen</a:t>
-            </a:r>
-            <a:r>
-              <a:rPr lang="en-US" dirty="0"/>
-              <a:t> und </a:t>
-            </a:r>
-            <a:r>
-              <a:rPr lang="en-US" dirty="0" err="1"/>
-              <a:t>vertikalen</a:t>
-            </a:r>
-            <a:br>
-              <a:rPr lang="en-US" dirty="0"/>
-            </a:br>
-            <a:r>
-              <a:rPr lang="en-US" dirty="0"/>
-              <a:t>Linen, die die Basis der Grid </a:t>
-            </a:r>
-            <a:r>
-              <a:rPr lang="en-US" dirty="0" err="1"/>
-              <a:t>Struktur</a:t>
-            </a:r>
-            <a:r>
-              <a:rPr lang="en-US" dirty="0"/>
-              <a:t> </a:t>
-            </a:r>
-            <a:r>
-              <a:rPr lang="en-US" dirty="0" err="1"/>
-              <a:t>bilden</a:t>
-            </a:r>
-            <a:r>
-              <a:rPr lang="en-US" dirty="0"/>
-              <a:t>.</a:t>
-            </a:r>
-            <a:br>
-              <a:rPr lang="en-US" dirty="0"/>
-            </a:br>
-            <a:br>
-              <a:rPr lang="en-US" dirty="0"/>
-            </a:br>
-            <a:r>
-              <a:rPr lang="en-US" dirty="0" err="1"/>
-              <a:t>Wir</a:t>
-            </a:r>
-            <a:r>
-              <a:rPr lang="en-US" dirty="0"/>
-              <a:t> </a:t>
-            </a:r>
-            <a:r>
-              <a:rPr lang="en-US" dirty="0" err="1"/>
-              <a:t>können</a:t>
-            </a:r>
-            <a:r>
-              <a:rPr lang="en-US" dirty="0"/>
-              <a:t> </a:t>
-            </a:r>
-            <a:r>
-              <a:rPr lang="en-US" dirty="0" err="1"/>
-              <a:t>sie</a:t>
-            </a:r>
-            <a:r>
-              <a:rPr lang="en-US" dirty="0"/>
-              <a:t> </a:t>
-            </a:r>
-            <a:r>
-              <a:rPr lang="en-US" dirty="0" err="1"/>
-              <a:t>mit</a:t>
-            </a:r>
-            <a:r>
-              <a:rPr lang="en-US" dirty="0"/>
-              <a:t> </a:t>
-            </a:r>
-            <a:r>
-              <a:rPr lang="en-US" dirty="0" err="1"/>
-              <a:t>einem</a:t>
-            </a:r>
-            <a:r>
-              <a:rPr lang="en-US" dirty="0"/>
-              <a:t> </a:t>
-            </a:r>
-            <a:r>
-              <a:rPr lang="en-US" dirty="0" err="1"/>
-              <a:t>numerischen</a:t>
-            </a:r>
-            <a:r>
-              <a:rPr lang="en-US" dirty="0"/>
-              <a:t> Index </a:t>
-            </a:r>
-            <a:r>
-              <a:rPr lang="en-US" dirty="0" err="1"/>
-              <a:t>ansprechen</a:t>
-            </a:r>
-            <a:r>
-              <a:rPr lang="en-US" dirty="0"/>
-              <a:t>, der </a:t>
-            </a:r>
-            <a:r>
-              <a:rPr lang="en-US" dirty="0" err="1"/>
-              <a:t>mit</a:t>
-            </a:r>
-            <a:r>
-              <a:rPr lang="en-US" dirty="0"/>
-              <a:t> 1 </a:t>
-            </a:r>
-            <a:r>
-              <a:rPr lang="en-US" dirty="0" err="1"/>
-              <a:t>beginnt</a:t>
-            </a:r>
-            <a:r>
-              <a:rPr lang="en-US" dirty="0"/>
-              <a:t>.</a:t>
-            </a:r>
-          </a:p>
-        </p:txBody>
-      </p:sp>
-    </p:spTree>
-    <p:extLst>
-      <p:ext uri="{BB962C8B-B14F-4D97-AF65-F5344CB8AC3E}">
-        <p14:creationId xmlns:p14="http://schemas.microsoft.com/office/powerpoint/2010/main" val="3358430858"/>
-      </p:ext>
-    </p:extLst>
-  </p:cSld>
-  <p:clrMapOvr>
-    <a:masterClrMapping/>
-  </p:clrMapOvr>
-</p:sld>
-</file>
-
 <file path=ppt/slides/slide99.xml><?xml version="1.0" encoding="utf-8"?>
 <p:sld xmlns:a="http://schemas.openxmlformats.org/drawingml/2006/main" xmlns:r="http://schemas.openxmlformats.org/officeDocument/2006/relationships" xmlns:p="http://schemas.openxmlformats.org/presentationml/2006/main">
   <p:cSld>
@@ -34075,7 +34303,7 @@
           <p:cNvPr id="2" name="Title 1">
             <a:extLst>
               <a:ext uri="{FF2B5EF4-FFF2-40B4-BE49-F238E27FC236}">
-                <a16:creationId xmlns:a16="http://schemas.microsoft.com/office/drawing/2014/main" id="{BA683EE5-5BCB-B446-9775-80D8DA8D16D1}"/>
+                <a16:creationId xmlns:a16="http://schemas.microsoft.com/office/drawing/2014/main" id="{C57CC73E-83AF-9D48-8780-676E6EE6AB4D}"/>
               </a:ext>
             </a:extLst>
           </p:cNvPr>
@@ -34093,44 +34321,125 @@
           <a:p>
             <a:r>
               <a:rPr lang="en-US" dirty="0"/>
-              <a:t>Grid: Track, Cell, Area </a:t>
-            </a:r>
-          </a:p>
-        </p:txBody>
-      </p:sp>
-      <p:pic>
-        <p:nvPicPr>
-          <p:cNvPr id="8" name="Inhaltsplatzhalter 7">
+              <a:t>Grid</a:t>
+            </a:r>
+          </a:p>
+        </p:txBody>
+      </p:sp>
+      <p:sp>
+        <p:nvSpPr>
+          <p:cNvPr id="3" name="Content Placeholder 2">
             <a:extLst>
               <a:ext uri="{FF2B5EF4-FFF2-40B4-BE49-F238E27FC236}">
-                <a16:creationId xmlns:a16="http://schemas.microsoft.com/office/drawing/2014/main" id="{B53AF9A3-D986-604B-94C1-C0CA2C5A5858}"/>
+                <a16:creationId xmlns:a16="http://schemas.microsoft.com/office/drawing/2014/main" id="{25799DE7-BC49-E444-A85A-C391B6D9D5F2}"/>
               </a:ext>
             </a:extLst>
           </p:cNvPr>
-          <p:cNvPicPr>
-            <a:picLocks noGrp="1" noChangeAspect="1"/>
-          </p:cNvPicPr>
+          <p:cNvSpPr>
+            <a:spLocks noGrp="1"/>
+          </p:cNvSpPr>
           <p:nvPr>
             <p:ph idx="1"/>
           </p:nvPr>
-        </p:nvPicPr>
-        <p:blipFill>
-          <a:blip r:embed="rId2"/>
-          <a:stretch>
-            <a:fillRect/>
-          </a:stretch>
-        </p:blipFill>
-        <p:spPr>
-          <a:xfrm>
-            <a:off x="680321" y="2336800"/>
-            <a:ext cx="6435109" cy="3598863"/>
-          </a:xfrm>
-        </p:spPr>
-      </p:pic>
+        </p:nvSpPr>
+        <p:spPr/>
+        <p:txBody>
+          <a:bodyPr/>
+          <a:lstStyle/>
+          <a:p>
+            <a:r>
+              <a:rPr lang="en-US" dirty="0"/>
+              <a:t>Das Grid Layout </a:t>
+            </a:r>
+            <a:r>
+              <a:rPr lang="en-US" dirty="0" err="1"/>
+              <a:t>wird</a:t>
+            </a:r>
+            <a:r>
+              <a:rPr lang="en-US" dirty="0"/>
+              <a:t> </a:t>
+            </a:r>
+            <a:r>
+              <a:rPr lang="en-US" dirty="0" err="1"/>
+              <a:t>noch</a:t>
+            </a:r>
+            <a:r>
+              <a:rPr lang="en-US" dirty="0"/>
+              <a:t> </a:t>
+            </a:r>
+            <a:r>
+              <a:rPr lang="en-US" dirty="0" err="1"/>
+              <a:t>nicht</a:t>
+            </a:r>
+            <a:r>
+              <a:rPr lang="en-US" dirty="0"/>
+              <a:t> so </a:t>
+            </a:r>
+            <a:r>
+              <a:rPr lang="en-US" dirty="0" err="1"/>
+              <a:t>lange</a:t>
+            </a:r>
+            <a:r>
+              <a:rPr lang="en-US" dirty="0"/>
+              <a:t> von “</a:t>
+            </a:r>
+            <a:r>
+              <a:rPr lang="en-US" dirty="0" err="1"/>
+              <a:t>allen</a:t>
+            </a:r>
+            <a:r>
+              <a:rPr lang="en-US" dirty="0"/>
+              <a:t>” </a:t>
+            </a:r>
+            <a:r>
+              <a:rPr lang="en-US" dirty="0" err="1"/>
+              <a:t>Browsern</a:t>
+            </a:r>
+            <a:r>
+              <a:rPr lang="en-US" dirty="0"/>
+              <a:t> </a:t>
+            </a:r>
+            <a:r>
+              <a:rPr lang="en-US" dirty="0" err="1"/>
+              <a:t>unterstützt</a:t>
+            </a:r>
+            <a:r>
+              <a:rPr lang="en-US" dirty="0"/>
+              <a:t>. Z.B. IE11 </a:t>
+            </a:r>
+            <a:r>
+              <a:rPr lang="en-US" dirty="0" err="1"/>
+              <a:t>unterstützt</a:t>
+            </a:r>
+            <a:r>
+              <a:rPr lang="en-US" dirty="0"/>
+              <a:t> Grid </a:t>
+            </a:r>
+            <a:r>
+              <a:rPr lang="en-US" dirty="0" err="1"/>
+              <a:t>nicht</a:t>
+            </a:r>
+            <a:r>
+              <a:rPr lang="en-US" dirty="0"/>
+              <a:t>.</a:t>
+            </a:r>
+            <a:br>
+              <a:rPr lang="en-US" dirty="0"/>
+            </a:br>
+            <a:r>
+              <a:rPr lang="en-US" dirty="0">
+                <a:hlinkClick r:id="rId2"/>
+              </a:rPr>
+              <a:t>https://caniuse.com/#search=css-grid</a:t>
+            </a:r>
+            <a:endParaRPr lang="en-US" dirty="0"/>
+          </a:p>
+        </p:txBody>
+      </p:sp>
     </p:spTree>
     <p:extLst>
       <p:ext uri="{BB962C8B-B14F-4D97-AF65-F5344CB8AC3E}">
-        <p14:creationId xmlns:p14="http://schemas.microsoft.com/office/powerpoint/2010/main" val="2062539358"/>
+        <p14:creationId xmlns:p14="http://schemas.microsoft.com/office/powerpoint/2010/main" val="2496049358"/>
       </p:ext>
     </p:extLst>
   </p:cSld>

</xml_diff>

<commit_message>
Übung hinzugefügt, Formular gestylt.
</commit_message>
<xml_diff>
--- a/html Schulung.pptx
+++ b/html Schulung.pptx
@@ -93,18 +93,18 @@
     <p:sldId id="358" r:id="rId84"/>
     <p:sldId id="356" r:id="rId85"/>
     <p:sldId id="366" r:id="rId86"/>
-    <p:sldId id="365" r:id="rId87"/>
-    <p:sldId id="325" r:id="rId88"/>
-    <p:sldId id="326" r:id="rId89"/>
-    <p:sldId id="327" r:id="rId90"/>
-    <p:sldId id="328" r:id="rId91"/>
-    <p:sldId id="331" r:id="rId92"/>
-    <p:sldId id="332" r:id="rId93"/>
-    <p:sldId id="334" r:id="rId94"/>
-    <p:sldId id="333" r:id="rId95"/>
-    <p:sldId id="367" r:id="rId96"/>
-    <p:sldId id="368" r:id="rId97"/>
-    <p:sldId id="369" r:id="rId98"/>
+    <p:sldId id="325" r:id="rId87"/>
+    <p:sldId id="326" r:id="rId88"/>
+    <p:sldId id="327" r:id="rId89"/>
+    <p:sldId id="328" r:id="rId90"/>
+    <p:sldId id="331" r:id="rId91"/>
+    <p:sldId id="332" r:id="rId92"/>
+    <p:sldId id="334" r:id="rId93"/>
+    <p:sldId id="333" r:id="rId94"/>
+    <p:sldId id="367" r:id="rId95"/>
+    <p:sldId id="368" r:id="rId96"/>
+    <p:sldId id="369" r:id="rId97"/>
+    <p:sldId id="370" r:id="rId98"/>
     <p:sldId id="329" r:id="rId99"/>
     <p:sldId id="330" r:id="rId100"/>
     <p:sldId id="335" r:id="rId101"/>
@@ -330,7 +330,7 @@
           <a:p>
             <a:fld id="{BE2D71F2-CD9B-7C46-8D66-54734C07EE34}" type="datetimeFigureOut">
               <a:rPr lang="de-DE" smtClean="0"/>
-              <a:t>26.03.19</a:t>
+              <a:t>27.03.19</a:t>
             </a:fld>
             <a:endParaRPr lang="de-DE"/>
           </a:p>
@@ -1518,7 +1518,7 @@
           <a:p>
             <a:fld id="{97F8442F-7EFF-D846-8D33-E60C8BAB8488}" type="datetimeFigureOut">
               <a:rPr lang="de-DE" smtClean="0"/>
-              <a:t>26.03.19</a:t>
+              <a:t>27.03.19</a:t>
             </a:fld>
             <a:endParaRPr lang="de-DE"/>
           </a:p>
@@ -1937,7 +1937,7 @@
           <a:p>
             <a:fld id="{97F8442F-7EFF-D846-8D33-E60C8BAB8488}" type="datetimeFigureOut">
               <a:rPr lang="de-DE" smtClean="0"/>
-              <a:t>26.03.19</a:t>
+              <a:t>27.03.19</a:t>
             </a:fld>
             <a:endParaRPr lang="de-DE"/>
           </a:p>
@@ -2278,7 +2278,7 @@
           <a:p>
             <a:fld id="{97F8442F-7EFF-D846-8D33-E60C8BAB8488}" type="datetimeFigureOut">
               <a:rPr lang="de-DE" smtClean="0"/>
-              <a:t>26.03.19</a:t>
+              <a:t>27.03.19</a:t>
             </a:fld>
             <a:endParaRPr lang="de-DE"/>
           </a:p>
@@ -2693,7 +2693,7 @@
           <a:p>
             <a:fld id="{97F8442F-7EFF-D846-8D33-E60C8BAB8488}" type="datetimeFigureOut">
               <a:rPr lang="de-DE" smtClean="0"/>
-              <a:t>26.03.19</a:t>
+              <a:t>27.03.19</a:t>
             </a:fld>
             <a:endParaRPr lang="de-DE"/>
           </a:p>
@@ -3266,7 +3266,7 @@
           <a:p>
             <a:fld id="{97F8442F-7EFF-D846-8D33-E60C8BAB8488}" type="datetimeFigureOut">
               <a:rPr lang="de-DE" smtClean="0"/>
-              <a:t>26.03.19</a:t>
+              <a:t>27.03.19</a:t>
             </a:fld>
             <a:endParaRPr lang="de-DE"/>
           </a:p>
@@ -3977,7 +3977,7 @@
           <a:p>
             <a:fld id="{97F8442F-7EFF-D846-8D33-E60C8BAB8488}" type="datetimeFigureOut">
               <a:rPr lang="de-DE" smtClean="0"/>
-              <a:t>26.03.19</a:t>
+              <a:t>27.03.19</a:t>
             </a:fld>
             <a:endParaRPr lang="de-DE"/>
           </a:p>
@@ -4920,7 +4920,7 @@
           <a:p>
             <a:fld id="{97F8442F-7EFF-D846-8D33-E60C8BAB8488}" type="datetimeFigureOut">
               <a:rPr lang="de-DE" smtClean="0"/>
-              <a:t>26.03.19</a:t>
+              <a:t>27.03.19</a:t>
             </a:fld>
             <a:endParaRPr lang="de-DE"/>
           </a:p>
@@ -5209,7 +5209,7 @@
           <a:p>
             <a:fld id="{97F8442F-7EFF-D846-8D33-E60C8BAB8488}" type="datetimeFigureOut">
               <a:rPr lang="de-DE" smtClean="0"/>
-              <a:t>26.03.19</a:t>
+              <a:t>27.03.19</a:t>
             </a:fld>
             <a:endParaRPr lang="de-DE"/>
           </a:p>
@@ -5449,7 +5449,7 @@
           <a:p>
             <a:fld id="{97F8442F-7EFF-D846-8D33-E60C8BAB8488}" type="datetimeFigureOut">
               <a:rPr lang="de-DE" smtClean="0"/>
-              <a:t>26.03.19</a:t>
+              <a:t>27.03.19</a:t>
             </a:fld>
             <a:endParaRPr lang="de-DE"/>
           </a:p>
@@ -5748,7 +5748,7 @@
           <a:p>
             <a:fld id="{97F8442F-7EFF-D846-8D33-E60C8BAB8488}" type="datetimeFigureOut">
               <a:rPr lang="de-DE" smtClean="0"/>
-              <a:t>26.03.19</a:t>
+              <a:t>27.03.19</a:t>
             </a:fld>
             <a:endParaRPr lang="de-DE"/>
           </a:p>
@@ -6142,7 +6142,7 @@
           <a:p>
             <a:fld id="{97F8442F-7EFF-D846-8D33-E60C8BAB8488}" type="datetimeFigureOut">
               <a:rPr lang="de-DE" smtClean="0"/>
-              <a:t>26.03.19</a:t>
+              <a:t>27.03.19</a:t>
             </a:fld>
             <a:endParaRPr lang="de-DE"/>
           </a:p>
@@ -6470,7 +6470,7 @@
           <a:p>
             <a:fld id="{97F8442F-7EFF-D846-8D33-E60C8BAB8488}" type="datetimeFigureOut">
               <a:rPr lang="de-DE" smtClean="0"/>
-              <a:t>26.03.19</a:t>
+              <a:t>27.03.19</a:t>
             </a:fld>
             <a:endParaRPr lang="de-DE"/>
           </a:p>
@@ -6938,7 +6938,7 @@
           <a:p>
             <a:fld id="{97F8442F-7EFF-D846-8D33-E60C8BAB8488}" type="datetimeFigureOut">
               <a:rPr lang="de-DE" smtClean="0"/>
-              <a:t>26.03.19</a:t>
+              <a:t>27.03.19</a:t>
             </a:fld>
             <a:endParaRPr lang="de-DE"/>
           </a:p>
@@ -7195,7 +7195,7 @@
           <a:p>
             <a:fld id="{97F8442F-7EFF-D846-8D33-E60C8BAB8488}" type="datetimeFigureOut">
               <a:rPr lang="de-DE" smtClean="0"/>
-              <a:t>26.03.19</a:t>
+              <a:t>27.03.19</a:t>
             </a:fld>
             <a:endParaRPr lang="de-DE"/>
           </a:p>
@@ -7358,7 +7358,7 @@
           <a:p>
             <a:fld id="{97F8442F-7EFF-D846-8D33-E60C8BAB8488}" type="datetimeFigureOut">
               <a:rPr lang="de-DE" smtClean="0"/>
-              <a:t>26.03.19</a:t>
+              <a:t>27.03.19</a:t>
             </a:fld>
             <a:endParaRPr lang="de-DE"/>
           </a:p>
@@ -7729,7 +7729,7 @@
           <a:p>
             <a:fld id="{97F8442F-7EFF-D846-8D33-E60C8BAB8488}" type="datetimeFigureOut">
               <a:rPr lang="de-DE" smtClean="0"/>
-              <a:t>26.03.19</a:t>
+              <a:t>27.03.19</a:t>
             </a:fld>
             <a:endParaRPr lang="de-DE"/>
           </a:p>
@@ -8143,7 +8143,7 @@
           <a:p>
             <a:fld id="{97F8442F-7EFF-D846-8D33-E60C8BAB8488}" type="datetimeFigureOut">
               <a:rPr lang="de-DE" smtClean="0"/>
-              <a:t>26.03.19</a:t>
+              <a:t>27.03.19</a:t>
             </a:fld>
             <a:endParaRPr lang="de-DE"/>
           </a:p>
@@ -8363,7 +8363,7 @@
           <a:p>
             <a:fld id="{97F8442F-7EFF-D846-8D33-E60C8BAB8488}" type="datetimeFigureOut">
               <a:rPr lang="de-DE" smtClean="0"/>
-              <a:t>26.03.19</a:t>
+              <a:t>27.03.19</a:t>
             </a:fld>
             <a:endParaRPr lang="de-DE"/>
           </a:p>
@@ -30479,132 +30479,6 @@
           <p:cNvPr id="2" name="Title 1">
             <a:extLst>
               <a:ext uri="{FF2B5EF4-FFF2-40B4-BE49-F238E27FC236}">
-                <a16:creationId xmlns:a16="http://schemas.microsoft.com/office/drawing/2014/main" id="{6DE61EB9-9431-ED49-AE1D-C75F1F7FC588}"/>
-              </a:ext>
-            </a:extLst>
-          </p:cNvPr>
-          <p:cNvSpPr>
-            <a:spLocks noGrp="1"/>
-          </p:cNvSpPr>
-          <p:nvPr>
-            <p:ph type="title"/>
-          </p:nvPr>
-        </p:nvSpPr>
-        <p:spPr/>
-        <p:txBody>
-          <a:bodyPr/>
-          <a:lstStyle/>
-          <a:p>
-            <a:r>
-              <a:rPr lang="en-US" dirty="0" err="1"/>
-              <a:t>Übung</a:t>
-            </a:r>
-            <a:endParaRPr lang="en-US" dirty="0"/>
-          </a:p>
-        </p:txBody>
-      </p:sp>
-      <p:sp>
-        <p:nvSpPr>
-          <p:cNvPr id="3" name="Content Placeholder 2">
-            <a:extLst>
-              <a:ext uri="{FF2B5EF4-FFF2-40B4-BE49-F238E27FC236}">
-                <a16:creationId xmlns:a16="http://schemas.microsoft.com/office/drawing/2014/main" id="{1DEC266C-1D0F-3445-A3EA-E38F0F05201C}"/>
-              </a:ext>
-            </a:extLst>
-          </p:cNvPr>
-          <p:cNvSpPr>
-            <a:spLocks noGrp="1"/>
-          </p:cNvSpPr>
-          <p:nvPr>
-            <p:ph idx="1"/>
-          </p:nvPr>
-        </p:nvSpPr>
-        <p:spPr/>
-        <p:txBody>
-          <a:bodyPr/>
-          <a:lstStyle/>
-          <a:p>
-            <a:pPr marL="0" indent="0">
-              <a:buNone/>
-            </a:pPr>
-            <a:r>
-              <a:rPr lang="en-US" dirty="0"/>
-              <a:t>Sticky Footer</a:t>
-            </a:r>
-          </a:p>
-          <a:p>
-            <a:pPr marL="0" indent="0">
-              <a:buNone/>
-            </a:pPr>
-            <a:endParaRPr lang="en-US" dirty="0"/>
-          </a:p>
-        </p:txBody>
-      </p:sp>
-      <p:pic>
-        <p:nvPicPr>
-          <p:cNvPr id="5" name="Picture 4">
-            <a:extLst>
-              <a:ext uri="{FF2B5EF4-FFF2-40B4-BE49-F238E27FC236}">
-                <a16:creationId xmlns:a16="http://schemas.microsoft.com/office/drawing/2014/main" id="{FE2B2155-E13F-BD41-B8E8-C79D64F49438}"/>
-              </a:ext>
-            </a:extLst>
-          </p:cNvPr>
-          <p:cNvPicPr>
-            <a:picLocks noChangeAspect="1"/>
-          </p:cNvPicPr>
-          <p:nvPr/>
-        </p:nvPicPr>
-        <p:blipFill>
-          <a:blip r:embed="rId2"/>
-          <a:stretch>
-            <a:fillRect/>
-          </a:stretch>
-        </p:blipFill>
-        <p:spPr>
-          <a:xfrm>
-            <a:off x="3077403" y="2336873"/>
-            <a:ext cx="6037193" cy="4094489"/>
-          </a:xfrm>
-          <a:prstGeom prst="rect">
-            <a:avLst/>
-          </a:prstGeom>
-        </p:spPr>
-      </p:pic>
-    </p:spTree>
-    <p:extLst>
-      <p:ext uri="{BB962C8B-B14F-4D97-AF65-F5344CB8AC3E}">
-        <p14:creationId xmlns:p14="http://schemas.microsoft.com/office/powerpoint/2010/main" val="46457091"/>
-      </p:ext>
-    </p:extLst>
-  </p:cSld>
-  <p:clrMapOvr>
-    <a:masterClrMapping/>
-  </p:clrMapOvr>
-</p:sld>
-</file>
-
-<file path=ppt/slides/slide87.xml><?xml version="1.0" encoding="utf-8"?>
-<p:sld xmlns:a="http://schemas.openxmlformats.org/drawingml/2006/main" xmlns:r="http://schemas.openxmlformats.org/officeDocument/2006/relationships" xmlns:p="http://schemas.openxmlformats.org/presentationml/2006/main">
-  <p:cSld>
-    <p:spTree>
-      <p:nvGrpSpPr>
-        <p:cNvPr id="1" name=""/>
-        <p:cNvGrpSpPr/>
-        <p:nvPr/>
-      </p:nvGrpSpPr>
-      <p:grpSpPr>
-        <a:xfrm>
-          <a:off x="0" y="0"/>
-          <a:ext cx="0" cy="0"/>
-          <a:chOff x="0" y="0"/>
-          <a:chExt cx="0" cy="0"/>
-        </a:xfrm>
-      </p:grpSpPr>
-      <p:sp>
-        <p:nvSpPr>
-          <p:cNvPr id="2" name="Title 1">
-            <a:extLst>
-              <a:ext uri="{FF2B5EF4-FFF2-40B4-BE49-F238E27FC236}">
                 <a16:creationId xmlns:a16="http://schemas.microsoft.com/office/drawing/2014/main" id="{D5490CE8-8A1E-3042-991A-E735B45852F1}"/>
               </a:ext>
             </a:extLst>
@@ -30859,7 +30733,7 @@
 </p:sld>
 </file>
 
-<file path=ppt/slides/slide88.xml><?xml version="1.0" encoding="utf-8"?>
+<file path=ppt/slides/slide87.xml><?xml version="1.0" encoding="utf-8"?>
 <p:sld xmlns:a="http://schemas.openxmlformats.org/drawingml/2006/main" xmlns:r="http://schemas.openxmlformats.org/officeDocument/2006/relationships" xmlns:p="http://schemas.openxmlformats.org/presentationml/2006/main">
   <p:cSld>
     <p:spTree>
@@ -31301,6 +31175,226 @@
 </p:sld>
 </file>
 
+<file path=ppt/slides/slide88.xml><?xml version="1.0" encoding="utf-8"?>
+<p:sld xmlns:a="http://schemas.openxmlformats.org/drawingml/2006/main" xmlns:r="http://schemas.openxmlformats.org/officeDocument/2006/relationships" xmlns:p="http://schemas.openxmlformats.org/presentationml/2006/main">
+  <p:cSld>
+    <p:spTree>
+      <p:nvGrpSpPr>
+        <p:cNvPr id="1" name=""/>
+        <p:cNvGrpSpPr/>
+        <p:nvPr/>
+      </p:nvGrpSpPr>
+      <p:grpSpPr>
+        <a:xfrm>
+          <a:off x="0" y="0"/>
+          <a:ext cx="0" cy="0"/>
+          <a:chOff x="0" y="0"/>
+          <a:chExt cx="0" cy="0"/>
+        </a:xfrm>
+      </p:grpSpPr>
+      <p:sp>
+        <p:nvSpPr>
+          <p:cNvPr id="2" name="Title 1">
+            <a:extLst>
+              <a:ext uri="{FF2B5EF4-FFF2-40B4-BE49-F238E27FC236}">
+                <a16:creationId xmlns:a16="http://schemas.microsoft.com/office/drawing/2014/main" id="{E1B3D9A2-0FB8-0646-88C3-FE5D6AB11CFC}"/>
+              </a:ext>
+            </a:extLst>
+          </p:cNvPr>
+          <p:cNvSpPr>
+            <a:spLocks noGrp="1"/>
+          </p:cNvSpPr>
+          <p:nvPr>
+            <p:ph type="title"/>
+          </p:nvPr>
+        </p:nvSpPr>
+        <p:spPr/>
+        <p:txBody>
+          <a:bodyPr/>
+          <a:lstStyle/>
+          <a:p>
+            <a:r>
+              <a:rPr lang="en-US" dirty="0"/>
+              <a:t>Flexbox: Container Properties</a:t>
+            </a:r>
+          </a:p>
+        </p:txBody>
+      </p:sp>
+      <p:sp>
+        <p:nvSpPr>
+          <p:cNvPr id="3" name="Content Placeholder 2">
+            <a:extLst>
+              <a:ext uri="{FF2B5EF4-FFF2-40B4-BE49-F238E27FC236}">
+                <a16:creationId xmlns:a16="http://schemas.microsoft.com/office/drawing/2014/main" id="{4F332575-B5FE-144F-9D81-EBD8922382A8}"/>
+              </a:ext>
+            </a:extLst>
+          </p:cNvPr>
+          <p:cNvSpPr>
+            <a:spLocks noGrp="1"/>
+          </p:cNvSpPr>
+          <p:nvPr>
+            <p:ph idx="1"/>
+          </p:nvPr>
+        </p:nvSpPr>
+        <p:spPr/>
+        <p:txBody>
+          <a:bodyPr/>
+          <a:lstStyle/>
+          <a:p>
+            <a:r>
+              <a:rPr lang="en-US" dirty="0">
+                <a:solidFill>
+                  <a:schemeClr val="bg1"/>
+                </a:solidFill>
+              </a:rPr>
+              <a:t>flex-wrap</a:t>
+            </a:r>
+            <a:r>
+              <a:rPr lang="en-US" dirty="0"/>
+              <a:t>: </a:t>
+            </a:r>
+            <a:r>
+              <a:rPr lang="en-US" dirty="0" err="1"/>
+              <a:t>versucht</a:t>
+            </a:r>
+            <a:r>
+              <a:rPr lang="en-US" dirty="0"/>
+              <a:t> </a:t>
+            </a:r>
+            <a:r>
+              <a:rPr lang="en-US" dirty="0" err="1"/>
+              <a:t>alle</a:t>
+            </a:r>
+            <a:r>
+              <a:rPr lang="en-US" dirty="0"/>
+              <a:t> Items in </a:t>
+            </a:r>
+            <a:r>
+              <a:rPr lang="en-US" dirty="0" err="1"/>
+              <a:t>eine</a:t>
+            </a:r>
+            <a:r>
+              <a:rPr lang="en-US" dirty="0"/>
+              <a:t> </a:t>
+            </a:r>
+            <a:r>
+              <a:rPr lang="en-US" dirty="0" err="1"/>
+              <a:t>Zeile</a:t>
+            </a:r>
+            <a:r>
+              <a:rPr lang="en-US" dirty="0"/>
+              <a:t> </a:t>
+            </a:r>
+            <a:r>
+              <a:rPr lang="en-US" dirty="0" err="1"/>
+              <a:t>zu</a:t>
+            </a:r>
+            <a:r>
+              <a:rPr lang="en-US" dirty="0"/>
+              <a:t> </a:t>
+            </a:r>
+            <a:r>
+              <a:rPr lang="en-US" dirty="0" err="1"/>
+              <a:t>packen</a:t>
+            </a:r>
+            <a:br>
+              <a:rPr lang="en-US" dirty="0"/>
+            </a:br>
+            <a:br>
+              <a:rPr lang="en-US" dirty="0"/>
+            </a:br>
+            <a:r>
+              <a:rPr lang="en-US" dirty="0"/>
+              <a:t>flex-wrap: </a:t>
+            </a:r>
+            <a:r>
+              <a:rPr lang="en-US" dirty="0" err="1"/>
+              <a:t>nowrap</a:t>
+            </a:r>
+            <a:r>
+              <a:rPr lang="en-US" dirty="0"/>
+              <a:t> | wrap | wrap-reverse</a:t>
+            </a:r>
+            <a:br>
+              <a:rPr lang="en-US" dirty="0"/>
+            </a:br>
+            <a:br>
+              <a:rPr lang="en-US" dirty="0"/>
+            </a:br>
+            <a:endParaRPr lang="en-US" dirty="0"/>
+          </a:p>
+          <a:p>
+            <a:r>
+              <a:rPr lang="en-US" dirty="0">
+                <a:solidFill>
+                  <a:schemeClr val="bg1"/>
+                </a:solidFill>
+              </a:rPr>
+              <a:t>flex-flow</a:t>
+            </a:r>
+            <a:r>
+              <a:rPr lang="en-US" dirty="0"/>
+              <a:t>:</a:t>
+            </a:r>
+            <a:r>
+              <a:rPr lang="en-US" b="1" dirty="0"/>
+              <a:t> </a:t>
+            </a:r>
+            <a:r>
+              <a:rPr lang="en-US" dirty="0" err="1"/>
+              <a:t>ist</a:t>
+            </a:r>
+            <a:r>
+              <a:rPr lang="en-US" dirty="0"/>
+              <a:t> </a:t>
+            </a:r>
+            <a:r>
+              <a:rPr lang="en-US" dirty="0" err="1"/>
+              <a:t>ein</a:t>
+            </a:r>
+            <a:r>
+              <a:rPr lang="en-US" dirty="0"/>
+              <a:t> shorthand </a:t>
+            </a:r>
+            <a:r>
+              <a:rPr lang="en-US" dirty="0" err="1"/>
+              <a:t>für</a:t>
+            </a:r>
+            <a:r>
+              <a:rPr lang="en-US" dirty="0"/>
+              <a:t> flex-direction und flex-wrap</a:t>
+            </a:r>
+            <a:br>
+              <a:rPr lang="en-US" dirty="0"/>
+            </a:br>
+            <a:br>
+              <a:rPr lang="en-US" dirty="0"/>
+            </a:br>
+            <a:r>
+              <a:rPr lang="en-US" dirty="0"/>
+              <a:t>flex-flow: row </a:t>
+            </a:r>
+            <a:r>
+              <a:rPr lang="en-US" dirty="0" err="1"/>
+              <a:t>nowrap</a:t>
+            </a:r>
+            <a:endParaRPr lang="en-US" dirty="0"/>
+          </a:p>
+        </p:txBody>
+      </p:sp>
+    </p:spTree>
+    <p:extLst>
+      <p:ext uri="{BB962C8B-B14F-4D97-AF65-F5344CB8AC3E}">
+        <p14:creationId xmlns:p14="http://schemas.microsoft.com/office/powerpoint/2010/main" val="1777042083"/>
+      </p:ext>
+    </p:extLst>
+  </p:cSld>
+  <p:clrMapOvr>
+    <a:masterClrMapping/>
+  </p:clrMapOvr>
+</p:sld>
+</file>
+
 <file path=ppt/slides/slide89.xml><?xml version="1.0" encoding="utf-8"?>
 <p:sld xmlns:a="http://schemas.openxmlformats.org/drawingml/2006/main" xmlns:r="http://schemas.openxmlformats.org/officeDocument/2006/relationships" xmlns:p="http://schemas.openxmlformats.org/presentationml/2006/main">
   <p:cSld>
@@ -31323,7 +31417,7 @@
           <p:cNvPr id="2" name="Title 1">
             <a:extLst>
               <a:ext uri="{FF2B5EF4-FFF2-40B4-BE49-F238E27FC236}">
-                <a16:creationId xmlns:a16="http://schemas.microsoft.com/office/drawing/2014/main" id="{E1B3D9A2-0FB8-0646-88C3-FE5D6AB11CFC}"/>
+                <a16:creationId xmlns:a16="http://schemas.microsoft.com/office/drawing/2014/main" id="{2B2CD961-5709-C241-A54E-238F4D05CD7C}"/>
               </a:ext>
             </a:extLst>
           </p:cNvPr>
@@ -31334,7 +31428,12 @@
             <p:ph type="title"/>
           </p:nvPr>
         </p:nvSpPr>
-        <p:spPr/>
+        <p:spPr>
+          <a:xfrm>
+            <a:off x="680321" y="753228"/>
+            <a:ext cx="9613861" cy="1080938"/>
+          </a:xfrm>
+        </p:spPr>
         <p:txBody>
           <a:bodyPr/>
           <a:lstStyle/>
@@ -31351,7 +31450,7 @@
           <p:cNvPr id="3" name="Content Placeholder 2">
             <a:extLst>
               <a:ext uri="{FF2B5EF4-FFF2-40B4-BE49-F238E27FC236}">
-                <a16:creationId xmlns:a16="http://schemas.microsoft.com/office/drawing/2014/main" id="{4F332575-B5FE-144F-9D81-EBD8922382A8}"/>
+                <a16:creationId xmlns:a16="http://schemas.microsoft.com/office/drawing/2014/main" id="{A3D67316-99A5-E94E-A390-438B2046BAF7}"/>
               </a:ext>
             </a:extLst>
           </p:cNvPr>
@@ -31364,7 +31463,9 @@
         </p:nvSpPr>
         <p:spPr/>
         <p:txBody>
-          <a:bodyPr/>
+          <a:bodyPr>
+            <a:normAutofit fontScale="92500" lnSpcReduction="10000"/>
+          </a:bodyPr>
           <a:lstStyle/>
           <a:p>
             <a:r>
@@ -31373,7 +31474,7 @@
                   <a:schemeClr val="bg1"/>
                 </a:solidFill>
               </a:rPr>
-              <a:t>flex-wrap</a:t>
+              <a:t>justify-content</a:t>
             </a:r>
             <a:r>
               <a:rPr lang="en-US" dirty="0"/>
@@ -31381,7 +31482,7 @@
             </a:r>
             <a:r>
               <a:rPr lang="en-US" dirty="0" err="1"/>
-              <a:t>versucht</a:t>
+              <a:t>Wie</a:t>
             </a:r>
             <a:r>
               <a:rPr lang="en-US" dirty="0"/>
@@ -31389,15 +31490,39 @@
             </a:r>
             <a:r>
               <a:rPr lang="en-US" dirty="0" err="1"/>
-              <a:t>alle</a:t>
-            </a:r>
-            <a:r>
-              <a:rPr lang="en-US" dirty="0"/>
-              <a:t> Items in </a:t>
+              <a:t>wird</a:t>
+            </a:r>
+            <a:r>
+              <a:rPr lang="en-US" dirty="0"/>
+              <a:t> extra </a:t>
             </a:r>
             <a:r>
               <a:rPr lang="en-US" dirty="0" err="1"/>
-              <a:t>eine</a:t>
+              <a:t>freier</a:t>
+            </a:r>
+            <a:r>
+              <a:rPr lang="en-US" dirty="0"/>
+              <a:t> Platz </a:t>
+            </a:r>
+            <a:r>
+              <a:rPr lang="en-US" dirty="0" err="1"/>
+              <a:t>zwischen</a:t>
+            </a:r>
+            <a:r>
+              <a:rPr lang="en-US" dirty="0"/>
+              <a:t> den Items </a:t>
+            </a:r>
+            <a:r>
+              <a:rPr lang="en-US" dirty="0" err="1"/>
+              <a:t>entlang</a:t>
+            </a:r>
+            <a:r>
+              <a:rPr lang="en-US" dirty="0"/>
+              <a:t> der </a:t>
+            </a:r>
+            <a:r>
+              <a:rPr lang="en-US" b="1" dirty="0"/>
+              <a:t>main-axis</a:t>
             </a:r>
             <a:r>
               <a:rPr lang="en-US" dirty="0"/>
@@ -31405,47 +31530,24 @@
             </a:r>
             <a:r>
               <a:rPr lang="en-US" dirty="0" err="1"/>
-              <a:t>Zeile</a:t>
-            </a:r>
-            <a:r>
-              <a:rPr lang="en-US" dirty="0"/>
-              <a:t> </a:t>
-            </a:r>
-            <a:r>
-              <a:rPr lang="en-US" dirty="0" err="1"/>
-              <a:t>zu</a:t>
-            </a:r>
-            <a:r>
-              <a:rPr lang="en-US" dirty="0"/>
-              <a:t> </a:t>
-            </a:r>
-            <a:r>
-              <a:rPr lang="en-US" dirty="0" err="1"/>
-              <a:t>packen</a:t>
+              <a:t>verteilt</a:t>
+            </a:r>
+            <a:r>
+              <a:rPr lang="en-US" dirty="0"/>
+              <a:t>.</a:t>
             </a:r>
             <a:br>
               <a:rPr lang="en-US" dirty="0"/>
             </a:br>
+            <a:r>
+              <a:rPr lang="en-US" sz="1800" dirty="0">
+                <a:latin typeface="Arial" panose="020B0604020202020204" pitchFamily="34" charset="0"/>
+                <a:cs typeface="Arial" panose="020B0604020202020204" pitchFamily="34" charset="0"/>
+              </a:rPr>
+              <a:t>justify-content: flex-start | flex-end | center | space-between | space-around | space-evenly</a:t>
+            </a:r>
             <a:br>
-              <a:rPr lang="en-US" dirty="0"/>
-            </a:br>
-            <a:r>
-              <a:rPr lang="en-US" dirty="0"/>
-              <a:t>flex-wrap: </a:t>
-            </a:r>
-            <a:r>
-              <a:rPr lang="en-US" dirty="0" err="1"/>
-              <a:t>nowrap</a:t>
-            </a:r>
-            <a:r>
-              <a:rPr lang="en-US" dirty="0"/>
-              <a:t> | wrap | wrap-reverse</a:t>
-            </a:r>
-            <a:br>
-              <a:rPr lang="en-US" dirty="0"/>
-            </a:br>
-            <a:br>
-              <a:rPr lang="en-US" dirty="0"/>
+              <a:rPr lang="en-US" b="1" dirty="0"/>
             </a:br>
             <a:endParaRPr lang="en-US" dirty="0"/>
           </a:p>
@@ -31456,11 +31558,105 @@
                   <a:schemeClr val="bg1"/>
                 </a:solidFill>
               </a:rPr>
-              <a:t>flex-flow</a:t>
-            </a:r>
-            <a:r>
-              <a:rPr lang="en-US" dirty="0"/>
-              <a:t>:</a:t>
+              <a:t>align-items</a:t>
+            </a:r>
+            <a:r>
+              <a:rPr lang="en-US" b="1" dirty="0"/>
+              <a:t>: </a:t>
+            </a:r>
+            <a:r>
+              <a:rPr lang="en-US" dirty="0" err="1"/>
+              <a:t>Wie</a:t>
+            </a:r>
+            <a:r>
+              <a:rPr lang="en-US" dirty="0"/>
+              <a:t> </a:t>
+            </a:r>
+            <a:r>
+              <a:rPr lang="en-US" dirty="0" err="1"/>
+              <a:t>wird</a:t>
+            </a:r>
+            <a:r>
+              <a:rPr lang="en-US" dirty="0"/>
+              <a:t> extra </a:t>
+            </a:r>
+            <a:r>
+              <a:rPr lang="en-US" dirty="0" err="1"/>
+              <a:t>freier</a:t>
+            </a:r>
+            <a:r>
+              <a:rPr lang="en-US" dirty="0"/>
+              <a:t> Platz </a:t>
+            </a:r>
+            <a:r>
+              <a:rPr lang="en-US" dirty="0" err="1"/>
+              <a:t>zwischen</a:t>
+            </a:r>
+            <a:r>
+              <a:rPr lang="en-US" dirty="0"/>
+              <a:t> den Items </a:t>
+            </a:r>
+            <a:r>
+              <a:rPr lang="en-US" dirty="0" err="1"/>
+              <a:t>entlang</a:t>
+            </a:r>
+            <a:r>
+              <a:rPr lang="en-US" dirty="0"/>
+              <a:t> der </a:t>
+            </a:r>
+            <a:r>
+              <a:rPr lang="en-US" b="1" dirty="0"/>
+              <a:t>cross-axis</a:t>
+            </a:r>
+            <a:r>
+              <a:rPr lang="en-US" dirty="0"/>
+              <a:t> </a:t>
+            </a:r>
+            <a:r>
+              <a:rPr lang="en-US" dirty="0" err="1"/>
+              <a:t>verteilt</a:t>
+            </a:r>
+            <a:r>
+              <a:rPr lang="en-US" dirty="0"/>
+              <a:t>.</a:t>
+            </a:r>
+            <a:br>
+              <a:rPr lang="en-US" b="1" dirty="0"/>
+            </a:br>
+            <a:r>
+              <a:rPr lang="en-US" sz="1800" dirty="0">
+                <a:latin typeface="Arial" panose="020B0604020202020204" pitchFamily="34" charset="0"/>
+                <a:cs typeface="Arial" panose="020B0604020202020204" pitchFamily="34" charset="0"/>
+              </a:rPr>
+              <a:t>align-items: stretch | flex-start | flex-end | center | baseline</a:t>
+            </a:r>
+            <a:br>
+              <a:rPr lang="en-US" sz="1800" dirty="0">
+                <a:latin typeface="Arial" panose="020B0604020202020204" pitchFamily="34" charset="0"/>
+                <a:cs typeface="Arial" panose="020B0604020202020204" pitchFamily="34" charset="0"/>
+              </a:rPr>
+            </a:br>
+            <a:endParaRPr lang="en-US" sz="1800" dirty="0">
+              <a:latin typeface="Arial" panose="020B0604020202020204" pitchFamily="34" charset="0"/>
+              <a:cs typeface="Arial" panose="020B0604020202020204" pitchFamily="34" charset="0"/>
+            </a:endParaRPr>
+          </a:p>
+          <a:p>
+            <a:r>
+              <a:rPr lang="en-US" dirty="0">
+                <a:solidFill>
+                  <a:schemeClr val="bg1"/>
+                </a:solidFill>
+              </a:rPr>
+              <a:t>align-content</a:t>
+            </a:r>
+            <a:r>
+              <a:rPr lang="en-US" b="1" dirty="0"/>
+              <a:t>: </a:t>
+            </a:r>
+            <a:r>
+              <a:rPr lang="en-US" dirty="0" err="1"/>
+              <a:t>Kommt</a:t>
             </a:r>
             <a:r>
               <a:rPr lang="en-US" b="1" dirty="0"/>
@@ -31468,7 +31664,7 @@
             </a:r>
             <a:r>
               <a:rPr lang="en-US" dirty="0" err="1"/>
-              <a:t>ist</a:t>
+              <a:t>nur</a:t>
             </a:r>
             <a:r>
               <a:rPr lang="en-US" dirty="0"/>
@@ -31476,34 +31672,154 @@
             </a:r>
             <a:r>
               <a:rPr lang="en-US" dirty="0" err="1"/>
-              <a:t>ein</a:t>
-            </a:r>
-            <a:r>
-              <a:rPr lang="en-US" dirty="0"/>
-              <a:t> shorthand </a:t>
+              <a:t>zum</a:t>
+            </a:r>
+            <a:r>
+              <a:rPr lang="en-US" dirty="0"/>
+              <a:t> </a:t>
             </a:r>
             <a:r>
               <a:rPr lang="en-US" dirty="0" err="1"/>
-              <a:t>für</a:t>
-            </a:r>
-            <a:r>
-              <a:rPr lang="en-US" dirty="0"/>
-              <a:t> flex-direction und flex-wrap</a:t>
+              <a:t>tragen</a:t>
+            </a:r>
+            <a:r>
+              <a:rPr lang="en-US" dirty="0"/>
+              <a:t>, </a:t>
+            </a:r>
+            <a:r>
+              <a:rPr lang="en-US" dirty="0" err="1"/>
+              <a:t>wenn</a:t>
+            </a:r>
+            <a:r>
+              <a:rPr lang="en-US" dirty="0"/>
+              <a:t> </a:t>
+            </a:r>
+            <a:r>
+              <a:rPr lang="en-US" dirty="0" err="1"/>
+              <a:t>es</a:t>
+            </a:r>
+            <a:r>
+              <a:rPr lang="en-US" dirty="0"/>
+              <a:t> </a:t>
+            </a:r>
+            <a:r>
+              <a:rPr lang="en-US" dirty="0" err="1"/>
+              <a:t>mehr</a:t>
+            </a:r>
+            <a:r>
+              <a:rPr lang="en-US" dirty="0"/>
+              <a:t> </a:t>
+            </a:r>
+            <a:r>
+              <a:rPr lang="en-US" dirty="0" err="1"/>
+              <a:t>wie</a:t>
+            </a:r>
+            <a:r>
+              <a:rPr lang="en-US" dirty="0"/>
+              <a:t> </a:t>
+            </a:r>
+            <a:r>
+              <a:rPr lang="en-US" dirty="0" err="1"/>
+              <a:t>eine</a:t>
+            </a:r>
+            <a:r>
+              <a:rPr lang="en-US" dirty="0"/>
+              <a:t> </a:t>
+            </a:r>
+            <a:r>
+              <a:rPr lang="en-US" dirty="0" err="1"/>
+              <a:t>Zeile</a:t>
+            </a:r>
+            <a:r>
+              <a:rPr lang="en-US" dirty="0"/>
+              <a:t> Items hat. </a:t>
+            </a:r>
+            <a:r>
+              <a:rPr lang="en-US" dirty="0" err="1"/>
+              <a:t>Wie</a:t>
+            </a:r>
+            <a:r>
+              <a:rPr lang="en-US" dirty="0"/>
+              <a:t> </a:t>
+            </a:r>
+            <a:r>
+              <a:rPr lang="en-US" dirty="0" err="1"/>
+              <a:t>wird</a:t>
+            </a:r>
+            <a:r>
+              <a:rPr lang="en-US" dirty="0"/>
+              <a:t> extra </a:t>
+            </a:r>
+            <a:r>
+              <a:rPr lang="en-US" dirty="0" err="1"/>
+              <a:t>freier</a:t>
+            </a:r>
+            <a:r>
+              <a:rPr lang="en-US" dirty="0"/>
+              <a:t> Platz </a:t>
+            </a:r>
+            <a:r>
+              <a:rPr lang="en-US" dirty="0" err="1"/>
+              <a:t>entlang</a:t>
+            </a:r>
+            <a:r>
+              <a:rPr lang="en-US" dirty="0"/>
+              <a:t> der </a:t>
+            </a:r>
+            <a:r>
+              <a:rPr lang="en-US" b="1" dirty="0"/>
+              <a:t>cross-axis</a:t>
+            </a:r>
+            <a:r>
+              <a:rPr lang="en-US" dirty="0"/>
+              <a:t> </a:t>
+            </a:r>
+            <a:r>
+              <a:rPr lang="en-US" dirty="0" err="1"/>
+              <a:t>zwischen</a:t>
+            </a:r>
+            <a:r>
+              <a:rPr lang="en-US" dirty="0"/>
+              <a:t> den </a:t>
+            </a:r>
+            <a:r>
+              <a:rPr lang="en-US" dirty="0" err="1"/>
+              <a:t>Zeilen</a:t>
+            </a:r>
+            <a:r>
+              <a:rPr lang="en-US" dirty="0"/>
+              <a:t> </a:t>
+            </a:r>
+            <a:r>
+              <a:rPr lang="en-US" dirty="0" err="1"/>
+              <a:t>verteilt</a:t>
+            </a:r>
+            <a:r>
+              <a:rPr lang="en-US" dirty="0"/>
+              <a:t>.</a:t>
             </a:r>
             <a:br>
-              <a:rPr lang="en-US" dirty="0"/>
+              <a:rPr lang="en-US" b="1" dirty="0"/>
             </a:br>
+            <a:r>
+              <a:rPr lang="en-US" sz="1800" dirty="0">
+                <a:latin typeface="Arial" panose="020B0604020202020204" pitchFamily="34" charset="0"/>
+                <a:cs typeface="Arial" panose="020B0604020202020204" pitchFamily="34" charset="0"/>
+              </a:rPr>
+              <a:t>align-content: stretch | flex-start | flex-end | center | space-between | space-around</a:t>
+            </a:r>
             <a:br>
-              <a:rPr lang="en-US" dirty="0"/>
+              <a:rPr lang="en-US" sz="1800" b="1" dirty="0">
+                <a:latin typeface="Arial" panose="020B0604020202020204" pitchFamily="34" charset="0"/>
+                <a:cs typeface="Arial" panose="020B0604020202020204" pitchFamily="34" charset="0"/>
+              </a:rPr>
             </a:br>
-            <a:r>
-              <a:rPr lang="en-US" dirty="0"/>
-              <a:t>flex-flow: row </a:t>
-            </a:r>
-            <a:r>
-              <a:rPr lang="en-US" dirty="0" err="1"/>
-              <a:t>nowrap</a:t>
-            </a:r>
+            <a:endParaRPr lang="en-US" sz="1800" dirty="0">
+              <a:latin typeface="Arial" panose="020B0604020202020204" pitchFamily="34" charset="0"/>
+              <a:cs typeface="Arial" panose="020B0604020202020204" pitchFamily="34" charset="0"/>
+            </a:endParaRPr>
+          </a:p>
+          <a:p>
             <a:endParaRPr lang="en-US" dirty="0"/>
           </a:p>
         </p:txBody>
@@ -31511,7 +31827,7 @@
     </p:spTree>
     <p:extLst>
       <p:ext uri="{BB962C8B-B14F-4D97-AF65-F5344CB8AC3E}">
-        <p14:creationId xmlns:p14="http://schemas.microsoft.com/office/powerpoint/2010/main" val="1777042083"/>
+        <p14:creationId xmlns:p14="http://schemas.microsoft.com/office/powerpoint/2010/main" val="2970264264"/>
       </p:ext>
     </p:extLst>
   </p:cSld>
@@ -31992,448 +32308,6 @@
           <p:cNvPr id="2" name="Title 1">
             <a:extLst>
               <a:ext uri="{FF2B5EF4-FFF2-40B4-BE49-F238E27FC236}">
-                <a16:creationId xmlns:a16="http://schemas.microsoft.com/office/drawing/2014/main" id="{2B2CD961-5709-C241-A54E-238F4D05CD7C}"/>
-              </a:ext>
-            </a:extLst>
-          </p:cNvPr>
-          <p:cNvSpPr>
-            <a:spLocks noGrp="1"/>
-          </p:cNvSpPr>
-          <p:nvPr>
-            <p:ph type="title"/>
-          </p:nvPr>
-        </p:nvSpPr>
-        <p:spPr>
-          <a:xfrm>
-            <a:off x="680321" y="753228"/>
-            <a:ext cx="9613861" cy="1080938"/>
-          </a:xfrm>
-        </p:spPr>
-        <p:txBody>
-          <a:bodyPr/>
-          <a:lstStyle/>
-          <a:p>
-            <a:r>
-              <a:rPr lang="en-US" dirty="0"/>
-              <a:t>Flexbox: Container Properties</a:t>
-            </a:r>
-          </a:p>
-        </p:txBody>
-      </p:sp>
-      <p:sp>
-        <p:nvSpPr>
-          <p:cNvPr id="3" name="Content Placeholder 2">
-            <a:extLst>
-              <a:ext uri="{FF2B5EF4-FFF2-40B4-BE49-F238E27FC236}">
-                <a16:creationId xmlns:a16="http://schemas.microsoft.com/office/drawing/2014/main" id="{A3D67316-99A5-E94E-A390-438B2046BAF7}"/>
-              </a:ext>
-            </a:extLst>
-          </p:cNvPr>
-          <p:cNvSpPr>
-            <a:spLocks noGrp="1"/>
-          </p:cNvSpPr>
-          <p:nvPr>
-            <p:ph idx="1"/>
-          </p:nvPr>
-        </p:nvSpPr>
-        <p:spPr/>
-        <p:txBody>
-          <a:bodyPr>
-            <a:normAutofit fontScale="92500" lnSpcReduction="10000"/>
-          </a:bodyPr>
-          <a:lstStyle/>
-          <a:p>
-            <a:r>
-              <a:rPr lang="en-US" dirty="0">
-                <a:solidFill>
-                  <a:schemeClr val="bg1"/>
-                </a:solidFill>
-              </a:rPr>
-              <a:t>justify-content</a:t>
-            </a:r>
-            <a:r>
-              <a:rPr lang="en-US" dirty="0"/>
-              <a:t>: </a:t>
-            </a:r>
-            <a:r>
-              <a:rPr lang="en-US" dirty="0" err="1"/>
-              <a:t>Wie</a:t>
-            </a:r>
-            <a:r>
-              <a:rPr lang="en-US" dirty="0"/>
-              <a:t> </a:t>
-            </a:r>
-            <a:r>
-              <a:rPr lang="en-US" dirty="0" err="1"/>
-              <a:t>wird</a:t>
-            </a:r>
-            <a:r>
-              <a:rPr lang="en-US" dirty="0"/>
-              <a:t> extra </a:t>
-            </a:r>
-            <a:r>
-              <a:rPr lang="en-US" dirty="0" err="1"/>
-              <a:t>freier</a:t>
-            </a:r>
-            <a:r>
-              <a:rPr lang="en-US" dirty="0"/>
-              <a:t> Platz </a:t>
-            </a:r>
-            <a:r>
-              <a:rPr lang="en-US" dirty="0" err="1"/>
-              <a:t>zwischen</a:t>
-            </a:r>
-            <a:r>
-              <a:rPr lang="en-US" dirty="0"/>
-              <a:t> den Items </a:t>
-            </a:r>
-            <a:r>
-              <a:rPr lang="en-US" dirty="0" err="1"/>
-              <a:t>entlang</a:t>
-            </a:r>
-            <a:r>
-              <a:rPr lang="en-US" dirty="0"/>
-              <a:t> der </a:t>
-            </a:r>
-            <a:r>
-              <a:rPr lang="en-US" b="1" dirty="0"/>
-              <a:t>main-axis</a:t>
-            </a:r>
-            <a:r>
-              <a:rPr lang="en-US" dirty="0"/>
-              <a:t> </a:t>
-            </a:r>
-            <a:r>
-              <a:rPr lang="en-US" dirty="0" err="1"/>
-              <a:t>verteilt</a:t>
-            </a:r>
-            <a:r>
-              <a:rPr lang="en-US" dirty="0"/>
-              <a:t>.</a:t>
-            </a:r>
-            <a:br>
-              <a:rPr lang="en-US" dirty="0"/>
-            </a:br>
-            <a:r>
-              <a:rPr lang="en-US" sz="1800" dirty="0">
-                <a:latin typeface="Arial" panose="020B0604020202020204" pitchFamily="34" charset="0"/>
-                <a:cs typeface="Arial" panose="020B0604020202020204" pitchFamily="34" charset="0"/>
-              </a:rPr>
-              <a:t>justify-content: flex-start | flex-end | center | space-between | space-around | space-evenly</a:t>
-            </a:r>
-            <a:br>
-              <a:rPr lang="en-US" b="1" dirty="0"/>
-            </a:br>
-            <a:endParaRPr lang="en-US" dirty="0"/>
-          </a:p>
-          <a:p>
-            <a:r>
-              <a:rPr lang="en-US" dirty="0">
-                <a:solidFill>
-                  <a:schemeClr val="bg1"/>
-                </a:solidFill>
-              </a:rPr>
-              <a:t>align-items</a:t>
-            </a:r>
-            <a:r>
-              <a:rPr lang="en-US" b="1" dirty="0"/>
-              <a:t>: </a:t>
-            </a:r>
-            <a:r>
-              <a:rPr lang="en-US" dirty="0" err="1"/>
-              <a:t>Wie</a:t>
-            </a:r>
-            <a:r>
-              <a:rPr lang="en-US" dirty="0"/>
-              <a:t> </a:t>
-            </a:r>
-            <a:r>
-              <a:rPr lang="en-US" dirty="0" err="1"/>
-              <a:t>wird</a:t>
-            </a:r>
-            <a:r>
-              <a:rPr lang="en-US" dirty="0"/>
-              <a:t> extra </a:t>
-            </a:r>
-            <a:r>
-              <a:rPr lang="en-US" dirty="0" err="1"/>
-              <a:t>freier</a:t>
-            </a:r>
-            <a:r>
-              <a:rPr lang="en-US" dirty="0"/>
-              <a:t> Platz </a:t>
-            </a:r>
-            <a:r>
-              <a:rPr lang="en-US" dirty="0" err="1"/>
-              <a:t>zwischen</a:t>
-            </a:r>
-            <a:r>
-              <a:rPr lang="en-US" dirty="0"/>
-              <a:t> den Items </a:t>
-            </a:r>
-            <a:r>
-              <a:rPr lang="en-US" dirty="0" err="1"/>
-              <a:t>entlang</a:t>
-            </a:r>
-            <a:r>
-              <a:rPr lang="en-US" dirty="0"/>
-              <a:t> der </a:t>
-            </a:r>
-            <a:r>
-              <a:rPr lang="en-US" b="1" dirty="0"/>
-              <a:t>cross-axis</a:t>
-            </a:r>
-            <a:r>
-              <a:rPr lang="en-US" dirty="0"/>
-              <a:t> </a:t>
-            </a:r>
-            <a:r>
-              <a:rPr lang="en-US" dirty="0" err="1"/>
-              <a:t>verteilt</a:t>
-            </a:r>
-            <a:r>
-              <a:rPr lang="en-US" dirty="0"/>
-              <a:t>.</a:t>
-            </a:r>
-            <a:br>
-              <a:rPr lang="en-US" b="1" dirty="0"/>
-            </a:br>
-            <a:r>
-              <a:rPr lang="en-US" sz="1800" dirty="0">
-                <a:latin typeface="Arial" panose="020B0604020202020204" pitchFamily="34" charset="0"/>
-                <a:cs typeface="Arial" panose="020B0604020202020204" pitchFamily="34" charset="0"/>
-              </a:rPr>
-              <a:t>align-items: stretch | flex-start | flex-end | center | baseline</a:t>
-            </a:r>
-            <a:br>
-              <a:rPr lang="en-US" sz="1800" dirty="0">
-                <a:latin typeface="Arial" panose="020B0604020202020204" pitchFamily="34" charset="0"/>
-                <a:cs typeface="Arial" panose="020B0604020202020204" pitchFamily="34" charset="0"/>
-              </a:rPr>
-            </a:br>
-            <a:endParaRPr lang="en-US" sz="1800" dirty="0">
-              <a:latin typeface="Arial" panose="020B0604020202020204" pitchFamily="34" charset="0"/>
-              <a:cs typeface="Arial" panose="020B0604020202020204" pitchFamily="34" charset="0"/>
-            </a:endParaRPr>
-          </a:p>
-          <a:p>
-            <a:r>
-              <a:rPr lang="en-US" dirty="0">
-                <a:solidFill>
-                  <a:schemeClr val="bg1"/>
-                </a:solidFill>
-              </a:rPr>
-              <a:t>align-content</a:t>
-            </a:r>
-            <a:r>
-              <a:rPr lang="en-US" b="1" dirty="0"/>
-              <a:t>: </a:t>
-            </a:r>
-            <a:r>
-              <a:rPr lang="en-US" dirty="0" err="1"/>
-              <a:t>Kommt</a:t>
-            </a:r>
-            <a:r>
-              <a:rPr lang="en-US" b="1" dirty="0"/>
-              <a:t> </a:t>
-            </a:r>
-            <a:r>
-              <a:rPr lang="en-US" dirty="0" err="1"/>
-              <a:t>nur</a:t>
-            </a:r>
-            <a:r>
-              <a:rPr lang="en-US" dirty="0"/>
-              <a:t> </a:t>
-            </a:r>
-            <a:r>
-              <a:rPr lang="en-US" dirty="0" err="1"/>
-              <a:t>zum</a:t>
-            </a:r>
-            <a:r>
-              <a:rPr lang="en-US" dirty="0"/>
-              <a:t> </a:t>
-            </a:r>
-            <a:r>
-              <a:rPr lang="en-US" dirty="0" err="1"/>
-              <a:t>tragen</a:t>
-            </a:r>
-            <a:r>
-              <a:rPr lang="en-US" dirty="0"/>
-              <a:t>, </a:t>
-            </a:r>
-            <a:r>
-              <a:rPr lang="en-US" dirty="0" err="1"/>
-              <a:t>wenn</a:t>
-            </a:r>
-            <a:r>
-              <a:rPr lang="en-US" dirty="0"/>
-              <a:t> </a:t>
-            </a:r>
-            <a:r>
-              <a:rPr lang="en-US" dirty="0" err="1"/>
-              <a:t>es</a:t>
-            </a:r>
-            <a:r>
-              <a:rPr lang="en-US" dirty="0"/>
-              <a:t> </a:t>
-            </a:r>
-            <a:r>
-              <a:rPr lang="en-US" dirty="0" err="1"/>
-              <a:t>mehr</a:t>
-            </a:r>
-            <a:r>
-              <a:rPr lang="en-US" dirty="0"/>
-              <a:t> </a:t>
-            </a:r>
-            <a:r>
-              <a:rPr lang="en-US" dirty="0" err="1"/>
-              <a:t>wie</a:t>
-            </a:r>
-            <a:r>
-              <a:rPr lang="en-US" dirty="0"/>
-              <a:t> </a:t>
-            </a:r>
-            <a:r>
-              <a:rPr lang="en-US" dirty="0" err="1"/>
-              <a:t>eine</a:t>
-            </a:r>
-            <a:r>
-              <a:rPr lang="en-US" dirty="0"/>
-              <a:t> </a:t>
-            </a:r>
-            <a:r>
-              <a:rPr lang="en-US" dirty="0" err="1"/>
-              <a:t>Zeile</a:t>
-            </a:r>
-            <a:r>
-              <a:rPr lang="en-US" dirty="0"/>
-              <a:t> Items hat. </a:t>
-            </a:r>
-            <a:r>
-              <a:rPr lang="en-US" dirty="0" err="1"/>
-              <a:t>Wie</a:t>
-            </a:r>
-            <a:r>
-              <a:rPr lang="en-US" dirty="0"/>
-              <a:t> </a:t>
-            </a:r>
-            <a:r>
-              <a:rPr lang="en-US" dirty="0" err="1"/>
-              <a:t>wird</a:t>
-            </a:r>
-            <a:r>
-              <a:rPr lang="en-US" dirty="0"/>
-              <a:t> extra </a:t>
-            </a:r>
-            <a:r>
-              <a:rPr lang="en-US" dirty="0" err="1"/>
-              <a:t>freier</a:t>
-            </a:r>
-            <a:r>
-              <a:rPr lang="en-US" dirty="0"/>
-              <a:t> Platz </a:t>
-            </a:r>
-            <a:r>
-              <a:rPr lang="en-US" dirty="0" err="1"/>
-              <a:t>entlang</a:t>
-            </a:r>
-            <a:r>
-              <a:rPr lang="en-US" dirty="0"/>
-              <a:t> der </a:t>
-            </a:r>
-            <a:r>
-              <a:rPr lang="en-US" b="1" dirty="0"/>
-              <a:t>cross-axis</a:t>
-            </a:r>
-            <a:r>
-              <a:rPr lang="en-US" dirty="0"/>
-              <a:t> </a:t>
-            </a:r>
-            <a:r>
-              <a:rPr lang="en-US" dirty="0" err="1"/>
-              <a:t>zwischen</a:t>
-            </a:r>
-            <a:r>
-              <a:rPr lang="en-US" dirty="0"/>
-              <a:t> den </a:t>
-            </a:r>
-            <a:r>
-              <a:rPr lang="en-US" dirty="0" err="1"/>
-              <a:t>Zeilen</a:t>
-            </a:r>
-            <a:r>
-              <a:rPr lang="en-US" dirty="0"/>
-              <a:t> </a:t>
-            </a:r>
-            <a:r>
-              <a:rPr lang="en-US" dirty="0" err="1"/>
-              <a:t>verteilt</a:t>
-            </a:r>
-            <a:r>
-              <a:rPr lang="en-US" dirty="0"/>
-              <a:t>.</a:t>
-            </a:r>
-            <a:br>
-              <a:rPr lang="en-US" b="1" dirty="0"/>
-            </a:br>
-            <a:r>
-              <a:rPr lang="en-US" sz="1800" dirty="0">
-                <a:latin typeface="Arial" panose="020B0604020202020204" pitchFamily="34" charset="0"/>
-                <a:cs typeface="Arial" panose="020B0604020202020204" pitchFamily="34" charset="0"/>
-              </a:rPr>
-              <a:t>align-content: stretch | flex-start | flex-end | center | space-between | space-around</a:t>
-            </a:r>
-            <a:br>
-              <a:rPr lang="en-US" sz="1800" b="1" dirty="0">
-                <a:latin typeface="Arial" panose="020B0604020202020204" pitchFamily="34" charset="0"/>
-                <a:cs typeface="Arial" panose="020B0604020202020204" pitchFamily="34" charset="0"/>
-              </a:rPr>
-            </a:br>
-            <a:endParaRPr lang="en-US" sz="1800" dirty="0">
-              <a:latin typeface="Arial" panose="020B0604020202020204" pitchFamily="34" charset="0"/>
-              <a:cs typeface="Arial" panose="020B0604020202020204" pitchFamily="34" charset="0"/>
-            </a:endParaRPr>
-          </a:p>
-          <a:p>
-            <a:endParaRPr lang="en-US" dirty="0"/>
-          </a:p>
-        </p:txBody>
-      </p:sp>
-    </p:spTree>
-    <p:extLst>
-      <p:ext uri="{BB962C8B-B14F-4D97-AF65-F5344CB8AC3E}">
-        <p14:creationId xmlns:p14="http://schemas.microsoft.com/office/powerpoint/2010/main" val="2970264264"/>
-      </p:ext>
-    </p:extLst>
-  </p:cSld>
-  <p:clrMapOvr>
-    <a:masterClrMapping/>
-  </p:clrMapOvr>
-</p:sld>
-</file>
-
-<file path=ppt/slides/slide91.xml><?xml version="1.0" encoding="utf-8"?>
-<p:sld xmlns:a="http://schemas.openxmlformats.org/drawingml/2006/main" xmlns:r="http://schemas.openxmlformats.org/officeDocument/2006/relationships" xmlns:p="http://schemas.openxmlformats.org/presentationml/2006/main">
-  <p:cSld>
-    <p:spTree>
-      <p:nvGrpSpPr>
-        <p:cNvPr id="1" name=""/>
-        <p:cNvGrpSpPr/>
-        <p:nvPr/>
-      </p:nvGrpSpPr>
-      <p:grpSpPr>
-        <a:xfrm>
-          <a:off x="0" y="0"/>
-          <a:ext cx="0" cy="0"/>
-          <a:chOff x="0" y="0"/>
-          <a:chExt cx="0" cy="0"/>
-        </a:xfrm>
-      </p:grpSpPr>
-      <p:sp>
-        <p:nvSpPr>
-          <p:cNvPr id="2" name="Title 1">
-            <a:extLst>
-              <a:ext uri="{FF2B5EF4-FFF2-40B4-BE49-F238E27FC236}">
                 <a16:creationId xmlns:a16="http://schemas.microsoft.com/office/drawing/2014/main" id="{51E96799-DB13-104C-822A-E2CBCB6F4EA1}"/>
               </a:ext>
             </a:extLst>
@@ -32674,7 +32548,7 @@
 </p:sld>
 </file>
 
-<file path=ppt/slides/slide92.xml><?xml version="1.0" encoding="utf-8"?>
+<file path=ppt/slides/slide91.xml><?xml version="1.0" encoding="utf-8"?>
 <p:sld xmlns:a="http://schemas.openxmlformats.org/drawingml/2006/main" xmlns:r="http://schemas.openxmlformats.org/officeDocument/2006/relationships" xmlns:p="http://schemas.openxmlformats.org/presentationml/2006/main">
   <p:cSld>
     <p:spTree>
@@ -33009,7 +32883,7 @@
 </p:sld>
 </file>
 
-<file path=ppt/slides/slide93.xml><?xml version="1.0" encoding="utf-8"?>
+<file path=ppt/slides/slide92.xml><?xml version="1.0" encoding="utf-8"?>
 <p:sld xmlns:a="http://schemas.openxmlformats.org/drawingml/2006/main" xmlns:r="http://schemas.openxmlformats.org/officeDocument/2006/relationships" xmlns:p="http://schemas.openxmlformats.org/presentationml/2006/main">
   <p:cSld>
     <p:spTree>
@@ -33117,7 +32991,7 @@
 </p:sld>
 </file>
 
-<file path=ppt/slides/slide94.xml><?xml version="1.0" encoding="utf-8"?>
+<file path=ppt/slides/slide93.xml><?xml version="1.0" encoding="utf-8"?>
 <p:sld xmlns:a="http://schemas.openxmlformats.org/drawingml/2006/main" xmlns:r="http://schemas.openxmlformats.org/officeDocument/2006/relationships" xmlns:p="http://schemas.openxmlformats.org/presentationml/2006/main">
   <p:cSld>
     <p:spTree>
@@ -33454,7 +33328,7 @@
 </p:sld>
 </file>
 
-<file path=ppt/slides/slide95.xml><?xml version="1.0" encoding="utf-8"?>
+<file path=ppt/slides/slide94.xml><?xml version="1.0" encoding="utf-8"?>
 <p:sld xmlns:a="http://schemas.openxmlformats.org/drawingml/2006/main" xmlns:r="http://schemas.openxmlformats.org/officeDocument/2006/relationships" xmlns:p="http://schemas.openxmlformats.org/presentationml/2006/main">
   <p:cSld>
     <p:spTree>
@@ -33610,7 +33484,7 @@
 </p:sld>
 </file>
 
-<file path=ppt/slides/slide96.xml><?xml version="1.0" encoding="utf-8"?>
+<file path=ppt/slides/slide95.xml><?xml version="1.0" encoding="utf-8"?>
 <p:sld xmlns:a="http://schemas.openxmlformats.org/drawingml/2006/main" xmlns:r="http://schemas.openxmlformats.org/officeDocument/2006/relationships" xmlns:p="http://schemas.openxmlformats.org/presentationml/2006/main">
   <p:cSld>
     <p:spTree>
@@ -33790,6 +33664,192 @@
 </p:sld>
 </file>
 
+<file path=ppt/slides/slide96.xml><?xml version="1.0" encoding="utf-8"?>
+<p:sld xmlns:a="http://schemas.openxmlformats.org/drawingml/2006/main" xmlns:r="http://schemas.openxmlformats.org/officeDocument/2006/relationships" xmlns:p="http://schemas.openxmlformats.org/presentationml/2006/main">
+  <p:cSld>
+    <p:spTree>
+      <p:nvGrpSpPr>
+        <p:cNvPr id="1" name=""/>
+        <p:cNvGrpSpPr/>
+        <p:nvPr/>
+      </p:nvGrpSpPr>
+      <p:grpSpPr>
+        <a:xfrm>
+          <a:off x="0" y="0"/>
+          <a:ext cx="0" cy="0"/>
+          <a:chOff x="0" y="0"/>
+          <a:chExt cx="0" cy="0"/>
+        </a:xfrm>
+      </p:grpSpPr>
+      <p:sp>
+        <p:nvSpPr>
+          <p:cNvPr id="2" name="Title 1">
+            <a:extLst>
+              <a:ext uri="{FF2B5EF4-FFF2-40B4-BE49-F238E27FC236}">
+                <a16:creationId xmlns:a16="http://schemas.microsoft.com/office/drawing/2014/main" id="{CB8A9F7C-4BB9-BC47-BA48-609B597702FB}"/>
+              </a:ext>
+            </a:extLst>
+          </p:cNvPr>
+          <p:cNvSpPr>
+            <a:spLocks noGrp="1"/>
+          </p:cNvSpPr>
+          <p:nvPr>
+            <p:ph type="title"/>
+          </p:nvPr>
+        </p:nvSpPr>
+        <p:spPr/>
+        <p:txBody>
+          <a:bodyPr/>
+          <a:lstStyle/>
+          <a:p>
+            <a:r>
+              <a:rPr lang="en-US" dirty="0" err="1"/>
+              <a:t>Übung</a:t>
+            </a:r>
+            <a:r>
+              <a:rPr lang="en-US" dirty="0"/>
+              <a:t> </a:t>
+            </a:r>
+          </a:p>
+        </p:txBody>
+      </p:sp>
+      <p:sp>
+        <p:nvSpPr>
+          <p:cNvPr id="3" name="Content Placeholder 2">
+            <a:extLst>
+              <a:ext uri="{FF2B5EF4-FFF2-40B4-BE49-F238E27FC236}">
+                <a16:creationId xmlns:a16="http://schemas.microsoft.com/office/drawing/2014/main" id="{BFF94DDA-1D44-4F4C-9D8E-7A74AC7A6D96}"/>
+              </a:ext>
+            </a:extLst>
+          </p:cNvPr>
+          <p:cNvSpPr>
+            <a:spLocks noGrp="1"/>
+          </p:cNvSpPr>
+          <p:nvPr>
+            <p:ph idx="1"/>
+          </p:nvPr>
+        </p:nvSpPr>
+        <p:spPr/>
+        <p:txBody>
+          <a:bodyPr/>
+          <a:lstStyle/>
+          <a:p>
+            <a:r>
+              <a:rPr lang="en-US" dirty="0" err="1"/>
+              <a:t>Baue</a:t>
+            </a:r>
+            <a:r>
+              <a:rPr lang="en-US" dirty="0"/>
+              <a:t> in </a:t>
+            </a:r>
+            <a:r>
+              <a:rPr lang="en-US" dirty="0" err="1"/>
+              <a:t>dein</a:t>
+            </a:r>
+            <a:r>
+              <a:rPr lang="en-US" dirty="0"/>
+              <a:t> Holy Grail Layout </a:t>
+            </a:r>
+            <a:r>
+              <a:rPr lang="en-US" dirty="0" err="1"/>
+              <a:t>noch</a:t>
+            </a:r>
+            <a:r>
+              <a:rPr lang="en-US" dirty="0"/>
+              <a:t> </a:t>
+            </a:r>
+            <a:r>
+              <a:rPr lang="en-US" dirty="0" err="1"/>
+              <a:t>einen</a:t>
+            </a:r>
+            <a:r>
+              <a:rPr lang="en-US" dirty="0"/>
+              <a:t> Sticky Footer </a:t>
+            </a:r>
+            <a:r>
+              <a:rPr lang="en-US" dirty="0" err="1"/>
+              <a:t>ein</a:t>
+            </a:r>
+            <a:r>
+              <a:rPr lang="en-US" dirty="0"/>
+              <a:t>…</a:t>
+            </a:r>
+          </a:p>
+        </p:txBody>
+      </p:sp>
+      <p:pic>
+        <p:nvPicPr>
+          <p:cNvPr id="5" name="Picture 4">
+            <a:extLst>
+              <a:ext uri="{FF2B5EF4-FFF2-40B4-BE49-F238E27FC236}">
+                <a16:creationId xmlns:a16="http://schemas.microsoft.com/office/drawing/2014/main" id="{70C1703C-C921-974C-977A-E4CA2DF17DDE}"/>
+              </a:ext>
+            </a:extLst>
+          </p:cNvPr>
+          <p:cNvPicPr>
+            <a:picLocks noChangeAspect="1"/>
+          </p:cNvPicPr>
+          <p:nvPr/>
+        </p:nvPicPr>
+        <p:blipFill>
+          <a:blip r:embed="rId2"/>
+          <a:stretch>
+            <a:fillRect/>
+          </a:stretch>
+        </p:blipFill>
+        <p:spPr>
+          <a:xfrm>
+            <a:off x="975211" y="3181436"/>
+            <a:ext cx="4825899" cy="1926012"/>
+          </a:xfrm>
+          <a:prstGeom prst="rect">
+            <a:avLst/>
+          </a:prstGeom>
+        </p:spPr>
+      </p:pic>
+      <p:pic>
+        <p:nvPicPr>
+          <p:cNvPr id="7" name="Picture 6">
+            <a:extLst>
+              <a:ext uri="{FF2B5EF4-FFF2-40B4-BE49-F238E27FC236}">
+                <a16:creationId xmlns:a16="http://schemas.microsoft.com/office/drawing/2014/main" id="{68959DD5-1A90-9848-98CA-2CC52FC2CE4D}"/>
+              </a:ext>
+            </a:extLst>
+          </p:cNvPr>
+          <p:cNvPicPr>
+            <a:picLocks noChangeAspect="1"/>
+          </p:cNvPicPr>
+          <p:nvPr/>
+        </p:nvPicPr>
+        <p:blipFill>
+          <a:blip r:embed="rId3"/>
+          <a:stretch>
+            <a:fillRect/>
+          </a:stretch>
+        </p:blipFill>
+        <p:spPr>
+          <a:xfrm>
+            <a:off x="6096000" y="3181436"/>
+            <a:ext cx="4828384" cy="3210339"/>
+          </a:xfrm>
+          <a:prstGeom prst="rect">
+            <a:avLst/>
+          </a:prstGeom>
+        </p:spPr>
+      </p:pic>
+    </p:spTree>
+    <p:extLst>
+      <p:ext uri="{BB962C8B-B14F-4D97-AF65-F5344CB8AC3E}">
+        <p14:creationId xmlns:p14="http://schemas.microsoft.com/office/powerpoint/2010/main" val="3885824606"/>
+      </p:ext>
+    </p:extLst>
+  </p:cSld>
+  <p:clrMapOvr>
+    <a:masterClrMapping/>
+  </p:clrMapOvr>
+</p:sld>
+</file>
+
 <file path=ppt/slides/slide97.xml><?xml version="1.0" encoding="utf-8"?>
 <p:sld xmlns:a="http://schemas.openxmlformats.org/drawingml/2006/main" xmlns:r="http://schemas.openxmlformats.org/officeDocument/2006/relationships" xmlns:p="http://schemas.openxmlformats.org/presentationml/2006/main">
   <p:cSld>
@@ -33812,7 +33872,7 @@
           <p:cNvPr id="2" name="Title 1">
             <a:extLst>
               <a:ext uri="{FF2B5EF4-FFF2-40B4-BE49-F238E27FC236}">
-                <a16:creationId xmlns:a16="http://schemas.microsoft.com/office/drawing/2014/main" id="{CB8A9F7C-4BB9-BC47-BA48-609B597702FB}"/>
+                <a16:creationId xmlns:a16="http://schemas.microsoft.com/office/drawing/2014/main" id="{1C8FE3EA-1A3D-8A49-AC2C-770BA1DACB0E}"/>
               </a:ext>
             </a:extLst>
           </p:cNvPr>
@@ -33832,10 +33892,7 @@
               <a:rPr lang="en-US" dirty="0" err="1"/>
               <a:t>Übung</a:t>
             </a:r>
-            <a:r>
-              <a:rPr lang="en-US" dirty="0"/>
-              <a:t> </a:t>
-            </a:r>
+            <a:endParaRPr lang="en-US" dirty="0"/>
           </a:p>
         </p:txBody>
       </p:sp>
@@ -33844,7 +33901,7 @@
           <p:cNvPr id="3" name="Content Placeholder 2">
             <a:extLst>
               <a:ext uri="{FF2B5EF4-FFF2-40B4-BE49-F238E27FC236}">
-                <a16:creationId xmlns:a16="http://schemas.microsoft.com/office/drawing/2014/main" id="{BFF94DDA-1D44-4F4C-9D8E-7A74AC7A6D96}"/>
+                <a16:creationId xmlns:a16="http://schemas.microsoft.com/office/drawing/2014/main" id="{3803A64D-B6ED-1744-B637-0586E7D0772A}"/>
               </a:ext>
             </a:extLst>
           </p:cNvPr>
@@ -33862,23 +33919,23 @@
           <a:p>
             <a:r>
               <a:rPr lang="en-US" dirty="0" err="1"/>
-              <a:t>Baue</a:t>
-            </a:r>
-            <a:r>
-              <a:rPr lang="en-US" dirty="0"/>
-              <a:t> in </a:t>
+              <a:t>Formular</a:t>
+            </a:r>
+            <a:r>
+              <a:rPr lang="en-US" dirty="0"/>
+              <a:t> </a:t>
             </a:r>
             <a:r>
               <a:rPr lang="en-US" dirty="0" err="1"/>
-              <a:t>dein</a:t>
-            </a:r>
-            <a:r>
-              <a:rPr lang="en-US" dirty="0"/>
-              <a:t> Holy Grail Layout </a:t>
+              <a:t>stylen</a:t>
+            </a:r>
+            <a:r>
+              <a:rPr lang="en-US" dirty="0"/>
+              <a:t> </a:t>
             </a:r>
             <a:r>
               <a:rPr lang="en-US" dirty="0" err="1"/>
-              <a:t>noch</a:t>
+              <a:t>mit</a:t>
             </a:r>
             <a:r>
               <a:rPr lang="en-US" dirty="0"/>
@@ -33886,28 +33943,65 @@
             </a:r>
             <a:r>
               <a:rPr lang="en-US" dirty="0" err="1"/>
-              <a:t>einen</a:t>
-            </a:r>
-            <a:r>
-              <a:rPr lang="en-US" dirty="0"/>
-              <a:t> Sticky Footer </a:t>
+              <a:t>dem</a:t>
+            </a:r>
+            <a:r>
+              <a:rPr lang="en-US" dirty="0"/>
+              <a:t> </a:t>
             </a:r>
             <a:r>
               <a:rPr lang="en-US" dirty="0" err="1"/>
-              <a:t>ein</a:t>
-            </a:r>
-            <a:r>
-              <a:rPr lang="en-US"/>
-              <a:t>…</a:t>
-            </a:r>
-            <a:endParaRPr lang="en-US" dirty="0"/>
-          </a:p>
-        </p:txBody>
-      </p:sp>
+              <a:t>Wissen</a:t>
+            </a:r>
+            <a:r>
+              <a:rPr lang="en-US" dirty="0"/>
+              <a:t>, was du </a:t>
+            </a:r>
+            <a:r>
+              <a:rPr lang="en-US" dirty="0" err="1"/>
+              <a:t>inzwischen</a:t>
+            </a:r>
+            <a:r>
+              <a:rPr lang="en-US" dirty="0"/>
+              <a:t> hast…</a:t>
+            </a:r>
+          </a:p>
+        </p:txBody>
+      </p:sp>
+      <p:pic>
+        <p:nvPicPr>
+          <p:cNvPr id="7" name="Picture 6">
+            <a:extLst>
+              <a:ext uri="{FF2B5EF4-FFF2-40B4-BE49-F238E27FC236}">
+                <a16:creationId xmlns:a16="http://schemas.microsoft.com/office/drawing/2014/main" id="{FDD6BFF6-4540-3B4C-8581-C448820DAFE9}"/>
+              </a:ext>
+            </a:extLst>
+          </p:cNvPr>
+          <p:cNvPicPr>
+            <a:picLocks noChangeAspect="1"/>
+          </p:cNvPicPr>
+          <p:nvPr/>
+        </p:nvPicPr>
+        <p:blipFill>
+          <a:blip r:embed="rId2"/>
+          <a:stretch>
+            <a:fillRect/>
+          </a:stretch>
+        </p:blipFill>
+        <p:spPr>
+          <a:xfrm>
+            <a:off x="3264751" y="2917532"/>
+            <a:ext cx="4445000" cy="3521364"/>
+          </a:xfrm>
+          <a:prstGeom prst="rect">
+            <a:avLst/>
+          </a:prstGeom>
+        </p:spPr>
+      </p:pic>
     </p:spTree>
     <p:extLst>
       <p:ext uri="{BB962C8B-B14F-4D97-AF65-F5344CB8AC3E}">
-        <p14:creationId xmlns:p14="http://schemas.microsoft.com/office/powerpoint/2010/main" val="3885824606"/>
+        <p14:creationId xmlns:p14="http://schemas.microsoft.com/office/powerpoint/2010/main" val="538053837"/>
       </p:ext>
     </p:extLst>
   </p:cSld>

</xml_diff>

<commit_message>
PP Präsentation für sass angepasst.
</commit_message>
<xml_diff>
--- a/html Schulung.pptx
+++ b/html Schulung.pptx
@@ -5,7 +5,7 @@
     <p:sldMasterId id="2147483660" r:id="rId1"/>
   </p:sldMasterIdLst>
   <p:notesMasterIdLst>
-    <p:notesMasterId r:id="rId116"/>
+    <p:notesMasterId r:id="rId114"/>
   </p:notesMasterIdLst>
   <p:sldIdLst>
     <p:sldId id="256" r:id="rId2"/>
@@ -117,11 +117,9 @@
     <p:sldId id="344" r:id="rId108"/>
     <p:sldId id="345" r:id="rId109"/>
     <p:sldId id="346" r:id="rId110"/>
-    <p:sldId id="347" r:id="rId111"/>
-    <p:sldId id="348" r:id="rId112"/>
-    <p:sldId id="337" r:id="rId113"/>
-    <p:sldId id="338" r:id="rId114"/>
-    <p:sldId id="264" r:id="rId115"/>
+    <p:sldId id="337" r:id="rId111"/>
+    <p:sldId id="338" r:id="rId112"/>
+    <p:sldId id="264" r:id="rId113"/>
   </p:sldIdLst>
   <p:sldSz cx="12192000" cy="6858000"/>
   <p:notesSz cx="6858000" cy="9144000"/>
@@ -11886,166 +11884,6 @@
       </p:grpSpPr>
       <p:sp>
         <p:nvSpPr>
-          <p:cNvPr id="2" name="Titel 1">
-            <a:extLst>
-              <a:ext uri="{FF2B5EF4-FFF2-40B4-BE49-F238E27FC236}">
-                <a16:creationId xmlns:a16="http://schemas.microsoft.com/office/drawing/2014/main" id="{AF291B26-8D81-6E41-9D56-468BA39AAAEB}"/>
-              </a:ext>
-            </a:extLst>
-          </p:cNvPr>
-          <p:cNvSpPr>
-            <a:spLocks noGrp="1"/>
-          </p:cNvSpPr>
-          <p:nvPr>
-            <p:ph type="title"/>
-          </p:nvPr>
-        </p:nvSpPr>
-        <p:spPr/>
-        <p:txBody>
-          <a:bodyPr/>
-          <a:lstStyle/>
-          <a:p>
-            <a:endParaRPr lang="de-DE"/>
-          </a:p>
-        </p:txBody>
-      </p:sp>
-      <p:sp>
-        <p:nvSpPr>
-          <p:cNvPr id="3" name="Inhaltsplatzhalter 2">
-            <a:extLst>
-              <a:ext uri="{FF2B5EF4-FFF2-40B4-BE49-F238E27FC236}">
-                <a16:creationId xmlns:a16="http://schemas.microsoft.com/office/drawing/2014/main" id="{4D3977DA-9BC2-944B-B95C-E22F84E99A06}"/>
-              </a:ext>
-            </a:extLst>
-          </p:cNvPr>
-          <p:cNvSpPr>
-            <a:spLocks noGrp="1"/>
-          </p:cNvSpPr>
-          <p:nvPr>
-            <p:ph idx="1"/>
-          </p:nvPr>
-        </p:nvSpPr>
-        <p:spPr/>
-        <p:txBody>
-          <a:bodyPr/>
-          <a:lstStyle/>
-          <a:p>
-            <a:endParaRPr lang="de-DE"/>
-          </a:p>
-        </p:txBody>
-      </p:sp>
-    </p:spTree>
-    <p:extLst>
-      <p:ext uri="{BB962C8B-B14F-4D97-AF65-F5344CB8AC3E}">
-        <p14:creationId xmlns:p14="http://schemas.microsoft.com/office/powerpoint/2010/main" val="3059955227"/>
-      </p:ext>
-    </p:extLst>
-  </p:cSld>
-  <p:clrMapOvr>
-    <a:masterClrMapping/>
-  </p:clrMapOvr>
-</p:sld>
-</file>
-
-<file path=ppt/slides/slide111.xml><?xml version="1.0" encoding="utf-8"?>
-<p:sld xmlns:a="http://schemas.openxmlformats.org/drawingml/2006/main" xmlns:r="http://schemas.openxmlformats.org/officeDocument/2006/relationships" xmlns:p="http://schemas.openxmlformats.org/presentationml/2006/main">
-  <p:cSld>
-    <p:spTree>
-      <p:nvGrpSpPr>
-        <p:cNvPr id="1" name=""/>
-        <p:cNvGrpSpPr/>
-        <p:nvPr/>
-      </p:nvGrpSpPr>
-      <p:grpSpPr>
-        <a:xfrm>
-          <a:off x="0" y="0"/>
-          <a:ext cx="0" cy="0"/>
-          <a:chOff x="0" y="0"/>
-          <a:chExt cx="0" cy="0"/>
-        </a:xfrm>
-      </p:grpSpPr>
-      <p:sp>
-        <p:nvSpPr>
-          <p:cNvPr id="2" name="Titel 1">
-            <a:extLst>
-              <a:ext uri="{FF2B5EF4-FFF2-40B4-BE49-F238E27FC236}">
-                <a16:creationId xmlns:a16="http://schemas.microsoft.com/office/drawing/2014/main" id="{0CC467E0-2B4E-D94E-9545-469513B5DF9C}"/>
-              </a:ext>
-            </a:extLst>
-          </p:cNvPr>
-          <p:cNvSpPr>
-            <a:spLocks noGrp="1"/>
-          </p:cNvSpPr>
-          <p:nvPr>
-            <p:ph type="title"/>
-          </p:nvPr>
-        </p:nvSpPr>
-        <p:spPr/>
-        <p:txBody>
-          <a:bodyPr/>
-          <a:lstStyle/>
-          <a:p>
-            <a:endParaRPr lang="de-DE"/>
-          </a:p>
-        </p:txBody>
-      </p:sp>
-      <p:sp>
-        <p:nvSpPr>
-          <p:cNvPr id="3" name="Inhaltsplatzhalter 2">
-            <a:extLst>
-              <a:ext uri="{FF2B5EF4-FFF2-40B4-BE49-F238E27FC236}">
-                <a16:creationId xmlns:a16="http://schemas.microsoft.com/office/drawing/2014/main" id="{51424325-0549-D545-B91C-5496B67B995F}"/>
-              </a:ext>
-            </a:extLst>
-          </p:cNvPr>
-          <p:cNvSpPr>
-            <a:spLocks noGrp="1"/>
-          </p:cNvSpPr>
-          <p:nvPr>
-            <p:ph idx="1"/>
-          </p:nvPr>
-        </p:nvSpPr>
-        <p:spPr/>
-        <p:txBody>
-          <a:bodyPr/>
-          <a:lstStyle/>
-          <a:p>
-            <a:endParaRPr lang="de-DE"/>
-          </a:p>
-        </p:txBody>
-      </p:sp>
-    </p:spTree>
-    <p:extLst>
-      <p:ext uri="{BB962C8B-B14F-4D97-AF65-F5344CB8AC3E}">
-        <p14:creationId xmlns:p14="http://schemas.microsoft.com/office/powerpoint/2010/main" val="4282559993"/>
-      </p:ext>
-    </p:extLst>
-  </p:cSld>
-  <p:clrMapOvr>
-    <a:masterClrMapping/>
-  </p:clrMapOvr>
-</p:sld>
-</file>
-
-<file path=ppt/slides/slide112.xml><?xml version="1.0" encoding="utf-8"?>
-<p:sld xmlns:a="http://schemas.openxmlformats.org/drawingml/2006/main" xmlns:r="http://schemas.openxmlformats.org/officeDocument/2006/relationships" xmlns:p="http://schemas.openxmlformats.org/presentationml/2006/main">
-  <p:cSld>
-    <p:spTree>
-      <p:nvGrpSpPr>
-        <p:cNvPr id="1" name=""/>
-        <p:cNvGrpSpPr/>
-        <p:nvPr/>
-      </p:nvGrpSpPr>
-      <p:grpSpPr>
-        <a:xfrm>
-          <a:off x="0" y="0"/>
-          <a:ext cx="0" cy="0"/>
-          <a:chOff x="0" y="0"/>
-          <a:chExt cx="0" cy="0"/>
-        </a:xfrm>
-      </p:grpSpPr>
-      <p:sp>
-        <p:nvSpPr>
           <p:cNvPr id="2" name="Title 1">
             <a:extLst>
               <a:ext uri="{FF2B5EF4-FFF2-40B4-BE49-F238E27FC236}">
@@ -12135,7 +11973,7 @@
 </p:sld>
 </file>
 
-<file path=ppt/slides/slide113.xml><?xml version="1.0" encoding="utf-8"?>
+<file path=ppt/slides/slide111.xml><?xml version="1.0" encoding="utf-8"?>
 <p:sld xmlns:a="http://schemas.openxmlformats.org/drawingml/2006/main" xmlns:r="http://schemas.openxmlformats.org/officeDocument/2006/relationships" xmlns:p="http://schemas.openxmlformats.org/presentationml/2006/main">
   <p:cSld>
     <p:spTree>
@@ -12301,7 +12139,7 @@
 </p:sld>
 </file>
 
-<file path=ppt/slides/slide114.xml><?xml version="1.0" encoding="utf-8"?>
+<file path=ppt/slides/slide112.xml><?xml version="1.0" encoding="utf-8"?>
 <p:sld xmlns:a="http://schemas.openxmlformats.org/drawingml/2006/main" xmlns:r="http://schemas.openxmlformats.org/officeDocument/2006/relationships" xmlns:p="http://schemas.openxmlformats.org/presentationml/2006/main">
   <p:cSld>
     <p:spTree>

</xml_diff>